<commit_message>
Added slides on namespace; stdout; variables
</commit_message>
<xml_diff>
--- a/CPlusPlus/essential_cpp.pptx
+++ b/CPlusPlus/essential_cpp.pptx
@@ -5,7 +5,7 @@
     <p:sldMasterId id="2147483660" r:id="rId1"/>
   </p:sldMasterIdLst>
   <p:notesMasterIdLst>
-    <p:notesMasterId r:id="rId10"/>
+    <p:notesMasterId r:id="rId14"/>
   </p:notesMasterIdLst>
   <p:sldIdLst>
     <p:sldId id="256" r:id="rId2"/>
@@ -16,6 +16,10 @@
     <p:sldId id="261" r:id="rId7"/>
     <p:sldId id="262" r:id="rId8"/>
     <p:sldId id="263" r:id="rId9"/>
+    <p:sldId id="264" r:id="rId10"/>
+    <p:sldId id="265" r:id="rId11"/>
+    <p:sldId id="266" r:id="rId12"/>
+    <p:sldId id="267" r:id="rId13"/>
   </p:sldIdLst>
   <p:sldSz cx="9144000" cy="6858000" type="screen4x3"/>
   <p:notesSz cx="6858000" cy="9144000"/>
@@ -114,6 +118,11 @@
       </a:defRPr>
     </a:lvl9pPr>
   </p:defaultTextStyle>
+  <p:extLst>
+    <p:ext uri="{EFAFB233-063F-42B5-8137-9DF3F51BA10A}">
+      <p15:sldGuideLst xmlns:p15="http://schemas.microsoft.com/office/powerpoint/2012/main"/>
+    </p:ext>
+  </p:extLst>
 </p:presentation>
 </file>
 
@@ -199,7 +208,7 @@
           <a:p>
             <a:fld id="{959286F1-78EA-4A32-8D12-1F28CCE43A8D}" type="datetimeFigureOut">
               <a:rPr lang="en-US" smtClean="0"/>
-              <a:t>2017-02-06</a:t>
+              <a:t>2017-02-09</a:t>
             </a:fld>
             <a:endParaRPr lang="en-US"/>
           </a:p>
@@ -682,7 +691,7 @@
           <a:p>
             <a:fld id="{7E64AD2A-13EC-46C7-9287-3CACAC3798D5}" type="datetime1">
               <a:rPr lang="en-US" smtClean="0"/>
-              <a:t>2017-02-06</a:t>
+              <a:t>2017-02-09</a:t>
             </a:fld>
             <a:endParaRPr lang="en-US"/>
           </a:p>
@@ -852,7 +861,7 @@
           <a:p>
             <a:fld id="{43AE06E8-3793-4EB5-8012-97A6BFC78375}" type="datetime1">
               <a:rPr lang="en-US" smtClean="0"/>
-              <a:t>2017-02-06</a:t>
+              <a:t>2017-02-09</a:t>
             </a:fld>
             <a:endParaRPr lang="en-US"/>
           </a:p>
@@ -1032,7 +1041,7 @@
           <a:p>
             <a:fld id="{E234FBB9-2650-4E82-9375-3AD81E2FC1C9}" type="datetime1">
               <a:rPr lang="en-US" smtClean="0"/>
-              <a:t>2017-02-06</a:t>
+              <a:t>2017-02-09</a:t>
             </a:fld>
             <a:endParaRPr lang="en-US"/>
           </a:p>
@@ -1202,7 +1211,7 @@
           <a:p>
             <a:fld id="{913E3CEC-9565-4823-A6C8-B34B815EB4CE}" type="datetime1">
               <a:rPr lang="en-US" smtClean="0"/>
-              <a:t>2017-02-06</a:t>
+              <a:t>2017-02-09</a:t>
             </a:fld>
             <a:endParaRPr lang="en-US"/>
           </a:p>
@@ -1446,7 +1455,7 @@
           <a:p>
             <a:fld id="{F5251CD9-EE9A-4CFE-A7E1-729B5C9F077D}" type="datetime1">
               <a:rPr lang="en-US" smtClean="0"/>
-              <a:t>2017-02-06</a:t>
+              <a:t>2017-02-09</a:t>
             </a:fld>
             <a:endParaRPr lang="en-US"/>
           </a:p>
@@ -1678,7 +1687,7 @@
           <a:p>
             <a:fld id="{9D8A7943-CAAB-4232-A550-28565CC8A736}" type="datetime1">
               <a:rPr lang="en-US" smtClean="0"/>
-              <a:t>2017-02-06</a:t>
+              <a:t>2017-02-09</a:t>
             </a:fld>
             <a:endParaRPr lang="en-US"/>
           </a:p>
@@ -2045,7 +2054,7 @@
           <a:p>
             <a:fld id="{AECA22B3-9CAA-48F4-B0A5-AAC29DCE38BB}" type="datetime1">
               <a:rPr lang="en-US" smtClean="0"/>
-              <a:t>2017-02-06</a:t>
+              <a:t>2017-02-09</a:t>
             </a:fld>
             <a:endParaRPr lang="en-US"/>
           </a:p>
@@ -2163,7 +2172,7 @@
           <a:p>
             <a:fld id="{17BEA515-885F-453F-9DB6-FB7EBDD5269C}" type="datetime1">
               <a:rPr lang="en-US" smtClean="0"/>
-              <a:t>2017-02-06</a:t>
+              <a:t>2017-02-09</a:t>
             </a:fld>
             <a:endParaRPr lang="en-US"/>
           </a:p>
@@ -2258,7 +2267,7 @@
           <a:p>
             <a:fld id="{DF49C002-0A7D-4B38-A829-C7867DEAC314}" type="datetime1">
               <a:rPr lang="en-US" smtClean="0"/>
-              <a:t>2017-02-06</a:t>
+              <a:t>2017-02-09</a:t>
             </a:fld>
             <a:endParaRPr lang="en-US"/>
           </a:p>
@@ -2535,7 +2544,7 @@
           <a:p>
             <a:fld id="{DF81AE77-813F-4EB7-92DB-CEFC7AEFB117}" type="datetime1">
               <a:rPr lang="en-US" smtClean="0"/>
-              <a:t>2017-02-06</a:t>
+              <a:t>2017-02-09</a:t>
             </a:fld>
             <a:endParaRPr lang="en-US"/>
           </a:p>
@@ -2792,7 +2801,7 @@
           <a:p>
             <a:fld id="{C3D8A7DD-E8A7-4B8B-A1C0-3939B552071F}" type="datetime1">
               <a:rPr lang="en-US" smtClean="0"/>
-              <a:t>2017-02-06</a:t>
+              <a:t>2017-02-09</a:t>
             </a:fld>
             <a:endParaRPr lang="en-US"/>
           </a:p>
@@ -3005,7 +3014,7 @@
           <a:p>
             <a:fld id="{0DDF3A26-7F7C-417D-882D-6FCBBDE254C3}" type="datetime1">
               <a:rPr lang="en-US" smtClean="0"/>
-              <a:t>2017-02-06</a:t>
+              <a:t>2017-02-09</a:t>
             </a:fld>
             <a:endParaRPr lang="en-US"/>
           </a:p>
@@ -3546,6 +3555,3357 @@
     <p:extLst>
       <p:ext uri="{BB962C8B-B14F-4D97-AF65-F5344CB8AC3E}">
         <p14:creationId xmlns:p14="http://schemas.microsoft.com/office/powerpoint/2010/main" val="2851347657"/>
+      </p:ext>
+    </p:extLst>
+  </p:cSld>
+  <p:clrMapOvr>
+    <a:masterClrMapping/>
+  </p:clrMapOvr>
+  <p:timing>
+    <p:tnLst>
+      <p:par>
+        <p:cTn id="1" dur="indefinite" restart="never" nodeType="tmRoot"/>
+      </p:par>
+    </p:tnLst>
+  </p:timing>
+</p:sld>
+</file>
+
+<file path=ppt/slides/slide10.xml><?xml version="1.0" encoding="utf-8"?>
+<p:sld xmlns:a="http://schemas.openxmlformats.org/drawingml/2006/main" xmlns:r="http://schemas.openxmlformats.org/officeDocument/2006/relationships" xmlns:p="http://schemas.openxmlformats.org/presentationml/2006/main">
+  <p:cSld>
+    <p:spTree>
+      <p:nvGrpSpPr>
+        <p:cNvPr id="1" name=""/>
+        <p:cNvGrpSpPr/>
+        <p:nvPr/>
+      </p:nvGrpSpPr>
+      <p:grpSpPr>
+        <a:xfrm>
+          <a:off x="0" y="0"/>
+          <a:ext cx="0" cy="0"/>
+          <a:chOff x="0" y="0"/>
+          <a:chExt cx="0" cy="0"/>
+        </a:xfrm>
+      </p:grpSpPr>
+      <p:sp>
+        <p:nvSpPr>
+          <p:cNvPr id="2" name="Title 1"/>
+          <p:cNvSpPr>
+            <a:spLocks noGrp="1"/>
+          </p:cNvSpPr>
+          <p:nvPr>
+            <p:ph type="title"/>
+          </p:nvPr>
+        </p:nvSpPr>
+        <p:spPr/>
+        <p:txBody>
+          <a:bodyPr/>
+          <a:lstStyle/>
+          <a:p>
+            <a:r>
+              <a:rPr lang="en-US" dirty="0" smtClean="0"/>
+              <a:t>Getting things out</a:t>
+            </a:r>
+            <a:endParaRPr lang="en-US" dirty="0"/>
+          </a:p>
+        </p:txBody>
+      </p:sp>
+      <p:sp>
+        <p:nvSpPr>
+          <p:cNvPr id="3" name="Content Placeholder 2"/>
+          <p:cNvSpPr>
+            <a:spLocks noGrp="1"/>
+          </p:cNvSpPr>
+          <p:nvPr>
+            <p:ph idx="1"/>
+          </p:nvPr>
+        </p:nvSpPr>
+        <p:spPr/>
+        <p:txBody>
+          <a:bodyPr/>
+          <a:lstStyle/>
+          <a:p>
+            <a:r>
+              <a:rPr lang="en-US" dirty="0" smtClean="0"/>
+              <a:t>Writing to terminal, i.e., </a:t>
+            </a:r>
+            <a:r>
+              <a:rPr lang="en-US" dirty="0" err="1" smtClean="0">
+                <a:latin typeface="Courier New" panose="02070309020205020404" pitchFamily="49" charset="0"/>
+                <a:cs typeface="Courier New" panose="02070309020205020404" pitchFamily="49" charset="0"/>
+              </a:rPr>
+              <a:t>cout</a:t>
+            </a:r>
+            <a:endParaRPr lang="en-US" dirty="0">
+              <a:latin typeface="Courier New" panose="02070309020205020404" pitchFamily="49" charset="0"/>
+              <a:cs typeface="Courier New" panose="02070309020205020404" pitchFamily="49" charset="0"/>
+            </a:endParaRPr>
+          </a:p>
+        </p:txBody>
+      </p:sp>
+      <p:sp>
+        <p:nvSpPr>
+          <p:cNvPr id="4" name="Slide Number Placeholder 3"/>
+          <p:cNvSpPr>
+            <a:spLocks noGrp="1"/>
+          </p:cNvSpPr>
+          <p:nvPr>
+            <p:ph type="sldNum" sz="quarter" idx="12"/>
+          </p:nvPr>
+        </p:nvSpPr>
+        <p:spPr/>
+        <p:txBody>
+          <a:bodyPr/>
+          <a:lstStyle/>
+          <a:p>
+            <a:fld id="{033373DF-BCDA-4600-B448-AFBDB22F4A39}" type="slidenum">
+              <a:rPr lang="en-US" smtClean="0"/>
+              <a:t>10</a:t>
+            </a:fld>
+            <a:endParaRPr lang="en-US"/>
+          </a:p>
+        </p:txBody>
+      </p:sp>
+      <p:sp>
+        <p:nvSpPr>
+          <p:cNvPr id="5" name="TextBox 4"/>
+          <p:cNvSpPr txBox="1"/>
+          <p:nvPr/>
+        </p:nvSpPr>
+        <p:spPr>
+          <a:xfrm>
+            <a:off x="1061267" y="2415473"/>
+            <a:ext cx="6244101" cy="1323439"/>
+          </a:xfrm>
+          <a:prstGeom prst="rect">
+            <a:avLst/>
+          </a:prstGeom>
+          <a:solidFill>
+            <a:schemeClr val="bg1">
+              <a:lumMod val="75000"/>
+            </a:schemeClr>
+          </a:solidFill>
+        </p:spPr>
+        <p:txBody>
+          <a:bodyPr wrap="square" rtlCol="0">
+            <a:spAutoFit/>
+          </a:bodyPr>
+          <a:lstStyle/>
+          <a:p>
+            <a:r>
+              <a:rPr lang="en-US" sz="1600" dirty="0" smtClean="0">
+                <a:latin typeface="Courier New" pitchFamily="49" charset="0"/>
+                <a:cs typeface="Courier New" pitchFamily="49" charset="0"/>
+              </a:rPr>
+              <a:t>#include &lt;</a:t>
+            </a:r>
+            <a:r>
+              <a:rPr lang="en-US" sz="1600" b="1" dirty="0" err="1" smtClean="0">
+                <a:solidFill>
+                  <a:srgbClr val="C00000"/>
+                </a:solidFill>
+                <a:latin typeface="Courier New" pitchFamily="49" charset="0"/>
+                <a:cs typeface="Courier New" pitchFamily="49" charset="0"/>
+              </a:rPr>
+              <a:t>iostream</a:t>
+            </a:r>
+            <a:r>
+              <a:rPr lang="en-US" sz="1600" dirty="0" smtClean="0">
+                <a:latin typeface="Courier New" pitchFamily="49" charset="0"/>
+                <a:cs typeface="Courier New" pitchFamily="49" charset="0"/>
+              </a:rPr>
+              <a:t>&gt;</a:t>
+            </a:r>
+          </a:p>
+          <a:p>
+            <a:r>
+              <a:rPr lang="en-US" sz="1600" dirty="0" smtClean="0">
+                <a:latin typeface="Courier New" pitchFamily="49" charset="0"/>
+                <a:cs typeface="Courier New" pitchFamily="49" charset="0"/>
+              </a:rPr>
+              <a:t>use namespace </a:t>
+            </a:r>
+            <a:r>
+              <a:rPr lang="en-US" sz="1600" dirty="0" err="1" smtClean="0">
+                <a:latin typeface="Courier New" pitchFamily="49" charset="0"/>
+                <a:cs typeface="Courier New" pitchFamily="49" charset="0"/>
+              </a:rPr>
+              <a:t>std</a:t>
+            </a:r>
+            <a:r>
+              <a:rPr lang="en-US" sz="1600" dirty="0" smtClean="0">
+                <a:latin typeface="Courier New" pitchFamily="49" charset="0"/>
+                <a:cs typeface="Courier New" pitchFamily="49" charset="0"/>
+              </a:rPr>
+              <a:t>;</a:t>
+            </a:r>
+            <a:endParaRPr lang="en-US" sz="1600" dirty="0" smtClean="0">
+              <a:latin typeface="Courier New" pitchFamily="49" charset="0"/>
+              <a:cs typeface="Courier New" pitchFamily="49" charset="0"/>
+            </a:endParaRPr>
+          </a:p>
+          <a:p>
+            <a:r>
+              <a:rPr lang="en-US" sz="1600" dirty="0" smtClean="0">
+                <a:latin typeface="Courier New" pitchFamily="49" charset="0"/>
+                <a:cs typeface="Courier New" pitchFamily="49" charset="0"/>
+              </a:rPr>
+              <a:t>…</a:t>
+            </a:r>
+            <a:endParaRPr lang="en-US" sz="1600" dirty="0" smtClean="0">
+              <a:latin typeface="Courier New" pitchFamily="49" charset="0"/>
+              <a:cs typeface="Courier New" pitchFamily="49" charset="0"/>
+            </a:endParaRPr>
+          </a:p>
+          <a:p>
+            <a:r>
+              <a:rPr lang="en-US" sz="1600" dirty="0" smtClean="0">
+                <a:latin typeface="Courier New" pitchFamily="49" charset="0"/>
+                <a:cs typeface="Courier New" pitchFamily="49" charset="0"/>
+              </a:rPr>
+              <a:t>    </a:t>
+            </a:r>
+            <a:r>
+              <a:rPr lang="en-US" sz="1600" b="1" dirty="0" err="1" smtClean="0">
+                <a:solidFill>
+                  <a:srgbClr val="C00000"/>
+                </a:solidFill>
+                <a:latin typeface="Courier New" pitchFamily="49" charset="0"/>
+                <a:cs typeface="Courier New" pitchFamily="49" charset="0"/>
+              </a:rPr>
+              <a:t>cout</a:t>
+            </a:r>
+            <a:r>
+              <a:rPr lang="en-US" sz="1600" dirty="0" smtClean="0">
+                <a:latin typeface="Courier New" pitchFamily="49" charset="0"/>
+                <a:cs typeface="Courier New" pitchFamily="49" charset="0"/>
+              </a:rPr>
+              <a:t> </a:t>
+            </a:r>
+            <a:r>
+              <a:rPr lang="en-US" sz="1600" dirty="0" smtClean="0">
+                <a:latin typeface="Courier New" pitchFamily="49" charset="0"/>
+                <a:cs typeface="Courier New" pitchFamily="49" charset="0"/>
+              </a:rPr>
+              <a:t>&lt;&lt; "hello " &lt;&lt; </a:t>
+            </a:r>
+            <a:r>
+              <a:rPr lang="en-US" sz="1600" dirty="0" err="1" smtClean="0">
+                <a:latin typeface="Courier New" pitchFamily="49" charset="0"/>
+                <a:cs typeface="Courier New" pitchFamily="49" charset="0"/>
+              </a:rPr>
+              <a:t>argv</a:t>
+            </a:r>
+            <a:r>
+              <a:rPr lang="en-US" sz="1600" dirty="0" smtClean="0">
+                <a:latin typeface="Courier New" pitchFamily="49" charset="0"/>
+                <a:cs typeface="Courier New" pitchFamily="49" charset="0"/>
+              </a:rPr>
+              <a:t>[1] &lt;&lt; "!" &lt;&lt; </a:t>
+            </a:r>
+            <a:r>
+              <a:rPr lang="en-US" sz="1600" b="1" dirty="0" err="1" smtClean="0">
+                <a:solidFill>
+                  <a:srgbClr val="C00000"/>
+                </a:solidFill>
+                <a:latin typeface="Courier New" pitchFamily="49" charset="0"/>
+                <a:cs typeface="Courier New" pitchFamily="49" charset="0"/>
+              </a:rPr>
+              <a:t>endl</a:t>
+            </a:r>
+            <a:r>
+              <a:rPr lang="en-US" sz="1600" dirty="0" smtClean="0">
+                <a:latin typeface="Courier New" pitchFamily="49" charset="0"/>
+                <a:cs typeface="Courier New" pitchFamily="49" charset="0"/>
+              </a:rPr>
+              <a:t>;</a:t>
+            </a:r>
+          </a:p>
+          <a:p>
+            <a:r>
+              <a:rPr lang="en-US" sz="1600" dirty="0" smtClean="0">
+                <a:latin typeface="Courier New" pitchFamily="49" charset="0"/>
+                <a:cs typeface="Courier New" pitchFamily="49" charset="0"/>
+              </a:rPr>
+              <a:t>…</a:t>
+            </a:r>
+            <a:endParaRPr lang="en-US" sz="1600" dirty="0">
+              <a:latin typeface="Courier New" pitchFamily="49" charset="0"/>
+              <a:cs typeface="Courier New" pitchFamily="49" charset="0"/>
+            </a:endParaRPr>
+          </a:p>
+        </p:txBody>
+      </p:sp>
+      <p:grpSp>
+        <p:nvGrpSpPr>
+          <p:cNvPr id="6" name="Group 5"/>
+          <p:cNvGrpSpPr/>
+          <p:nvPr/>
+        </p:nvGrpSpPr>
+        <p:grpSpPr>
+          <a:xfrm>
+            <a:off x="1061267" y="2008321"/>
+            <a:ext cx="7305983" cy="707886"/>
+            <a:chOff x="-2572239" y="3685670"/>
+            <a:chExt cx="7305983" cy="707886"/>
+          </a:xfrm>
+        </p:grpSpPr>
+        <p:sp>
+          <p:nvSpPr>
+            <p:cNvPr id="7" name="TextBox 6"/>
+            <p:cNvSpPr txBox="1"/>
+            <p:nvPr/>
+          </p:nvSpPr>
+          <p:spPr>
+            <a:xfrm>
+              <a:off x="2146017" y="3685670"/>
+              <a:ext cx="2587727" cy="707886"/>
+            </a:xfrm>
+            <a:prstGeom prst="rect">
+              <a:avLst/>
+            </a:prstGeom>
+            <a:solidFill>
+              <a:schemeClr val="bg1"/>
+            </a:solidFill>
+            <a:ln w="19050">
+              <a:solidFill>
+                <a:srgbClr val="C00000"/>
+              </a:solidFill>
+            </a:ln>
+          </p:spPr>
+          <p:txBody>
+            <a:bodyPr wrap="square" rtlCol="0">
+              <a:spAutoFit/>
+            </a:bodyPr>
+            <a:lstStyle/>
+            <a:p>
+              <a:r>
+                <a:rPr lang="en-US" sz="2000" dirty="0" smtClean="0">
+                  <a:solidFill>
+                    <a:srgbClr val="C00000"/>
+                  </a:solidFill>
+                </a:rPr>
+                <a:t>import declarations of</a:t>
+              </a:r>
+            </a:p>
+            <a:p>
+              <a:r>
+                <a:rPr lang="en-US" sz="2000" dirty="0" err="1" smtClean="0">
+                  <a:solidFill>
+                    <a:srgbClr val="C00000"/>
+                  </a:solidFill>
+                  <a:latin typeface="Courier New" panose="02070309020205020404" pitchFamily="49" charset="0"/>
+                  <a:cs typeface="Courier New" panose="02070309020205020404" pitchFamily="49" charset="0"/>
+                </a:rPr>
+                <a:t>cout</a:t>
+              </a:r>
+              <a:r>
+                <a:rPr lang="en-US" sz="2000" dirty="0" smtClean="0">
+                  <a:solidFill>
+                    <a:srgbClr val="C00000"/>
+                  </a:solidFill>
+                </a:rPr>
+                <a:t>, </a:t>
+              </a:r>
+              <a:r>
+                <a:rPr lang="en-US" sz="2000" dirty="0" err="1" smtClean="0">
+                  <a:solidFill>
+                    <a:srgbClr val="C00000"/>
+                  </a:solidFill>
+                  <a:latin typeface="Courier New" panose="02070309020205020404" pitchFamily="49" charset="0"/>
+                  <a:cs typeface="Courier New" panose="02070309020205020404" pitchFamily="49" charset="0"/>
+                </a:rPr>
+                <a:t>endl</a:t>
+              </a:r>
+              <a:endParaRPr lang="en-US" sz="2000" dirty="0">
+                <a:solidFill>
+                  <a:srgbClr val="C00000"/>
+                </a:solidFill>
+                <a:latin typeface="Courier New" panose="02070309020205020404" pitchFamily="49" charset="0"/>
+                <a:cs typeface="Courier New" panose="02070309020205020404" pitchFamily="49" charset="0"/>
+              </a:endParaRPr>
+            </a:p>
+          </p:txBody>
+        </p:sp>
+        <p:sp>
+          <p:nvSpPr>
+            <p:cNvPr id="8" name="Rectangle 7"/>
+            <p:cNvSpPr/>
+            <p:nvPr/>
+          </p:nvSpPr>
+          <p:spPr>
+            <a:xfrm>
+              <a:off x="-2572239" y="4112712"/>
+              <a:ext cx="2434588" cy="280844"/>
+            </a:xfrm>
+            <a:prstGeom prst="rect">
+              <a:avLst/>
+            </a:prstGeom>
+            <a:noFill/>
+            <a:ln w="19050">
+              <a:solidFill>
+                <a:srgbClr val="C00000"/>
+              </a:solidFill>
+            </a:ln>
+          </p:spPr>
+          <p:style>
+            <a:lnRef idx="2">
+              <a:schemeClr val="accent1">
+                <a:shade val="50000"/>
+              </a:schemeClr>
+            </a:lnRef>
+            <a:fillRef idx="1">
+              <a:schemeClr val="accent1"/>
+            </a:fillRef>
+            <a:effectRef idx="0">
+              <a:schemeClr val="accent1"/>
+            </a:effectRef>
+            <a:fontRef idx="minor">
+              <a:schemeClr val="lt1"/>
+            </a:fontRef>
+          </p:style>
+          <p:txBody>
+            <a:bodyPr rtlCol="0" anchor="ctr"/>
+            <a:lstStyle/>
+            <a:p>
+              <a:pPr algn="ctr"/>
+              <a:endParaRPr lang="en-US"/>
+            </a:p>
+          </p:txBody>
+        </p:sp>
+        <p:cxnSp>
+          <p:nvCxnSpPr>
+            <p:cNvPr id="9" name="Straight Arrow Connector 8"/>
+            <p:cNvCxnSpPr>
+              <a:stCxn id="7" idx="1"/>
+              <a:endCxn id="8" idx="3"/>
+            </p:cNvCxnSpPr>
+            <p:nvPr/>
+          </p:nvCxnSpPr>
+          <p:spPr>
+            <a:xfrm flipH="1">
+              <a:off x="-137651" y="4039613"/>
+              <a:ext cx="2283668" cy="213521"/>
+            </a:xfrm>
+            <a:prstGeom prst="straightConnector1">
+              <a:avLst/>
+            </a:prstGeom>
+            <a:ln w="19050">
+              <a:solidFill>
+                <a:srgbClr val="C00000"/>
+              </a:solidFill>
+              <a:tailEnd type="stealth" w="lg" len="lg"/>
+            </a:ln>
+          </p:spPr>
+          <p:style>
+            <a:lnRef idx="1">
+              <a:schemeClr val="accent1"/>
+            </a:lnRef>
+            <a:fillRef idx="0">
+              <a:schemeClr val="accent1"/>
+            </a:fillRef>
+            <a:effectRef idx="0">
+              <a:schemeClr val="accent1"/>
+            </a:effectRef>
+            <a:fontRef idx="minor">
+              <a:schemeClr val="tx1"/>
+            </a:fontRef>
+          </p:style>
+        </p:cxnSp>
+      </p:grpSp>
+      <p:grpSp>
+        <p:nvGrpSpPr>
+          <p:cNvPr id="13" name="Group 12"/>
+          <p:cNvGrpSpPr/>
+          <p:nvPr/>
+        </p:nvGrpSpPr>
+        <p:grpSpPr>
+          <a:xfrm>
+            <a:off x="6213986" y="3176831"/>
+            <a:ext cx="1415846" cy="1141579"/>
+            <a:chOff x="2044622" y="2944201"/>
+            <a:chExt cx="1415846" cy="1141579"/>
+          </a:xfrm>
+        </p:grpSpPr>
+        <p:sp>
+          <p:nvSpPr>
+            <p:cNvPr id="14" name="TextBox 13"/>
+            <p:cNvSpPr txBox="1"/>
+            <p:nvPr/>
+          </p:nvSpPr>
+          <p:spPr>
+            <a:xfrm>
+              <a:off x="2146017" y="3685670"/>
+              <a:ext cx="1314451" cy="400110"/>
+            </a:xfrm>
+            <a:prstGeom prst="rect">
+              <a:avLst/>
+            </a:prstGeom>
+            <a:solidFill>
+              <a:schemeClr val="bg1"/>
+            </a:solidFill>
+            <a:ln w="19050">
+              <a:solidFill>
+                <a:srgbClr val="C00000"/>
+              </a:solidFill>
+            </a:ln>
+          </p:spPr>
+          <p:txBody>
+            <a:bodyPr wrap="square" rtlCol="0">
+              <a:spAutoFit/>
+            </a:bodyPr>
+            <a:lstStyle/>
+            <a:p>
+              <a:r>
+                <a:rPr lang="en-US" sz="2000" dirty="0" smtClean="0">
+                  <a:solidFill>
+                    <a:srgbClr val="C00000"/>
+                  </a:solidFill>
+                </a:rPr>
+                <a:t>end of line</a:t>
+              </a:r>
+              <a:endParaRPr lang="en-US" sz="2000" dirty="0">
+                <a:solidFill>
+                  <a:srgbClr val="C00000"/>
+                </a:solidFill>
+                <a:latin typeface="Courier New" panose="02070309020205020404" pitchFamily="49" charset="0"/>
+                <a:cs typeface="Courier New" panose="02070309020205020404" pitchFamily="49" charset="0"/>
+              </a:endParaRPr>
+            </a:p>
+          </p:txBody>
+        </p:sp>
+        <p:sp>
+          <p:nvSpPr>
+            <p:cNvPr id="15" name="Rectangle 14"/>
+            <p:cNvSpPr/>
+            <p:nvPr/>
+          </p:nvSpPr>
+          <p:spPr>
+            <a:xfrm>
+              <a:off x="2044622" y="2944201"/>
+              <a:ext cx="590423" cy="280844"/>
+            </a:xfrm>
+            <a:prstGeom prst="rect">
+              <a:avLst/>
+            </a:prstGeom>
+            <a:noFill/>
+            <a:ln w="19050">
+              <a:solidFill>
+                <a:srgbClr val="C00000"/>
+              </a:solidFill>
+            </a:ln>
+          </p:spPr>
+          <p:style>
+            <a:lnRef idx="2">
+              <a:schemeClr val="accent1">
+                <a:shade val="50000"/>
+              </a:schemeClr>
+            </a:lnRef>
+            <a:fillRef idx="1">
+              <a:schemeClr val="accent1"/>
+            </a:fillRef>
+            <a:effectRef idx="0">
+              <a:schemeClr val="accent1"/>
+            </a:effectRef>
+            <a:fontRef idx="minor">
+              <a:schemeClr val="lt1"/>
+            </a:fontRef>
+          </p:style>
+          <p:txBody>
+            <a:bodyPr rtlCol="0" anchor="ctr"/>
+            <a:lstStyle/>
+            <a:p>
+              <a:pPr algn="ctr"/>
+              <a:endParaRPr lang="en-US"/>
+            </a:p>
+          </p:txBody>
+        </p:sp>
+        <p:cxnSp>
+          <p:nvCxnSpPr>
+            <p:cNvPr id="16" name="Straight Arrow Connector 15"/>
+            <p:cNvCxnSpPr>
+              <a:stCxn id="14" idx="0"/>
+              <a:endCxn id="15" idx="2"/>
+            </p:cNvCxnSpPr>
+            <p:nvPr/>
+          </p:nvCxnSpPr>
+          <p:spPr>
+            <a:xfrm flipH="1" flipV="1">
+              <a:off x="2339834" y="3225045"/>
+              <a:ext cx="463409" cy="460625"/>
+            </a:xfrm>
+            <a:prstGeom prst="straightConnector1">
+              <a:avLst/>
+            </a:prstGeom>
+            <a:ln w="19050">
+              <a:solidFill>
+                <a:srgbClr val="C00000"/>
+              </a:solidFill>
+              <a:tailEnd type="stealth" w="lg" len="lg"/>
+            </a:ln>
+          </p:spPr>
+          <p:style>
+            <a:lnRef idx="1">
+              <a:schemeClr val="accent1"/>
+            </a:lnRef>
+            <a:fillRef idx="0">
+              <a:schemeClr val="accent1"/>
+            </a:fillRef>
+            <a:effectRef idx="0">
+              <a:schemeClr val="accent1"/>
+            </a:effectRef>
+            <a:fontRef idx="minor">
+              <a:schemeClr val="tx1"/>
+            </a:fontRef>
+          </p:style>
+        </p:cxnSp>
+      </p:grpSp>
+      <p:grpSp>
+        <p:nvGrpSpPr>
+          <p:cNvPr id="22" name="Group 21"/>
+          <p:cNvGrpSpPr/>
+          <p:nvPr/>
+        </p:nvGrpSpPr>
+        <p:grpSpPr>
+          <a:xfrm>
+            <a:off x="556038" y="3188012"/>
+            <a:ext cx="1605023" cy="1140748"/>
+            <a:chOff x="1030022" y="2944201"/>
+            <a:chExt cx="1605023" cy="1140748"/>
+          </a:xfrm>
+        </p:grpSpPr>
+        <p:sp>
+          <p:nvSpPr>
+            <p:cNvPr id="23" name="TextBox 22"/>
+            <p:cNvSpPr txBox="1"/>
+            <p:nvPr/>
+          </p:nvSpPr>
+          <p:spPr>
+            <a:xfrm>
+              <a:off x="1030022" y="3684839"/>
+              <a:ext cx="1405464" cy="400110"/>
+            </a:xfrm>
+            <a:prstGeom prst="rect">
+              <a:avLst/>
+            </a:prstGeom>
+            <a:solidFill>
+              <a:schemeClr val="bg1"/>
+            </a:solidFill>
+            <a:ln w="19050">
+              <a:solidFill>
+                <a:srgbClr val="C00000"/>
+              </a:solidFill>
+            </a:ln>
+          </p:spPr>
+          <p:txBody>
+            <a:bodyPr wrap="square" rtlCol="0">
+              <a:spAutoFit/>
+            </a:bodyPr>
+            <a:lstStyle/>
+            <a:p>
+              <a:r>
+                <a:rPr lang="en-US" sz="2000" dirty="0" smtClean="0">
+                  <a:solidFill>
+                    <a:srgbClr val="C00000"/>
+                  </a:solidFill>
+                </a:rPr>
+                <a:t>destination</a:t>
+              </a:r>
+              <a:endParaRPr lang="en-US" sz="2000" dirty="0">
+                <a:solidFill>
+                  <a:srgbClr val="C00000"/>
+                </a:solidFill>
+                <a:latin typeface="Courier New" panose="02070309020205020404" pitchFamily="49" charset="0"/>
+                <a:cs typeface="Courier New" panose="02070309020205020404" pitchFamily="49" charset="0"/>
+              </a:endParaRPr>
+            </a:p>
+          </p:txBody>
+        </p:sp>
+        <p:sp>
+          <p:nvSpPr>
+            <p:cNvPr id="24" name="Rectangle 23"/>
+            <p:cNvSpPr/>
+            <p:nvPr/>
+          </p:nvSpPr>
+          <p:spPr>
+            <a:xfrm>
+              <a:off x="2044622" y="2944201"/>
+              <a:ext cx="590423" cy="280844"/>
+            </a:xfrm>
+            <a:prstGeom prst="rect">
+              <a:avLst/>
+            </a:prstGeom>
+            <a:noFill/>
+            <a:ln w="19050">
+              <a:solidFill>
+                <a:srgbClr val="C00000"/>
+              </a:solidFill>
+            </a:ln>
+          </p:spPr>
+          <p:style>
+            <a:lnRef idx="2">
+              <a:schemeClr val="accent1">
+                <a:shade val="50000"/>
+              </a:schemeClr>
+            </a:lnRef>
+            <a:fillRef idx="1">
+              <a:schemeClr val="accent1"/>
+            </a:fillRef>
+            <a:effectRef idx="0">
+              <a:schemeClr val="accent1"/>
+            </a:effectRef>
+            <a:fontRef idx="minor">
+              <a:schemeClr val="lt1"/>
+            </a:fontRef>
+          </p:style>
+          <p:txBody>
+            <a:bodyPr rtlCol="0" anchor="ctr"/>
+            <a:lstStyle/>
+            <a:p>
+              <a:pPr algn="ctr"/>
+              <a:endParaRPr lang="en-US"/>
+            </a:p>
+          </p:txBody>
+        </p:sp>
+        <p:cxnSp>
+          <p:nvCxnSpPr>
+            <p:cNvPr id="25" name="Straight Arrow Connector 24"/>
+            <p:cNvCxnSpPr>
+              <a:stCxn id="23" idx="0"/>
+              <a:endCxn id="24" idx="2"/>
+            </p:cNvCxnSpPr>
+            <p:nvPr/>
+          </p:nvCxnSpPr>
+          <p:spPr>
+            <a:xfrm flipV="1">
+              <a:off x="1732754" y="3225045"/>
+              <a:ext cx="607080" cy="459794"/>
+            </a:xfrm>
+            <a:prstGeom prst="straightConnector1">
+              <a:avLst/>
+            </a:prstGeom>
+            <a:ln w="19050">
+              <a:solidFill>
+                <a:srgbClr val="C00000"/>
+              </a:solidFill>
+              <a:tailEnd type="stealth" w="lg" len="lg"/>
+            </a:ln>
+          </p:spPr>
+          <p:style>
+            <a:lnRef idx="1">
+              <a:schemeClr val="accent1"/>
+            </a:lnRef>
+            <a:fillRef idx="0">
+              <a:schemeClr val="accent1"/>
+            </a:fillRef>
+            <a:effectRef idx="0">
+              <a:schemeClr val="accent1"/>
+            </a:effectRef>
+            <a:fontRef idx="minor">
+              <a:schemeClr val="tx1"/>
+            </a:fontRef>
+          </p:style>
+        </p:cxnSp>
+      </p:grpSp>
+      <p:grpSp>
+        <p:nvGrpSpPr>
+          <p:cNvPr id="30" name="Group 29"/>
+          <p:cNvGrpSpPr/>
+          <p:nvPr/>
+        </p:nvGrpSpPr>
+        <p:grpSpPr>
+          <a:xfrm>
+            <a:off x="2115136" y="3188012"/>
+            <a:ext cx="2329045" cy="1140748"/>
+            <a:chOff x="1030021" y="2944201"/>
+            <a:chExt cx="2329045" cy="1140748"/>
+          </a:xfrm>
+        </p:grpSpPr>
+        <p:sp>
+          <p:nvSpPr>
+            <p:cNvPr id="31" name="TextBox 30"/>
+            <p:cNvSpPr txBox="1"/>
+            <p:nvPr/>
+          </p:nvSpPr>
+          <p:spPr>
+            <a:xfrm>
+              <a:off x="1030021" y="3684839"/>
+              <a:ext cx="2329045" cy="400110"/>
+            </a:xfrm>
+            <a:prstGeom prst="rect">
+              <a:avLst/>
+            </a:prstGeom>
+            <a:solidFill>
+              <a:schemeClr val="bg1"/>
+            </a:solidFill>
+            <a:ln w="19050">
+              <a:solidFill>
+                <a:srgbClr val="C00000"/>
+              </a:solidFill>
+            </a:ln>
+          </p:spPr>
+          <p:txBody>
+            <a:bodyPr wrap="square" rtlCol="0">
+              <a:spAutoFit/>
+            </a:bodyPr>
+            <a:lstStyle/>
+            <a:p>
+              <a:r>
+                <a:rPr lang="en-US" sz="2000" dirty="0" smtClean="0">
+                  <a:solidFill>
+                    <a:srgbClr val="C00000"/>
+                  </a:solidFill>
+                </a:rPr>
+                <a:t>"sen</a:t>
+              </a:r>
+              <a:r>
+                <a:rPr lang="en-US" sz="2000" dirty="0" smtClean="0">
+                  <a:solidFill>
+                    <a:srgbClr val="C00000"/>
+                  </a:solidFill>
+                </a:rPr>
+                <a:t>d </a:t>
+              </a:r>
+              <a:r>
+                <a:rPr lang="en-US" sz="2000" dirty="0" smtClean="0">
+                  <a:solidFill>
+                    <a:srgbClr val="C00000"/>
+                  </a:solidFill>
+                </a:rPr>
+                <a:t>to" </a:t>
+              </a:r>
+              <a:r>
+                <a:rPr lang="en-US" sz="2000" dirty="0" smtClean="0">
+                  <a:solidFill>
+                    <a:srgbClr val="C00000"/>
+                  </a:solidFill>
+                  <a:cs typeface="Courier New" panose="02070309020205020404" pitchFamily="49" charset="0"/>
+                </a:rPr>
+                <a:t>operator</a:t>
+              </a:r>
+              <a:endParaRPr lang="en-US" sz="2000" dirty="0">
+                <a:solidFill>
+                  <a:srgbClr val="C00000"/>
+                </a:solidFill>
+                <a:cs typeface="Courier New" panose="02070309020205020404" pitchFamily="49" charset="0"/>
+              </a:endParaRPr>
+            </a:p>
+          </p:txBody>
+        </p:sp>
+        <p:sp>
+          <p:nvSpPr>
+            <p:cNvPr id="32" name="Rectangle 31"/>
+            <p:cNvSpPr/>
+            <p:nvPr/>
+          </p:nvSpPr>
+          <p:spPr>
+            <a:xfrm>
+              <a:off x="1159044" y="2944201"/>
+              <a:ext cx="251811" cy="280844"/>
+            </a:xfrm>
+            <a:prstGeom prst="rect">
+              <a:avLst/>
+            </a:prstGeom>
+            <a:noFill/>
+            <a:ln w="19050">
+              <a:solidFill>
+                <a:srgbClr val="C00000"/>
+              </a:solidFill>
+            </a:ln>
+          </p:spPr>
+          <p:style>
+            <a:lnRef idx="2">
+              <a:schemeClr val="accent1">
+                <a:shade val="50000"/>
+              </a:schemeClr>
+            </a:lnRef>
+            <a:fillRef idx="1">
+              <a:schemeClr val="accent1"/>
+            </a:fillRef>
+            <a:effectRef idx="0">
+              <a:schemeClr val="accent1"/>
+            </a:effectRef>
+            <a:fontRef idx="minor">
+              <a:schemeClr val="lt1"/>
+            </a:fontRef>
+          </p:style>
+          <p:txBody>
+            <a:bodyPr rtlCol="0" anchor="ctr"/>
+            <a:lstStyle/>
+            <a:p>
+              <a:pPr algn="ctr"/>
+              <a:endParaRPr lang="en-US"/>
+            </a:p>
+          </p:txBody>
+        </p:sp>
+        <p:cxnSp>
+          <p:nvCxnSpPr>
+            <p:cNvPr id="33" name="Straight Arrow Connector 32"/>
+            <p:cNvCxnSpPr>
+              <a:stCxn id="31" idx="0"/>
+              <a:endCxn id="32" idx="2"/>
+            </p:cNvCxnSpPr>
+            <p:nvPr/>
+          </p:nvCxnSpPr>
+          <p:spPr>
+            <a:xfrm flipH="1" flipV="1">
+              <a:off x="1284950" y="3225045"/>
+              <a:ext cx="909594" cy="459794"/>
+            </a:xfrm>
+            <a:prstGeom prst="straightConnector1">
+              <a:avLst/>
+            </a:prstGeom>
+            <a:ln w="19050">
+              <a:solidFill>
+                <a:srgbClr val="C00000"/>
+              </a:solidFill>
+              <a:tailEnd type="stealth" w="lg" len="lg"/>
+            </a:ln>
+          </p:spPr>
+          <p:style>
+            <a:lnRef idx="1">
+              <a:schemeClr val="accent1"/>
+            </a:lnRef>
+            <a:fillRef idx="0">
+              <a:schemeClr val="accent1"/>
+            </a:fillRef>
+            <a:effectRef idx="0">
+              <a:schemeClr val="accent1"/>
+            </a:effectRef>
+            <a:fontRef idx="minor">
+              <a:schemeClr val="tx1"/>
+            </a:fontRef>
+          </p:style>
+        </p:cxnSp>
+      </p:grpSp>
+      <p:sp>
+        <p:nvSpPr>
+          <p:cNvPr id="39" name="TextBox 38"/>
+          <p:cNvSpPr txBox="1"/>
+          <p:nvPr/>
+        </p:nvSpPr>
+        <p:spPr>
+          <a:xfrm>
+            <a:off x="1720644" y="5020162"/>
+            <a:ext cx="4906298" cy="461665"/>
+          </a:xfrm>
+          <a:prstGeom prst="rect">
+            <a:avLst/>
+          </a:prstGeom>
+          <a:noFill/>
+        </p:spPr>
+        <p:txBody>
+          <a:bodyPr wrap="square" rtlCol="0">
+            <a:spAutoFit/>
+          </a:bodyPr>
+          <a:lstStyle/>
+          <a:p>
+            <a:r>
+              <a:rPr lang="en-US" sz="2400" dirty="0" smtClean="0">
+                <a:latin typeface="Courier New" panose="02070309020205020404" pitchFamily="49" charset="0"/>
+                <a:cs typeface="Courier New" panose="02070309020205020404" pitchFamily="49" charset="0"/>
+              </a:rPr>
+              <a:t>"hello "</a:t>
+            </a:r>
+            <a:r>
+              <a:rPr lang="en-US" sz="2400" dirty="0" smtClean="0"/>
+              <a:t>: string constant, i.e., text</a:t>
+            </a:r>
+            <a:endParaRPr lang="en-US" sz="2400" dirty="0"/>
+          </a:p>
+        </p:txBody>
+      </p:sp>
+      <p:sp>
+        <p:nvSpPr>
+          <p:cNvPr id="42" name="Rectangle 41"/>
+          <p:cNvSpPr/>
+          <p:nvPr/>
+        </p:nvSpPr>
+        <p:spPr>
+          <a:xfrm>
+            <a:off x="3730852" y="3165633"/>
+            <a:ext cx="251811" cy="280844"/>
+          </a:xfrm>
+          <a:prstGeom prst="rect">
+            <a:avLst/>
+          </a:prstGeom>
+          <a:noFill/>
+          <a:ln w="19050">
+            <a:solidFill>
+              <a:srgbClr val="C00000"/>
+            </a:solidFill>
+          </a:ln>
+        </p:spPr>
+        <p:style>
+          <a:lnRef idx="2">
+            <a:schemeClr val="accent1">
+              <a:shade val="50000"/>
+            </a:schemeClr>
+          </a:lnRef>
+          <a:fillRef idx="1">
+            <a:schemeClr val="accent1"/>
+          </a:fillRef>
+          <a:effectRef idx="0">
+            <a:schemeClr val="accent1"/>
+          </a:effectRef>
+          <a:fontRef idx="minor">
+            <a:schemeClr val="lt1"/>
+          </a:fontRef>
+        </p:style>
+        <p:txBody>
+          <a:bodyPr rtlCol="0" anchor="ctr"/>
+          <a:lstStyle/>
+          <a:p>
+            <a:pPr algn="ctr"/>
+            <a:endParaRPr lang="en-US"/>
+          </a:p>
+        </p:txBody>
+      </p:sp>
+      <p:cxnSp>
+        <p:nvCxnSpPr>
+          <p:cNvPr id="43" name="Straight Arrow Connector 42"/>
+          <p:cNvCxnSpPr>
+            <a:stCxn id="31" idx="0"/>
+            <a:endCxn id="42" idx="2"/>
+          </p:cNvCxnSpPr>
+          <p:nvPr/>
+        </p:nvCxnSpPr>
+        <p:spPr>
+          <a:xfrm flipV="1">
+            <a:off x="3279659" y="3446477"/>
+            <a:ext cx="577099" cy="482173"/>
+          </a:xfrm>
+          <a:prstGeom prst="straightConnector1">
+            <a:avLst/>
+          </a:prstGeom>
+          <a:ln w="19050">
+            <a:solidFill>
+              <a:srgbClr val="C00000"/>
+            </a:solidFill>
+            <a:tailEnd type="stealth" w="lg" len="lg"/>
+          </a:ln>
+        </p:spPr>
+        <p:style>
+          <a:lnRef idx="1">
+            <a:schemeClr val="accent1"/>
+          </a:lnRef>
+          <a:fillRef idx="0">
+            <a:schemeClr val="accent1"/>
+          </a:fillRef>
+          <a:effectRef idx="0">
+            <a:schemeClr val="accent1"/>
+          </a:effectRef>
+          <a:fontRef idx="minor">
+            <a:schemeClr val="tx1"/>
+          </a:fontRef>
+        </p:style>
+      </p:cxnSp>
+    </p:spTree>
+    <p:extLst>
+      <p:ext uri="{BB962C8B-B14F-4D97-AF65-F5344CB8AC3E}">
+        <p14:creationId xmlns:p14="http://schemas.microsoft.com/office/powerpoint/2010/main" val="1187712723"/>
+      </p:ext>
+    </p:extLst>
+  </p:cSld>
+  <p:clrMapOvr>
+    <a:masterClrMapping/>
+  </p:clrMapOvr>
+  <p:timing>
+    <p:tnLst>
+      <p:par>
+        <p:cTn id="1" dur="indefinite" restart="never" nodeType="tmRoot">
+          <p:childTnLst>
+            <p:seq concurrent="1" nextAc="seek">
+              <p:cTn id="2" dur="indefinite" nodeType="mainSeq">
+                <p:childTnLst>
+                  <p:par>
+                    <p:cTn id="3" fill="hold">
+                      <p:stCondLst>
+                        <p:cond delay="indefinite"/>
+                      </p:stCondLst>
+                      <p:childTnLst>
+                        <p:par>
+                          <p:cTn id="4" fill="hold">
+                            <p:stCondLst>
+                              <p:cond delay="0"/>
+                            </p:stCondLst>
+                            <p:childTnLst>
+                              <p:par>
+                                <p:cTn id="5" presetID="1" presetClass="entr" presetSubtype="0" fill="hold" nodeType="clickEffect">
+                                  <p:stCondLst>
+                                    <p:cond delay="0"/>
+                                  </p:stCondLst>
+                                  <p:childTnLst>
+                                    <p:set>
+                                      <p:cBhvr>
+                                        <p:cTn id="6" dur="1" fill="hold">
+                                          <p:stCondLst>
+                                            <p:cond delay="0"/>
+                                          </p:stCondLst>
+                                        </p:cTn>
+                                        <p:tgtEl>
+                                          <p:spTgt spid="6"/>
+                                        </p:tgtEl>
+                                        <p:attrNameLst>
+                                          <p:attrName>style.visibility</p:attrName>
+                                        </p:attrNameLst>
+                                      </p:cBhvr>
+                                      <p:to>
+                                        <p:strVal val="visible"/>
+                                      </p:to>
+                                    </p:set>
+                                  </p:childTnLst>
+                                </p:cTn>
+                              </p:par>
+                            </p:childTnLst>
+                          </p:cTn>
+                        </p:par>
+                      </p:childTnLst>
+                    </p:cTn>
+                  </p:par>
+                  <p:par>
+                    <p:cTn id="7" fill="hold">
+                      <p:stCondLst>
+                        <p:cond delay="indefinite"/>
+                      </p:stCondLst>
+                      <p:childTnLst>
+                        <p:par>
+                          <p:cTn id="8" fill="hold">
+                            <p:stCondLst>
+                              <p:cond delay="0"/>
+                            </p:stCondLst>
+                            <p:childTnLst>
+                              <p:par>
+                                <p:cTn id="9" presetID="1" presetClass="entr" presetSubtype="0" fill="hold" nodeType="clickEffect">
+                                  <p:stCondLst>
+                                    <p:cond delay="0"/>
+                                  </p:stCondLst>
+                                  <p:childTnLst>
+                                    <p:set>
+                                      <p:cBhvr>
+                                        <p:cTn id="10" dur="1" fill="hold">
+                                          <p:stCondLst>
+                                            <p:cond delay="0"/>
+                                          </p:stCondLst>
+                                        </p:cTn>
+                                        <p:tgtEl>
+                                          <p:spTgt spid="22"/>
+                                        </p:tgtEl>
+                                        <p:attrNameLst>
+                                          <p:attrName>style.visibility</p:attrName>
+                                        </p:attrNameLst>
+                                      </p:cBhvr>
+                                      <p:to>
+                                        <p:strVal val="visible"/>
+                                      </p:to>
+                                    </p:set>
+                                  </p:childTnLst>
+                                </p:cTn>
+                              </p:par>
+                            </p:childTnLst>
+                          </p:cTn>
+                        </p:par>
+                      </p:childTnLst>
+                    </p:cTn>
+                  </p:par>
+                  <p:par>
+                    <p:cTn id="11" fill="hold">
+                      <p:stCondLst>
+                        <p:cond delay="indefinite"/>
+                      </p:stCondLst>
+                      <p:childTnLst>
+                        <p:par>
+                          <p:cTn id="12" fill="hold">
+                            <p:stCondLst>
+                              <p:cond delay="0"/>
+                            </p:stCondLst>
+                            <p:childTnLst>
+                              <p:par>
+                                <p:cTn id="13" presetID="1" presetClass="entr" presetSubtype="0" fill="hold" nodeType="clickEffect">
+                                  <p:stCondLst>
+                                    <p:cond delay="0"/>
+                                  </p:stCondLst>
+                                  <p:childTnLst>
+                                    <p:set>
+                                      <p:cBhvr>
+                                        <p:cTn id="14" dur="1" fill="hold">
+                                          <p:stCondLst>
+                                            <p:cond delay="0"/>
+                                          </p:stCondLst>
+                                        </p:cTn>
+                                        <p:tgtEl>
+                                          <p:spTgt spid="30"/>
+                                        </p:tgtEl>
+                                        <p:attrNameLst>
+                                          <p:attrName>style.visibility</p:attrName>
+                                        </p:attrNameLst>
+                                      </p:cBhvr>
+                                      <p:to>
+                                        <p:strVal val="visible"/>
+                                      </p:to>
+                                    </p:set>
+                                  </p:childTnLst>
+                                </p:cTn>
+                              </p:par>
+                            </p:childTnLst>
+                          </p:cTn>
+                        </p:par>
+                      </p:childTnLst>
+                    </p:cTn>
+                  </p:par>
+                  <p:par>
+                    <p:cTn id="15" fill="hold">
+                      <p:stCondLst>
+                        <p:cond delay="indefinite"/>
+                      </p:stCondLst>
+                      <p:childTnLst>
+                        <p:par>
+                          <p:cTn id="16" fill="hold">
+                            <p:stCondLst>
+                              <p:cond delay="0"/>
+                            </p:stCondLst>
+                            <p:childTnLst>
+                              <p:par>
+                                <p:cTn id="17" presetID="1" presetClass="entr" presetSubtype="0" fill="hold" grpId="0" nodeType="clickEffect">
+                                  <p:stCondLst>
+                                    <p:cond delay="0"/>
+                                  </p:stCondLst>
+                                  <p:childTnLst>
+                                    <p:set>
+                                      <p:cBhvr>
+                                        <p:cTn id="18" dur="1" fill="hold">
+                                          <p:stCondLst>
+                                            <p:cond delay="0"/>
+                                          </p:stCondLst>
+                                        </p:cTn>
+                                        <p:tgtEl>
+                                          <p:spTgt spid="39"/>
+                                        </p:tgtEl>
+                                        <p:attrNameLst>
+                                          <p:attrName>style.visibility</p:attrName>
+                                        </p:attrNameLst>
+                                      </p:cBhvr>
+                                      <p:to>
+                                        <p:strVal val="visible"/>
+                                      </p:to>
+                                    </p:set>
+                                  </p:childTnLst>
+                                </p:cTn>
+                              </p:par>
+                            </p:childTnLst>
+                          </p:cTn>
+                        </p:par>
+                      </p:childTnLst>
+                    </p:cTn>
+                  </p:par>
+                  <p:par>
+                    <p:cTn id="19" fill="hold">
+                      <p:stCondLst>
+                        <p:cond delay="indefinite"/>
+                      </p:stCondLst>
+                      <p:childTnLst>
+                        <p:par>
+                          <p:cTn id="20" fill="hold">
+                            <p:stCondLst>
+                              <p:cond delay="0"/>
+                            </p:stCondLst>
+                            <p:childTnLst>
+                              <p:par>
+                                <p:cTn id="21" presetID="1" presetClass="entr" presetSubtype="0" fill="hold" nodeType="clickEffect">
+                                  <p:stCondLst>
+                                    <p:cond delay="0"/>
+                                  </p:stCondLst>
+                                  <p:childTnLst>
+                                    <p:set>
+                                      <p:cBhvr>
+                                        <p:cTn id="22" dur="1" fill="hold">
+                                          <p:stCondLst>
+                                            <p:cond delay="0"/>
+                                          </p:stCondLst>
+                                        </p:cTn>
+                                        <p:tgtEl>
+                                          <p:spTgt spid="13"/>
+                                        </p:tgtEl>
+                                        <p:attrNameLst>
+                                          <p:attrName>style.visibility</p:attrName>
+                                        </p:attrNameLst>
+                                      </p:cBhvr>
+                                      <p:to>
+                                        <p:strVal val="visible"/>
+                                      </p:to>
+                                    </p:set>
+                                  </p:childTnLst>
+                                </p:cTn>
+                              </p:par>
+                            </p:childTnLst>
+                          </p:cTn>
+                        </p:par>
+                      </p:childTnLst>
+                    </p:cTn>
+                  </p:par>
+                </p:childTnLst>
+              </p:cTn>
+              <p:prevCondLst>
+                <p:cond evt="onPrev" delay="0">
+                  <p:tgtEl>
+                    <p:sldTgt/>
+                  </p:tgtEl>
+                </p:cond>
+              </p:prevCondLst>
+              <p:nextCondLst>
+                <p:cond evt="onNext" delay="0">
+                  <p:tgtEl>
+                    <p:sldTgt/>
+                  </p:tgtEl>
+                </p:cond>
+              </p:nextCondLst>
+            </p:seq>
+          </p:childTnLst>
+        </p:cTn>
+      </p:par>
+    </p:tnLst>
+    <p:bldLst>
+      <p:bldP spid="39" grpId="0"/>
+    </p:bldLst>
+  </p:timing>
+</p:sld>
+</file>
+
+<file path=ppt/slides/slide11.xml><?xml version="1.0" encoding="utf-8"?>
+<p:sld xmlns:a="http://schemas.openxmlformats.org/drawingml/2006/main" xmlns:r="http://schemas.openxmlformats.org/officeDocument/2006/relationships" xmlns:p="http://schemas.openxmlformats.org/presentationml/2006/main">
+  <p:cSld>
+    <p:spTree>
+      <p:nvGrpSpPr>
+        <p:cNvPr id="1" name=""/>
+        <p:cNvGrpSpPr/>
+        <p:nvPr/>
+      </p:nvGrpSpPr>
+      <p:grpSpPr>
+        <a:xfrm>
+          <a:off x="0" y="0"/>
+          <a:ext cx="0" cy="0"/>
+          <a:chOff x="0" y="0"/>
+          <a:chExt cx="0" cy="0"/>
+        </a:xfrm>
+      </p:grpSpPr>
+      <p:sp>
+        <p:nvSpPr>
+          <p:cNvPr id="2" name="Title 1"/>
+          <p:cNvSpPr>
+            <a:spLocks noGrp="1"/>
+          </p:cNvSpPr>
+          <p:nvPr>
+            <p:ph type="title"/>
+          </p:nvPr>
+        </p:nvSpPr>
+        <p:spPr/>
+        <p:txBody>
+          <a:bodyPr/>
+          <a:lstStyle/>
+          <a:p>
+            <a:r>
+              <a:rPr lang="en-US" dirty="0" smtClean="0"/>
+              <a:t>Getting things in</a:t>
+            </a:r>
+            <a:endParaRPr lang="en-US" dirty="0"/>
+          </a:p>
+        </p:txBody>
+      </p:sp>
+      <p:sp>
+        <p:nvSpPr>
+          <p:cNvPr id="3" name="Content Placeholder 2"/>
+          <p:cNvSpPr>
+            <a:spLocks noGrp="1"/>
+          </p:cNvSpPr>
+          <p:nvPr>
+            <p:ph idx="1"/>
+          </p:nvPr>
+        </p:nvSpPr>
+        <p:spPr/>
+        <p:txBody>
+          <a:bodyPr/>
+          <a:lstStyle/>
+          <a:p>
+            <a:r>
+              <a:rPr lang="en-US" dirty="0" smtClean="0"/>
+              <a:t>Command line arguments</a:t>
+            </a:r>
+            <a:endParaRPr lang="en-US" dirty="0"/>
+          </a:p>
+        </p:txBody>
+      </p:sp>
+      <p:sp>
+        <p:nvSpPr>
+          <p:cNvPr id="4" name="Slide Number Placeholder 3"/>
+          <p:cNvSpPr>
+            <a:spLocks noGrp="1"/>
+          </p:cNvSpPr>
+          <p:nvPr>
+            <p:ph type="sldNum" sz="quarter" idx="12"/>
+          </p:nvPr>
+        </p:nvSpPr>
+        <p:spPr/>
+        <p:txBody>
+          <a:bodyPr/>
+          <a:lstStyle/>
+          <a:p>
+            <a:fld id="{033373DF-BCDA-4600-B448-AFBDB22F4A39}" type="slidenum">
+              <a:rPr lang="en-US" smtClean="0"/>
+              <a:t>11</a:t>
+            </a:fld>
+            <a:endParaRPr lang="en-US"/>
+          </a:p>
+        </p:txBody>
+      </p:sp>
+      <p:sp>
+        <p:nvSpPr>
+          <p:cNvPr id="5" name="TextBox 4"/>
+          <p:cNvSpPr txBox="1"/>
+          <p:nvPr/>
+        </p:nvSpPr>
+        <p:spPr>
+          <a:xfrm>
+            <a:off x="1175441" y="2308628"/>
+            <a:ext cx="5368777" cy="1077218"/>
+          </a:xfrm>
+          <a:prstGeom prst="rect">
+            <a:avLst/>
+          </a:prstGeom>
+          <a:solidFill>
+            <a:schemeClr val="tx1"/>
+          </a:solidFill>
+          <a:ln>
+            <a:solidFill>
+              <a:schemeClr val="tx1"/>
+            </a:solidFill>
+          </a:ln>
+        </p:spPr>
+        <p:txBody>
+          <a:bodyPr wrap="square" rtlCol="0">
+            <a:spAutoFit/>
+          </a:bodyPr>
+          <a:lstStyle/>
+          <a:p>
+            <a:r>
+              <a:rPr lang="en-US" sz="1600" b="1" dirty="0">
+                <a:solidFill>
+                  <a:schemeClr val="bg1"/>
+                </a:solidFill>
+                <a:latin typeface="Courier New" pitchFamily="49" charset="0"/>
+                <a:cs typeface="Courier New" pitchFamily="49" charset="0"/>
+              </a:rPr>
+              <a:t>$  </a:t>
+            </a:r>
+            <a:r>
+              <a:rPr lang="en-US" sz="1600" b="1" dirty="0" smtClean="0">
+                <a:solidFill>
+                  <a:schemeClr val="bg1"/>
+                </a:solidFill>
+                <a:latin typeface="Courier New" pitchFamily="49" charset="0"/>
+                <a:cs typeface="Courier New" pitchFamily="49" charset="0"/>
+              </a:rPr>
+              <a:t>./hello.exe  </a:t>
+            </a:r>
+            <a:r>
+              <a:rPr lang="en-US" sz="1600" b="1" dirty="0" smtClean="0">
+                <a:solidFill>
+                  <a:srgbClr val="FF0000"/>
+                </a:solidFill>
+                <a:latin typeface="Courier New" pitchFamily="49" charset="0"/>
+                <a:cs typeface="Courier New" pitchFamily="49" charset="0"/>
+              </a:rPr>
+              <a:t>world</a:t>
+            </a:r>
+          </a:p>
+          <a:p>
+            <a:r>
+              <a:rPr lang="en-US" sz="1600" b="1" dirty="0" smtClean="0">
+                <a:solidFill>
+                  <a:schemeClr val="bg1"/>
+                </a:solidFill>
+                <a:latin typeface="Courier New" pitchFamily="49" charset="0"/>
+                <a:cs typeface="Courier New" pitchFamily="49" charset="0"/>
+              </a:rPr>
+              <a:t>hello </a:t>
+            </a:r>
+            <a:r>
+              <a:rPr lang="en-US" sz="1600" b="1" dirty="0" smtClean="0">
+                <a:solidFill>
+                  <a:srgbClr val="FF0000"/>
+                </a:solidFill>
+                <a:latin typeface="Courier New" pitchFamily="49" charset="0"/>
+                <a:cs typeface="Courier New" pitchFamily="49" charset="0"/>
+              </a:rPr>
+              <a:t>world</a:t>
+            </a:r>
+            <a:r>
+              <a:rPr lang="en-US" sz="1600" b="1" dirty="0" smtClean="0">
+                <a:solidFill>
+                  <a:schemeClr val="bg1"/>
+                </a:solidFill>
+                <a:latin typeface="Courier New" pitchFamily="49" charset="0"/>
+                <a:cs typeface="Courier New" pitchFamily="49" charset="0"/>
+              </a:rPr>
+              <a:t>!</a:t>
+            </a:r>
+          </a:p>
+          <a:p>
+            <a:r>
+              <a:rPr lang="en-US" sz="1600" b="1" dirty="0" smtClean="0">
+                <a:solidFill>
+                  <a:schemeClr val="bg1"/>
+                </a:solidFill>
+                <a:latin typeface="Courier New" pitchFamily="49" charset="0"/>
+                <a:cs typeface="Courier New" pitchFamily="49" charset="0"/>
+              </a:rPr>
+              <a:t>$  ./hello.exe  </a:t>
+            </a:r>
+            <a:r>
+              <a:rPr lang="en-US" sz="1600" b="1" dirty="0" smtClean="0">
+                <a:solidFill>
+                  <a:srgbClr val="FF0000"/>
+                </a:solidFill>
+                <a:latin typeface="Courier New" pitchFamily="49" charset="0"/>
+                <a:cs typeface="Courier New" pitchFamily="49" charset="0"/>
+              </a:rPr>
+              <a:t>C++</a:t>
+            </a:r>
+          </a:p>
+          <a:p>
+            <a:r>
+              <a:rPr lang="en-US" sz="1600" b="1" dirty="0" smtClean="0">
+                <a:solidFill>
+                  <a:schemeClr val="bg1"/>
+                </a:solidFill>
+                <a:latin typeface="Courier New" pitchFamily="49" charset="0"/>
+                <a:cs typeface="Courier New" pitchFamily="49" charset="0"/>
+              </a:rPr>
+              <a:t>hello </a:t>
+            </a:r>
+            <a:r>
+              <a:rPr lang="en-US" sz="1600" b="1" dirty="0" smtClean="0">
+                <a:solidFill>
+                  <a:srgbClr val="FF0000"/>
+                </a:solidFill>
+                <a:latin typeface="Courier New" pitchFamily="49" charset="0"/>
+                <a:cs typeface="Courier New" pitchFamily="49" charset="0"/>
+              </a:rPr>
+              <a:t>C++</a:t>
+            </a:r>
+            <a:r>
+              <a:rPr lang="en-US" sz="1600" b="1" dirty="0" smtClean="0">
+                <a:solidFill>
+                  <a:schemeClr val="bg1"/>
+                </a:solidFill>
+                <a:latin typeface="Courier New" pitchFamily="49" charset="0"/>
+                <a:cs typeface="Courier New" pitchFamily="49" charset="0"/>
+              </a:rPr>
+              <a:t>!</a:t>
+            </a:r>
+            <a:r>
+              <a:rPr lang="en-US" sz="1600" b="1" dirty="0" smtClean="0">
+                <a:solidFill>
+                  <a:schemeClr val="bg1"/>
+                </a:solidFill>
+                <a:latin typeface="Courier New" pitchFamily="49" charset="0"/>
+                <a:cs typeface="Courier New" pitchFamily="49" charset="0"/>
+              </a:rPr>
+              <a:t> </a:t>
+            </a:r>
+            <a:endParaRPr lang="nl-BE" sz="1600" b="1" dirty="0">
+              <a:solidFill>
+                <a:schemeClr val="bg1"/>
+              </a:solidFill>
+              <a:latin typeface="Courier New" pitchFamily="49" charset="0"/>
+              <a:cs typeface="Courier New" pitchFamily="49" charset="0"/>
+            </a:endParaRPr>
+          </a:p>
+        </p:txBody>
+      </p:sp>
+      <p:grpSp>
+        <p:nvGrpSpPr>
+          <p:cNvPr id="6" name="Group 5"/>
+          <p:cNvGrpSpPr/>
+          <p:nvPr/>
+        </p:nvGrpSpPr>
+        <p:grpSpPr>
+          <a:xfrm>
+            <a:off x="3156154" y="2322613"/>
+            <a:ext cx="3677265" cy="1678681"/>
+            <a:chOff x="2044622" y="2944201"/>
+            <a:chExt cx="3677265" cy="1678681"/>
+          </a:xfrm>
+        </p:grpSpPr>
+        <p:sp>
+          <p:nvSpPr>
+            <p:cNvPr id="7" name="TextBox 6"/>
+            <p:cNvSpPr txBox="1"/>
+            <p:nvPr/>
+          </p:nvSpPr>
+          <p:spPr>
+            <a:xfrm>
+              <a:off x="2578636" y="4222772"/>
+              <a:ext cx="3143251" cy="400110"/>
+            </a:xfrm>
+            <a:prstGeom prst="rect">
+              <a:avLst/>
+            </a:prstGeom>
+            <a:solidFill>
+              <a:schemeClr val="bg1"/>
+            </a:solidFill>
+            <a:ln w="19050">
+              <a:solidFill>
+                <a:srgbClr val="C00000"/>
+              </a:solidFill>
+            </a:ln>
+          </p:spPr>
+          <p:txBody>
+            <a:bodyPr wrap="square" rtlCol="0">
+              <a:spAutoFit/>
+            </a:bodyPr>
+            <a:lstStyle/>
+            <a:p>
+              <a:r>
+                <a:rPr lang="en-US" sz="2000" dirty="0" smtClean="0">
+                  <a:solidFill>
+                    <a:srgbClr val="C00000"/>
+                  </a:solidFill>
+                </a:rPr>
+                <a:t>argument passed at runtime</a:t>
+              </a:r>
+              <a:endParaRPr lang="en-US" sz="2000" dirty="0">
+                <a:solidFill>
+                  <a:srgbClr val="C00000"/>
+                </a:solidFill>
+                <a:latin typeface="Courier New" panose="02070309020205020404" pitchFamily="49" charset="0"/>
+                <a:cs typeface="Courier New" panose="02070309020205020404" pitchFamily="49" charset="0"/>
+              </a:endParaRPr>
+            </a:p>
+          </p:txBody>
+        </p:sp>
+        <p:sp>
+          <p:nvSpPr>
+            <p:cNvPr id="8" name="Rectangle 7"/>
+            <p:cNvSpPr/>
+            <p:nvPr/>
+          </p:nvSpPr>
+          <p:spPr>
+            <a:xfrm>
+              <a:off x="2044622" y="2944201"/>
+              <a:ext cx="751500" cy="280844"/>
+            </a:xfrm>
+            <a:prstGeom prst="rect">
+              <a:avLst/>
+            </a:prstGeom>
+            <a:noFill/>
+            <a:ln w="19050">
+              <a:solidFill>
+                <a:srgbClr val="C00000"/>
+              </a:solidFill>
+            </a:ln>
+          </p:spPr>
+          <p:style>
+            <a:lnRef idx="2">
+              <a:schemeClr val="accent1">
+                <a:shade val="50000"/>
+              </a:schemeClr>
+            </a:lnRef>
+            <a:fillRef idx="1">
+              <a:schemeClr val="accent1"/>
+            </a:fillRef>
+            <a:effectRef idx="0">
+              <a:schemeClr val="accent1"/>
+            </a:effectRef>
+            <a:fontRef idx="minor">
+              <a:schemeClr val="lt1"/>
+            </a:fontRef>
+          </p:style>
+          <p:txBody>
+            <a:bodyPr rtlCol="0" anchor="ctr"/>
+            <a:lstStyle/>
+            <a:p>
+              <a:pPr algn="ctr"/>
+              <a:endParaRPr lang="en-US"/>
+            </a:p>
+          </p:txBody>
+        </p:sp>
+        <p:cxnSp>
+          <p:nvCxnSpPr>
+            <p:cNvPr id="9" name="Straight Arrow Connector 8"/>
+            <p:cNvCxnSpPr>
+              <a:stCxn id="7" idx="0"/>
+              <a:endCxn id="8" idx="2"/>
+            </p:cNvCxnSpPr>
+            <p:nvPr/>
+          </p:nvCxnSpPr>
+          <p:spPr>
+            <a:xfrm flipH="1" flipV="1">
+              <a:off x="2420372" y="3225045"/>
+              <a:ext cx="1729890" cy="997727"/>
+            </a:xfrm>
+            <a:prstGeom prst="straightConnector1">
+              <a:avLst/>
+            </a:prstGeom>
+            <a:ln w="19050">
+              <a:solidFill>
+                <a:srgbClr val="C00000"/>
+              </a:solidFill>
+              <a:tailEnd type="stealth" w="lg" len="lg"/>
+            </a:ln>
+          </p:spPr>
+          <p:style>
+            <a:lnRef idx="1">
+              <a:schemeClr val="accent1"/>
+            </a:lnRef>
+            <a:fillRef idx="0">
+              <a:schemeClr val="accent1"/>
+            </a:fillRef>
+            <a:effectRef idx="0">
+              <a:schemeClr val="accent1"/>
+            </a:effectRef>
+            <a:fontRef idx="minor">
+              <a:schemeClr val="tx1"/>
+            </a:fontRef>
+          </p:style>
+        </p:cxnSp>
+      </p:grpSp>
+      <p:sp>
+        <p:nvSpPr>
+          <p:cNvPr id="13" name="Rectangle 12"/>
+          <p:cNvSpPr/>
+          <p:nvPr/>
+        </p:nvSpPr>
+        <p:spPr>
+          <a:xfrm>
+            <a:off x="3177942" y="2818795"/>
+            <a:ext cx="512226" cy="280844"/>
+          </a:xfrm>
+          <a:prstGeom prst="rect">
+            <a:avLst/>
+          </a:prstGeom>
+          <a:noFill/>
+          <a:ln w="19050">
+            <a:solidFill>
+              <a:srgbClr val="C00000"/>
+            </a:solidFill>
+          </a:ln>
+        </p:spPr>
+        <p:style>
+          <a:lnRef idx="2">
+            <a:schemeClr val="accent1">
+              <a:shade val="50000"/>
+            </a:schemeClr>
+          </a:lnRef>
+          <a:fillRef idx="1">
+            <a:schemeClr val="accent1"/>
+          </a:fillRef>
+          <a:effectRef idx="0">
+            <a:schemeClr val="accent1"/>
+          </a:effectRef>
+          <a:fontRef idx="minor">
+            <a:schemeClr val="lt1"/>
+          </a:fontRef>
+        </p:style>
+        <p:txBody>
+          <a:bodyPr rtlCol="0" anchor="ctr"/>
+          <a:lstStyle/>
+          <a:p>
+            <a:pPr algn="ctr"/>
+            <a:endParaRPr lang="en-US"/>
+          </a:p>
+        </p:txBody>
+      </p:sp>
+      <p:cxnSp>
+        <p:nvCxnSpPr>
+          <p:cNvPr id="14" name="Straight Arrow Connector 13"/>
+          <p:cNvCxnSpPr>
+            <a:stCxn id="7" idx="0"/>
+            <a:endCxn id="13" idx="2"/>
+          </p:cNvCxnSpPr>
+          <p:nvPr/>
+        </p:nvCxnSpPr>
+        <p:spPr>
+          <a:xfrm flipH="1" flipV="1">
+            <a:off x="3434055" y="3099639"/>
+            <a:ext cx="1827739" cy="501545"/>
+          </a:xfrm>
+          <a:prstGeom prst="straightConnector1">
+            <a:avLst/>
+          </a:prstGeom>
+          <a:ln w="19050">
+            <a:solidFill>
+              <a:srgbClr val="C00000"/>
+            </a:solidFill>
+            <a:tailEnd type="stealth" w="lg" len="lg"/>
+          </a:ln>
+        </p:spPr>
+        <p:style>
+          <a:lnRef idx="1">
+            <a:schemeClr val="accent1"/>
+          </a:lnRef>
+          <a:fillRef idx="0">
+            <a:schemeClr val="accent1"/>
+          </a:fillRef>
+          <a:effectRef idx="0">
+            <a:schemeClr val="accent1"/>
+          </a:effectRef>
+          <a:fontRef idx="minor">
+            <a:schemeClr val="tx1"/>
+          </a:fontRef>
+        </p:style>
+      </p:cxnSp>
+      <p:sp>
+        <p:nvSpPr>
+          <p:cNvPr id="20" name="TextBox 19"/>
+          <p:cNvSpPr txBox="1"/>
+          <p:nvPr/>
+        </p:nvSpPr>
+        <p:spPr>
+          <a:xfrm>
+            <a:off x="1061267" y="4027966"/>
+            <a:ext cx="6244101" cy="1569660"/>
+          </a:xfrm>
+          <a:prstGeom prst="rect">
+            <a:avLst/>
+          </a:prstGeom>
+          <a:solidFill>
+            <a:schemeClr val="bg1">
+              <a:lumMod val="75000"/>
+            </a:schemeClr>
+          </a:solidFill>
+        </p:spPr>
+        <p:txBody>
+          <a:bodyPr wrap="square" rtlCol="0">
+            <a:spAutoFit/>
+          </a:bodyPr>
+          <a:lstStyle/>
+          <a:p>
+            <a:r>
+              <a:rPr lang="en-US" sz="1600" dirty="0" smtClean="0">
+                <a:latin typeface="Courier New" pitchFamily="49" charset="0"/>
+                <a:cs typeface="Courier New" pitchFamily="49" charset="0"/>
+              </a:rPr>
+              <a:t>…</a:t>
+            </a:r>
+          </a:p>
+          <a:p>
+            <a:r>
+              <a:rPr lang="en-US" sz="1600" dirty="0" err="1" smtClean="0">
+                <a:latin typeface="Courier New" pitchFamily="49" charset="0"/>
+                <a:cs typeface="Courier New" pitchFamily="49" charset="0"/>
+              </a:rPr>
+              <a:t>int</a:t>
+            </a:r>
+            <a:r>
+              <a:rPr lang="en-US" sz="1600" dirty="0" smtClean="0">
+                <a:latin typeface="Courier New" pitchFamily="49" charset="0"/>
+                <a:cs typeface="Courier New" pitchFamily="49" charset="0"/>
+              </a:rPr>
+              <a:t> </a:t>
+            </a:r>
+            <a:r>
+              <a:rPr lang="en-US" sz="1600" dirty="0" smtClean="0">
+                <a:latin typeface="Courier New" pitchFamily="49" charset="0"/>
+                <a:cs typeface="Courier New" pitchFamily="49" charset="0"/>
+              </a:rPr>
+              <a:t>main(</a:t>
+            </a:r>
+            <a:r>
+              <a:rPr lang="en-US" sz="1600" dirty="0" err="1" smtClean="0">
+                <a:latin typeface="Courier New" pitchFamily="49" charset="0"/>
+                <a:cs typeface="Courier New" pitchFamily="49" charset="0"/>
+              </a:rPr>
+              <a:t>int</a:t>
+            </a:r>
+            <a:r>
+              <a:rPr lang="en-US" sz="1600" dirty="0" smtClean="0">
+                <a:latin typeface="Courier New" pitchFamily="49" charset="0"/>
+                <a:cs typeface="Courier New" pitchFamily="49" charset="0"/>
+              </a:rPr>
+              <a:t> </a:t>
+            </a:r>
+            <a:r>
+              <a:rPr lang="en-US" sz="1600" dirty="0" err="1" smtClean="0">
+                <a:latin typeface="Courier New" pitchFamily="49" charset="0"/>
+                <a:cs typeface="Courier New" pitchFamily="49" charset="0"/>
+              </a:rPr>
+              <a:t>argc</a:t>
+            </a:r>
+            <a:r>
+              <a:rPr lang="en-US" sz="1600" dirty="0" smtClean="0">
+                <a:latin typeface="Courier New" pitchFamily="49" charset="0"/>
+                <a:cs typeface="Courier New" pitchFamily="49" charset="0"/>
+              </a:rPr>
+              <a:t>, char *</a:t>
+            </a:r>
+            <a:r>
+              <a:rPr lang="en-US" sz="1600" dirty="0" err="1" smtClean="0">
+                <a:latin typeface="Courier New" pitchFamily="49" charset="0"/>
+                <a:cs typeface="Courier New" pitchFamily="49" charset="0"/>
+              </a:rPr>
+              <a:t>argv</a:t>
+            </a:r>
+            <a:r>
+              <a:rPr lang="en-US" sz="1600" dirty="0" smtClean="0">
+                <a:latin typeface="Courier New" pitchFamily="49" charset="0"/>
+                <a:cs typeface="Courier New" pitchFamily="49" charset="0"/>
+              </a:rPr>
+              <a:t>[]) </a:t>
+            </a:r>
+            <a:r>
+              <a:rPr lang="en-US" sz="1600" dirty="0" smtClean="0">
+                <a:latin typeface="Courier New" pitchFamily="49" charset="0"/>
+                <a:cs typeface="Courier New" pitchFamily="49" charset="0"/>
+              </a:rPr>
+              <a:t>{</a:t>
+            </a:r>
+          </a:p>
+          <a:p>
+            <a:r>
+              <a:rPr lang="en-US" sz="1600" dirty="0" smtClean="0">
+                <a:latin typeface="Courier New" pitchFamily="49" charset="0"/>
+                <a:cs typeface="Courier New" pitchFamily="49" charset="0"/>
+              </a:rPr>
+              <a:t>…</a:t>
+            </a:r>
+            <a:endParaRPr lang="en-US" sz="1600" dirty="0" smtClean="0">
+              <a:latin typeface="Courier New" pitchFamily="49" charset="0"/>
+              <a:cs typeface="Courier New" pitchFamily="49" charset="0"/>
+            </a:endParaRPr>
+          </a:p>
+          <a:p>
+            <a:r>
+              <a:rPr lang="en-US" sz="1600" dirty="0" smtClean="0">
+                <a:latin typeface="Courier New" pitchFamily="49" charset="0"/>
+                <a:cs typeface="Courier New" pitchFamily="49" charset="0"/>
+              </a:rPr>
+              <a:t>    </a:t>
+            </a:r>
+            <a:r>
+              <a:rPr lang="en-US" sz="1600" dirty="0" err="1" smtClean="0">
+                <a:solidFill>
+                  <a:srgbClr val="C00000"/>
+                </a:solidFill>
+                <a:latin typeface="Courier New" pitchFamily="49" charset="0"/>
+                <a:cs typeface="Courier New" pitchFamily="49" charset="0"/>
+              </a:rPr>
+              <a:t>cout</a:t>
+            </a:r>
+            <a:r>
+              <a:rPr lang="en-US" sz="1600" dirty="0" smtClean="0">
+                <a:latin typeface="Courier New" pitchFamily="49" charset="0"/>
+                <a:cs typeface="Courier New" pitchFamily="49" charset="0"/>
+              </a:rPr>
+              <a:t> </a:t>
+            </a:r>
+            <a:r>
+              <a:rPr lang="en-US" sz="1600" dirty="0" smtClean="0">
+                <a:latin typeface="Courier New" pitchFamily="49" charset="0"/>
+                <a:cs typeface="Courier New" pitchFamily="49" charset="0"/>
+              </a:rPr>
+              <a:t>&lt;&lt; "hello " &lt;&lt; </a:t>
+            </a:r>
+            <a:r>
+              <a:rPr lang="en-US" sz="1600" dirty="0" err="1" smtClean="0">
+                <a:latin typeface="Courier New" pitchFamily="49" charset="0"/>
+                <a:cs typeface="Courier New" pitchFamily="49" charset="0"/>
+              </a:rPr>
+              <a:t>argv</a:t>
+            </a:r>
+            <a:r>
+              <a:rPr lang="en-US" sz="1600" dirty="0" smtClean="0">
+                <a:latin typeface="Courier New" pitchFamily="49" charset="0"/>
+                <a:cs typeface="Courier New" pitchFamily="49" charset="0"/>
+              </a:rPr>
+              <a:t>[1] &lt;&lt; "!" &lt;&lt; </a:t>
+            </a:r>
+            <a:r>
+              <a:rPr lang="en-US" sz="1600" dirty="0" err="1" smtClean="0">
+                <a:latin typeface="Courier New" pitchFamily="49" charset="0"/>
+                <a:cs typeface="Courier New" pitchFamily="49" charset="0"/>
+              </a:rPr>
+              <a:t>endl</a:t>
+            </a:r>
+            <a:r>
+              <a:rPr lang="en-US" sz="1600" dirty="0" smtClean="0">
+                <a:latin typeface="Courier New" pitchFamily="49" charset="0"/>
+                <a:cs typeface="Courier New" pitchFamily="49" charset="0"/>
+              </a:rPr>
+              <a:t>;</a:t>
+            </a:r>
+          </a:p>
+          <a:p>
+            <a:r>
+              <a:rPr lang="en-US" sz="1600" dirty="0" smtClean="0">
+                <a:latin typeface="Courier New" pitchFamily="49" charset="0"/>
+                <a:cs typeface="Courier New" pitchFamily="49" charset="0"/>
+              </a:rPr>
+              <a:t>…</a:t>
+            </a:r>
+            <a:endParaRPr lang="en-US" sz="1600" dirty="0" smtClean="0">
+              <a:latin typeface="Courier New" pitchFamily="49" charset="0"/>
+              <a:cs typeface="Courier New" pitchFamily="49" charset="0"/>
+            </a:endParaRPr>
+          </a:p>
+          <a:p>
+            <a:r>
+              <a:rPr lang="en-US" sz="1600" dirty="0" smtClean="0">
+                <a:latin typeface="Courier New" pitchFamily="49" charset="0"/>
+                <a:cs typeface="Courier New" pitchFamily="49" charset="0"/>
+              </a:rPr>
+              <a:t>}</a:t>
+            </a:r>
+            <a:endParaRPr lang="en-US" sz="1600" dirty="0">
+              <a:latin typeface="Courier New" pitchFamily="49" charset="0"/>
+              <a:cs typeface="Courier New" pitchFamily="49" charset="0"/>
+            </a:endParaRPr>
+          </a:p>
+        </p:txBody>
+      </p:sp>
+      <p:grpSp>
+        <p:nvGrpSpPr>
+          <p:cNvPr id="21" name="Group 20"/>
+          <p:cNvGrpSpPr/>
+          <p:nvPr/>
+        </p:nvGrpSpPr>
+        <p:grpSpPr>
+          <a:xfrm>
+            <a:off x="1641746" y="4308105"/>
+            <a:ext cx="1624687" cy="1686991"/>
+            <a:chOff x="1010358" y="2944201"/>
+            <a:chExt cx="1624687" cy="1686991"/>
+          </a:xfrm>
+        </p:grpSpPr>
+        <p:sp>
+          <p:nvSpPr>
+            <p:cNvPr id="22" name="TextBox 21"/>
+            <p:cNvSpPr txBox="1"/>
+            <p:nvPr/>
+          </p:nvSpPr>
+          <p:spPr>
+            <a:xfrm>
+              <a:off x="1010358" y="3923306"/>
+              <a:ext cx="1405464" cy="707886"/>
+            </a:xfrm>
+            <a:prstGeom prst="rect">
+              <a:avLst/>
+            </a:prstGeom>
+            <a:solidFill>
+              <a:schemeClr val="bg1"/>
+            </a:solidFill>
+            <a:ln w="19050">
+              <a:solidFill>
+                <a:srgbClr val="C00000"/>
+              </a:solidFill>
+            </a:ln>
+          </p:spPr>
+          <p:txBody>
+            <a:bodyPr wrap="square" rtlCol="0">
+              <a:spAutoFit/>
+            </a:bodyPr>
+            <a:lstStyle/>
+            <a:p>
+              <a:r>
+                <a:rPr lang="en-US" sz="2000" dirty="0" smtClean="0">
+                  <a:solidFill>
+                    <a:srgbClr val="C00000"/>
+                  </a:solidFill>
+                </a:rPr>
+                <a:t>number of arguments</a:t>
+              </a:r>
+              <a:endParaRPr lang="en-US" sz="2000" dirty="0">
+                <a:solidFill>
+                  <a:srgbClr val="C00000"/>
+                </a:solidFill>
+                <a:latin typeface="Courier New" panose="02070309020205020404" pitchFamily="49" charset="0"/>
+                <a:cs typeface="Courier New" panose="02070309020205020404" pitchFamily="49" charset="0"/>
+              </a:endParaRPr>
+            </a:p>
+          </p:txBody>
+        </p:sp>
+        <p:sp>
+          <p:nvSpPr>
+            <p:cNvPr id="23" name="Rectangle 22"/>
+            <p:cNvSpPr/>
+            <p:nvPr/>
+          </p:nvSpPr>
+          <p:spPr>
+            <a:xfrm>
+              <a:off x="2044622" y="2944201"/>
+              <a:ext cx="590423" cy="280844"/>
+            </a:xfrm>
+            <a:prstGeom prst="rect">
+              <a:avLst/>
+            </a:prstGeom>
+            <a:noFill/>
+            <a:ln w="19050">
+              <a:solidFill>
+                <a:srgbClr val="C00000"/>
+              </a:solidFill>
+            </a:ln>
+          </p:spPr>
+          <p:style>
+            <a:lnRef idx="2">
+              <a:schemeClr val="accent1">
+                <a:shade val="50000"/>
+              </a:schemeClr>
+            </a:lnRef>
+            <a:fillRef idx="1">
+              <a:schemeClr val="accent1"/>
+            </a:fillRef>
+            <a:effectRef idx="0">
+              <a:schemeClr val="accent1"/>
+            </a:effectRef>
+            <a:fontRef idx="minor">
+              <a:schemeClr val="lt1"/>
+            </a:fontRef>
+          </p:style>
+          <p:txBody>
+            <a:bodyPr rtlCol="0" anchor="ctr"/>
+            <a:lstStyle/>
+            <a:p>
+              <a:pPr algn="ctr"/>
+              <a:endParaRPr lang="en-US"/>
+            </a:p>
+          </p:txBody>
+        </p:sp>
+        <p:cxnSp>
+          <p:nvCxnSpPr>
+            <p:cNvPr id="24" name="Straight Arrow Connector 23"/>
+            <p:cNvCxnSpPr>
+              <a:stCxn id="22" idx="0"/>
+              <a:endCxn id="23" idx="2"/>
+            </p:cNvCxnSpPr>
+            <p:nvPr/>
+          </p:nvCxnSpPr>
+          <p:spPr>
+            <a:xfrm flipV="1">
+              <a:off x="1713090" y="3225045"/>
+              <a:ext cx="626744" cy="698261"/>
+            </a:xfrm>
+            <a:prstGeom prst="straightConnector1">
+              <a:avLst/>
+            </a:prstGeom>
+            <a:ln w="19050">
+              <a:solidFill>
+                <a:srgbClr val="C00000"/>
+              </a:solidFill>
+              <a:tailEnd type="stealth" w="lg" len="lg"/>
+            </a:ln>
+          </p:spPr>
+          <p:style>
+            <a:lnRef idx="1">
+              <a:schemeClr val="accent1"/>
+            </a:lnRef>
+            <a:fillRef idx="0">
+              <a:schemeClr val="accent1"/>
+            </a:fillRef>
+            <a:effectRef idx="0">
+              <a:schemeClr val="accent1"/>
+            </a:effectRef>
+            <a:fontRef idx="minor">
+              <a:schemeClr val="tx1"/>
+            </a:fontRef>
+          </p:style>
+        </p:cxnSp>
+      </p:grpSp>
+      <p:grpSp>
+        <p:nvGrpSpPr>
+          <p:cNvPr id="27" name="Group 26"/>
+          <p:cNvGrpSpPr/>
+          <p:nvPr/>
+        </p:nvGrpSpPr>
+        <p:grpSpPr>
+          <a:xfrm>
+            <a:off x="4191341" y="4308105"/>
+            <a:ext cx="1838155" cy="1692599"/>
+            <a:chOff x="513342" y="2984727"/>
+            <a:chExt cx="1838155" cy="1692599"/>
+          </a:xfrm>
+        </p:grpSpPr>
+        <p:sp>
+          <p:nvSpPr>
+            <p:cNvPr id="28" name="TextBox 27"/>
+            <p:cNvSpPr txBox="1"/>
+            <p:nvPr/>
+          </p:nvSpPr>
+          <p:spPr>
+            <a:xfrm>
+              <a:off x="946033" y="3969440"/>
+              <a:ext cx="1405464" cy="707886"/>
+            </a:xfrm>
+            <a:prstGeom prst="rect">
+              <a:avLst/>
+            </a:prstGeom>
+            <a:solidFill>
+              <a:schemeClr val="bg1"/>
+            </a:solidFill>
+            <a:ln w="19050">
+              <a:solidFill>
+                <a:srgbClr val="C00000"/>
+              </a:solidFill>
+            </a:ln>
+          </p:spPr>
+          <p:txBody>
+            <a:bodyPr wrap="square" rtlCol="0">
+              <a:spAutoFit/>
+            </a:bodyPr>
+            <a:lstStyle/>
+            <a:p>
+              <a:r>
+                <a:rPr lang="en-US" sz="2000" dirty="0" smtClean="0">
+                  <a:solidFill>
+                    <a:srgbClr val="C00000"/>
+                  </a:solidFill>
+                </a:rPr>
+                <a:t>values of arguments</a:t>
+              </a:r>
+              <a:endParaRPr lang="en-US" sz="2000" dirty="0">
+                <a:solidFill>
+                  <a:srgbClr val="C00000"/>
+                </a:solidFill>
+                <a:latin typeface="Courier New" panose="02070309020205020404" pitchFamily="49" charset="0"/>
+                <a:cs typeface="Courier New" panose="02070309020205020404" pitchFamily="49" charset="0"/>
+              </a:endParaRPr>
+            </a:p>
+          </p:txBody>
+        </p:sp>
+        <p:sp>
+          <p:nvSpPr>
+            <p:cNvPr id="29" name="Rectangle 28"/>
+            <p:cNvSpPr/>
+            <p:nvPr/>
+          </p:nvSpPr>
+          <p:spPr>
+            <a:xfrm>
+              <a:off x="513342" y="2984727"/>
+              <a:ext cx="590423" cy="280844"/>
+            </a:xfrm>
+            <a:prstGeom prst="rect">
+              <a:avLst/>
+            </a:prstGeom>
+            <a:noFill/>
+            <a:ln w="19050">
+              <a:solidFill>
+                <a:srgbClr val="C00000"/>
+              </a:solidFill>
+            </a:ln>
+          </p:spPr>
+          <p:style>
+            <a:lnRef idx="2">
+              <a:schemeClr val="accent1">
+                <a:shade val="50000"/>
+              </a:schemeClr>
+            </a:lnRef>
+            <a:fillRef idx="1">
+              <a:schemeClr val="accent1"/>
+            </a:fillRef>
+            <a:effectRef idx="0">
+              <a:schemeClr val="accent1"/>
+            </a:effectRef>
+            <a:fontRef idx="minor">
+              <a:schemeClr val="lt1"/>
+            </a:fontRef>
+          </p:style>
+          <p:txBody>
+            <a:bodyPr rtlCol="0" anchor="ctr"/>
+            <a:lstStyle/>
+            <a:p>
+              <a:pPr algn="ctr"/>
+              <a:endParaRPr lang="en-US"/>
+            </a:p>
+          </p:txBody>
+        </p:sp>
+        <p:cxnSp>
+          <p:nvCxnSpPr>
+            <p:cNvPr id="30" name="Straight Arrow Connector 29"/>
+            <p:cNvCxnSpPr>
+              <a:stCxn id="28" idx="0"/>
+              <a:endCxn id="29" idx="2"/>
+            </p:cNvCxnSpPr>
+            <p:nvPr/>
+          </p:nvCxnSpPr>
+          <p:spPr>
+            <a:xfrm flipH="1" flipV="1">
+              <a:off x="808554" y="3265571"/>
+              <a:ext cx="840211" cy="703869"/>
+            </a:xfrm>
+            <a:prstGeom prst="straightConnector1">
+              <a:avLst/>
+            </a:prstGeom>
+            <a:ln w="19050">
+              <a:solidFill>
+                <a:srgbClr val="C00000"/>
+              </a:solidFill>
+              <a:tailEnd type="stealth" w="lg" len="lg"/>
+            </a:ln>
+          </p:spPr>
+          <p:style>
+            <a:lnRef idx="1">
+              <a:schemeClr val="accent1"/>
+            </a:lnRef>
+            <a:fillRef idx="0">
+              <a:schemeClr val="accent1"/>
+            </a:fillRef>
+            <a:effectRef idx="0">
+              <a:schemeClr val="accent1"/>
+            </a:effectRef>
+            <a:fontRef idx="minor">
+              <a:schemeClr val="tx1"/>
+            </a:fontRef>
+          </p:style>
+        </p:cxnSp>
+      </p:grpSp>
+      <p:grpSp>
+        <p:nvGrpSpPr>
+          <p:cNvPr id="35" name="Group 34"/>
+          <p:cNvGrpSpPr/>
+          <p:nvPr/>
+        </p:nvGrpSpPr>
+        <p:grpSpPr>
+          <a:xfrm>
+            <a:off x="2981805" y="4797748"/>
+            <a:ext cx="1934324" cy="1379215"/>
+            <a:chOff x="1010359" y="2944201"/>
+            <a:chExt cx="1934324" cy="1379215"/>
+          </a:xfrm>
+        </p:grpSpPr>
+        <p:sp>
+          <p:nvSpPr>
+            <p:cNvPr id="36" name="TextBox 35"/>
+            <p:cNvSpPr txBox="1"/>
+            <p:nvPr/>
+          </p:nvSpPr>
+          <p:spPr>
+            <a:xfrm>
+              <a:off x="1010359" y="3923306"/>
+              <a:ext cx="1423048" cy="400110"/>
+            </a:xfrm>
+            <a:prstGeom prst="rect">
+              <a:avLst/>
+            </a:prstGeom>
+            <a:solidFill>
+              <a:schemeClr val="bg1"/>
+            </a:solidFill>
+            <a:ln w="19050">
+              <a:solidFill>
+                <a:srgbClr val="C00000"/>
+              </a:solidFill>
+            </a:ln>
+          </p:spPr>
+          <p:txBody>
+            <a:bodyPr wrap="square" rtlCol="0">
+              <a:spAutoFit/>
+            </a:bodyPr>
+            <a:lstStyle/>
+            <a:p>
+              <a:r>
+                <a:rPr lang="en-US" sz="2000" dirty="0" smtClean="0">
+                  <a:solidFill>
+                    <a:srgbClr val="C00000"/>
+                  </a:solidFill>
+                </a:rPr>
+                <a:t>1</a:t>
+              </a:r>
+              <a:r>
+                <a:rPr lang="en-US" sz="2000" baseline="30000" dirty="0" smtClean="0">
+                  <a:solidFill>
+                    <a:srgbClr val="C00000"/>
+                  </a:solidFill>
+                </a:rPr>
+                <a:t>st</a:t>
+              </a:r>
+              <a:r>
+                <a:rPr lang="en-US" sz="2000" dirty="0" smtClean="0">
+                  <a:solidFill>
+                    <a:srgbClr val="C00000"/>
+                  </a:solidFill>
+                </a:rPr>
+                <a:t> value (?)</a:t>
+              </a:r>
+              <a:endParaRPr lang="en-US" sz="2000" dirty="0">
+                <a:solidFill>
+                  <a:srgbClr val="C00000"/>
+                </a:solidFill>
+                <a:latin typeface="Courier New" panose="02070309020205020404" pitchFamily="49" charset="0"/>
+                <a:cs typeface="Courier New" panose="02070309020205020404" pitchFamily="49" charset="0"/>
+              </a:endParaRPr>
+            </a:p>
+          </p:txBody>
+        </p:sp>
+        <p:sp>
+          <p:nvSpPr>
+            <p:cNvPr id="37" name="Rectangle 36"/>
+            <p:cNvSpPr/>
+            <p:nvPr/>
+          </p:nvSpPr>
+          <p:spPr>
+            <a:xfrm>
+              <a:off x="2044622" y="2944201"/>
+              <a:ext cx="900061" cy="280844"/>
+            </a:xfrm>
+            <a:prstGeom prst="rect">
+              <a:avLst/>
+            </a:prstGeom>
+            <a:noFill/>
+            <a:ln w="19050">
+              <a:solidFill>
+                <a:srgbClr val="C00000"/>
+              </a:solidFill>
+            </a:ln>
+          </p:spPr>
+          <p:style>
+            <a:lnRef idx="2">
+              <a:schemeClr val="accent1">
+                <a:shade val="50000"/>
+              </a:schemeClr>
+            </a:lnRef>
+            <a:fillRef idx="1">
+              <a:schemeClr val="accent1"/>
+            </a:fillRef>
+            <a:effectRef idx="0">
+              <a:schemeClr val="accent1"/>
+            </a:effectRef>
+            <a:fontRef idx="minor">
+              <a:schemeClr val="lt1"/>
+            </a:fontRef>
+          </p:style>
+          <p:txBody>
+            <a:bodyPr rtlCol="0" anchor="ctr"/>
+            <a:lstStyle/>
+            <a:p>
+              <a:pPr algn="ctr"/>
+              <a:endParaRPr lang="en-US"/>
+            </a:p>
+          </p:txBody>
+        </p:sp>
+        <p:cxnSp>
+          <p:nvCxnSpPr>
+            <p:cNvPr id="38" name="Straight Arrow Connector 37"/>
+            <p:cNvCxnSpPr>
+              <a:stCxn id="36" idx="0"/>
+              <a:endCxn id="37" idx="2"/>
+            </p:cNvCxnSpPr>
+            <p:nvPr/>
+          </p:nvCxnSpPr>
+          <p:spPr>
+            <a:xfrm flipV="1">
+              <a:off x="1721883" y="3225045"/>
+              <a:ext cx="772770" cy="698261"/>
+            </a:xfrm>
+            <a:prstGeom prst="straightConnector1">
+              <a:avLst/>
+            </a:prstGeom>
+            <a:ln w="19050">
+              <a:solidFill>
+                <a:srgbClr val="C00000"/>
+              </a:solidFill>
+              <a:tailEnd type="stealth" w="lg" len="lg"/>
+            </a:ln>
+          </p:spPr>
+          <p:style>
+            <a:lnRef idx="1">
+              <a:schemeClr val="accent1"/>
+            </a:lnRef>
+            <a:fillRef idx="0">
+              <a:schemeClr val="accent1"/>
+            </a:fillRef>
+            <a:effectRef idx="0">
+              <a:schemeClr val="accent1"/>
+            </a:effectRef>
+            <a:fontRef idx="minor">
+              <a:schemeClr val="tx1"/>
+            </a:fontRef>
+          </p:style>
+        </p:cxnSp>
+      </p:grpSp>
+      <p:sp>
+        <p:nvSpPr>
+          <p:cNvPr id="46" name="TextBox 45"/>
+          <p:cNvSpPr txBox="1"/>
+          <p:nvPr/>
+        </p:nvSpPr>
+        <p:spPr>
+          <a:xfrm>
+            <a:off x="6432166" y="5363730"/>
+            <a:ext cx="1595309" cy="646331"/>
+          </a:xfrm>
+          <a:prstGeom prst="rect">
+            <a:avLst/>
+          </a:prstGeom>
+          <a:solidFill>
+            <a:schemeClr val="bg1"/>
+          </a:solidFill>
+          <a:ln>
+            <a:solidFill>
+              <a:schemeClr val="tx1"/>
+            </a:solidFill>
+          </a:ln>
+        </p:spPr>
+        <p:txBody>
+          <a:bodyPr wrap="none" rtlCol="0">
+            <a:spAutoFit/>
+          </a:bodyPr>
+          <a:lstStyle/>
+          <a:p>
+            <a:r>
+              <a:rPr lang="en-US" dirty="0" smtClean="0"/>
+              <a:t>Assigned when</a:t>
+            </a:r>
+          </a:p>
+          <a:p>
+            <a:r>
+              <a:rPr lang="en-US" dirty="0" smtClean="0"/>
+              <a:t>program starts</a:t>
+            </a:r>
+            <a:endParaRPr lang="en-US" dirty="0"/>
+          </a:p>
+        </p:txBody>
+      </p:sp>
+    </p:spTree>
+    <p:extLst>
+      <p:ext uri="{BB962C8B-B14F-4D97-AF65-F5344CB8AC3E}">
+        <p14:creationId xmlns:p14="http://schemas.microsoft.com/office/powerpoint/2010/main" val="910030305"/>
+      </p:ext>
+    </p:extLst>
+  </p:cSld>
+  <p:clrMapOvr>
+    <a:masterClrMapping/>
+  </p:clrMapOvr>
+  <p:timing>
+    <p:tnLst>
+      <p:par>
+        <p:cTn id="1" dur="indefinite" restart="never" nodeType="tmRoot">
+          <p:childTnLst>
+            <p:seq concurrent="1" nextAc="seek">
+              <p:cTn id="2" dur="indefinite" nodeType="mainSeq">
+                <p:childTnLst>
+                  <p:par>
+                    <p:cTn id="3" fill="hold">
+                      <p:stCondLst>
+                        <p:cond delay="indefinite"/>
+                      </p:stCondLst>
+                      <p:childTnLst>
+                        <p:par>
+                          <p:cTn id="4" fill="hold">
+                            <p:stCondLst>
+                              <p:cond delay="0"/>
+                            </p:stCondLst>
+                            <p:childTnLst>
+                              <p:par>
+                                <p:cTn id="5" presetID="1" presetClass="entr" presetSubtype="0" fill="hold" nodeType="clickEffect">
+                                  <p:stCondLst>
+                                    <p:cond delay="0"/>
+                                  </p:stCondLst>
+                                  <p:childTnLst>
+                                    <p:set>
+                                      <p:cBhvr>
+                                        <p:cTn id="6" dur="1" fill="hold">
+                                          <p:stCondLst>
+                                            <p:cond delay="0"/>
+                                          </p:stCondLst>
+                                        </p:cTn>
+                                        <p:tgtEl>
+                                          <p:spTgt spid="6"/>
+                                        </p:tgtEl>
+                                        <p:attrNameLst>
+                                          <p:attrName>style.visibility</p:attrName>
+                                        </p:attrNameLst>
+                                      </p:cBhvr>
+                                      <p:to>
+                                        <p:strVal val="visible"/>
+                                      </p:to>
+                                    </p:set>
+                                  </p:childTnLst>
+                                </p:cTn>
+                              </p:par>
+                            </p:childTnLst>
+                          </p:cTn>
+                        </p:par>
+                      </p:childTnLst>
+                    </p:cTn>
+                  </p:par>
+                  <p:par>
+                    <p:cTn id="7" fill="hold">
+                      <p:stCondLst>
+                        <p:cond delay="indefinite"/>
+                      </p:stCondLst>
+                      <p:childTnLst>
+                        <p:par>
+                          <p:cTn id="8" fill="hold">
+                            <p:stCondLst>
+                              <p:cond delay="0"/>
+                            </p:stCondLst>
+                            <p:childTnLst>
+                              <p:par>
+                                <p:cTn id="9" presetID="1" presetClass="entr" presetSubtype="0" fill="hold" grpId="0" nodeType="clickEffect">
+                                  <p:stCondLst>
+                                    <p:cond delay="0"/>
+                                  </p:stCondLst>
+                                  <p:childTnLst>
+                                    <p:set>
+                                      <p:cBhvr>
+                                        <p:cTn id="10" dur="1" fill="hold">
+                                          <p:stCondLst>
+                                            <p:cond delay="0"/>
+                                          </p:stCondLst>
+                                        </p:cTn>
+                                        <p:tgtEl>
+                                          <p:spTgt spid="20"/>
+                                        </p:tgtEl>
+                                        <p:attrNameLst>
+                                          <p:attrName>style.visibility</p:attrName>
+                                        </p:attrNameLst>
+                                      </p:cBhvr>
+                                      <p:to>
+                                        <p:strVal val="visible"/>
+                                      </p:to>
+                                    </p:set>
+                                  </p:childTnLst>
+                                </p:cTn>
+                              </p:par>
+                            </p:childTnLst>
+                          </p:cTn>
+                        </p:par>
+                      </p:childTnLst>
+                    </p:cTn>
+                  </p:par>
+                  <p:par>
+                    <p:cTn id="11" fill="hold">
+                      <p:stCondLst>
+                        <p:cond delay="indefinite"/>
+                      </p:stCondLst>
+                      <p:childTnLst>
+                        <p:par>
+                          <p:cTn id="12" fill="hold">
+                            <p:stCondLst>
+                              <p:cond delay="0"/>
+                            </p:stCondLst>
+                            <p:childTnLst>
+                              <p:par>
+                                <p:cTn id="13" presetID="1" presetClass="entr" presetSubtype="0" fill="hold" nodeType="clickEffect">
+                                  <p:stCondLst>
+                                    <p:cond delay="0"/>
+                                  </p:stCondLst>
+                                  <p:childTnLst>
+                                    <p:set>
+                                      <p:cBhvr>
+                                        <p:cTn id="14" dur="1" fill="hold">
+                                          <p:stCondLst>
+                                            <p:cond delay="0"/>
+                                          </p:stCondLst>
+                                        </p:cTn>
+                                        <p:tgtEl>
+                                          <p:spTgt spid="21"/>
+                                        </p:tgtEl>
+                                        <p:attrNameLst>
+                                          <p:attrName>style.visibility</p:attrName>
+                                        </p:attrNameLst>
+                                      </p:cBhvr>
+                                      <p:to>
+                                        <p:strVal val="visible"/>
+                                      </p:to>
+                                    </p:set>
+                                  </p:childTnLst>
+                                </p:cTn>
+                              </p:par>
+                            </p:childTnLst>
+                          </p:cTn>
+                        </p:par>
+                      </p:childTnLst>
+                    </p:cTn>
+                  </p:par>
+                  <p:par>
+                    <p:cTn id="15" fill="hold">
+                      <p:stCondLst>
+                        <p:cond delay="indefinite"/>
+                      </p:stCondLst>
+                      <p:childTnLst>
+                        <p:par>
+                          <p:cTn id="16" fill="hold">
+                            <p:stCondLst>
+                              <p:cond delay="0"/>
+                            </p:stCondLst>
+                            <p:childTnLst>
+                              <p:par>
+                                <p:cTn id="17" presetID="1" presetClass="entr" presetSubtype="0" fill="hold" nodeType="clickEffect">
+                                  <p:stCondLst>
+                                    <p:cond delay="0"/>
+                                  </p:stCondLst>
+                                  <p:childTnLst>
+                                    <p:set>
+                                      <p:cBhvr>
+                                        <p:cTn id="18" dur="1" fill="hold">
+                                          <p:stCondLst>
+                                            <p:cond delay="0"/>
+                                          </p:stCondLst>
+                                        </p:cTn>
+                                        <p:tgtEl>
+                                          <p:spTgt spid="27"/>
+                                        </p:tgtEl>
+                                        <p:attrNameLst>
+                                          <p:attrName>style.visibility</p:attrName>
+                                        </p:attrNameLst>
+                                      </p:cBhvr>
+                                      <p:to>
+                                        <p:strVal val="visible"/>
+                                      </p:to>
+                                    </p:set>
+                                  </p:childTnLst>
+                                </p:cTn>
+                              </p:par>
+                            </p:childTnLst>
+                          </p:cTn>
+                        </p:par>
+                      </p:childTnLst>
+                    </p:cTn>
+                  </p:par>
+                  <p:par>
+                    <p:cTn id="19" fill="hold">
+                      <p:stCondLst>
+                        <p:cond delay="indefinite"/>
+                      </p:stCondLst>
+                      <p:childTnLst>
+                        <p:par>
+                          <p:cTn id="20" fill="hold">
+                            <p:stCondLst>
+                              <p:cond delay="0"/>
+                            </p:stCondLst>
+                            <p:childTnLst>
+                              <p:par>
+                                <p:cTn id="21" presetID="1" presetClass="entr" presetSubtype="0" fill="hold" nodeType="clickEffect">
+                                  <p:stCondLst>
+                                    <p:cond delay="0"/>
+                                  </p:stCondLst>
+                                  <p:childTnLst>
+                                    <p:set>
+                                      <p:cBhvr>
+                                        <p:cTn id="22" dur="1" fill="hold">
+                                          <p:stCondLst>
+                                            <p:cond delay="0"/>
+                                          </p:stCondLst>
+                                        </p:cTn>
+                                        <p:tgtEl>
+                                          <p:spTgt spid="35"/>
+                                        </p:tgtEl>
+                                        <p:attrNameLst>
+                                          <p:attrName>style.visibility</p:attrName>
+                                        </p:attrNameLst>
+                                      </p:cBhvr>
+                                      <p:to>
+                                        <p:strVal val="visible"/>
+                                      </p:to>
+                                    </p:set>
+                                  </p:childTnLst>
+                                </p:cTn>
+                              </p:par>
+                            </p:childTnLst>
+                          </p:cTn>
+                        </p:par>
+                      </p:childTnLst>
+                    </p:cTn>
+                  </p:par>
+                  <p:par>
+                    <p:cTn id="23" fill="hold">
+                      <p:stCondLst>
+                        <p:cond delay="indefinite"/>
+                      </p:stCondLst>
+                      <p:childTnLst>
+                        <p:par>
+                          <p:cTn id="24" fill="hold">
+                            <p:stCondLst>
+                              <p:cond delay="0"/>
+                            </p:stCondLst>
+                            <p:childTnLst>
+                              <p:par>
+                                <p:cTn id="25" presetID="1" presetClass="entr" presetSubtype="0" fill="hold" grpId="0" nodeType="clickEffect">
+                                  <p:stCondLst>
+                                    <p:cond delay="0"/>
+                                  </p:stCondLst>
+                                  <p:childTnLst>
+                                    <p:set>
+                                      <p:cBhvr>
+                                        <p:cTn id="26" dur="1" fill="hold">
+                                          <p:stCondLst>
+                                            <p:cond delay="0"/>
+                                          </p:stCondLst>
+                                        </p:cTn>
+                                        <p:tgtEl>
+                                          <p:spTgt spid="46"/>
+                                        </p:tgtEl>
+                                        <p:attrNameLst>
+                                          <p:attrName>style.visibility</p:attrName>
+                                        </p:attrNameLst>
+                                      </p:cBhvr>
+                                      <p:to>
+                                        <p:strVal val="visible"/>
+                                      </p:to>
+                                    </p:set>
+                                  </p:childTnLst>
+                                </p:cTn>
+                              </p:par>
+                            </p:childTnLst>
+                          </p:cTn>
+                        </p:par>
+                      </p:childTnLst>
+                    </p:cTn>
+                  </p:par>
+                </p:childTnLst>
+              </p:cTn>
+              <p:prevCondLst>
+                <p:cond evt="onPrev" delay="0">
+                  <p:tgtEl>
+                    <p:sldTgt/>
+                  </p:tgtEl>
+                </p:cond>
+              </p:prevCondLst>
+              <p:nextCondLst>
+                <p:cond evt="onNext" delay="0">
+                  <p:tgtEl>
+                    <p:sldTgt/>
+                  </p:tgtEl>
+                </p:cond>
+              </p:nextCondLst>
+            </p:seq>
+          </p:childTnLst>
+        </p:cTn>
+      </p:par>
+    </p:tnLst>
+    <p:bldLst>
+      <p:bldP spid="20" grpId="0" animBg="1"/>
+      <p:bldP spid="46" grpId="0" animBg="1"/>
+    </p:bldLst>
+  </p:timing>
+</p:sld>
+</file>
+
+<file path=ppt/slides/slide12.xml><?xml version="1.0" encoding="utf-8"?>
+<p:sld xmlns:a="http://schemas.openxmlformats.org/drawingml/2006/main" xmlns:r="http://schemas.openxmlformats.org/officeDocument/2006/relationships" xmlns:p="http://schemas.openxmlformats.org/presentationml/2006/main">
+  <p:cSld>
+    <p:spTree>
+      <p:nvGrpSpPr>
+        <p:cNvPr id="1" name=""/>
+        <p:cNvGrpSpPr/>
+        <p:nvPr/>
+      </p:nvGrpSpPr>
+      <p:grpSpPr>
+        <a:xfrm>
+          <a:off x="0" y="0"/>
+          <a:ext cx="0" cy="0"/>
+          <a:chOff x="0" y="0"/>
+          <a:chExt cx="0" cy="0"/>
+        </a:xfrm>
+      </p:grpSpPr>
+      <p:sp>
+        <p:nvSpPr>
+          <p:cNvPr id="2" name="Title 1"/>
+          <p:cNvSpPr>
+            <a:spLocks noGrp="1"/>
+          </p:cNvSpPr>
+          <p:nvPr>
+            <p:ph type="title"/>
+          </p:nvPr>
+        </p:nvSpPr>
+        <p:spPr/>
+        <p:txBody>
+          <a:bodyPr/>
+          <a:lstStyle/>
+          <a:p>
+            <a:r>
+              <a:rPr lang="en-US" dirty="0" smtClean="0"/>
+              <a:t>Variables</a:t>
+            </a:r>
+            <a:endParaRPr lang="en-US" dirty="0"/>
+          </a:p>
+        </p:txBody>
+      </p:sp>
+      <p:sp>
+        <p:nvSpPr>
+          <p:cNvPr id="3" name="Content Placeholder 2"/>
+          <p:cNvSpPr>
+            <a:spLocks noGrp="1"/>
+          </p:cNvSpPr>
+          <p:nvPr>
+            <p:ph idx="1"/>
+          </p:nvPr>
+        </p:nvSpPr>
+        <p:spPr/>
+        <p:txBody>
+          <a:bodyPr/>
+          <a:lstStyle/>
+          <a:p>
+            <a:r>
+              <a:rPr lang="en-US" dirty="0" smtClean="0"/>
+              <a:t>Named values</a:t>
+            </a:r>
+          </a:p>
+          <a:p>
+            <a:r>
+              <a:rPr lang="en-US" dirty="0" smtClean="0"/>
+              <a:t>Can change during run</a:t>
+            </a:r>
+          </a:p>
+          <a:p>
+            <a:r>
+              <a:rPr lang="en-US" dirty="0" smtClean="0"/>
+              <a:t>Must be declared, i.e., </a:t>
+            </a:r>
+            <a:r>
+              <a:rPr lang="en-US" dirty="0" err="1" smtClean="0">
+                <a:latin typeface="Courier New" panose="02070309020205020404" pitchFamily="49" charset="0"/>
+                <a:cs typeface="Courier New" panose="02070309020205020404" pitchFamily="49" charset="0"/>
+              </a:rPr>
+              <a:t>int</a:t>
+            </a:r>
+            <a:r>
+              <a:rPr lang="en-US" dirty="0" smtClean="0">
+                <a:latin typeface="Courier New" panose="02070309020205020404" pitchFamily="49" charset="0"/>
+                <a:cs typeface="Courier New" panose="02070309020205020404" pitchFamily="49" charset="0"/>
+              </a:rPr>
+              <a:t> </a:t>
+            </a:r>
+            <a:r>
+              <a:rPr lang="en-US" dirty="0" err="1" smtClean="0">
+                <a:latin typeface="Courier New" panose="02070309020205020404" pitchFamily="49" charset="0"/>
+                <a:cs typeface="Courier New" panose="02070309020205020404" pitchFamily="49" charset="0"/>
+              </a:rPr>
+              <a:t>argc</a:t>
+            </a:r>
+            <a:endParaRPr lang="en-US" dirty="0">
+              <a:latin typeface="Courier New" panose="02070309020205020404" pitchFamily="49" charset="0"/>
+              <a:cs typeface="Courier New" panose="02070309020205020404" pitchFamily="49" charset="0"/>
+            </a:endParaRPr>
+          </a:p>
+        </p:txBody>
+      </p:sp>
+      <p:sp>
+        <p:nvSpPr>
+          <p:cNvPr id="4" name="Slide Number Placeholder 3"/>
+          <p:cNvSpPr>
+            <a:spLocks noGrp="1"/>
+          </p:cNvSpPr>
+          <p:nvPr>
+            <p:ph type="sldNum" sz="quarter" idx="12"/>
+          </p:nvPr>
+        </p:nvSpPr>
+        <p:spPr/>
+        <p:txBody>
+          <a:bodyPr/>
+          <a:lstStyle/>
+          <a:p>
+            <a:fld id="{033373DF-BCDA-4600-B448-AFBDB22F4A39}" type="slidenum">
+              <a:rPr lang="en-US" smtClean="0"/>
+              <a:t>12</a:t>
+            </a:fld>
+            <a:endParaRPr lang="en-US"/>
+          </a:p>
+        </p:txBody>
+      </p:sp>
+      <p:grpSp>
+        <p:nvGrpSpPr>
+          <p:cNvPr id="5" name="Group 4"/>
+          <p:cNvGrpSpPr/>
+          <p:nvPr/>
+        </p:nvGrpSpPr>
+        <p:grpSpPr>
+          <a:xfrm>
+            <a:off x="3234571" y="2900515"/>
+            <a:ext cx="1799546" cy="1420122"/>
+            <a:chOff x="1010358" y="2903294"/>
+            <a:chExt cx="1799546" cy="1420122"/>
+          </a:xfrm>
+        </p:grpSpPr>
+        <p:sp>
+          <p:nvSpPr>
+            <p:cNvPr id="6" name="TextBox 5"/>
+            <p:cNvSpPr txBox="1"/>
+            <p:nvPr/>
+          </p:nvSpPr>
+          <p:spPr>
+            <a:xfrm>
+              <a:off x="1010358" y="3923306"/>
+              <a:ext cx="1799546" cy="400110"/>
+            </a:xfrm>
+            <a:prstGeom prst="rect">
+              <a:avLst/>
+            </a:prstGeom>
+            <a:solidFill>
+              <a:schemeClr val="bg1"/>
+            </a:solidFill>
+            <a:ln w="19050">
+              <a:solidFill>
+                <a:srgbClr val="C00000"/>
+              </a:solidFill>
+            </a:ln>
+          </p:spPr>
+          <p:txBody>
+            <a:bodyPr wrap="square" rtlCol="0">
+              <a:spAutoFit/>
+            </a:bodyPr>
+            <a:lstStyle/>
+            <a:p>
+              <a:r>
+                <a:rPr lang="en-US" sz="2000" dirty="0" smtClean="0">
+                  <a:solidFill>
+                    <a:srgbClr val="C00000"/>
+                  </a:solidFill>
+                </a:rPr>
+                <a:t>argument type</a:t>
+              </a:r>
+              <a:endParaRPr lang="en-US" sz="2000" dirty="0">
+                <a:solidFill>
+                  <a:srgbClr val="C00000"/>
+                </a:solidFill>
+                <a:latin typeface="Courier New" panose="02070309020205020404" pitchFamily="49" charset="0"/>
+                <a:cs typeface="Courier New" panose="02070309020205020404" pitchFamily="49" charset="0"/>
+              </a:endParaRPr>
+            </a:p>
+          </p:txBody>
+        </p:sp>
+        <p:sp>
+          <p:nvSpPr>
+            <p:cNvPr id="7" name="Rectangle 6"/>
+            <p:cNvSpPr/>
+            <p:nvPr/>
+          </p:nvSpPr>
+          <p:spPr>
+            <a:xfrm>
+              <a:off x="1979896" y="2903294"/>
+              <a:ext cx="692357" cy="380743"/>
+            </a:xfrm>
+            <a:prstGeom prst="rect">
+              <a:avLst/>
+            </a:prstGeom>
+            <a:noFill/>
+            <a:ln w="19050">
+              <a:solidFill>
+                <a:srgbClr val="C00000"/>
+              </a:solidFill>
+            </a:ln>
+          </p:spPr>
+          <p:style>
+            <a:lnRef idx="2">
+              <a:schemeClr val="accent1">
+                <a:shade val="50000"/>
+              </a:schemeClr>
+            </a:lnRef>
+            <a:fillRef idx="1">
+              <a:schemeClr val="accent1"/>
+            </a:fillRef>
+            <a:effectRef idx="0">
+              <a:schemeClr val="accent1"/>
+            </a:effectRef>
+            <a:fontRef idx="minor">
+              <a:schemeClr val="lt1"/>
+            </a:fontRef>
+          </p:style>
+          <p:txBody>
+            <a:bodyPr rtlCol="0" anchor="ctr"/>
+            <a:lstStyle/>
+            <a:p>
+              <a:pPr algn="ctr"/>
+              <a:endParaRPr lang="en-US"/>
+            </a:p>
+          </p:txBody>
+        </p:sp>
+        <p:cxnSp>
+          <p:nvCxnSpPr>
+            <p:cNvPr id="8" name="Straight Arrow Connector 7"/>
+            <p:cNvCxnSpPr>
+              <a:stCxn id="6" idx="0"/>
+              <a:endCxn id="7" idx="2"/>
+            </p:cNvCxnSpPr>
+            <p:nvPr/>
+          </p:nvCxnSpPr>
+          <p:spPr>
+            <a:xfrm flipV="1">
+              <a:off x="1910131" y="3284037"/>
+              <a:ext cx="415944" cy="639269"/>
+            </a:xfrm>
+            <a:prstGeom prst="straightConnector1">
+              <a:avLst/>
+            </a:prstGeom>
+            <a:ln w="19050">
+              <a:solidFill>
+                <a:srgbClr val="C00000"/>
+              </a:solidFill>
+              <a:tailEnd type="stealth" w="lg" len="lg"/>
+            </a:ln>
+          </p:spPr>
+          <p:style>
+            <a:lnRef idx="1">
+              <a:schemeClr val="accent1"/>
+            </a:lnRef>
+            <a:fillRef idx="0">
+              <a:schemeClr val="accent1"/>
+            </a:fillRef>
+            <a:effectRef idx="0">
+              <a:schemeClr val="accent1"/>
+            </a:effectRef>
+            <a:fontRef idx="minor">
+              <a:schemeClr val="tx1"/>
+            </a:fontRef>
+          </p:style>
+        </p:cxnSp>
+      </p:grpSp>
+      <p:grpSp>
+        <p:nvGrpSpPr>
+          <p:cNvPr id="12" name="Group 11"/>
+          <p:cNvGrpSpPr/>
+          <p:nvPr/>
+        </p:nvGrpSpPr>
+        <p:grpSpPr>
+          <a:xfrm>
+            <a:off x="5034117" y="2900515"/>
+            <a:ext cx="2477728" cy="1420122"/>
+            <a:chOff x="566968" y="2903294"/>
+            <a:chExt cx="2477728" cy="1420122"/>
+          </a:xfrm>
+        </p:grpSpPr>
+        <p:sp>
+          <p:nvSpPr>
+            <p:cNvPr id="13" name="TextBox 12"/>
+            <p:cNvSpPr txBox="1"/>
+            <p:nvPr/>
+          </p:nvSpPr>
+          <p:spPr>
+            <a:xfrm>
+              <a:off x="1010358" y="3923306"/>
+              <a:ext cx="2034338" cy="400110"/>
+            </a:xfrm>
+            <a:prstGeom prst="rect">
+              <a:avLst/>
+            </a:prstGeom>
+            <a:solidFill>
+              <a:schemeClr val="bg1"/>
+            </a:solidFill>
+            <a:ln w="19050">
+              <a:solidFill>
+                <a:srgbClr val="C00000"/>
+              </a:solidFill>
+            </a:ln>
+          </p:spPr>
+          <p:txBody>
+            <a:bodyPr wrap="square" rtlCol="0">
+              <a:spAutoFit/>
+            </a:bodyPr>
+            <a:lstStyle/>
+            <a:p>
+              <a:r>
+                <a:rPr lang="en-US" sz="2000" dirty="0" smtClean="0">
+                  <a:solidFill>
+                    <a:srgbClr val="C00000"/>
+                  </a:solidFill>
+                </a:rPr>
+                <a:t>argument name</a:t>
+              </a:r>
+              <a:endParaRPr lang="en-US" sz="2000" dirty="0">
+                <a:solidFill>
+                  <a:srgbClr val="C00000"/>
+                </a:solidFill>
+                <a:latin typeface="Courier New" panose="02070309020205020404" pitchFamily="49" charset="0"/>
+                <a:cs typeface="Courier New" panose="02070309020205020404" pitchFamily="49" charset="0"/>
+              </a:endParaRPr>
+            </a:p>
+          </p:txBody>
+        </p:sp>
+        <p:sp>
+          <p:nvSpPr>
+            <p:cNvPr id="14" name="Rectangle 13"/>
+            <p:cNvSpPr/>
+            <p:nvPr/>
+          </p:nvSpPr>
+          <p:spPr>
+            <a:xfrm>
+              <a:off x="566968" y="2903294"/>
+              <a:ext cx="1042218" cy="380743"/>
+            </a:xfrm>
+            <a:prstGeom prst="rect">
+              <a:avLst/>
+            </a:prstGeom>
+            <a:noFill/>
+            <a:ln w="19050">
+              <a:solidFill>
+                <a:srgbClr val="C00000"/>
+              </a:solidFill>
+            </a:ln>
+          </p:spPr>
+          <p:style>
+            <a:lnRef idx="2">
+              <a:schemeClr val="accent1">
+                <a:shade val="50000"/>
+              </a:schemeClr>
+            </a:lnRef>
+            <a:fillRef idx="1">
+              <a:schemeClr val="accent1"/>
+            </a:fillRef>
+            <a:effectRef idx="0">
+              <a:schemeClr val="accent1"/>
+            </a:effectRef>
+            <a:fontRef idx="minor">
+              <a:schemeClr val="lt1"/>
+            </a:fontRef>
+          </p:style>
+          <p:txBody>
+            <a:bodyPr rtlCol="0" anchor="ctr"/>
+            <a:lstStyle/>
+            <a:p>
+              <a:pPr algn="ctr"/>
+              <a:endParaRPr lang="en-US"/>
+            </a:p>
+          </p:txBody>
+        </p:sp>
+        <p:cxnSp>
+          <p:nvCxnSpPr>
+            <p:cNvPr id="15" name="Straight Arrow Connector 14"/>
+            <p:cNvCxnSpPr>
+              <a:stCxn id="13" idx="0"/>
+              <a:endCxn id="14" idx="2"/>
+            </p:cNvCxnSpPr>
+            <p:nvPr/>
+          </p:nvCxnSpPr>
+          <p:spPr>
+            <a:xfrm flipH="1" flipV="1">
+              <a:off x="1088077" y="3284037"/>
+              <a:ext cx="939450" cy="639269"/>
+            </a:xfrm>
+            <a:prstGeom prst="straightConnector1">
+              <a:avLst/>
+            </a:prstGeom>
+            <a:ln w="19050">
+              <a:solidFill>
+                <a:srgbClr val="C00000"/>
+              </a:solidFill>
+              <a:tailEnd type="stealth" w="lg" len="lg"/>
+            </a:ln>
+          </p:spPr>
+          <p:style>
+            <a:lnRef idx="1">
+              <a:schemeClr val="accent1"/>
+            </a:lnRef>
+            <a:fillRef idx="0">
+              <a:schemeClr val="accent1"/>
+            </a:fillRef>
+            <a:effectRef idx="0">
+              <a:schemeClr val="accent1"/>
+            </a:effectRef>
+            <a:fontRef idx="minor">
+              <a:schemeClr val="tx1"/>
+            </a:fontRef>
+          </p:style>
+        </p:cxnSp>
+      </p:grpSp>
+      <p:sp>
+        <p:nvSpPr>
+          <p:cNvPr id="23" name="TextBox 22"/>
+          <p:cNvSpPr txBox="1"/>
+          <p:nvPr/>
+        </p:nvSpPr>
+        <p:spPr>
+          <a:xfrm>
+            <a:off x="1061267" y="4529411"/>
+            <a:ext cx="6244101" cy="1077218"/>
+          </a:xfrm>
+          <a:prstGeom prst="rect">
+            <a:avLst/>
+          </a:prstGeom>
+          <a:solidFill>
+            <a:schemeClr val="bg1">
+              <a:lumMod val="75000"/>
+            </a:schemeClr>
+          </a:solidFill>
+        </p:spPr>
+        <p:txBody>
+          <a:bodyPr wrap="square" rtlCol="0">
+            <a:spAutoFit/>
+          </a:bodyPr>
+          <a:lstStyle/>
+          <a:p>
+            <a:r>
+              <a:rPr lang="en-US" sz="1600" dirty="0" smtClean="0">
+                <a:latin typeface="Courier New" pitchFamily="49" charset="0"/>
+                <a:cs typeface="Courier New" pitchFamily="49" charset="0"/>
+              </a:rPr>
+              <a:t>…</a:t>
+            </a:r>
+          </a:p>
+          <a:p>
+            <a:r>
+              <a:rPr lang="en-US" sz="1600" dirty="0" smtClean="0">
+                <a:latin typeface="Courier New" pitchFamily="49" charset="0"/>
+                <a:cs typeface="Courier New" pitchFamily="49" charset="0"/>
+              </a:rPr>
+              <a:t>    </a:t>
+            </a:r>
+            <a:r>
+              <a:rPr lang="en-US" sz="1600" dirty="0" err="1" smtClean="0">
+                <a:latin typeface="Courier New" pitchFamily="49" charset="0"/>
+                <a:cs typeface="Courier New" pitchFamily="49" charset="0"/>
+              </a:rPr>
+              <a:t>int</a:t>
+            </a:r>
+            <a:r>
+              <a:rPr lang="en-US" sz="1600" dirty="0" smtClean="0">
+                <a:latin typeface="Courier New" pitchFamily="49" charset="0"/>
+                <a:cs typeface="Courier New" pitchFamily="49" charset="0"/>
+              </a:rPr>
+              <a:t> m {13};</a:t>
+            </a:r>
+          </a:p>
+          <a:p>
+            <a:r>
+              <a:rPr lang="en-US" sz="1600" dirty="0">
+                <a:latin typeface="Courier New" pitchFamily="49" charset="0"/>
+                <a:cs typeface="Courier New" pitchFamily="49" charset="0"/>
+              </a:rPr>
+              <a:t> </a:t>
+            </a:r>
+            <a:r>
+              <a:rPr lang="en-US" sz="1600" dirty="0" smtClean="0">
+                <a:latin typeface="Courier New" pitchFamily="49" charset="0"/>
+                <a:cs typeface="Courier New" pitchFamily="49" charset="0"/>
+              </a:rPr>
+              <a:t>   </a:t>
+            </a:r>
+            <a:r>
+              <a:rPr lang="en-US" sz="1600" dirty="0" err="1" smtClean="0">
+                <a:latin typeface="Courier New" pitchFamily="49" charset="0"/>
+                <a:cs typeface="Courier New" pitchFamily="49" charset="0"/>
+              </a:rPr>
+              <a:t>int</a:t>
+            </a:r>
+            <a:r>
+              <a:rPr lang="en-US" sz="1600" dirty="0" smtClean="0">
+                <a:latin typeface="Courier New" pitchFamily="49" charset="0"/>
+                <a:cs typeface="Courier New" pitchFamily="49" charset="0"/>
+              </a:rPr>
+              <a:t> n = 3*m;</a:t>
+            </a:r>
+            <a:endParaRPr lang="en-US" sz="1600" dirty="0" smtClean="0">
+              <a:latin typeface="Courier New" pitchFamily="49" charset="0"/>
+              <a:cs typeface="Courier New" pitchFamily="49" charset="0"/>
+            </a:endParaRPr>
+          </a:p>
+          <a:p>
+            <a:r>
+              <a:rPr lang="en-US" sz="1600" dirty="0" smtClean="0">
+                <a:latin typeface="Courier New" pitchFamily="49" charset="0"/>
+                <a:cs typeface="Courier New" pitchFamily="49" charset="0"/>
+              </a:rPr>
+              <a:t>…</a:t>
+            </a:r>
+            <a:endParaRPr lang="en-US" sz="1600" dirty="0" smtClean="0">
+              <a:latin typeface="Courier New" pitchFamily="49" charset="0"/>
+              <a:cs typeface="Courier New" pitchFamily="49" charset="0"/>
+            </a:endParaRPr>
+          </a:p>
+        </p:txBody>
+      </p:sp>
+    </p:spTree>
+    <p:extLst>
+      <p:ext uri="{BB962C8B-B14F-4D97-AF65-F5344CB8AC3E}">
+        <p14:creationId xmlns:p14="http://schemas.microsoft.com/office/powerpoint/2010/main" val="2320515007"/>
       </p:ext>
     </p:extLst>
   </p:cSld>
@@ -4836,11 +8196,7 @@
           <a:p>
             <a:r>
               <a:rPr lang="en-US" dirty="0" smtClean="0"/>
-              <a:t>Typographical </a:t>
-            </a:r>
-            <a:r>
-              <a:rPr lang="en-US" dirty="0" smtClean="0"/>
-              <a:t>conventions</a:t>
+              <a:t>Typographical conventions</a:t>
             </a:r>
             <a:endParaRPr lang="nl-BE" dirty="0"/>
           </a:p>
@@ -4892,11 +8248,7 @@
             </a:r>
             <a:r>
               <a:rPr lang="en-US" dirty="0" smtClean="0"/>
-              <a:t>, it represents your shell prompt</a:t>
-            </a:r>
-            <a:r>
-              <a:rPr lang="en-US" dirty="0" smtClean="0"/>
-              <a:t>!</a:t>
+              <a:t>, it represents your shell prompt!</a:t>
             </a:r>
           </a:p>
           <a:p>
@@ -5135,14 +8487,16 @@
                 <a:latin typeface="Courier New" pitchFamily="49" charset="0"/>
                 <a:cs typeface="Courier New" pitchFamily="49" charset="0"/>
               </a:rPr>
-              <a:t>case </a:t>
-            </a:r>
+              <a:t>case dim temp</a:t>
+            </a:r>
+          </a:p>
+          <a:p>
             <a:r>
               <a:rPr lang="en-US" sz="1600" dirty="0">
                 <a:latin typeface="Courier New" pitchFamily="49" charset="0"/>
                 <a:cs typeface="Courier New" pitchFamily="49" charset="0"/>
               </a:rPr>
-              <a:t>dim temp</a:t>
+              <a:t>1 1 -0.5</a:t>
             </a:r>
           </a:p>
           <a:p>
@@ -5151,44 +8505,17 @@
                 <a:latin typeface="Courier New" pitchFamily="49" charset="0"/>
                 <a:cs typeface="Courier New" pitchFamily="49" charset="0"/>
               </a:rPr>
-              <a:t>1</a:t>
-            </a:r>
+              <a:t>2 1 0.0</a:t>
+            </a:r>
+          </a:p>
+          <a:p>
             <a:r>
               <a:rPr lang="en-US" sz="1600" dirty="0">
                 <a:latin typeface="Courier New" pitchFamily="49" charset="0"/>
                 <a:cs typeface="Courier New" pitchFamily="49" charset="0"/>
               </a:rPr>
-              <a:t> </a:t>
-            </a:r>
-            <a:r>
-              <a:rPr lang="en-US" sz="1600" dirty="0">
-                <a:latin typeface="Courier New" pitchFamily="49" charset="0"/>
-                <a:cs typeface="Courier New" pitchFamily="49" charset="0"/>
-              </a:rPr>
-              <a:t>1 -0.5</a:t>
-            </a:r>
-          </a:p>
-          <a:p>
-            <a:r>
-              <a:rPr lang="en-US" sz="1600" dirty="0">
-                <a:latin typeface="Courier New" pitchFamily="49" charset="0"/>
-                <a:cs typeface="Courier New" pitchFamily="49" charset="0"/>
-              </a:rPr>
-              <a:t>2 1 0.0</a:t>
-            </a:r>
-          </a:p>
-          <a:p>
-            <a:r>
-              <a:rPr lang="en-US" sz="1600" dirty="0">
-                <a:latin typeface="Courier New" pitchFamily="49" charset="0"/>
-                <a:cs typeface="Courier New" pitchFamily="49" charset="0"/>
-              </a:rPr>
               <a:t>…</a:t>
             </a:r>
-            <a:endParaRPr lang="en-US" sz="1600" dirty="0">
-              <a:latin typeface="Courier New" pitchFamily="49" charset="0"/>
-              <a:cs typeface="Courier New" pitchFamily="49" charset="0"/>
-            </a:endParaRPr>
           </a:p>
         </p:txBody>
       </p:sp>
@@ -5322,11 +8649,7 @@
             <a:p>
               <a:r>
                 <a:rPr lang="en-US" dirty="0"/>
-                <a:t>f</a:t>
-              </a:r>
-              <a:r>
-                <a:rPr lang="en-US" dirty="0"/>
-                <a:t>ragment</a:t>
+                <a:t>fragment</a:t>
               </a:r>
               <a:br>
                 <a:rPr lang="en-US" dirty="0"/>
@@ -8032,6 +11355,965 @@
 </p:sld>
 </file>
 
+<file path=ppt/slides/slide9.xml><?xml version="1.0" encoding="utf-8"?>
+<p:sld xmlns:a="http://schemas.openxmlformats.org/drawingml/2006/main" xmlns:r="http://schemas.openxmlformats.org/officeDocument/2006/relationships" xmlns:p="http://schemas.openxmlformats.org/presentationml/2006/main">
+  <p:cSld>
+    <p:spTree>
+      <p:nvGrpSpPr>
+        <p:cNvPr id="1" name=""/>
+        <p:cNvGrpSpPr/>
+        <p:nvPr/>
+      </p:nvGrpSpPr>
+      <p:grpSpPr>
+        <a:xfrm>
+          <a:off x="0" y="0"/>
+          <a:ext cx="0" cy="0"/>
+          <a:chOff x="0" y="0"/>
+          <a:chExt cx="0" cy="0"/>
+        </a:xfrm>
+      </p:grpSpPr>
+      <p:sp>
+        <p:nvSpPr>
+          <p:cNvPr id="2" name="Title 1"/>
+          <p:cNvSpPr>
+            <a:spLocks noGrp="1"/>
+          </p:cNvSpPr>
+          <p:nvPr>
+            <p:ph type="title"/>
+          </p:nvPr>
+        </p:nvSpPr>
+        <p:spPr/>
+        <p:txBody>
+          <a:bodyPr/>
+          <a:lstStyle/>
+          <a:p>
+            <a:r>
+              <a:rPr lang="en-US" dirty="0" smtClean="0"/>
+              <a:t>Namespaces</a:t>
+            </a:r>
+            <a:endParaRPr lang="en-US" dirty="0"/>
+          </a:p>
+        </p:txBody>
+      </p:sp>
+      <p:sp>
+        <p:nvSpPr>
+          <p:cNvPr id="3" name="Content Placeholder 2"/>
+          <p:cNvSpPr>
+            <a:spLocks noGrp="1"/>
+          </p:cNvSpPr>
+          <p:nvPr>
+            <p:ph idx="1"/>
+          </p:nvPr>
+        </p:nvSpPr>
+        <p:spPr/>
+        <p:txBody>
+          <a:bodyPr/>
+          <a:lstStyle/>
+          <a:p>
+            <a:r>
+              <a:rPr lang="en-US" dirty="0" smtClean="0"/>
+              <a:t>Avoid name conflicts</a:t>
+            </a:r>
+          </a:p>
+          <a:p>
+            <a:pPr lvl="1"/>
+            <a:r>
+              <a:rPr lang="en-US" dirty="0" smtClean="0"/>
+              <a:t>functions/variables with same name in multiple contexts</a:t>
+            </a:r>
+          </a:p>
+          <a:p>
+            <a:r>
+              <a:rPr lang="en-US" dirty="0" smtClean="0"/>
+              <a:t>E.g., standard library in namespace </a:t>
+            </a:r>
+            <a:r>
+              <a:rPr lang="en-US" dirty="0" err="1" smtClean="0">
+                <a:latin typeface="Courier New" panose="02070309020205020404" pitchFamily="49" charset="0"/>
+                <a:cs typeface="Courier New" panose="02070309020205020404" pitchFamily="49" charset="0"/>
+              </a:rPr>
+              <a:t>std</a:t>
+            </a:r>
+            <a:endParaRPr lang="en-US" dirty="0" smtClean="0">
+              <a:latin typeface="Courier New" panose="02070309020205020404" pitchFamily="49" charset="0"/>
+              <a:cs typeface="Courier New" panose="02070309020205020404" pitchFamily="49" charset="0"/>
+            </a:endParaRPr>
+          </a:p>
+          <a:p>
+            <a:pPr lvl="1"/>
+            <a:r>
+              <a:rPr lang="en-US" dirty="0" err="1" smtClean="0">
+                <a:latin typeface="Courier New" panose="02070309020205020404" pitchFamily="49" charset="0"/>
+                <a:cs typeface="Courier New" panose="02070309020205020404" pitchFamily="49" charset="0"/>
+              </a:rPr>
+              <a:t>iostream</a:t>
+            </a:r>
+            <a:r>
+              <a:rPr lang="en-US" dirty="0" smtClean="0">
+                <a:latin typeface="Courier New" panose="02070309020205020404" pitchFamily="49" charset="0"/>
+                <a:cs typeface="Courier New" panose="02070309020205020404" pitchFamily="49" charset="0"/>
+              </a:rPr>
+              <a:t>: </a:t>
+            </a:r>
+            <a:r>
+              <a:rPr lang="en-US" dirty="0" err="1" smtClean="0">
+                <a:latin typeface="Courier New" panose="02070309020205020404" pitchFamily="49" charset="0"/>
+                <a:cs typeface="Courier New" panose="02070309020205020404" pitchFamily="49" charset="0"/>
+              </a:rPr>
+              <a:t>cout</a:t>
+            </a:r>
+            <a:r>
+              <a:rPr lang="en-US" dirty="0" smtClean="0"/>
+              <a:t>, </a:t>
+            </a:r>
+            <a:r>
+              <a:rPr lang="en-US" dirty="0" err="1" smtClean="0">
+                <a:latin typeface="Courier New" panose="02070309020205020404" pitchFamily="49" charset="0"/>
+                <a:cs typeface="Courier New" panose="02070309020205020404" pitchFamily="49" charset="0"/>
+              </a:rPr>
+              <a:t>endl</a:t>
+            </a:r>
+            <a:endParaRPr lang="en-US" dirty="0" smtClean="0">
+              <a:latin typeface="Courier New" panose="02070309020205020404" pitchFamily="49" charset="0"/>
+              <a:cs typeface="Courier New" panose="02070309020205020404" pitchFamily="49" charset="0"/>
+            </a:endParaRPr>
+          </a:p>
+          <a:p>
+            <a:r>
+              <a:rPr lang="en-US" dirty="0" smtClean="0"/>
+              <a:t>Either</a:t>
+            </a:r>
+          </a:p>
+          <a:p>
+            <a:pPr lvl="1"/>
+            <a:r>
+              <a:rPr lang="en-US" dirty="0" smtClean="0"/>
+              <a:t>prefix with namespace, e.g., </a:t>
+            </a:r>
+            <a:r>
+              <a:rPr lang="en-US" dirty="0" err="1" smtClean="0">
+                <a:latin typeface="Courier New" panose="02070309020205020404" pitchFamily="49" charset="0"/>
+                <a:cs typeface="Courier New" panose="02070309020205020404" pitchFamily="49" charset="0"/>
+              </a:rPr>
+              <a:t>std</a:t>
+            </a:r>
+            <a:r>
+              <a:rPr lang="en-US" dirty="0" smtClean="0">
+                <a:latin typeface="Courier New" panose="02070309020205020404" pitchFamily="49" charset="0"/>
+                <a:cs typeface="Courier New" panose="02070309020205020404" pitchFamily="49" charset="0"/>
+              </a:rPr>
+              <a:t>::</a:t>
+            </a:r>
+            <a:r>
+              <a:rPr lang="en-US" dirty="0" err="1" smtClean="0">
+                <a:latin typeface="Courier New" panose="02070309020205020404" pitchFamily="49" charset="0"/>
+                <a:cs typeface="Courier New" panose="02070309020205020404" pitchFamily="49" charset="0"/>
+              </a:rPr>
+              <a:t>cout</a:t>
+            </a:r>
+            <a:r>
+              <a:rPr lang="en-US" dirty="0" smtClean="0"/>
+              <a:t>, or</a:t>
+            </a:r>
+          </a:p>
+          <a:p>
+            <a:pPr lvl="1"/>
+            <a:r>
+              <a:rPr lang="en-US" dirty="0" smtClean="0"/>
+              <a:t>use namespace</a:t>
+            </a:r>
+            <a:endParaRPr lang="en-US" dirty="0"/>
+          </a:p>
+        </p:txBody>
+      </p:sp>
+      <p:sp>
+        <p:nvSpPr>
+          <p:cNvPr id="4" name="Slide Number Placeholder 3"/>
+          <p:cNvSpPr>
+            <a:spLocks noGrp="1"/>
+          </p:cNvSpPr>
+          <p:nvPr>
+            <p:ph type="sldNum" sz="quarter" idx="12"/>
+          </p:nvPr>
+        </p:nvSpPr>
+        <p:spPr/>
+        <p:txBody>
+          <a:bodyPr/>
+          <a:lstStyle/>
+          <a:p>
+            <a:fld id="{033373DF-BCDA-4600-B448-AFBDB22F4A39}" type="slidenum">
+              <a:rPr lang="en-US" smtClean="0"/>
+              <a:t>9</a:t>
+            </a:fld>
+            <a:endParaRPr lang="en-US"/>
+          </a:p>
+        </p:txBody>
+      </p:sp>
+      <p:sp>
+        <p:nvSpPr>
+          <p:cNvPr id="5" name="TextBox 4"/>
+          <p:cNvSpPr txBox="1"/>
+          <p:nvPr/>
+        </p:nvSpPr>
+        <p:spPr>
+          <a:xfrm>
+            <a:off x="1061267" y="4942368"/>
+            <a:ext cx="6244101" cy="1569660"/>
+          </a:xfrm>
+          <a:prstGeom prst="rect">
+            <a:avLst/>
+          </a:prstGeom>
+          <a:solidFill>
+            <a:schemeClr val="bg1">
+              <a:lumMod val="75000"/>
+            </a:schemeClr>
+          </a:solidFill>
+        </p:spPr>
+        <p:txBody>
+          <a:bodyPr wrap="square" rtlCol="0">
+            <a:spAutoFit/>
+          </a:bodyPr>
+          <a:lstStyle/>
+          <a:p>
+            <a:r>
+              <a:rPr lang="en-US" sz="1600" dirty="0" smtClean="0">
+                <a:latin typeface="Courier New" pitchFamily="49" charset="0"/>
+                <a:cs typeface="Courier New" pitchFamily="49" charset="0"/>
+              </a:rPr>
+              <a:t>#include &lt;</a:t>
+            </a:r>
+            <a:r>
+              <a:rPr lang="en-US" sz="1600" dirty="0" err="1" smtClean="0">
+                <a:latin typeface="Courier New" pitchFamily="49" charset="0"/>
+                <a:cs typeface="Courier New" pitchFamily="49" charset="0"/>
+              </a:rPr>
+              <a:t>iostream</a:t>
+            </a:r>
+            <a:r>
+              <a:rPr lang="en-US" sz="1600" dirty="0" smtClean="0">
+                <a:latin typeface="Courier New" pitchFamily="49" charset="0"/>
+                <a:cs typeface="Courier New" pitchFamily="49" charset="0"/>
+              </a:rPr>
+              <a:t>&gt;</a:t>
+            </a:r>
+          </a:p>
+          <a:p>
+            <a:r>
+              <a:rPr lang="en-US" sz="1600" b="1" dirty="0" smtClean="0">
+                <a:solidFill>
+                  <a:srgbClr val="C00000"/>
+                </a:solidFill>
+                <a:latin typeface="Courier New" pitchFamily="49" charset="0"/>
+                <a:cs typeface="Courier New" pitchFamily="49" charset="0"/>
+              </a:rPr>
+              <a:t>use namespace </a:t>
+            </a:r>
+            <a:r>
+              <a:rPr lang="en-US" sz="1600" b="1" dirty="0" err="1" smtClean="0">
+                <a:solidFill>
+                  <a:srgbClr val="C00000"/>
+                </a:solidFill>
+                <a:latin typeface="Courier New" pitchFamily="49" charset="0"/>
+                <a:cs typeface="Courier New" pitchFamily="49" charset="0"/>
+              </a:rPr>
+              <a:t>std</a:t>
+            </a:r>
+            <a:r>
+              <a:rPr lang="en-US" sz="1600" dirty="0" smtClean="0">
+                <a:latin typeface="Courier New" pitchFamily="49" charset="0"/>
+                <a:cs typeface="Courier New" pitchFamily="49" charset="0"/>
+              </a:rPr>
+              <a:t>;</a:t>
+            </a:r>
+            <a:endParaRPr lang="en-US" sz="1600" dirty="0" smtClean="0">
+              <a:latin typeface="Courier New" pitchFamily="49" charset="0"/>
+              <a:cs typeface="Courier New" pitchFamily="49" charset="0"/>
+            </a:endParaRPr>
+          </a:p>
+          <a:p>
+            <a:r>
+              <a:rPr lang="en-US" sz="1600" dirty="0" err="1" smtClean="0">
+                <a:latin typeface="Courier New" pitchFamily="49" charset="0"/>
+                <a:cs typeface="Courier New" pitchFamily="49" charset="0"/>
+              </a:rPr>
+              <a:t>int</a:t>
+            </a:r>
+            <a:r>
+              <a:rPr lang="en-US" sz="1600" dirty="0" smtClean="0">
+                <a:latin typeface="Courier New" pitchFamily="49" charset="0"/>
+                <a:cs typeface="Courier New" pitchFamily="49" charset="0"/>
+              </a:rPr>
+              <a:t> main(</a:t>
+            </a:r>
+            <a:r>
+              <a:rPr lang="en-US" sz="1600" dirty="0" err="1" smtClean="0">
+                <a:latin typeface="Courier New" pitchFamily="49" charset="0"/>
+                <a:cs typeface="Courier New" pitchFamily="49" charset="0"/>
+              </a:rPr>
+              <a:t>int</a:t>
+            </a:r>
+            <a:r>
+              <a:rPr lang="en-US" sz="1600" dirty="0" smtClean="0">
+                <a:latin typeface="Courier New" pitchFamily="49" charset="0"/>
+                <a:cs typeface="Courier New" pitchFamily="49" charset="0"/>
+              </a:rPr>
+              <a:t> </a:t>
+            </a:r>
+            <a:r>
+              <a:rPr lang="en-US" sz="1600" dirty="0" err="1" smtClean="0">
+                <a:latin typeface="Courier New" pitchFamily="49" charset="0"/>
+                <a:cs typeface="Courier New" pitchFamily="49" charset="0"/>
+              </a:rPr>
+              <a:t>argc</a:t>
+            </a:r>
+            <a:r>
+              <a:rPr lang="en-US" sz="1600" dirty="0" smtClean="0">
+                <a:latin typeface="Courier New" pitchFamily="49" charset="0"/>
+                <a:cs typeface="Courier New" pitchFamily="49" charset="0"/>
+              </a:rPr>
+              <a:t>, char *</a:t>
+            </a:r>
+            <a:r>
+              <a:rPr lang="en-US" sz="1600" dirty="0" err="1" smtClean="0">
+                <a:latin typeface="Courier New" pitchFamily="49" charset="0"/>
+                <a:cs typeface="Courier New" pitchFamily="49" charset="0"/>
+              </a:rPr>
+              <a:t>argv</a:t>
+            </a:r>
+            <a:r>
+              <a:rPr lang="en-US" sz="1600" dirty="0" smtClean="0">
+                <a:latin typeface="Courier New" pitchFamily="49" charset="0"/>
+                <a:cs typeface="Courier New" pitchFamily="49" charset="0"/>
+              </a:rPr>
+              <a:t>[]) {</a:t>
+            </a:r>
+          </a:p>
+          <a:p>
+            <a:r>
+              <a:rPr lang="en-US" sz="1600" dirty="0" smtClean="0">
+                <a:latin typeface="Courier New" pitchFamily="49" charset="0"/>
+                <a:cs typeface="Courier New" pitchFamily="49" charset="0"/>
+              </a:rPr>
+              <a:t>    </a:t>
+            </a:r>
+            <a:r>
+              <a:rPr lang="en-US" sz="1600" b="1" dirty="0" err="1" smtClean="0">
+                <a:solidFill>
+                  <a:srgbClr val="C00000"/>
+                </a:solidFill>
+                <a:latin typeface="Courier New" pitchFamily="49" charset="0"/>
+                <a:cs typeface="Courier New" pitchFamily="49" charset="0"/>
+              </a:rPr>
+              <a:t>cout</a:t>
+            </a:r>
+            <a:r>
+              <a:rPr lang="en-US" sz="1600" dirty="0" smtClean="0">
+                <a:latin typeface="Courier New" pitchFamily="49" charset="0"/>
+                <a:cs typeface="Courier New" pitchFamily="49" charset="0"/>
+              </a:rPr>
+              <a:t> </a:t>
+            </a:r>
+            <a:r>
+              <a:rPr lang="en-US" sz="1600" dirty="0" smtClean="0">
+                <a:latin typeface="Courier New" pitchFamily="49" charset="0"/>
+                <a:cs typeface="Courier New" pitchFamily="49" charset="0"/>
+              </a:rPr>
+              <a:t>&lt;&lt; "hello " &lt;&lt; </a:t>
+            </a:r>
+            <a:r>
+              <a:rPr lang="en-US" sz="1600" dirty="0" err="1" smtClean="0">
+                <a:latin typeface="Courier New" pitchFamily="49" charset="0"/>
+                <a:cs typeface="Courier New" pitchFamily="49" charset="0"/>
+              </a:rPr>
+              <a:t>argv</a:t>
+            </a:r>
+            <a:r>
+              <a:rPr lang="en-US" sz="1600" dirty="0" smtClean="0">
+                <a:latin typeface="Courier New" pitchFamily="49" charset="0"/>
+                <a:cs typeface="Courier New" pitchFamily="49" charset="0"/>
+              </a:rPr>
+              <a:t>[1] &lt;&lt; "!" &lt;&lt; </a:t>
+            </a:r>
+            <a:r>
+              <a:rPr lang="en-US" sz="1600" b="1" dirty="0" err="1" smtClean="0">
+                <a:solidFill>
+                  <a:srgbClr val="C00000"/>
+                </a:solidFill>
+                <a:latin typeface="Courier New" pitchFamily="49" charset="0"/>
+                <a:cs typeface="Courier New" pitchFamily="49" charset="0"/>
+              </a:rPr>
+              <a:t>endl</a:t>
+            </a:r>
+            <a:r>
+              <a:rPr lang="en-US" sz="1600" dirty="0" smtClean="0">
+                <a:latin typeface="Courier New" pitchFamily="49" charset="0"/>
+                <a:cs typeface="Courier New" pitchFamily="49" charset="0"/>
+              </a:rPr>
+              <a:t>;</a:t>
+            </a:r>
+          </a:p>
+          <a:p>
+            <a:r>
+              <a:rPr lang="en-US" sz="1600" dirty="0" smtClean="0">
+                <a:latin typeface="Courier New" pitchFamily="49" charset="0"/>
+                <a:cs typeface="Courier New" pitchFamily="49" charset="0"/>
+              </a:rPr>
+              <a:t>    return 0;</a:t>
+            </a:r>
+          </a:p>
+          <a:p>
+            <a:r>
+              <a:rPr lang="en-US" sz="1600" dirty="0" smtClean="0">
+                <a:latin typeface="Courier New" pitchFamily="49" charset="0"/>
+                <a:cs typeface="Courier New" pitchFamily="49" charset="0"/>
+              </a:rPr>
+              <a:t>}</a:t>
+            </a:r>
+            <a:endParaRPr lang="en-US" sz="1600" dirty="0">
+              <a:latin typeface="Courier New" pitchFamily="49" charset="0"/>
+              <a:cs typeface="Courier New" pitchFamily="49" charset="0"/>
+            </a:endParaRPr>
+          </a:p>
+        </p:txBody>
+      </p:sp>
+      <p:grpSp>
+        <p:nvGrpSpPr>
+          <p:cNvPr id="6" name="Group 5"/>
+          <p:cNvGrpSpPr/>
+          <p:nvPr/>
+        </p:nvGrpSpPr>
+        <p:grpSpPr>
+          <a:xfrm>
+            <a:off x="1061268" y="5018751"/>
+            <a:ext cx="7234060" cy="480122"/>
+            <a:chOff x="-2444419" y="3913434"/>
+            <a:chExt cx="7234060" cy="480122"/>
+          </a:xfrm>
+        </p:grpSpPr>
+        <p:sp>
+          <p:nvSpPr>
+            <p:cNvPr id="7" name="TextBox 6"/>
+            <p:cNvSpPr txBox="1"/>
+            <p:nvPr/>
+          </p:nvSpPr>
+          <p:spPr>
+            <a:xfrm>
+              <a:off x="2627799" y="3913434"/>
+              <a:ext cx="2161842" cy="400110"/>
+            </a:xfrm>
+            <a:prstGeom prst="rect">
+              <a:avLst/>
+            </a:prstGeom>
+            <a:solidFill>
+              <a:schemeClr val="bg1"/>
+            </a:solidFill>
+            <a:ln w="19050">
+              <a:solidFill>
+                <a:srgbClr val="C00000"/>
+              </a:solidFill>
+            </a:ln>
+          </p:spPr>
+          <p:txBody>
+            <a:bodyPr wrap="square" rtlCol="0">
+              <a:spAutoFit/>
+            </a:bodyPr>
+            <a:lstStyle/>
+            <a:p>
+              <a:r>
+                <a:rPr lang="en-US" sz="2000" dirty="0" smtClean="0">
+                  <a:solidFill>
+                    <a:srgbClr val="C00000"/>
+                  </a:solidFill>
+                </a:rPr>
+                <a:t>assumed in slides</a:t>
+              </a:r>
+              <a:endParaRPr lang="en-US" sz="2000" dirty="0">
+                <a:solidFill>
+                  <a:srgbClr val="C00000"/>
+                </a:solidFill>
+              </a:endParaRPr>
+            </a:p>
+          </p:txBody>
+        </p:sp>
+        <p:sp>
+          <p:nvSpPr>
+            <p:cNvPr id="8" name="Rectangle 7"/>
+            <p:cNvSpPr/>
+            <p:nvPr/>
+          </p:nvSpPr>
+          <p:spPr>
+            <a:xfrm>
+              <a:off x="-2444419" y="4112712"/>
+              <a:ext cx="2306768" cy="280844"/>
+            </a:xfrm>
+            <a:prstGeom prst="rect">
+              <a:avLst/>
+            </a:prstGeom>
+            <a:noFill/>
+            <a:ln w="19050">
+              <a:solidFill>
+                <a:srgbClr val="C00000"/>
+              </a:solidFill>
+            </a:ln>
+          </p:spPr>
+          <p:style>
+            <a:lnRef idx="2">
+              <a:schemeClr val="accent1">
+                <a:shade val="50000"/>
+              </a:schemeClr>
+            </a:lnRef>
+            <a:fillRef idx="1">
+              <a:schemeClr val="accent1"/>
+            </a:fillRef>
+            <a:effectRef idx="0">
+              <a:schemeClr val="accent1"/>
+            </a:effectRef>
+            <a:fontRef idx="minor">
+              <a:schemeClr val="lt1"/>
+            </a:fontRef>
+          </p:style>
+          <p:txBody>
+            <a:bodyPr rtlCol="0" anchor="ctr"/>
+            <a:lstStyle/>
+            <a:p>
+              <a:pPr algn="ctr"/>
+              <a:endParaRPr lang="en-US"/>
+            </a:p>
+          </p:txBody>
+        </p:sp>
+        <p:cxnSp>
+          <p:nvCxnSpPr>
+            <p:cNvPr id="9" name="Straight Arrow Connector 8"/>
+            <p:cNvCxnSpPr>
+              <a:stCxn id="7" idx="1"/>
+              <a:endCxn id="8" idx="3"/>
+            </p:cNvCxnSpPr>
+            <p:nvPr/>
+          </p:nvCxnSpPr>
+          <p:spPr>
+            <a:xfrm flipH="1">
+              <a:off x="-137651" y="4113489"/>
+              <a:ext cx="2765450" cy="139645"/>
+            </a:xfrm>
+            <a:prstGeom prst="straightConnector1">
+              <a:avLst/>
+            </a:prstGeom>
+            <a:ln w="19050">
+              <a:solidFill>
+                <a:srgbClr val="C00000"/>
+              </a:solidFill>
+              <a:tailEnd type="stealth" w="lg" len="lg"/>
+            </a:ln>
+          </p:spPr>
+          <p:style>
+            <a:lnRef idx="1">
+              <a:schemeClr val="accent1"/>
+            </a:lnRef>
+            <a:fillRef idx="0">
+              <a:schemeClr val="accent1"/>
+            </a:fillRef>
+            <a:effectRef idx="0">
+              <a:schemeClr val="accent1"/>
+            </a:effectRef>
+            <a:fontRef idx="minor">
+              <a:schemeClr val="tx1"/>
+            </a:fontRef>
+          </p:style>
+        </p:cxnSp>
+      </p:grpSp>
+    </p:spTree>
+    <p:extLst>
+      <p:ext uri="{BB962C8B-B14F-4D97-AF65-F5344CB8AC3E}">
+        <p14:creationId xmlns:p14="http://schemas.microsoft.com/office/powerpoint/2010/main" val="3415193880"/>
+      </p:ext>
+    </p:extLst>
+  </p:cSld>
+  <p:clrMapOvr>
+    <a:masterClrMapping/>
+  </p:clrMapOvr>
+  <p:timing>
+    <p:tnLst>
+      <p:par>
+        <p:cTn id="1" dur="indefinite" restart="never" nodeType="tmRoot">
+          <p:childTnLst>
+            <p:seq concurrent="1" nextAc="seek">
+              <p:cTn id="2" dur="indefinite" nodeType="mainSeq">
+                <p:childTnLst>
+                  <p:par>
+                    <p:cTn id="3" fill="hold">
+                      <p:stCondLst>
+                        <p:cond delay="indefinite"/>
+                        <p:cond evt="onBegin" delay="0">
+                          <p:tn val="2"/>
+                        </p:cond>
+                      </p:stCondLst>
+                      <p:childTnLst>
+                        <p:par>
+                          <p:cTn id="4" fill="hold">
+                            <p:stCondLst>
+                              <p:cond delay="0"/>
+                            </p:stCondLst>
+                            <p:childTnLst>
+                              <p:par>
+                                <p:cTn id="5" presetID="1" presetClass="entr" presetSubtype="0" fill="hold" grpId="0" nodeType="withEffect">
+                                  <p:stCondLst>
+                                    <p:cond delay="0"/>
+                                  </p:stCondLst>
+                                  <p:childTnLst>
+                                    <p:set>
+                                      <p:cBhvr>
+                                        <p:cTn id="6" dur="1" fill="hold">
+                                          <p:stCondLst>
+                                            <p:cond delay="0"/>
+                                          </p:stCondLst>
+                                        </p:cTn>
+                                        <p:tgtEl>
+                                          <p:spTgt spid="3">
+                                            <p:txEl>
+                                              <p:pRg st="0" end="0"/>
+                                            </p:txEl>
+                                          </p:spTgt>
+                                        </p:tgtEl>
+                                        <p:attrNameLst>
+                                          <p:attrName>style.visibility</p:attrName>
+                                        </p:attrNameLst>
+                                      </p:cBhvr>
+                                      <p:to>
+                                        <p:strVal val="visible"/>
+                                      </p:to>
+                                    </p:set>
+                                  </p:childTnLst>
+                                </p:cTn>
+                              </p:par>
+                              <p:par>
+                                <p:cTn id="7" presetID="1" presetClass="entr" presetSubtype="0" fill="hold" grpId="0" nodeType="withEffect">
+                                  <p:stCondLst>
+                                    <p:cond delay="0"/>
+                                  </p:stCondLst>
+                                  <p:childTnLst>
+                                    <p:set>
+                                      <p:cBhvr>
+                                        <p:cTn id="8" dur="1" fill="hold">
+                                          <p:stCondLst>
+                                            <p:cond delay="0"/>
+                                          </p:stCondLst>
+                                        </p:cTn>
+                                        <p:tgtEl>
+                                          <p:spTgt spid="3">
+                                            <p:txEl>
+                                              <p:pRg st="1" end="1"/>
+                                            </p:txEl>
+                                          </p:spTgt>
+                                        </p:tgtEl>
+                                        <p:attrNameLst>
+                                          <p:attrName>style.visibility</p:attrName>
+                                        </p:attrNameLst>
+                                      </p:cBhvr>
+                                      <p:to>
+                                        <p:strVal val="visible"/>
+                                      </p:to>
+                                    </p:set>
+                                  </p:childTnLst>
+                                </p:cTn>
+                              </p:par>
+                            </p:childTnLst>
+                          </p:cTn>
+                        </p:par>
+                      </p:childTnLst>
+                    </p:cTn>
+                  </p:par>
+                  <p:par>
+                    <p:cTn id="9" fill="hold">
+                      <p:stCondLst>
+                        <p:cond delay="indefinite"/>
+                      </p:stCondLst>
+                      <p:childTnLst>
+                        <p:par>
+                          <p:cTn id="10" fill="hold">
+                            <p:stCondLst>
+                              <p:cond delay="0"/>
+                            </p:stCondLst>
+                            <p:childTnLst>
+                              <p:par>
+                                <p:cTn id="11" presetID="1" presetClass="entr" presetSubtype="0" fill="hold" grpId="0" nodeType="clickEffect">
+                                  <p:stCondLst>
+                                    <p:cond delay="0"/>
+                                  </p:stCondLst>
+                                  <p:childTnLst>
+                                    <p:set>
+                                      <p:cBhvr>
+                                        <p:cTn id="12" dur="1" fill="hold">
+                                          <p:stCondLst>
+                                            <p:cond delay="0"/>
+                                          </p:stCondLst>
+                                        </p:cTn>
+                                        <p:tgtEl>
+                                          <p:spTgt spid="3">
+                                            <p:txEl>
+                                              <p:pRg st="2" end="2"/>
+                                            </p:txEl>
+                                          </p:spTgt>
+                                        </p:tgtEl>
+                                        <p:attrNameLst>
+                                          <p:attrName>style.visibility</p:attrName>
+                                        </p:attrNameLst>
+                                      </p:cBhvr>
+                                      <p:to>
+                                        <p:strVal val="visible"/>
+                                      </p:to>
+                                    </p:set>
+                                  </p:childTnLst>
+                                </p:cTn>
+                              </p:par>
+                              <p:par>
+                                <p:cTn id="13" presetID="1" presetClass="entr" presetSubtype="0" fill="hold" grpId="0" nodeType="withEffect">
+                                  <p:stCondLst>
+                                    <p:cond delay="0"/>
+                                  </p:stCondLst>
+                                  <p:childTnLst>
+                                    <p:set>
+                                      <p:cBhvr>
+                                        <p:cTn id="14" dur="1" fill="hold">
+                                          <p:stCondLst>
+                                            <p:cond delay="0"/>
+                                          </p:stCondLst>
+                                        </p:cTn>
+                                        <p:tgtEl>
+                                          <p:spTgt spid="3">
+                                            <p:txEl>
+                                              <p:pRg st="3" end="3"/>
+                                            </p:txEl>
+                                          </p:spTgt>
+                                        </p:tgtEl>
+                                        <p:attrNameLst>
+                                          <p:attrName>style.visibility</p:attrName>
+                                        </p:attrNameLst>
+                                      </p:cBhvr>
+                                      <p:to>
+                                        <p:strVal val="visible"/>
+                                      </p:to>
+                                    </p:set>
+                                  </p:childTnLst>
+                                </p:cTn>
+                              </p:par>
+                            </p:childTnLst>
+                          </p:cTn>
+                        </p:par>
+                      </p:childTnLst>
+                    </p:cTn>
+                  </p:par>
+                  <p:par>
+                    <p:cTn id="15" fill="hold">
+                      <p:stCondLst>
+                        <p:cond delay="indefinite"/>
+                      </p:stCondLst>
+                      <p:childTnLst>
+                        <p:par>
+                          <p:cTn id="16" fill="hold">
+                            <p:stCondLst>
+                              <p:cond delay="0"/>
+                            </p:stCondLst>
+                            <p:childTnLst>
+                              <p:par>
+                                <p:cTn id="17" presetID="1" presetClass="entr" presetSubtype="0" fill="hold" grpId="0" nodeType="clickEffect">
+                                  <p:stCondLst>
+                                    <p:cond delay="0"/>
+                                  </p:stCondLst>
+                                  <p:childTnLst>
+                                    <p:set>
+                                      <p:cBhvr>
+                                        <p:cTn id="18" dur="1" fill="hold">
+                                          <p:stCondLst>
+                                            <p:cond delay="0"/>
+                                          </p:stCondLst>
+                                        </p:cTn>
+                                        <p:tgtEl>
+                                          <p:spTgt spid="3">
+                                            <p:txEl>
+                                              <p:pRg st="4" end="4"/>
+                                            </p:txEl>
+                                          </p:spTgt>
+                                        </p:tgtEl>
+                                        <p:attrNameLst>
+                                          <p:attrName>style.visibility</p:attrName>
+                                        </p:attrNameLst>
+                                      </p:cBhvr>
+                                      <p:to>
+                                        <p:strVal val="visible"/>
+                                      </p:to>
+                                    </p:set>
+                                  </p:childTnLst>
+                                </p:cTn>
+                              </p:par>
+                              <p:par>
+                                <p:cTn id="19" presetID="1" presetClass="entr" presetSubtype="0" fill="hold" grpId="0" nodeType="withEffect">
+                                  <p:stCondLst>
+                                    <p:cond delay="0"/>
+                                  </p:stCondLst>
+                                  <p:childTnLst>
+                                    <p:set>
+                                      <p:cBhvr>
+                                        <p:cTn id="20" dur="1" fill="hold">
+                                          <p:stCondLst>
+                                            <p:cond delay="0"/>
+                                          </p:stCondLst>
+                                        </p:cTn>
+                                        <p:tgtEl>
+                                          <p:spTgt spid="3">
+                                            <p:txEl>
+                                              <p:pRg st="5" end="5"/>
+                                            </p:txEl>
+                                          </p:spTgt>
+                                        </p:tgtEl>
+                                        <p:attrNameLst>
+                                          <p:attrName>style.visibility</p:attrName>
+                                        </p:attrNameLst>
+                                      </p:cBhvr>
+                                      <p:to>
+                                        <p:strVal val="visible"/>
+                                      </p:to>
+                                    </p:set>
+                                  </p:childTnLst>
+                                </p:cTn>
+                              </p:par>
+                              <p:par>
+                                <p:cTn id="21" presetID="1" presetClass="entr" presetSubtype="0" fill="hold" grpId="0" nodeType="withEffect">
+                                  <p:stCondLst>
+                                    <p:cond delay="0"/>
+                                  </p:stCondLst>
+                                  <p:childTnLst>
+                                    <p:set>
+                                      <p:cBhvr>
+                                        <p:cTn id="22" dur="1" fill="hold">
+                                          <p:stCondLst>
+                                            <p:cond delay="0"/>
+                                          </p:stCondLst>
+                                        </p:cTn>
+                                        <p:tgtEl>
+                                          <p:spTgt spid="3">
+                                            <p:txEl>
+                                              <p:pRg st="6" end="6"/>
+                                            </p:txEl>
+                                          </p:spTgt>
+                                        </p:tgtEl>
+                                        <p:attrNameLst>
+                                          <p:attrName>style.visibility</p:attrName>
+                                        </p:attrNameLst>
+                                      </p:cBhvr>
+                                      <p:to>
+                                        <p:strVal val="visible"/>
+                                      </p:to>
+                                    </p:set>
+                                  </p:childTnLst>
+                                </p:cTn>
+                              </p:par>
+                              <p:par>
+                                <p:cTn id="23" presetID="1" presetClass="entr" presetSubtype="0" fill="hold" grpId="0" nodeType="withEffect">
+                                  <p:stCondLst>
+                                    <p:cond delay="0"/>
+                                  </p:stCondLst>
+                                  <p:childTnLst>
+                                    <p:set>
+                                      <p:cBhvr>
+                                        <p:cTn id="24" dur="1" fill="hold">
+                                          <p:stCondLst>
+                                            <p:cond delay="0"/>
+                                          </p:stCondLst>
+                                        </p:cTn>
+                                        <p:tgtEl>
+                                          <p:spTgt spid="5"/>
+                                        </p:tgtEl>
+                                        <p:attrNameLst>
+                                          <p:attrName>style.visibility</p:attrName>
+                                        </p:attrNameLst>
+                                      </p:cBhvr>
+                                      <p:to>
+                                        <p:strVal val="visible"/>
+                                      </p:to>
+                                    </p:set>
+                                  </p:childTnLst>
+                                </p:cTn>
+                              </p:par>
+                            </p:childTnLst>
+                          </p:cTn>
+                        </p:par>
+                      </p:childTnLst>
+                    </p:cTn>
+                  </p:par>
+                  <p:par>
+                    <p:cTn id="25" fill="hold">
+                      <p:stCondLst>
+                        <p:cond delay="indefinite"/>
+                      </p:stCondLst>
+                      <p:childTnLst>
+                        <p:par>
+                          <p:cTn id="26" fill="hold">
+                            <p:stCondLst>
+                              <p:cond delay="0"/>
+                            </p:stCondLst>
+                            <p:childTnLst>
+                              <p:par>
+                                <p:cTn id="27" presetID="1" presetClass="entr" presetSubtype="0" fill="hold" nodeType="clickEffect">
+                                  <p:stCondLst>
+                                    <p:cond delay="0"/>
+                                  </p:stCondLst>
+                                  <p:childTnLst>
+                                    <p:set>
+                                      <p:cBhvr>
+                                        <p:cTn id="28" dur="1" fill="hold">
+                                          <p:stCondLst>
+                                            <p:cond delay="0"/>
+                                          </p:stCondLst>
+                                        </p:cTn>
+                                        <p:tgtEl>
+                                          <p:spTgt spid="6"/>
+                                        </p:tgtEl>
+                                        <p:attrNameLst>
+                                          <p:attrName>style.visibility</p:attrName>
+                                        </p:attrNameLst>
+                                      </p:cBhvr>
+                                      <p:to>
+                                        <p:strVal val="visible"/>
+                                      </p:to>
+                                    </p:set>
+                                  </p:childTnLst>
+                                </p:cTn>
+                              </p:par>
+                            </p:childTnLst>
+                          </p:cTn>
+                        </p:par>
+                      </p:childTnLst>
+                    </p:cTn>
+                  </p:par>
+                </p:childTnLst>
+              </p:cTn>
+              <p:prevCondLst>
+                <p:cond evt="onPrev" delay="0">
+                  <p:tgtEl>
+                    <p:sldTgt/>
+                  </p:tgtEl>
+                </p:cond>
+              </p:prevCondLst>
+              <p:nextCondLst>
+                <p:cond evt="onNext" delay="0">
+                  <p:tgtEl>
+                    <p:sldTgt/>
+                  </p:tgtEl>
+                </p:cond>
+              </p:nextCondLst>
+            </p:seq>
+          </p:childTnLst>
+        </p:cTn>
+      </p:par>
+    </p:tnLst>
+    <p:bldLst>
+      <p:bldP spid="3" grpId="0" uiExpand="1" build="p"/>
+      <p:bldP spid="5" grpId="0" animBg="1"/>
+    </p:bldLst>
+  </p:timing>
+</p:sld>
+</file>
+
 <file path=ppt/theme/theme1.xml><?xml version="1.0" encoding="utf-8"?>
 <a:theme xmlns:a="http://schemas.openxmlformats.org/drawingml/2006/main" name="Office Theme">
   <a:themeElements>

</xml_diff>

<commit_message>
Added slides on types, opearators & math
</commit_message>
<xml_diff>
--- a/CPlusPlus/essential_cpp.pptx
+++ b/CPlusPlus/essential_cpp.pptx
@@ -5,7 +5,7 @@
     <p:sldMasterId id="2147483660" r:id="rId1"/>
   </p:sldMasterIdLst>
   <p:notesMasterIdLst>
-    <p:notesMasterId r:id="rId14"/>
+    <p:notesMasterId r:id="rId16"/>
   </p:notesMasterIdLst>
   <p:sldIdLst>
     <p:sldId id="256" r:id="rId2"/>
@@ -20,6 +20,8 @@
     <p:sldId id="265" r:id="rId11"/>
     <p:sldId id="266" r:id="rId12"/>
     <p:sldId id="267" r:id="rId13"/>
+    <p:sldId id="268" r:id="rId14"/>
+    <p:sldId id="269" r:id="rId15"/>
   </p:sldIdLst>
   <p:sldSz cx="9144000" cy="6858000" type="screen4x3"/>
   <p:notesSz cx="6858000" cy="9144000"/>
@@ -3740,10 +3742,6 @@
               </a:rPr>
               <a:t>;</a:t>
             </a:r>
-            <a:endParaRPr lang="en-US" sz="1600" dirty="0" smtClean="0">
-              <a:latin typeface="Courier New" pitchFamily="49" charset="0"/>
-              <a:cs typeface="Courier New" pitchFamily="49" charset="0"/>
-            </a:endParaRPr>
           </a:p>
           <a:p>
             <a:r>
@@ -3753,10 +3751,6 @@
               </a:rPr>
               <a:t>…</a:t>
             </a:r>
-            <a:endParaRPr lang="en-US" sz="1600" dirty="0" smtClean="0">
-              <a:latin typeface="Courier New" pitchFamily="49" charset="0"/>
-              <a:cs typeface="Courier New" pitchFamily="49" charset="0"/>
-            </a:endParaRPr>
           </a:p>
           <a:p>
             <a:r>
@@ -3781,14 +3775,7 @@
                 <a:latin typeface="Courier New" pitchFamily="49" charset="0"/>
                 <a:cs typeface="Courier New" pitchFamily="49" charset="0"/>
               </a:rPr>
-              <a:t> </a:t>
-            </a:r>
-            <a:r>
-              <a:rPr lang="en-US" sz="1600" dirty="0" smtClean="0">
-                <a:latin typeface="Courier New" pitchFamily="49" charset="0"/>
-                <a:cs typeface="Courier New" pitchFamily="49" charset="0"/>
-              </a:rPr>
-              <a:t>&lt;&lt; "hello " &lt;&lt; </a:t>
+              <a:t> &lt;&lt; "hello " &lt;&lt; </a:t>
             </a:r>
             <a:r>
               <a:rPr lang="en-US" sz="1600" dirty="0" err="1" smtClean="0">
@@ -4357,23 +4344,7 @@
                     <a:srgbClr val="C00000"/>
                   </a:solidFill>
                 </a:rPr>
-                <a:t>"sen</a:t>
-              </a:r>
-              <a:r>
-                <a:rPr lang="en-US" sz="2000" dirty="0" smtClean="0">
-                  <a:solidFill>
-                    <a:srgbClr val="C00000"/>
-                  </a:solidFill>
-                </a:rPr>
-                <a:t>d </a:t>
-              </a:r>
-              <a:r>
-                <a:rPr lang="en-US" sz="2000" dirty="0" smtClean="0">
-                  <a:solidFill>
-                    <a:srgbClr val="C00000"/>
-                  </a:solidFill>
-                </a:rPr>
-                <a:t>to" </a:t>
+                <a:t>"send to" </a:t>
               </a:r>
               <a:r>
                 <a:rPr lang="en-US" sz="2000" dirty="0" smtClean="0">
@@ -5101,17 +5072,7 @@
                 <a:latin typeface="Courier New" pitchFamily="49" charset="0"/>
                 <a:cs typeface="Courier New" pitchFamily="49" charset="0"/>
               </a:rPr>
-              <a:t>!</a:t>
-            </a:r>
-            <a:r>
-              <a:rPr lang="en-US" sz="1600" b="1" dirty="0" smtClean="0">
-                <a:solidFill>
-                  <a:schemeClr val="bg1"/>
-                </a:solidFill>
-                <a:latin typeface="Courier New" pitchFamily="49" charset="0"/>
-                <a:cs typeface="Courier New" pitchFamily="49" charset="0"/>
-              </a:rPr>
-              <a:t> </a:t>
+              <a:t>! </a:t>
             </a:r>
             <a:endParaRPr lang="nl-BE" sz="1600" b="1" dirty="0">
               <a:solidFill>
@@ -5402,77 +5363,59 @@
                 <a:latin typeface="Courier New" pitchFamily="49" charset="0"/>
                 <a:cs typeface="Courier New" pitchFamily="49" charset="0"/>
               </a:rPr>
+              <a:t> main(</a:t>
+            </a:r>
+            <a:r>
+              <a:rPr lang="en-US" sz="1600" dirty="0" err="1" smtClean="0">
+                <a:latin typeface="Courier New" pitchFamily="49" charset="0"/>
+                <a:cs typeface="Courier New" pitchFamily="49" charset="0"/>
+              </a:rPr>
+              <a:t>int</a:t>
+            </a:r>
+            <a:r>
+              <a:rPr lang="en-US" sz="1600" dirty="0" smtClean="0">
+                <a:latin typeface="Courier New" pitchFamily="49" charset="0"/>
+                <a:cs typeface="Courier New" pitchFamily="49" charset="0"/>
+              </a:rPr>
               <a:t> </a:t>
             </a:r>
             <a:r>
+              <a:rPr lang="en-US" sz="1600" dirty="0" err="1" smtClean="0">
+                <a:latin typeface="Courier New" pitchFamily="49" charset="0"/>
+                <a:cs typeface="Courier New" pitchFamily="49" charset="0"/>
+              </a:rPr>
+              <a:t>argc</a:t>
+            </a:r>
+            <a:r>
               <a:rPr lang="en-US" sz="1600" dirty="0" smtClean="0">
                 <a:latin typeface="Courier New" pitchFamily="49" charset="0"/>
                 <a:cs typeface="Courier New" pitchFamily="49" charset="0"/>
               </a:rPr>
-              <a:t>main(</a:t>
+              <a:t>, char *</a:t>
             </a:r>
             <a:r>
               <a:rPr lang="en-US" sz="1600" dirty="0" err="1" smtClean="0">
                 <a:latin typeface="Courier New" pitchFamily="49" charset="0"/>
                 <a:cs typeface="Courier New" pitchFamily="49" charset="0"/>
               </a:rPr>
-              <a:t>int</a:t>
+              <a:t>argv</a:t>
             </a:r>
             <a:r>
               <a:rPr lang="en-US" sz="1600" dirty="0" smtClean="0">
                 <a:latin typeface="Courier New" pitchFamily="49" charset="0"/>
                 <a:cs typeface="Courier New" pitchFamily="49" charset="0"/>
               </a:rPr>
-              <a:t> </a:t>
-            </a:r>
-            <a:r>
-              <a:rPr lang="en-US" sz="1600" dirty="0" err="1" smtClean="0">
-                <a:latin typeface="Courier New" pitchFamily="49" charset="0"/>
-                <a:cs typeface="Courier New" pitchFamily="49" charset="0"/>
-              </a:rPr>
-              <a:t>argc</a:t>
-            </a:r>
+              <a:t>[]) {</a:t>
+            </a:r>
+          </a:p>
+          <a:p>
             <a:r>
               <a:rPr lang="en-US" sz="1600" dirty="0" smtClean="0">
                 <a:latin typeface="Courier New" pitchFamily="49" charset="0"/>
                 <a:cs typeface="Courier New" pitchFamily="49" charset="0"/>
               </a:rPr>
-              <a:t>, char *</a:t>
-            </a:r>
-            <a:r>
-              <a:rPr lang="en-US" sz="1600" dirty="0" err="1" smtClean="0">
-                <a:latin typeface="Courier New" pitchFamily="49" charset="0"/>
-                <a:cs typeface="Courier New" pitchFamily="49" charset="0"/>
-              </a:rPr>
-              <a:t>argv</a:t>
-            </a:r>
-            <a:r>
-              <a:rPr lang="en-US" sz="1600" dirty="0" smtClean="0">
-                <a:latin typeface="Courier New" pitchFamily="49" charset="0"/>
-                <a:cs typeface="Courier New" pitchFamily="49" charset="0"/>
-              </a:rPr>
-              <a:t>[]) </a:t>
-            </a:r>
-            <a:r>
-              <a:rPr lang="en-US" sz="1600" dirty="0" smtClean="0">
-                <a:latin typeface="Courier New" pitchFamily="49" charset="0"/>
-                <a:cs typeface="Courier New" pitchFamily="49" charset="0"/>
-              </a:rPr>
-              <a:t>{</a:t>
-            </a:r>
-          </a:p>
-          <a:p>
-            <a:r>
-              <a:rPr lang="en-US" sz="1600" dirty="0" smtClean="0">
-                <a:latin typeface="Courier New" pitchFamily="49" charset="0"/>
-                <a:cs typeface="Courier New" pitchFamily="49" charset="0"/>
-              </a:rPr>
               <a:t>…</a:t>
             </a:r>
-            <a:endParaRPr lang="en-US" sz="1600" dirty="0" smtClean="0">
-              <a:latin typeface="Courier New" pitchFamily="49" charset="0"/>
-              <a:cs typeface="Courier New" pitchFamily="49" charset="0"/>
-            </a:endParaRPr>
           </a:p>
           <a:p>
             <a:r>
@@ -5497,56 +5440,45 @@
                 <a:latin typeface="Courier New" pitchFamily="49" charset="0"/>
                 <a:cs typeface="Courier New" pitchFamily="49" charset="0"/>
               </a:rPr>
-              <a:t> </a:t>
+              <a:t> &lt;&lt; "hello " &lt;&lt; </a:t>
+            </a:r>
+            <a:r>
+              <a:rPr lang="en-US" sz="1600" dirty="0" err="1" smtClean="0">
+                <a:latin typeface="Courier New" pitchFamily="49" charset="0"/>
+                <a:cs typeface="Courier New" pitchFamily="49" charset="0"/>
+              </a:rPr>
+              <a:t>argv</a:t>
             </a:r>
             <a:r>
               <a:rPr lang="en-US" sz="1600" dirty="0" smtClean="0">
                 <a:latin typeface="Courier New" pitchFamily="49" charset="0"/>
                 <a:cs typeface="Courier New" pitchFamily="49" charset="0"/>
               </a:rPr>
-              <a:t>&lt;&lt; "hello " &lt;&lt; </a:t>
+              <a:t>[1] &lt;&lt; "!" &lt;&lt; </a:t>
             </a:r>
             <a:r>
               <a:rPr lang="en-US" sz="1600" dirty="0" err="1" smtClean="0">
                 <a:latin typeface="Courier New" pitchFamily="49" charset="0"/>
                 <a:cs typeface="Courier New" pitchFamily="49" charset="0"/>
               </a:rPr>
-              <a:t>argv</a:t>
+              <a:t>endl</a:t>
             </a:r>
             <a:r>
               <a:rPr lang="en-US" sz="1600" dirty="0" smtClean="0">
                 <a:latin typeface="Courier New" pitchFamily="49" charset="0"/>
                 <a:cs typeface="Courier New" pitchFamily="49" charset="0"/>
               </a:rPr>
-              <a:t>[1] &lt;&lt; "!" &lt;&lt; </a:t>
-            </a:r>
-            <a:r>
-              <a:rPr lang="en-US" sz="1600" dirty="0" err="1" smtClean="0">
-                <a:latin typeface="Courier New" pitchFamily="49" charset="0"/>
-                <a:cs typeface="Courier New" pitchFamily="49" charset="0"/>
-              </a:rPr>
-              <a:t>endl</a:t>
-            </a:r>
+              <a:t>;</a:t>
+            </a:r>
+          </a:p>
+          <a:p>
             <a:r>
               <a:rPr lang="en-US" sz="1600" dirty="0" smtClean="0">
                 <a:latin typeface="Courier New" pitchFamily="49" charset="0"/>
                 <a:cs typeface="Courier New" pitchFamily="49" charset="0"/>
               </a:rPr>
-              <a:t>;</a:t>
-            </a:r>
-          </a:p>
-          <a:p>
-            <a:r>
-              <a:rPr lang="en-US" sz="1600" dirty="0" smtClean="0">
-                <a:latin typeface="Courier New" pitchFamily="49" charset="0"/>
-                <a:cs typeface="Courier New" pitchFamily="49" charset="0"/>
-              </a:rPr>
               <a:t>…</a:t>
             </a:r>
-            <a:endParaRPr lang="en-US" sz="1600" dirty="0" smtClean="0">
-              <a:latin typeface="Courier New" pitchFamily="49" charset="0"/>
-              <a:cs typeface="Courier New" pitchFamily="49" charset="0"/>
-            </a:endParaRPr>
           </a:p>
           <a:p>
             <a:r>
@@ -6437,8 +6369,9 @@
           <a:p>
             <a:r>
               <a:rPr lang="en-US" dirty="0" smtClean="0"/>
-              <a:t>Named values</a:t>
-            </a:r>
+              <a:t>Names for values in memory (RAM)</a:t>
+            </a:r>
+            <a:endParaRPr lang="en-US" dirty="0" smtClean="0"/>
           </a:p>
           <a:p>
             <a:r>
@@ -6805,7 +6738,7 @@
         <p:spPr>
           <a:xfrm>
             <a:off x="1061267" y="4529411"/>
-            <a:ext cx="6244101" cy="1077218"/>
+            <a:ext cx="6244101" cy="1569660"/>
           </a:xfrm>
           <a:prstGeom prst="rect">
             <a:avLst/>
@@ -6880,7 +6813,74 @@
                 <a:latin typeface="Courier New" pitchFamily="49" charset="0"/>
                 <a:cs typeface="Courier New" pitchFamily="49" charset="0"/>
               </a:rPr>
-              <a:t> n = 3*m;</a:t>
+              <a:t> n = 3*m</a:t>
+            </a:r>
+            <a:r>
+              <a:rPr lang="en-US" sz="1600" dirty="0" smtClean="0">
+                <a:latin typeface="Courier New" pitchFamily="49" charset="0"/>
+                <a:cs typeface="Courier New" pitchFamily="49" charset="0"/>
+              </a:rPr>
+              <a:t>;</a:t>
+            </a:r>
+          </a:p>
+          <a:p>
+            <a:r>
+              <a:rPr lang="en-US" sz="1600" dirty="0">
+                <a:latin typeface="Courier New" pitchFamily="49" charset="0"/>
+                <a:cs typeface="Courier New" pitchFamily="49" charset="0"/>
+              </a:rPr>
+              <a:t> </a:t>
+            </a:r>
+            <a:r>
+              <a:rPr lang="en-US" sz="1600" dirty="0" smtClean="0">
+                <a:latin typeface="Courier New" pitchFamily="49" charset="0"/>
+                <a:cs typeface="Courier New" pitchFamily="49" charset="0"/>
+              </a:rPr>
+              <a:t>   m = m + n;</a:t>
+            </a:r>
+          </a:p>
+          <a:p>
+            <a:r>
+              <a:rPr lang="en-US" sz="1600" dirty="0">
+                <a:latin typeface="Courier New" pitchFamily="49" charset="0"/>
+                <a:cs typeface="Courier New" pitchFamily="49" charset="0"/>
+              </a:rPr>
+              <a:t> </a:t>
+            </a:r>
+            <a:r>
+              <a:rPr lang="en-US" sz="1600" dirty="0" smtClean="0">
+                <a:latin typeface="Courier New" pitchFamily="49" charset="0"/>
+                <a:cs typeface="Courier New" pitchFamily="49" charset="0"/>
+              </a:rPr>
+              <a:t>   </a:t>
+            </a:r>
+            <a:r>
+              <a:rPr lang="en-US" sz="1600" dirty="0" err="1" smtClean="0">
+                <a:latin typeface="Courier New" pitchFamily="49" charset="0"/>
+                <a:cs typeface="Courier New" pitchFamily="49" charset="0"/>
+              </a:rPr>
+              <a:t>cout</a:t>
+            </a:r>
+            <a:r>
+              <a:rPr lang="en-US" sz="1600" dirty="0" smtClean="0">
+                <a:latin typeface="Courier New" pitchFamily="49" charset="0"/>
+                <a:cs typeface="Courier New" pitchFamily="49" charset="0"/>
+              </a:rPr>
+              <a:t> &lt;&lt; m &lt;&lt; ", " &lt;&lt; n &lt;&lt; </a:t>
+            </a:r>
+            <a:r>
+              <a:rPr lang="en-US" sz="1600" dirty="0" err="1" smtClean="0">
+                <a:latin typeface="Courier New" pitchFamily="49" charset="0"/>
+                <a:cs typeface="Courier New" pitchFamily="49" charset="0"/>
+              </a:rPr>
+              <a:t>endl</a:t>
+            </a:r>
+            <a:r>
+              <a:rPr lang="en-US" sz="1600" dirty="0" smtClean="0">
+                <a:latin typeface="Courier New" pitchFamily="49" charset="0"/>
+                <a:cs typeface="Courier New" pitchFamily="49" charset="0"/>
+              </a:rPr>
+              <a:t>;</a:t>
             </a:r>
             <a:endParaRPr lang="en-US" sz="1600" dirty="0" smtClean="0">
               <a:latin typeface="Courier New" pitchFamily="49" charset="0"/>
@@ -6895,7 +6895,76 @@
               </a:rPr>
               <a:t>…</a:t>
             </a:r>
-            <a:endParaRPr lang="en-US" sz="1600" dirty="0" smtClean="0">
+          </a:p>
+        </p:txBody>
+      </p:sp>
+      <p:sp>
+        <p:nvSpPr>
+          <p:cNvPr id="16" name="TextBox 15"/>
+          <p:cNvSpPr txBox="1"/>
+          <p:nvPr/>
+        </p:nvSpPr>
+        <p:spPr>
+          <a:xfrm>
+            <a:off x="2054325" y="5924892"/>
+            <a:ext cx="925253" cy="830997"/>
+          </a:xfrm>
+          <a:prstGeom prst="rect">
+            <a:avLst/>
+          </a:prstGeom>
+          <a:solidFill>
+            <a:schemeClr val="tx1"/>
+          </a:solidFill>
+          <a:ln>
+            <a:solidFill>
+              <a:schemeClr val="tx1"/>
+            </a:solidFill>
+          </a:ln>
+        </p:spPr>
+        <p:txBody>
+          <a:bodyPr wrap="none" rtlCol="0">
+            <a:spAutoFit/>
+          </a:bodyPr>
+          <a:lstStyle/>
+          <a:p>
+            <a:r>
+              <a:rPr lang="en-US" sz="1600" b="1" dirty="0" smtClean="0">
+                <a:solidFill>
+                  <a:schemeClr val="bg1"/>
+                </a:solidFill>
+                <a:latin typeface="Courier New" pitchFamily="49" charset="0"/>
+                <a:cs typeface="Courier New" pitchFamily="49" charset="0"/>
+              </a:rPr>
+              <a:t>…</a:t>
+            </a:r>
+          </a:p>
+          <a:p>
+            <a:r>
+              <a:rPr lang="en-US" sz="1600" b="1" dirty="0" smtClean="0">
+                <a:solidFill>
+                  <a:schemeClr val="bg1"/>
+                </a:solidFill>
+                <a:latin typeface="Courier New" pitchFamily="49" charset="0"/>
+                <a:cs typeface="Courier New" pitchFamily="49" charset="0"/>
+              </a:rPr>
+              <a:t>52, 39</a:t>
+            </a:r>
+          </a:p>
+          <a:p>
+            <a:r>
+              <a:rPr lang="en-US" sz="1600" b="1" dirty="0" smtClean="0">
+                <a:solidFill>
+                  <a:schemeClr val="bg1"/>
+                </a:solidFill>
+                <a:latin typeface="Courier New" pitchFamily="49" charset="0"/>
+                <a:cs typeface="Courier New" pitchFamily="49" charset="0"/>
+              </a:rPr>
+              <a:t>…</a:t>
+            </a:r>
+            <a:endParaRPr lang="nl-BE" sz="1600" b="1" dirty="0">
+              <a:solidFill>
+                <a:schemeClr val="bg1"/>
+              </a:solidFill>
               <a:latin typeface="Courier New" pitchFamily="49" charset="0"/>
               <a:cs typeface="Courier New" pitchFamily="49" charset="0"/>
             </a:endParaRPr>
@@ -6915,9 +6984,1970 @@
   <p:timing>
     <p:tnLst>
       <p:par>
+        <p:cTn id="1" dur="indefinite" restart="never" nodeType="tmRoot">
+          <p:childTnLst>
+            <p:seq concurrent="1" nextAc="seek">
+              <p:cTn id="2" dur="indefinite" nodeType="mainSeq">
+                <p:childTnLst>
+                  <p:par>
+                    <p:cTn id="3" fill="hold">
+                      <p:stCondLst>
+                        <p:cond delay="indefinite"/>
+                        <p:cond evt="onBegin" delay="0">
+                          <p:tn val="2"/>
+                        </p:cond>
+                      </p:stCondLst>
+                      <p:childTnLst>
+                        <p:par>
+                          <p:cTn id="4" fill="hold">
+                            <p:stCondLst>
+                              <p:cond delay="0"/>
+                            </p:stCondLst>
+                            <p:childTnLst>
+                              <p:par>
+                                <p:cTn id="5" presetID="1" presetClass="entr" presetSubtype="0" fill="hold" grpId="0" nodeType="withEffect">
+                                  <p:stCondLst>
+                                    <p:cond delay="0"/>
+                                  </p:stCondLst>
+                                  <p:childTnLst>
+                                    <p:set>
+                                      <p:cBhvr>
+                                        <p:cTn id="6" dur="1" fill="hold">
+                                          <p:stCondLst>
+                                            <p:cond delay="0"/>
+                                          </p:stCondLst>
+                                        </p:cTn>
+                                        <p:tgtEl>
+                                          <p:spTgt spid="3">
+                                            <p:txEl>
+                                              <p:pRg st="0" end="0"/>
+                                            </p:txEl>
+                                          </p:spTgt>
+                                        </p:tgtEl>
+                                        <p:attrNameLst>
+                                          <p:attrName>style.visibility</p:attrName>
+                                        </p:attrNameLst>
+                                      </p:cBhvr>
+                                      <p:to>
+                                        <p:strVal val="visible"/>
+                                      </p:to>
+                                    </p:set>
+                                  </p:childTnLst>
+                                </p:cTn>
+                              </p:par>
+                            </p:childTnLst>
+                          </p:cTn>
+                        </p:par>
+                      </p:childTnLst>
+                    </p:cTn>
+                  </p:par>
+                  <p:par>
+                    <p:cTn id="7" fill="hold">
+                      <p:stCondLst>
+                        <p:cond delay="indefinite"/>
+                      </p:stCondLst>
+                      <p:childTnLst>
+                        <p:par>
+                          <p:cTn id="8" fill="hold">
+                            <p:stCondLst>
+                              <p:cond delay="0"/>
+                            </p:stCondLst>
+                            <p:childTnLst>
+                              <p:par>
+                                <p:cTn id="9" presetID="1" presetClass="entr" presetSubtype="0" fill="hold" grpId="0" nodeType="clickEffect">
+                                  <p:stCondLst>
+                                    <p:cond delay="0"/>
+                                  </p:stCondLst>
+                                  <p:childTnLst>
+                                    <p:set>
+                                      <p:cBhvr>
+                                        <p:cTn id="10" dur="1" fill="hold">
+                                          <p:stCondLst>
+                                            <p:cond delay="0"/>
+                                          </p:stCondLst>
+                                        </p:cTn>
+                                        <p:tgtEl>
+                                          <p:spTgt spid="3">
+                                            <p:txEl>
+                                              <p:pRg st="1" end="1"/>
+                                            </p:txEl>
+                                          </p:spTgt>
+                                        </p:tgtEl>
+                                        <p:attrNameLst>
+                                          <p:attrName>style.visibility</p:attrName>
+                                        </p:attrNameLst>
+                                      </p:cBhvr>
+                                      <p:to>
+                                        <p:strVal val="visible"/>
+                                      </p:to>
+                                    </p:set>
+                                  </p:childTnLst>
+                                </p:cTn>
+                              </p:par>
+                            </p:childTnLst>
+                          </p:cTn>
+                        </p:par>
+                      </p:childTnLst>
+                    </p:cTn>
+                  </p:par>
+                  <p:par>
+                    <p:cTn id="11" fill="hold">
+                      <p:stCondLst>
+                        <p:cond delay="indefinite"/>
+                      </p:stCondLst>
+                      <p:childTnLst>
+                        <p:par>
+                          <p:cTn id="12" fill="hold">
+                            <p:stCondLst>
+                              <p:cond delay="0"/>
+                            </p:stCondLst>
+                            <p:childTnLst>
+                              <p:par>
+                                <p:cTn id="13" presetID="1" presetClass="entr" presetSubtype="0" fill="hold" grpId="0" nodeType="clickEffect">
+                                  <p:stCondLst>
+                                    <p:cond delay="0"/>
+                                  </p:stCondLst>
+                                  <p:childTnLst>
+                                    <p:set>
+                                      <p:cBhvr>
+                                        <p:cTn id="14" dur="1" fill="hold">
+                                          <p:stCondLst>
+                                            <p:cond delay="0"/>
+                                          </p:stCondLst>
+                                        </p:cTn>
+                                        <p:tgtEl>
+                                          <p:spTgt spid="3">
+                                            <p:txEl>
+                                              <p:pRg st="2" end="2"/>
+                                            </p:txEl>
+                                          </p:spTgt>
+                                        </p:tgtEl>
+                                        <p:attrNameLst>
+                                          <p:attrName>style.visibility</p:attrName>
+                                        </p:attrNameLst>
+                                      </p:cBhvr>
+                                      <p:to>
+                                        <p:strVal val="visible"/>
+                                      </p:to>
+                                    </p:set>
+                                  </p:childTnLst>
+                                </p:cTn>
+                              </p:par>
+                            </p:childTnLst>
+                          </p:cTn>
+                        </p:par>
+                      </p:childTnLst>
+                    </p:cTn>
+                  </p:par>
+                  <p:par>
+                    <p:cTn id="15" fill="hold">
+                      <p:stCondLst>
+                        <p:cond delay="indefinite"/>
+                      </p:stCondLst>
+                      <p:childTnLst>
+                        <p:par>
+                          <p:cTn id="16" fill="hold">
+                            <p:stCondLst>
+                              <p:cond delay="0"/>
+                            </p:stCondLst>
+                            <p:childTnLst>
+                              <p:par>
+                                <p:cTn id="17" presetID="1" presetClass="entr" presetSubtype="0" fill="hold" nodeType="clickEffect">
+                                  <p:stCondLst>
+                                    <p:cond delay="0"/>
+                                  </p:stCondLst>
+                                  <p:childTnLst>
+                                    <p:set>
+                                      <p:cBhvr>
+                                        <p:cTn id="18" dur="1" fill="hold">
+                                          <p:stCondLst>
+                                            <p:cond delay="0"/>
+                                          </p:stCondLst>
+                                        </p:cTn>
+                                        <p:tgtEl>
+                                          <p:spTgt spid="12"/>
+                                        </p:tgtEl>
+                                        <p:attrNameLst>
+                                          <p:attrName>style.visibility</p:attrName>
+                                        </p:attrNameLst>
+                                      </p:cBhvr>
+                                      <p:to>
+                                        <p:strVal val="visible"/>
+                                      </p:to>
+                                    </p:set>
+                                  </p:childTnLst>
+                                </p:cTn>
+                              </p:par>
+                            </p:childTnLst>
+                          </p:cTn>
+                        </p:par>
+                      </p:childTnLst>
+                    </p:cTn>
+                  </p:par>
+                  <p:par>
+                    <p:cTn id="19" fill="hold">
+                      <p:stCondLst>
+                        <p:cond delay="indefinite"/>
+                      </p:stCondLst>
+                      <p:childTnLst>
+                        <p:par>
+                          <p:cTn id="20" fill="hold">
+                            <p:stCondLst>
+                              <p:cond delay="0"/>
+                            </p:stCondLst>
+                            <p:childTnLst>
+                              <p:par>
+                                <p:cTn id="21" presetID="1" presetClass="entr" presetSubtype="0" fill="hold" nodeType="clickEffect">
+                                  <p:stCondLst>
+                                    <p:cond delay="0"/>
+                                  </p:stCondLst>
+                                  <p:childTnLst>
+                                    <p:set>
+                                      <p:cBhvr>
+                                        <p:cTn id="22" dur="1" fill="hold">
+                                          <p:stCondLst>
+                                            <p:cond delay="0"/>
+                                          </p:stCondLst>
+                                        </p:cTn>
+                                        <p:tgtEl>
+                                          <p:spTgt spid="5"/>
+                                        </p:tgtEl>
+                                        <p:attrNameLst>
+                                          <p:attrName>style.visibility</p:attrName>
+                                        </p:attrNameLst>
+                                      </p:cBhvr>
+                                      <p:to>
+                                        <p:strVal val="visible"/>
+                                      </p:to>
+                                    </p:set>
+                                  </p:childTnLst>
+                                </p:cTn>
+                              </p:par>
+                            </p:childTnLst>
+                          </p:cTn>
+                        </p:par>
+                      </p:childTnLst>
+                    </p:cTn>
+                  </p:par>
+                  <p:par>
+                    <p:cTn id="23" fill="hold">
+                      <p:stCondLst>
+                        <p:cond delay="indefinite"/>
+                      </p:stCondLst>
+                      <p:childTnLst>
+                        <p:par>
+                          <p:cTn id="24" fill="hold">
+                            <p:stCondLst>
+                              <p:cond delay="0"/>
+                            </p:stCondLst>
+                            <p:childTnLst>
+                              <p:par>
+                                <p:cTn id="25" presetID="1" presetClass="entr" presetSubtype="0" fill="hold" grpId="0" nodeType="clickEffect">
+                                  <p:stCondLst>
+                                    <p:cond delay="0"/>
+                                  </p:stCondLst>
+                                  <p:childTnLst>
+                                    <p:set>
+                                      <p:cBhvr>
+                                        <p:cTn id="26" dur="1" fill="hold">
+                                          <p:stCondLst>
+                                            <p:cond delay="0"/>
+                                          </p:stCondLst>
+                                        </p:cTn>
+                                        <p:tgtEl>
+                                          <p:spTgt spid="23"/>
+                                        </p:tgtEl>
+                                        <p:attrNameLst>
+                                          <p:attrName>style.visibility</p:attrName>
+                                        </p:attrNameLst>
+                                      </p:cBhvr>
+                                      <p:to>
+                                        <p:strVal val="visible"/>
+                                      </p:to>
+                                    </p:set>
+                                  </p:childTnLst>
+                                </p:cTn>
+                              </p:par>
+                            </p:childTnLst>
+                          </p:cTn>
+                        </p:par>
+                      </p:childTnLst>
+                    </p:cTn>
+                  </p:par>
+                  <p:par>
+                    <p:cTn id="27" fill="hold">
+                      <p:stCondLst>
+                        <p:cond delay="indefinite"/>
+                      </p:stCondLst>
+                      <p:childTnLst>
+                        <p:par>
+                          <p:cTn id="28" fill="hold">
+                            <p:stCondLst>
+                              <p:cond delay="0"/>
+                            </p:stCondLst>
+                            <p:childTnLst>
+                              <p:par>
+                                <p:cTn id="29" presetID="1" presetClass="entr" presetSubtype="0" fill="hold" grpId="0" nodeType="clickEffect">
+                                  <p:stCondLst>
+                                    <p:cond delay="0"/>
+                                  </p:stCondLst>
+                                  <p:childTnLst>
+                                    <p:set>
+                                      <p:cBhvr>
+                                        <p:cTn id="30" dur="1" fill="hold">
+                                          <p:stCondLst>
+                                            <p:cond delay="0"/>
+                                          </p:stCondLst>
+                                        </p:cTn>
+                                        <p:tgtEl>
+                                          <p:spTgt spid="16"/>
+                                        </p:tgtEl>
+                                        <p:attrNameLst>
+                                          <p:attrName>style.visibility</p:attrName>
+                                        </p:attrNameLst>
+                                      </p:cBhvr>
+                                      <p:to>
+                                        <p:strVal val="visible"/>
+                                      </p:to>
+                                    </p:set>
+                                  </p:childTnLst>
+                                </p:cTn>
+                              </p:par>
+                            </p:childTnLst>
+                          </p:cTn>
+                        </p:par>
+                      </p:childTnLst>
+                    </p:cTn>
+                  </p:par>
+                </p:childTnLst>
+              </p:cTn>
+              <p:prevCondLst>
+                <p:cond evt="onPrev" delay="0">
+                  <p:tgtEl>
+                    <p:sldTgt/>
+                  </p:tgtEl>
+                </p:cond>
+              </p:prevCondLst>
+              <p:nextCondLst>
+                <p:cond evt="onNext" delay="0">
+                  <p:tgtEl>
+                    <p:sldTgt/>
+                  </p:tgtEl>
+                </p:cond>
+              </p:nextCondLst>
+            </p:seq>
+          </p:childTnLst>
+        </p:cTn>
+      </p:par>
+    </p:tnLst>
+    <p:bldLst>
+      <p:bldP spid="3" grpId="0" uiExpand="1" build="p"/>
+      <p:bldP spid="23" grpId="0" animBg="1"/>
+      <p:bldP spid="16" grpId="0" animBg="1"/>
+    </p:bldLst>
+  </p:timing>
+</p:sld>
+</file>
+
+<file path=ppt/slides/slide13.xml><?xml version="1.0" encoding="utf-8"?>
+<p:sld xmlns:a="http://schemas.openxmlformats.org/drawingml/2006/main" xmlns:r="http://schemas.openxmlformats.org/officeDocument/2006/relationships" xmlns:p="http://schemas.openxmlformats.org/presentationml/2006/main">
+  <p:cSld>
+    <p:spTree>
+      <p:nvGrpSpPr>
+        <p:cNvPr id="1" name=""/>
+        <p:cNvGrpSpPr/>
+        <p:nvPr/>
+      </p:nvGrpSpPr>
+      <p:grpSpPr>
+        <a:xfrm>
+          <a:off x="0" y="0"/>
+          <a:ext cx="0" cy="0"/>
+          <a:chOff x="0" y="0"/>
+          <a:chExt cx="0" cy="0"/>
+        </a:xfrm>
+      </p:grpSpPr>
+      <p:sp>
+        <p:nvSpPr>
+          <p:cNvPr id="2" name="Title 1"/>
+          <p:cNvSpPr>
+            <a:spLocks noGrp="1"/>
+          </p:cNvSpPr>
+          <p:nvPr>
+            <p:ph type="title"/>
+          </p:nvPr>
+        </p:nvSpPr>
+        <p:spPr/>
+        <p:txBody>
+          <a:bodyPr/>
+          <a:lstStyle/>
+          <a:p>
+            <a:r>
+              <a:rPr lang="en-US" dirty="0" smtClean="0"/>
+              <a:t>Types</a:t>
+            </a:r>
+            <a:endParaRPr lang="en-US" dirty="0"/>
+          </a:p>
+        </p:txBody>
+      </p:sp>
+      <p:sp>
+        <p:nvSpPr>
+          <p:cNvPr id="3" name="Content Placeholder 2"/>
+          <p:cNvSpPr>
+            <a:spLocks noGrp="1"/>
+          </p:cNvSpPr>
+          <p:nvPr>
+            <p:ph idx="1"/>
+          </p:nvPr>
+        </p:nvSpPr>
+        <p:spPr/>
+        <p:txBody>
+          <a:bodyPr>
+            <a:normAutofit fontScale="85000" lnSpcReduction="20000"/>
+          </a:bodyPr>
+          <a:lstStyle/>
+          <a:p>
+            <a:r>
+              <a:rPr lang="en-US" dirty="0" err="1" smtClean="0">
+                <a:latin typeface="Courier New" panose="02070309020205020404" pitchFamily="49" charset="0"/>
+                <a:cs typeface="Courier New" panose="02070309020205020404" pitchFamily="49" charset="0"/>
+              </a:rPr>
+              <a:t>char</a:t>
+            </a:r>
+            <a:r>
+              <a:rPr lang="en-US" dirty="0" smtClean="0"/>
+              <a:t>: character, e.g., </a:t>
+            </a:r>
+            <a:r>
+              <a:rPr lang="en-US" dirty="0" smtClean="0">
+                <a:latin typeface="Courier New" panose="02070309020205020404" pitchFamily="49" charset="0"/>
+                <a:cs typeface="Courier New" panose="02070309020205020404" pitchFamily="49" charset="0"/>
+              </a:rPr>
+              <a:t>'a'</a:t>
+            </a:r>
+            <a:r>
+              <a:rPr lang="en-US" dirty="0" smtClean="0"/>
+              <a:t>, </a:t>
+            </a:r>
+            <a:r>
+              <a:rPr lang="en-US" dirty="0" smtClean="0">
+                <a:latin typeface="Courier New" panose="02070309020205020404" pitchFamily="49" charset="0"/>
+                <a:cs typeface="Courier New" panose="02070309020205020404" pitchFamily="49" charset="0"/>
+              </a:rPr>
+              <a:t>'7'</a:t>
+            </a:r>
+            <a:r>
+              <a:rPr lang="en-US" dirty="0" smtClean="0"/>
+              <a:t>, </a:t>
+            </a:r>
+            <a:r>
+              <a:rPr lang="en-US" dirty="0" smtClean="0">
+                <a:latin typeface="Courier New" panose="02070309020205020404" pitchFamily="49" charset="0"/>
+                <a:cs typeface="Courier New" panose="02070309020205020404" pitchFamily="49" charset="0"/>
+              </a:rPr>
+              <a:t>'\n'</a:t>
+            </a:r>
+          </a:p>
+          <a:p>
+            <a:r>
+              <a:rPr lang="en-US" dirty="0" smtClean="0">
+                <a:latin typeface="Courier New" panose="02070309020205020404" pitchFamily="49" charset="0"/>
+                <a:cs typeface="Courier New" panose="02070309020205020404" pitchFamily="49" charset="0"/>
+              </a:rPr>
+              <a:t>string: </a:t>
+            </a:r>
+            <a:r>
+              <a:rPr lang="en-US" dirty="0" smtClean="0">
+                <a:cs typeface="Courier New" panose="02070309020205020404" pitchFamily="49" charset="0"/>
+              </a:rPr>
+              <a:t>character sequence, e.g., </a:t>
+            </a:r>
+            <a:r>
+              <a:rPr lang="en-US" dirty="0" smtClean="0">
+                <a:latin typeface="Courier New" panose="02070309020205020404" pitchFamily="49" charset="0"/>
+                <a:cs typeface="Courier New" panose="02070309020205020404" pitchFamily="49" charset="0"/>
+              </a:rPr>
+              <a:t>"hello", ""</a:t>
+            </a:r>
+          </a:p>
+          <a:p>
+            <a:r>
+              <a:rPr lang="en-US" dirty="0" err="1" smtClean="0">
+                <a:latin typeface="Courier New" panose="02070309020205020404" pitchFamily="49" charset="0"/>
+                <a:cs typeface="Courier New" panose="02070309020205020404" pitchFamily="49" charset="0"/>
+              </a:rPr>
+              <a:t>int</a:t>
+            </a:r>
+            <a:r>
+              <a:rPr lang="en-US" dirty="0" smtClean="0"/>
+              <a:t>: integer number, e.g., </a:t>
+            </a:r>
+            <a:r>
+              <a:rPr lang="en-US" dirty="0" smtClean="0">
+                <a:latin typeface="Courier New" panose="02070309020205020404" pitchFamily="49" charset="0"/>
+                <a:cs typeface="Courier New" panose="02070309020205020404" pitchFamily="49" charset="0"/>
+              </a:rPr>
+              <a:t>7</a:t>
+            </a:r>
+            <a:r>
+              <a:rPr lang="en-US" dirty="0" smtClean="0"/>
+              <a:t>, </a:t>
+            </a:r>
+            <a:r>
+              <a:rPr lang="en-US" dirty="0" smtClean="0">
+                <a:latin typeface="Courier New" panose="02070309020205020404" pitchFamily="49" charset="0"/>
+                <a:cs typeface="Courier New" panose="02070309020205020404" pitchFamily="49" charset="0"/>
+              </a:rPr>
+              <a:t>-15</a:t>
+            </a:r>
+            <a:r>
+              <a:rPr lang="en-US" dirty="0" smtClean="0"/>
+              <a:t>, </a:t>
+            </a:r>
+            <a:r>
+              <a:rPr lang="en-US" dirty="0" smtClean="0">
+                <a:latin typeface="Courier New" panose="02070309020205020404" pitchFamily="49" charset="0"/>
+                <a:cs typeface="Courier New" panose="02070309020205020404" pitchFamily="49" charset="0"/>
+              </a:rPr>
+              <a:t>1034</a:t>
+            </a:r>
+          </a:p>
+          <a:p>
+            <a:r>
+              <a:rPr lang="en-US" dirty="0" smtClean="0">
+                <a:latin typeface="Courier New" panose="02070309020205020404" pitchFamily="49" charset="0"/>
+                <a:cs typeface="Courier New" panose="02070309020205020404" pitchFamily="49" charset="0"/>
+              </a:rPr>
+              <a:t>float</a:t>
+            </a:r>
+            <a:r>
+              <a:rPr lang="en-US" dirty="0" smtClean="0"/>
+              <a:t>: single precision floating point number,</a:t>
+            </a:r>
+            <a:br>
+              <a:rPr lang="en-US" dirty="0" smtClean="0"/>
+            </a:br>
+            <a:r>
+              <a:rPr lang="en-US" dirty="0" smtClean="0"/>
+              <a:t>e.g., </a:t>
+            </a:r>
+            <a:r>
+              <a:rPr lang="en-US" dirty="0" smtClean="0">
+                <a:latin typeface="Courier New" panose="02070309020205020404" pitchFamily="49" charset="0"/>
+                <a:cs typeface="Courier New" panose="02070309020205020404" pitchFamily="49" charset="0"/>
+              </a:rPr>
+              <a:t>7.0</a:t>
+            </a:r>
+            <a:r>
+              <a:rPr lang="en-US" dirty="0" smtClean="0"/>
+              <a:t>, </a:t>
+            </a:r>
+            <a:r>
+              <a:rPr lang="en-US" dirty="0" smtClean="0">
+                <a:latin typeface="Courier New" panose="02070309020205020404" pitchFamily="49" charset="0"/>
+                <a:cs typeface="Courier New" panose="02070309020205020404" pitchFamily="49" charset="0"/>
+              </a:rPr>
+              <a:t>-0.531</a:t>
+            </a:r>
+            <a:r>
+              <a:rPr lang="en-US" dirty="0" smtClean="0"/>
+              <a:t>, </a:t>
+            </a:r>
+            <a:r>
+              <a:rPr lang="en-US" dirty="0" smtClean="0">
+                <a:latin typeface="Courier New" panose="02070309020205020404" pitchFamily="49" charset="0"/>
+                <a:cs typeface="Courier New" panose="02070309020205020404" pitchFamily="49" charset="0"/>
+              </a:rPr>
+              <a:t>1.37e-3</a:t>
+            </a:r>
+          </a:p>
+          <a:p>
+            <a:pPr lvl="1"/>
+            <a:r>
+              <a:rPr lang="en-US" dirty="0" smtClean="0"/>
+              <a:t>4 byte representation</a:t>
+            </a:r>
+          </a:p>
+          <a:p>
+            <a:pPr lvl="1"/>
+            <a:r>
+              <a:rPr lang="en-US" dirty="0" smtClean="0"/>
+              <a:t>7 significant digits, smallest non-zero: 10</a:t>
+            </a:r>
+            <a:r>
+              <a:rPr lang="en-US" baseline="30000" dirty="0" smtClean="0"/>
+              <a:t>-38</a:t>
+            </a:r>
+            <a:endParaRPr lang="en-US" dirty="0" smtClean="0"/>
+          </a:p>
+          <a:p>
+            <a:pPr lvl="1"/>
+            <a:r>
+              <a:rPr lang="en-US" dirty="0" smtClean="0"/>
+              <a:t>range </a:t>
+            </a:r>
+            <a:r>
+              <a:rPr lang="en-US" dirty="0" smtClean="0">
+                <a:sym typeface="Symbol" panose="05050102010706020507" pitchFamily="18" charset="2"/>
+              </a:rPr>
+              <a:t></a:t>
+            </a:r>
+            <a:r>
+              <a:rPr lang="en-US" dirty="0" smtClean="0"/>
+              <a:t> [-10</a:t>
+            </a:r>
+            <a:r>
+              <a:rPr lang="en-US" baseline="30000" dirty="0" smtClean="0"/>
+              <a:t>38</a:t>
+            </a:r>
+            <a:r>
+              <a:rPr lang="en-US" dirty="0" smtClean="0"/>
+              <a:t>, 10</a:t>
+            </a:r>
+            <a:r>
+              <a:rPr lang="en-US" baseline="30000" dirty="0" smtClean="0"/>
+              <a:t>38</a:t>
+            </a:r>
+            <a:r>
+              <a:rPr lang="en-US" dirty="0" smtClean="0"/>
+              <a:t>]</a:t>
+            </a:r>
+          </a:p>
+          <a:p>
+            <a:r>
+              <a:rPr lang="en-US" dirty="0" smtClean="0">
+                <a:latin typeface="Courier New" panose="02070309020205020404" pitchFamily="49" charset="0"/>
+                <a:cs typeface="Courier New" panose="02070309020205020404" pitchFamily="49" charset="0"/>
+              </a:rPr>
+              <a:t>double</a:t>
+            </a:r>
+            <a:r>
+              <a:rPr lang="en-US" dirty="0" smtClean="0"/>
+              <a:t>: double precision floating point number</a:t>
+            </a:r>
+          </a:p>
+          <a:p>
+            <a:pPr lvl="1"/>
+            <a:r>
+              <a:rPr lang="en-US" dirty="0" smtClean="0"/>
+              <a:t>8 byte representation</a:t>
+            </a:r>
+          </a:p>
+          <a:p>
+            <a:pPr lvl="1"/>
+            <a:r>
+              <a:rPr lang="en-US" dirty="0" smtClean="0"/>
+              <a:t>15 significant digits</a:t>
+            </a:r>
+            <a:r>
+              <a:rPr lang="en-US" dirty="0"/>
+              <a:t> , smallest non-zero: </a:t>
+            </a:r>
+            <a:r>
+              <a:rPr lang="en-US" dirty="0" smtClean="0"/>
+              <a:t>10</a:t>
+            </a:r>
+            <a:r>
+              <a:rPr lang="en-US" baseline="30000" dirty="0" smtClean="0"/>
+              <a:t>-312</a:t>
+            </a:r>
+            <a:endParaRPr lang="en-US" dirty="0" smtClean="0"/>
+          </a:p>
+          <a:p>
+            <a:pPr lvl="1"/>
+            <a:r>
+              <a:rPr lang="en-US" dirty="0" smtClean="0"/>
+              <a:t>range </a:t>
+            </a:r>
+            <a:r>
+              <a:rPr lang="en-US" dirty="0"/>
+              <a:t> </a:t>
+            </a:r>
+            <a:r>
+              <a:rPr lang="en-US" dirty="0">
+                <a:sym typeface="Symbol" panose="05050102010706020507" pitchFamily="18" charset="2"/>
+              </a:rPr>
+              <a:t></a:t>
+            </a:r>
+            <a:r>
+              <a:rPr lang="en-US" dirty="0"/>
+              <a:t> [-</a:t>
+            </a:r>
+            <a:r>
+              <a:rPr lang="en-US" dirty="0" smtClean="0"/>
+              <a:t>10</a:t>
+            </a:r>
+            <a:r>
+              <a:rPr lang="en-US" baseline="30000" dirty="0" smtClean="0"/>
+              <a:t>312</a:t>
+            </a:r>
+            <a:r>
+              <a:rPr lang="en-US" dirty="0" smtClean="0"/>
+              <a:t>, 1e</a:t>
+            </a:r>
+            <a:r>
+              <a:rPr lang="en-US" baseline="30000" dirty="0" smtClean="0"/>
+              <a:t>312</a:t>
+            </a:r>
+            <a:r>
+              <a:rPr lang="en-US" dirty="0" smtClean="0"/>
+              <a:t>]</a:t>
+            </a:r>
+          </a:p>
+          <a:p>
+            <a:r>
+              <a:rPr lang="en-US" dirty="0" smtClean="0">
+                <a:latin typeface="Courier New" panose="02070309020205020404" pitchFamily="49" charset="0"/>
+                <a:cs typeface="Courier New" panose="02070309020205020404" pitchFamily="49" charset="0"/>
+              </a:rPr>
+              <a:t>bool</a:t>
+            </a:r>
+            <a:r>
+              <a:rPr lang="en-US" dirty="0" smtClean="0"/>
+              <a:t>: Boolean value, i.e., </a:t>
+            </a:r>
+            <a:r>
+              <a:rPr lang="en-US" dirty="0" smtClean="0">
+                <a:latin typeface="Courier New" panose="02070309020205020404" pitchFamily="49" charset="0"/>
+                <a:cs typeface="Courier New" panose="02070309020205020404" pitchFamily="49" charset="0"/>
+              </a:rPr>
+              <a:t>true</a:t>
+            </a:r>
+            <a:r>
+              <a:rPr lang="en-US" dirty="0" smtClean="0"/>
+              <a:t>, </a:t>
+            </a:r>
+            <a:r>
+              <a:rPr lang="en-US" dirty="0" smtClean="0">
+                <a:latin typeface="Courier New" panose="02070309020205020404" pitchFamily="49" charset="0"/>
+                <a:cs typeface="Courier New" panose="02070309020205020404" pitchFamily="49" charset="0"/>
+              </a:rPr>
+              <a:t>false</a:t>
+            </a:r>
+          </a:p>
+        </p:txBody>
+      </p:sp>
+      <p:sp>
+        <p:nvSpPr>
+          <p:cNvPr id="4" name="Slide Number Placeholder 3"/>
+          <p:cNvSpPr>
+            <a:spLocks noGrp="1"/>
+          </p:cNvSpPr>
+          <p:nvPr>
+            <p:ph type="sldNum" sz="quarter" idx="12"/>
+          </p:nvPr>
+        </p:nvSpPr>
+        <p:spPr/>
+        <p:txBody>
+          <a:bodyPr/>
+          <a:lstStyle/>
+          <a:p>
+            <a:fld id="{033373DF-BCDA-4600-B448-AFBDB22F4A39}" type="slidenum">
+              <a:rPr lang="en-US" smtClean="0"/>
+              <a:t>13</a:t>
+            </a:fld>
+            <a:endParaRPr lang="en-US"/>
+          </a:p>
+        </p:txBody>
+      </p:sp>
+    </p:spTree>
+    <p:extLst>
+      <p:ext uri="{BB962C8B-B14F-4D97-AF65-F5344CB8AC3E}">
+        <p14:creationId xmlns:p14="http://schemas.microsoft.com/office/powerpoint/2010/main" val="3792402471"/>
+      </p:ext>
+    </p:extLst>
+  </p:cSld>
+  <p:clrMapOvr>
+    <a:masterClrMapping/>
+  </p:clrMapOvr>
+  <p:timing>
+    <p:tnLst>
+      <p:par>
         <p:cTn id="1" dur="indefinite" restart="never" nodeType="tmRoot"/>
       </p:par>
     </p:tnLst>
+  </p:timing>
+</p:sld>
+</file>
+
+<file path=ppt/slides/slide14.xml><?xml version="1.0" encoding="utf-8"?>
+<p:sld xmlns:a="http://schemas.openxmlformats.org/drawingml/2006/main" xmlns:r="http://schemas.openxmlformats.org/officeDocument/2006/relationships" xmlns:p="http://schemas.openxmlformats.org/presentationml/2006/main">
+  <p:cSld>
+    <p:spTree>
+      <p:nvGrpSpPr>
+        <p:cNvPr id="1" name=""/>
+        <p:cNvGrpSpPr/>
+        <p:nvPr/>
+      </p:nvGrpSpPr>
+      <p:grpSpPr>
+        <a:xfrm>
+          <a:off x="0" y="0"/>
+          <a:ext cx="0" cy="0"/>
+          <a:chOff x="0" y="0"/>
+          <a:chExt cx="0" cy="0"/>
+        </a:xfrm>
+      </p:grpSpPr>
+      <p:sp>
+        <p:nvSpPr>
+          <p:cNvPr id="2" name="Title 1"/>
+          <p:cNvSpPr>
+            <a:spLocks noGrp="1"/>
+          </p:cNvSpPr>
+          <p:nvPr>
+            <p:ph type="title"/>
+          </p:nvPr>
+        </p:nvSpPr>
+        <p:spPr/>
+        <p:txBody>
+          <a:bodyPr/>
+          <a:lstStyle/>
+          <a:p>
+            <a:r>
+              <a:rPr lang="en-US" dirty="0" smtClean="0"/>
+              <a:t>Operators &amp; math functions</a:t>
+            </a:r>
+            <a:endParaRPr lang="en-US" dirty="0"/>
+          </a:p>
+        </p:txBody>
+      </p:sp>
+      <p:sp>
+        <p:nvSpPr>
+          <p:cNvPr id="3" name="Content Placeholder 2"/>
+          <p:cNvSpPr>
+            <a:spLocks noGrp="1"/>
+          </p:cNvSpPr>
+          <p:nvPr>
+            <p:ph idx="1"/>
+          </p:nvPr>
+        </p:nvSpPr>
+        <p:spPr/>
+        <p:txBody>
+          <a:bodyPr>
+            <a:normAutofit lnSpcReduction="10000"/>
+          </a:bodyPr>
+          <a:lstStyle/>
+          <a:p>
+            <a:r>
+              <a:rPr lang="en-US" dirty="0" err="1" smtClean="0">
+                <a:latin typeface="Courier New" panose="02070309020205020404" pitchFamily="49" charset="0"/>
+                <a:cs typeface="Courier New" panose="02070309020205020404" pitchFamily="49" charset="0"/>
+              </a:rPr>
+              <a:t>int</a:t>
+            </a:r>
+            <a:r>
+              <a:rPr lang="en-US" dirty="0" smtClean="0"/>
+              <a:t>, </a:t>
+            </a:r>
+            <a:r>
+              <a:rPr lang="en-US" dirty="0" smtClean="0">
+                <a:latin typeface="Courier New" panose="02070309020205020404" pitchFamily="49" charset="0"/>
+                <a:cs typeface="Courier New" panose="02070309020205020404" pitchFamily="49" charset="0"/>
+              </a:rPr>
+              <a:t>float</a:t>
+            </a:r>
+            <a:r>
+              <a:rPr lang="en-US" dirty="0" smtClean="0"/>
+              <a:t>, </a:t>
+            </a:r>
+            <a:r>
+              <a:rPr lang="en-US" dirty="0" smtClean="0">
+                <a:latin typeface="Courier New" panose="02070309020205020404" pitchFamily="49" charset="0"/>
+                <a:cs typeface="Courier New" panose="02070309020205020404" pitchFamily="49" charset="0"/>
+              </a:rPr>
+              <a:t>double</a:t>
+            </a:r>
+            <a:r>
+              <a:rPr lang="en-US" dirty="0" smtClean="0"/>
+              <a:t>: </a:t>
+            </a:r>
+            <a:r>
+              <a:rPr lang="en-US" dirty="0" smtClean="0">
+                <a:latin typeface="Courier New" panose="02070309020205020404" pitchFamily="49" charset="0"/>
+                <a:cs typeface="Courier New" panose="02070309020205020404" pitchFamily="49" charset="0"/>
+              </a:rPr>
+              <a:t>+</a:t>
+            </a:r>
+            <a:r>
+              <a:rPr lang="en-US" dirty="0" smtClean="0"/>
+              <a:t>, </a:t>
+            </a:r>
+            <a:r>
+              <a:rPr lang="en-US" dirty="0" smtClean="0">
+                <a:latin typeface="Courier New" panose="02070309020205020404" pitchFamily="49" charset="0"/>
+                <a:cs typeface="Courier New" panose="02070309020205020404" pitchFamily="49" charset="0"/>
+              </a:rPr>
+              <a:t>-</a:t>
+            </a:r>
+            <a:r>
+              <a:rPr lang="en-US" dirty="0" smtClean="0"/>
+              <a:t>, </a:t>
+            </a:r>
+            <a:r>
+              <a:rPr lang="en-US" dirty="0" smtClean="0">
+                <a:latin typeface="Courier New" panose="02070309020205020404" pitchFamily="49" charset="0"/>
+                <a:cs typeface="Courier New" panose="02070309020205020404" pitchFamily="49" charset="0"/>
+              </a:rPr>
+              <a:t>*</a:t>
+            </a:r>
+            <a:r>
+              <a:rPr lang="en-US" dirty="0" smtClean="0"/>
+              <a:t>, </a:t>
+            </a:r>
+            <a:r>
+              <a:rPr lang="en-US" dirty="0" smtClean="0">
+                <a:latin typeface="Courier New" panose="02070309020205020404" pitchFamily="49" charset="0"/>
+                <a:cs typeface="Courier New" panose="02070309020205020404" pitchFamily="49" charset="0"/>
+              </a:rPr>
+              <a:t>/</a:t>
+            </a:r>
+          </a:p>
+          <a:p>
+            <a:r>
+              <a:rPr lang="en-US" dirty="0" smtClean="0">
+                <a:latin typeface="Courier New" panose="02070309020205020404" pitchFamily="49" charset="0"/>
+                <a:cs typeface="Courier New" panose="02070309020205020404" pitchFamily="49" charset="0"/>
+              </a:rPr>
+              <a:t>bool</a:t>
+            </a:r>
+            <a:r>
+              <a:rPr lang="en-US" dirty="0" smtClean="0"/>
+              <a:t>: </a:t>
+            </a:r>
+            <a:r>
+              <a:rPr lang="en-US" dirty="0" smtClean="0">
+                <a:latin typeface="Courier New" panose="02070309020205020404" pitchFamily="49" charset="0"/>
+                <a:cs typeface="Courier New" panose="02070309020205020404" pitchFamily="49" charset="0"/>
+              </a:rPr>
+              <a:t>&amp;&amp;</a:t>
+            </a:r>
+            <a:r>
+              <a:rPr lang="en-US" dirty="0" smtClean="0"/>
+              <a:t> (and), </a:t>
+            </a:r>
+            <a:r>
+              <a:rPr lang="en-US" dirty="0" smtClean="0">
+                <a:latin typeface="Courier New" panose="02070309020205020404" pitchFamily="49" charset="0"/>
+                <a:cs typeface="Courier New" panose="02070309020205020404" pitchFamily="49" charset="0"/>
+              </a:rPr>
+              <a:t>||</a:t>
+            </a:r>
+            <a:r>
+              <a:rPr lang="en-US" dirty="0" smtClean="0"/>
+              <a:t> (or), </a:t>
+            </a:r>
+            <a:r>
+              <a:rPr lang="en-US" dirty="0" smtClean="0">
+                <a:latin typeface="Courier New" panose="02070309020205020404" pitchFamily="49" charset="0"/>
+                <a:cs typeface="Courier New" panose="02070309020205020404" pitchFamily="49" charset="0"/>
+              </a:rPr>
+              <a:t>!</a:t>
+            </a:r>
+            <a:r>
+              <a:rPr lang="en-US" dirty="0" smtClean="0"/>
+              <a:t> (not)</a:t>
+            </a:r>
+          </a:p>
+          <a:p>
+            <a:r>
+              <a:rPr lang="en-US" dirty="0"/>
+              <a:t>C</a:t>
+            </a:r>
+            <a:r>
+              <a:rPr lang="en-US" dirty="0" smtClean="0"/>
+              <a:t>omparison</a:t>
+            </a:r>
+          </a:p>
+          <a:p>
+            <a:pPr lvl="1"/>
+            <a:r>
+              <a:rPr lang="en-US" dirty="0" smtClean="0">
+                <a:latin typeface="Courier New" panose="02070309020205020404" pitchFamily="49" charset="0"/>
+                <a:cs typeface="Courier New" panose="02070309020205020404" pitchFamily="49" charset="0"/>
+              </a:rPr>
+              <a:t>char</a:t>
+            </a:r>
+            <a:r>
+              <a:rPr lang="en-US" dirty="0" smtClean="0"/>
+              <a:t>, </a:t>
+            </a:r>
+            <a:r>
+              <a:rPr lang="en-US" dirty="0" smtClean="0">
+                <a:latin typeface="Courier New" panose="02070309020205020404" pitchFamily="49" charset="0"/>
+                <a:cs typeface="Courier New" panose="02070309020205020404" pitchFamily="49" charset="0"/>
+              </a:rPr>
+              <a:t>string</a:t>
+            </a:r>
+            <a:r>
+              <a:rPr lang="en-US" dirty="0" smtClean="0"/>
+              <a:t>, </a:t>
+            </a:r>
+            <a:r>
+              <a:rPr lang="en-US" dirty="0" err="1" smtClean="0">
+                <a:latin typeface="Courier New" panose="02070309020205020404" pitchFamily="49" charset="0"/>
+                <a:cs typeface="Courier New" panose="02070309020205020404" pitchFamily="49" charset="0"/>
+              </a:rPr>
+              <a:t>int</a:t>
+            </a:r>
+            <a:r>
+              <a:rPr lang="en-US" dirty="0" smtClean="0"/>
+              <a:t>: </a:t>
+            </a:r>
+            <a:r>
+              <a:rPr lang="en-US" dirty="0" smtClean="0">
+                <a:latin typeface="Courier New" panose="02070309020205020404" pitchFamily="49" charset="0"/>
+                <a:cs typeface="Courier New" panose="02070309020205020404" pitchFamily="49" charset="0"/>
+              </a:rPr>
+              <a:t>==</a:t>
+            </a:r>
+            <a:r>
+              <a:rPr lang="en-US" dirty="0" smtClean="0"/>
+              <a:t>, </a:t>
+            </a:r>
+            <a:r>
+              <a:rPr lang="en-US" dirty="0" smtClean="0">
+                <a:latin typeface="Courier New" panose="02070309020205020404" pitchFamily="49" charset="0"/>
+                <a:cs typeface="Courier New" panose="02070309020205020404" pitchFamily="49" charset="0"/>
+              </a:rPr>
+              <a:t>!=</a:t>
+            </a:r>
+            <a:r>
+              <a:rPr lang="en-US" dirty="0" smtClean="0"/>
+              <a:t>, </a:t>
+            </a:r>
+            <a:r>
+              <a:rPr lang="en-US" dirty="0" smtClean="0">
+                <a:latin typeface="Courier New" panose="02070309020205020404" pitchFamily="49" charset="0"/>
+                <a:cs typeface="Courier New" panose="02070309020205020404" pitchFamily="49" charset="0"/>
+              </a:rPr>
+              <a:t>&lt;</a:t>
+            </a:r>
+            <a:r>
+              <a:rPr lang="en-US" dirty="0" smtClean="0"/>
+              <a:t>, </a:t>
+            </a:r>
+            <a:r>
+              <a:rPr lang="en-US" dirty="0" smtClean="0">
+                <a:latin typeface="Courier New" panose="02070309020205020404" pitchFamily="49" charset="0"/>
+                <a:cs typeface="Courier New" panose="02070309020205020404" pitchFamily="49" charset="0"/>
+              </a:rPr>
+              <a:t>&lt;=</a:t>
+            </a:r>
+            <a:r>
+              <a:rPr lang="en-US" dirty="0" smtClean="0"/>
+              <a:t>, </a:t>
+            </a:r>
+            <a:r>
+              <a:rPr lang="en-US" dirty="0" smtClean="0">
+                <a:latin typeface="Courier New" panose="02070309020205020404" pitchFamily="49" charset="0"/>
+                <a:cs typeface="Courier New" panose="02070309020205020404" pitchFamily="49" charset="0"/>
+              </a:rPr>
+              <a:t>&gt;</a:t>
+            </a:r>
+            <a:r>
+              <a:rPr lang="en-US" dirty="0" smtClean="0"/>
+              <a:t>, </a:t>
+            </a:r>
+            <a:r>
+              <a:rPr lang="en-US" dirty="0" smtClean="0">
+                <a:latin typeface="Courier New" panose="02070309020205020404" pitchFamily="49" charset="0"/>
+                <a:cs typeface="Courier New" panose="02070309020205020404" pitchFamily="49" charset="0"/>
+              </a:rPr>
+              <a:t>&gt;=</a:t>
+            </a:r>
+          </a:p>
+          <a:p>
+            <a:pPr lvl="1"/>
+            <a:r>
+              <a:rPr lang="en-US" dirty="0" smtClean="0">
+                <a:latin typeface="Courier New" panose="02070309020205020404" pitchFamily="49" charset="0"/>
+                <a:cs typeface="Courier New" panose="02070309020205020404" pitchFamily="49" charset="0"/>
+              </a:rPr>
+              <a:t>float</a:t>
+            </a:r>
+            <a:r>
+              <a:rPr lang="en-US" dirty="0" smtClean="0"/>
+              <a:t>, </a:t>
+            </a:r>
+            <a:r>
+              <a:rPr lang="en-US" dirty="0" smtClean="0">
+                <a:latin typeface="Courier New" panose="02070309020205020404" pitchFamily="49" charset="0"/>
+                <a:cs typeface="Courier New" panose="02070309020205020404" pitchFamily="49" charset="0"/>
+              </a:rPr>
+              <a:t>double</a:t>
+            </a:r>
+            <a:r>
+              <a:rPr lang="en-US" dirty="0" smtClean="0"/>
+              <a:t>: </a:t>
+            </a:r>
+            <a:r>
+              <a:rPr lang="en-US" dirty="0" smtClean="0">
+                <a:latin typeface="Courier New" panose="02070309020205020404" pitchFamily="49" charset="0"/>
+                <a:cs typeface="Courier New" panose="02070309020205020404" pitchFamily="49" charset="0"/>
+              </a:rPr>
+              <a:t>&lt;</a:t>
+            </a:r>
+            <a:r>
+              <a:rPr lang="en-US" dirty="0" smtClean="0"/>
+              <a:t>, </a:t>
+            </a:r>
+            <a:r>
+              <a:rPr lang="en-US" dirty="0" smtClean="0">
+                <a:latin typeface="Courier New" panose="02070309020205020404" pitchFamily="49" charset="0"/>
+                <a:cs typeface="Courier New" panose="02070309020205020404" pitchFamily="49" charset="0"/>
+              </a:rPr>
+              <a:t>&lt;=</a:t>
+            </a:r>
+            <a:r>
+              <a:rPr lang="en-US" dirty="0" smtClean="0"/>
+              <a:t>, </a:t>
+            </a:r>
+            <a:r>
+              <a:rPr lang="en-US" dirty="0" smtClean="0">
+                <a:latin typeface="Courier New" panose="02070309020205020404" pitchFamily="49" charset="0"/>
+                <a:cs typeface="Courier New" panose="02070309020205020404" pitchFamily="49" charset="0"/>
+              </a:rPr>
+              <a:t>&gt;</a:t>
+            </a:r>
+            <a:r>
+              <a:rPr lang="en-US" dirty="0" smtClean="0"/>
+              <a:t>, </a:t>
+            </a:r>
+            <a:r>
+              <a:rPr lang="en-US" dirty="0" smtClean="0">
+                <a:latin typeface="Courier New" panose="02070309020205020404" pitchFamily="49" charset="0"/>
+                <a:cs typeface="Courier New" panose="02070309020205020404" pitchFamily="49" charset="0"/>
+              </a:rPr>
+              <a:t>&gt;=</a:t>
+            </a:r>
+          </a:p>
+          <a:p>
+            <a:pPr lvl="1"/>
+            <a:endParaRPr lang="en-US" dirty="0">
+              <a:latin typeface="Courier New" panose="02070309020205020404" pitchFamily="49" charset="0"/>
+              <a:cs typeface="Courier New" panose="02070309020205020404" pitchFamily="49" charset="0"/>
+            </a:endParaRPr>
+          </a:p>
+          <a:p>
+            <a:pPr lvl="1"/>
+            <a:endParaRPr lang="en-US" dirty="0" smtClean="0">
+              <a:latin typeface="Courier New" panose="02070309020205020404" pitchFamily="49" charset="0"/>
+              <a:cs typeface="Courier New" panose="02070309020205020404" pitchFamily="49" charset="0"/>
+            </a:endParaRPr>
+          </a:p>
+          <a:p>
+            <a:r>
+              <a:rPr lang="en-US" dirty="0" smtClean="0">
+                <a:cs typeface="Courier New" panose="02070309020205020404" pitchFamily="49" charset="0"/>
+              </a:rPr>
+              <a:t>Mathematical functions</a:t>
+            </a:r>
+          </a:p>
+          <a:p>
+            <a:pPr lvl="1"/>
+            <a:r>
+              <a:rPr lang="en-US" dirty="0" smtClean="0">
+                <a:latin typeface="Courier New" panose="02070309020205020404" pitchFamily="49" charset="0"/>
+                <a:cs typeface="Courier New" panose="02070309020205020404" pitchFamily="49" charset="0"/>
+              </a:rPr>
+              <a:t>#include &lt;math&gt;</a:t>
+            </a:r>
+          </a:p>
+          <a:p>
+            <a:pPr lvl="1"/>
+            <a:r>
+              <a:rPr lang="en-US" dirty="0" smtClean="0">
+                <a:cs typeface="Courier New" panose="02070309020205020404" pitchFamily="49" charset="0"/>
+              </a:rPr>
+              <a:t>e.g., </a:t>
+            </a:r>
+            <a:r>
+              <a:rPr lang="en-US" dirty="0" smtClean="0">
+                <a:latin typeface="Courier New" panose="02070309020205020404" pitchFamily="49" charset="0"/>
+                <a:cs typeface="Courier New" panose="02070309020205020404" pitchFamily="49" charset="0"/>
+              </a:rPr>
+              <a:t>sin</a:t>
+            </a:r>
+            <a:r>
+              <a:rPr lang="en-US" dirty="0" smtClean="0">
+                <a:cs typeface="Courier New" panose="02070309020205020404" pitchFamily="49" charset="0"/>
+              </a:rPr>
+              <a:t>, </a:t>
+            </a:r>
+            <a:r>
+              <a:rPr lang="en-US" dirty="0" smtClean="0">
+                <a:latin typeface="Courier New" panose="02070309020205020404" pitchFamily="49" charset="0"/>
+                <a:cs typeface="Courier New" panose="02070309020205020404" pitchFamily="49" charset="0"/>
+              </a:rPr>
+              <a:t>cos</a:t>
+            </a:r>
+            <a:r>
+              <a:rPr lang="en-US" dirty="0" smtClean="0">
+                <a:cs typeface="Courier New" panose="02070309020205020404" pitchFamily="49" charset="0"/>
+              </a:rPr>
+              <a:t>, </a:t>
+            </a:r>
+            <a:r>
+              <a:rPr lang="en-US" dirty="0" smtClean="0">
+                <a:latin typeface="Courier New" panose="02070309020205020404" pitchFamily="49" charset="0"/>
+                <a:cs typeface="Courier New" panose="02070309020205020404" pitchFamily="49" charset="0"/>
+              </a:rPr>
+              <a:t>tan</a:t>
+            </a:r>
+            <a:r>
+              <a:rPr lang="en-US" dirty="0" smtClean="0">
+                <a:cs typeface="Courier New" panose="02070309020205020404" pitchFamily="49" charset="0"/>
+              </a:rPr>
+              <a:t>, </a:t>
+            </a:r>
+            <a:r>
+              <a:rPr lang="en-US" dirty="0" err="1" smtClean="0">
+                <a:latin typeface="Courier New" panose="02070309020205020404" pitchFamily="49" charset="0"/>
+                <a:cs typeface="Courier New" panose="02070309020205020404" pitchFamily="49" charset="0"/>
+              </a:rPr>
+              <a:t>exp</a:t>
+            </a:r>
+            <a:r>
+              <a:rPr lang="en-US" dirty="0" smtClean="0">
+                <a:cs typeface="Courier New" panose="02070309020205020404" pitchFamily="49" charset="0"/>
+              </a:rPr>
+              <a:t>, </a:t>
+            </a:r>
+            <a:r>
+              <a:rPr lang="en-US" dirty="0" smtClean="0">
+                <a:latin typeface="Courier New" panose="02070309020205020404" pitchFamily="49" charset="0"/>
+                <a:cs typeface="Courier New" panose="02070309020205020404" pitchFamily="49" charset="0"/>
+              </a:rPr>
+              <a:t>log</a:t>
+            </a:r>
+            <a:r>
+              <a:rPr lang="en-US" dirty="0" smtClean="0">
+                <a:cs typeface="Courier New" panose="02070309020205020404" pitchFamily="49" charset="0"/>
+              </a:rPr>
+              <a:t>, </a:t>
+            </a:r>
+            <a:r>
+              <a:rPr lang="en-US" dirty="0" err="1" smtClean="0">
+                <a:latin typeface="Courier New" panose="02070309020205020404" pitchFamily="49" charset="0"/>
+                <a:cs typeface="Courier New" panose="02070309020205020404" pitchFamily="49" charset="0"/>
+              </a:rPr>
+              <a:t>sqrt</a:t>
+            </a:r>
+            <a:r>
+              <a:rPr lang="en-US" dirty="0" smtClean="0">
+                <a:cs typeface="Courier New" panose="02070309020205020404" pitchFamily="49" charset="0"/>
+              </a:rPr>
+              <a:t>,…</a:t>
+            </a:r>
+            <a:endParaRPr lang="en-US" dirty="0">
+              <a:cs typeface="Courier New" panose="02070309020205020404" pitchFamily="49" charset="0"/>
+            </a:endParaRPr>
+          </a:p>
+        </p:txBody>
+      </p:sp>
+      <p:sp>
+        <p:nvSpPr>
+          <p:cNvPr id="4" name="Slide Number Placeholder 3"/>
+          <p:cNvSpPr>
+            <a:spLocks noGrp="1"/>
+          </p:cNvSpPr>
+          <p:nvPr>
+            <p:ph type="sldNum" sz="quarter" idx="12"/>
+          </p:nvPr>
+        </p:nvSpPr>
+        <p:spPr/>
+        <p:txBody>
+          <a:bodyPr/>
+          <a:lstStyle/>
+          <a:p>
+            <a:fld id="{033373DF-BCDA-4600-B448-AFBDB22F4A39}" type="slidenum">
+              <a:rPr lang="en-US" smtClean="0"/>
+              <a:t>14</a:t>
+            </a:fld>
+            <a:endParaRPr lang="en-US"/>
+          </a:p>
+        </p:txBody>
+      </p:sp>
+      <p:sp>
+        <p:nvSpPr>
+          <p:cNvPr id="5" name="TextBox 4"/>
+          <p:cNvSpPr txBox="1"/>
+          <p:nvPr/>
+        </p:nvSpPr>
+        <p:spPr>
+          <a:xfrm>
+            <a:off x="6322143" y="1769345"/>
+            <a:ext cx="2423933" cy="461665"/>
+          </a:xfrm>
+          <a:prstGeom prst="rect">
+            <a:avLst/>
+          </a:prstGeom>
+          <a:noFill/>
+          <a:ln>
+            <a:solidFill>
+              <a:schemeClr val="tx1"/>
+            </a:solidFill>
+          </a:ln>
+        </p:spPr>
+        <p:txBody>
+          <a:bodyPr wrap="none" rtlCol="0">
+            <a:spAutoFit/>
+          </a:bodyPr>
+          <a:lstStyle/>
+          <a:p>
+            <a:r>
+              <a:rPr lang="en-US" sz="2400" dirty="0" smtClean="0"/>
+              <a:t>Note: </a:t>
+            </a:r>
+            <a:r>
+              <a:rPr lang="en-US" sz="2400" dirty="0" smtClean="0">
+                <a:latin typeface="Courier New" panose="02070309020205020404" pitchFamily="49" charset="0"/>
+                <a:cs typeface="Courier New" panose="02070309020205020404" pitchFamily="49" charset="0"/>
+              </a:rPr>
+              <a:t>3/5 == 0</a:t>
+            </a:r>
+            <a:endParaRPr lang="en-US" sz="2400" dirty="0">
+              <a:latin typeface="Courier New" panose="02070309020205020404" pitchFamily="49" charset="0"/>
+              <a:cs typeface="Courier New" panose="02070309020205020404" pitchFamily="49" charset="0"/>
+            </a:endParaRPr>
+          </a:p>
+        </p:txBody>
+      </p:sp>
+      <p:grpSp>
+        <p:nvGrpSpPr>
+          <p:cNvPr id="9" name="Group 8"/>
+          <p:cNvGrpSpPr/>
+          <p:nvPr/>
+        </p:nvGrpSpPr>
+        <p:grpSpPr>
+          <a:xfrm>
+            <a:off x="1661653" y="3987963"/>
+            <a:ext cx="5274391" cy="523220"/>
+            <a:chOff x="2172931" y="4354409"/>
+            <a:chExt cx="5274391" cy="523220"/>
+          </a:xfrm>
+        </p:grpSpPr>
+        <p:sp>
+          <p:nvSpPr>
+            <p:cNvPr id="6" name="TextBox 5"/>
+            <p:cNvSpPr txBox="1"/>
+            <p:nvPr/>
+          </p:nvSpPr>
+          <p:spPr>
+            <a:xfrm>
+              <a:off x="2212259" y="4385187"/>
+              <a:ext cx="5161991" cy="461665"/>
+            </a:xfrm>
+            <a:prstGeom prst="rect">
+              <a:avLst/>
+            </a:prstGeom>
+            <a:noFill/>
+          </p:spPr>
+          <p:txBody>
+            <a:bodyPr wrap="none" rtlCol="0">
+              <a:spAutoFit/>
+            </a:bodyPr>
+            <a:lstStyle/>
+            <a:p>
+              <a:r>
+                <a:rPr lang="en-US" sz="2400" dirty="0" smtClean="0">
+                  <a:latin typeface="Courier New" panose="02070309020205020404" pitchFamily="49" charset="0"/>
+                  <a:cs typeface="Courier New" panose="02070309020205020404" pitchFamily="49" charset="0"/>
+                </a:rPr>
+                <a:t>1.0/3.0 == 0.33333333333333</a:t>
+              </a:r>
+              <a:endParaRPr lang="en-US" sz="2400" dirty="0">
+                <a:latin typeface="Courier New" panose="02070309020205020404" pitchFamily="49" charset="0"/>
+                <a:cs typeface="Courier New" panose="02070309020205020404" pitchFamily="49" charset="0"/>
+              </a:endParaRPr>
+            </a:p>
+          </p:txBody>
+        </p:sp>
+        <p:sp>
+          <p:nvSpPr>
+            <p:cNvPr id="8" name="Rectangle 7"/>
+            <p:cNvSpPr/>
+            <p:nvPr/>
+          </p:nvSpPr>
+          <p:spPr>
+            <a:xfrm>
+              <a:off x="2172931" y="4354409"/>
+              <a:ext cx="5274391" cy="523220"/>
+            </a:xfrm>
+            <a:prstGeom prst="rect">
+              <a:avLst/>
+            </a:prstGeom>
+            <a:noFill/>
+            <a:ln>
+              <a:solidFill>
+                <a:schemeClr val="tx1"/>
+              </a:solidFill>
+            </a:ln>
+          </p:spPr>
+          <p:style>
+            <a:lnRef idx="2">
+              <a:schemeClr val="accent1">
+                <a:shade val="50000"/>
+              </a:schemeClr>
+            </a:lnRef>
+            <a:fillRef idx="1">
+              <a:schemeClr val="accent1"/>
+            </a:fillRef>
+            <a:effectRef idx="0">
+              <a:schemeClr val="accent1"/>
+            </a:effectRef>
+            <a:fontRef idx="minor">
+              <a:schemeClr val="lt1"/>
+            </a:fontRef>
+          </p:style>
+          <p:txBody>
+            <a:bodyPr rtlCol="0" anchor="ctr"/>
+            <a:lstStyle/>
+            <a:p>
+              <a:pPr algn="ctr"/>
+              <a:endParaRPr lang="en-US"/>
+            </a:p>
+          </p:txBody>
+        </p:sp>
+      </p:grpSp>
+      <p:sp>
+        <p:nvSpPr>
+          <p:cNvPr id="7" name="TextBox 6"/>
+          <p:cNvSpPr txBox="1"/>
+          <p:nvPr/>
+        </p:nvSpPr>
+        <p:spPr>
+          <a:xfrm>
+            <a:off x="3264309" y="3926407"/>
+            <a:ext cx="397866" cy="646331"/>
+          </a:xfrm>
+          <a:prstGeom prst="rect">
+            <a:avLst/>
+          </a:prstGeom>
+          <a:noFill/>
+        </p:spPr>
+        <p:txBody>
+          <a:bodyPr wrap="none" rtlCol="0">
+            <a:spAutoFit/>
+          </a:bodyPr>
+          <a:lstStyle/>
+          <a:p>
+            <a:r>
+              <a:rPr lang="en-US" sz="3600" dirty="0" smtClean="0">
+                <a:solidFill>
+                  <a:srgbClr val="C00000"/>
+                </a:solidFill>
+              </a:rPr>
+              <a:t>?</a:t>
+            </a:r>
+            <a:endParaRPr lang="en-US" sz="3600" dirty="0">
+              <a:solidFill>
+                <a:srgbClr val="C00000"/>
+              </a:solidFill>
+            </a:endParaRPr>
+          </a:p>
+        </p:txBody>
+      </p:sp>
+    </p:spTree>
+    <p:extLst>
+      <p:ext uri="{BB962C8B-B14F-4D97-AF65-F5344CB8AC3E}">
+        <p14:creationId xmlns:p14="http://schemas.microsoft.com/office/powerpoint/2010/main" val="487931677"/>
+      </p:ext>
+    </p:extLst>
+  </p:cSld>
+  <p:clrMapOvr>
+    <a:masterClrMapping/>
+  </p:clrMapOvr>
+  <p:timing>
+    <p:tnLst>
+      <p:par>
+        <p:cTn id="1" dur="indefinite" restart="never" nodeType="tmRoot">
+          <p:childTnLst>
+            <p:seq concurrent="1" nextAc="seek">
+              <p:cTn id="2" dur="indefinite" nodeType="mainSeq">
+                <p:childTnLst>
+                  <p:par>
+                    <p:cTn id="3" fill="hold">
+                      <p:stCondLst>
+                        <p:cond delay="indefinite"/>
+                        <p:cond evt="onBegin" delay="0">
+                          <p:tn val="2"/>
+                        </p:cond>
+                      </p:stCondLst>
+                      <p:childTnLst>
+                        <p:par>
+                          <p:cTn id="4" fill="hold">
+                            <p:stCondLst>
+                              <p:cond delay="0"/>
+                            </p:stCondLst>
+                            <p:childTnLst>
+                              <p:par>
+                                <p:cTn id="5" presetID="1" presetClass="entr" presetSubtype="0" fill="hold" grpId="0" nodeType="withEffect">
+                                  <p:stCondLst>
+                                    <p:cond delay="0"/>
+                                  </p:stCondLst>
+                                  <p:childTnLst>
+                                    <p:set>
+                                      <p:cBhvr>
+                                        <p:cTn id="6" dur="1" fill="hold">
+                                          <p:stCondLst>
+                                            <p:cond delay="0"/>
+                                          </p:stCondLst>
+                                        </p:cTn>
+                                        <p:tgtEl>
+                                          <p:spTgt spid="3">
+                                            <p:txEl>
+                                              <p:pRg st="0" end="0"/>
+                                            </p:txEl>
+                                          </p:spTgt>
+                                        </p:tgtEl>
+                                        <p:attrNameLst>
+                                          <p:attrName>style.visibility</p:attrName>
+                                        </p:attrNameLst>
+                                      </p:cBhvr>
+                                      <p:to>
+                                        <p:strVal val="visible"/>
+                                      </p:to>
+                                    </p:set>
+                                  </p:childTnLst>
+                                </p:cTn>
+                              </p:par>
+                            </p:childTnLst>
+                          </p:cTn>
+                        </p:par>
+                      </p:childTnLst>
+                    </p:cTn>
+                  </p:par>
+                  <p:par>
+                    <p:cTn id="7" fill="hold">
+                      <p:stCondLst>
+                        <p:cond delay="indefinite"/>
+                      </p:stCondLst>
+                      <p:childTnLst>
+                        <p:par>
+                          <p:cTn id="8" fill="hold">
+                            <p:stCondLst>
+                              <p:cond delay="0"/>
+                            </p:stCondLst>
+                            <p:childTnLst>
+                              <p:par>
+                                <p:cTn id="9" presetID="1" presetClass="entr" presetSubtype="0" fill="hold" grpId="0" nodeType="clickEffect">
+                                  <p:stCondLst>
+                                    <p:cond delay="0"/>
+                                  </p:stCondLst>
+                                  <p:childTnLst>
+                                    <p:set>
+                                      <p:cBhvr>
+                                        <p:cTn id="10" dur="1" fill="hold">
+                                          <p:stCondLst>
+                                            <p:cond delay="0"/>
+                                          </p:stCondLst>
+                                        </p:cTn>
+                                        <p:tgtEl>
+                                          <p:spTgt spid="5"/>
+                                        </p:tgtEl>
+                                        <p:attrNameLst>
+                                          <p:attrName>style.visibility</p:attrName>
+                                        </p:attrNameLst>
+                                      </p:cBhvr>
+                                      <p:to>
+                                        <p:strVal val="visible"/>
+                                      </p:to>
+                                    </p:set>
+                                  </p:childTnLst>
+                                </p:cTn>
+                              </p:par>
+                            </p:childTnLst>
+                          </p:cTn>
+                        </p:par>
+                      </p:childTnLst>
+                    </p:cTn>
+                  </p:par>
+                  <p:par>
+                    <p:cTn id="11" fill="hold">
+                      <p:stCondLst>
+                        <p:cond delay="indefinite"/>
+                      </p:stCondLst>
+                      <p:childTnLst>
+                        <p:par>
+                          <p:cTn id="12" fill="hold">
+                            <p:stCondLst>
+                              <p:cond delay="0"/>
+                            </p:stCondLst>
+                            <p:childTnLst>
+                              <p:par>
+                                <p:cTn id="13" presetID="1" presetClass="entr" presetSubtype="0" fill="hold" grpId="0" nodeType="clickEffect">
+                                  <p:stCondLst>
+                                    <p:cond delay="0"/>
+                                  </p:stCondLst>
+                                  <p:childTnLst>
+                                    <p:set>
+                                      <p:cBhvr>
+                                        <p:cTn id="14" dur="1" fill="hold">
+                                          <p:stCondLst>
+                                            <p:cond delay="0"/>
+                                          </p:stCondLst>
+                                        </p:cTn>
+                                        <p:tgtEl>
+                                          <p:spTgt spid="3">
+                                            <p:txEl>
+                                              <p:pRg st="1" end="1"/>
+                                            </p:txEl>
+                                          </p:spTgt>
+                                        </p:tgtEl>
+                                        <p:attrNameLst>
+                                          <p:attrName>style.visibility</p:attrName>
+                                        </p:attrNameLst>
+                                      </p:cBhvr>
+                                      <p:to>
+                                        <p:strVal val="visible"/>
+                                      </p:to>
+                                    </p:set>
+                                  </p:childTnLst>
+                                </p:cTn>
+                              </p:par>
+                            </p:childTnLst>
+                          </p:cTn>
+                        </p:par>
+                      </p:childTnLst>
+                    </p:cTn>
+                  </p:par>
+                  <p:par>
+                    <p:cTn id="15" fill="hold">
+                      <p:stCondLst>
+                        <p:cond delay="indefinite"/>
+                      </p:stCondLst>
+                      <p:childTnLst>
+                        <p:par>
+                          <p:cTn id="16" fill="hold">
+                            <p:stCondLst>
+                              <p:cond delay="0"/>
+                            </p:stCondLst>
+                            <p:childTnLst>
+                              <p:par>
+                                <p:cTn id="17" presetID="1" presetClass="entr" presetSubtype="0" fill="hold" grpId="0" nodeType="clickEffect">
+                                  <p:stCondLst>
+                                    <p:cond delay="0"/>
+                                  </p:stCondLst>
+                                  <p:childTnLst>
+                                    <p:set>
+                                      <p:cBhvr>
+                                        <p:cTn id="18" dur="1" fill="hold">
+                                          <p:stCondLst>
+                                            <p:cond delay="0"/>
+                                          </p:stCondLst>
+                                        </p:cTn>
+                                        <p:tgtEl>
+                                          <p:spTgt spid="3">
+                                            <p:txEl>
+                                              <p:pRg st="2" end="2"/>
+                                            </p:txEl>
+                                          </p:spTgt>
+                                        </p:tgtEl>
+                                        <p:attrNameLst>
+                                          <p:attrName>style.visibility</p:attrName>
+                                        </p:attrNameLst>
+                                      </p:cBhvr>
+                                      <p:to>
+                                        <p:strVal val="visible"/>
+                                      </p:to>
+                                    </p:set>
+                                  </p:childTnLst>
+                                </p:cTn>
+                              </p:par>
+                              <p:par>
+                                <p:cTn id="19" presetID="1" presetClass="entr" presetSubtype="0" fill="hold" grpId="0" nodeType="withEffect">
+                                  <p:stCondLst>
+                                    <p:cond delay="0"/>
+                                  </p:stCondLst>
+                                  <p:childTnLst>
+                                    <p:set>
+                                      <p:cBhvr>
+                                        <p:cTn id="20" dur="1" fill="hold">
+                                          <p:stCondLst>
+                                            <p:cond delay="0"/>
+                                          </p:stCondLst>
+                                        </p:cTn>
+                                        <p:tgtEl>
+                                          <p:spTgt spid="3">
+                                            <p:txEl>
+                                              <p:pRg st="3" end="3"/>
+                                            </p:txEl>
+                                          </p:spTgt>
+                                        </p:tgtEl>
+                                        <p:attrNameLst>
+                                          <p:attrName>style.visibility</p:attrName>
+                                        </p:attrNameLst>
+                                      </p:cBhvr>
+                                      <p:to>
+                                        <p:strVal val="visible"/>
+                                      </p:to>
+                                    </p:set>
+                                  </p:childTnLst>
+                                </p:cTn>
+                              </p:par>
+                              <p:par>
+                                <p:cTn id="21" presetID="1" presetClass="entr" presetSubtype="0" fill="hold" grpId="0" nodeType="withEffect">
+                                  <p:stCondLst>
+                                    <p:cond delay="0"/>
+                                  </p:stCondLst>
+                                  <p:childTnLst>
+                                    <p:set>
+                                      <p:cBhvr>
+                                        <p:cTn id="22" dur="1" fill="hold">
+                                          <p:stCondLst>
+                                            <p:cond delay="0"/>
+                                          </p:stCondLst>
+                                        </p:cTn>
+                                        <p:tgtEl>
+                                          <p:spTgt spid="3">
+                                            <p:txEl>
+                                              <p:pRg st="4" end="4"/>
+                                            </p:txEl>
+                                          </p:spTgt>
+                                        </p:tgtEl>
+                                        <p:attrNameLst>
+                                          <p:attrName>style.visibility</p:attrName>
+                                        </p:attrNameLst>
+                                      </p:cBhvr>
+                                      <p:to>
+                                        <p:strVal val="visible"/>
+                                      </p:to>
+                                    </p:set>
+                                  </p:childTnLst>
+                                </p:cTn>
+                              </p:par>
+                            </p:childTnLst>
+                          </p:cTn>
+                        </p:par>
+                      </p:childTnLst>
+                    </p:cTn>
+                  </p:par>
+                  <p:par>
+                    <p:cTn id="23" fill="hold">
+                      <p:stCondLst>
+                        <p:cond delay="indefinite"/>
+                      </p:stCondLst>
+                      <p:childTnLst>
+                        <p:par>
+                          <p:cTn id="24" fill="hold">
+                            <p:stCondLst>
+                              <p:cond delay="0"/>
+                            </p:stCondLst>
+                            <p:childTnLst>
+                              <p:par>
+                                <p:cTn id="25" presetID="1" presetClass="entr" presetSubtype="0" fill="hold" grpId="0" nodeType="clickEffect">
+                                  <p:stCondLst>
+                                    <p:cond delay="0"/>
+                                  </p:stCondLst>
+                                  <p:childTnLst>
+                                    <p:set>
+                                      <p:cBhvr>
+                                        <p:cTn id="26" dur="1" fill="hold">
+                                          <p:stCondLst>
+                                            <p:cond delay="0"/>
+                                          </p:stCondLst>
+                                        </p:cTn>
+                                        <p:tgtEl>
+                                          <p:spTgt spid="3">
+                                            <p:txEl>
+                                              <p:pRg st="7" end="7"/>
+                                            </p:txEl>
+                                          </p:spTgt>
+                                        </p:tgtEl>
+                                        <p:attrNameLst>
+                                          <p:attrName>style.visibility</p:attrName>
+                                        </p:attrNameLst>
+                                      </p:cBhvr>
+                                      <p:to>
+                                        <p:strVal val="visible"/>
+                                      </p:to>
+                                    </p:set>
+                                  </p:childTnLst>
+                                </p:cTn>
+                              </p:par>
+                              <p:par>
+                                <p:cTn id="27" presetID="1" presetClass="entr" presetSubtype="0" fill="hold" grpId="0" nodeType="withEffect">
+                                  <p:stCondLst>
+                                    <p:cond delay="0"/>
+                                  </p:stCondLst>
+                                  <p:childTnLst>
+                                    <p:set>
+                                      <p:cBhvr>
+                                        <p:cTn id="28" dur="1" fill="hold">
+                                          <p:stCondLst>
+                                            <p:cond delay="0"/>
+                                          </p:stCondLst>
+                                        </p:cTn>
+                                        <p:tgtEl>
+                                          <p:spTgt spid="3">
+                                            <p:txEl>
+                                              <p:pRg st="8" end="8"/>
+                                            </p:txEl>
+                                          </p:spTgt>
+                                        </p:tgtEl>
+                                        <p:attrNameLst>
+                                          <p:attrName>style.visibility</p:attrName>
+                                        </p:attrNameLst>
+                                      </p:cBhvr>
+                                      <p:to>
+                                        <p:strVal val="visible"/>
+                                      </p:to>
+                                    </p:set>
+                                  </p:childTnLst>
+                                </p:cTn>
+                              </p:par>
+                              <p:par>
+                                <p:cTn id="29" presetID="1" presetClass="entr" presetSubtype="0" fill="hold" grpId="0" nodeType="withEffect">
+                                  <p:stCondLst>
+                                    <p:cond delay="0"/>
+                                  </p:stCondLst>
+                                  <p:childTnLst>
+                                    <p:set>
+                                      <p:cBhvr>
+                                        <p:cTn id="30" dur="1" fill="hold">
+                                          <p:stCondLst>
+                                            <p:cond delay="0"/>
+                                          </p:stCondLst>
+                                        </p:cTn>
+                                        <p:tgtEl>
+                                          <p:spTgt spid="3">
+                                            <p:txEl>
+                                              <p:pRg st="9" end="9"/>
+                                            </p:txEl>
+                                          </p:spTgt>
+                                        </p:tgtEl>
+                                        <p:attrNameLst>
+                                          <p:attrName>style.visibility</p:attrName>
+                                        </p:attrNameLst>
+                                      </p:cBhvr>
+                                      <p:to>
+                                        <p:strVal val="visible"/>
+                                      </p:to>
+                                    </p:set>
+                                  </p:childTnLst>
+                                </p:cTn>
+                              </p:par>
+                            </p:childTnLst>
+                          </p:cTn>
+                        </p:par>
+                      </p:childTnLst>
+                    </p:cTn>
+                  </p:par>
+                  <p:par>
+                    <p:cTn id="31" fill="hold">
+                      <p:stCondLst>
+                        <p:cond delay="indefinite"/>
+                      </p:stCondLst>
+                      <p:childTnLst>
+                        <p:par>
+                          <p:cTn id="32" fill="hold">
+                            <p:stCondLst>
+                              <p:cond delay="0"/>
+                            </p:stCondLst>
+                            <p:childTnLst>
+                              <p:par>
+                                <p:cTn id="33" presetID="1" presetClass="entr" presetSubtype="0" fill="hold" nodeType="clickEffect">
+                                  <p:stCondLst>
+                                    <p:cond delay="0"/>
+                                  </p:stCondLst>
+                                  <p:childTnLst>
+                                    <p:set>
+                                      <p:cBhvr>
+                                        <p:cTn id="34" dur="1" fill="hold">
+                                          <p:stCondLst>
+                                            <p:cond delay="0"/>
+                                          </p:stCondLst>
+                                        </p:cTn>
+                                        <p:tgtEl>
+                                          <p:spTgt spid="9"/>
+                                        </p:tgtEl>
+                                        <p:attrNameLst>
+                                          <p:attrName>style.visibility</p:attrName>
+                                        </p:attrNameLst>
+                                      </p:cBhvr>
+                                      <p:to>
+                                        <p:strVal val="visible"/>
+                                      </p:to>
+                                    </p:set>
+                                  </p:childTnLst>
+                                </p:cTn>
+                              </p:par>
+                            </p:childTnLst>
+                          </p:cTn>
+                        </p:par>
+                      </p:childTnLst>
+                    </p:cTn>
+                  </p:par>
+                  <p:par>
+                    <p:cTn id="35" fill="hold">
+                      <p:stCondLst>
+                        <p:cond delay="indefinite"/>
+                      </p:stCondLst>
+                      <p:childTnLst>
+                        <p:par>
+                          <p:cTn id="36" fill="hold">
+                            <p:stCondLst>
+                              <p:cond delay="0"/>
+                            </p:stCondLst>
+                            <p:childTnLst>
+                              <p:par>
+                                <p:cTn id="37" presetID="1" presetClass="entr" presetSubtype="0" fill="hold" grpId="0" nodeType="clickEffect">
+                                  <p:stCondLst>
+                                    <p:cond delay="0"/>
+                                  </p:stCondLst>
+                                  <p:childTnLst>
+                                    <p:set>
+                                      <p:cBhvr>
+                                        <p:cTn id="38" dur="1" fill="hold">
+                                          <p:stCondLst>
+                                            <p:cond delay="0"/>
+                                          </p:stCondLst>
+                                        </p:cTn>
+                                        <p:tgtEl>
+                                          <p:spTgt spid="7"/>
+                                        </p:tgtEl>
+                                        <p:attrNameLst>
+                                          <p:attrName>style.visibility</p:attrName>
+                                        </p:attrNameLst>
+                                      </p:cBhvr>
+                                      <p:to>
+                                        <p:strVal val="visible"/>
+                                      </p:to>
+                                    </p:set>
+                                  </p:childTnLst>
+                                </p:cTn>
+                              </p:par>
+                            </p:childTnLst>
+                          </p:cTn>
+                        </p:par>
+                      </p:childTnLst>
+                    </p:cTn>
+                  </p:par>
+                </p:childTnLst>
+              </p:cTn>
+              <p:prevCondLst>
+                <p:cond evt="onPrev" delay="0">
+                  <p:tgtEl>
+                    <p:sldTgt/>
+                  </p:tgtEl>
+                </p:cond>
+              </p:prevCondLst>
+              <p:nextCondLst>
+                <p:cond evt="onNext" delay="0">
+                  <p:tgtEl>
+                    <p:sldTgt/>
+                  </p:tgtEl>
+                </p:cond>
+              </p:nextCondLst>
+            </p:seq>
+          </p:childTnLst>
+        </p:cTn>
+      </p:par>
+    </p:tnLst>
+    <p:bldLst>
+      <p:bldP spid="3" grpId="0" uiExpand="1" build="p"/>
+      <p:bldP spid="5" grpId="0" animBg="1"/>
+      <p:bldP spid="7" grpId="0"/>
+    </p:bldLst>
   </p:timing>
 </p:sld>
 </file>
@@ -11625,10 +13655,6 @@
               </a:rPr>
               <a:t>;</a:t>
             </a:r>
-            <a:endParaRPr lang="en-US" sz="1600" dirty="0" smtClean="0">
-              <a:latin typeface="Courier New" pitchFamily="49" charset="0"/>
-              <a:cs typeface="Courier New" pitchFamily="49" charset="0"/>
-            </a:endParaRPr>
           </a:p>
           <a:p>
             <a:r>
@@ -11711,14 +13737,7 @@
                 <a:latin typeface="Courier New" pitchFamily="49" charset="0"/>
                 <a:cs typeface="Courier New" pitchFamily="49" charset="0"/>
               </a:rPr>
-              <a:t> </a:t>
-            </a:r>
-            <a:r>
-              <a:rPr lang="en-US" sz="1600" dirty="0" smtClean="0">
-                <a:latin typeface="Courier New" pitchFamily="49" charset="0"/>
-                <a:cs typeface="Courier New" pitchFamily="49" charset="0"/>
-              </a:rPr>
-              <a:t>&lt;&lt; "hello " &lt;&lt; </a:t>
+              <a:t> &lt;&lt; "hello " &lt;&lt; </a:t>
             </a:r>
             <a:r>
               <a:rPr lang="en-US" sz="1600" dirty="0" err="1" smtClean="0">

</xml_diff>

<commit_message>
Added slides on functions
</commit_message>
<xml_diff>
--- a/CPlusPlus/essential_cpp.pptx
+++ b/CPlusPlus/essential_cpp.pptx
@@ -5,7 +5,7 @@
     <p:sldMasterId id="2147483660" r:id="rId1"/>
   </p:sldMasterIdLst>
   <p:notesMasterIdLst>
-    <p:notesMasterId r:id="rId16"/>
+    <p:notesMasterId r:id="rId19"/>
   </p:notesMasterIdLst>
   <p:sldIdLst>
     <p:sldId id="256" r:id="rId2"/>
@@ -22,6 +22,9 @@
     <p:sldId id="267" r:id="rId13"/>
     <p:sldId id="268" r:id="rId14"/>
     <p:sldId id="269" r:id="rId15"/>
+    <p:sldId id="270" r:id="rId16"/>
+    <p:sldId id="272" r:id="rId17"/>
+    <p:sldId id="271" r:id="rId18"/>
   </p:sldIdLst>
   <p:sldSz cx="9144000" cy="6858000" type="screen4x3"/>
   <p:notesSz cx="6858000" cy="9144000"/>
@@ -8176,7 +8179,21 @@
                 <a:latin typeface="Courier New" panose="02070309020205020404" pitchFamily="49" charset="0"/>
                 <a:cs typeface="Courier New" panose="02070309020205020404" pitchFamily="49" charset="0"/>
               </a:rPr>
-              <a:t>#include &lt;math&gt;</a:t>
+              <a:t>#include &lt;</a:t>
+            </a:r>
+            <a:r>
+              <a:rPr lang="en-US" dirty="0" err="1" smtClean="0">
+                <a:latin typeface="Courier New" panose="02070309020205020404" pitchFamily="49" charset="0"/>
+                <a:cs typeface="Courier New" panose="02070309020205020404" pitchFamily="49" charset="0"/>
+              </a:rPr>
+              <a:t>cmath</a:t>
+            </a:r>
+            <a:r>
+              <a:rPr lang="en-US" dirty="0" smtClean="0">
+                <a:latin typeface="Courier New" panose="02070309020205020404" pitchFamily="49" charset="0"/>
+                <a:cs typeface="Courier New" panose="02070309020205020404" pitchFamily="49" charset="0"/>
+              </a:rPr>
+              <a:t>&gt;</a:t>
             </a:r>
           </a:p>
           <a:p>
@@ -8471,6 +8488,58 @@
                 <a:srgbClr val="C00000"/>
               </a:solidFill>
             </a:endParaRPr>
+          </a:p>
+        </p:txBody>
+      </p:sp>
+      <p:sp>
+        <p:nvSpPr>
+          <p:cNvPr id="10" name="TextBox 9"/>
+          <p:cNvSpPr txBox="1"/>
+          <p:nvPr/>
+        </p:nvSpPr>
+        <p:spPr>
+          <a:xfrm>
+            <a:off x="6689027" y="5787820"/>
+            <a:ext cx="1611339" cy="646331"/>
+          </a:xfrm>
+          <a:prstGeom prst="rect">
+            <a:avLst/>
+          </a:prstGeom>
+          <a:solidFill>
+            <a:schemeClr val="bg1"/>
+          </a:solidFill>
+          <a:ln>
+            <a:solidFill>
+              <a:schemeClr val="tx1"/>
+            </a:solidFill>
+          </a:ln>
+        </p:spPr>
+        <p:txBody>
+          <a:bodyPr wrap="none" rtlCol="0">
+            <a:spAutoFit/>
+          </a:bodyPr>
+          <a:lstStyle/>
+          <a:p>
+            <a:r>
+              <a:rPr lang="en-US" dirty="0" smtClean="0"/>
+              <a:t>x, y, d local</a:t>
+            </a:r>
+            <a:br>
+              <a:rPr lang="en-US" dirty="0" smtClean="0"/>
+            </a:br>
+            <a:r>
+              <a:rPr lang="en-US" dirty="0" smtClean="0"/>
+              <a:t>to </a:t>
+            </a:r>
+            <a:r>
+              <a:rPr lang="en-US" dirty="0" err="1" smtClean="0"/>
+              <a:t>dist</a:t>
+            </a:r>
+            <a:r>
+              <a:rPr lang="en-US" dirty="0" smtClean="0"/>
+              <a:t> function</a:t>
+            </a:r>
+            <a:endParaRPr lang="en-US" dirty="0"/>
           </a:p>
         </p:txBody>
       </p:sp>
@@ -9024,6 +9093,2808 @@
       <p:bldP spid="3" grpId="0" uiExpand="1" build="p"/>
       <p:bldP spid="5" grpId="0" animBg="1"/>
       <p:bldP spid="7" grpId="0"/>
+    </p:bldLst>
+  </p:timing>
+</p:sld>
+</file>
+
+<file path=ppt/slides/slide15.xml><?xml version="1.0" encoding="utf-8"?>
+<p:sld xmlns:a="http://schemas.openxmlformats.org/drawingml/2006/main" xmlns:r="http://schemas.openxmlformats.org/officeDocument/2006/relationships" xmlns:p="http://schemas.openxmlformats.org/presentationml/2006/main">
+  <p:cSld>
+    <p:spTree>
+      <p:nvGrpSpPr>
+        <p:cNvPr id="1" name=""/>
+        <p:cNvGrpSpPr/>
+        <p:nvPr/>
+      </p:nvGrpSpPr>
+      <p:grpSpPr>
+        <a:xfrm>
+          <a:off x="0" y="0"/>
+          <a:ext cx="0" cy="0"/>
+          <a:chOff x="0" y="0"/>
+          <a:chExt cx="0" cy="0"/>
+        </a:xfrm>
+      </p:grpSpPr>
+      <p:sp>
+        <p:nvSpPr>
+          <p:cNvPr id="2" name="Title 1"/>
+          <p:cNvSpPr>
+            <a:spLocks noGrp="1"/>
+          </p:cNvSpPr>
+          <p:nvPr>
+            <p:ph type="title"/>
+          </p:nvPr>
+        </p:nvSpPr>
+        <p:spPr/>
+        <p:txBody>
+          <a:bodyPr/>
+          <a:lstStyle/>
+          <a:p>
+            <a:r>
+              <a:rPr lang="en-US" dirty="0" smtClean="0"/>
+              <a:t>Task: data transformation</a:t>
+            </a:r>
+            <a:endParaRPr lang="en-US" dirty="0"/>
+          </a:p>
+        </p:txBody>
+      </p:sp>
+      <p:sp>
+        <p:nvSpPr>
+          <p:cNvPr id="3" name="Content Placeholder 2"/>
+          <p:cNvSpPr>
+            <a:spLocks noGrp="1"/>
+          </p:cNvSpPr>
+          <p:nvPr>
+            <p:ph idx="1"/>
+          </p:nvPr>
+        </p:nvSpPr>
+        <p:spPr/>
+        <p:txBody>
+          <a:bodyPr/>
+          <a:lstStyle/>
+          <a:p>
+            <a:r>
+              <a:rPr lang="en-US" dirty="0" smtClean="0"/>
+              <a:t>File </a:t>
+            </a:r>
+            <a:r>
+              <a:rPr lang="en-US" dirty="0" smtClean="0">
+                <a:latin typeface="Courier New" panose="02070309020205020404" pitchFamily="49" charset="0"/>
+                <a:cs typeface="Courier New" panose="02070309020205020404" pitchFamily="49" charset="0"/>
+              </a:rPr>
+              <a:t>data.txt</a:t>
+            </a:r>
+            <a:r>
+              <a:rPr lang="en-US" dirty="0" smtClean="0"/>
+              <a:t> contains coordinates in 2D, compute distance from origin, write to </a:t>
+            </a:r>
+            <a:r>
+              <a:rPr lang="en-US" dirty="0" smtClean="0">
+                <a:latin typeface="Courier New" panose="02070309020205020404" pitchFamily="49" charset="0"/>
+                <a:cs typeface="Courier New" panose="02070309020205020404" pitchFamily="49" charset="0"/>
+              </a:rPr>
+              <a:t>out.txt</a:t>
+            </a:r>
+          </a:p>
+          <a:p>
+            <a:endParaRPr lang="en-US" dirty="0">
+              <a:latin typeface="Courier New" panose="02070309020205020404" pitchFamily="49" charset="0"/>
+              <a:cs typeface="Courier New" panose="02070309020205020404" pitchFamily="49" charset="0"/>
+            </a:endParaRPr>
+          </a:p>
+          <a:p>
+            <a:endParaRPr lang="en-US" dirty="0" smtClean="0">
+              <a:latin typeface="Courier New" panose="02070309020205020404" pitchFamily="49" charset="0"/>
+              <a:cs typeface="Courier New" panose="02070309020205020404" pitchFamily="49" charset="0"/>
+            </a:endParaRPr>
+          </a:p>
+          <a:p>
+            <a:endParaRPr lang="en-US" dirty="0">
+              <a:latin typeface="Courier New" panose="02070309020205020404" pitchFamily="49" charset="0"/>
+              <a:cs typeface="Courier New" panose="02070309020205020404" pitchFamily="49" charset="0"/>
+            </a:endParaRPr>
+          </a:p>
+          <a:p>
+            <a:endParaRPr lang="en-US" dirty="0">
+              <a:cs typeface="Courier New" panose="02070309020205020404" pitchFamily="49" charset="0"/>
+            </a:endParaRPr>
+          </a:p>
+        </p:txBody>
+      </p:sp>
+      <p:sp>
+        <p:nvSpPr>
+          <p:cNvPr id="4" name="Slide Number Placeholder 3"/>
+          <p:cNvSpPr>
+            <a:spLocks noGrp="1"/>
+          </p:cNvSpPr>
+          <p:nvPr>
+            <p:ph type="sldNum" sz="quarter" idx="12"/>
+          </p:nvPr>
+        </p:nvSpPr>
+        <p:spPr/>
+        <p:txBody>
+          <a:bodyPr/>
+          <a:lstStyle/>
+          <a:p>
+            <a:fld id="{033373DF-BCDA-4600-B448-AFBDB22F4A39}" type="slidenum">
+              <a:rPr lang="en-US" smtClean="0"/>
+              <a:t>15</a:t>
+            </a:fld>
+            <a:endParaRPr lang="en-US"/>
+          </a:p>
+        </p:txBody>
+      </p:sp>
+      <p:grpSp>
+        <p:nvGrpSpPr>
+          <p:cNvPr id="7" name="Group 6"/>
+          <p:cNvGrpSpPr/>
+          <p:nvPr/>
+        </p:nvGrpSpPr>
+        <p:grpSpPr>
+          <a:xfrm>
+            <a:off x="1676735" y="3225009"/>
+            <a:ext cx="1943279" cy="834020"/>
+            <a:chOff x="6187999" y="569019"/>
+            <a:chExt cx="1943279" cy="834020"/>
+          </a:xfrm>
+        </p:grpSpPr>
+        <p:sp>
+          <p:nvSpPr>
+            <p:cNvPr id="5" name="TextBox 4"/>
+            <p:cNvSpPr txBox="1"/>
+            <p:nvPr/>
+          </p:nvSpPr>
+          <p:spPr>
+            <a:xfrm>
+              <a:off x="6187999" y="569019"/>
+              <a:ext cx="1943279" cy="830997"/>
+            </a:xfrm>
+            <a:prstGeom prst="rect">
+              <a:avLst/>
+            </a:prstGeom>
+            <a:solidFill>
+              <a:schemeClr val="accent6">
+                <a:lumMod val="20000"/>
+                <a:lumOff val="80000"/>
+              </a:schemeClr>
+            </a:solidFill>
+            <a:ln>
+              <a:solidFill>
+                <a:schemeClr val="tx1"/>
+              </a:solidFill>
+            </a:ln>
+          </p:spPr>
+          <p:txBody>
+            <a:bodyPr wrap="square" rtlCol="0">
+              <a:spAutoFit/>
+            </a:bodyPr>
+            <a:lstStyle/>
+            <a:p>
+              <a:r>
+                <a:rPr lang="en-US" sz="1600" dirty="0">
+                  <a:latin typeface="Courier New" pitchFamily="49" charset="0"/>
+                  <a:cs typeface="Courier New" pitchFamily="49" charset="0"/>
+                </a:rPr>
+                <a:t>5.0 3.0</a:t>
+              </a:r>
+            </a:p>
+            <a:p>
+              <a:r>
+                <a:rPr lang="en-US" sz="1600" dirty="0">
+                  <a:latin typeface="Courier New" pitchFamily="49" charset="0"/>
+                  <a:cs typeface="Courier New" pitchFamily="49" charset="0"/>
+                </a:rPr>
+                <a:t>2.0 1.5</a:t>
+              </a:r>
+            </a:p>
+            <a:p>
+              <a:r>
+                <a:rPr lang="en-US" sz="1600" dirty="0">
+                  <a:latin typeface="Courier New" pitchFamily="49" charset="0"/>
+                  <a:cs typeface="Courier New" pitchFamily="49" charset="0"/>
+                </a:rPr>
+                <a:t>16 -3</a:t>
+              </a:r>
+              <a:endParaRPr lang="en-US" sz="1600" dirty="0">
+                <a:latin typeface="Courier New" pitchFamily="49" charset="0"/>
+                <a:cs typeface="Courier New" pitchFamily="49" charset="0"/>
+              </a:endParaRPr>
+            </a:p>
+          </p:txBody>
+        </p:sp>
+        <p:sp>
+          <p:nvSpPr>
+            <p:cNvPr id="6" name="TextBox 5"/>
+            <p:cNvSpPr txBox="1"/>
+            <p:nvPr/>
+          </p:nvSpPr>
+          <p:spPr>
+            <a:xfrm>
+              <a:off x="7379918" y="1095262"/>
+              <a:ext cx="751360" cy="307777"/>
+            </a:xfrm>
+            <a:prstGeom prst="rect">
+              <a:avLst/>
+            </a:prstGeom>
+            <a:noFill/>
+            <a:ln>
+              <a:solidFill>
+                <a:schemeClr val="tx1"/>
+              </a:solidFill>
+            </a:ln>
+          </p:spPr>
+          <p:txBody>
+            <a:bodyPr wrap="none" rtlCol="0">
+              <a:spAutoFit/>
+            </a:bodyPr>
+            <a:lstStyle/>
+            <a:p>
+              <a:r>
+                <a:rPr lang="en-US" sz="1400" dirty="0" smtClean="0"/>
+                <a:t>data.txt</a:t>
+              </a:r>
+              <a:endParaRPr lang="en-US" sz="1400" dirty="0"/>
+            </a:p>
+          </p:txBody>
+        </p:sp>
+      </p:grpSp>
+      <p:grpSp>
+        <p:nvGrpSpPr>
+          <p:cNvPr id="13" name="Group 12"/>
+          <p:cNvGrpSpPr/>
+          <p:nvPr/>
+        </p:nvGrpSpPr>
+        <p:grpSpPr>
+          <a:xfrm>
+            <a:off x="4122577" y="3225009"/>
+            <a:ext cx="2814081" cy="832277"/>
+            <a:chOff x="4122577" y="2939873"/>
+            <a:chExt cx="2814081" cy="832277"/>
+          </a:xfrm>
+        </p:grpSpPr>
+        <p:grpSp>
+          <p:nvGrpSpPr>
+            <p:cNvPr id="8" name="Group 7"/>
+            <p:cNvGrpSpPr/>
+            <p:nvPr/>
+          </p:nvGrpSpPr>
+          <p:grpSpPr>
+            <a:xfrm>
+              <a:off x="4993379" y="2939873"/>
+              <a:ext cx="1943279" cy="832277"/>
+              <a:chOff x="6187999" y="569019"/>
+              <a:chExt cx="1943279" cy="832277"/>
+            </a:xfrm>
+          </p:grpSpPr>
+          <p:sp>
+            <p:nvSpPr>
+              <p:cNvPr id="9" name="TextBox 8"/>
+              <p:cNvSpPr txBox="1"/>
+              <p:nvPr/>
+            </p:nvSpPr>
+            <p:spPr>
+              <a:xfrm>
+                <a:off x="6187999" y="569019"/>
+                <a:ext cx="1943279" cy="830997"/>
+              </a:xfrm>
+              <a:prstGeom prst="rect">
+                <a:avLst/>
+              </a:prstGeom>
+              <a:solidFill>
+                <a:schemeClr val="accent6">
+                  <a:lumMod val="20000"/>
+                  <a:lumOff val="80000"/>
+                </a:schemeClr>
+              </a:solidFill>
+              <a:ln>
+                <a:solidFill>
+                  <a:schemeClr val="tx1"/>
+                </a:solidFill>
+              </a:ln>
+            </p:spPr>
+            <p:txBody>
+              <a:bodyPr wrap="square" rtlCol="0">
+                <a:spAutoFit/>
+              </a:bodyPr>
+              <a:lstStyle/>
+              <a:p>
+                <a:r>
+                  <a:rPr lang="en-US" sz="1600" dirty="0">
+                    <a:latin typeface="Courier New" pitchFamily="49" charset="0"/>
+                    <a:cs typeface="Courier New" pitchFamily="49" charset="0"/>
+                  </a:rPr>
+                  <a:t>5.83095</a:t>
+                </a:r>
+              </a:p>
+              <a:p>
+                <a:r>
+                  <a:rPr lang="en-US" sz="1600" dirty="0">
+                    <a:latin typeface="Courier New" pitchFamily="49" charset="0"/>
+                    <a:cs typeface="Courier New" pitchFamily="49" charset="0"/>
+                  </a:rPr>
+                  <a:t>2.5</a:t>
+                </a:r>
+              </a:p>
+              <a:p>
+                <a:r>
+                  <a:rPr lang="en-US" sz="1600" dirty="0">
+                    <a:latin typeface="Courier New" pitchFamily="49" charset="0"/>
+                    <a:cs typeface="Courier New" pitchFamily="49" charset="0"/>
+                  </a:rPr>
+                  <a:t>16.2788</a:t>
+                </a:r>
+              </a:p>
+            </p:txBody>
+          </p:sp>
+          <p:sp>
+            <p:nvSpPr>
+              <p:cNvPr id="10" name="TextBox 9"/>
+              <p:cNvSpPr txBox="1"/>
+              <p:nvPr/>
+            </p:nvSpPr>
+            <p:spPr>
+              <a:xfrm>
+                <a:off x="7448742" y="1093519"/>
+                <a:ext cx="676660" cy="307777"/>
+              </a:xfrm>
+              <a:prstGeom prst="rect">
+                <a:avLst/>
+              </a:prstGeom>
+              <a:noFill/>
+              <a:ln>
+                <a:solidFill>
+                  <a:schemeClr val="tx1"/>
+                </a:solidFill>
+              </a:ln>
+            </p:spPr>
+            <p:txBody>
+              <a:bodyPr wrap="none" rtlCol="0">
+                <a:spAutoFit/>
+              </a:bodyPr>
+              <a:lstStyle/>
+              <a:p>
+                <a:r>
+                  <a:rPr lang="en-US" sz="1400" dirty="0" smtClean="0"/>
+                  <a:t>out.txt</a:t>
+                </a:r>
+                <a:endParaRPr lang="en-US" sz="1400" dirty="0"/>
+              </a:p>
+            </p:txBody>
+          </p:sp>
+        </p:grpSp>
+        <p:cxnSp>
+          <p:nvCxnSpPr>
+            <p:cNvPr id="12" name="Straight Arrow Connector 11"/>
+            <p:cNvCxnSpPr/>
+            <p:nvPr/>
+          </p:nvCxnSpPr>
+          <p:spPr>
+            <a:xfrm>
+              <a:off x="4122577" y="3355371"/>
+              <a:ext cx="550607" cy="0"/>
+            </a:xfrm>
+            <a:prstGeom prst="straightConnector1">
+              <a:avLst/>
+            </a:prstGeom>
+            <a:ln w="57150">
+              <a:solidFill>
+                <a:schemeClr val="tx1"/>
+              </a:solidFill>
+              <a:tailEnd type="stealth" w="lg" len="lg"/>
+            </a:ln>
+          </p:spPr>
+          <p:style>
+            <a:lnRef idx="1">
+              <a:schemeClr val="accent1"/>
+            </a:lnRef>
+            <a:fillRef idx="0">
+              <a:schemeClr val="accent1"/>
+            </a:fillRef>
+            <a:effectRef idx="0">
+              <a:schemeClr val="accent1"/>
+            </a:effectRef>
+            <a:fontRef idx="minor">
+              <a:schemeClr val="tx1"/>
+            </a:fontRef>
+          </p:style>
+        </p:cxnSp>
+      </p:grpSp>
+    </p:spTree>
+    <p:extLst>
+      <p:ext uri="{BB962C8B-B14F-4D97-AF65-F5344CB8AC3E}">
+        <p14:creationId xmlns:p14="http://schemas.microsoft.com/office/powerpoint/2010/main" val="3193219001"/>
+      </p:ext>
+    </p:extLst>
+  </p:cSld>
+  <p:clrMapOvr>
+    <a:masterClrMapping/>
+  </p:clrMapOvr>
+  <p:timing>
+    <p:tnLst>
+      <p:par>
+        <p:cTn id="1" dur="indefinite" restart="never" nodeType="tmRoot">
+          <p:childTnLst>
+            <p:seq concurrent="1" nextAc="seek">
+              <p:cTn id="2" dur="indefinite" nodeType="mainSeq">
+                <p:childTnLst>
+                  <p:par>
+                    <p:cTn id="3" fill="hold">
+                      <p:stCondLst>
+                        <p:cond delay="indefinite"/>
+                        <p:cond evt="onBegin" delay="0">
+                          <p:tn val="2"/>
+                        </p:cond>
+                      </p:stCondLst>
+                      <p:childTnLst>
+                        <p:par>
+                          <p:cTn id="4" fill="hold">
+                            <p:stCondLst>
+                              <p:cond delay="0"/>
+                            </p:stCondLst>
+                            <p:childTnLst>
+                              <p:par>
+                                <p:cTn id="5" presetID="1" presetClass="entr" presetSubtype="0" fill="hold" grpId="0" nodeType="withEffect">
+                                  <p:stCondLst>
+                                    <p:cond delay="0"/>
+                                  </p:stCondLst>
+                                  <p:childTnLst>
+                                    <p:set>
+                                      <p:cBhvr>
+                                        <p:cTn id="6" dur="1" fill="hold">
+                                          <p:stCondLst>
+                                            <p:cond delay="0"/>
+                                          </p:stCondLst>
+                                        </p:cTn>
+                                        <p:tgtEl>
+                                          <p:spTgt spid="3">
+                                            <p:txEl>
+                                              <p:pRg st="0" end="0"/>
+                                            </p:txEl>
+                                          </p:spTgt>
+                                        </p:tgtEl>
+                                        <p:attrNameLst>
+                                          <p:attrName>style.visibility</p:attrName>
+                                        </p:attrNameLst>
+                                      </p:cBhvr>
+                                      <p:to>
+                                        <p:strVal val="visible"/>
+                                      </p:to>
+                                    </p:set>
+                                  </p:childTnLst>
+                                </p:cTn>
+                              </p:par>
+                              <p:par>
+                                <p:cTn id="7" presetID="1" presetClass="entr" presetSubtype="0" fill="hold" nodeType="withEffect">
+                                  <p:stCondLst>
+                                    <p:cond delay="0"/>
+                                  </p:stCondLst>
+                                  <p:childTnLst>
+                                    <p:set>
+                                      <p:cBhvr>
+                                        <p:cTn id="8" dur="1" fill="hold">
+                                          <p:stCondLst>
+                                            <p:cond delay="0"/>
+                                          </p:stCondLst>
+                                        </p:cTn>
+                                        <p:tgtEl>
+                                          <p:spTgt spid="7"/>
+                                        </p:tgtEl>
+                                        <p:attrNameLst>
+                                          <p:attrName>style.visibility</p:attrName>
+                                        </p:attrNameLst>
+                                      </p:cBhvr>
+                                      <p:to>
+                                        <p:strVal val="visible"/>
+                                      </p:to>
+                                    </p:set>
+                                  </p:childTnLst>
+                                </p:cTn>
+                              </p:par>
+                            </p:childTnLst>
+                          </p:cTn>
+                        </p:par>
+                      </p:childTnLst>
+                    </p:cTn>
+                  </p:par>
+                  <p:par>
+                    <p:cTn id="9" fill="hold">
+                      <p:stCondLst>
+                        <p:cond delay="indefinite"/>
+                      </p:stCondLst>
+                      <p:childTnLst>
+                        <p:par>
+                          <p:cTn id="10" fill="hold">
+                            <p:stCondLst>
+                              <p:cond delay="0"/>
+                            </p:stCondLst>
+                            <p:childTnLst>
+                              <p:par>
+                                <p:cTn id="11" presetID="1" presetClass="entr" presetSubtype="0" fill="hold" nodeType="clickEffect">
+                                  <p:stCondLst>
+                                    <p:cond delay="0"/>
+                                  </p:stCondLst>
+                                  <p:childTnLst>
+                                    <p:set>
+                                      <p:cBhvr>
+                                        <p:cTn id="12" dur="1" fill="hold">
+                                          <p:stCondLst>
+                                            <p:cond delay="0"/>
+                                          </p:stCondLst>
+                                        </p:cTn>
+                                        <p:tgtEl>
+                                          <p:spTgt spid="13"/>
+                                        </p:tgtEl>
+                                        <p:attrNameLst>
+                                          <p:attrName>style.visibility</p:attrName>
+                                        </p:attrNameLst>
+                                      </p:cBhvr>
+                                      <p:to>
+                                        <p:strVal val="visible"/>
+                                      </p:to>
+                                    </p:set>
+                                  </p:childTnLst>
+                                </p:cTn>
+                              </p:par>
+                            </p:childTnLst>
+                          </p:cTn>
+                        </p:par>
+                      </p:childTnLst>
+                    </p:cTn>
+                  </p:par>
+                </p:childTnLst>
+              </p:cTn>
+              <p:prevCondLst>
+                <p:cond evt="onPrev" delay="0">
+                  <p:tgtEl>
+                    <p:sldTgt/>
+                  </p:tgtEl>
+                </p:cond>
+              </p:prevCondLst>
+              <p:nextCondLst>
+                <p:cond evt="onNext" delay="0">
+                  <p:tgtEl>
+                    <p:sldTgt/>
+                  </p:tgtEl>
+                </p:cond>
+              </p:nextCondLst>
+            </p:seq>
+          </p:childTnLst>
+        </p:cTn>
+      </p:par>
+    </p:tnLst>
+    <p:bldLst>
+      <p:bldP spid="3" grpId="0" uiExpand="1" build="p"/>
+    </p:bldLst>
+  </p:timing>
+</p:sld>
+</file>
+
+<file path=ppt/slides/slide16.xml><?xml version="1.0" encoding="utf-8"?>
+<p:sld xmlns:a="http://schemas.openxmlformats.org/drawingml/2006/main" xmlns:r="http://schemas.openxmlformats.org/officeDocument/2006/relationships" xmlns:p="http://schemas.openxmlformats.org/presentationml/2006/main">
+  <p:cSld>
+    <p:spTree>
+      <p:nvGrpSpPr>
+        <p:cNvPr id="1" name=""/>
+        <p:cNvGrpSpPr/>
+        <p:nvPr/>
+      </p:nvGrpSpPr>
+      <p:grpSpPr>
+        <a:xfrm>
+          <a:off x="0" y="0"/>
+          <a:ext cx="0" cy="0"/>
+          <a:chOff x="0" y="0"/>
+          <a:chExt cx="0" cy="0"/>
+        </a:xfrm>
+      </p:grpSpPr>
+      <p:sp>
+        <p:nvSpPr>
+          <p:cNvPr id="2" name="Title 1"/>
+          <p:cNvSpPr>
+            <a:spLocks noGrp="1"/>
+          </p:cNvSpPr>
+          <p:nvPr>
+            <p:ph type="title"/>
+          </p:nvPr>
+        </p:nvSpPr>
+        <p:spPr/>
+        <p:txBody>
+          <a:bodyPr/>
+          <a:lstStyle/>
+          <a:p>
+            <a:r>
+              <a:rPr lang="en-US" dirty="0" smtClean="0"/>
+              <a:t>Functions</a:t>
+            </a:r>
+            <a:endParaRPr lang="en-US" dirty="0"/>
+          </a:p>
+        </p:txBody>
+      </p:sp>
+      <p:sp>
+        <p:nvSpPr>
+          <p:cNvPr id="3" name="Content Placeholder 2"/>
+          <p:cNvSpPr>
+            <a:spLocks noGrp="1"/>
+          </p:cNvSpPr>
+          <p:nvPr>
+            <p:ph idx="1"/>
+          </p:nvPr>
+        </p:nvSpPr>
+        <p:spPr/>
+        <p:txBody>
+          <a:bodyPr/>
+          <a:lstStyle/>
+          <a:p>
+            <a:r>
+              <a:rPr lang="en-US" dirty="0" smtClean="0"/>
+              <a:t>Function signature = declaration</a:t>
+            </a:r>
+          </a:p>
+          <a:p>
+            <a:pPr lvl="1"/>
+            <a:r>
+              <a:rPr lang="en-US" dirty="0" smtClean="0">
+                <a:cs typeface="Courier New" panose="02070309020205020404" pitchFamily="49" charset="0"/>
+              </a:rPr>
+              <a:t>name</a:t>
+            </a:r>
+          </a:p>
+          <a:p>
+            <a:pPr lvl="1"/>
+            <a:r>
+              <a:rPr lang="en-US" dirty="0" smtClean="0">
+                <a:cs typeface="Courier New" panose="02070309020205020404" pitchFamily="49" charset="0"/>
+              </a:rPr>
+              <a:t>argument types and names (zero or more)</a:t>
+            </a:r>
+          </a:p>
+          <a:p>
+            <a:pPr lvl="1"/>
+            <a:r>
+              <a:rPr lang="en-US" dirty="0" smtClean="0">
+                <a:cs typeface="Courier New" panose="02070309020205020404" pitchFamily="49" charset="0"/>
+              </a:rPr>
+              <a:t>return type</a:t>
+            </a:r>
+          </a:p>
+          <a:p>
+            <a:r>
+              <a:rPr lang="en-US" dirty="0" smtClean="0">
+                <a:cs typeface="Courier New" panose="02070309020205020404" pitchFamily="49" charset="0"/>
+              </a:rPr>
+              <a:t>Function implementation: statements in body</a:t>
+            </a:r>
+          </a:p>
+        </p:txBody>
+      </p:sp>
+      <p:sp>
+        <p:nvSpPr>
+          <p:cNvPr id="4" name="Slide Number Placeholder 3"/>
+          <p:cNvSpPr>
+            <a:spLocks noGrp="1"/>
+          </p:cNvSpPr>
+          <p:nvPr>
+            <p:ph type="sldNum" sz="quarter" idx="12"/>
+          </p:nvPr>
+        </p:nvSpPr>
+        <p:spPr/>
+        <p:txBody>
+          <a:bodyPr/>
+          <a:lstStyle/>
+          <a:p>
+            <a:fld id="{033373DF-BCDA-4600-B448-AFBDB22F4A39}" type="slidenum">
+              <a:rPr lang="en-US" smtClean="0"/>
+              <a:t>16</a:t>
+            </a:fld>
+            <a:endParaRPr lang="en-US"/>
+          </a:p>
+        </p:txBody>
+      </p:sp>
+      <p:sp>
+        <p:nvSpPr>
+          <p:cNvPr id="14" name="TextBox 13"/>
+          <p:cNvSpPr txBox="1"/>
+          <p:nvPr/>
+        </p:nvSpPr>
+        <p:spPr>
+          <a:xfrm>
+            <a:off x="2162479" y="4772481"/>
+            <a:ext cx="4503791" cy="1815882"/>
+          </a:xfrm>
+          <a:prstGeom prst="rect">
+            <a:avLst/>
+          </a:prstGeom>
+          <a:solidFill>
+            <a:schemeClr val="bg1">
+              <a:lumMod val="75000"/>
+            </a:schemeClr>
+          </a:solidFill>
+        </p:spPr>
+        <p:txBody>
+          <a:bodyPr wrap="square" rtlCol="0">
+            <a:spAutoFit/>
+          </a:bodyPr>
+          <a:lstStyle/>
+          <a:p>
+            <a:r>
+              <a:rPr lang="en-US" sz="1600" dirty="0" smtClean="0">
+                <a:latin typeface="Courier New" pitchFamily="49" charset="0"/>
+                <a:cs typeface="Courier New" pitchFamily="49" charset="0"/>
+              </a:rPr>
+              <a:t>#include &lt;</a:t>
+            </a:r>
+            <a:r>
+              <a:rPr lang="en-US" sz="1600" dirty="0" err="1" smtClean="0">
+                <a:latin typeface="Courier New" pitchFamily="49" charset="0"/>
+                <a:cs typeface="Courier New" pitchFamily="49" charset="0"/>
+              </a:rPr>
+              <a:t>cmath</a:t>
+            </a:r>
+            <a:r>
+              <a:rPr lang="en-US" sz="1600" dirty="0" smtClean="0">
+                <a:latin typeface="Courier New" pitchFamily="49" charset="0"/>
+                <a:cs typeface="Courier New" pitchFamily="49" charset="0"/>
+              </a:rPr>
+              <a:t>&gt;</a:t>
+            </a:r>
+          </a:p>
+          <a:p>
+            <a:r>
+              <a:rPr lang="en-US" sz="1600" dirty="0" smtClean="0">
+                <a:latin typeface="Courier New" pitchFamily="49" charset="0"/>
+                <a:cs typeface="Courier New" pitchFamily="49" charset="0"/>
+              </a:rPr>
+              <a:t>…</a:t>
+            </a:r>
+            <a:endParaRPr lang="en-US" sz="1600" dirty="0" smtClean="0">
+              <a:latin typeface="Courier New" pitchFamily="49" charset="0"/>
+              <a:cs typeface="Courier New" pitchFamily="49" charset="0"/>
+            </a:endParaRPr>
+          </a:p>
+          <a:p>
+            <a:r>
+              <a:rPr lang="en-US" sz="1600" dirty="0" smtClean="0">
+                <a:latin typeface="Courier New" pitchFamily="49" charset="0"/>
+                <a:cs typeface="Courier New" pitchFamily="49" charset="0"/>
+              </a:rPr>
+              <a:t>double </a:t>
+            </a:r>
+            <a:r>
+              <a:rPr lang="en-US" sz="1600" dirty="0" err="1" smtClean="0">
+                <a:latin typeface="Courier New" pitchFamily="49" charset="0"/>
+                <a:cs typeface="Courier New" pitchFamily="49" charset="0"/>
+              </a:rPr>
+              <a:t>dist</a:t>
+            </a:r>
+            <a:r>
+              <a:rPr lang="en-US" sz="1600" dirty="0" smtClean="0">
+                <a:latin typeface="Courier New" pitchFamily="49" charset="0"/>
+                <a:cs typeface="Courier New" pitchFamily="49" charset="0"/>
+              </a:rPr>
+              <a:t>(double x, double y) {</a:t>
+            </a:r>
+          </a:p>
+          <a:p>
+            <a:r>
+              <a:rPr lang="en-US" sz="1600" dirty="0">
+                <a:latin typeface="Courier New" pitchFamily="49" charset="0"/>
+                <a:cs typeface="Courier New" pitchFamily="49" charset="0"/>
+              </a:rPr>
+              <a:t> </a:t>
+            </a:r>
+            <a:r>
+              <a:rPr lang="en-US" sz="1600" dirty="0" smtClean="0">
+                <a:latin typeface="Courier New" pitchFamily="49" charset="0"/>
+                <a:cs typeface="Courier New" pitchFamily="49" charset="0"/>
+              </a:rPr>
+              <a:t>   double d = </a:t>
+            </a:r>
+            <a:r>
+              <a:rPr lang="en-US" sz="1600" dirty="0" err="1">
+                <a:latin typeface="Courier New" pitchFamily="49" charset="0"/>
+                <a:cs typeface="Courier New" pitchFamily="49" charset="0"/>
+              </a:rPr>
+              <a:t>sqrt</a:t>
+            </a:r>
+            <a:r>
+              <a:rPr lang="en-US" sz="1600" dirty="0">
+                <a:latin typeface="Courier New" pitchFamily="49" charset="0"/>
+                <a:cs typeface="Courier New" pitchFamily="49" charset="0"/>
+              </a:rPr>
+              <a:t>(x*x + y*y);</a:t>
+            </a:r>
+            <a:endParaRPr lang="en-US" sz="1600" dirty="0" smtClean="0">
+              <a:latin typeface="Courier New" pitchFamily="49" charset="0"/>
+              <a:cs typeface="Courier New" pitchFamily="49" charset="0"/>
+            </a:endParaRPr>
+          </a:p>
+          <a:p>
+            <a:r>
+              <a:rPr lang="en-US" sz="1600" dirty="0">
+                <a:latin typeface="Courier New" pitchFamily="49" charset="0"/>
+                <a:cs typeface="Courier New" pitchFamily="49" charset="0"/>
+              </a:rPr>
+              <a:t> </a:t>
+            </a:r>
+            <a:r>
+              <a:rPr lang="en-US" sz="1600" dirty="0" smtClean="0">
+                <a:latin typeface="Courier New" pitchFamily="49" charset="0"/>
+                <a:cs typeface="Courier New" pitchFamily="49" charset="0"/>
+              </a:rPr>
+              <a:t>   return d;</a:t>
+            </a:r>
+          </a:p>
+          <a:p>
+            <a:r>
+              <a:rPr lang="en-US" sz="1600" dirty="0">
+                <a:latin typeface="Courier New" pitchFamily="49" charset="0"/>
+                <a:cs typeface="Courier New" pitchFamily="49" charset="0"/>
+              </a:rPr>
+              <a:t>}</a:t>
+            </a:r>
+            <a:endParaRPr lang="en-US" sz="1600" dirty="0" smtClean="0">
+              <a:latin typeface="Courier New" pitchFamily="49" charset="0"/>
+              <a:cs typeface="Courier New" pitchFamily="49" charset="0"/>
+            </a:endParaRPr>
+          </a:p>
+          <a:p>
+            <a:r>
+              <a:rPr lang="en-US" sz="1600" dirty="0" smtClean="0">
+                <a:latin typeface="Courier New" pitchFamily="49" charset="0"/>
+                <a:cs typeface="Courier New" pitchFamily="49" charset="0"/>
+              </a:rPr>
+              <a:t>…</a:t>
+            </a:r>
+          </a:p>
+        </p:txBody>
+      </p:sp>
+      <p:grpSp>
+        <p:nvGrpSpPr>
+          <p:cNvPr id="16" name="Group 15"/>
+          <p:cNvGrpSpPr/>
+          <p:nvPr/>
+        </p:nvGrpSpPr>
+        <p:grpSpPr>
+          <a:xfrm>
+            <a:off x="383220" y="5078099"/>
+            <a:ext cx="2614658" cy="494365"/>
+            <a:chOff x="1010358" y="3923306"/>
+            <a:chExt cx="2614658" cy="494365"/>
+          </a:xfrm>
+        </p:grpSpPr>
+        <p:sp>
+          <p:nvSpPr>
+            <p:cNvPr id="17" name="TextBox 16"/>
+            <p:cNvSpPr txBox="1"/>
+            <p:nvPr/>
+          </p:nvSpPr>
+          <p:spPr>
+            <a:xfrm>
+              <a:off x="1010358" y="3923306"/>
+              <a:ext cx="1405464" cy="400110"/>
+            </a:xfrm>
+            <a:prstGeom prst="rect">
+              <a:avLst/>
+            </a:prstGeom>
+            <a:solidFill>
+              <a:schemeClr val="bg1"/>
+            </a:solidFill>
+            <a:ln w="19050">
+              <a:solidFill>
+                <a:srgbClr val="C00000"/>
+              </a:solidFill>
+            </a:ln>
+          </p:spPr>
+          <p:txBody>
+            <a:bodyPr wrap="square" rtlCol="0">
+              <a:spAutoFit/>
+            </a:bodyPr>
+            <a:lstStyle/>
+            <a:p>
+              <a:r>
+                <a:rPr lang="en-US" sz="2000" dirty="0" smtClean="0">
+                  <a:solidFill>
+                    <a:srgbClr val="C00000"/>
+                  </a:solidFill>
+                </a:rPr>
+                <a:t>return type</a:t>
+              </a:r>
+              <a:endParaRPr lang="en-US" sz="2000" dirty="0">
+                <a:solidFill>
+                  <a:srgbClr val="C00000"/>
+                </a:solidFill>
+                <a:latin typeface="Courier New" panose="02070309020205020404" pitchFamily="49" charset="0"/>
+                <a:cs typeface="Courier New" panose="02070309020205020404" pitchFamily="49" charset="0"/>
+              </a:endParaRPr>
+            </a:p>
+          </p:txBody>
+        </p:sp>
+        <p:sp>
+          <p:nvSpPr>
+            <p:cNvPr id="18" name="Rectangle 17"/>
+            <p:cNvSpPr/>
+            <p:nvPr/>
+          </p:nvSpPr>
+          <p:spPr>
+            <a:xfrm>
+              <a:off x="2856209" y="4136827"/>
+              <a:ext cx="768807" cy="280844"/>
+            </a:xfrm>
+            <a:prstGeom prst="rect">
+              <a:avLst/>
+            </a:prstGeom>
+            <a:noFill/>
+            <a:ln w="19050">
+              <a:solidFill>
+                <a:srgbClr val="C00000"/>
+              </a:solidFill>
+            </a:ln>
+          </p:spPr>
+          <p:style>
+            <a:lnRef idx="2">
+              <a:schemeClr val="accent1">
+                <a:shade val="50000"/>
+              </a:schemeClr>
+            </a:lnRef>
+            <a:fillRef idx="1">
+              <a:schemeClr val="accent1"/>
+            </a:fillRef>
+            <a:effectRef idx="0">
+              <a:schemeClr val="accent1"/>
+            </a:effectRef>
+            <a:fontRef idx="minor">
+              <a:schemeClr val="lt1"/>
+            </a:fontRef>
+          </p:style>
+          <p:txBody>
+            <a:bodyPr rtlCol="0" anchor="ctr"/>
+            <a:lstStyle/>
+            <a:p>
+              <a:pPr algn="ctr"/>
+              <a:endParaRPr lang="en-US"/>
+            </a:p>
+          </p:txBody>
+        </p:sp>
+        <p:cxnSp>
+          <p:nvCxnSpPr>
+            <p:cNvPr id="19" name="Straight Arrow Connector 18"/>
+            <p:cNvCxnSpPr>
+              <a:stCxn id="17" idx="3"/>
+              <a:endCxn id="18" idx="1"/>
+            </p:cNvCxnSpPr>
+            <p:nvPr/>
+          </p:nvCxnSpPr>
+          <p:spPr>
+            <a:xfrm>
+              <a:off x="2415822" y="4123361"/>
+              <a:ext cx="440387" cy="153888"/>
+            </a:xfrm>
+            <a:prstGeom prst="straightConnector1">
+              <a:avLst/>
+            </a:prstGeom>
+            <a:ln w="19050">
+              <a:solidFill>
+                <a:srgbClr val="C00000"/>
+              </a:solidFill>
+              <a:tailEnd type="stealth" w="lg" len="lg"/>
+            </a:ln>
+          </p:spPr>
+          <p:style>
+            <a:lnRef idx="1">
+              <a:schemeClr val="accent1"/>
+            </a:lnRef>
+            <a:fillRef idx="0">
+              <a:schemeClr val="accent1"/>
+            </a:fillRef>
+            <a:effectRef idx="0">
+              <a:schemeClr val="accent1"/>
+            </a:effectRef>
+            <a:fontRef idx="minor">
+              <a:schemeClr val="tx1"/>
+            </a:fontRef>
+          </p:style>
+        </p:cxnSp>
+      </p:grpSp>
+      <p:grpSp>
+        <p:nvGrpSpPr>
+          <p:cNvPr id="24" name="Group 23"/>
+          <p:cNvGrpSpPr/>
+          <p:nvPr/>
+        </p:nvGrpSpPr>
+        <p:grpSpPr>
+          <a:xfrm>
+            <a:off x="379991" y="5757209"/>
+            <a:ext cx="3405429" cy="831154"/>
+            <a:chOff x="1007129" y="3503552"/>
+            <a:chExt cx="3405429" cy="831154"/>
+          </a:xfrm>
+        </p:grpSpPr>
+        <p:sp>
+          <p:nvSpPr>
+            <p:cNvPr id="25" name="TextBox 24"/>
+            <p:cNvSpPr txBox="1"/>
+            <p:nvPr/>
+          </p:nvSpPr>
+          <p:spPr>
+            <a:xfrm>
+              <a:off x="1007129" y="3934596"/>
+              <a:ext cx="1475285" cy="400110"/>
+            </a:xfrm>
+            <a:prstGeom prst="rect">
+              <a:avLst/>
+            </a:prstGeom>
+            <a:solidFill>
+              <a:schemeClr val="bg1"/>
+            </a:solidFill>
+            <a:ln w="19050">
+              <a:solidFill>
+                <a:srgbClr val="C00000"/>
+              </a:solidFill>
+            </a:ln>
+          </p:spPr>
+          <p:txBody>
+            <a:bodyPr wrap="square" rtlCol="0">
+              <a:spAutoFit/>
+            </a:bodyPr>
+            <a:lstStyle/>
+            <a:p>
+              <a:r>
+                <a:rPr lang="en-US" sz="2000" dirty="0" smtClean="0">
+                  <a:solidFill>
+                    <a:srgbClr val="C00000"/>
+                  </a:solidFill>
+                </a:rPr>
+                <a:t>return value</a:t>
+              </a:r>
+              <a:endParaRPr lang="en-US" sz="2000" dirty="0">
+                <a:solidFill>
+                  <a:srgbClr val="C00000"/>
+                </a:solidFill>
+                <a:latin typeface="Courier New" panose="02070309020205020404" pitchFamily="49" charset="0"/>
+                <a:cs typeface="Courier New" panose="02070309020205020404" pitchFamily="49" charset="0"/>
+              </a:endParaRPr>
+            </a:p>
+          </p:txBody>
+        </p:sp>
+        <p:sp>
+          <p:nvSpPr>
+            <p:cNvPr id="26" name="Rectangle 25"/>
+            <p:cNvSpPr/>
+            <p:nvPr/>
+          </p:nvSpPr>
+          <p:spPr>
+            <a:xfrm>
+              <a:off x="4154068" y="3503552"/>
+              <a:ext cx="258490" cy="280844"/>
+            </a:xfrm>
+            <a:prstGeom prst="rect">
+              <a:avLst/>
+            </a:prstGeom>
+            <a:noFill/>
+            <a:ln w="19050">
+              <a:solidFill>
+                <a:srgbClr val="C00000"/>
+              </a:solidFill>
+            </a:ln>
+          </p:spPr>
+          <p:style>
+            <a:lnRef idx="2">
+              <a:schemeClr val="accent1">
+                <a:shade val="50000"/>
+              </a:schemeClr>
+            </a:lnRef>
+            <a:fillRef idx="1">
+              <a:schemeClr val="accent1"/>
+            </a:fillRef>
+            <a:effectRef idx="0">
+              <a:schemeClr val="accent1"/>
+            </a:effectRef>
+            <a:fontRef idx="minor">
+              <a:schemeClr val="lt1"/>
+            </a:fontRef>
+          </p:style>
+          <p:txBody>
+            <a:bodyPr rtlCol="0" anchor="ctr"/>
+            <a:lstStyle/>
+            <a:p>
+              <a:pPr algn="ctr"/>
+              <a:endParaRPr lang="en-US"/>
+            </a:p>
+          </p:txBody>
+        </p:sp>
+        <p:cxnSp>
+          <p:nvCxnSpPr>
+            <p:cNvPr id="27" name="Straight Arrow Connector 26"/>
+            <p:cNvCxnSpPr>
+              <a:stCxn id="25" idx="3"/>
+              <a:endCxn id="26" idx="1"/>
+            </p:cNvCxnSpPr>
+            <p:nvPr/>
+          </p:nvCxnSpPr>
+          <p:spPr>
+            <a:xfrm flipV="1">
+              <a:off x="2482414" y="3643974"/>
+              <a:ext cx="1671654" cy="490677"/>
+            </a:xfrm>
+            <a:prstGeom prst="straightConnector1">
+              <a:avLst/>
+            </a:prstGeom>
+            <a:ln w="19050">
+              <a:solidFill>
+                <a:srgbClr val="C00000"/>
+              </a:solidFill>
+              <a:tailEnd type="stealth" w="lg" len="lg"/>
+            </a:ln>
+          </p:spPr>
+          <p:style>
+            <a:lnRef idx="1">
+              <a:schemeClr val="accent1"/>
+            </a:lnRef>
+            <a:fillRef idx="0">
+              <a:schemeClr val="accent1"/>
+            </a:fillRef>
+            <a:effectRef idx="0">
+              <a:schemeClr val="accent1"/>
+            </a:effectRef>
+            <a:fontRef idx="minor">
+              <a:schemeClr val="tx1"/>
+            </a:fontRef>
+          </p:style>
+        </p:cxnSp>
+      </p:grpSp>
+      <p:grpSp>
+        <p:nvGrpSpPr>
+          <p:cNvPr id="31" name="Group 30"/>
+          <p:cNvGrpSpPr/>
+          <p:nvPr/>
+        </p:nvGrpSpPr>
+        <p:grpSpPr>
+          <a:xfrm>
+            <a:off x="3711895" y="4353960"/>
+            <a:ext cx="2462762" cy="1213985"/>
+            <a:chOff x="296846" y="3923306"/>
+            <a:chExt cx="2462762" cy="1213985"/>
+          </a:xfrm>
+        </p:grpSpPr>
+        <p:sp>
+          <p:nvSpPr>
+            <p:cNvPr id="32" name="TextBox 31"/>
+            <p:cNvSpPr txBox="1"/>
+            <p:nvPr/>
+          </p:nvSpPr>
+          <p:spPr>
+            <a:xfrm>
+              <a:off x="1010357" y="3923306"/>
+              <a:ext cx="1749251" cy="400110"/>
+            </a:xfrm>
+            <a:prstGeom prst="rect">
+              <a:avLst/>
+            </a:prstGeom>
+            <a:solidFill>
+              <a:schemeClr val="bg1"/>
+            </a:solidFill>
+            <a:ln w="19050">
+              <a:solidFill>
+                <a:srgbClr val="C00000"/>
+              </a:solidFill>
+            </a:ln>
+          </p:spPr>
+          <p:txBody>
+            <a:bodyPr wrap="square" rtlCol="0">
+              <a:spAutoFit/>
+            </a:bodyPr>
+            <a:lstStyle/>
+            <a:p>
+              <a:r>
+                <a:rPr lang="en-US" sz="2000" dirty="0" smtClean="0">
+                  <a:solidFill>
+                    <a:srgbClr val="C00000"/>
+                  </a:solidFill>
+                </a:rPr>
+                <a:t>argument type</a:t>
+              </a:r>
+              <a:endParaRPr lang="en-US" sz="2000" dirty="0">
+                <a:solidFill>
+                  <a:srgbClr val="C00000"/>
+                </a:solidFill>
+                <a:latin typeface="Courier New" panose="02070309020205020404" pitchFamily="49" charset="0"/>
+                <a:cs typeface="Courier New" panose="02070309020205020404" pitchFamily="49" charset="0"/>
+              </a:endParaRPr>
+            </a:p>
+          </p:txBody>
+        </p:sp>
+        <p:sp>
+          <p:nvSpPr>
+            <p:cNvPr id="33" name="Rectangle 32"/>
+            <p:cNvSpPr/>
+            <p:nvPr/>
+          </p:nvSpPr>
+          <p:spPr>
+            <a:xfrm>
+              <a:off x="296846" y="4856447"/>
+              <a:ext cx="768807" cy="280844"/>
+            </a:xfrm>
+            <a:prstGeom prst="rect">
+              <a:avLst/>
+            </a:prstGeom>
+            <a:noFill/>
+            <a:ln w="19050">
+              <a:solidFill>
+                <a:srgbClr val="C00000"/>
+              </a:solidFill>
+            </a:ln>
+          </p:spPr>
+          <p:style>
+            <a:lnRef idx="2">
+              <a:schemeClr val="accent1">
+                <a:shade val="50000"/>
+              </a:schemeClr>
+            </a:lnRef>
+            <a:fillRef idx="1">
+              <a:schemeClr val="accent1"/>
+            </a:fillRef>
+            <a:effectRef idx="0">
+              <a:schemeClr val="accent1"/>
+            </a:effectRef>
+            <a:fontRef idx="minor">
+              <a:schemeClr val="lt1"/>
+            </a:fontRef>
+          </p:style>
+          <p:txBody>
+            <a:bodyPr rtlCol="0" anchor="ctr"/>
+            <a:lstStyle/>
+            <a:p>
+              <a:pPr algn="ctr"/>
+              <a:endParaRPr lang="en-US"/>
+            </a:p>
+          </p:txBody>
+        </p:sp>
+        <p:cxnSp>
+          <p:nvCxnSpPr>
+            <p:cNvPr id="34" name="Straight Arrow Connector 33"/>
+            <p:cNvCxnSpPr>
+              <a:stCxn id="32" idx="2"/>
+              <a:endCxn id="33" idx="0"/>
+            </p:cNvCxnSpPr>
+            <p:nvPr/>
+          </p:nvCxnSpPr>
+          <p:spPr>
+            <a:xfrm flipH="1">
+              <a:off x="681250" y="4323416"/>
+              <a:ext cx="1203733" cy="533031"/>
+            </a:xfrm>
+            <a:prstGeom prst="straightConnector1">
+              <a:avLst/>
+            </a:prstGeom>
+            <a:ln w="19050">
+              <a:solidFill>
+                <a:srgbClr val="C00000"/>
+              </a:solidFill>
+              <a:tailEnd type="stealth" w="lg" len="lg"/>
+            </a:ln>
+          </p:spPr>
+          <p:style>
+            <a:lnRef idx="1">
+              <a:schemeClr val="accent1"/>
+            </a:lnRef>
+            <a:fillRef idx="0">
+              <a:schemeClr val="accent1"/>
+            </a:fillRef>
+            <a:effectRef idx="0">
+              <a:schemeClr val="accent1"/>
+            </a:effectRef>
+            <a:fontRef idx="minor">
+              <a:schemeClr val="tx1"/>
+            </a:fontRef>
+          </p:style>
+        </p:cxnSp>
+      </p:grpSp>
+      <p:grpSp>
+        <p:nvGrpSpPr>
+          <p:cNvPr id="39" name="Group 38"/>
+          <p:cNvGrpSpPr/>
+          <p:nvPr/>
+        </p:nvGrpSpPr>
+        <p:grpSpPr>
+          <a:xfrm>
+            <a:off x="4523318" y="4351249"/>
+            <a:ext cx="3772153" cy="1214535"/>
+            <a:chOff x="296846" y="3922756"/>
+            <a:chExt cx="3772153" cy="1214535"/>
+          </a:xfrm>
+        </p:grpSpPr>
+        <p:sp>
+          <p:nvSpPr>
+            <p:cNvPr id="40" name="TextBox 39"/>
+            <p:cNvSpPr txBox="1"/>
+            <p:nvPr/>
+          </p:nvSpPr>
+          <p:spPr>
+            <a:xfrm>
+              <a:off x="2148400" y="3922756"/>
+              <a:ext cx="1920599" cy="400110"/>
+            </a:xfrm>
+            <a:prstGeom prst="rect">
+              <a:avLst/>
+            </a:prstGeom>
+            <a:solidFill>
+              <a:schemeClr val="bg1"/>
+            </a:solidFill>
+            <a:ln w="19050">
+              <a:solidFill>
+                <a:srgbClr val="C00000"/>
+              </a:solidFill>
+            </a:ln>
+          </p:spPr>
+          <p:txBody>
+            <a:bodyPr wrap="square" rtlCol="0">
+              <a:spAutoFit/>
+            </a:bodyPr>
+            <a:lstStyle/>
+            <a:p>
+              <a:r>
+                <a:rPr lang="en-US" sz="2000" dirty="0" smtClean="0">
+                  <a:solidFill>
+                    <a:srgbClr val="C00000"/>
+                  </a:solidFill>
+                </a:rPr>
+                <a:t>argument name</a:t>
+              </a:r>
+              <a:endParaRPr lang="en-US" sz="2000" dirty="0">
+                <a:solidFill>
+                  <a:srgbClr val="C00000"/>
+                </a:solidFill>
+                <a:latin typeface="Courier New" panose="02070309020205020404" pitchFamily="49" charset="0"/>
+                <a:cs typeface="Courier New" panose="02070309020205020404" pitchFamily="49" charset="0"/>
+              </a:endParaRPr>
+            </a:p>
+          </p:txBody>
+        </p:sp>
+        <p:sp>
+          <p:nvSpPr>
+            <p:cNvPr id="41" name="Rectangle 40"/>
+            <p:cNvSpPr/>
+            <p:nvPr/>
+          </p:nvSpPr>
+          <p:spPr>
+            <a:xfrm>
+              <a:off x="296846" y="4856447"/>
+              <a:ext cx="254755" cy="280844"/>
+            </a:xfrm>
+            <a:prstGeom prst="rect">
+              <a:avLst/>
+            </a:prstGeom>
+            <a:noFill/>
+            <a:ln w="19050">
+              <a:solidFill>
+                <a:srgbClr val="C00000"/>
+              </a:solidFill>
+            </a:ln>
+          </p:spPr>
+          <p:style>
+            <a:lnRef idx="2">
+              <a:schemeClr val="accent1">
+                <a:shade val="50000"/>
+              </a:schemeClr>
+            </a:lnRef>
+            <a:fillRef idx="1">
+              <a:schemeClr val="accent1"/>
+            </a:fillRef>
+            <a:effectRef idx="0">
+              <a:schemeClr val="accent1"/>
+            </a:effectRef>
+            <a:fontRef idx="minor">
+              <a:schemeClr val="lt1"/>
+            </a:fontRef>
+          </p:style>
+          <p:txBody>
+            <a:bodyPr rtlCol="0" anchor="ctr"/>
+            <a:lstStyle/>
+            <a:p>
+              <a:pPr algn="ctr"/>
+              <a:endParaRPr lang="en-US"/>
+            </a:p>
+          </p:txBody>
+        </p:sp>
+        <p:cxnSp>
+          <p:nvCxnSpPr>
+            <p:cNvPr id="42" name="Straight Arrow Connector 41"/>
+            <p:cNvCxnSpPr>
+              <a:stCxn id="40" idx="2"/>
+              <a:endCxn id="41" idx="0"/>
+            </p:cNvCxnSpPr>
+            <p:nvPr/>
+          </p:nvCxnSpPr>
+          <p:spPr>
+            <a:xfrm flipH="1">
+              <a:off x="424224" y="4322866"/>
+              <a:ext cx="2684476" cy="533581"/>
+            </a:xfrm>
+            <a:prstGeom prst="straightConnector1">
+              <a:avLst/>
+            </a:prstGeom>
+            <a:ln w="19050">
+              <a:solidFill>
+                <a:srgbClr val="C00000"/>
+              </a:solidFill>
+              <a:tailEnd type="stealth" w="lg" len="lg"/>
+            </a:ln>
+          </p:spPr>
+          <p:style>
+            <a:lnRef idx="1">
+              <a:schemeClr val="accent1"/>
+            </a:lnRef>
+            <a:fillRef idx="0">
+              <a:schemeClr val="accent1"/>
+            </a:fillRef>
+            <a:effectRef idx="0">
+              <a:schemeClr val="accent1"/>
+            </a:effectRef>
+            <a:fontRef idx="minor">
+              <a:schemeClr val="tx1"/>
+            </a:fontRef>
+          </p:style>
+        </p:cxnSp>
+      </p:grpSp>
+      <p:grpSp>
+        <p:nvGrpSpPr>
+          <p:cNvPr id="46" name="Group 45"/>
+          <p:cNvGrpSpPr/>
+          <p:nvPr/>
+        </p:nvGrpSpPr>
+        <p:grpSpPr>
+          <a:xfrm>
+            <a:off x="2036169" y="4080062"/>
+            <a:ext cx="1749251" cy="1492402"/>
+            <a:chOff x="-727110" y="3644889"/>
+            <a:chExt cx="1749251" cy="1492402"/>
+          </a:xfrm>
+        </p:grpSpPr>
+        <p:sp>
+          <p:nvSpPr>
+            <p:cNvPr id="47" name="TextBox 46"/>
+            <p:cNvSpPr txBox="1"/>
+            <p:nvPr/>
+          </p:nvSpPr>
+          <p:spPr>
+            <a:xfrm>
+              <a:off x="-727110" y="3644889"/>
+              <a:ext cx="1749251" cy="400110"/>
+            </a:xfrm>
+            <a:prstGeom prst="rect">
+              <a:avLst/>
+            </a:prstGeom>
+            <a:solidFill>
+              <a:schemeClr val="bg1"/>
+            </a:solidFill>
+            <a:ln w="19050">
+              <a:solidFill>
+                <a:srgbClr val="C00000"/>
+              </a:solidFill>
+            </a:ln>
+          </p:spPr>
+          <p:txBody>
+            <a:bodyPr wrap="square" rtlCol="0">
+              <a:spAutoFit/>
+            </a:bodyPr>
+            <a:lstStyle/>
+            <a:p>
+              <a:r>
+                <a:rPr lang="en-US" sz="2000" dirty="0" smtClean="0">
+                  <a:solidFill>
+                    <a:srgbClr val="C00000"/>
+                  </a:solidFill>
+                </a:rPr>
+                <a:t>function name</a:t>
+              </a:r>
+              <a:endParaRPr lang="en-US" sz="2000" dirty="0">
+                <a:solidFill>
+                  <a:srgbClr val="C00000"/>
+                </a:solidFill>
+                <a:latin typeface="Courier New" panose="02070309020205020404" pitchFamily="49" charset="0"/>
+                <a:cs typeface="Courier New" panose="02070309020205020404" pitchFamily="49" charset="0"/>
+              </a:endParaRPr>
+            </a:p>
+          </p:txBody>
+        </p:sp>
+        <p:sp>
+          <p:nvSpPr>
+            <p:cNvPr id="48" name="Rectangle 47"/>
+            <p:cNvSpPr/>
+            <p:nvPr/>
+          </p:nvSpPr>
+          <p:spPr>
+            <a:xfrm>
+              <a:off x="296846" y="4856447"/>
+              <a:ext cx="595787" cy="280844"/>
+            </a:xfrm>
+            <a:prstGeom prst="rect">
+              <a:avLst/>
+            </a:prstGeom>
+            <a:noFill/>
+            <a:ln w="19050">
+              <a:solidFill>
+                <a:srgbClr val="C00000"/>
+              </a:solidFill>
+            </a:ln>
+          </p:spPr>
+          <p:style>
+            <a:lnRef idx="2">
+              <a:schemeClr val="accent1">
+                <a:shade val="50000"/>
+              </a:schemeClr>
+            </a:lnRef>
+            <a:fillRef idx="1">
+              <a:schemeClr val="accent1"/>
+            </a:fillRef>
+            <a:effectRef idx="0">
+              <a:schemeClr val="accent1"/>
+            </a:effectRef>
+            <a:fontRef idx="minor">
+              <a:schemeClr val="lt1"/>
+            </a:fontRef>
+          </p:style>
+          <p:txBody>
+            <a:bodyPr rtlCol="0" anchor="ctr"/>
+            <a:lstStyle/>
+            <a:p>
+              <a:pPr algn="ctr"/>
+              <a:endParaRPr lang="en-US"/>
+            </a:p>
+          </p:txBody>
+        </p:sp>
+        <p:cxnSp>
+          <p:nvCxnSpPr>
+            <p:cNvPr id="49" name="Straight Arrow Connector 48"/>
+            <p:cNvCxnSpPr>
+              <a:stCxn id="47" idx="2"/>
+              <a:endCxn id="48" idx="0"/>
+            </p:cNvCxnSpPr>
+            <p:nvPr/>
+          </p:nvCxnSpPr>
+          <p:spPr>
+            <a:xfrm>
+              <a:off x="147516" y="4044999"/>
+              <a:ext cx="447224" cy="811448"/>
+            </a:xfrm>
+            <a:prstGeom prst="straightConnector1">
+              <a:avLst/>
+            </a:prstGeom>
+            <a:ln w="19050">
+              <a:solidFill>
+                <a:srgbClr val="C00000"/>
+              </a:solidFill>
+              <a:tailEnd type="stealth" w="lg" len="lg"/>
+            </a:ln>
+          </p:spPr>
+          <p:style>
+            <a:lnRef idx="1">
+              <a:schemeClr val="accent1"/>
+            </a:lnRef>
+            <a:fillRef idx="0">
+              <a:schemeClr val="accent1"/>
+            </a:fillRef>
+            <a:effectRef idx="0">
+              <a:schemeClr val="accent1"/>
+            </a:effectRef>
+            <a:fontRef idx="minor">
+              <a:schemeClr val="tx1"/>
+            </a:fontRef>
+          </p:style>
+        </p:cxnSp>
+      </p:grpSp>
+      <p:grpSp>
+        <p:nvGrpSpPr>
+          <p:cNvPr id="62" name="Group 61"/>
+          <p:cNvGrpSpPr/>
+          <p:nvPr/>
+        </p:nvGrpSpPr>
+        <p:grpSpPr>
+          <a:xfrm>
+            <a:off x="6254122" y="5190270"/>
+            <a:ext cx="2520044" cy="847783"/>
+            <a:chOff x="6254122" y="5190270"/>
+            <a:chExt cx="2520044" cy="847783"/>
+          </a:xfrm>
+        </p:grpSpPr>
+        <p:sp>
+          <p:nvSpPr>
+            <p:cNvPr id="53" name="Right Brace 52"/>
+            <p:cNvSpPr/>
+            <p:nvPr/>
+          </p:nvSpPr>
+          <p:spPr>
+            <a:xfrm>
+              <a:off x="6254122" y="5572464"/>
+              <a:ext cx="120750" cy="465589"/>
+            </a:xfrm>
+            <a:prstGeom prst="rightBrace">
+              <a:avLst/>
+            </a:prstGeom>
+            <a:ln w="28575">
+              <a:solidFill>
+                <a:srgbClr val="C00000"/>
+              </a:solidFill>
+            </a:ln>
+          </p:spPr>
+          <p:style>
+            <a:lnRef idx="1">
+              <a:schemeClr val="accent1"/>
+            </a:lnRef>
+            <a:fillRef idx="0">
+              <a:schemeClr val="accent1"/>
+            </a:fillRef>
+            <a:effectRef idx="0">
+              <a:schemeClr val="accent1"/>
+            </a:effectRef>
+            <a:fontRef idx="minor">
+              <a:schemeClr val="tx1"/>
+            </a:fontRef>
+          </p:style>
+          <p:txBody>
+            <a:bodyPr rtlCol="0" anchor="ctr"/>
+            <a:lstStyle/>
+            <a:p>
+              <a:pPr algn="ctr"/>
+              <a:endParaRPr lang="en-US"/>
+            </a:p>
+          </p:txBody>
+        </p:sp>
+        <p:grpSp>
+          <p:nvGrpSpPr>
+            <p:cNvPr id="54" name="Group 53"/>
+            <p:cNvGrpSpPr/>
+            <p:nvPr/>
+          </p:nvGrpSpPr>
+          <p:grpSpPr>
+            <a:xfrm>
+              <a:off x="6454550" y="5190270"/>
+              <a:ext cx="2319616" cy="614988"/>
+              <a:chOff x="-370787" y="3441725"/>
+              <a:chExt cx="2319616" cy="614988"/>
+            </a:xfrm>
+          </p:grpSpPr>
+          <p:sp>
+            <p:nvSpPr>
+              <p:cNvPr id="55" name="TextBox 54"/>
+              <p:cNvSpPr txBox="1"/>
+              <p:nvPr/>
+            </p:nvSpPr>
+            <p:spPr>
+              <a:xfrm>
+                <a:off x="199578" y="3441725"/>
+                <a:ext cx="1749251" cy="400110"/>
+              </a:xfrm>
+              <a:prstGeom prst="rect">
+                <a:avLst/>
+              </a:prstGeom>
+              <a:solidFill>
+                <a:schemeClr val="bg1"/>
+              </a:solidFill>
+              <a:ln w="19050">
+                <a:solidFill>
+                  <a:srgbClr val="C00000"/>
+                </a:solidFill>
+              </a:ln>
+            </p:spPr>
+            <p:txBody>
+              <a:bodyPr wrap="square" rtlCol="0">
+                <a:spAutoFit/>
+              </a:bodyPr>
+              <a:lstStyle/>
+              <a:p>
+                <a:r>
+                  <a:rPr lang="en-US" sz="2000" dirty="0" smtClean="0">
+                    <a:solidFill>
+                      <a:srgbClr val="C00000"/>
+                    </a:solidFill>
+                  </a:rPr>
+                  <a:t>function body</a:t>
+                </a:r>
+                <a:endParaRPr lang="en-US" sz="2000" dirty="0">
+                  <a:solidFill>
+                    <a:srgbClr val="C00000"/>
+                  </a:solidFill>
+                  <a:latin typeface="Courier New" panose="02070309020205020404" pitchFamily="49" charset="0"/>
+                  <a:cs typeface="Courier New" panose="02070309020205020404" pitchFamily="49" charset="0"/>
+                </a:endParaRPr>
+              </a:p>
+            </p:txBody>
+          </p:sp>
+          <p:cxnSp>
+            <p:nvCxnSpPr>
+              <p:cNvPr id="57" name="Straight Arrow Connector 56"/>
+              <p:cNvCxnSpPr>
+                <a:stCxn id="55" idx="1"/>
+              </p:cNvCxnSpPr>
+              <p:nvPr/>
+            </p:nvCxnSpPr>
+            <p:spPr>
+              <a:xfrm flipH="1">
+                <a:off x="-370787" y="3641780"/>
+                <a:ext cx="570365" cy="414933"/>
+              </a:xfrm>
+              <a:prstGeom prst="straightConnector1">
+                <a:avLst/>
+              </a:prstGeom>
+              <a:ln w="19050">
+                <a:solidFill>
+                  <a:srgbClr val="C00000"/>
+                </a:solidFill>
+                <a:tailEnd type="stealth" w="lg" len="lg"/>
+              </a:ln>
+            </p:spPr>
+            <p:style>
+              <a:lnRef idx="1">
+                <a:schemeClr val="accent1"/>
+              </a:lnRef>
+              <a:fillRef idx="0">
+                <a:schemeClr val="accent1"/>
+              </a:fillRef>
+              <a:effectRef idx="0">
+                <a:schemeClr val="accent1"/>
+              </a:effectRef>
+              <a:fontRef idx="minor">
+                <a:schemeClr val="tx1"/>
+              </a:fontRef>
+            </p:style>
+          </p:cxnSp>
+        </p:grpSp>
+      </p:grpSp>
+      <p:sp>
+        <p:nvSpPr>
+          <p:cNvPr id="63" name="TextBox 62"/>
+          <p:cNvSpPr txBox="1"/>
+          <p:nvPr/>
+        </p:nvSpPr>
+        <p:spPr>
+          <a:xfrm>
+            <a:off x="6689027" y="5787820"/>
+            <a:ext cx="1823897" cy="646331"/>
+          </a:xfrm>
+          <a:prstGeom prst="rect">
+            <a:avLst/>
+          </a:prstGeom>
+          <a:solidFill>
+            <a:schemeClr val="bg1"/>
+          </a:solidFill>
+          <a:ln>
+            <a:solidFill>
+              <a:schemeClr val="tx1"/>
+            </a:solidFill>
+          </a:ln>
+        </p:spPr>
+        <p:txBody>
+          <a:bodyPr wrap="none" rtlCol="0">
+            <a:spAutoFit/>
+          </a:bodyPr>
+          <a:lstStyle/>
+          <a:p>
+            <a:r>
+              <a:rPr lang="en-US" dirty="0" smtClean="0">
+                <a:latin typeface="Courier New" panose="02070309020205020404" pitchFamily="49" charset="0"/>
+                <a:cs typeface="Courier New" panose="02070309020205020404" pitchFamily="49" charset="0"/>
+              </a:rPr>
+              <a:t>x</a:t>
+            </a:r>
+            <a:r>
+              <a:rPr lang="en-US" dirty="0" smtClean="0"/>
+              <a:t>, </a:t>
+            </a:r>
+            <a:r>
+              <a:rPr lang="en-US" dirty="0" smtClean="0">
+                <a:latin typeface="Courier New" panose="02070309020205020404" pitchFamily="49" charset="0"/>
+                <a:cs typeface="Courier New" panose="02070309020205020404" pitchFamily="49" charset="0"/>
+              </a:rPr>
+              <a:t>y</a:t>
+            </a:r>
+            <a:r>
+              <a:rPr lang="en-US" dirty="0" smtClean="0"/>
+              <a:t>, </a:t>
+            </a:r>
+            <a:r>
+              <a:rPr lang="en-US" dirty="0" smtClean="0">
+                <a:latin typeface="Courier New" panose="02070309020205020404" pitchFamily="49" charset="0"/>
+                <a:cs typeface="Courier New" panose="02070309020205020404" pitchFamily="49" charset="0"/>
+              </a:rPr>
+              <a:t>d</a:t>
+            </a:r>
+            <a:r>
+              <a:rPr lang="en-US" dirty="0" smtClean="0"/>
+              <a:t> local</a:t>
+            </a:r>
+            <a:br>
+              <a:rPr lang="en-US" dirty="0" smtClean="0"/>
+            </a:br>
+            <a:r>
+              <a:rPr lang="en-US" dirty="0" smtClean="0"/>
+              <a:t>to </a:t>
+            </a:r>
+            <a:r>
+              <a:rPr lang="en-US" dirty="0" err="1" smtClean="0">
+                <a:latin typeface="Courier New" panose="02070309020205020404" pitchFamily="49" charset="0"/>
+                <a:cs typeface="Courier New" panose="02070309020205020404" pitchFamily="49" charset="0"/>
+              </a:rPr>
+              <a:t>dist</a:t>
+            </a:r>
+            <a:r>
+              <a:rPr lang="en-US" dirty="0" smtClean="0"/>
+              <a:t> function</a:t>
+            </a:r>
+            <a:endParaRPr lang="en-US" dirty="0"/>
+          </a:p>
+        </p:txBody>
+      </p:sp>
+    </p:spTree>
+    <p:extLst>
+      <p:ext uri="{BB962C8B-B14F-4D97-AF65-F5344CB8AC3E}">
+        <p14:creationId xmlns:p14="http://schemas.microsoft.com/office/powerpoint/2010/main" val="1041364482"/>
+      </p:ext>
+    </p:extLst>
+  </p:cSld>
+  <p:clrMapOvr>
+    <a:masterClrMapping/>
+  </p:clrMapOvr>
+  <p:timing>
+    <p:tnLst>
+      <p:par>
+        <p:cTn id="1" dur="indefinite" restart="never" nodeType="tmRoot">
+          <p:childTnLst>
+            <p:seq concurrent="1" nextAc="seek">
+              <p:cTn id="2" dur="indefinite" nodeType="mainSeq">
+                <p:childTnLst>
+                  <p:par>
+                    <p:cTn id="3" fill="hold">
+                      <p:stCondLst>
+                        <p:cond delay="indefinite"/>
+                        <p:cond evt="onBegin" delay="0">
+                          <p:tn val="2"/>
+                        </p:cond>
+                      </p:stCondLst>
+                      <p:childTnLst>
+                        <p:par>
+                          <p:cTn id="4" fill="hold">
+                            <p:stCondLst>
+                              <p:cond delay="0"/>
+                            </p:stCondLst>
+                            <p:childTnLst>
+                              <p:par>
+                                <p:cTn id="5" presetID="1" presetClass="entr" presetSubtype="0" fill="hold" grpId="0" nodeType="withEffect">
+                                  <p:stCondLst>
+                                    <p:cond delay="0"/>
+                                  </p:stCondLst>
+                                  <p:childTnLst>
+                                    <p:set>
+                                      <p:cBhvr>
+                                        <p:cTn id="6" dur="1" fill="hold">
+                                          <p:stCondLst>
+                                            <p:cond delay="0"/>
+                                          </p:stCondLst>
+                                        </p:cTn>
+                                        <p:tgtEl>
+                                          <p:spTgt spid="3">
+                                            <p:txEl>
+                                              <p:pRg st="0" end="0"/>
+                                            </p:txEl>
+                                          </p:spTgt>
+                                        </p:tgtEl>
+                                        <p:attrNameLst>
+                                          <p:attrName>style.visibility</p:attrName>
+                                        </p:attrNameLst>
+                                      </p:cBhvr>
+                                      <p:to>
+                                        <p:strVal val="visible"/>
+                                      </p:to>
+                                    </p:set>
+                                  </p:childTnLst>
+                                </p:cTn>
+                              </p:par>
+                            </p:childTnLst>
+                          </p:cTn>
+                        </p:par>
+                      </p:childTnLst>
+                    </p:cTn>
+                  </p:par>
+                  <p:par>
+                    <p:cTn id="7" fill="hold">
+                      <p:stCondLst>
+                        <p:cond delay="indefinite"/>
+                      </p:stCondLst>
+                      <p:childTnLst>
+                        <p:par>
+                          <p:cTn id="8" fill="hold">
+                            <p:stCondLst>
+                              <p:cond delay="0"/>
+                            </p:stCondLst>
+                            <p:childTnLst>
+                              <p:par>
+                                <p:cTn id="9" presetID="1" presetClass="entr" presetSubtype="0" fill="hold" grpId="0" nodeType="clickEffect">
+                                  <p:stCondLst>
+                                    <p:cond delay="0"/>
+                                  </p:stCondLst>
+                                  <p:childTnLst>
+                                    <p:set>
+                                      <p:cBhvr>
+                                        <p:cTn id="10" dur="1" fill="hold">
+                                          <p:stCondLst>
+                                            <p:cond delay="0"/>
+                                          </p:stCondLst>
+                                        </p:cTn>
+                                        <p:tgtEl>
+                                          <p:spTgt spid="3">
+                                            <p:txEl>
+                                              <p:pRg st="1" end="1"/>
+                                            </p:txEl>
+                                          </p:spTgt>
+                                        </p:tgtEl>
+                                        <p:attrNameLst>
+                                          <p:attrName>style.visibility</p:attrName>
+                                        </p:attrNameLst>
+                                      </p:cBhvr>
+                                      <p:to>
+                                        <p:strVal val="visible"/>
+                                      </p:to>
+                                    </p:set>
+                                  </p:childTnLst>
+                                </p:cTn>
+                              </p:par>
+                              <p:par>
+                                <p:cTn id="11" presetID="1" presetClass="entr" presetSubtype="0" fill="hold" nodeType="withEffect">
+                                  <p:stCondLst>
+                                    <p:cond delay="0"/>
+                                  </p:stCondLst>
+                                  <p:childTnLst>
+                                    <p:set>
+                                      <p:cBhvr>
+                                        <p:cTn id="12" dur="1" fill="hold">
+                                          <p:stCondLst>
+                                            <p:cond delay="0"/>
+                                          </p:stCondLst>
+                                        </p:cTn>
+                                        <p:tgtEl>
+                                          <p:spTgt spid="46"/>
+                                        </p:tgtEl>
+                                        <p:attrNameLst>
+                                          <p:attrName>style.visibility</p:attrName>
+                                        </p:attrNameLst>
+                                      </p:cBhvr>
+                                      <p:to>
+                                        <p:strVal val="visible"/>
+                                      </p:to>
+                                    </p:set>
+                                  </p:childTnLst>
+                                </p:cTn>
+                              </p:par>
+                            </p:childTnLst>
+                          </p:cTn>
+                        </p:par>
+                      </p:childTnLst>
+                    </p:cTn>
+                  </p:par>
+                  <p:par>
+                    <p:cTn id="13" fill="hold">
+                      <p:stCondLst>
+                        <p:cond delay="indefinite"/>
+                      </p:stCondLst>
+                      <p:childTnLst>
+                        <p:par>
+                          <p:cTn id="14" fill="hold">
+                            <p:stCondLst>
+                              <p:cond delay="0"/>
+                            </p:stCondLst>
+                            <p:childTnLst>
+                              <p:par>
+                                <p:cTn id="15" presetID="1" presetClass="entr" presetSubtype="0" fill="hold" grpId="0" nodeType="clickEffect">
+                                  <p:stCondLst>
+                                    <p:cond delay="0"/>
+                                  </p:stCondLst>
+                                  <p:childTnLst>
+                                    <p:set>
+                                      <p:cBhvr>
+                                        <p:cTn id="16" dur="1" fill="hold">
+                                          <p:stCondLst>
+                                            <p:cond delay="0"/>
+                                          </p:stCondLst>
+                                        </p:cTn>
+                                        <p:tgtEl>
+                                          <p:spTgt spid="3">
+                                            <p:txEl>
+                                              <p:pRg st="2" end="2"/>
+                                            </p:txEl>
+                                          </p:spTgt>
+                                        </p:tgtEl>
+                                        <p:attrNameLst>
+                                          <p:attrName>style.visibility</p:attrName>
+                                        </p:attrNameLst>
+                                      </p:cBhvr>
+                                      <p:to>
+                                        <p:strVal val="visible"/>
+                                      </p:to>
+                                    </p:set>
+                                  </p:childTnLst>
+                                </p:cTn>
+                              </p:par>
+                              <p:par>
+                                <p:cTn id="17" presetID="1" presetClass="entr" presetSubtype="0" fill="hold" nodeType="withEffect">
+                                  <p:stCondLst>
+                                    <p:cond delay="0"/>
+                                  </p:stCondLst>
+                                  <p:childTnLst>
+                                    <p:set>
+                                      <p:cBhvr>
+                                        <p:cTn id="18" dur="1" fill="hold">
+                                          <p:stCondLst>
+                                            <p:cond delay="0"/>
+                                          </p:stCondLst>
+                                        </p:cTn>
+                                        <p:tgtEl>
+                                          <p:spTgt spid="31"/>
+                                        </p:tgtEl>
+                                        <p:attrNameLst>
+                                          <p:attrName>style.visibility</p:attrName>
+                                        </p:attrNameLst>
+                                      </p:cBhvr>
+                                      <p:to>
+                                        <p:strVal val="visible"/>
+                                      </p:to>
+                                    </p:set>
+                                  </p:childTnLst>
+                                </p:cTn>
+                              </p:par>
+                              <p:par>
+                                <p:cTn id="19" presetID="1" presetClass="entr" presetSubtype="0" fill="hold" nodeType="withEffect">
+                                  <p:stCondLst>
+                                    <p:cond delay="0"/>
+                                  </p:stCondLst>
+                                  <p:childTnLst>
+                                    <p:set>
+                                      <p:cBhvr>
+                                        <p:cTn id="20" dur="1" fill="hold">
+                                          <p:stCondLst>
+                                            <p:cond delay="0"/>
+                                          </p:stCondLst>
+                                        </p:cTn>
+                                        <p:tgtEl>
+                                          <p:spTgt spid="39"/>
+                                        </p:tgtEl>
+                                        <p:attrNameLst>
+                                          <p:attrName>style.visibility</p:attrName>
+                                        </p:attrNameLst>
+                                      </p:cBhvr>
+                                      <p:to>
+                                        <p:strVal val="visible"/>
+                                      </p:to>
+                                    </p:set>
+                                  </p:childTnLst>
+                                </p:cTn>
+                              </p:par>
+                            </p:childTnLst>
+                          </p:cTn>
+                        </p:par>
+                      </p:childTnLst>
+                    </p:cTn>
+                  </p:par>
+                  <p:par>
+                    <p:cTn id="21" fill="hold">
+                      <p:stCondLst>
+                        <p:cond delay="indefinite"/>
+                      </p:stCondLst>
+                      <p:childTnLst>
+                        <p:par>
+                          <p:cTn id="22" fill="hold">
+                            <p:stCondLst>
+                              <p:cond delay="0"/>
+                            </p:stCondLst>
+                            <p:childTnLst>
+                              <p:par>
+                                <p:cTn id="23" presetID="1" presetClass="entr" presetSubtype="0" fill="hold" grpId="0" nodeType="clickEffect">
+                                  <p:stCondLst>
+                                    <p:cond delay="0"/>
+                                  </p:stCondLst>
+                                  <p:childTnLst>
+                                    <p:set>
+                                      <p:cBhvr>
+                                        <p:cTn id="24" dur="1" fill="hold">
+                                          <p:stCondLst>
+                                            <p:cond delay="0"/>
+                                          </p:stCondLst>
+                                        </p:cTn>
+                                        <p:tgtEl>
+                                          <p:spTgt spid="3">
+                                            <p:txEl>
+                                              <p:pRg st="3" end="3"/>
+                                            </p:txEl>
+                                          </p:spTgt>
+                                        </p:tgtEl>
+                                        <p:attrNameLst>
+                                          <p:attrName>style.visibility</p:attrName>
+                                        </p:attrNameLst>
+                                      </p:cBhvr>
+                                      <p:to>
+                                        <p:strVal val="visible"/>
+                                      </p:to>
+                                    </p:set>
+                                  </p:childTnLst>
+                                </p:cTn>
+                              </p:par>
+                              <p:par>
+                                <p:cTn id="25" presetID="1" presetClass="entr" presetSubtype="0" fill="hold" nodeType="withEffect">
+                                  <p:stCondLst>
+                                    <p:cond delay="0"/>
+                                  </p:stCondLst>
+                                  <p:childTnLst>
+                                    <p:set>
+                                      <p:cBhvr>
+                                        <p:cTn id="26" dur="1" fill="hold">
+                                          <p:stCondLst>
+                                            <p:cond delay="0"/>
+                                          </p:stCondLst>
+                                        </p:cTn>
+                                        <p:tgtEl>
+                                          <p:spTgt spid="16"/>
+                                        </p:tgtEl>
+                                        <p:attrNameLst>
+                                          <p:attrName>style.visibility</p:attrName>
+                                        </p:attrNameLst>
+                                      </p:cBhvr>
+                                      <p:to>
+                                        <p:strVal val="visible"/>
+                                      </p:to>
+                                    </p:set>
+                                  </p:childTnLst>
+                                </p:cTn>
+                              </p:par>
+                            </p:childTnLst>
+                          </p:cTn>
+                        </p:par>
+                      </p:childTnLst>
+                    </p:cTn>
+                  </p:par>
+                  <p:par>
+                    <p:cTn id="27" fill="hold">
+                      <p:stCondLst>
+                        <p:cond delay="indefinite"/>
+                      </p:stCondLst>
+                      <p:childTnLst>
+                        <p:par>
+                          <p:cTn id="28" fill="hold">
+                            <p:stCondLst>
+                              <p:cond delay="0"/>
+                            </p:stCondLst>
+                            <p:childTnLst>
+                              <p:par>
+                                <p:cTn id="29" presetID="1" presetClass="entr" presetSubtype="0" fill="hold" grpId="0" nodeType="clickEffect">
+                                  <p:stCondLst>
+                                    <p:cond delay="0"/>
+                                  </p:stCondLst>
+                                  <p:childTnLst>
+                                    <p:set>
+                                      <p:cBhvr>
+                                        <p:cTn id="30" dur="1" fill="hold">
+                                          <p:stCondLst>
+                                            <p:cond delay="0"/>
+                                          </p:stCondLst>
+                                        </p:cTn>
+                                        <p:tgtEl>
+                                          <p:spTgt spid="3">
+                                            <p:txEl>
+                                              <p:pRg st="4" end="4"/>
+                                            </p:txEl>
+                                          </p:spTgt>
+                                        </p:tgtEl>
+                                        <p:attrNameLst>
+                                          <p:attrName>style.visibility</p:attrName>
+                                        </p:attrNameLst>
+                                      </p:cBhvr>
+                                      <p:to>
+                                        <p:strVal val="visible"/>
+                                      </p:to>
+                                    </p:set>
+                                  </p:childTnLst>
+                                </p:cTn>
+                              </p:par>
+                              <p:par>
+                                <p:cTn id="31" presetID="1" presetClass="entr" presetSubtype="0" fill="hold" nodeType="withEffect">
+                                  <p:stCondLst>
+                                    <p:cond delay="0"/>
+                                  </p:stCondLst>
+                                  <p:childTnLst>
+                                    <p:set>
+                                      <p:cBhvr>
+                                        <p:cTn id="32" dur="1" fill="hold">
+                                          <p:stCondLst>
+                                            <p:cond delay="0"/>
+                                          </p:stCondLst>
+                                        </p:cTn>
+                                        <p:tgtEl>
+                                          <p:spTgt spid="62"/>
+                                        </p:tgtEl>
+                                        <p:attrNameLst>
+                                          <p:attrName>style.visibility</p:attrName>
+                                        </p:attrNameLst>
+                                      </p:cBhvr>
+                                      <p:to>
+                                        <p:strVal val="visible"/>
+                                      </p:to>
+                                    </p:set>
+                                  </p:childTnLst>
+                                </p:cTn>
+                              </p:par>
+                            </p:childTnLst>
+                          </p:cTn>
+                        </p:par>
+                      </p:childTnLst>
+                    </p:cTn>
+                  </p:par>
+                  <p:par>
+                    <p:cTn id="33" fill="hold">
+                      <p:stCondLst>
+                        <p:cond delay="indefinite"/>
+                      </p:stCondLst>
+                      <p:childTnLst>
+                        <p:par>
+                          <p:cTn id="34" fill="hold">
+                            <p:stCondLst>
+                              <p:cond delay="0"/>
+                            </p:stCondLst>
+                            <p:childTnLst>
+                              <p:par>
+                                <p:cTn id="35" presetID="1" presetClass="entr" presetSubtype="0" fill="hold" nodeType="clickEffect">
+                                  <p:stCondLst>
+                                    <p:cond delay="0"/>
+                                  </p:stCondLst>
+                                  <p:childTnLst>
+                                    <p:set>
+                                      <p:cBhvr>
+                                        <p:cTn id="36" dur="1" fill="hold">
+                                          <p:stCondLst>
+                                            <p:cond delay="0"/>
+                                          </p:stCondLst>
+                                        </p:cTn>
+                                        <p:tgtEl>
+                                          <p:spTgt spid="24"/>
+                                        </p:tgtEl>
+                                        <p:attrNameLst>
+                                          <p:attrName>style.visibility</p:attrName>
+                                        </p:attrNameLst>
+                                      </p:cBhvr>
+                                      <p:to>
+                                        <p:strVal val="visible"/>
+                                      </p:to>
+                                    </p:set>
+                                  </p:childTnLst>
+                                </p:cTn>
+                              </p:par>
+                            </p:childTnLst>
+                          </p:cTn>
+                        </p:par>
+                      </p:childTnLst>
+                    </p:cTn>
+                  </p:par>
+                  <p:par>
+                    <p:cTn id="37" fill="hold">
+                      <p:stCondLst>
+                        <p:cond delay="indefinite"/>
+                      </p:stCondLst>
+                      <p:childTnLst>
+                        <p:par>
+                          <p:cTn id="38" fill="hold">
+                            <p:stCondLst>
+                              <p:cond delay="0"/>
+                            </p:stCondLst>
+                            <p:childTnLst>
+                              <p:par>
+                                <p:cTn id="39" presetID="1" presetClass="entr" presetSubtype="0" fill="hold" grpId="0" nodeType="clickEffect">
+                                  <p:stCondLst>
+                                    <p:cond delay="0"/>
+                                  </p:stCondLst>
+                                  <p:childTnLst>
+                                    <p:set>
+                                      <p:cBhvr>
+                                        <p:cTn id="40" dur="1" fill="hold">
+                                          <p:stCondLst>
+                                            <p:cond delay="0"/>
+                                          </p:stCondLst>
+                                        </p:cTn>
+                                        <p:tgtEl>
+                                          <p:spTgt spid="63"/>
+                                        </p:tgtEl>
+                                        <p:attrNameLst>
+                                          <p:attrName>style.visibility</p:attrName>
+                                        </p:attrNameLst>
+                                      </p:cBhvr>
+                                      <p:to>
+                                        <p:strVal val="visible"/>
+                                      </p:to>
+                                    </p:set>
+                                  </p:childTnLst>
+                                </p:cTn>
+                              </p:par>
+                            </p:childTnLst>
+                          </p:cTn>
+                        </p:par>
+                      </p:childTnLst>
+                    </p:cTn>
+                  </p:par>
+                </p:childTnLst>
+              </p:cTn>
+              <p:prevCondLst>
+                <p:cond evt="onPrev" delay="0">
+                  <p:tgtEl>
+                    <p:sldTgt/>
+                  </p:tgtEl>
+                </p:cond>
+              </p:prevCondLst>
+              <p:nextCondLst>
+                <p:cond evt="onNext" delay="0">
+                  <p:tgtEl>
+                    <p:sldTgt/>
+                  </p:tgtEl>
+                </p:cond>
+              </p:nextCondLst>
+            </p:seq>
+          </p:childTnLst>
+        </p:cTn>
+      </p:par>
+    </p:tnLst>
+    <p:bldLst>
+      <p:bldP spid="3" grpId="0" uiExpand="1" build="p" bldLvl="2"/>
+      <p:bldP spid="63" grpId="0" animBg="1"/>
+    </p:bldLst>
+  </p:timing>
+</p:sld>
+</file>
+
+<file path=ppt/slides/slide17.xml><?xml version="1.0" encoding="utf-8"?>
+<p:sld xmlns:a="http://schemas.openxmlformats.org/drawingml/2006/main" xmlns:r="http://schemas.openxmlformats.org/officeDocument/2006/relationships" xmlns:p="http://schemas.openxmlformats.org/presentationml/2006/main">
+  <p:cSld>
+    <p:spTree>
+      <p:nvGrpSpPr>
+        <p:cNvPr id="1" name=""/>
+        <p:cNvGrpSpPr/>
+        <p:nvPr/>
+      </p:nvGrpSpPr>
+      <p:grpSpPr>
+        <a:xfrm>
+          <a:off x="0" y="0"/>
+          <a:ext cx="0" cy="0"/>
+          <a:chOff x="0" y="0"/>
+          <a:chExt cx="0" cy="0"/>
+        </a:xfrm>
+      </p:grpSpPr>
+      <p:sp>
+        <p:nvSpPr>
+          <p:cNvPr id="2" name="Title 1"/>
+          <p:cNvSpPr>
+            <a:spLocks noGrp="1"/>
+          </p:cNvSpPr>
+          <p:nvPr>
+            <p:ph type="title"/>
+          </p:nvPr>
+        </p:nvSpPr>
+        <p:spPr/>
+        <p:txBody>
+          <a:bodyPr/>
+          <a:lstStyle/>
+          <a:p>
+            <a:r>
+              <a:rPr lang="en-US" dirty="0" smtClean="0"/>
+              <a:t>Data in, results out</a:t>
+            </a:r>
+            <a:endParaRPr lang="en-US" dirty="0"/>
+          </a:p>
+        </p:txBody>
+      </p:sp>
+      <p:sp>
+        <p:nvSpPr>
+          <p:cNvPr id="4" name="Slide Number Placeholder 3"/>
+          <p:cNvSpPr>
+            <a:spLocks noGrp="1"/>
+          </p:cNvSpPr>
+          <p:nvPr>
+            <p:ph type="sldNum" sz="quarter" idx="12"/>
+          </p:nvPr>
+        </p:nvSpPr>
+        <p:spPr/>
+        <p:txBody>
+          <a:bodyPr/>
+          <a:lstStyle/>
+          <a:p>
+            <a:fld id="{033373DF-BCDA-4600-B448-AFBDB22F4A39}" type="slidenum">
+              <a:rPr lang="en-US" smtClean="0"/>
+              <a:t>17</a:t>
+            </a:fld>
+            <a:endParaRPr lang="en-US"/>
+          </a:p>
+        </p:txBody>
+      </p:sp>
+      <p:sp>
+        <p:nvSpPr>
+          <p:cNvPr id="5" name="TextBox 4"/>
+          <p:cNvSpPr txBox="1"/>
+          <p:nvPr/>
+        </p:nvSpPr>
+        <p:spPr>
+          <a:xfrm>
+            <a:off x="707306" y="1576997"/>
+            <a:ext cx="6244101" cy="4031873"/>
+          </a:xfrm>
+          <a:prstGeom prst="rect">
+            <a:avLst/>
+          </a:prstGeom>
+          <a:solidFill>
+            <a:schemeClr val="bg1">
+              <a:lumMod val="75000"/>
+            </a:schemeClr>
+          </a:solidFill>
+        </p:spPr>
+        <p:txBody>
+          <a:bodyPr wrap="square" rtlCol="0">
+            <a:spAutoFit/>
+          </a:bodyPr>
+          <a:lstStyle/>
+          <a:p>
+            <a:r>
+              <a:rPr lang="en-US" sz="1600" dirty="0">
+                <a:latin typeface="Courier New" pitchFamily="49" charset="0"/>
+                <a:cs typeface="Courier New" pitchFamily="49" charset="0"/>
+              </a:rPr>
+              <a:t>#include &lt;</a:t>
+            </a:r>
+            <a:r>
+              <a:rPr lang="en-US" sz="1600" dirty="0" err="1">
+                <a:latin typeface="Courier New" pitchFamily="49" charset="0"/>
+                <a:cs typeface="Courier New" pitchFamily="49" charset="0"/>
+              </a:rPr>
+              <a:t>iostream</a:t>
+            </a:r>
+            <a:r>
+              <a:rPr lang="en-US" sz="1600" dirty="0">
+                <a:latin typeface="Courier New" pitchFamily="49" charset="0"/>
+                <a:cs typeface="Courier New" pitchFamily="49" charset="0"/>
+              </a:rPr>
+              <a:t>&gt;</a:t>
+            </a:r>
+          </a:p>
+          <a:p>
+            <a:r>
+              <a:rPr lang="en-US" sz="1600" dirty="0">
+                <a:latin typeface="Courier New" pitchFamily="49" charset="0"/>
+                <a:cs typeface="Courier New" pitchFamily="49" charset="0"/>
+              </a:rPr>
+              <a:t>#include &lt;</a:t>
+            </a:r>
+            <a:r>
+              <a:rPr lang="en-US" sz="1600" dirty="0" err="1">
+                <a:latin typeface="Courier New" pitchFamily="49" charset="0"/>
+                <a:cs typeface="Courier New" pitchFamily="49" charset="0"/>
+              </a:rPr>
+              <a:t>cmath</a:t>
+            </a:r>
+            <a:r>
+              <a:rPr lang="en-US" sz="1600" dirty="0">
+                <a:latin typeface="Courier New" pitchFamily="49" charset="0"/>
+                <a:cs typeface="Courier New" pitchFamily="49" charset="0"/>
+              </a:rPr>
+              <a:t>&gt;</a:t>
+            </a:r>
+          </a:p>
+          <a:p>
+            <a:endParaRPr lang="en-US" sz="1600" dirty="0">
+              <a:latin typeface="Courier New" pitchFamily="49" charset="0"/>
+              <a:cs typeface="Courier New" pitchFamily="49" charset="0"/>
+            </a:endParaRPr>
+          </a:p>
+          <a:p>
+            <a:r>
+              <a:rPr lang="en-US" sz="1600" dirty="0">
+                <a:latin typeface="Courier New" pitchFamily="49" charset="0"/>
+                <a:cs typeface="Courier New" pitchFamily="49" charset="0"/>
+              </a:rPr>
+              <a:t>using namespace </a:t>
+            </a:r>
+            <a:r>
+              <a:rPr lang="en-US" sz="1600" dirty="0" err="1">
+                <a:latin typeface="Courier New" pitchFamily="49" charset="0"/>
+                <a:cs typeface="Courier New" pitchFamily="49" charset="0"/>
+              </a:rPr>
+              <a:t>std</a:t>
+            </a:r>
+            <a:r>
+              <a:rPr lang="en-US" sz="1600" dirty="0">
+                <a:latin typeface="Courier New" pitchFamily="49" charset="0"/>
+                <a:cs typeface="Courier New" pitchFamily="49" charset="0"/>
+              </a:rPr>
+              <a:t>;</a:t>
+            </a:r>
+          </a:p>
+          <a:p>
+            <a:endParaRPr lang="en-US" sz="1600" dirty="0">
+              <a:latin typeface="Courier New" pitchFamily="49" charset="0"/>
+              <a:cs typeface="Courier New" pitchFamily="49" charset="0"/>
+            </a:endParaRPr>
+          </a:p>
+          <a:p>
+            <a:r>
+              <a:rPr lang="en-US" sz="1600" dirty="0">
+                <a:latin typeface="Courier New" pitchFamily="49" charset="0"/>
+                <a:cs typeface="Courier New" pitchFamily="49" charset="0"/>
+              </a:rPr>
+              <a:t>double </a:t>
+            </a:r>
+            <a:r>
+              <a:rPr lang="en-US" sz="1600" dirty="0" err="1">
+                <a:latin typeface="Courier New" pitchFamily="49" charset="0"/>
+                <a:cs typeface="Courier New" pitchFamily="49" charset="0"/>
+              </a:rPr>
+              <a:t>dist</a:t>
+            </a:r>
+            <a:r>
+              <a:rPr lang="en-US" sz="1600" dirty="0">
+                <a:latin typeface="Courier New" pitchFamily="49" charset="0"/>
+                <a:cs typeface="Courier New" pitchFamily="49" charset="0"/>
+              </a:rPr>
+              <a:t>(double x, double y) {</a:t>
+            </a:r>
+          </a:p>
+          <a:p>
+            <a:r>
+              <a:rPr lang="en-US" sz="1600" dirty="0">
+                <a:latin typeface="Courier New" pitchFamily="49" charset="0"/>
+                <a:cs typeface="Courier New" pitchFamily="49" charset="0"/>
+              </a:rPr>
+              <a:t>    return </a:t>
+            </a:r>
+            <a:r>
+              <a:rPr lang="en-US" sz="1600" dirty="0" err="1">
+                <a:latin typeface="Courier New" pitchFamily="49" charset="0"/>
+                <a:cs typeface="Courier New" pitchFamily="49" charset="0"/>
+              </a:rPr>
+              <a:t>sqrt</a:t>
+            </a:r>
+            <a:r>
+              <a:rPr lang="en-US" sz="1600" dirty="0">
+                <a:latin typeface="Courier New" pitchFamily="49" charset="0"/>
+                <a:cs typeface="Courier New" pitchFamily="49" charset="0"/>
+              </a:rPr>
+              <a:t>(x*x + y*y);</a:t>
+            </a:r>
+          </a:p>
+          <a:p>
+            <a:r>
+              <a:rPr lang="en-US" sz="1600" dirty="0">
+                <a:latin typeface="Courier New" pitchFamily="49" charset="0"/>
+                <a:cs typeface="Courier New" pitchFamily="49" charset="0"/>
+              </a:rPr>
+              <a:t>}</a:t>
+            </a:r>
+          </a:p>
+          <a:p>
+            <a:endParaRPr lang="en-US" sz="1600" dirty="0">
+              <a:latin typeface="Courier New" pitchFamily="49" charset="0"/>
+              <a:cs typeface="Courier New" pitchFamily="49" charset="0"/>
+            </a:endParaRPr>
+          </a:p>
+          <a:p>
+            <a:r>
+              <a:rPr lang="en-US" sz="1600" dirty="0" err="1">
+                <a:latin typeface="Courier New" pitchFamily="49" charset="0"/>
+                <a:cs typeface="Courier New" pitchFamily="49" charset="0"/>
+              </a:rPr>
+              <a:t>int</a:t>
+            </a:r>
+            <a:r>
+              <a:rPr lang="en-US" sz="1600" dirty="0">
+                <a:latin typeface="Courier New" pitchFamily="49" charset="0"/>
+                <a:cs typeface="Courier New" pitchFamily="49" charset="0"/>
+              </a:rPr>
+              <a:t> main() {</a:t>
+            </a:r>
+          </a:p>
+          <a:p>
+            <a:r>
+              <a:rPr lang="en-US" sz="1600" dirty="0">
+                <a:latin typeface="Courier New" pitchFamily="49" charset="0"/>
+                <a:cs typeface="Courier New" pitchFamily="49" charset="0"/>
+              </a:rPr>
+              <a:t>    double a, b;</a:t>
+            </a:r>
+          </a:p>
+          <a:p>
+            <a:r>
+              <a:rPr lang="en-US" sz="1600" dirty="0">
+                <a:latin typeface="Courier New" pitchFamily="49" charset="0"/>
+                <a:cs typeface="Courier New" pitchFamily="49" charset="0"/>
+              </a:rPr>
+              <a:t>    while (</a:t>
+            </a:r>
+            <a:r>
+              <a:rPr lang="en-US" sz="1600" dirty="0" err="1">
+                <a:latin typeface="Courier New" pitchFamily="49" charset="0"/>
+                <a:cs typeface="Courier New" pitchFamily="49" charset="0"/>
+              </a:rPr>
+              <a:t>cin</a:t>
+            </a:r>
+            <a:r>
+              <a:rPr lang="en-US" sz="1600" dirty="0">
+                <a:latin typeface="Courier New" pitchFamily="49" charset="0"/>
+                <a:cs typeface="Courier New" pitchFamily="49" charset="0"/>
+              </a:rPr>
+              <a:t> &gt;&gt; a &gt;&gt; b) {</a:t>
+            </a:r>
+          </a:p>
+          <a:p>
+            <a:r>
+              <a:rPr lang="en-US" sz="1600" dirty="0">
+                <a:latin typeface="Courier New" pitchFamily="49" charset="0"/>
+                <a:cs typeface="Courier New" pitchFamily="49" charset="0"/>
+              </a:rPr>
+              <a:t>        </a:t>
+            </a:r>
+            <a:r>
+              <a:rPr lang="en-US" sz="1600" dirty="0" err="1">
+                <a:latin typeface="Courier New" pitchFamily="49" charset="0"/>
+                <a:cs typeface="Courier New" pitchFamily="49" charset="0"/>
+              </a:rPr>
+              <a:t>cout</a:t>
+            </a:r>
+            <a:r>
+              <a:rPr lang="en-US" sz="1600" dirty="0">
+                <a:latin typeface="Courier New" pitchFamily="49" charset="0"/>
+                <a:cs typeface="Courier New" pitchFamily="49" charset="0"/>
+              </a:rPr>
+              <a:t> &lt;&lt; </a:t>
+            </a:r>
+            <a:r>
+              <a:rPr lang="en-US" sz="1600" dirty="0" err="1">
+                <a:latin typeface="Courier New" pitchFamily="49" charset="0"/>
+                <a:cs typeface="Courier New" pitchFamily="49" charset="0"/>
+              </a:rPr>
+              <a:t>dist</a:t>
+            </a:r>
+            <a:r>
+              <a:rPr lang="en-US" sz="1600" dirty="0">
+                <a:latin typeface="Courier New" pitchFamily="49" charset="0"/>
+                <a:cs typeface="Courier New" pitchFamily="49" charset="0"/>
+              </a:rPr>
+              <a:t>(a, b) &lt;&lt; </a:t>
+            </a:r>
+            <a:r>
+              <a:rPr lang="en-US" sz="1600" dirty="0" err="1">
+                <a:latin typeface="Courier New" pitchFamily="49" charset="0"/>
+                <a:cs typeface="Courier New" pitchFamily="49" charset="0"/>
+              </a:rPr>
+              <a:t>endl</a:t>
+            </a:r>
+            <a:r>
+              <a:rPr lang="en-US" sz="1600" dirty="0">
+                <a:latin typeface="Courier New" pitchFamily="49" charset="0"/>
+                <a:cs typeface="Courier New" pitchFamily="49" charset="0"/>
+              </a:rPr>
+              <a:t>;</a:t>
+            </a:r>
+          </a:p>
+          <a:p>
+            <a:r>
+              <a:rPr lang="en-US" sz="1600" dirty="0">
+                <a:latin typeface="Courier New" pitchFamily="49" charset="0"/>
+                <a:cs typeface="Courier New" pitchFamily="49" charset="0"/>
+              </a:rPr>
+              <a:t>    }</a:t>
+            </a:r>
+          </a:p>
+          <a:p>
+            <a:r>
+              <a:rPr lang="en-US" sz="1600" dirty="0">
+                <a:latin typeface="Courier New" pitchFamily="49" charset="0"/>
+                <a:cs typeface="Courier New" pitchFamily="49" charset="0"/>
+              </a:rPr>
+              <a:t>    return 0;</a:t>
+            </a:r>
+          </a:p>
+          <a:p>
+            <a:r>
+              <a:rPr lang="en-US" sz="1600" dirty="0" smtClean="0">
+                <a:latin typeface="Courier New" pitchFamily="49" charset="0"/>
+                <a:cs typeface="Courier New" pitchFamily="49" charset="0"/>
+              </a:rPr>
+              <a:t>}</a:t>
+            </a:r>
+            <a:endParaRPr lang="en-US" sz="1600" dirty="0">
+              <a:latin typeface="Courier New" pitchFamily="49" charset="0"/>
+              <a:cs typeface="Courier New" pitchFamily="49" charset="0"/>
+            </a:endParaRPr>
+          </a:p>
+        </p:txBody>
+      </p:sp>
+    </p:spTree>
+    <p:extLst>
+      <p:ext uri="{BB962C8B-B14F-4D97-AF65-F5344CB8AC3E}">
+        <p14:creationId xmlns:p14="http://schemas.microsoft.com/office/powerpoint/2010/main" val="1758618532"/>
+      </p:ext>
+    </p:extLst>
+  </p:cSld>
+  <p:clrMapOvr>
+    <a:masterClrMapping/>
+  </p:clrMapOvr>
+  <p:timing>
+    <p:tnLst>
+      <p:par>
+        <p:cTn id="1" dur="indefinite" restart="never" nodeType="tmRoot">
+          <p:childTnLst>
+            <p:seq concurrent="1" nextAc="seek">
+              <p:cTn id="2" dur="indefinite" nodeType="mainSeq">
+                <p:childTnLst>
+                  <p:par>
+                    <p:cTn id="3" fill="hold">
+                      <p:stCondLst>
+                        <p:cond delay="indefinite"/>
+                        <p:cond evt="onBegin" delay="0">
+                          <p:tn val="2"/>
+                        </p:cond>
+                      </p:stCondLst>
+                      <p:childTnLst>
+                        <p:par>
+                          <p:cTn id="4" fill="hold">
+                            <p:stCondLst>
+                              <p:cond delay="0"/>
+                            </p:stCondLst>
+                            <p:childTnLst>
+                              <p:par>
+                                <p:cTn id="5" presetID="1" presetClass="entr" presetSubtype="0" fill="hold" grpId="0" nodeType="withEffect">
+                                  <p:stCondLst>
+                                    <p:cond delay="0"/>
+                                  </p:stCondLst>
+                                  <p:childTnLst>
+                                    <p:set>
+                                      <p:cBhvr>
+                                        <p:cTn id="6" dur="1" fill="hold">
+                                          <p:stCondLst>
+                                            <p:cond delay="0"/>
+                                          </p:stCondLst>
+                                        </p:cTn>
+                                        <p:tgtEl>
+                                          <p:spTgt spid="5"/>
+                                        </p:tgtEl>
+                                        <p:attrNameLst>
+                                          <p:attrName>style.visibility</p:attrName>
+                                        </p:attrNameLst>
+                                      </p:cBhvr>
+                                      <p:to>
+                                        <p:strVal val="visible"/>
+                                      </p:to>
+                                    </p:set>
+                                  </p:childTnLst>
+                                </p:cTn>
+                              </p:par>
+                            </p:childTnLst>
+                          </p:cTn>
+                        </p:par>
+                      </p:childTnLst>
+                    </p:cTn>
+                  </p:par>
+                </p:childTnLst>
+              </p:cTn>
+              <p:prevCondLst>
+                <p:cond evt="onPrev" delay="0">
+                  <p:tgtEl>
+                    <p:sldTgt/>
+                  </p:tgtEl>
+                </p:cond>
+              </p:prevCondLst>
+              <p:nextCondLst>
+                <p:cond evt="onNext" delay="0">
+                  <p:tgtEl>
+                    <p:sldTgt/>
+                  </p:tgtEl>
+                </p:cond>
+              </p:nextCondLst>
+            </p:seq>
+          </p:childTnLst>
+        </p:cTn>
+      </p:par>
+    </p:tnLst>
+    <p:bldLst>
+      <p:bldP spid="5" grpId="0" animBg="1"/>
     </p:bldLst>
   </p:timing>
 </p:sld>

</xml_diff>

<commit_message>
Added slides on I/O streams
</commit_message>
<xml_diff>
--- a/CPlusPlus/essential_cpp.pptx
+++ b/CPlusPlus/essential_cpp.pptx
@@ -5,7 +5,7 @@
     <p:sldMasterId id="2147483660" r:id="rId1"/>
   </p:sldMasterIdLst>
   <p:notesMasterIdLst>
-    <p:notesMasterId r:id="rId19"/>
+    <p:notesMasterId r:id="rId22"/>
   </p:notesMasterIdLst>
   <p:sldIdLst>
     <p:sldId id="256" r:id="rId2"/>
@@ -25,6 +25,9 @@
     <p:sldId id="270" r:id="rId16"/>
     <p:sldId id="272" r:id="rId17"/>
     <p:sldId id="271" r:id="rId18"/>
+    <p:sldId id="274" r:id="rId19"/>
+    <p:sldId id="275" r:id="rId20"/>
+    <p:sldId id="273" r:id="rId21"/>
   </p:sldIdLst>
   <p:sldSz cx="9144000" cy="6858000" type="screen4x3"/>
   <p:notesSz cx="6858000" cy="9144000"/>
@@ -213,7 +216,7 @@
           <a:p>
             <a:fld id="{959286F1-78EA-4A32-8D12-1F28CCE43A8D}" type="datetimeFigureOut">
               <a:rPr lang="en-US" smtClean="0"/>
-              <a:t>2017-02-09</a:t>
+              <a:t>2017-02-10</a:t>
             </a:fld>
             <a:endParaRPr lang="en-US"/>
           </a:p>
@@ -696,7 +699,7 @@
           <a:p>
             <a:fld id="{7E64AD2A-13EC-46C7-9287-3CACAC3798D5}" type="datetime1">
               <a:rPr lang="en-US" smtClean="0"/>
-              <a:t>2017-02-09</a:t>
+              <a:t>2017-02-10</a:t>
             </a:fld>
             <a:endParaRPr lang="en-US"/>
           </a:p>
@@ -866,7 +869,7 @@
           <a:p>
             <a:fld id="{43AE06E8-3793-4EB5-8012-97A6BFC78375}" type="datetime1">
               <a:rPr lang="en-US" smtClean="0"/>
-              <a:t>2017-02-09</a:t>
+              <a:t>2017-02-10</a:t>
             </a:fld>
             <a:endParaRPr lang="en-US"/>
           </a:p>
@@ -1046,7 +1049,7 @@
           <a:p>
             <a:fld id="{E234FBB9-2650-4E82-9375-3AD81E2FC1C9}" type="datetime1">
               <a:rPr lang="en-US" smtClean="0"/>
-              <a:t>2017-02-09</a:t>
+              <a:t>2017-02-10</a:t>
             </a:fld>
             <a:endParaRPr lang="en-US"/>
           </a:p>
@@ -1216,7 +1219,7 @@
           <a:p>
             <a:fld id="{913E3CEC-9565-4823-A6C8-B34B815EB4CE}" type="datetime1">
               <a:rPr lang="en-US" smtClean="0"/>
-              <a:t>2017-02-09</a:t>
+              <a:t>2017-02-10</a:t>
             </a:fld>
             <a:endParaRPr lang="en-US"/>
           </a:p>
@@ -1460,7 +1463,7 @@
           <a:p>
             <a:fld id="{F5251CD9-EE9A-4CFE-A7E1-729B5C9F077D}" type="datetime1">
               <a:rPr lang="en-US" smtClean="0"/>
-              <a:t>2017-02-09</a:t>
+              <a:t>2017-02-10</a:t>
             </a:fld>
             <a:endParaRPr lang="en-US"/>
           </a:p>
@@ -1692,7 +1695,7 @@
           <a:p>
             <a:fld id="{9D8A7943-CAAB-4232-A550-28565CC8A736}" type="datetime1">
               <a:rPr lang="en-US" smtClean="0"/>
-              <a:t>2017-02-09</a:t>
+              <a:t>2017-02-10</a:t>
             </a:fld>
             <a:endParaRPr lang="en-US"/>
           </a:p>
@@ -2059,7 +2062,7 @@
           <a:p>
             <a:fld id="{AECA22B3-9CAA-48F4-B0A5-AAC29DCE38BB}" type="datetime1">
               <a:rPr lang="en-US" smtClean="0"/>
-              <a:t>2017-02-09</a:t>
+              <a:t>2017-02-10</a:t>
             </a:fld>
             <a:endParaRPr lang="en-US"/>
           </a:p>
@@ -2177,7 +2180,7 @@
           <a:p>
             <a:fld id="{17BEA515-885F-453F-9DB6-FB7EBDD5269C}" type="datetime1">
               <a:rPr lang="en-US" smtClean="0"/>
-              <a:t>2017-02-09</a:t>
+              <a:t>2017-02-10</a:t>
             </a:fld>
             <a:endParaRPr lang="en-US"/>
           </a:p>
@@ -2272,7 +2275,7 @@
           <a:p>
             <a:fld id="{DF49C002-0A7D-4B38-A829-C7867DEAC314}" type="datetime1">
               <a:rPr lang="en-US" smtClean="0"/>
-              <a:t>2017-02-09</a:t>
+              <a:t>2017-02-10</a:t>
             </a:fld>
             <a:endParaRPr lang="en-US"/>
           </a:p>
@@ -2549,7 +2552,7 @@
           <a:p>
             <a:fld id="{DF81AE77-813F-4EB7-92DB-CEFC7AEFB117}" type="datetime1">
               <a:rPr lang="en-US" smtClean="0"/>
-              <a:t>2017-02-09</a:t>
+              <a:t>2017-02-10</a:t>
             </a:fld>
             <a:endParaRPr lang="en-US"/>
           </a:p>
@@ -2806,7 +2809,7 @@
           <a:p>
             <a:fld id="{C3D8A7DD-E8A7-4B8B-A1C0-3939B552071F}" type="datetime1">
               <a:rPr lang="en-US" smtClean="0"/>
-              <a:t>2017-02-09</a:t>
+              <a:t>2017-02-10</a:t>
             </a:fld>
             <a:endParaRPr lang="en-US"/>
           </a:p>
@@ -3019,7 +3022,7 @@
           <a:p>
             <a:fld id="{0DDF3A26-7F7C-417D-882D-6FCBBDE254C3}" type="datetime1">
               <a:rPr lang="en-US" smtClean="0"/>
-              <a:t>2017-02-09</a:t>
+              <a:t>2017-02-10</a:t>
             </a:fld>
             <a:endParaRPr lang="en-US"/>
           </a:p>
@@ -6372,7 +6375,28 @@
           <a:p>
             <a:r>
               <a:rPr lang="en-US" dirty="0" smtClean="0"/>
-              <a:t>Names for values in memory (RAM)</a:t>
+              <a:t>Names for values in memory (RAM</a:t>
+            </a:r>
+            <a:r>
+              <a:rPr lang="en-US" dirty="0" smtClean="0"/>
+              <a:t>)</a:t>
+            </a:r>
+          </a:p>
+          <a:p>
+            <a:r>
+              <a:rPr lang="en-US" dirty="0" smtClean="0"/>
+              <a:t>Names start with letter or </a:t>
+            </a:r>
+            <a:r>
+              <a:rPr lang="en-US" dirty="0" smtClean="0">
+                <a:latin typeface="Courier New" panose="02070309020205020404" pitchFamily="49" charset="0"/>
+                <a:cs typeface="Courier New" panose="02070309020205020404" pitchFamily="49" charset="0"/>
+              </a:rPr>
+              <a:t>_</a:t>
+            </a:r>
+            <a:r>
+              <a:rPr lang="en-US" dirty="0" smtClean="0"/>
+              <a:t>, can contain digits</a:t>
             </a:r>
             <a:endParaRPr lang="en-US" dirty="0" smtClean="0"/>
           </a:p>
@@ -6446,10 +6470,10 @@
         </p:nvGrpSpPr>
         <p:grpSpPr>
           <a:xfrm>
-            <a:off x="3234571" y="2900515"/>
-            <a:ext cx="1799546" cy="1420122"/>
+            <a:off x="3264067" y="3372461"/>
+            <a:ext cx="1799546" cy="1103060"/>
             <a:chOff x="1010358" y="2903294"/>
-            <a:chExt cx="1799546" cy="1420122"/>
+            <a:chExt cx="1799546" cy="1103060"/>
           </a:xfrm>
         </p:grpSpPr>
         <p:sp>
@@ -6460,7 +6484,7 @@
           </p:nvSpPr>
           <p:spPr>
             <a:xfrm>
-              <a:off x="1010358" y="3923306"/>
+              <a:off x="1010358" y="3606244"/>
               <a:ext cx="1799546" cy="400110"/>
             </a:xfrm>
             <a:prstGeom prst="rect">
@@ -6557,7 +6581,7 @@
           <p:spPr>
             <a:xfrm flipV="1">
               <a:off x="1910131" y="3284037"/>
-              <a:ext cx="415944" cy="639269"/>
+              <a:ext cx="415944" cy="322207"/>
             </a:xfrm>
             <a:prstGeom prst="straightConnector1">
               <a:avLst/>
@@ -6593,10 +6617,10 @@
         </p:nvGrpSpPr>
         <p:grpSpPr>
           <a:xfrm>
-            <a:off x="5034117" y="2900515"/>
-            <a:ext cx="2477728" cy="1420122"/>
+            <a:off x="5029364" y="3372461"/>
+            <a:ext cx="2342742" cy="1103060"/>
             <a:chOff x="566968" y="2903294"/>
-            <a:chExt cx="2477728" cy="1420122"/>
+            <a:chExt cx="2342742" cy="1103060"/>
           </a:xfrm>
         </p:grpSpPr>
         <p:sp>
@@ -6607,7 +6631,7 @@
           </p:nvSpPr>
           <p:spPr>
             <a:xfrm>
-              <a:off x="1010358" y="3923306"/>
+              <a:off x="875372" y="3606244"/>
               <a:ext cx="2034338" cy="400110"/>
             </a:xfrm>
             <a:prstGeom prst="rect">
@@ -6704,7 +6728,7 @@
           <p:spPr>
             <a:xfrm flipH="1" flipV="1">
               <a:off x="1088077" y="3284037"/>
-              <a:ext cx="939450" cy="639269"/>
+              <a:ext cx="804464" cy="322207"/>
             </a:xfrm>
             <a:prstGeom prst="straightConnector1">
               <a:avLst/>
@@ -6816,79 +6840,68 @@
                 <a:latin typeface="Courier New" pitchFamily="49" charset="0"/>
                 <a:cs typeface="Courier New" pitchFamily="49" charset="0"/>
               </a:rPr>
-              <a:t> n = 3*m</a:t>
+              <a:t> n = 3*m;</a:t>
+            </a:r>
+          </a:p>
+          <a:p>
+            <a:r>
+              <a:rPr lang="en-US" sz="1600" dirty="0">
+                <a:latin typeface="Courier New" pitchFamily="49" charset="0"/>
+                <a:cs typeface="Courier New" pitchFamily="49" charset="0"/>
+              </a:rPr>
+              <a:t> </a:t>
             </a:r>
             <a:r>
               <a:rPr lang="en-US" sz="1600" dirty="0" smtClean="0">
                 <a:latin typeface="Courier New" pitchFamily="49" charset="0"/>
                 <a:cs typeface="Courier New" pitchFamily="49" charset="0"/>
               </a:rPr>
+              <a:t>   m = m + n;</a:t>
+            </a:r>
+          </a:p>
+          <a:p>
+            <a:r>
+              <a:rPr lang="en-US" sz="1600" dirty="0">
+                <a:latin typeface="Courier New" pitchFamily="49" charset="0"/>
+                <a:cs typeface="Courier New" pitchFamily="49" charset="0"/>
+              </a:rPr>
+              <a:t> </a:t>
+            </a:r>
+            <a:r>
+              <a:rPr lang="en-US" sz="1600" dirty="0" smtClean="0">
+                <a:latin typeface="Courier New" pitchFamily="49" charset="0"/>
+                <a:cs typeface="Courier New" pitchFamily="49" charset="0"/>
+              </a:rPr>
+              <a:t>   </a:t>
+            </a:r>
+            <a:r>
+              <a:rPr lang="en-US" sz="1600" dirty="0" err="1" smtClean="0">
+                <a:latin typeface="Courier New" pitchFamily="49" charset="0"/>
+                <a:cs typeface="Courier New" pitchFamily="49" charset="0"/>
+              </a:rPr>
+              <a:t>cout</a:t>
+            </a:r>
+            <a:r>
+              <a:rPr lang="en-US" sz="1600" dirty="0" smtClean="0">
+                <a:latin typeface="Courier New" pitchFamily="49" charset="0"/>
+                <a:cs typeface="Courier New" pitchFamily="49" charset="0"/>
+              </a:rPr>
+              <a:t> &lt;&lt; m &lt;&lt; ", " &lt;&lt; n &lt;&lt; </a:t>
+            </a:r>
+            <a:r>
+              <a:rPr lang="en-US" sz="1600" dirty="0" err="1" smtClean="0">
+                <a:latin typeface="Courier New" pitchFamily="49" charset="0"/>
+                <a:cs typeface="Courier New" pitchFamily="49" charset="0"/>
+              </a:rPr>
+              <a:t>endl</a:t>
+            </a:r>
+            <a:r>
+              <a:rPr lang="en-US" sz="1600" dirty="0" smtClean="0">
+                <a:latin typeface="Courier New" pitchFamily="49" charset="0"/>
+                <a:cs typeface="Courier New" pitchFamily="49" charset="0"/>
+              </a:rPr>
               <a:t>;</a:t>
             </a:r>
-          </a:p>
-          <a:p>
-            <a:r>
-              <a:rPr lang="en-US" sz="1600" dirty="0">
-                <a:latin typeface="Courier New" pitchFamily="49" charset="0"/>
-                <a:cs typeface="Courier New" pitchFamily="49" charset="0"/>
-              </a:rPr>
-              <a:t> </a:t>
-            </a:r>
-            <a:r>
-              <a:rPr lang="en-US" sz="1600" dirty="0" smtClean="0">
-                <a:latin typeface="Courier New" pitchFamily="49" charset="0"/>
-                <a:cs typeface="Courier New" pitchFamily="49" charset="0"/>
-              </a:rPr>
-              <a:t>   m = m + n;</a:t>
-            </a:r>
-          </a:p>
-          <a:p>
-            <a:r>
-              <a:rPr lang="en-US" sz="1600" dirty="0">
-                <a:latin typeface="Courier New" pitchFamily="49" charset="0"/>
-                <a:cs typeface="Courier New" pitchFamily="49" charset="0"/>
-              </a:rPr>
-              <a:t> </a:t>
-            </a:r>
-            <a:r>
-              <a:rPr lang="en-US" sz="1600" dirty="0" smtClean="0">
-                <a:latin typeface="Courier New" pitchFamily="49" charset="0"/>
-                <a:cs typeface="Courier New" pitchFamily="49" charset="0"/>
-              </a:rPr>
-              <a:t>   </a:t>
-            </a:r>
-            <a:r>
-              <a:rPr lang="en-US" sz="1600" dirty="0" err="1" smtClean="0">
-                <a:latin typeface="Courier New" pitchFamily="49" charset="0"/>
-                <a:cs typeface="Courier New" pitchFamily="49" charset="0"/>
-              </a:rPr>
-              <a:t>cout</a:t>
-            </a:r>
-            <a:r>
-              <a:rPr lang="en-US" sz="1600" dirty="0" smtClean="0">
-                <a:latin typeface="Courier New" pitchFamily="49" charset="0"/>
-                <a:cs typeface="Courier New" pitchFamily="49" charset="0"/>
-              </a:rPr>
-              <a:t> &lt;&lt; m &lt;&lt; ", " &lt;&lt; n &lt;&lt; </a:t>
-            </a:r>
-            <a:r>
-              <a:rPr lang="en-US" sz="1600" dirty="0" err="1" smtClean="0">
-                <a:latin typeface="Courier New" pitchFamily="49" charset="0"/>
-                <a:cs typeface="Courier New" pitchFamily="49" charset="0"/>
-              </a:rPr>
-              <a:t>endl</a:t>
-            </a:r>
-            <a:r>
-              <a:rPr lang="en-US" sz="1600" dirty="0" smtClean="0">
-                <a:latin typeface="Courier New" pitchFamily="49" charset="0"/>
-                <a:cs typeface="Courier New" pitchFamily="49" charset="0"/>
-              </a:rPr>
-              <a:t>;</a:t>
-            </a:r>
-            <a:endParaRPr lang="en-US" sz="1600" dirty="0" smtClean="0">
-              <a:latin typeface="Courier New" pitchFamily="49" charset="0"/>
-              <a:cs typeface="Courier New" pitchFamily="49" charset="0"/>
-            </a:endParaRPr>
           </a:p>
           <a:p>
             <a:r>
@@ -7155,7 +7168,7 @@
                             </p:stCondLst>
                             <p:childTnLst>
                               <p:par>
-                                <p:cTn id="17" presetID="1" presetClass="entr" presetSubtype="0" fill="hold" nodeType="clickEffect">
+                                <p:cTn id="17" presetID="1" presetClass="entr" presetSubtype="0" fill="hold" grpId="0" nodeType="clickEffect">
                                   <p:stCondLst>
                                     <p:cond delay="0"/>
                                   </p:stCondLst>
@@ -7168,7 +7181,11 @@
                                           </p:stCondLst>
                                         </p:cTn>
                                         <p:tgtEl>
-                                          <p:spTgt spid="12"/>
+                                          <p:spTgt spid="3">
+                                            <p:txEl>
+                                              <p:pRg st="3" end="3"/>
+                                            </p:txEl>
+                                          </p:spTgt>
                                         </p:tgtEl>
                                         <p:attrNameLst>
                                           <p:attrName>style.visibility</p:attrName>
@@ -7213,7 +7230,7 @@
                                           </p:stCondLst>
                                         </p:cTn>
                                         <p:tgtEl>
-                                          <p:spTgt spid="5"/>
+                                          <p:spTgt spid="12"/>
                                         </p:tgtEl>
                                         <p:attrNameLst>
                                           <p:attrName>style.visibility</p:attrName>
@@ -7245,7 +7262,7 @@
                             </p:stCondLst>
                             <p:childTnLst>
                               <p:par>
-                                <p:cTn id="25" presetID="1" presetClass="entr" presetSubtype="0" fill="hold" grpId="0" nodeType="clickEffect">
+                                <p:cTn id="25" presetID="1" presetClass="entr" presetSubtype="0" fill="hold" nodeType="clickEffect">
                                   <p:stCondLst>
                                     <p:cond delay="0"/>
                                   </p:stCondLst>
@@ -7258,7 +7275,7 @@
                                           </p:stCondLst>
                                         </p:cTn>
                                         <p:tgtEl>
-                                          <p:spTgt spid="23"/>
+                                          <p:spTgt spid="5"/>
                                         </p:tgtEl>
                                         <p:attrNameLst>
                                           <p:attrName>style.visibility</p:attrName>
@@ -7298,6 +7315,51 @@
                                     <p:set>
                                       <p:cBhvr>
                                         <p:cTn id="30" dur="1" fill="hold">
+                                          <p:stCondLst>
+                                            <p:cond delay="0"/>
+                                          </p:stCondLst>
+                                        </p:cTn>
+                                        <p:tgtEl>
+                                          <p:spTgt spid="23"/>
+                                        </p:tgtEl>
+                                        <p:attrNameLst>
+                                          <p:attrName>style.visibility</p:attrName>
+                                        </p:attrNameLst>
+                                      </p:cBhvr>
+                                      <p:to>
+                                        <p:strVal val="visible"/>
+                                      </p:to>
+                                    </p:set>
+                                  </p:childTnLst>
+                                </p:cTn>
+                              </p:par>
+                            </p:childTnLst>
+                          </p:cTn>
+                        </p:par>
+                      </p:childTnLst>
+                    </p:cTn>
+                  </p:par>
+                  <p:par>
+                    <p:cTn id="31" fill="hold">
+                      <p:stCondLst>
+                        <p:cond delay="indefinite"/>
+                      </p:stCondLst>
+                      <p:childTnLst>
+                        <p:par>
+                          <p:cTn id="32" fill="hold">
+                            <p:stCondLst>
+                              <p:cond delay="0"/>
+                            </p:stCondLst>
+                            <p:childTnLst>
+                              <p:par>
+                                <p:cTn id="33" presetID="1" presetClass="entr" presetSubtype="0" fill="hold" grpId="0" nodeType="clickEffect">
+                                  <p:stCondLst>
+                                    <p:cond delay="0"/>
+                                  </p:stCondLst>
+                                  <p:childTnLst>
+                                    <p:set>
+                                      <p:cBhvr>
+                                        <p:cTn id="34" dur="1" fill="hold">
                                           <p:stCondLst>
                                             <p:cond delay="0"/>
                                           </p:stCondLst>
@@ -9295,10 +9357,6 @@
                 </a:rPr>
                 <a:t>16 -3</a:t>
               </a:r>
-              <a:endParaRPr lang="en-US" sz="1600" dirty="0">
-                <a:latin typeface="Courier New" pitchFamily="49" charset="0"/>
-                <a:cs typeface="Courier New" pitchFamily="49" charset="0"/>
-              </a:endParaRPr>
             </a:p>
           </p:txBody>
         </p:sp>
@@ -9845,10 +9903,6 @@
               </a:rPr>
               <a:t>…</a:t>
             </a:r>
-            <a:endParaRPr lang="en-US" sz="1600" dirty="0" smtClean="0">
-              <a:latin typeface="Courier New" pitchFamily="49" charset="0"/>
-              <a:cs typeface="Courier New" pitchFamily="49" charset="0"/>
-            </a:endParaRPr>
           </a:p>
           <a:p>
             <a:r>
@@ -11806,10 +11860,1056 @@
           </a:p>
         </p:txBody>
       </p:sp>
+      <p:sp>
+        <p:nvSpPr>
+          <p:cNvPr id="6" name="TextBox 5"/>
+          <p:cNvSpPr txBox="1"/>
+          <p:nvPr/>
+        </p:nvSpPr>
+        <p:spPr>
+          <a:xfrm>
+            <a:off x="3004244" y="4983009"/>
+            <a:ext cx="4817317" cy="1077218"/>
+          </a:xfrm>
+          <a:prstGeom prst="rect">
+            <a:avLst/>
+          </a:prstGeom>
+          <a:solidFill>
+            <a:schemeClr val="tx1"/>
+          </a:solidFill>
+          <a:ln>
+            <a:solidFill>
+              <a:schemeClr val="tx1"/>
+            </a:solidFill>
+          </a:ln>
+        </p:spPr>
+        <p:txBody>
+          <a:bodyPr wrap="square" rtlCol="0">
+            <a:spAutoFit/>
+          </a:bodyPr>
+          <a:lstStyle/>
+          <a:p>
+            <a:r>
+              <a:rPr lang="en-US" sz="1600" b="1" dirty="0">
+                <a:solidFill>
+                  <a:schemeClr val="bg1"/>
+                </a:solidFill>
+                <a:latin typeface="Courier New" pitchFamily="49" charset="0"/>
+                <a:cs typeface="Courier New" pitchFamily="49" charset="0"/>
+              </a:rPr>
+              <a:t>$  </a:t>
+            </a:r>
+            <a:r>
+              <a:rPr lang="en-US" sz="1600" b="1" dirty="0" smtClean="0">
+                <a:solidFill>
+                  <a:schemeClr val="bg1"/>
+                </a:solidFill>
+                <a:latin typeface="Courier New" pitchFamily="49" charset="0"/>
+                <a:cs typeface="Courier New" pitchFamily="49" charset="0"/>
+              </a:rPr>
+              <a:t>./dist.exe  &lt; data.txt</a:t>
+            </a:r>
+            <a:endParaRPr lang="en-US" sz="1600" b="1" dirty="0">
+              <a:solidFill>
+                <a:schemeClr val="bg1"/>
+              </a:solidFill>
+              <a:latin typeface="Courier New" pitchFamily="49" charset="0"/>
+              <a:cs typeface="Courier New" pitchFamily="49" charset="0"/>
+            </a:endParaRPr>
+          </a:p>
+          <a:p>
+            <a:r>
+              <a:rPr lang="en-US" sz="1600" dirty="0">
+                <a:solidFill>
+                  <a:schemeClr val="bg1"/>
+                </a:solidFill>
+                <a:latin typeface="Courier New" pitchFamily="49" charset="0"/>
+                <a:cs typeface="Courier New" pitchFamily="49" charset="0"/>
+              </a:rPr>
+              <a:t>5.83095</a:t>
+            </a:r>
+          </a:p>
+          <a:p>
+            <a:r>
+              <a:rPr lang="en-US" sz="1600" dirty="0">
+                <a:solidFill>
+                  <a:schemeClr val="bg1"/>
+                </a:solidFill>
+                <a:latin typeface="Courier New" pitchFamily="49" charset="0"/>
+                <a:cs typeface="Courier New" pitchFamily="49" charset="0"/>
+              </a:rPr>
+              <a:t>2.5</a:t>
+            </a:r>
+          </a:p>
+          <a:p>
+            <a:r>
+              <a:rPr lang="en-US" sz="1600" dirty="0" smtClean="0">
+                <a:solidFill>
+                  <a:schemeClr val="bg1"/>
+                </a:solidFill>
+                <a:latin typeface="Courier New" pitchFamily="49" charset="0"/>
+                <a:cs typeface="Courier New" pitchFamily="49" charset="0"/>
+              </a:rPr>
+              <a:t>16.2788</a:t>
+            </a:r>
+            <a:endParaRPr lang="en-US" sz="1600" dirty="0">
+              <a:solidFill>
+                <a:schemeClr val="bg1"/>
+              </a:solidFill>
+              <a:latin typeface="Courier New" pitchFamily="49" charset="0"/>
+              <a:cs typeface="Courier New" pitchFamily="49" charset="0"/>
+            </a:endParaRPr>
+          </a:p>
+        </p:txBody>
+      </p:sp>
+      <p:sp>
+        <p:nvSpPr>
+          <p:cNvPr id="7" name="TextBox 6"/>
+          <p:cNvSpPr txBox="1"/>
+          <p:nvPr/>
+        </p:nvSpPr>
+        <p:spPr>
+          <a:xfrm>
+            <a:off x="3004244" y="6200359"/>
+            <a:ext cx="4817317" cy="338554"/>
+          </a:xfrm>
+          <a:prstGeom prst="rect">
+            <a:avLst/>
+          </a:prstGeom>
+          <a:solidFill>
+            <a:schemeClr val="tx1"/>
+          </a:solidFill>
+          <a:ln>
+            <a:solidFill>
+              <a:schemeClr val="tx1"/>
+            </a:solidFill>
+          </a:ln>
+        </p:spPr>
+        <p:txBody>
+          <a:bodyPr wrap="square" rtlCol="0">
+            <a:spAutoFit/>
+          </a:bodyPr>
+          <a:lstStyle/>
+          <a:p>
+            <a:r>
+              <a:rPr lang="en-US" sz="1600" b="1" dirty="0">
+                <a:solidFill>
+                  <a:schemeClr val="bg1"/>
+                </a:solidFill>
+                <a:latin typeface="Courier New" pitchFamily="49" charset="0"/>
+                <a:cs typeface="Courier New" pitchFamily="49" charset="0"/>
+              </a:rPr>
+              <a:t>$  </a:t>
+            </a:r>
+            <a:r>
+              <a:rPr lang="en-US" sz="1600" b="1" dirty="0" smtClean="0">
+                <a:solidFill>
+                  <a:schemeClr val="bg1"/>
+                </a:solidFill>
+                <a:latin typeface="Courier New" pitchFamily="49" charset="0"/>
+                <a:cs typeface="Courier New" pitchFamily="49" charset="0"/>
+              </a:rPr>
+              <a:t>./dist.exe  &lt; data.txt  &gt; out.txt</a:t>
+            </a:r>
+            <a:endParaRPr lang="en-US" sz="1600" dirty="0">
+              <a:solidFill>
+                <a:schemeClr val="bg1"/>
+              </a:solidFill>
+              <a:latin typeface="Courier New" pitchFamily="49" charset="0"/>
+              <a:cs typeface="Courier New" pitchFamily="49" charset="0"/>
+            </a:endParaRPr>
+          </a:p>
+        </p:txBody>
+      </p:sp>
     </p:spTree>
     <p:extLst>
       <p:ext uri="{BB962C8B-B14F-4D97-AF65-F5344CB8AC3E}">
         <p14:creationId xmlns:p14="http://schemas.microsoft.com/office/powerpoint/2010/main" val="1758618532"/>
+      </p:ext>
+    </p:extLst>
+  </p:cSld>
+  <p:clrMapOvr>
+    <a:masterClrMapping/>
+  </p:clrMapOvr>
+  <p:timing>
+    <p:tnLst>
+      <p:par>
+        <p:cTn id="1" dur="indefinite" restart="never" nodeType="tmRoot">
+          <p:childTnLst>
+            <p:seq concurrent="1" nextAc="seek">
+              <p:cTn id="2" dur="indefinite" nodeType="mainSeq">
+                <p:childTnLst>
+                  <p:par>
+                    <p:cTn id="3" fill="hold">
+                      <p:stCondLst>
+                        <p:cond delay="indefinite"/>
+                      </p:stCondLst>
+                      <p:childTnLst>
+                        <p:par>
+                          <p:cTn id="4" fill="hold">
+                            <p:stCondLst>
+                              <p:cond delay="0"/>
+                            </p:stCondLst>
+                            <p:childTnLst>
+                              <p:par>
+                                <p:cTn id="5" presetID="1" presetClass="entr" presetSubtype="0" fill="hold" grpId="0" nodeType="clickEffect">
+                                  <p:stCondLst>
+                                    <p:cond delay="0"/>
+                                  </p:stCondLst>
+                                  <p:childTnLst>
+                                    <p:set>
+                                      <p:cBhvr>
+                                        <p:cTn id="6" dur="1" fill="hold">
+                                          <p:stCondLst>
+                                            <p:cond delay="0"/>
+                                          </p:stCondLst>
+                                        </p:cTn>
+                                        <p:tgtEl>
+                                          <p:spTgt spid="6"/>
+                                        </p:tgtEl>
+                                        <p:attrNameLst>
+                                          <p:attrName>style.visibility</p:attrName>
+                                        </p:attrNameLst>
+                                      </p:cBhvr>
+                                      <p:to>
+                                        <p:strVal val="visible"/>
+                                      </p:to>
+                                    </p:set>
+                                  </p:childTnLst>
+                                </p:cTn>
+                              </p:par>
+                            </p:childTnLst>
+                          </p:cTn>
+                        </p:par>
+                      </p:childTnLst>
+                    </p:cTn>
+                  </p:par>
+                  <p:par>
+                    <p:cTn id="7" fill="hold">
+                      <p:stCondLst>
+                        <p:cond delay="indefinite"/>
+                      </p:stCondLst>
+                      <p:childTnLst>
+                        <p:par>
+                          <p:cTn id="8" fill="hold">
+                            <p:stCondLst>
+                              <p:cond delay="0"/>
+                            </p:stCondLst>
+                            <p:childTnLst>
+                              <p:par>
+                                <p:cTn id="9" presetID="1" presetClass="entr" presetSubtype="0" fill="hold" grpId="0" nodeType="clickEffect">
+                                  <p:stCondLst>
+                                    <p:cond delay="0"/>
+                                  </p:stCondLst>
+                                  <p:childTnLst>
+                                    <p:set>
+                                      <p:cBhvr>
+                                        <p:cTn id="10" dur="1" fill="hold">
+                                          <p:stCondLst>
+                                            <p:cond delay="0"/>
+                                          </p:stCondLst>
+                                        </p:cTn>
+                                        <p:tgtEl>
+                                          <p:spTgt spid="7"/>
+                                        </p:tgtEl>
+                                        <p:attrNameLst>
+                                          <p:attrName>style.visibility</p:attrName>
+                                        </p:attrNameLst>
+                                      </p:cBhvr>
+                                      <p:to>
+                                        <p:strVal val="visible"/>
+                                      </p:to>
+                                    </p:set>
+                                  </p:childTnLst>
+                                </p:cTn>
+                              </p:par>
+                            </p:childTnLst>
+                          </p:cTn>
+                        </p:par>
+                      </p:childTnLst>
+                    </p:cTn>
+                  </p:par>
+                </p:childTnLst>
+              </p:cTn>
+              <p:prevCondLst>
+                <p:cond evt="onPrev" delay="0">
+                  <p:tgtEl>
+                    <p:sldTgt/>
+                  </p:tgtEl>
+                </p:cond>
+              </p:prevCondLst>
+              <p:nextCondLst>
+                <p:cond evt="onNext" delay="0">
+                  <p:tgtEl>
+                    <p:sldTgt/>
+                  </p:tgtEl>
+                </p:cond>
+              </p:nextCondLst>
+            </p:seq>
+          </p:childTnLst>
+        </p:cTn>
+      </p:par>
+    </p:tnLst>
+    <p:bldLst>
+      <p:bldP spid="6" grpId="0" animBg="1"/>
+      <p:bldP spid="7" grpId="0" animBg="1"/>
+    </p:bldLst>
+  </p:timing>
+</p:sld>
+</file>
+
+<file path=ppt/slides/slide18.xml><?xml version="1.0" encoding="utf-8"?>
+<p:sld xmlns:a="http://schemas.openxmlformats.org/drawingml/2006/main" xmlns:r="http://schemas.openxmlformats.org/officeDocument/2006/relationships" xmlns:p="http://schemas.openxmlformats.org/presentationml/2006/main">
+  <p:cSld>
+    <p:spTree>
+      <p:nvGrpSpPr>
+        <p:cNvPr id="1" name=""/>
+        <p:cNvGrpSpPr/>
+        <p:nvPr/>
+      </p:nvGrpSpPr>
+      <p:grpSpPr>
+        <a:xfrm>
+          <a:off x="0" y="0"/>
+          <a:ext cx="0" cy="0"/>
+          <a:chOff x="0" y="0"/>
+          <a:chExt cx="0" cy="0"/>
+        </a:xfrm>
+      </p:grpSpPr>
+      <p:sp>
+        <p:nvSpPr>
+          <p:cNvPr id="2" name="Title 1"/>
+          <p:cNvSpPr>
+            <a:spLocks noGrp="1"/>
+          </p:cNvSpPr>
+          <p:nvPr>
+            <p:ph type="title"/>
+          </p:nvPr>
+        </p:nvSpPr>
+        <p:spPr/>
+        <p:txBody>
+          <a:bodyPr/>
+          <a:lstStyle/>
+          <a:p>
+            <a:r>
+              <a:rPr lang="en-US" dirty="0" smtClean="0"/>
+              <a:t>I/O streams</a:t>
+            </a:r>
+            <a:endParaRPr lang="en-US" dirty="0"/>
+          </a:p>
+        </p:txBody>
+      </p:sp>
+      <p:sp>
+        <p:nvSpPr>
+          <p:cNvPr id="5" name="Content Placeholder 4"/>
+          <p:cNvSpPr>
+            <a:spLocks noGrp="1"/>
+          </p:cNvSpPr>
+          <p:nvPr>
+            <p:ph idx="1"/>
+          </p:nvPr>
+        </p:nvSpPr>
+        <p:spPr/>
+        <p:txBody>
+          <a:bodyPr/>
+          <a:lstStyle/>
+          <a:p>
+            <a:r>
+              <a:rPr lang="en-US" dirty="0" smtClean="0"/>
+              <a:t>Reading from</a:t>
+            </a:r>
+          </a:p>
+          <a:p>
+            <a:pPr lvl="1"/>
+            <a:r>
+              <a:rPr lang="en-US" dirty="0" smtClean="0"/>
+              <a:t>standard input: </a:t>
+            </a:r>
+            <a:r>
+              <a:rPr lang="en-US" dirty="0" err="1" smtClean="0">
+                <a:latin typeface="Courier New" panose="02070309020205020404" pitchFamily="49" charset="0"/>
+                <a:cs typeface="Courier New" panose="02070309020205020404" pitchFamily="49" charset="0"/>
+              </a:rPr>
+              <a:t>cin</a:t>
+            </a:r>
+            <a:r>
+              <a:rPr lang="en-US" dirty="0" smtClean="0"/>
+              <a:t> (via keyboard, I/O redirection)</a:t>
+            </a:r>
+          </a:p>
+          <a:p>
+            <a:pPr lvl="1"/>
+            <a:r>
+              <a:rPr lang="en-US" dirty="0" smtClean="0"/>
+              <a:t>files (see later)</a:t>
+            </a:r>
+          </a:p>
+          <a:p>
+            <a:r>
+              <a:rPr lang="en-US" dirty="0" smtClean="0"/>
+              <a:t>Writing to</a:t>
+            </a:r>
+          </a:p>
+          <a:p>
+            <a:pPr lvl="1"/>
+            <a:r>
+              <a:rPr lang="en-US" dirty="0" smtClean="0"/>
+              <a:t>standard output: </a:t>
+            </a:r>
+            <a:r>
+              <a:rPr lang="en-US" dirty="0" err="1" smtClean="0">
+                <a:latin typeface="Courier New" panose="02070309020205020404" pitchFamily="49" charset="0"/>
+                <a:cs typeface="Courier New" panose="02070309020205020404" pitchFamily="49" charset="0"/>
+              </a:rPr>
+              <a:t>cout</a:t>
+            </a:r>
+            <a:r>
+              <a:rPr lang="en-US" dirty="0" smtClean="0"/>
+              <a:t> (to screen, I/O redirection)</a:t>
+            </a:r>
+          </a:p>
+          <a:p>
+            <a:pPr lvl="1"/>
+            <a:r>
+              <a:rPr lang="en-US" dirty="0" smtClean="0"/>
+              <a:t>standard error: </a:t>
+            </a:r>
+            <a:r>
+              <a:rPr lang="en-US" dirty="0" err="1" smtClean="0">
+                <a:latin typeface="Courier New" panose="02070309020205020404" pitchFamily="49" charset="0"/>
+                <a:cs typeface="Courier New" panose="02070309020205020404" pitchFamily="49" charset="0"/>
+              </a:rPr>
+              <a:t>cerr</a:t>
+            </a:r>
+            <a:r>
+              <a:rPr lang="en-US" dirty="0"/>
+              <a:t> (to screen, I/O redirection)</a:t>
+            </a:r>
+          </a:p>
+          <a:p>
+            <a:pPr lvl="1"/>
+            <a:r>
+              <a:rPr lang="en-US" dirty="0" smtClean="0"/>
+              <a:t>files (see later)</a:t>
+            </a:r>
+          </a:p>
+        </p:txBody>
+      </p:sp>
+      <p:sp>
+        <p:nvSpPr>
+          <p:cNvPr id="3" name="Slide Number Placeholder 2"/>
+          <p:cNvSpPr>
+            <a:spLocks noGrp="1"/>
+          </p:cNvSpPr>
+          <p:nvPr>
+            <p:ph type="sldNum" sz="quarter" idx="12"/>
+          </p:nvPr>
+        </p:nvSpPr>
+        <p:spPr/>
+        <p:txBody>
+          <a:bodyPr/>
+          <a:lstStyle/>
+          <a:p>
+            <a:fld id="{033373DF-BCDA-4600-B448-AFBDB22F4A39}" type="slidenum">
+              <a:rPr lang="en-US" smtClean="0"/>
+              <a:t>18</a:t>
+            </a:fld>
+            <a:endParaRPr lang="en-US"/>
+          </a:p>
+        </p:txBody>
+      </p:sp>
+      <p:sp>
+        <p:nvSpPr>
+          <p:cNvPr id="4" name="TextBox 3"/>
+          <p:cNvSpPr txBox="1"/>
+          <p:nvPr/>
+        </p:nvSpPr>
+        <p:spPr>
+          <a:xfrm>
+            <a:off x="628650" y="4943592"/>
+            <a:ext cx="6244101" cy="1815882"/>
+          </a:xfrm>
+          <a:prstGeom prst="rect">
+            <a:avLst/>
+          </a:prstGeom>
+          <a:solidFill>
+            <a:schemeClr val="bg1">
+              <a:lumMod val="75000"/>
+            </a:schemeClr>
+          </a:solidFill>
+        </p:spPr>
+        <p:txBody>
+          <a:bodyPr wrap="square" rtlCol="0">
+            <a:spAutoFit/>
+          </a:bodyPr>
+          <a:lstStyle/>
+          <a:p>
+            <a:r>
+              <a:rPr lang="en-US" sz="1600" dirty="0" smtClean="0">
+                <a:latin typeface="Courier New" pitchFamily="49" charset="0"/>
+                <a:cs typeface="Courier New" pitchFamily="49" charset="0"/>
+              </a:rPr>
+              <a:t>#include &lt;</a:t>
+            </a:r>
+            <a:r>
+              <a:rPr lang="en-US" sz="1600" dirty="0" err="1" smtClean="0">
+                <a:latin typeface="Courier New" pitchFamily="49" charset="0"/>
+                <a:cs typeface="Courier New" pitchFamily="49" charset="0"/>
+              </a:rPr>
+              <a:t>iostream</a:t>
+            </a:r>
+            <a:r>
+              <a:rPr lang="en-US" sz="1600" dirty="0" smtClean="0">
+                <a:latin typeface="Courier New" pitchFamily="49" charset="0"/>
+                <a:cs typeface="Courier New" pitchFamily="49" charset="0"/>
+              </a:rPr>
+              <a:t>&gt;</a:t>
+            </a:r>
+          </a:p>
+          <a:p>
+            <a:r>
+              <a:rPr lang="en-US" sz="1600" dirty="0" smtClean="0">
+                <a:latin typeface="Courier New" pitchFamily="49" charset="0"/>
+                <a:cs typeface="Courier New" pitchFamily="49" charset="0"/>
+              </a:rPr>
+              <a:t>…</a:t>
+            </a:r>
+          </a:p>
+          <a:p>
+            <a:r>
+              <a:rPr lang="en-US" sz="1600" dirty="0">
+                <a:latin typeface="Courier New" pitchFamily="49" charset="0"/>
+                <a:cs typeface="Courier New" pitchFamily="49" charset="0"/>
+              </a:rPr>
+              <a:t> </a:t>
+            </a:r>
+            <a:r>
+              <a:rPr lang="en-US" sz="1600" dirty="0" smtClean="0">
+                <a:latin typeface="Courier New" pitchFamily="49" charset="0"/>
+                <a:cs typeface="Courier New" pitchFamily="49" charset="0"/>
+              </a:rPr>
+              <a:t>   double a, b;</a:t>
+            </a:r>
+            <a:endParaRPr lang="en-US" sz="1600" dirty="0">
+              <a:latin typeface="Courier New" pitchFamily="49" charset="0"/>
+              <a:cs typeface="Courier New" pitchFamily="49" charset="0"/>
+            </a:endParaRPr>
+          </a:p>
+          <a:p>
+            <a:r>
+              <a:rPr lang="en-US" sz="1600" dirty="0">
+                <a:latin typeface="Courier New" pitchFamily="49" charset="0"/>
+                <a:cs typeface="Courier New" pitchFamily="49" charset="0"/>
+              </a:rPr>
+              <a:t>    while (</a:t>
+            </a:r>
+            <a:r>
+              <a:rPr lang="en-US" sz="1600" b="1" dirty="0" err="1">
+                <a:latin typeface="Courier New" pitchFamily="49" charset="0"/>
+                <a:cs typeface="Courier New" pitchFamily="49" charset="0"/>
+              </a:rPr>
+              <a:t>cin</a:t>
+            </a:r>
+            <a:r>
+              <a:rPr lang="en-US" sz="1600" dirty="0">
+                <a:latin typeface="Courier New" pitchFamily="49" charset="0"/>
+                <a:cs typeface="Courier New" pitchFamily="49" charset="0"/>
+              </a:rPr>
+              <a:t> </a:t>
+            </a:r>
+            <a:r>
+              <a:rPr lang="en-US" sz="1600" b="1" dirty="0">
+                <a:solidFill>
+                  <a:srgbClr val="C00000"/>
+                </a:solidFill>
+                <a:latin typeface="Courier New" pitchFamily="49" charset="0"/>
+                <a:cs typeface="Courier New" pitchFamily="49" charset="0"/>
+              </a:rPr>
+              <a:t>&gt;&gt;</a:t>
+            </a:r>
+            <a:r>
+              <a:rPr lang="en-US" sz="1600" dirty="0">
+                <a:latin typeface="Courier New" pitchFamily="49" charset="0"/>
+                <a:cs typeface="Courier New" pitchFamily="49" charset="0"/>
+              </a:rPr>
+              <a:t> a </a:t>
+            </a:r>
+            <a:r>
+              <a:rPr lang="en-US" sz="1600" b="1" dirty="0">
+                <a:solidFill>
+                  <a:srgbClr val="C00000"/>
+                </a:solidFill>
+                <a:latin typeface="Courier New" pitchFamily="49" charset="0"/>
+                <a:cs typeface="Courier New" pitchFamily="49" charset="0"/>
+              </a:rPr>
+              <a:t>&gt;&gt;</a:t>
+            </a:r>
+            <a:r>
+              <a:rPr lang="en-US" sz="1600" dirty="0">
+                <a:latin typeface="Courier New" pitchFamily="49" charset="0"/>
+                <a:cs typeface="Courier New" pitchFamily="49" charset="0"/>
+              </a:rPr>
+              <a:t> b) {</a:t>
+            </a:r>
+          </a:p>
+          <a:p>
+            <a:r>
+              <a:rPr lang="en-US" sz="1600" dirty="0">
+                <a:latin typeface="Courier New" pitchFamily="49" charset="0"/>
+                <a:cs typeface="Courier New" pitchFamily="49" charset="0"/>
+              </a:rPr>
+              <a:t>        </a:t>
+            </a:r>
+            <a:r>
+              <a:rPr lang="en-US" sz="1600" b="1" dirty="0" err="1">
+                <a:latin typeface="Courier New" pitchFamily="49" charset="0"/>
+                <a:cs typeface="Courier New" pitchFamily="49" charset="0"/>
+              </a:rPr>
+              <a:t>cout</a:t>
+            </a:r>
+            <a:r>
+              <a:rPr lang="en-US" sz="1600" dirty="0">
+                <a:latin typeface="Courier New" pitchFamily="49" charset="0"/>
+                <a:cs typeface="Courier New" pitchFamily="49" charset="0"/>
+              </a:rPr>
+              <a:t> </a:t>
+            </a:r>
+            <a:r>
+              <a:rPr lang="en-US" sz="1600" b="1" dirty="0">
+                <a:solidFill>
+                  <a:srgbClr val="C00000"/>
+                </a:solidFill>
+                <a:latin typeface="Courier New" pitchFamily="49" charset="0"/>
+                <a:cs typeface="Courier New" pitchFamily="49" charset="0"/>
+              </a:rPr>
+              <a:t>&lt;&lt;</a:t>
+            </a:r>
+            <a:r>
+              <a:rPr lang="en-US" sz="1600" dirty="0">
+                <a:latin typeface="Courier New" pitchFamily="49" charset="0"/>
+                <a:cs typeface="Courier New" pitchFamily="49" charset="0"/>
+              </a:rPr>
+              <a:t> </a:t>
+            </a:r>
+            <a:r>
+              <a:rPr lang="en-US" sz="1600" dirty="0" err="1">
+                <a:latin typeface="Courier New" pitchFamily="49" charset="0"/>
+                <a:cs typeface="Courier New" pitchFamily="49" charset="0"/>
+              </a:rPr>
+              <a:t>dist</a:t>
+            </a:r>
+            <a:r>
+              <a:rPr lang="en-US" sz="1600" dirty="0">
+                <a:latin typeface="Courier New" pitchFamily="49" charset="0"/>
+                <a:cs typeface="Courier New" pitchFamily="49" charset="0"/>
+              </a:rPr>
+              <a:t>(a, b) </a:t>
+            </a:r>
+            <a:r>
+              <a:rPr lang="en-US" sz="1600" b="1" dirty="0">
+                <a:solidFill>
+                  <a:srgbClr val="C00000"/>
+                </a:solidFill>
+                <a:latin typeface="Courier New" pitchFamily="49" charset="0"/>
+                <a:cs typeface="Courier New" pitchFamily="49" charset="0"/>
+              </a:rPr>
+              <a:t>&lt;&lt;</a:t>
+            </a:r>
+            <a:r>
+              <a:rPr lang="en-US" sz="1600" dirty="0">
+                <a:latin typeface="Courier New" pitchFamily="49" charset="0"/>
+                <a:cs typeface="Courier New" pitchFamily="49" charset="0"/>
+              </a:rPr>
+              <a:t> </a:t>
+            </a:r>
+            <a:r>
+              <a:rPr lang="en-US" sz="1600" dirty="0" err="1">
+                <a:latin typeface="Courier New" pitchFamily="49" charset="0"/>
+                <a:cs typeface="Courier New" pitchFamily="49" charset="0"/>
+              </a:rPr>
+              <a:t>endl</a:t>
+            </a:r>
+            <a:r>
+              <a:rPr lang="en-US" sz="1600" dirty="0">
+                <a:latin typeface="Courier New" pitchFamily="49" charset="0"/>
+                <a:cs typeface="Courier New" pitchFamily="49" charset="0"/>
+              </a:rPr>
+              <a:t>;</a:t>
+            </a:r>
+          </a:p>
+          <a:p>
+            <a:r>
+              <a:rPr lang="en-US" sz="1600" dirty="0">
+                <a:latin typeface="Courier New" pitchFamily="49" charset="0"/>
+                <a:cs typeface="Courier New" pitchFamily="49" charset="0"/>
+              </a:rPr>
+              <a:t>    }</a:t>
+            </a:r>
+          </a:p>
+          <a:p>
+            <a:r>
+              <a:rPr lang="en-US" sz="1600" dirty="0" smtClean="0">
+                <a:latin typeface="Courier New" pitchFamily="49" charset="0"/>
+                <a:cs typeface="Courier New" pitchFamily="49" charset="0"/>
+              </a:rPr>
+              <a:t>…</a:t>
+            </a:r>
+            <a:endParaRPr lang="en-US" sz="1600" dirty="0">
+              <a:latin typeface="Courier New" pitchFamily="49" charset="0"/>
+              <a:cs typeface="Courier New" pitchFamily="49" charset="0"/>
+            </a:endParaRPr>
+          </a:p>
+        </p:txBody>
+      </p:sp>
+      <p:sp>
+        <p:nvSpPr>
+          <p:cNvPr id="6" name="TextBox 5"/>
+          <p:cNvSpPr txBox="1"/>
+          <p:nvPr/>
+        </p:nvSpPr>
+        <p:spPr>
+          <a:xfrm>
+            <a:off x="3750700" y="1825625"/>
+            <a:ext cx="1497013" cy="400110"/>
+          </a:xfrm>
+          <a:prstGeom prst="rect">
+            <a:avLst/>
+          </a:prstGeom>
+          <a:noFill/>
+          <a:ln>
+            <a:solidFill>
+              <a:schemeClr val="tx1"/>
+            </a:solidFill>
+          </a:ln>
+        </p:spPr>
+        <p:txBody>
+          <a:bodyPr wrap="none" rtlCol="0">
+            <a:spAutoFit/>
+          </a:bodyPr>
+          <a:lstStyle/>
+          <a:p>
+            <a:r>
+              <a:rPr lang="en-US" sz="2000" dirty="0" smtClean="0"/>
+              <a:t>Operator </a:t>
+            </a:r>
+            <a:r>
+              <a:rPr lang="en-US" sz="2000" dirty="0" smtClean="0">
+                <a:latin typeface="Courier New" panose="02070309020205020404" pitchFamily="49" charset="0"/>
+                <a:cs typeface="Courier New" panose="02070309020205020404" pitchFamily="49" charset="0"/>
+              </a:rPr>
+              <a:t>&gt;&gt;</a:t>
+            </a:r>
+            <a:endParaRPr lang="en-US" sz="2000" dirty="0">
+              <a:latin typeface="Courier New" panose="02070309020205020404" pitchFamily="49" charset="0"/>
+              <a:cs typeface="Courier New" panose="02070309020205020404" pitchFamily="49" charset="0"/>
+            </a:endParaRPr>
+          </a:p>
+        </p:txBody>
+      </p:sp>
+      <p:sp>
+        <p:nvSpPr>
+          <p:cNvPr id="7" name="TextBox 6"/>
+          <p:cNvSpPr txBox="1"/>
+          <p:nvPr/>
+        </p:nvSpPr>
+        <p:spPr>
+          <a:xfrm>
+            <a:off x="3823493" y="3155986"/>
+            <a:ext cx="1497013" cy="400110"/>
+          </a:xfrm>
+          <a:prstGeom prst="rect">
+            <a:avLst/>
+          </a:prstGeom>
+          <a:noFill/>
+          <a:ln>
+            <a:solidFill>
+              <a:schemeClr val="tx1"/>
+            </a:solidFill>
+          </a:ln>
+        </p:spPr>
+        <p:txBody>
+          <a:bodyPr wrap="none" rtlCol="0">
+            <a:spAutoFit/>
+          </a:bodyPr>
+          <a:lstStyle/>
+          <a:p>
+            <a:r>
+              <a:rPr lang="en-US" sz="2000" dirty="0" smtClean="0"/>
+              <a:t>Operator </a:t>
+            </a:r>
+            <a:r>
+              <a:rPr lang="en-US" sz="2000" dirty="0" smtClean="0">
+                <a:latin typeface="Courier New" panose="02070309020205020404" pitchFamily="49" charset="0"/>
+                <a:cs typeface="Courier New" panose="02070309020205020404" pitchFamily="49" charset="0"/>
+              </a:rPr>
+              <a:t>&lt;&lt;</a:t>
+            </a:r>
+            <a:endParaRPr lang="en-US" sz="2000" dirty="0">
+              <a:latin typeface="Courier New" panose="02070309020205020404" pitchFamily="49" charset="0"/>
+              <a:cs typeface="Courier New" panose="02070309020205020404" pitchFamily="49" charset="0"/>
+            </a:endParaRPr>
+          </a:p>
+        </p:txBody>
+      </p:sp>
+      <p:grpSp>
+        <p:nvGrpSpPr>
+          <p:cNvPr id="10" name="Group 9"/>
+          <p:cNvGrpSpPr/>
+          <p:nvPr/>
+        </p:nvGrpSpPr>
+        <p:grpSpPr>
+          <a:xfrm>
+            <a:off x="2812025" y="4902194"/>
+            <a:ext cx="5565058" cy="855582"/>
+            <a:chOff x="-613024" y="3441725"/>
+            <a:chExt cx="5565058" cy="855582"/>
+          </a:xfrm>
+        </p:grpSpPr>
+        <p:sp>
+          <p:nvSpPr>
+            <p:cNvPr id="11" name="TextBox 10"/>
+            <p:cNvSpPr txBox="1"/>
+            <p:nvPr/>
+          </p:nvSpPr>
+          <p:spPr>
+            <a:xfrm>
+              <a:off x="199578" y="3441725"/>
+              <a:ext cx="4752456" cy="400110"/>
+            </a:xfrm>
+            <a:prstGeom prst="rect">
+              <a:avLst/>
+            </a:prstGeom>
+            <a:solidFill>
+              <a:schemeClr val="bg1"/>
+            </a:solidFill>
+            <a:ln w="19050">
+              <a:solidFill>
+                <a:srgbClr val="C00000"/>
+              </a:solidFill>
+            </a:ln>
+          </p:spPr>
+          <p:txBody>
+            <a:bodyPr wrap="square" rtlCol="0">
+              <a:spAutoFit/>
+            </a:bodyPr>
+            <a:lstStyle/>
+            <a:p>
+              <a:r>
+                <a:rPr lang="en-US" sz="2000" dirty="0" smtClean="0">
+                  <a:solidFill>
+                    <a:srgbClr val="C00000"/>
+                  </a:solidFill>
+                </a:rPr>
+                <a:t>automatic conversion </a:t>
+              </a:r>
+              <a:r>
+                <a:rPr lang="en-US" sz="2000" dirty="0" smtClean="0">
+                  <a:solidFill>
+                    <a:srgbClr val="C00000"/>
+                  </a:solidFill>
+                  <a:latin typeface="Courier New" panose="02070309020205020404" pitchFamily="49" charset="0"/>
+                  <a:cs typeface="Courier New" panose="02070309020205020404" pitchFamily="49" charset="0"/>
+                </a:rPr>
+                <a:t>string</a:t>
+              </a:r>
+              <a:r>
+                <a:rPr lang="en-US" sz="2000" dirty="0" smtClean="0">
+                  <a:solidFill>
+                    <a:srgbClr val="C00000"/>
+                  </a:solidFill>
+                </a:rPr>
+                <a:t> to </a:t>
+              </a:r>
+              <a:r>
+                <a:rPr lang="en-US" sz="2000" dirty="0" smtClean="0">
+                  <a:solidFill>
+                    <a:srgbClr val="C00000"/>
+                  </a:solidFill>
+                  <a:latin typeface="Courier New" panose="02070309020205020404" pitchFamily="49" charset="0"/>
+                  <a:cs typeface="Courier New" panose="02070309020205020404" pitchFamily="49" charset="0"/>
+                </a:rPr>
+                <a:t>double</a:t>
+              </a:r>
+              <a:endParaRPr lang="en-US" sz="2000" dirty="0">
+                <a:solidFill>
+                  <a:srgbClr val="C00000"/>
+                </a:solidFill>
+                <a:latin typeface="Courier New" panose="02070309020205020404" pitchFamily="49" charset="0"/>
+                <a:cs typeface="Courier New" panose="02070309020205020404" pitchFamily="49" charset="0"/>
+              </a:endParaRPr>
+            </a:p>
+          </p:txBody>
+        </p:sp>
+        <p:cxnSp>
+          <p:nvCxnSpPr>
+            <p:cNvPr id="12" name="Straight Arrow Connector 11"/>
+            <p:cNvCxnSpPr>
+              <a:stCxn id="11" idx="1"/>
+            </p:cNvCxnSpPr>
+            <p:nvPr/>
+          </p:nvCxnSpPr>
+          <p:spPr>
+            <a:xfrm flipH="1">
+              <a:off x="-613024" y="3641780"/>
+              <a:ext cx="812602" cy="655527"/>
+            </a:xfrm>
+            <a:prstGeom prst="straightConnector1">
+              <a:avLst/>
+            </a:prstGeom>
+            <a:ln w="19050">
+              <a:solidFill>
+                <a:srgbClr val="C00000"/>
+              </a:solidFill>
+              <a:tailEnd type="stealth" w="lg" len="lg"/>
+            </a:ln>
+          </p:spPr>
+          <p:style>
+            <a:lnRef idx="1">
+              <a:schemeClr val="accent1"/>
+            </a:lnRef>
+            <a:fillRef idx="0">
+              <a:schemeClr val="accent1"/>
+            </a:fillRef>
+            <a:effectRef idx="0">
+              <a:schemeClr val="accent1"/>
+            </a:effectRef>
+            <a:fontRef idx="minor">
+              <a:schemeClr val="tx1"/>
+            </a:fontRef>
+          </p:style>
+        </p:cxnSp>
+      </p:grpSp>
+      <p:grpSp>
+        <p:nvGrpSpPr>
+          <p:cNvPr id="16" name="Group 15"/>
+          <p:cNvGrpSpPr/>
+          <p:nvPr/>
+        </p:nvGrpSpPr>
+        <p:grpSpPr>
+          <a:xfrm>
+            <a:off x="2566219" y="6253317"/>
+            <a:ext cx="5506065" cy="535611"/>
+            <a:chOff x="-806956" y="3306224"/>
+            <a:chExt cx="5506065" cy="535611"/>
+          </a:xfrm>
+        </p:grpSpPr>
+        <p:sp>
+          <p:nvSpPr>
+            <p:cNvPr id="17" name="TextBox 16"/>
+            <p:cNvSpPr txBox="1"/>
+            <p:nvPr/>
+          </p:nvSpPr>
+          <p:spPr>
+            <a:xfrm>
+              <a:off x="-40040" y="3441725"/>
+              <a:ext cx="4739149" cy="400110"/>
+            </a:xfrm>
+            <a:prstGeom prst="rect">
+              <a:avLst/>
+            </a:prstGeom>
+            <a:solidFill>
+              <a:schemeClr val="bg1"/>
+            </a:solidFill>
+            <a:ln w="19050">
+              <a:solidFill>
+                <a:srgbClr val="C00000"/>
+              </a:solidFill>
+            </a:ln>
+          </p:spPr>
+          <p:txBody>
+            <a:bodyPr wrap="square" rtlCol="0">
+              <a:spAutoFit/>
+            </a:bodyPr>
+            <a:lstStyle/>
+            <a:p>
+              <a:r>
+                <a:rPr lang="en-US" sz="2000" dirty="0" smtClean="0">
+                  <a:solidFill>
+                    <a:srgbClr val="C00000"/>
+                  </a:solidFill>
+                </a:rPr>
+                <a:t>automatic conversion </a:t>
+              </a:r>
+              <a:r>
+                <a:rPr lang="en-US" sz="2000" dirty="0" smtClean="0">
+                  <a:solidFill>
+                    <a:srgbClr val="C00000"/>
+                  </a:solidFill>
+                  <a:latin typeface="Courier New" panose="02070309020205020404" pitchFamily="49" charset="0"/>
+                  <a:cs typeface="Courier New" panose="02070309020205020404" pitchFamily="49" charset="0"/>
+                </a:rPr>
+                <a:t>double</a:t>
+              </a:r>
+              <a:r>
+                <a:rPr lang="en-US" sz="2000" dirty="0" smtClean="0">
+                  <a:solidFill>
+                    <a:srgbClr val="C00000"/>
+                  </a:solidFill>
+                </a:rPr>
+                <a:t> to </a:t>
+              </a:r>
+              <a:r>
+                <a:rPr lang="en-US" sz="2000" dirty="0" smtClean="0">
+                  <a:solidFill>
+                    <a:srgbClr val="C00000"/>
+                  </a:solidFill>
+                  <a:latin typeface="Courier New" panose="02070309020205020404" pitchFamily="49" charset="0"/>
+                  <a:cs typeface="Courier New" panose="02070309020205020404" pitchFamily="49" charset="0"/>
+                </a:rPr>
+                <a:t>string</a:t>
+              </a:r>
+              <a:endParaRPr lang="en-US" sz="2000" dirty="0">
+                <a:solidFill>
+                  <a:srgbClr val="C00000"/>
+                </a:solidFill>
+                <a:latin typeface="Courier New" panose="02070309020205020404" pitchFamily="49" charset="0"/>
+                <a:cs typeface="Courier New" panose="02070309020205020404" pitchFamily="49" charset="0"/>
+              </a:endParaRPr>
+            </a:p>
+          </p:txBody>
+        </p:sp>
+        <p:cxnSp>
+          <p:nvCxnSpPr>
+            <p:cNvPr id="18" name="Straight Arrow Connector 17"/>
+            <p:cNvCxnSpPr>
+              <a:stCxn id="17" idx="1"/>
+            </p:cNvCxnSpPr>
+            <p:nvPr/>
+          </p:nvCxnSpPr>
+          <p:spPr>
+            <a:xfrm flipH="1" flipV="1">
+              <a:off x="-806956" y="3306224"/>
+              <a:ext cx="766916" cy="335556"/>
+            </a:xfrm>
+            <a:prstGeom prst="straightConnector1">
+              <a:avLst/>
+            </a:prstGeom>
+            <a:ln w="19050">
+              <a:solidFill>
+                <a:srgbClr val="C00000"/>
+              </a:solidFill>
+              <a:tailEnd type="stealth" w="lg" len="lg"/>
+            </a:ln>
+          </p:spPr>
+          <p:style>
+            <a:lnRef idx="1">
+              <a:schemeClr val="accent1"/>
+            </a:lnRef>
+            <a:fillRef idx="0">
+              <a:schemeClr val="accent1"/>
+            </a:fillRef>
+            <a:effectRef idx="0">
+              <a:schemeClr val="accent1"/>
+            </a:effectRef>
+            <a:fontRef idx="minor">
+              <a:schemeClr val="tx1"/>
+            </a:fontRef>
+          </p:style>
+        </p:cxnSp>
+      </p:grpSp>
+    </p:spTree>
+    <p:extLst>
+      <p:ext uri="{BB962C8B-B14F-4D97-AF65-F5344CB8AC3E}">
+        <p14:creationId xmlns:p14="http://schemas.microsoft.com/office/powerpoint/2010/main" val="1289357250"/>
       </p:ext>
     </p:extLst>
   </p:cSld>
@@ -11853,7 +12953,485 @@
                                           </p:stCondLst>
                                         </p:cTn>
                                         <p:tgtEl>
-                                          <p:spTgt spid="5"/>
+                                          <p:spTgt spid="5">
+                                            <p:txEl>
+                                              <p:pRg st="0" end="0"/>
+                                            </p:txEl>
+                                          </p:spTgt>
+                                        </p:tgtEl>
+                                        <p:attrNameLst>
+                                          <p:attrName>style.visibility</p:attrName>
+                                        </p:attrNameLst>
+                                      </p:cBhvr>
+                                      <p:to>
+                                        <p:strVal val="visible"/>
+                                      </p:to>
+                                    </p:set>
+                                  </p:childTnLst>
+                                </p:cTn>
+                              </p:par>
+                            </p:childTnLst>
+                          </p:cTn>
+                        </p:par>
+                      </p:childTnLst>
+                    </p:cTn>
+                  </p:par>
+                  <p:par>
+                    <p:cTn id="7" fill="hold">
+                      <p:stCondLst>
+                        <p:cond delay="indefinite"/>
+                      </p:stCondLst>
+                      <p:childTnLst>
+                        <p:par>
+                          <p:cTn id="8" fill="hold">
+                            <p:stCondLst>
+                              <p:cond delay="0"/>
+                            </p:stCondLst>
+                            <p:childTnLst>
+                              <p:par>
+                                <p:cTn id="9" presetID="1" presetClass="entr" presetSubtype="0" fill="hold" grpId="0" nodeType="clickEffect">
+                                  <p:stCondLst>
+                                    <p:cond delay="0"/>
+                                  </p:stCondLst>
+                                  <p:childTnLst>
+                                    <p:set>
+                                      <p:cBhvr>
+                                        <p:cTn id="10" dur="1" fill="hold">
+                                          <p:stCondLst>
+                                            <p:cond delay="0"/>
+                                          </p:stCondLst>
+                                        </p:cTn>
+                                        <p:tgtEl>
+                                          <p:spTgt spid="5">
+                                            <p:txEl>
+                                              <p:pRg st="1" end="1"/>
+                                            </p:txEl>
+                                          </p:spTgt>
+                                        </p:tgtEl>
+                                        <p:attrNameLst>
+                                          <p:attrName>style.visibility</p:attrName>
+                                        </p:attrNameLst>
+                                      </p:cBhvr>
+                                      <p:to>
+                                        <p:strVal val="visible"/>
+                                      </p:to>
+                                    </p:set>
+                                  </p:childTnLst>
+                                </p:cTn>
+                              </p:par>
+                            </p:childTnLst>
+                          </p:cTn>
+                        </p:par>
+                      </p:childTnLst>
+                    </p:cTn>
+                  </p:par>
+                  <p:par>
+                    <p:cTn id="11" fill="hold">
+                      <p:stCondLst>
+                        <p:cond delay="indefinite"/>
+                      </p:stCondLst>
+                      <p:childTnLst>
+                        <p:par>
+                          <p:cTn id="12" fill="hold">
+                            <p:stCondLst>
+                              <p:cond delay="0"/>
+                            </p:stCondLst>
+                            <p:childTnLst>
+                              <p:par>
+                                <p:cTn id="13" presetID="1" presetClass="entr" presetSubtype="0" fill="hold" grpId="0" nodeType="clickEffect">
+                                  <p:stCondLst>
+                                    <p:cond delay="0"/>
+                                  </p:stCondLst>
+                                  <p:childTnLst>
+                                    <p:set>
+                                      <p:cBhvr>
+                                        <p:cTn id="14" dur="1" fill="hold">
+                                          <p:stCondLst>
+                                            <p:cond delay="0"/>
+                                          </p:stCondLst>
+                                        </p:cTn>
+                                        <p:tgtEl>
+                                          <p:spTgt spid="5">
+                                            <p:txEl>
+                                              <p:pRg st="2" end="2"/>
+                                            </p:txEl>
+                                          </p:spTgt>
+                                        </p:tgtEl>
+                                        <p:attrNameLst>
+                                          <p:attrName>style.visibility</p:attrName>
+                                        </p:attrNameLst>
+                                      </p:cBhvr>
+                                      <p:to>
+                                        <p:strVal val="visible"/>
+                                      </p:to>
+                                    </p:set>
+                                  </p:childTnLst>
+                                </p:cTn>
+                              </p:par>
+                            </p:childTnLst>
+                          </p:cTn>
+                        </p:par>
+                      </p:childTnLst>
+                    </p:cTn>
+                  </p:par>
+                  <p:par>
+                    <p:cTn id="15" fill="hold">
+                      <p:stCondLst>
+                        <p:cond delay="indefinite"/>
+                      </p:stCondLst>
+                      <p:childTnLst>
+                        <p:par>
+                          <p:cTn id="16" fill="hold">
+                            <p:stCondLst>
+                              <p:cond delay="0"/>
+                            </p:stCondLst>
+                            <p:childTnLst>
+                              <p:par>
+                                <p:cTn id="17" presetID="1" presetClass="entr" presetSubtype="0" fill="hold" grpId="0" nodeType="clickEffect">
+                                  <p:stCondLst>
+                                    <p:cond delay="0"/>
+                                  </p:stCondLst>
+                                  <p:childTnLst>
+                                    <p:set>
+                                      <p:cBhvr>
+                                        <p:cTn id="18" dur="1" fill="hold">
+                                          <p:stCondLst>
+                                            <p:cond delay="0"/>
+                                          </p:stCondLst>
+                                        </p:cTn>
+                                        <p:tgtEl>
+                                          <p:spTgt spid="6"/>
+                                        </p:tgtEl>
+                                        <p:attrNameLst>
+                                          <p:attrName>style.visibility</p:attrName>
+                                        </p:attrNameLst>
+                                      </p:cBhvr>
+                                      <p:to>
+                                        <p:strVal val="visible"/>
+                                      </p:to>
+                                    </p:set>
+                                  </p:childTnLst>
+                                </p:cTn>
+                              </p:par>
+                            </p:childTnLst>
+                          </p:cTn>
+                        </p:par>
+                      </p:childTnLst>
+                    </p:cTn>
+                  </p:par>
+                  <p:par>
+                    <p:cTn id="19" fill="hold">
+                      <p:stCondLst>
+                        <p:cond delay="indefinite"/>
+                      </p:stCondLst>
+                      <p:childTnLst>
+                        <p:par>
+                          <p:cTn id="20" fill="hold">
+                            <p:stCondLst>
+                              <p:cond delay="0"/>
+                            </p:stCondLst>
+                            <p:childTnLst>
+                              <p:par>
+                                <p:cTn id="21" presetID="1" presetClass="entr" presetSubtype="0" fill="hold" grpId="0" nodeType="clickEffect">
+                                  <p:stCondLst>
+                                    <p:cond delay="0"/>
+                                  </p:stCondLst>
+                                  <p:childTnLst>
+                                    <p:set>
+                                      <p:cBhvr>
+                                        <p:cTn id="22" dur="1" fill="hold">
+                                          <p:stCondLst>
+                                            <p:cond delay="0"/>
+                                          </p:stCondLst>
+                                        </p:cTn>
+                                        <p:tgtEl>
+                                          <p:spTgt spid="5">
+                                            <p:txEl>
+                                              <p:pRg st="3" end="3"/>
+                                            </p:txEl>
+                                          </p:spTgt>
+                                        </p:tgtEl>
+                                        <p:attrNameLst>
+                                          <p:attrName>style.visibility</p:attrName>
+                                        </p:attrNameLst>
+                                      </p:cBhvr>
+                                      <p:to>
+                                        <p:strVal val="visible"/>
+                                      </p:to>
+                                    </p:set>
+                                  </p:childTnLst>
+                                </p:cTn>
+                              </p:par>
+                            </p:childTnLst>
+                          </p:cTn>
+                        </p:par>
+                      </p:childTnLst>
+                    </p:cTn>
+                  </p:par>
+                  <p:par>
+                    <p:cTn id="23" fill="hold">
+                      <p:stCondLst>
+                        <p:cond delay="indefinite"/>
+                      </p:stCondLst>
+                      <p:childTnLst>
+                        <p:par>
+                          <p:cTn id="24" fill="hold">
+                            <p:stCondLst>
+                              <p:cond delay="0"/>
+                            </p:stCondLst>
+                            <p:childTnLst>
+                              <p:par>
+                                <p:cTn id="25" presetID="1" presetClass="entr" presetSubtype="0" fill="hold" grpId="0" nodeType="clickEffect">
+                                  <p:stCondLst>
+                                    <p:cond delay="0"/>
+                                  </p:stCondLst>
+                                  <p:childTnLst>
+                                    <p:set>
+                                      <p:cBhvr>
+                                        <p:cTn id="26" dur="1" fill="hold">
+                                          <p:stCondLst>
+                                            <p:cond delay="0"/>
+                                          </p:stCondLst>
+                                        </p:cTn>
+                                        <p:tgtEl>
+                                          <p:spTgt spid="5">
+                                            <p:txEl>
+                                              <p:pRg st="4" end="4"/>
+                                            </p:txEl>
+                                          </p:spTgt>
+                                        </p:tgtEl>
+                                        <p:attrNameLst>
+                                          <p:attrName>style.visibility</p:attrName>
+                                        </p:attrNameLst>
+                                      </p:cBhvr>
+                                      <p:to>
+                                        <p:strVal val="visible"/>
+                                      </p:to>
+                                    </p:set>
+                                  </p:childTnLst>
+                                </p:cTn>
+                              </p:par>
+                            </p:childTnLst>
+                          </p:cTn>
+                        </p:par>
+                      </p:childTnLst>
+                    </p:cTn>
+                  </p:par>
+                  <p:par>
+                    <p:cTn id="27" fill="hold">
+                      <p:stCondLst>
+                        <p:cond delay="indefinite"/>
+                      </p:stCondLst>
+                      <p:childTnLst>
+                        <p:par>
+                          <p:cTn id="28" fill="hold">
+                            <p:stCondLst>
+                              <p:cond delay="0"/>
+                            </p:stCondLst>
+                            <p:childTnLst>
+                              <p:par>
+                                <p:cTn id="29" presetID="1" presetClass="entr" presetSubtype="0" fill="hold" grpId="0" nodeType="clickEffect">
+                                  <p:stCondLst>
+                                    <p:cond delay="0"/>
+                                  </p:stCondLst>
+                                  <p:childTnLst>
+                                    <p:set>
+                                      <p:cBhvr>
+                                        <p:cTn id="30" dur="1" fill="hold">
+                                          <p:stCondLst>
+                                            <p:cond delay="0"/>
+                                          </p:stCondLst>
+                                        </p:cTn>
+                                        <p:tgtEl>
+                                          <p:spTgt spid="5">
+                                            <p:txEl>
+                                              <p:pRg st="5" end="5"/>
+                                            </p:txEl>
+                                          </p:spTgt>
+                                        </p:tgtEl>
+                                        <p:attrNameLst>
+                                          <p:attrName>style.visibility</p:attrName>
+                                        </p:attrNameLst>
+                                      </p:cBhvr>
+                                      <p:to>
+                                        <p:strVal val="visible"/>
+                                      </p:to>
+                                    </p:set>
+                                  </p:childTnLst>
+                                </p:cTn>
+                              </p:par>
+                            </p:childTnLst>
+                          </p:cTn>
+                        </p:par>
+                      </p:childTnLst>
+                    </p:cTn>
+                  </p:par>
+                  <p:par>
+                    <p:cTn id="31" fill="hold">
+                      <p:stCondLst>
+                        <p:cond delay="indefinite"/>
+                      </p:stCondLst>
+                      <p:childTnLst>
+                        <p:par>
+                          <p:cTn id="32" fill="hold">
+                            <p:stCondLst>
+                              <p:cond delay="0"/>
+                            </p:stCondLst>
+                            <p:childTnLst>
+                              <p:par>
+                                <p:cTn id="33" presetID="1" presetClass="entr" presetSubtype="0" fill="hold" grpId="0" nodeType="clickEffect">
+                                  <p:stCondLst>
+                                    <p:cond delay="0"/>
+                                  </p:stCondLst>
+                                  <p:childTnLst>
+                                    <p:set>
+                                      <p:cBhvr>
+                                        <p:cTn id="34" dur="1" fill="hold">
+                                          <p:stCondLst>
+                                            <p:cond delay="0"/>
+                                          </p:stCondLst>
+                                        </p:cTn>
+                                        <p:tgtEl>
+                                          <p:spTgt spid="5">
+                                            <p:txEl>
+                                              <p:pRg st="6" end="6"/>
+                                            </p:txEl>
+                                          </p:spTgt>
+                                        </p:tgtEl>
+                                        <p:attrNameLst>
+                                          <p:attrName>style.visibility</p:attrName>
+                                        </p:attrNameLst>
+                                      </p:cBhvr>
+                                      <p:to>
+                                        <p:strVal val="visible"/>
+                                      </p:to>
+                                    </p:set>
+                                  </p:childTnLst>
+                                </p:cTn>
+                              </p:par>
+                            </p:childTnLst>
+                          </p:cTn>
+                        </p:par>
+                      </p:childTnLst>
+                    </p:cTn>
+                  </p:par>
+                  <p:par>
+                    <p:cTn id="35" fill="hold">
+                      <p:stCondLst>
+                        <p:cond delay="indefinite"/>
+                      </p:stCondLst>
+                      <p:childTnLst>
+                        <p:par>
+                          <p:cTn id="36" fill="hold">
+                            <p:stCondLst>
+                              <p:cond delay="0"/>
+                            </p:stCondLst>
+                            <p:childTnLst>
+                              <p:par>
+                                <p:cTn id="37" presetID="1" presetClass="entr" presetSubtype="0" fill="hold" grpId="0" nodeType="clickEffect">
+                                  <p:stCondLst>
+                                    <p:cond delay="0"/>
+                                  </p:stCondLst>
+                                  <p:childTnLst>
+                                    <p:set>
+                                      <p:cBhvr>
+                                        <p:cTn id="38" dur="1" fill="hold">
+                                          <p:stCondLst>
+                                            <p:cond delay="0"/>
+                                          </p:stCondLst>
+                                        </p:cTn>
+                                        <p:tgtEl>
+                                          <p:spTgt spid="7"/>
+                                        </p:tgtEl>
+                                        <p:attrNameLst>
+                                          <p:attrName>style.visibility</p:attrName>
+                                        </p:attrNameLst>
+                                      </p:cBhvr>
+                                      <p:to>
+                                        <p:strVal val="visible"/>
+                                      </p:to>
+                                    </p:set>
+                                  </p:childTnLst>
+                                </p:cTn>
+                              </p:par>
+                            </p:childTnLst>
+                          </p:cTn>
+                        </p:par>
+                      </p:childTnLst>
+                    </p:cTn>
+                  </p:par>
+                  <p:par>
+                    <p:cTn id="39" fill="hold">
+                      <p:stCondLst>
+                        <p:cond delay="indefinite"/>
+                      </p:stCondLst>
+                      <p:childTnLst>
+                        <p:par>
+                          <p:cTn id="40" fill="hold">
+                            <p:stCondLst>
+                              <p:cond delay="0"/>
+                            </p:stCondLst>
+                            <p:childTnLst>
+                              <p:par>
+                                <p:cTn id="41" presetID="1" presetClass="entr" presetSubtype="0" fill="hold" nodeType="clickEffect">
+                                  <p:stCondLst>
+                                    <p:cond delay="0"/>
+                                  </p:stCondLst>
+                                  <p:childTnLst>
+                                    <p:set>
+                                      <p:cBhvr>
+                                        <p:cTn id="42" dur="1" fill="hold">
+                                          <p:stCondLst>
+                                            <p:cond delay="0"/>
+                                          </p:stCondLst>
+                                        </p:cTn>
+                                        <p:tgtEl>
+                                          <p:spTgt spid="10"/>
+                                        </p:tgtEl>
+                                        <p:attrNameLst>
+                                          <p:attrName>style.visibility</p:attrName>
+                                        </p:attrNameLst>
+                                      </p:cBhvr>
+                                      <p:to>
+                                        <p:strVal val="visible"/>
+                                      </p:to>
+                                    </p:set>
+                                  </p:childTnLst>
+                                </p:cTn>
+                              </p:par>
+                            </p:childTnLst>
+                          </p:cTn>
+                        </p:par>
+                      </p:childTnLst>
+                    </p:cTn>
+                  </p:par>
+                  <p:par>
+                    <p:cTn id="43" fill="hold">
+                      <p:stCondLst>
+                        <p:cond delay="indefinite"/>
+                      </p:stCondLst>
+                      <p:childTnLst>
+                        <p:par>
+                          <p:cTn id="44" fill="hold">
+                            <p:stCondLst>
+                              <p:cond delay="0"/>
+                            </p:stCondLst>
+                            <p:childTnLst>
+                              <p:par>
+                                <p:cTn id="45" presetID="1" presetClass="entr" presetSubtype="0" fill="hold" nodeType="clickEffect">
+                                  <p:stCondLst>
+                                    <p:cond delay="0"/>
+                                  </p:stCondLst>
+                                  <p:childTnLst>
+                                    <p:set>
+                                      <p:cBhvr>
+                                        <p:cTn id="46" dur="1" fill="hold">
+                                          <p:stCondLst>
+                                            <p:cond delay="0"/>
+                                          </p:stCondLst>
+                                        </p:cTn>
+                                        <p:tgtEl>
+                                          <p:spTgt spid="16"/>
                                         </p:tgtEl>
                                         <p:attrNameLst>
                                           <p:attrName>style.visibility</p:attrName>
@@ -11894,7 +13472,654 @@
       </p:par>
     </p:tnLst>
     <p:bldLst>
-      <p:bldP spid="5" grpId="0" animBg="1"/>
+      <p:bldP spid="5" grpId="0" uiExpand="1" build="p" bldLvl="2"/>
+      <p:bldP spid="6" grpId="0" animBg="1"/>
+      <p:bldP spid="7" grpId="0" animBg="1"/>
+    </p:bldLst>
+  </p:timing>
+</p:sld>
+</file>
+
+<file path=ppt/slides/slide19.xml><?xml version="1.0" encoding="utf-8"?>
+<p:sld xmlns:a="http://schemas.openxmlformats.org/drawingml/2006/main" xmlns:r="http://schemas.openxmlformats.org/officeDocument/2006/relationships" xmlns:p="http://schemas.openxmlformats.org/presentationml/2006/main">
+  <p:cSld>
+    <p:spTree>
+      <p:nvGrpSpPr>
+        <p:cNvPr id="1" name=""/>
+        <p:cNvGrpSpPr/>
+        <p:nvPr/>
+      </p:nvGrpSpPr>
+      <p:grpSpPr>
+        <a:xfrm>
+          <a:off x="0" y="0"/>
+          <a:ext cx="0" cy="0"/>
+          <a:chOff x="0" y="0"/>
+          <a:chExt cx="0" cy="0"/>
+        </a:xfrm>
+      </p:grpSpPr>
+      <p:sp>
+        <p:nvSpPr>
+          <p:cNvPr id="2" name="Title 1"/>
+          <p:cNvSpPr>
+            <a:spLocks noGrp="1"/>
+          </p:cNvSpPr>
+          <p:nvPr>
+            <p:ph type="title"/>
+          </p:nvPr>
+        </p:nvSpPr>
+        <p:spPr/>
+        <p:txBody>
+          <a:bodyPr/>
+          <a:lstStyle/>
+          <a:p>
+            <a:r>
+              <a:rPr lang="en-US" dirty="0" smtClean="0"/>
+              <a:t>I/O operator semantics</a:t>
+            </a:r>
+            <a:endParaRPr lang="en-US" dirty="0"/>
+          </a:p>
+        </p:txBody>
+      </p:sp>
+      <p:sp>
+        <p:nvSpPr>
+          <p:cNvPr id="3" name="Content Placeholder 2"/>
+          <p:cNvSpPr>
+            <a:spLocks noGrp="1"/>
+          </p:cNvSpPr>
+          <p:nvPr>
+            <p:ph idx="1"/>
+          </p:nvPr>
+        </p:nvSpPr>
+        <p:spPr/>
+        <p:txBody>
+          <a:bodyPr>
+            <a:normAutofit lnSpcReduction="10000"/>
+          </a:bodyPr>
+          <a:lstStyle/>
+          <a:p>
+            <a:r>
+              <a:rPr lang="en-US" dirty="0" smtClean="0"/>
+              <a:t>Read string representation of </a:t>
+            </a:r>
+            <a:r>
+              <a:rPr lang="en-US" dirty="0" smtClean="0">
+                <a:latin typeface="Courier New" panose="02070309020205020404" pitchFamily="49" charset="0"/>
+                <a:cs typeface="Courier New" panose="02070309020205020404" pitchFamily="49" charset="0"/>
+              </a:rPr>
+              <a:t>double</a:t>
+            </a:r>
+            <a:r>
+              <a:rPr lang="en-US" dirty="0" smtClean="0"/>
+              <a:t> from standard input, assign to variable </a:t>
+            </a:r>
+            <a:r>
+              <a:rPr lang="en-US" dirty="0" smtClean="0">
+                <a:latin typeface="Courier New" panose="02070309020205020404" pitchFamily="49" charset="0"/>
+                <a:cs typeface="Courier New" panose="02070309020205020404" pitchFamily="49" charset="0"/>
+              </a:rPr>
+              <a:t>a</a:t>
+            </a:r>
+            <a:r>
+              <a:rPr lang="en-US" dirty="0" smtClean="0"/>
+              <a:t>, read string representation of </a:t>
+            </a:r>
+            <a:r>
+              <a:rPr lang="en-US" dirty="0" smtClean="0">
+                <a:latin typeface="Courier New" panose="02070309020205020404" pitchFamily="49" charset="0"/>
+                <a:cs typeface="Courier New" panose="02070309020205020404" pitchFamily="49" charset="0"/>
+              </a:rPr>
+              <a:t>double</a:t>
+            </a:r>
+            <a:r>
+              <a:rPr lang="en-US" dirty="0" smtClean="0"/>
+              <a:t> from standard input, assign to variable </a:t>
+            </a:r>
+            <a:r>
+              <a:rPr lang="en-US" dirty="0" smtClean="0">
+                <a:latin typeface="Courier New" panose="02070309020205020404" pitchFamily="49" charset="0"/>
+                <a:cs typeface="Courier New" panose="02070309020205020404" pitchFamily="49" charset="0"/>
+              </a:rPr>
+              <a:t>b</a:t>
+            </a:r>
+            <a:r>
+              <a:rPr lang="en-US" dirty="0" smtClean="0">
+                <a:cs typeface="Courier New" panose="02070309020205020404" pitchFamily="49" charset="0"/>
+              </a:rPr>
+              <a:t>, </a:t>
+            </a:r>
+            <a:r>
+              <a:rPr lang="en-US" dirty="0" smtClean="0">
+                <a:latin typeface="Courier New" panose="02070309020205020404" pitchFamily="49" charset="0"/>
+                <a:cs typeface="Courier New" panose="02070309020205020404" pitchFamily="49" charset="0"/>
+              </a:rPr>
+              <a:t>true</a:t>
+            </a:r>
+            <a:r>
+              <a:rPr lang="en-US" dirty="0" smtClean="0">
+                <a:cs typeface="Courier New" panose="02070309020205020404" pitchFamily="49" charset="0"/>
+              </a:rPr>
+              <a:t> on success, </a:t>
+            </a:r>
+            <a:r>
+              <a:rPr lang="en-US" dirty="0" smtClean="0">
+                <a:latin typeface="Courier New" panose="02070309020205020404" pitchFamily="49" charset="0"/>
+                <a:cs typeface="Courier New" panose="02070309020205020404" pitchFamily="49" charset="0"/>
+              </a:rPr>
+              <a:t>false</a:t>
+            </a:r>
+            <a:r>
+              <a:rPr lang="en-US" dirty="0" smtClean="0">
+                <a:cs typeface="Courier New" panose="02070309020205020404" pitchFamily="49" charset="0"/>
+              </a:rPr>
+              <a:t> otherwise.</a:t>
+            </a:r>
+          </a:p>
+          <a:p>
+            <a:endParaRPr lang="en-US" dirty="0"/>
+          </a:p>
+          <a:p>
+            <a:endParaRPr lang="en-US" dirty="0" smtClean="0"/>
+          </a:p>
+          <a:p>
+            <a:r>
+              <a:rPr lang="en-US" dirty="0" smtClean="0"/>
+              <a:t>Convert </a:t>
+            </a:r>
+            <a:r>
+              <a:rPr lang="en-US" dirty="0" smtClean="0">
+                <a:latin typeface="Courier New" panose="02070309020205020404" pitchFamily="49" charset="0"/>
+                <a:cs typeface="Courier New" panose="02070309020205020404" pitchFamily="49" charset="0"/>
+              </a:rPr>
+              <a:t>double</a:t>
+            </a:r>
+            <a:r>
+              <a:rPr lang="en-US" dirty="0" smtClean="0"/>
+              <a:t>, i.e., return value of </a:t>
+            </a:r>
+            <a:r>
+              <a:rPr lang="en-US" dirty="0" err="1" smtClean="0">
+                <a:latin typeface="Courier New" panose="02070309020205020404" pitchFamily="49" charset="0"/>
+                <a:cs typeface="Courier New" panose="02070309020205020404" pitchFamily="49" charset="0"/>
+              </a:rPr>
+              <a:t>dist</a:t>
+            </a:r>
+            <a:r>
+              <a:rPr lang="en-US" dirty="0" smtClean="0"/>
+              <a:t> call to string representation, and write to standard output, write end-of-line to standard output (</a:t>
+            </a:r>
+            <a:r>
+              <a:rPr lang="en-US" dirty="0" smtClean="0">
+                <a:latin typeface="Courier New" panose="02070309020205020404" pitchFamily="49" charset="0"/>
+                <a:cs typeface="Courier New" panose="02070309020205020404" pitchFamily="49" charset="0"/>
+              </a:rPr>
+              <a:t>'\n'</a:t>
+            </a:r>
+            <a:r>
+              <a:rPr lang="en-US" dirty="0" smtClean="0"/>
+              <a:t> on Linux/</a:t>
+            </a:r>
+            <a:r>
+              <a:rPr lang="en-US" dirty="0" err="1" smtClean="0"/>
+              <a:t>MacOS</a:t>
+            </a:r>
+            <a:r>
+              <a:rPr lang="en-US" dirty="0" smtClean="0"/>
+              <a:t> X, </a:t>
+            </a:r>
+            <a:r>
+              <a:rPr lang="en-US" dirty="0" smtClean="0">
+                <a:latin typeface="Courier New" panose="02070309020205020404" pitchFamily="49" charset="0"/>
+                <a:cs typeface="Courier New" panose="02070309020205020404" pitchFamily="49" charset="0"/>
+              </a:rPr>
+              <a:t>'\r'</a:t>
+            </a:r>
+            <a:r>
+              <a:rPr lang="en-US" dirty="0" smtClean="0"/>
+              <a:t> + </a:t>
+            </a:r>
+            <a:r>
+              <a:rPr lang="en-US" dirty="0" smtClean="0">
+                <a:latin typeface="Courier New" panose="02070309020205020404" pitchFamily="49" charset="0"/>
+                <a:cs typeface="Courier New" panose="02070309020205020404" pitchFamily="49" charset="0"/>
+              </a:rPr>
+              <a:t>'\n'</a:t>
+            </a:r>
+            <a:r>
+              <a:rPr lang="en-US" dirty="0" smtClean="0"/>
+              <a:t> on </a:t>
+            </a:r>
+            <a:r>
+              <a:rPr lang="en-US" smtClean="0"/>
+              <a:t>Windows).</a:t>
+            </a:r>
+            <a:endParaRPr lang="en-US" dirty="0"/>
+          </a:p>
+        </p:txBody>
+      </p:sp>
+      <p:sp>
+        <p:nvSpPr>
+          <p:cNvPr id="4" name="Slide Number Placeholder 3"/>
+          <p:cNvSpPr>
+            <a:spLocks noGrp="1"/>
+          </p:cNvSpPr>
+          <p:nvPr>
+            <p:ph type="sldNum" sz="quarter" idx="12"/>
+          </p:nvPr>
+        </p:nvSpPr>
+        <p:spPr/>
+        <p:txBody>
+          <a:bodyPr/>
+          <a:lstStyle/>
+          <a:p>
+            <a:fld id="{033373DF-BCDA-4600-B448-AFBDB22F4A39}" type="slidenum">
+              <a:rPr lang="en-US" smtClean="0"/>
+              <a:t>19</a:t>
+            </a:fld>
+            <a:endParaRPr lang="en-US"/>
+          </a:p>
+        </p:txBody>
+      </p:sp>
+      <p:sp>
+        <p:nvSpPr>
+          <p:cNvPr id="5" name="TextBox 4"/>
+          <p:cNvSpPr txBox="1"/>
+          <p:nvPr/>
+        </p:nvSpPr>
+        <p:spPr>
+          <a:xfrm>
+            <a:off x="1326741" y="3681987"/>
+            <a:ext cx="3717208" cy="584775"/>
+          </a:xfrm>
+          <a:prstGeom prst="rect">
+            <a:avLst/>
+          </a:prstGeom>
+          <a:solidFill>
+            <a:schemeClr val="bg1">
+              <a:lumMod val="75000"/>
+            </a:schemeClr>
+          </a:solidFill>
+        </p:spPr>
+        <p:txBody>
+          <a:bodyPr wrap="square" rtlCol="0">
+            <a:spAutoFit/>
+          </a:bodyPr>
+          <a:lstStyle/>
+          <a:p>
+            <a:r>
+              <a:rPr lang="en-US" sz="1600" dirty="0" smtClean="0">
+                <a:latin typeface="Courier New" pitchFamily="49" charset="0"/>
+                <a:cs typeface="Courier New" pitchFamily="49" charset="0"/>
+              </a:rPr>
+              <a:t>double a, b;</a:t>
+            </a:r>
+            <a:endParaRPr lang="en-US" sz="1600" dirty="0">
+              <a:latin typeface="Courier New" pitchFamily="49" charset="0"/>
+              <a:cs typeface="Courier New" pitchFamily="49" charset="0"/>
+            </a:endParaRPr>
+          </a:p>
+          <a:p>
+            <a:r>
+              <a:rPr lang="en-US" sz="1600" dirty="0" smtClean="0">
+                <a:latin typeface="Courier New" pitchFamily="49" charset="0"/>
+                <a:cs typeface="Courier New" pitchFamily="49" charset="0"/>
+              </a:rPr>
+              <a:t>… </a:t>
+            </a:r>
+            <a:r>
+              <a:rPr lang="en-US" sz="1600" b="1" dirty="0" err="1" smtClean="0">
+                <a:latin typeface="Courier New" pitchFamily="49" charset="0"/>
+                <a:cs typeface="Courier New" pitchFamily="49" charset="0"/>
+              </a:rPr>
+              <a:t>cin</a:t>
+            </a:r>
+            <a:r>
+              <a:rPr lang="en-US" sz="1600" dirty="0" smtClean="0">
+                <a:latin typeface="Courier New" pitchFamily="49" charset="0"/>
+                <a:cs typeface="Courier New" pitchFamily="49" charset="0"/>
+              </a:rPr>
+              <a:t> </a:t>
+            </a:r>
+            <a:r>
+              <a:rPr lang="en-US" sz="1600" b="1" dirty="0">
+                <a:solidFill>
+                  <a:srgbClr val="C00000"/>
+                </a:solidFill>
+                <a:latin typeface="Courier New" pitchFamily="49" charset="0"/>
+                <a:cs typeface="Courier New" pitchFamily="49" charset="0"/>
+              </a:rPr>
+              <a:t>&gt;&gt;</a:t>
+            </a:r>
+            <a:r>
+              <a:rPr lang="en-US" sz="1600" dirty="0">
+                <a:latin typeface="Courier New" pitchFamily="49" charset="0"/>
+                <a:cs typeface="Courier New" pitchFamily="49" charset="0"/>
+              </a:rPr>
+              <a:t> a </a:t>
+            </a:r>
+            <a:r>
+              <a:rPr lang="en-US" sz="1600" b="1" dirty="0">
+                <a:solidFill>
+                  <a:srgbClr val="C00000"/>
+                </a:solidFill>
+                <a:latin typeface="Courier New" pitchFamily="49" charset="0"/>
+                <a:cs typeface="Courier New" pitchFamily="49" charset="0"/>
+              </a:rPr>
+              <a:t>&gt;&gt;</a:t>
+            </a:r>
+            <a:r>
+              <a:rPr lang="en-US" sz="1600" dirty="0">
+                <a:latin typeface="Courier New" pitchFamily="49" charset="0"/>
+                <a:cs typeface="Courier New" pitchFamily="49" charset="0"/>
+              </a:rPr>
+              <a:t> </a:t>
+            </a:r>
+            <a:r>
+              <a:rPr lang="en-US" sz="1600" dirty="0" smtClean="0">
+                <a:latin typeface="Courier New" pitchFamily="49" charset="0"/>
+                <a:cs typeface="Courier New" pitchFamily="49" charset="0"/>
+              </a:rPr>
+              <a:t>b</a:t>
+            </a:r>
+            <a:r>
+              <a:rPr lang="en-US" sz="1600" dirty="0">
+                <a:latin typeface="Courier New" pitchFamily="49" charset="0"/>
+                <a:cs typeface="Courier New" pitchFamily="49" charset="0"/>
+              </a:rPr>
+              <a:t> </a:t>
+            </a:r>
+            <a:r>
+              <a:rPr lang="en-US" sz="1600" dirty="0" smtClean="0">
+                <a:latin typeface="Courier New" pitchFamily="49" charset="0"/>
+                <a:cs typeface="Courier New" pitchFamily="49" charset="0"/>
+              </a:rPr>
+              <a:t>…</a:t>
+            </a:r>
+            <a:endParaRPr lang="en-US" sz="1600" dirty="0">
+              <a:latin typeface="Courier New" pitchFamily="49" charset="0"/>
+              <a:cs typeface="Courier New" pitchFamily="49" charset="0"/>
+            </a:endParaRPr>
+          </a:p>
+        </p:txBody>
+      </p:sp>
+      <p:sp>
+        <p:nvSpPr>
+          <p:cNvPr id="6" name="TextBox 5"/>
+          <p:cNvSpPr txBox="1"/>
+          <p:nvPr/>
+        </p:nvSpPr>
+        <p:spPr>
+          <a:xfrm>
+            <a:off x="1326739" y="6200359"/>
+            <a:ext cx="3717209" cy="338554"/>
+          </a:xfrm>
+          <a:prstGeom prst="rect">
+            <a:avLst/>
+          </a:prstGeom>
+          <a:solidFill>
+            <a:schemeClr val="bg1">
+              <a:lumMod val="75000"/>
+            </a:schemeClr>
+          </a:solidFill>
+        </p:spPr>
+        <p:txBody>
+          <a:bodyPr wrap="square" rtlCol="0">
+            <a:spAutoFit/>
+          </a:bodyPr>
+          <a:lstStyle/>
+          <a:p>
+            <a:r>
+              <a:rPr lang="en-US" sz="1600" b="1" dirty="0" err="1" smtClean="0">
+                <a:latin typeface="Courier New" pitchFamily="49" charset="0"/>
+                <a:cs typeface="Courier New" pitchFamily="49" charset="0"/>
+              </a:rPr>
+              <a:t>cout</a:t>
+            </a:r>
+            <a:r>
+              <a:rPr lang="en-US" sz="1600" dirty="0" smtClean="0">
+                <a:latin typeface="Courier New" pitchFamily="49" charset="0"/>
+                <a:cs typeface="Courier New" pitchFamily="49" charset="0"/>
+              </a:rPr>
+              <a:t> </a:t>
+            </a:r>
+            <a:r>
+              <a:rPr lang="en-US" sz="1600" b="1" dirty="0">
+                <a:solidFill>
+                  <a:srgbClr val="C00000"/>
+                </a:solidFill>
+                <a:latin typeface="Courier New" pitchFamily="49" charset="0"/>
+                <a:cs typeface="Courier New" pitchFamily="49" charset="0"/>
+              </a:rPr>
+              <a:t>&lt;&lt;</a:t>
+            </a:r>
+            <a:r>
+              <a:rPr lang="en-US" sz="1600" dirty="0">
+                <a:latin typeface="Courier New" pitchFamily="49" charset="0"/>
+                <a:cs typeface="Courier New" pitchFamily="49" charset="0"/>
+              </a:rPr>
+              <a:t> </a:t>
+            </a:r>
+            <a:r>
+              <a:rPr lang="en-US" sz="1600" dirty="0" err="1">
+                <a:latin typeface="Courier New" pitchFamily="49" charset="0"/>
+                <a:cs typeface="Courier New" pitchFamily="49" charset="0"/>
+              </a:rPr>
+              <a:t>dist</a:t>
+            </a:r>
+            <a:r>
+              <a:rPr lang="en-US" sz="1600" dirty="0">
+                <a:latin typeface="Courier New" pitchFamily="49" charset="0"/>
+                <a:cs typeface="Courier New" pitchFamily="49" charset="0"/>
+              </a:rPr>
+              <a:t>(a, b) </a:t>
+            </a:r>
+            <a:r>
+              <a:rPr lang="en-US" sz="1600" b="1" dirty="0">
+                <a:solidFill>
+                  <a:srgbClr val="C00000"/>
+                </a:solidFill>
+                <a:latin typeface="Courier New" pitchFamily="49" charset="0"/>
+                <a:cs typeface="Courier New" pitchFamily="49" charset="0"/>
+              </a:rPr>
+              <a:t>&lt;&lt;</a:t>
+            </a:r>
+            <a:r>
+              <a:rPr lang="en-US" sz="1600" dirty="0">
+                <a:latin typeface="Courier New" pitchFamily="49" charset="0"/>
+                <a:cs typeface="Courier New" pitchFamily="49" charset="0"/>
+              </a:rPr>
+              <a:t> </a:t>
+            </a:r>
+            <a:r>
+              <a:rPr lang="en-US" sz="1600" dirty="0" err="1">
+                <a:latin typeface="Courier New" pitchFamily="49" charset="0"/>
+                <a:cs typeface="Courier New" pitchFamily="49" charset="0"/>
+              </a:rPr>
+              <a:t>endl</a:t>
+            </a:r>
+            <a:r>
+              <a:rPr lang="en-US" sz="1600" dirty="0" smtClean="0">
+                <a:latin typeface="Courier New" pitchFamily="49" charset="0"/>
+                <a:cs typeface="Courier New" pitchFamily="49" charset="0"/>
+              </a:rPr>
+              <a:t>;</a:t>
+            </a:r>
+            <a:endParaRPr lang="en-US" sz="1600" dirty="0">
+              <a:latin typeface="Courier New" pitchFamily="49" charset="0"/>
+              <a:cs typeface="Courier New" pitchFamily="49" charset="0"/>
+            </a:endParaRPr>
+          </a:p>
+        </p:txBody>
+      </p:sp>
+    </p:spTree>
+    <p:extLst>
+      <p:ext uri="{BB962C8B-B14F-4D97-AF65-F5344CB8AC3E}">
+        <p14:creationId xmlns:p14="http://schemas.microsoft.com/office/powerpoint/2010/main" val="3415995685"/>
+      </p:ext>
+    </p:extLst>
+  </p:cSld>
+  <p:clrMapOvr>
+    <a:masterClrMapping/>
+  </p:clrMapOvr>
+  <p:timing>
+    <p:tnLst>
+      <p:par>
+        <p:cTn id="1" dur="indefinite" restart="never" nodeType="tmRoot">
+          <p:childTnLst>
+            <p:seq concurrent="1" nextAc="seek">
+              <p:cTn id="2" dur="indefinite" nodeType="mainSeq">
+                <p:childTnLst>
+                  <p:par>
+                    <p:cTn id="3" fill="hold">
+                      <p:stCondLst>
+                        <p:cond delay="indefinite"/>
+                        <p:cond evt="onBegin" delay="0">
+                          <p:tn val="2"/>
+                        </p:cond>
+                      </p:stCondLst>
+                      <p:childTnLst>
+                        <p:par>
+                          <p:cTn id="4" fill="hold">
+                            <p:stCondLst>
+                              <p:cond delay="0"/>
+                            </p:stCondLst>
+                            <p:childTnLst>
+                              <p:par>
+                                <p:cTn id="5" presetID="1" presetClass="entr" presetSubtype="0" fill="hold" grpId="0" nodeType="withEffect">
+                                  <p:stCondLst>
+                                    <p:cond delay="0"/>
+                                  </p:stCondLst>
+                                  <p:childTnLst>
+                                    <p:set>
+                                      <p:cBhvr>
+                                        <p:cTn id="6" dur="1" fill="hold">
+                                          <p:stCondLst>
+                                            <p:cond delay="0"/>
+                                          </p:stCondLst>
+                                        </p:cTn>
+                                        <p:tgtEl>
+                                          <p:spTgt spid="3">
+                                            <p:txEl>
+                                              <p:pRg st="0" end="0"/>
+                                            </p:txEl>
+                                          </p:spTgt>
+                                        </p:tgtEl>
+                                        <p:attrNameLst>
+                                          <p:attrName>style.visibility</p:attrName>
+                                        </p:attrNameLst>
+                                      </p:cBhvr>
+                                      <p:to>
+                                        <p:strVal val="visible"/>
+                                      </p:to>
+                                    </p:set>
+                                  </p:childTnLst>
+                                </p:cTn>
+                              </p:par>
+                            </p:childTnLst>
+                          </p:cTn>
+                        </p:par>
+                      </p:childTnLst>
+                    </p:cTn>
+                  </p:par>
+                  <p:par>
+                    <p:cTn id="7" fill="hold">
+                      <p:stCondLst>
+                        <p:cond delay="indefinite"/>
+                      </p:stCondLst>
+                      <p:childTnLst>
+                        <p:par>
+                          <p:cTn id="8" fill="hold">
+                            <p:stCondLst>
+                              <p:cond delay="0"/>
+                            </p:stCondLst>
+                            <p:childTnLst>
+                              <p:par>
+                                <p:cTn id="9" presetID="1" presetClass="entr" presetSubtype="0" fill="hold" grpId="0" nodeType="clickEffect">
+                                  <p:stCondLst>
+                                    <p:cond delay="0"/>
+                                  </p:stCondLst>
+                                  <p:childTnLst>
+                                    <p:set>
+                                      <p:cBhvr>
+                                        <p:cTn id="10" dur="1" fill="hold">
+                                          <p:stCondLst>
+                                            <p:cond delay="0"/>
+                                          </p:stCondLst>
+                                        </p:cTn>
+                                        <p:tgtEl>
+                                          <p:spTgt spid="3">
+                                            <p:txEl>
+                                              <p:pRg st="3" end="3"/>
+                                            </p:txEl>
+                                          </p:spTgt>
+                                        </p:tgtEl>
+                                        <p:attrNameLst>
+                                          <p:attrName>style.visibility</p:attrName>
+                                        </p:attrNameLst>
+                                      </p:cBhvr>
+                                      <p:to>
+                                        <p:strVal val="visible"/>
+                                      </p:to>
+                                    </p:set>
+                                  </p:childTnLst>
+                                </p:cTn>
+                              </p:par>
+                              <p:par>
+                                <p:cTn id="11" presetID="1" presetClass="entr" presetSubtype="0" fill="hold" grpId="0" nodeType="withEffect">
+                                  <p:stCondLst>
+                                    <p:cond delay="0"/>
+                                  </p:stCondLst>
+                                  <p:childTnLst>
+                                    <p:set>
+                                      <p:cBhvr>
+                                        <p:cTn id="12" dur="1" fill="hold">
+                                          <p:stCondLst>
+                                            <p:cond delay="0"/>
+                                          </p:stCondLst>
+                                        </p:cTn>
+                                        <p:tgtEl>
+                                          <p:spTgt spid="6"/>
+                                        </p:tgtEl>
+                                        <p:attrNameLst>
+                                          <p:attrName>style.visibility</p:attrName>
+                                        </p:attrNameLst>
+                                      </p:cBhvr>
+                                      <p:to>
+                                        <p:strVal val="visible"/>
+                                      </p:to>
+                                    </p:set>
+                                  </p:childTnLst>
+                                </p:cTn>
+                              </p:par>
+                            </p:childTnLst>
+                          </p:cTn>
+                        </p:par>
+                      </p:childTnLst>
+                    </p:cTn>
+                  </p:par>
+                </p:childTnLst>
+              </p:cTn>
+              <p:prevCondLst>
+                <p:cond evt="onPrev" delay="0">
+                  <p:tgtEl>
+                    <p:sldTgt/>
+                  </p:tgtEl>
+                </p:cond>
+              </p:prevCondLst>
+              <p:nextCondLst>
+                <p:cond evt="onNext" delay="0">
+                  <p:tgtEl>
+                    <p:sldTgt/>
+                  </p:tgtEl>
+                </p:cond>
+              </p:nextCondLst>
+            </p:seq>
+          </p:childTnLst>
+        </p:cTn>
+      </p:par>
+    </p:tnLst>
+    <p:bldLst>
+      <p:bldP spid="3" grpId="0" uiExpand="1" build="p"/>
+      <p:bldP spid="6" grpId="0" animBg="1"/>
     </p:bldLst>
   </p:timing>
 </p:sld>
@@ -11998,6 +14223,299 @@
         <p:cTn id="1" dur="indefinite" restart="never" nodeType="tmRoot"/>
       </p:par>
     </p:tnLst>
+  </p:timing>
+</p:sld>
+</file>
+
+<file path=ppt/slides/slide20.xml><?xml version="1.0" encoding="utf-8"?>
+<p:sld xmlns:a="http://schemas.openxmlformats.org/drawingml/2006/main" xmlns:r="http://schemas.openxmlformats.org/officeDocument/2006/relationships" xmlns:p="http://schemas.openxmlformats.org/presentationml/2006/main">
+  <p:cSld>
+    <p:spTree>
+      <p:nvGrpSpPr>
+        <p:cNvPr id="1" name=""/>
+        <p:cNvGrpSpPr/>
+        <p:nvPr/>
+      </p:nvGrpSpPr>
+      <p:grpSpPr>
+        <a:xfrm>
+          <a:off x="0" y="0"/>
+          <a:ext cx="0" cy="0"/>
+          <a:chOff x="0" y="0"/>
+          <a:chExt cx="0" cy="0"/>
+        </a:xfrm>
+      </p:grpSpPr>
+      <p:sp>
+        <p:nvSpPr>
+          <p:cNvPr id="2" name="Title 1"/>
+          <p:cNvSpPr>
+            <a:spLocks noGrp="1"/>
+          </p:cNvSpPr>
+          <p:nvPr>
+            <p:ph type="title"/>
+          </p:nvPr>
+        </p:nvSpPr>
+        <p:spPr/>
+        <p:txBody>
+          <a:bodyPr/>
+          <a:lstStyle/>
+          <a:p>
+            <a:r>
+              <a:rPr lang="en-US" dirty="0" smtClean="0"/>
+              <a:t>While loop</a:t>
+            </a:r>
+            <a:endParaRPr lang="en-US" dirty="0"/>
+          </a:p>
+        </p:txBody>
+      </p:sp>
+      <p:sp>
+        <p:nvSpPr>
+          <p:cNvPr id="3" name="Slide Number Placeholder 2"/>
+          <p:cNvSpPr>
+            <a:spLocks noGrp="1"/>
+          </p:cNvSpPr>
+          <p:nvPr>
+            <p:ph type="sldNum" sz="quarter" idx="12"/>
+          </p:nvPr>
+        </p:nvSpPr>
+        <p:spPr/>
+        <p:txBody>
+          <a:bodyPr/>
+          <a:lstStyle/>
+          <a:p>
+            <a:fld id="{033373DF-BCDA-4600-B448-AFBDB22F4A39}" type="slidenum">
+              <a:rPr lang="en-US" smtClean="0"/>
+              <a:t>20</a:t>
+            </a:fld>
+            <a:endParaRPr lang="en-US"/>
+          </a:p>
+        </p:txBody>
+      </p:sp>
+      <p:sp>
+        <p:nvSpPr>
+          <p:cNvPr id="4" name="TextBox 3"/>
+          <p:cNvSpPr txBox="1"/>
+          <p:nvPr/>
+        </p:nvSpPr>
+        <p:spPr>
+          <a:xfrm>
+            <a:off x="707306" y="1576997"/>
+            <a:ext cx="6244101" cy="1323439"/>
+          </a:xfrm>
+          <a:prstGeom prst="rect">
+            <a:avLst/>
+          </a:prstGeom>
+          <a:solidFill>
+            <a:schemeClr val="bg1">
+              <a:lumMod val="75000"/>
+            </a:schemeClr>
+          </a:solidFill>
+        </p:spPr>
+        <p:txBody>
+          <a:bodyPr wrap="square" rtlCol="0">
+            <a:spAutoFit/>
+          </a:bodyPr>
+          <a:lstStyle/>
+          <a:p>
+            <a:r>
+              <a:rPr lang="en-US" sz="1600" dirty="0" smtClean="0">
+                <a:latin typeface="Courier New" pitchFamily="49" charset="0"/>
+                <a:cs typeface="Courier New" pitchFamily="49" charset="0"/>
+              </a:rPr>
+              <a:t>…</a:t>
+            </a:r>
+            <a:endParaRPr lang="en-US" sz="1600" dirty="0">
+              <a:latin typeface="Courier New" pitchFamily="49" charset="0"/>
+              <a:cs typeface="Courier New" pitchFamily="49" charset="0"/>
+            </a:endParaRPr>
+          </a:p>
+          <a:p>
+            <a:r>
+              <a:rPr lang="en-US" sz="1600" dirty="0">
+                <a:latin typeface="Courier New" pitchFamily="49" charset="0"/>
+                <a:cs typeface="Courier New" pitchFamily="49" charset="0"/>
+              </a:rPr>
+              <a:t>    while (</a:t>
+            </a:r>
+            <a:r>
+              <a:rPr lang="en-US" sz="1600" dirty="0" err="1">
+                <a:latin typeface="Courier New" pitchFamily="49" charset="0"/>
+                <a:cs typeface="Courier New" pitchFamily="49" charset="0"/>
+              </a:rPr>
+              <a:t>cin</a:t>
+            </a:r>
+            <a:r>
+              <a:rPr lang="en-US" sz="1600" dirty="0">
+                <a:latin typeface="Courier New" pitchFamily="49" charset="0"/>
+                <a:cs typeface="Courier New" pitchFamily="49" charset="0"/>
+              </a:rPr>
+              <a:t> &gt;&gt; a &gt;&gt; b) {</a:t>
+            </a:r>
+          </a:p>
+          <a:p>
+            <a:r>
+              <a:rPr lang="en-US" sz="1600" dirty="0">
+                <a:latin typeface="Courier New" pitchFamily="49" charset="0"/>
+                <a:cs typeface="Courier New" pitchFamily="49" charset="0"/>
+              </a:rPr>
+              <a:t>        </a:t>
+            </a:r>
+            <a:r>
+              <a:rPr lang="en-US" sz="1600" dirty="0" err="1">
+                <a:latin typeface="Courier New" pitchFamily="49" charset="0"/>
+                <a:cs typeface="Courier New" pitchFamily="49" charset="0"/>
+              </a:rPr>
+              <a:t>cout</a:t>
+            </a:r>
+            <a:r>
+              <a:rPr lang="en-US" sz="1600" dirty="0">
+                <a:latin typeface="Courier New" pitchFamily="49" charset="0"/>
+                <a:cs typeface="Courier New" pitchFamily="49" charset="0"/>
+              </a:rPr>
+              <a:t> &lt;&lt; </a:t>
+            </a:r>
+            <a:r>
+              <a:rPr lang="en-US" sz="1600" dirty="0" err="1">
+                <a:latin typeface="Courier New" pitchFamily="49" charset="0"/>
+                <a:cs typeface="Courier New" pitchFamily="49" charset="0"/>
+              </a:rPr>
+              <a:t>dist</a:t>
+            </a:r>
+            <a:r>
+              <a:rPr lang="en-US" sz="1600" dirty="0">
+                <a:latin typeface="Courier New" pitchFamily="49" charset="0"/>
+                <a:cs typeface="Courier New" pitchFamily="49" charset="0"/>
+              </a:rPr>
+              <a:t>(a, b) &lt;&lt; </a:t>
+            </a:r>
+            <a:r>
+              <a:rPr lang="en-US" sz="1600" dirty="0" err="1">
+                <a:latin typeface="Courier New" pitchFamily="49" charset="0"/>
+                <a:cs typeface="Courier New" pitchFamily="49" charset="0"/>
+              </a:rPr>
+              <a:t>endl</a:t>
+            </a:r>
+            <a:r>
+              <a:rPr lang="en-US" sz="1600" dirty="0">
+                <a:latin typeface="Courier New" pitchFamily="49" charset="0"/>
+                <a:cs typeface="Courier New" pitchFamily="49" charset="0"/>
+              </a:rPr>
+              <a:t>;</a:t>
+            </a:r>
+          </a:p>
+          <a:p>
+            <a:r>
+              <a:rPr lang="en-US" sz="1600" dirty="0">
+                <a:latin typeface="Courier New" pitchFamily="49" charset="0"/>
+                <a:cs typeface="Courier New" pitchFamily="49" charset="0"/>
+              </a:rPr>
+              <a:t>    }</a:t>
+            </a:r>
+          </a:p>
+          <a:p>
+            <a:r>
+              <a:rPr lang="en-US" sz="1600" dirty="0" smtClean="0">
+                <a:latin typeface="Courier New" pitchFamily="49" charset="0"/>
+                <a:cs typeface="Courier New" pitchFamily="49" charset="0"/>
+              </a:rPr>
+              <a:t>…</a:t>
+            </a:r>
+            <a:endParaRPr lang="en-US" sz="1600" dirty="0">
+              <a:latin typeface="Courier New" pitchFamily="49" charset="0"/>
+              <a:cs typeface="Courier New" pitchFamily="49" charset="0"/>
+            </a:endParaRPr>
+          </a:p>
+        </p:txBody>
+      </p:sp>
+    </p:spTree>
+    <p:extLst>
+      <p:ext uri="{BB962C8B-B14F-4D97-AF65-F5344CB8AC3E}">
+        <p14:creationId xmlns:p14="http://schemas.microsoft.com/office/powerpoint/2010/main" val="2715052523"/>
+      </p:ext>
+    </p:extLst>
+  </p:cSld>
+  <p:clrMapOvr>
+    <a:masterClrMapping/>
+  </p:clrMapOvr>
+  <p:timing>
+    <p:tnLst>
+      <p:par>
+        <p:cTn id="1" dur="indefinite" restart="never" nodeType="tmRoot">
+          <p:childTnLst>
+            <p:seq concurrent="1" nextAc="seek">
+              <p:cTn id="2" dur="indefinite" nodeType="mainSeq">
+                <p:childTnLst>
+                  <p:par>
+                    <p:cTn id="3" fill="hold">
+                      <p:stCondLst>
+                        <p:cond delay="indefinite"/>
+                        <p:cond evt="onBegin" delay="0">
+                          <p:tn val="2"/>
+                        </p:cond>
+                      </p:stCondLst>
+                      <p:childTnLst>
+                        <p:par>
+                          <p:cTn id="4" fill="hold">
+                            <p:stCondLst>
+                              <p:cond delay="0"/>
+                            </p:stCondLst>
+                            <p:childTnLst>
+                              <p:par>
+                                <p:cTn id="5" presetID="1" presetClass="entr" presetSubtype="0" fill="hold" grpId="0" nodeType="withEffect">
+                                  <p:stCondLst>
+                                    <p:cond delay="0"/>
+                                  </p:stCondLst>
+                                  <p:childTnLst>
+                                    <p:set>
+                                      <p:cBhvr>
+                                        <p:cTn id="6" dur="1" fill="hold">
+                                          <p:stCondLst>
+                                            <p:cond delay="0"/>
+                                          </p:stCondLst>
+                                        </p:cTn>
+                                        <p:tgtEl>
+                                          <p:spTgt spid="4"/>
+                                        </p:tgtEl>
+                                        <p:attrNameLst>
+                                          <p:attrName>style.visibility</p:attrName>
+                                        </p:attrNameLst>
+                                      </p:cBhvr>
+                                      <p:to>
+                                        <p:strVal val="visible"/>
+                                      </p:to>
+                                    </p:set>
+                                  </p:childTnLst>
+                                </p:cTn>
+                              </p:par>
+                            </p:childTnLst>
+                          </p:cTn>
+                        </p:par>
+                      </p:childTnLst>
+                    </p:cTn>
+                  </p:par>
+                </p:childTnLst>
+              </p:cTn>
+              <p:prevCondLst>
+                <p:cond evt="onPrev" delay="0">
+                  <p:tgtEl>
+                    <p:sldTgt/>
+                  </p:tgtEl>
+                </p:cond>
+              </p:prevCondLst>
+              <p:nextCondLst>
+                <p:cond evt="onNext" delay="0">
+                  <p:tgtEl>
+                    <p:sldTgt/>
+                  </p:tgtEl>
+                </p:cond>
+              </p:nextCondLst>
+            </p:seq>
+          </p:childTnLst>
+        </p:cTn>
+      </p:par>
+    </p:tnLst>
+    <p:bldLst>
+      <p:bldP spid="4" grpId="0" animBg="1"/>
+    </p:bldLst>
   </p:timing>
 </p:sld>
 </file>

</xml_diff>

<commit_message>
Added remark on whitespace separator for input stream
</commit_message>
<xml_diff>
--- a/CPlusPlus/essential_cpp.pptx
+++ b/CPlusPlus/essential_cpp.pptx
@@ -13611,7 +13611,7 @@
               <a:rPr lang="en-US" dirty="0" smtClean="0">
                 <a:cs typeface="Courier New" panose="02070309020205020404" pitchFamily="49" charset="0"/>
               </a:rPr>
-              <a:t> otherwise.</a:t>
+              <a:t> otherwise. Whitespace is separator.</a:t>
             </a:r>
           </a:p>
           <a:p>
@@ -13686,11 +13686,7 @@
             </a:r>
             <a:r>
               <a:rPr lang="en-US" dirty="0" smtClean="0"/>
-              <a:t> on </a:t>
-            </a:r>
-            <a:r>
-              <a:rPr lang="en-US" smtClean="0"/>
-              <a:t>Windows).</a:t>
+              <a:t> on Windows).</a:t>
             </a:r>
             <a:endParaRPr lang="en-US" dirty="0"/>
           </a:p>

</xml_diff>

<commit_message>
Added slides on wile, do-while and if statements
</commit_message>
<xml_diff>
--- a/CPlusPlus/essential_cpp.pptx
+++ b/CPlusPlus/essential_cpp.pptx
@@ -5,7 +5,7 @@
     <p:sldMasterId id="2147483660" r:id="rId1"/>
   </p:sldMasterIdLst>
   <p:notesMasterIdLst>
-    <p:notesMasterId r:id="rId22"/>
+    <p:notesMasterId r:id="rId24"/>
   </p:notesMasterIdLst>
   <p:sldIdLst>
     <p:sldId id="256" r:id="rId2"/>
@@ -28,6 +28,8 @@
     <p:sldId id="274" r:id="rId19"/>
     <p:sldId id="275" r:id="rId20"/>
     <p:sldId id="273" r:id="rId21"/>
+    <p:sldId id="277" r:id="rId22"/>
+    <p:sldId id="276" r:id="rId23"/>
   </p:sldIdLst>
   <p:sldSz cx="9144000" cy="6858000" type="screen4x3"/>
   <p:notesSz cx="6858000" cy="9144000"/>
@@ -216,7 +218,7 @@
           <a:p>
             <a:fld id="{959286F1-78EA-4A32-8D12-1F28CCE43A8D}" type="datetimeFigureOut">
               <a:rPr lang="en-US" smtClean="0"/>
-              <a:t>2017-02-10</a:t>
+              <a:t>2017-02-12</a:t>
             </a:fld>
             <a:endParaRPr lang="en-US"/>
           </a:p>
@@ -699,7 +701,7 @@
           <a:p>
             <a:fld id="{7E64AD2A-13EC-46C7-9287-3CACAC3798D5}" type="datetime1">
               <a:rPr lang="en-US" smtClean="0"/>
-              <a:t>2017-02-10</a:t>
+              <a:t>2017-02-12</a:t>
             </a:fld>
             <a:endParaRPr lang="en-US"/>
           </a:p>
@@ -869,7 +871,7 @@
           <a:p>
             <a:fld id="{43AE06E8-3793-4EB5-8012-97A6BFC78375}" type="datetime1">
               <a:rPr lang="en-US" smtClean="0"/>
-              <a:t>2017-02-10</a:t>
+              <a:t>2017-02-12</a:t>
             </a:fld>
             <a:endParaRPr lang="en-US"/>
           </a:p>
@@ -1049,7 +1051,7 @@
           <a:p>
             <a:fld id="{E234FBB9-2650-4E82-9375-3AD81E2FC1C9}" type="datetime1">
               <a:rPr lang="en-US" smtClean="0"/>
-              <a:t>2017-02-10</a:t>
+              <a:t>2017-02-12</a:t>
             </a:fld>
             <a:endParaRPr lang="en-US"/>
           </a:p>
@@ -1219,7 +1221,7 @@
           <a:p>
             <a:fld id="{913E3CEC-9565-4823-A6C8-B34B815EB4CE}" type="datetime1">
               <a:rPr lang="en-US" smtClean="0"/>
-              <a:t>2017-02-10</a:t>
+              <a:t>2017-02-12</a:t>
             </a:fld>
             <a:endParaRPr lang="en-US"/>
           </a:p>
@@ -1463,7 +1465,7 @@
           <a:p>
             <a:fld id="{F5251CD9-EE9A-4CFE-A7E1-729B5C9F077D}" type="datetime1">
               <a:rPr lang="en-US" smtClean="0"/>
-              <a:t>2017-02-10</a:t>
+              <a:t>2017-02-12</a:t>
             </a:fld>
             <a:endParaRPr lang="en-US"/>
           </a:p>
@@ -1695,7 +1697,7 @@
           <a:p>
             <a:fld id="{9D8A7943-CAAB-4232-A550-28565CC8A736}" type="datetime1">
               <a:rPr lang="en-US" smtClean="0"/>
-              <a:t>2017-02-10</a:t>
+              <a:t>2017-02-12</a:t>
             </a:fld>
             <a:endParaRPr lang="en-US"/>
           </a:p>
@@ -2062,7 +2064,7 @@
           <a:p>
             <a:fld id="{AECA22B3-9CAA-48F4-B0A5-AAC29DCE38BB}" type="datetime1">
               <a:rPr lang="en-US" smtClean="0"/>
-              <a:t>2017-02-10</a:t>
+              <a:t>2017-02-12</a:t>
             </a:fld>
             <a:endParaRPr lang="en-US"/>
           </a:p>
@@ -2180,7 +2182,7 @@
           <a:p>
             <a:fld id="{17BEA515-885F-453F-9DB6-FB7EBDD5269C}" type="datetime1">
               <a:rPr lang="en-US" smtClean="0"/>
-              <a:t>2017-02-10</a:t>
+              <a:t>2017-02-12</a:t>
             </a:fld>
             <a:endParaRPr lang="en-US"/>
           </a:p>
@@ -2275,7 +2277,7 @@
           <a:p>
             <a:fld id="{DF49C002-0A7D-4B38-A829-C7867DEAC314}" type="datetime1">
               <a:rPr lang="en-US" smtClean="0"/>
-              <a:t>2017-02-10</a:t>
+              <a:t>2017-02-12</a:t>
             </a:fld>
             <a:endParaRPr lang="en-US"/>
           </a:p>
@@ -2552,7 +2554,7 @@
           <a:p>
             <a:fld id="{DF81AE77-813F-4EB7-92DB-CEFC7AEFB117}" type="datetime1">
               <a:rPr lang="en-US" smtClean="0"/>
-              <a:t>2017-02-10</a:t>
+              <a:t>2017-02-12</a:t>
             </a:fld>
             <a:endParaRPr lang="en-US"/>
           </a:p>
@@ -2809,7 +2811,7 @@
           <a:p>
             <a:fld id="{C3D8A7DD-E8A7-4B8B-A1C0-3939B552071F}" type="datetime1">
               <a:rPr lang="en-US" smtClean="0"/>
-              <a:t>2017-02-10</a:t>
+              <a:t>2017-02-12</a:t>
             </a:fld>
             <a:endParaRPr lang="en-US"/>
           </a:p>
@@ -3022,7 +3024,7 @@
           <a:p>
             <a:fld id="{0DDF3A26-7F7C-417D-882D-6FCBBDE254C3}" type="datetime1">
               <a:rPr lang="en-US" smtClean="0"/>
-              <a:t>2017-02-10</a:t>
+              <a:t>2017-02-12</a:t>
             </a:fld>
             <a:endParaRPr lang="en-US"/>
           </a:p>
@@ -6375,11 +6377,7 @@
           <a:p>
             <a:r>
               <a:rPr lang="en-US" dirty="0" smtClean="0"/>
-              <a:t>Names for values in memory (RAM</a:t>
-            </a:r>
-            <a:r>
-              <a:rPr lang="en-US" dirty="0" smtClean="0"/>
-              <a:t>)</a:t>
+              <a:t>Names for values in memory (RAM)</a:t>
             </a:r>
           </a:p>
           <a:p>
@@ -6398,7 +6396,6 @@
               <a:rPr lang="en-US" dirty="0" smtClean="0"/>
               <a:t>, can contain digits</a:t>
             </a:r>
-            <a:endParaRPr lang="en-US" dirty="0" smtClean="0"/>
           </a:p>
           <a:p>
             <a:r>
@@ -14257,9 +14254,112 @@
           <a:p>
             <a:r>
               <a:rPr lang="en-US" dirty="0" smtClean="0"/>
-              <a:t>While loop</a:t>
+              <a:t>While </a:t>
+            </a:r>
+            <a:r>
+              <a:rPr lang="en-US" dirty="0" smtClean="0"/>
+              <a:t>statement</a:t>
             </a:r>
             <a:endParaRPr lang="en-US" dirty="0"/>
+          </a:p>
+        </p:txBody>
+      </p:sp>
+      <p:sp>
+        <p:nvSpPr>
+          <p:cNvPr id="5" name="Content Placeholder 4"/>
+          <p:cNvSpPr>
+            <a:spLocks noGrp="1"/>
+          </p:cNvSpPr>
+          <p:nvPr>
+            <p:ph idx="1"/>
+          </p:nvPr>
+        </p:nvSpPr>
+        <p:spPr/>
+        <p:txBody>
+          <a:bodyPr>
+            <a:normAutofit lnSpcReduction="10000"/>
+          </a:bodyPr>
+          <a:lstStyle/>
+          <a:p>
+            <a:r>
+              <a:rPr lang="en-US" dirty="0"/>
+              <a:t>G</a:t>
+            </a:r>
+            <a:r>
+              <a:rPr lang="en-US" dirty="0" smtClean="0"/>
+              <a:t>reatest common divisor (GCD) of </a:t>
+            </a:r>
+            <a:r>
+              <a:rPr lang="en-US" dirty="0" smtClean="0">
+                <a:latin typeface="Courier New" panose="02070309020205020404" pitchFamily="49" charset="0"/>
+                <a:cs typeface="Courier New" panose="02070309020205020404" pitchFamily="49" charset="0"/>
+              </a:rPr>
+              <a:t>x</a:t>
+            </a:r>
+            <a:r>
+              <a:rPr lang="en-US" dirty="0" smtClean="0"/>
+              <a:t> and </a:t>
+            </a:r>
+            <a:r>
+              <a:rPr lang="en-US" dirty="0" smtClean="0">
+                <a:latin typeface="Courier New" panose="02070309020205020404" pitchFamily="49" charset="0"/>
+                <a:cs typeface="Courier New" panose="02070309020205020404" pitchFamily="49" charset="0"/>
+              </a:rPr>
+              <a:t>y</a:t>
+            </a:r>
+          </a:p>
+          <a:p>
+            <a:endParaRPr lang="en-US" dirty="0">
+              <a:latin typeface="Courier New" panose="02070309020205020404" pitchFamily="49" charset="0"/>
+              <a:cs typeface="Courier New" panose="02070309020205020404" pitchFamily="49" charset="0"/>
+            </a:endParaRPr>
+          </a:p>
+          <a:p>
+            <a:endParaRPr lang="en-US" dirty="0" smtClean="0">
+              <a:latin typeface="Courier New" panose="02070309020205020404" pitchFamily="49" charset="0"/>
+              <a:cs typeface="Courier New" panose="02070309020205020404" pitchFamily="49" charset="0"/>
+            </a:endParaRPr>
+          </a:p>
+          <a:p>
+            <a:endParaRPr lang="en-US" dirty="0">
+              <a:latin typeface="Courier New" panose="02070309020205020404" pitchFamily="49" charset="0"/>
+              <a:cs typeface="Courier New" panose="02070309020205020404" pitchFamily="49" charset="0"/>
+            </a:endParaRPr>
+          </a:p>
+          <a:p>
+            <a:endParaRPr lang="en-US" dirty="0" smtClean="0">
+              <a:latin typeface="Courier New" panose="02070309020205020404" pitchFamily="49" charset="0"/>
+              <a:cs typeface="Courier New" panose="02070309020205020404" pitchFamily="49" charset="0"/>
+            </a:endParaRPr>
+          </a:p>
+          <a:p>
+            <a:endParaRPr lang="en-US" dirty="0">
+              <a:latin typeface="Courier New" panose="02070309020205020404" pitchFamily="49" charset="0"/>
+              <a:cs typeface="Courier New" panose="02070309020205020404" pitchFamily="49" charset="0"/>
+            </a:endParaRPr>
+          </a:p>
+          <a:p>
+            <a:endParaRPr lang="en-US" dirty="0" smtClean="0">
+              <a:latin typeface="Courier New" panose="02070309020205020404" pitchFamily="49" charset="0"/>
+              <a:cs typeface="Courier New" panose="02070309020205020404" pitchFamily="49" charset="0"/>
+            </a:endParaRPr>
+          </a:p>
+          <a:p>
+            <a:endParaRPr lang="en-US" dirty="0">
+              <a:latin typeface="Courier New" panose="02070309020205020404" pitchFamily="49" charset="0"/>
+              <a:cs typeface="Courier New" panose="02070309020205020404" pitchFamily="49" charset="0"/>
+            </a:endParaRPr>
+          </a:p>
+          <a:p>
+            <a:r>
+              <a:rPr lang="en-US" dirty="0" smtClean="0">
+                <a:cs typeface="Courier New" panose="02070309020205020404" pitchFamily="49" charset="0"/>
+              </a:rPr>
+              <a:t>Repetition statement</a:t>
+            </a:r>
+            <a:endParaRPr lang="en-US" dirty="0">
+              <a:cs typeface="Courier New" panose="02070309020205020404" pitchFamily="49" charset="0"/>
+            </a:endParaRPr>
           </a:p>
         </p:txBody>
       </p:sp>
@@ -14294,8 +14394,8 @@
         </p:nvSpPr>
         <p:spPr>
           <a:xfrm>
-            <a:off x="707306" y="1576997"/>
-            <a:ext cx="6244101" cy="1323439"/>
+            <a:off x="701777" y="3032175"/>
+            <a:ext cx="6244101" cy="2308324"/>
           </a:xfrm>
           <a:prstGeom prst="rect">
             <a:avLst/>
@@ -14313,11 +14413,83 @@
           <a:lstStyle/>
           <a:p>
             <a:r>
+              <a:rPr lang="en-US" sz="1600" dirty="0" err="1" smtClean="0">
+                <a:latin typeface="Courier New" pitchFamily="49" charset="0"/>
+                <a:cs typeface="Courier New" pitchFamily="49" charset="0"/>
+              </a:rPr>
+              <a:t>int</a:t>
+            </a:r>
+            <a:r>
               <a:rPr lang="en-US" sz="1600" dirty="0" smtClean="0">
                 <a:latin typeface="Courier New" pitchFamily="49" charset="0"/>
                 <a:cs typeface="Courier New" pitchFamily="49" charset="0"/>
               </a:rPr>
-              <a:t>…</a:t>
+              <a:t> </a:t>
+            </a:r>
+            <a:r>
+              <a:rPr lang="en-US" sz="1600" dirty="0" err="1" smtClean="0">
+                <a:latin typeface="Courier New" pitchFamily="49" charset="0"/>
+                <a:cs typeface="Courier New" pitchFamily="49" charset="0"/>
+              </a:rPr>
+              <a:t>gcd</a:t>
+            </a:r>
+            <a:r>
+              <a:rPr lang="en-US" sz="1600" dirty="0" smtClean="0">
+                <a:latin typeface="Courier New" pitchFamily="49" charset="0"/>
+                <a:cs typeface="Courier New" pitchFamily="49" charset="0"/>
+              </a:rPr>
+              <a:t>(</a:t>
+            </a:r>
+            <a:r>
+              <a:rPr lang="en-US" sz="1600" dirty="0" err="1" smtClean="0">
+                <a:latin typeface="Courier New" pitchFamily="49" charset="0"/>
+                <a:cs typeface="Courier New" pitchFamily="49" charset="0"/>
+              </a:rPr>
+              <a:t>int</a:t>
+            </a:r>
+            <a:r>
+              <a:rPr lang="en-US" sz="1600" dirty="0" smtClean="0">
+                <a:latin typeface="Courier New" pitchFamily="49" charset="0"/>
+                <a:cs typeface="Courier New" pitchFamily="49" charset="0"/>
+              </a:rPr>
+              <a:t> x, </a:t>
+            </a:r>
+            <a:r>
+              <a:rPr lang="en-US" sz="1600" dirty="0" err="1" smtClean="0">
+                <a:latin typeface="Courier New" pitchFamily="49" charset="0"/>
+                <a:cs typeface="Courier New" pitchFamily="49" charset="0"/>
+              </a:rPr>
+              <a:t>int</a:t>
+            </a:r>
+            <a:r>
+              <a:rPr lang="en-US" sz="1600" dirty="0" smtClean="0">
+                <a:latin typeface="Courier New" pitchFamily="49" charset="0"/>
+                <a:cs typeface="Courier New" pitchFamily="49" charset="0"/>
+              </a:rPr>
+              <a:t> y) {</a:t>
+            </a:r>
+          </a:p>
+          <a:p>
+            <a:r>
+              <a:rPr lang="en-US" sz="1600" dirty="0" smtClean="0">
+                <a:latin typeface="Courier New" pitchFamily="49" charset="0"/>
+                <a:cs typeface="Courier New" pitchFamily="49" charset="0"/>
+              </a:rPr>
+              <a:t>    while </a:t>
+            </a:r>
+            <a:r>
+              <a:rPr lang="en-US" sz="1600" dirty="0">
+                <a:latin typeface="Courier New" pitchFamily="49" charset="0"/>
+                <a:cs typeface="Courier New" pitchFamily="49" charset="0"/>
+              </a:rPr>
+              <a:t>(x != y</a:t>
+            </a:r>
+            <a:r>
+              <a:rPr lang="en-US" sz="1600" dirty="0" smtClean="0">
+                <a:latin typeface="Courier New" pitchFamily="49" charset="0"/>
+                <a:cs typeface="Courier New" pitchFamily="49" charset="0"/>
+              </a:rPr>
+              <a:t>) {</a:t>
             </a:r>
             <a:endParaRPr lang="en-US" sz="1600" dirty="0">
               <a:latin typeface="Courier New" pitchFamily="49" charset="0"/>
@@ -14330,21 +14502,16 @@
                 <a:latin typeface="Courier New" pitchFamily="49" charset="0"/>
                 <a:cs typeface="Courier New" pitchFamily="49" charset="0"/>
               </a:rPr>
-              <a:t>    while (</a:t>
-            </a:r>
-            <a:r>
-              <a:rPr lang="en-US" sz="1600" dirty="0" err="1">
-                <a:latin typeface="Courier New" pitchFamily="49" charset="0"/>
-                <a:cs typeface="Courier New" pitchFamily="49" charset="0"/>
-              </a:rPr>
-              <a:t>cin</a:t>
-            </a:r>
+              <a:t>        if (x &gt; y)</a:t>
+            </a:r>
+          </a:p>
+          <a:p>
             <a:r>
               <a:rPr lang="en-US" sz="1600" dirty="0">
                 <a:latin typeface="Courier New" pitchFamily="49" charset="0"/>
                 <a:cs typeface="Courier New" pitchFamily="49" charset="0"/>
               </a:rPr>
-              <a:t> &gt;&gt; a &gt;&gt; b) {</a:t>
+              <a:t>            x -= y;</a:t>
             </a:r>
           </a:p>
           <a:p>
@@ -14353,49 +14520,48 @@
                 <a:latin typeface="Courier New" pitchFamily="49" charset="0"/>
                 <a:cs typeface="Courier New" pitchFamily="49" charset="0"/>
               </a:rPr>
-              <a:t>        </a:t>
-            </a:r>
-            <a:r>
-              <a:rPr lang="en-US" sz="1600" dirty="0" err="1">
-                <a:latin typeface="Courier New" pitchFamily="49" charset="0"/>
-                <a:cs typeface="Courier New" pitchFamily="49" charset="0"/>
-              </a:rPr>
-              <a:t>cout</a:t>
-            </a:r>
+              <a:t>        else</a:t>
+            </a:r>
+          </a:p>
+          <a:p>
             <a:r>
               <a:rPr lang="en-US" sz="1600" dirty="0">
                 <a:latin typeface="Courier New" pitchFamily="49" charset="0"/>
                 <a:cs typeface="Courier New" pitchFamily="49" charset="0"/>
               </a:rPr>
-              <a:t> &lt;&lt; </a:t>
-            </a:r>
-            <a:r>
-              <a:rPr lang="en-US" sz="1600" dirty="0" err="1">
-                <a:latin typeface="Courier New" pitchFamily="49" charset="0"/>
-                <a:cs typeface="Courier New" pitchFamily="49" charset="0"/>
-              </a:rPr>
-              <a:t>dist</a:t>
-            </a:r>
+              <a:t>            y -= x;</a:t>
+            </a:r>
+          </a:p>
+          <a:p>
             <a:r>
               <a:rPr lang="en-US" sz="1600" dirty="0">
                 <a:latin typeface="Courier New" pitchFamily="49" charset="0"/>
                 <a:cs typeface="Courier New" pitchFamily="49" charset="0"/>
               </a:rPr>
-              <a:t>(a, b) &lt;&lt; </a:t>
-            </a:r>
-            <a:r>
-              <a:rPr lang="en-US" sz="1600" dirty="0" err="1">
-                <a:latin typeface="Courier New" pitchFamily="49" charset="0"/>
-                <a:cs typeface="Courier New" pitchFamily="49" charset="0"/>
-              </a:rPr>
-              <a:t>endl</a:t>
-            </a:r>
+              <a:t>    </a:t>
+            </a:r>
+            <a:r>
+              <a:rPr lang="en-US" sz="1600" dirty="0" smtClean="0">
+                <a:latin typeface="Courier New" pitchFamily="49" charset="0"/>
+                <a:cs typeface="Courier New" pitchFamily="49" charset="0"/>
+              </a:rPr>
+              <a:t>}</a:t>
+            </a:r>
+          </a:p>
+          <a:p>
             <a:r>
               <a:rPr lang="en-US" sz="1600" dirty="0">
                 <a:latin typeface="Courier New" pitchFamily="49" charset="0"/>
                 <a:cs typeface="Courier New" pitchFamily="49" charset="0"/>
               </a:rPr>
-              <a:t>;</a:t>
+              <a:t> </a:t>
+            </a:r>
+            <a:r>
+              <a:rPr lang="en-US" sz="1600" dirty="0" smtClean="0">
+                <a:latin typeface="Courier New" pitchFamily="49" charset="0"/>
+                <a:cs typeface="Courier New" pitchFamily="49" charset="0"/>
+              </a:rPr>
+              <a:t>   return x;</a:t>
             </a:r>
           </a:p>
           <a:p>
@@ -14404,21 +14570,364 @@
                 <a:latin typeface="Courier New" pitchFamily="49" charset="0"/>
                 <a:cs typeface="Courier New" pitchFamily="49" charset="0"/>
               </a:rPr>
-              <a:t>    }</a:t>
-            </a:r>
-          </a:p>
-          <a:p>
-            <a:r>
-              <a:rPr lang="en-US" sz="1600" dirty="0" smtClean="0">
-                <a:latin typeface="Courier New" pitchFamily="49" charset="0"/>
-                <a:cs typeface="Courier New" pitchFamily="49" charset="0"/>
-              </a:rPr>
-              <a:t>…</a:t>
+              <a:t>}</a:t>
             </a:r>
             <a:endParaRPr lang="en-US" sz="1600" dirty="0">
               <a:latin typeface="Courier New" pitchFamily="49" charset="0"/>
               <a:cs typeface="Courier New" pitchFamily="49" charset="0"/>
             </a:endParaRPr>
+          </a:p>
+        </p:txBody>
+      </p:sp>
+      <p:grpSp>
+        <p:nvGrpSpPr>
+          <p:cNvPr id="6" name="Group 5"/>
+          <p:cNvGrpSpPr/>
+          <p:nvPr/>
+        </p:nvGrpSpPr>
+        <p:grpSpPr>
+          <a:xfrm>
+            <a:off x="2109238" y="2357716"/>
+            <a:ext cx="2806891" cy="1213985"/>
+            <a:chOff x="296846" y="3923306"/>
+            <a:chExt cx="2806891" cy="1213985"/>
+          </a:xfrm>
+        </p:grpSpPr>
+        <p:sp>
+          <p:nvSpPr>
+            <p:cNvPr id="7" name="TextBox 6"/>
+            <p:cNvSpPr txBox="1"/>
+            <p:nvPr/>
+          </p:nvSpPr>
+          <p:spPr>
+            <a:xfrm>
+              <a:off x="1010357" y="3923306"/>
+              <a:ext cx="2093380" cy="400110"/>
+            </a:xfrm>
+            <a:prstGeom prst="rect">
+              <a:avLst/>
+            </a:prstGeom>
+            <a:solidFill>
+              <a:schemeClr val="bg1"/>
+            </a:solidFill>
+            <a:ln w="19050">
+              <a:solidFill>
+                <a:srgbClr val="C00000"/>
+              </a:solidFill>
+            </a:ln>
+          </p:spPr>
+          <p:txBody>
+            <a:bodyPr wrap="square" rtlCol="0">
+              <a:spAutoFit/>
+            </a:bodyPr>
+            <a:lstStyle/>
+            <a:p>
+              <a:r>
+                <a:rPr lang="en-US" sz="2000" dirty="0" smtClean="0">
+                  <a:solidFill>
+                    <a:srgbClr val="C00000"/>
+                  </a:solidFill>
+                </a:rPr>
+                <a:t>Boolean condition</a:t>
+              </a:r>
+              <a:endParaRPr lang="en-US" sz="2000" dirty="0">
+                <a:solidFill>
+                  <a:srgbClr val="C00000"/>
+                </a:solidFill>
+                <a:latin typeface="Courier New" panose="02070309020205020404" pitchFamily="49" charset="0"/>
+                <a:cs typeface="Courier New" panose="02070309020205020404" pitchFamily="49" charset="0"/>
+              </a:endParaRPr>
+            </a:p>
+          </p:txBody>
+        </p:sp>
+        <p:sp>
+          <p:nvSpPr>
+            <p:cNvPr id="8" name="Rectangle 7"/>
+            <p:cNvSpPr/>
+            <p:nvPr/>
+          </p:nvSpPr>
+          <p:spPr>
+            <a:xfrm>
+              <a:off x="296846" y="4856447"/>
+              <a:ext cx="768807" cy="280844"/>
+            </a:xfrm>
+            <a:prstGeom prst="rect">
+              <a:avLst/>
+            </a:prstGeom>
+            <a:noFill/>
+            <a:ln w="19050">
+              <a:solidFill>
+                <a:srgbClr val="C00000"/>
+              </a:solidFill>
+            </a:ln>
+          </p:spPr>
+          <p:style>
+            <a:lnRef idx="2">
+              <a:schemeClr val="accent1">
+                <a:shade val="50000"/>
+              </a:schemeClr>
+            </a:lnRef>
+            <a:fillRef idx="1">
+              <a:schemeClr val="accent1"/>
+            </a:fillRef>
+            <a:effectRef idx="0">
+              <a:schemeClr val="accent1"/>
+            </a:effectRef>
+            <a:fontRef idx="minor">
+              <a:schemeClr val="lt1"/>
+            </a:fontRef>
+          </p:style>
+          <p:txBody>
+            <a:bodyPr rtlCol="0" anchor="ctr"/>
+            <a:lstStyle/>
+            <a:p>
+              <a:pPr algn="ctr"/>
+              <a:endParaRPr lang="en-US"/>
+            </a:p>
+          </p:txBody>
+        </p:sp>
+        <p:cxnSp>
+          <p:nvCxnSpPr>
+            <p:cNvPr id="9" name="Straight Arrow Connector 8"/>
+            <p:cNvCxnSpPr>
+              <a:stCxn id="7" idx="2"/>
+              <a:endCxn id="8" idx="0"/>
+            </p:cNvCxnSpPr>
+            <p:nvPr/>
+          </p:nvCxnSpPr>
+          <p:spPr>
+            <a:xfrm flipH="1">
+              <a:off x="681250" y="4323416"/>
+              <a:ext cx="1375797" cy="533031"/>
+            </a:xfrm>
+            <a:prstGeom prst="straightConnector1">
+              <a:avLst/>
+            </a:prstGeom>
+            <a:ln w="19050">
+              <a:solidFill>
+                <a:srgbClr val="C00000"/>
+              </a:solidFill>
+              <a:tailEnd type="stealth" w="lg" len="lg"/>
+            </a:ln>
+          </p:spPr>
+          <p:style>
+            <a:lnRef idx="1">
+              <a:schemeClr val="accent1"/>
+            </a:lnRef>
+            <a:fillRef idx="0">
+              <a:schemeClr val="accent1"/>
+            </a:fillRef>
+            <a:effectRef idx="0">
+              <a:schemeClr val="accent1"/>
+            </a:effectRef>
+            <a:fontRef idx="minor">
+              <a:schemeClr val="tx1"/>
+            </a:fontRef>
+          </p:style>
+        </p:cxnSp>
+      </p:grpSp>
+      <p:grpSp>
+        <p:nvGrpSpPr>
+          <p:cNvPr id="11" name="Group 10"/>
+          <p:cNvGrpSpPr/>
+          <p:nvPr/>
+        </p:nvGrpSpPr>
+        <p:grpSpPr>
+          <a:xfrm>
+            <a:off x="3443688" y="3215443"/>
+            <a:ext cx="3242249" cy="1309371"/>
+            <a:chOff x="6254122" y="5190270"/>
+            <a:chExt cx="3242249" cy="1309371"/>
+          </a:xfrm>
+        </p:grpSpPr>
+        <p:sp>
+          <p:nvSpPr>
+            <p:cNvPr id="12" name="Right Brace 11"/>
+            <p:cNvSpPr/>
+            <p:nvPr/>
+          </p:nvSpPr>
+          <p:spPr>
+            <a:xfrm>
+              <a:off x="6254122" y="5572464"/>
+              <a:ext cx="46766" cy="927177"/>
+            </a:xfrm>
+            <a:prstGeom prst="rightBrace">
+              <a:avLst/>
+            </a:prstGeom>
+            <a:ln w="28575">
+              <a:solidFill>
+                <a:srgbClr val="C00000"/>
+              </a:solidFill>
+            </a:ln>
+          </p:spPr>
+          <p:style>
+            <a:lnRef idx="1">
+              <a:schemeClr val="accent1"/>
+            </a:lnRef>
+            <a:fillRef idx="0">
+              <a:schemeClr val="accent1"/>
+            </a:fillRef>
+            <a:effectRef idx="0">
+              <a:schemeClr val="accent1"/>
+            </a:effectRef>
+            <a:fontRef idx="minor">
+              <a:schemeClr val="tx1"/>
+            </a:fontRef>
+          </p:style>
+          <p:txBody>
+            <a:bodyPr rtlCol="0" anchor="ctr"/>
+            <a:lstStyle/>
+            <a:p>
+              <a:pPr algn="ctr"/>
+              <a:endParaRPr lang="en-US"/>
+            </a:p>
+          </p:txBody>
+        </p:sp>
+        <p:grpSp>
+          <p:nvGrpSpPr>
+            <p:cNvPr id="13" name="Group 12"/>
+            <p:cNvGrpSpPr/>
+            <p:nvPr/>
+          </p:nvGrpSpPr>
+          <p:grpSpPr>
+            <a:xfrm>
+              <a:off x="6458204" y="5190270"/>
+              <a:ext cx="3038167" cy="842822"/>
+              <a:chOff x="-367133" y="3441725"/>
+              <a:chExt cx="3038167" cy="842822"/>
+            </a:xfrm>
+          </p:grpSpPr>
+          <p:sp>
+            <p:nvSpPr>
+              <p:cNvPr id="14" name="TextBox 13"/>
+              <p:cNvSpPr txBox="1"/>
+              <p:nvPr/>
+            </p:nvSpPr>
+            <p:spPr>
+              <a:xfrm>
+                <a:off x="199577" y="3441725"/>
+                <a:ext cx="2471457" cy="707886"/>
+              </a:xfrm>
+              <a:prstGeom prst="rect">
+                <a:avLst/>
+              </a:prstGeom>
+              <a:solidFill>
+                <a:schemeClr val="bg1"/>
+              </a:solidFill>
+              <a:ln w="19050">
+                <a:solidFill>
+                  <a:srgbClr val="C00000"/>
+                </a:solidFill>
+              </a:ln>
+            </p:spPr>
+            <p:txBody>
+              <a:bodyPr wrap="square" rtlCol="0">
+                <a:spAutoFit/>
+              </a:bodyPr>
+              <a:lstStyle/>
+              <a:p>
+                <a:r>
+                  <a:rPr lang="en-US" sz="2000" dirty="0" smtClean="0">
+                    <a:solidFill>
+                      <a:srgbClr val="C00000"/>
+                    </a:solidFill>
+                  </a:rPr>
+                  <a:t>repeat while Boolean condition </a:t>
+                </a:r>
+                <a:r>
+                  <a:rPr lang="en-US" sz="2000" dirty="0" smtClean="0">
+                    <a:solidFill>
+                      <a:srgbClr val="C00000"/>
+                    </a:solidFill>
+                    <a:latin typeface="Courier New" panose="02070309020205020404" pitchFamily="49" charset="0"/>
+                    <a:cs typeface="Courier New" panose="02070309020205020404" pitchFamily="49" charset="0"/>
+                  </a:rPr>
+                  <a:t>true</a:t>
+                </a:r>
+                <a:endParaRPr lang="en-US" sz="2000" dirty="0">
+                  <a:solidFill>
+                    <a:srgbClr val="C00000"/>
+                  </a:solidFill>
+                  <a:latin typeface="Courier New" panose="02070309020205020404" pitchFamily="49" charset="0"/>
+                  <a:cs typeface="Courier New" panose="02070309020205020404" pitchFamily="49" charset="0"/>
+                </a:endParaRPr>
+              </a:p>
+            </p:txBody>
+          </p:sp>
+          <p:cxnSp>
+            <p:nvCxnSpPr>
+              <p:cNvPr id="15" name="Straight Arrow Connector 14"/>
+              <p:cNvCxnSpPr>
+                <a:stCxn id="14" idx="1"/>
+              </p:cNvCxnSpPr>
+              <p:nvPr/>
+            </p:nvCxnSpPr>
+            <p:spPr>
+              <a:xfrm flipH="1">
+                <a:off x="-367133" y="3795668"/>
+                <a:ext cx="566710" cy="488879"/>
+              </a:xfrm>
+              <a:prstGeom prst="straightConnector1">
+                <a:avLst/>
+              </a:prstGeom>
+              <a:ln w="19050">
+                <a:solidFill>
+                  <a:srgbClr val="C00000"/>
+                </a:solidFill>
+                <a:tailEnd type="stealth" w="lg" len="lg"/>
+              </a:ln>
+            </p:spPr>
+            <p:style>
+              <a:lnRef idx="1">
+                <a:schemeClr val="accent1"/>
+              </a:lnRef>
+              <a:fillRef idx="0">
+                <a:schemeClr val="accent1"/>
+              </a:fillRef>
+              <a:effectRef idx="0">
+                <a:schemeClr val="accent1"/>
+              </a:effectRef>
+              <a:fontRef idx="minor">
+                <a:schemeClr val="tx1"/>
+              </a:fontRef>
+            </p:style>
+          </p:cxnSp>
+        </p:grpSp>
+      </p:grpSp>
+      <p:sp>
+        <p:nvSpPr>
+          <p:cNvPr id="20" name="TextBox 19"/>
+          <p:cNvSpPr txBox="1"/>
+          <p:nvPr/>
+        </p:nvSpPr>
+        <p:spPr>
+          <a:xfrm flipH="1">
+            <a:off x="4442467" y="4346138"/>
+            <a:ext cx="2243470" cy="707886"/>
+          </a:xfrm>
+          <a:prstGeom prst="rect">
+            <a:avLst/>
+          </a:prstGeom>
+          <a:solidFill>
+            <a:schemeClr val="bg1"/>
+          </a:solidFill>
+          <a:ln>
+            <a:solidFill>
+              <a:schemeClr val="tx1"/>
+            </a:solidFill>
+          </a:ln>
+        </p:spPr>
+        <p:txBody>
+          <a:bodyPr wrap="square" rtlCol="0">
+            <a:spAutoFit/>
+          </a:bodyPr>
+          <a:lstStyle/>
+          <a:p>
+            <a:r>
+              <a:rPr lang="en-US" sz="2000" dirty="0" smtClean="0"/>
+              <a:t>Body executed zero or more times</a:t>
+            </a:r>
+            <a:endParaRPr lang="en-US" sz="2000" dirty="0"/>
           </a:p>
         </p:txBody>
       </p:sp>
@@ -14469,7 +14978,195 @@
                                           </p:stCondLst>
                                         </p:cTn>
                                         <p:tgtEl>
-                                          <p:spTgt spid="4"/>
+                                          <p:spTgt spid="5">
+                                            <p:txEl>
+                                              <p:pRg st="0" end="0"/>
+                                            </p:txEl>
+                                          </p:spTgt>
+                                        </p:tgtEl>
+                                        <p:attrNameLst>
+                                          <p:attrName>style.visibility</p:attrName>
+                                        </p:attrNameLst>
+                                      </p:cBhvr>
+                                      <p:to>
+                                        <p:strVal val="visible"/>
+                                      </p:to>
+                                    </p:set>
+                                  </p:childTnLst>
+                                </p:cTn>
+                              </p:par>
+                            </p:childTnLst>
+                          </p:cTn>
+                        </p:par>
+                      </p:childTnLst>
+                    </p:cTn>
+                  </p:par>
+                  <p:par>
+                    <p:cTn id="7" fill="hold">
+                      <p:stCondLst>
+                        <p:cond delay="indefinite"/>
+                      </p:stCondLst>
+                      <p:childTnLst>
+                        <p:par>
+                          <p:cTn id="8" fill="hold">
+                            <p:stCondLst>
+                              <p:cond delay="0"/>
+                            </p:stCondLst>
+                            <p:childTnLst>
+                              <p:par>
+                                <p:cTn id="9" presetID="1" presetClass="entr" presetSubtype="0" fill="hold" nodeType="clickEffect">
+                                  <p:stCondLst>
+                                    <p:cond delay="0"/>
+                                  </p:stCondLst>
+                                  <p:childTnLst>
+                                    <p:set>
+                                      <p:cBhvr>
+                                        <p:cTn id="10" dur="1" fill="hold">
+                                          <p:stCondLst>
+                                            <p:cond delay="0"/>
+                                          </p:stCondLst>
+                                        </p:cTn>
+                                        <p:tgtEl>
+                                          <p:spTgt spid="6"/>
+                                        </p:tgtEl>
+                                        <p:attrNameLst>
+                                          <p:attrName>style.visibility</p:attrName>
+                                        </p:attrNameLst>
+                                      </p:cBhvr>
+                                      <p:to>
+                                        <p:strVal val="visible"/>
+                                      </p:to>
+                                    </p:set>
+                                  </p:childTnLst>
+                                </p:cTn>
+                              </p:par>
+                            </p:childTnLst>
+                          </p:cTn>
+                        </p:par>
+                      </p:childTnLst>
+                    </p:cTn>
+                  </p:par>
+                  <p:par>
+                    <p:cTn id="11" fill="hold">
+                      <p:stCondLst>
+                        <p:cond delay="indefinite"/>
+                      </p:stCondLst>
+                      <p:childTnLst>
+                        <p:par>
+                          <p:cTn id="12" fill="hold">
+                            <p:stCondLst>
+                              <p:cond delay="0"/>
+                            </p:stCondLst>
+                            <p:childTnLst>
+                              <p:par>
+                                <p:cTn id="13" presetID="1" presetClass="entr" presetSubtype="0" fill="hold" nodeType="clickEffect">
+                                  <p:stCondLst>
+                                    <p:cond delay="0"/>
+                                  </p:stCondLst>
+                                  <p:childTnLst>
+                                    <p:set>
+                                      <p:cBhvr>
+                                        <p:cTn id="14" dur="1" fill="hold">
+                                          <p:stCondLst>
+                                            <p:cond delay="0"/>
+                                          </p:stCondLst>
+                                        </p:cTn>
+                                        <p:tgtEl>
+                                          <p:spTgt spid="11"/>
+                                        </p:tgtEl>
+                                        <p:attrNameLst>
+                                          <p:attrName>style.visibility</p:attrName>
+                                        </p:attrNameLst>
+                                      </p:cBhvr>
+                                      <p:to>
+                                        <p:strVal val="visible"/>
+                                      </p:to>
+                                    </p:set>
+                                  </p:childTnLst>
+                                </p:cTn>
+                              </p:par>
+                            </p:childTnLst>
+                          </p:cTn>
+                        </p:par>
+                      </p:childTnLst>
+                    </p:cTn>
+                  </p:par>
+                  <p:par>
+                    <p:cTn id="15" fill="hold">
+                      <p:stCondLst>
+                        <p:cond delay="indefinite"/>
+                      </p:stCondLst>
+                      <p:childTnLst>
+                        <p:par>
+                          <p:cTn id="16" fill="hold">
+                            <p:stCondLst>
+                              <p:cond delay="0"/>
+                            </p:stCondLst>
+                            <p:childTnLst>
+                              <p:par>
+                                <p:cTn id="17" presetID="1" presetClass="entr" presetSubtype="0" fill="hold" grpId="0" nodeType="clickEffect">
+                                  <p:stCondLst>
+                                    <p:cond delay="0"/>
+                                  </p:stCondLst>
+                                  <p:childTnLst>
+                                    <p:set>
+                                      <p:cBhvr>
+                                        <p:cTn id="18" dur="1" fill="hold">
+                                          <p:stCondLst>
+                                            <p:cond delay="0"/>
+                                          </p:stCondLst>
+                                        </p:cTn>
+                                        <p:tgtEl>
+                                          <p:spTgt spid="20"/>
+                                        </p:tgtEl>
+                                        <p:attrNameLst>
+                                          <p:attrName>style.visibility</p:attrName>
+                                        </p:attrNameLst>
+                                      </p:cBhvr>
+                                      <p:to>
+                                        <p:strVal val="visible"/>
+                                      </p:to>
+                                    </p:set>
+                                  </p:childTnLst>
+                                </p:cTn>
+                              </p:par>
+                            </p:childTnLst>
+                          </p:cTn>
+                        </p:par>
+                      </p:childTnLst>
+                    </p:cTn>
+                  </p:par>
+                  <p:par>
+                    <p:cTn id="19" fill="hold">
+                      <p:stCondLst>
+                        <p:cond delay="indefinite"/>
+                      </p:stCondLst>
+                      <p:childTnLst>
+                        <p:par>
+                          <p:cTn id="20" fill="hold">
+                            <p:stCondLst>
+                              <p:cond delay="0"/>
+                            </p:stCondLst>
+                            <p:childTnLst>
+                              <p:par>
+                                <p:cTn id="21" presetID="1" presetClass="entr" presetSubtype="0" fill="hold" grpId="0" nodeType="clickEffect">
+                                  <p:stCondLst>
+                                    <p:cond delay="0"/>
+                                  </p:stCondLst>
+                                  <p:childTnLst>
+                                    <p:set>
+                                      <p:cBhvr>
+                                        <p:cTn id="22" dur="1" fill="hold">
+                                          <p:stCondLst>
+                                            <p:cond delay="0"/>
+                                          </p:stCondLst>
+                                        </p:cTn>
+                                        <p:tgtEl>
+                                          <p:spTgt spid="5">
+                                            <p:txEl>
+                                              <p:pRg st="8" end="8"/>
+                                            </p:txEl>
+                                          </p:spTgt>
                                         </p:tgtEl>
                                         <p:attrNameLst>
                                           <p:attrName>style.visibility</p:attrName>
@@ -14510,7 +15207,2162 @@
       </p:par>
     </p:tnLst>
     <p:bldLst>
-      <p:bldP spid="4" grpId="0" animBg="1"/>
+      <p:bldP spid="5" grpId="0" uiExpand="1" build="p"/>
+      <p:bldP spid="20" grpId="0" animBg="1"/>
+    </p:bldLst>
+  </p:timing>
+</p:sld>
+</file>
+
+<file path=ppt/slides/slide21.xml><?xml version="1.0" encoding="utf-8"?>
+<p:sld xmlns:a="http://schemas.openxmlformats.org/drawingml/2006/main" xmlns:r="http://schemas.openxmlformats.org/officeDocument/2006/relationships" xmlns:p="http://schemas.openxmlformats.org/presentationml/2006/main">
+  <p:cSld>
+    <p:spTree>
+      <p:nvGrpSpPr>
+        <p:cNvPr id="1" name=""/>
+        <p:cNvGrpSpPr/>
+        <p:nvPr/>
+      </p:nvGrpSpPr>
+      <p:grpSpPr>
+        <a:xfrm>
+          <a:off x="0" y="0"/>
+          <a:ext cx="0" cy="0"/>
+          <a:chOff x="0" y="0"/>
+          <a:chExt cx="0" cy="0"/>
+        </a:xfrm>
+      </p:grpSpPr>
+      <p:sp>
+        <p:nvSpPr>
+          <p:cNvPr id="2" name="Title 1"/>
+          <p:cNvSpPr>
+            <a:spLocks noGrp="1"/>
+          </p:cNvSpPr>
+          <p:nvPr>
+            <p:ph type="title"/>
+          </p:nvPr>
+        </p:nvSpPr>
+        <p:spPr/>
+        <p:txBody>
+          <a:bodyPr/>
+          <a:lstStyle/>
+          <a:p>
+            <a:r>
+              <a:rPr lang="en-US" dirty="0" smtClean="0"/>
+              <a:t>Do-w</a:t>
+            </a:r>
+            <a:r>
+              <a:rPr lang="en-US" dirty="0" smtClean="0"/>
+              <a:t>hile statement</a:t>
+            </a:r>
+            <a:endParaRPr lang="en-US" dirty="0"/>
+          </a:p>
+        </p:txBody>
+      </p:sp>
+      <p:sp>
+        <p:nvSpPr>
+          <p:cNvPr id="5" name="Content Placeholder 4"/>
+          <p:cNvSpPr>
+            <a:spLocks noGrp="1"/>
+          </p:cNvSpPr>
+          <p:nvPr>
+            <p:ph idx="1"/>
+          </p:nvPr>
+        </p:nvSpPr>
+        <p:spPr/>
+        <p:txBody>
+          <a:bodyPr/>
+          <a:lstStyle/>
+          <a:p>
+            <a:r>
+              <a:rPr lang="en-US" dirty="0" smtClean="0"/>
+              <a:t>Alternative to while</a:t>
+            </a:r>
+          </a:p>
+          <a:p>
+            <a:r>
+              <a:rPr lang="en-US" dirty="0" smtClean="0">
+                <a:cs typeface="Courier New" panose="02070309020205020404" pitchFamily="49" charset="0"/>
+              </a:rPr>
+              <a:t>Less frequently  used</a:t>
+            </a:r>
+            <a:endParaRPr lang="en-US" dirty="0">
+              <a:cs typeface="Courier New" panose="02070309020205020404" pitchFamily="49" charset="0"/>
+            </a:endParaRPr>
+          </a:p>
+        </p:txBody>
+      </p:sp>
+      <p:sp>
+        <p:nvSpPr>
+          <p:cNvPr id="3" name="Slide Number Placeholder 2"/>
+          <p:cNvSpPr>
+            <a:spLocks noGrp="1"/>
+          </p:cNvSpPr>
+          <p:nvPr>
+            <p:ph type="sldNum" sz="quarter" idx="12"/>
+          </p:nvPr>
+        </p:nvSpPr>
+        <p:spPr/>
+        <p:txBody>
+          <a:bodyPr/>
+          <a:lstStyle/>
+          <a:p>
+            <a:fld id="{033373DF-BCDA-4600-B448-AFBDB22F4A39}" type="slidenum">
+              <a:rPr lang="en-US" smtClean="0"/>
+              <a:t>21</a:t>
+            </a:fld>
+            <a:endParaRPr lang="en-US"/>
+          </a:p>
+        </p:txBody>
+      </p:sp>
+      <p:sp>
+        <p:nvSpPr>
+          <p:cNvPr id="4" name="TextBox 3"/>
+          <p:cNvSpPr txBox="1"/>
+          <p:nvPr/>
+        </p:nvSpPr>
+        <p:spPr>
+          <a:xfrm>
+            <a:off x="701777" y="3032175"/>
+            <a:ext cx="6244101" cy="2308324"/>
+          </a:xfrm>
+          <a:prstGeom prst="rect">
+            <a:avLst/>
+          </a:prstGeom>
+          <a:solidFill>
+            <a:schemeClr val="bg1">
+              <a:lumMod val="75000"/>
+            </a:schemeClr>
+          </a:solidFill>
+        </p:spPr>
+        <p:txBody>
+          <a:bodyPr wrap="square" rtlCol="0">
+            <a:spAutoFit/>
+          </a:bodyPr>
+          <a:lstStyle/>
+          <a:p>
+            <a:r>
+              <a:rPr lang="en-US" sz="1600" dirty="0" err="1" smtClean="0">
+                <a:latin typeface="Courier New" pitchFamily="49" charset="0"/>
+                <a:cs typeface="Courier New" pitchFamily="49" charset="0"/>
+              </a:rPr>
+              <a:t>int</a:t>
+            </a:r>
+            <a:r>
+              <a:rPr lang="en-US" sz="1600" dirty="0" smtClean="0">
+                <a:latin typeface="Courier New" pitchFamily="49" charset="0"/>
+                <a:cs typeface="Courier New" pitchFamily="49" charset="0"/>
+              </a:rPr>
+              <a:t> </a:t>
+            </a:r>
+            <a:r>
+              <a:rPr lang="en-US" sz="1600" dirty="0" err="1" smtClean="0">
+                <a:latin typeface="Courier New" pitchFamily="49" charset="0"/>
+                <a:cs typeface="Courier New" pitchFamily="49" charset="0"/>
+              </a:rPr>
+              <a:t>gcd</a:t>
+            </a:r>
+            <a:r>
+              <a:rPr lang="en-US" sz="1600" dirty="0" smtClean="0">
+                <a:latin typeface="Courier New" pitchFamily="49" charset="0"/>
+                <a:cs typeface="Courier New" pitchFamily="49" charset="0"/>
+              </a:rPr>
+              <a:t>(</a:t>
+            </a:r>
+            <a:r>
+              <a:rPr lang="en-US" sz="1600" dirty="0" err="1" smtClean="0">
+                <a:latin typeface="Courier New" pitchFamily="49" charset="0"/>
+                <a:cs typeface="Courier New" pitchFamily="49" charset="0"/>
+              </a:rPr>
+              <a:t>int</a:t>
+            </a:r>
+            <a:r>
+              <a:rPr lang="en-US" sz="1600" dirty="0" smtClean="0">
+                <a:latin typeface="Courier New" pitchFamily="49" charset="0"/>
+                <a:cs typeface="Courier New" pitchFamily="49" charset="0"/>
+              </a:rPr>
+              <a:t> x, </a:t>
+            </a:r>
+            <a:r>
+              <a:rPr lang="en-US" sz="1600" dirty="0" err="1" smtClean="0">
+                <a:latin typeface="Courier New" pitchFamily="49" charset="0"/>
+                <a:cs typeface="Courier New" pitchFamily="49" charset="0"/>
+              </a:rPr>
+              <a:t>int</a:t>
+            </a:r>
+            <a:r>
+              <a:rPr lang="en-US" sz="1600" dirty="0" smtClean="0">
+                <a:latin typeface="Courier New" pitchFamily="49" charset="0"/>
+                <a:cs typeface="Courier New" pitchFamily="49" charset="0"/>
+              </a:rPr>
+              <a:t> y) {</a:t>
+            </a:r>
+          </a:p>
+          <a:p>
+            <a:r>
+              <a:rPr lang="en-US" sz="1600" dirty="0" smtClean="0">
+                <a:latin typeface="Courier New" pitchFamily="49" charset="0"/>
+                <a:cs typeface="Courier New" pitchFamily="49" charset="0"/>
+              </a:rPr>
+              <a:t>    do {</a:t>
+            </a:r>
+            <a:endParaRPr lang="en-US" sz="1600" dirty="0">
+              <a:latin typeface="Courier New" pitchFamily="49" charset="0"/>
+              <a:cs typeface="Courier New" pitchFamily="49" charset="0"/>
+            </a:endParaRPr>
+          </a:p>
+          <a:p>
+            <a:r>
+              <a:rPr lang="en-US" sz="1600" dirty="0">
+                <a:latin typeface="Courier New" pitchFamily="49" charset="0"/>
+                <a:cs typeface="Courier New" pitchFamily="49" charset="0"/>
+              </a:rPr>
+              <a:t>        if (x &gt; y)</a:t>
+            </a:r>
+          </a:p>
+          <a:p>
+            <a:r>
+              <a:rPr lang="en-US" sz="1600" dirty="0">
+                <a:latin typeface="Courier New" pitchFamily="49" charset="0"/>
+                <a:cs typeface="Courier New" pitchFamily="49" charset="0"/>
+              </a:rPr>
+              <a:t>            x -= y;</a:t>
+            </a:r>
+          </a:p>
+          <a:p>
+            <a:r>
+              <a:rPr lang="en-US" sz="1600" dirty="0">
+                <a:latin typeface="Courier New" pitchFamily="49" charset="0"/>
+                <a:cs typeface="Courier New" pitchFamily="49" charset="0"/>
+              </a:rPr>
+              <a:t>        </a:t>
+            </a:r>
+            <a:r>
+              <a:rPr lang="en-US" sz="1600" dirty="0" smtClean="0">
+                <a:latin typeface="Courier New" pitchFamily="49" charset="0"/>
+                <a:cs typeface="Courier New" pitchFamily="49" charset="0"/>
+              </a:rPr>
+              <a:t>else if (y &lt; x)</a:t>
+            </a:r>
+            <a:endParaRPr lang="en-US" sz="1600" dirty="0">
+              <a:latin typeface="Courier New" pitchFamily="49" charset="0"/>
+              <a:cs typeface="Courier New" pitchFamily="49" charset="0"/>
+            </a:endParaRPr>
+          </a:p>
+          <a:p>
+            <a:r>
+              <a:rPr lang="en-US" sz="1600" dirty="0">
+                <a:latin typeface="Courier New" pitchFamily="49" charset="0"/>
+                <a:cs typeface="Courier New" pitchFamily="49" charset="0"/>
+              </a:rPr>
+              <a:t>            y -= x;</a:t>
+            </a:r>
+          </a:p>
+          <a:p>
+            <a:r>
+              <a:rPr lang="en-US" sz="1600" dirty="0">
+                <a:latin typeface="Courier New" pitchFamily="49" charset="0"/>
+                <a:cs typeface="Courier New" pitchFamily="49" charset="0"/>
+              </a:rPr>
+              <a:t>    </a:t>
+            </a:r>
+            <a:r>
+              <a:rPr lang="en-US" sz="1600" dirty="0" smtClean="0">
+                <a:latin typeface="Courier New" pitchFamily="49" charset="0"/>
+                <a:cs typeface="Courier New" pitchFamily="49" charset="0"/>
+              </a:rPr>
+              <a:t>} </a:t>
+            </a:r>
+            <a:r>
+              <a:rPr lang="en-US" sz="1600" dirty="0">
+                <a:latin typeface="Courier New" pitchFamily="49" charset="0"/>
+                <a:cs typeface="Courier New" pitchFamily="49" charset="0"/>
+              </a:rPr>
+              <a:t>while (x != y)</a:t>
+            </a:r>
+            <a:endParaRPr lang="en-US" sz="1600" dirty="0" smtClean="0">
+              <a:latin typeface="Courier New" pitchFamily="49" charset="0"/>
+              <a:cs typeface="Courier New" pitchFamily="49" charset="0"/>
+            </a:endParaRPr>
+          </a:p>
+          <a:p>
+            <a:r>
+              <a:rPr lang="en-US" sz="1600" dirty="0">
+                <a:latin typeface="Courier New" pitchFamily="49" charset="0"/>
+                <a:cs typeface="Courier New" pitchFamily="49" charset="0"/>
+              </a:rPr>
+              <a:t> </a:t>
+            </a:r>
+            <a:r>
+              <a:rPr lang="en-US" sz="1600" dirty="0" smtClean="0">
+                <a:latin typeface="Courier New" pitchFamily="49" charset="0"/>
+                <a:cs typeface="Courier New" pitchFamily="49" charset="0"/>
+              </a:rPr>
+              <a:t>   return x;</a:t>
+            </a:r>
+          </a:p>
+          <a:p>
+            <a:r>
+              <a:rPr lang="en-US" sz="1600" dirty="0">
+                <a:latin typeface="Courier New" pitchFamily="49" charset="0"/>
+                <a:cs typeface="Courier New" pitchFamily="49" charset="0"/>
+              </a:rPr>
+              <a:t>}</a:t>
+            </a:r>
+            <a:endParaRPr lang="en-US" sz="1600" dirty="0">
+              <a:latin typeface="Courier New" pitchFamily="49" charset="0"/>
+              <a:cs typeface="Courier New" pitchFamily="49" charset="0"/>
+            </a:endParaRPr>
+          </a:p>
+        </p:txBody>
+      </p:sp>
+      <p:grpSp>
+        <p:nvGrpSpPr>
+          <p:cNvPr id="6" name="Group 5"/>
+          <p:cNvGrpSpPr/>
+          <p:nvPr/>
+        </p:nvGrpSpPr>
+        <p:grpSpPr>
+          <a:xfrm>
+            <a:off x="2401618" y="4532801"/>
+            <a:ext cx="2862187" cy="1008658"/>
+            <a:chOff x="241550" y="3314758"/>
+            <a:chExt cx="2862187" cy="1008658"/>
+          </a:xfrm>
+        </p:grpSpPr>
+        <p:sp>
+          <p:nvSpPr>
+            <p:cNvPr id="7" name="TextBox 6"/>
+            <p:cNvSpPr txBox="1"/>
+            <p:nvPr/>
+          </p:nvSpPr>
+          <p:spPr>
+            <a:xfrm>
+              <a:off x="1010357" y="3923306"/>
+              <a:ext cx="2093380" cy="400110"/>
+            </a:xfrm>
+            <a:prstGeom prst="rect">
+              <a:avLst/>
+            </a:prstGeom>
+            <a:solidFill>
+              <a:schemeClr val="bg1"/>
+            </a:solidFill>
+            <a:ln w="19050">
+              <a:solidFill>
+                <a:srgbClr val="C00000"/>
+              </a:solidFill>
+            </a:ln>
+          </p:spPr>
+          <p:txBody>
+            <a:bodyPr wrap="square" rtlCol="0">
+              <a:spAutoFit/>
+            </a:bodyPr>
+            <a:lstStyle/>
+            <a:p>
+              <a:r>
+                <a:rPr lang="en-US" sz="2000" dirty="0" smtClean="0">
+                  <a:solidFill>
+                    <a:srgbClr val="C00000"/>
+                  </a:solidFill>
+                </a:rPr>
+                <a:t>Boolean condition</a:t>
+              </a:r>
+              <a:endParaRPr lang="en-US" sz="2000" dirty="0">
+                <a:solidFill>
+                  <a:srgbClr val="C00000"/>
+                </a:solidFill>
+                <a:latin typeface="Courier New" panose="02070309020205020404" pitchFamily="49" charset="0"/>
+                <a:cs typeface="Courier New" panose="02070309020205020404" pitchFamily="49" charset="0"/>
+              </a:endParaRPr>
+            </a:p>
+          </p:txBody>
+        </p:sp>
+        <p:sp>
+          <p:nvSpPr>
+            <p:cNvPr id="8" name="Rectangle 7"/>
+            <p:cNvSpPr/>
+            <p:nvPr/>
+          </p:nvSpPr>
+          <p:spPr>
+            <a:xfrm>
+              <a:off x="241550" y="3314758"/>
+              <a:ext cx="768807" cy="280844"/>
+            </a:xfrm>
+            <a:prstGeom prst="rect">
+              <a:avLst/>
+            </a:prstGeom>
+            <a:noFill/>
+            <a:ln w="19050">
+              <a:solidFill>
+                <a:srgbClr val="C00000"/>
+              </a:solidFill>
+            </a:ln>
+          </p:spPr>
+          <p:style>
+            <a:lnRef idx="2">
+              <a:schemeClr val="accent1">
+                <a:shade val="50000"/>
+              </a:schemeClr>
+            </a:lnRef>
+            <a:fillRef idx="1">
+              <a:schemeClr val="accent1"/>
+            </a:fillRef>
+            <a:effectRef idx="0">
+              <a:schemeClr val="accent1"/>
+            </a:effectRef>
+            <a:fontRef idx="minor">
+              <a:schemeClr val="lt1"/>
+            </a:fontRef>
+          </p:style>
+          <p:txBody>
+            <a:bodyPr rtlCol="0" anchor="ctr"/>
+            <a:lstStyle/>
+            <a:p>
+              <a:pPr algn="ctr"/>
+              <a:endParaRPr lang="en-US"/>
+            </a:p>
+          </p:txBody>
+        </p:sp>
+        <p:cxnSp>
+          <p:nvCxnSpPr>
+            <p:cNvPr id="9" name="Straight Arrow Connector 8"/>
+            <p:cNvCxnSpPr>
+              <a:stCxn id="7" idx="0"/>
+              <a:endCxn id="8" idx="3"/>
+            </p:cNvCxnSpPr>
+            <p:nvPr/>
+          </p:nvCxnSpPr>
+          <p:spPr>
+            <a:xfrm flipH="1" flipV="1">
+              <a:off x="1010357" y="3455180"/>
+              <a:ext cx="1046690" cy="468126"/>
+            </a:xfrm>
+            <a:prstGeom prst="straightConnector1">
+              <a:avLst/>
+            </a:prstGeom>
+            <a:ln w="19050">
+              <a:solidFill>
+                <a:srgbClr val="C00000"/>
+              </a:solidFill>
+              <a:tailEnd type="stealth" w="lg" len="lg"/>
+            </a:ln>
+          </p:spPr>
+          <p:style>
+            <a:lnRef idx="1">
+              <a:schemeClr val="accent1"/>
+            </a:lnRef>
+            <a:fillRef idx="0">
+              <a:schemeClr val="accent1"/>
+            </a:fillRef>
+            <a:effectRef idx="0">
+              <a:schemeClr val="accent1"/>
+            </a:effectRef>
+            <a:fontRef idx="minor">
+              <a:schemeClr val="tx1"/>
+            </a:fontRef>
+          </p:style>
+        </p:cxnSp>
+      </p:grpSp>
+      <p:grpSp>
+        <p:nvGrpSpPr>
+          <p:cNvPr id="11" name="Group 10"/>
+          <p:cNvGrpSpPr/>
+          <p:nvPr/>
+        </p:nvGrpSpPr>
+        <p:grpSpPr>
+          <a:xfrm>
+            <a:off x="3836977" y="3215443"/>
+            <a:ext cx="3242249" cy="1309371"/>
+            <a:chOff x="6254122" y="5190270"/>
+            <a:chExt cx="3242249" cy="1309371"/>
+          </a:xfrm>
+        </p:grpSpPr>
+        <p:sp>
+          <p:nvSpPr>
+            <p:cNvPr id="12" name="Right Brace 11"/>
+            <p:cNvSpPr/>
+            <p:nvPr/>
+          </p:nvSpPr>
+          <p:spPr>
+            <a:xfrm>
+              <a:off x="6254122" y="5572464"/>
+              <a:ext cx="46766" cy="927177"/>
+            </a:xfrm>
+            <a:prstGeom prst="rightBrace">
+              <a:avLst/>
+            </a:prstGeom>
+            <a:ln w="28575">
+              <a:solidFill>
+                <a:srgbClr val="C00000"/>
+              </a:solidFill>
+            </a:ln>
+          </p:spPr>
+          <p:style>
+            <a:lnRef idx="1">
+              <a:schemeClr val="accent1"/>
+            </a:lnRef>
+            <a:fillRef idx="0">
+              <a:schemeClr val="accent1"/>
+            </a:fillRef>
+            <a:effectRef idx="0">
+              <a:schemeClr val="accent1"/>
+            </a:effectRef>
+            <a:fontRef idx="minor">
+              <a:schemeClr val="tx1"/>
+            </a:fontRef>
+          </p:style>
+          <p:txBody>
+            <a:bodyPr rtlCol="0" anchor="ctr"/>
+            <a:lstStyle/>
+            <a:p>
+              <a:pPr algn="ctr"/>
+              <a:endParaRPr lang="en-US"/>
+            </a:p>
+          </p:txBody>
+        </p:sp>
+        <p:grpSp>
+          <p:nvGrpSpPr>
+            <p:cNvPr id="13" name="Group 12"/>
+            <p:cNvGrpSpPr/>
+            <p:nvPr/>
+          </p:nvGrpSpPr>
+          <p:grpSpPr>
+            <a:xfrm>
+              <a:off x="6458204" y="5190270"/>
+              <a:ext cx="3038167" cy="842822"/>
+              <a:chOff x="-367133" y="3441725"/>
+              <a:chExt cx="3038167" cy="842822"/>
+            </a:xfrm>
+          </p:grpSpPr>
+          <p:sp>
+            <p:nvSpPr>
+              <p:cNvPr id="14" name="TextBox 13"/>
+              <p:cNvSpPr txBox="1"/>
+              <p:nvPr/>
+            </p:nvSpPr>
+            <p:spPr>
+              <a:xfrm>
+                <a:off x="199577" y="3441725"/>
+                <a:ext cx="2471457" cy="707886"/>
+              </a:xfrm>
+              <a:prstGeom prst="rect">
+                <a:avLst/>
+              </a:prstGeom>
+              <a:solidFill>
+                <a:schemeClr val="bg1"/>
+              </a:solidFill>
+              <a:ln w="19050">
+                <a:solidFill>
+                  <a:srgbClr val="C00000"/>
+                </a:solidFill>
+              </a:ln>
+            </p:spPr>
+            <p:txBody>
+              <a:bodyPr wrap="square" rtlCol="0">
+                <a:spAutoFit/>
+              </a:bodyPr>
+              <a:lstStyle/>
+              <a:p>
+                <a:r>
+                  <a:rPr lang="en-US" sz="2000" dirty="0" smtClean="0">
+                    <a:solidFill>
+                      <a:srgbClr val="C00000"/>
+                    </a:solidFill>
+                  </a:rPr>
+                  <a:t>repeat while Boolean condition </a:t>
+                </a:r>
+                <a:r>
+                  <a:rPr lang="en-US" sz="2000" dirty="0" smtClean="0">
+                    <a:solidFill>
+                      <a:srgbClr val="C00000"/>
+                    </a:solidFill>
+                    <a:latin typeface="Courier New" panose="02070309020205020404" pitchFamily="49" charset="0"/>
+                    <a:cs typeface="Courier New" panose="02070309020205020404" pitchFamily="49" charset="0"/>
+                  </a:rPr>
+                  <a:t>true</a:t>
+                </a:r>
+                <a:endParaRPr lang="en-US" sz="2000" dirty="0">
+                  <a:solidFill>
+                    <a:srgbClr val="C00000"/>
+                  </a:solidFill>
+                  <a:latin typeface="Courier New" panose="02070309020205020404" pitchFamily="49" charset="0"/>
+                  <a:cs typeface="Courier New" panose="02070309020205020404" pitchFamily="49" charset="0"/>
+                </a:endParaRPr>
+              </a:p>
+            </p:txBody>
+          </p:sp>
+          <p:cxnSp>
+            <p:nvCxnSpPr>
+              <p:cNvPr id="15" name="Straight Arrow Connector 14"/>
+              <p:cNvCxnSpPr>
+                <a:stCxn id="14" idx="1"/>
+              </p:cNvCxnSpPr>
+              <p:nvPr/>
+            </p:nvCxnSpPr>
+            <p:spPr>
+              <a:xfrm flipH="1">
+                <a:off x="-367133" y="3795668"/>
+                <a:ext cx="566710" cy="488879"/>
+              </a:xfrm>
+              <a:prstGeom prst="straightConnector1">
+                <a:avLst/>
+              </a:prstGeom>
+              <a:ln w="19050">
+                <a:solidFill>
+                  <a:srgbClr val="C00000"/>
+                </a:solidFill>
+                <a:tailEnd type="stealth" w="lg" len="lg"/>
+              </a:ln>
+            </p:spPr>
+            <p:style>
+              <a:lnRef idx="1">
+                <a:schemeClr val="accent1"/>
+              </a:lnRef>
+              <a:fillRef idx="0">
+                <a:schemeClr val="accent1"/>
+              </a:fillRef>
+              <a:effectRef idx="0">
+                <a:schemeClr val="accent1"/>
+              </a:effectRef>
+              <a:fontRef idx="minor">
+                <a:schemeClr val="tx1"/>
+              </a:fontRef>
+            </p:style>
+          </p:cxnSp>
+        </p:grpSp>
+      </p:grpSp>
+      <p:sp>
+        <p:nvSpPr>
+          <p:cNvPr id="18" name="TextBox 17"/>
+          <p:cNvSpPr txBox="1"/>
+          <p:nvPr/>
+        </p:nvSpPr>
+        <p:spPr>
+          <a:xfrm flipH="1">
+            <a:off x="5880048" y="4125686"/>
+            <a:ext cx="2192235" cy="707886"/>
+          </a:xfrm>
+          <a:prstGeom prst="rect">
+            <a:avLst/>
+          </a:prstGeom>
+          <a:solidFill>
+            <a:schemeClr val="bg1"/>
+          </a:solidFill>
+          <a:ln>
+            <a:solidFill>
+              <a:schemeClr val="tx1"/>
+            </a:solidFill>
+          </a:ln>
+        </p:spPr>
+        <p:txBody>
+          <a:bodyPr wrap="square" rtlCol="0">
+            <a:spAutoFit/>
+          </a:bodyPr>
+          <a:lstStyle/>
+          <a:p>
+            <a:r>
+              <a:rPr lang="en-US" sz="2000" dirty="0" smtClean="0"/>
+              <a:t>Body executed one or more times</a:t>
+            </a:r>
+            <a:endParaRPr lang="en-US" sz="2000" dirty="0"/>
+          </a:p>
+        </p:txBody>
+      </p:sp>
+    </p:spTree>
+    <p:extLst>
+      <p:ext uri="{BB962C8B-B14F-4D97-AF65-F5344CB8AC3E}">
+        <p14:creationId xmlns:p14="http://schemas.microsoft.com/office/powerpoint/2010/main" val="3310184683"/>
+      </p:ext>
+    </p:extLst>
+  </p:cSld>
+  <p:clrMapOvr>
+    <a:masterClrMapping/>
+  </p:clrMapOvr>
+  <p:timing>
+    <p:tnLst>
+      <p:par>
+        <p:cTn id="1" dur="indefinite" restart="never" nodeType="tmRoot">
+          <p:childTnLst>
+            <p:seq concurrent="1" nextAc="seek">
+              <p:cTn id="2" dur="indefinite" nodeType="mainSeq">
+                <p:childTnLst>
+                  <p:par>
+                    <p:cTn id="3" fill="hold">
+                      <p:stCondLst>
+                        <p:cond delay="indefinite"/>
+                        <p:cond evt="onBegin" delay="0">
+                          <p:tn val="2"/>
+                        </p:cond>
+                      </p:stCondLst>
+                      <p:childTnLst>
+                        <p:par>
+                          <p:cTn id="4" fill="hold">
+                            <p:stCondLst>
+                              <p:cond delay="0"/>
+                            </p:stCondLst>
+                            <p:childTnLst>
+                              <p:par>
+                                <p:cTn id="5" presetID="1" presetClass="entr" presetSubtype="0" fill="hold" grpId="0" nodeType="withEffect">
+                                  <p:stCondLst>
+                                    <p:cond delay="0"/>
+                                  </p:stCondLst>
+                                  <p:childTnLst>
+                                    <p:set>
+                                      <p:cBhvr>
+                                        <p:cTn id="6" dur="1" fill="hold">
+                                          <p:stCondLst>
+                                            <p:cond delay="0"/>
+                                          </p:stCondLst>
+                                        </p:cTn>
+                                        <p:tgtEl>
+                                          <p:spTgt spid="5">
+                                            <p:txEl>
+                                              <p:pRg st="0" end="0"/>
+                                            </p:txEl>
+                                          </p:spTgt>
+                                        </p:tgtEl>
+                                        <p:attrNameLst>
+                                          <p:attrName>style.visibility</p:attrName>
+                                        </p:attrNameLst>
+                                      </p:cBhvr>
+                                      <p:to>
+                                        <p:strVal val="visible"/>
+                                      </p:to>
+                                    </p:set>
+                                  </p:childTnLst>
+                                </p:cTn>
+                              </p:par>
+                              <p:par>
+                                <p:cTn id="7" presetID="1" presetClass="entr" presetSubtype="0" fill="hold" grpId="0" nodeType="withEffect">
+                                  <p:stCondLst>
+                                    <p:cond delay="0"/>
+                                  </p:stCondLst>
+                                  <p:childTnLst>
+                                    <p:set>
+                                      <p:cBhvr>
+                                        <p:cTn id="8" dur="1" fill="hold">
+                                          <p:stCondLst>
+                                            <p:cond delay="0"/>
+                                          </p:stCondLst>
+                                        </p:cTn>
+                                        <p:tgtEl>
+                                          <p:spTgt spid="5">
+                                            <p:txEl>
+                                              <p:pRg st="1" end="1"/>
+                                            </p:txEl>
+                                          </p:spTgt>
+                                        </p:tgtEl>
+                                        <p:attrNameLst>
+                                          <p:attrName>style.visibility</p:attrName>
+                                        </p:attrNameLst>
+                                      </p:cBhvr>
+                                      <p:to>
+                                        <p:strVal val="visible"/>
+                                      </p:to>
+                                    </p:set>
+                                  </p:childTnLst>
+                                </p:cTn>
+                              </p:par>
+                            </p:childTnLst>
+                          </p:cTn>
+                        </p:par>
+                      </p:childTnLst>
+                    </p:cTn>
+                  </p:par>
+                  <p:par>
+                    <p:cTn id="9" fill="hold">
+                      <p:stCondLst>
+                        <p:cond delay="indefinite"/>
+                      </p:stCondLst>
+                      <p:childTnLst>
+                        <p:par>
+                          <p:cTn id="10" fill="hold">
+                            <p:stCondLst>
+                              <p:cond delay="0"/>
+                            </p:stCondLst>
+                            <p:childTnLst>
+                              <p:par>
+                                <p:cTn id="11" presetID="1" presetClass="entr" presetSubtype="0" fill="hold" nodeType="clickEffect">
+                                  <p:stCondLst>
+                                    <p:cond delay="0"/>
+                                  </p:stCondLst>
+                                  <p:childTnLst>
+                                    <p:set>
+                                      <p:cBhvr>
+                                        <p:cTn id="12" dur="1" fill="hold">
+                                          <p:stCondLst>
+                                            <p:cond delay="0"/>
+                                          </p:stCondLst>
+                                        </p:cTn>
+                                        <p:tgtEl>
+                                          <p:spTgt spid="6"/>
+                                        </p:tgtEl>
+                                        <p:attrNameLst>
+                                          <p:attrName>style.visibility</p:attrName>
+                                        </p:attrNameLst>
+                                      </p:cBhvr>
+                                      <p:to>
+                                        <p:strVal val="visible"/>
+                                      </p:to>
+                                    </p:set>
+                                  </p:childTnLst>
+                                </p:cTn>
+                              </p:par>
+                            </p:childTnLst>
+                          </p:cTn>
+                        </p:par>
+                      </p:childTnLst>
+                    </p:cTn>
+                  </p:par>
+                  <p:par>
+                    <p:cTn id="13" fill="hold">
+                      <p:stCondLst>
+                        <p:cond delay="indefinite"/>
+                      </p:stCondLst>
+                      <p:childTnLst>
+                        <p:par>
+                          <p:cTn id="14" fill="hold">
+                            <p:stCondLst>
+                              <p:cond delay="0"/>
+                            </p:stCondLst>
+                            <p:childTnLst>
+                              <p:par>
+                                <p:cTn id="15" presetID="1" presetClass="entr" presetSubtype="0" fill="hold" nodeType="clickEffect">
+                                  <p:stCondLst>
+                                    <p:cond delay="0"/>
+                                  </p:stCondLst>
+                                  <p:childTnLst>
+                                    <p:set>
+                                      <p:cBhvr>
+                                        <p:cTn id="16" dur="1" fill="hold">
+                                          <p:stCondLst>
+                                            <p:cond delay="0"/>
+                                          </p:stCondLst>
+                                        </p:cTn>
+                                        <p:tgtEl>
+                                          <p:spTgt spid="11"/>
+                                        </p:tgtEl>
+                                        <p:attrNameLst>
+                                          <p:attrName>style.visibility</p:attrName>
+                                        </p:attrNameLst>
+                                      </p:cBhvr>
+                                      <p:to>
+                                        <p:strVal val="visible"/>
+                                      </p:to>
+                                    </p:set>
+                                  </p:childTnLst>
+                                </p:cTn>
+                              </p:par>
+                            </p:childTnLst>
+                          </p:cTn>
+                        </p:par>
+                      </p:childTnLst>
+                    </p:cTn>
+                  </p:par>
+                  <p:par>
+                    <p:cTn id="17" fill="hold">
+                      <p:stCondLst>
+                        <p:cond delay="indefinite"/>
+                      </p:stCondLst>
+                      <p:childTnLst>
+                        <p:par>
+                          <p:cTn id="18" fill="hold">
+                            <p:stCondLst>
+                              <p:cond delay="0"/>
+                            </p:stCondLst>
+                            <p:childTnLst>
+                              <p:par>
+                                <p:cTn id="19" presetID="1" presetClass="entr" presetSubtype="0" fill="hold" grpId="0" nodeType="clickEffect">
+                                  <p:stCondLst>
+                                    <p:cond delay="0"/>
+                                  </p:stCondLst>
+                                  <p:childTnLst>
+                                    <p:set>
+                                      <p:cBhvr>
+                                        <p:cTn id="20" dur="1" fill="hold">
+                                          <p:stCondLst>
+                                            <p:cond delay="0"/>
+                                          </p:stCondLst>
+                                        </p:cTn>
+                                        <p:tgtEl>
+                                          <p:spTgt spid="18"/>
+                                        </p:tgtEl>
+                                        <p:attrNameLst>
+                                          <p:attrName>style.visibility</p:attrName>
+                                        </p:attrNameLst>
+                                      </p:cBhvr>
+                                      <p:to>
+                                        <p:strVal val="visible"/>
+                                      </p:to>
+                                    </p:set>
+                                  </p:childTnLst>
+                                </p:cTn>
+                              </p:par>
+                            </p:childTnLst>
+                          </p:cTn>
+                        </p:par>
+                      </p:childTnLst>
+                    </p:cTn>
+                  </p:par>
+                </p:childTnLst>
+              </p:cTn>
+              <p:prevCondLst>
+                <p:cond evt="onPrev" delay="0">
+                  <p:tgtEl>
+                    <p:sldTgt/>
+                  </p:tgtEl>
+                </p:cond>
+              </p:prevCondLst>
+              <p:nextCondLst>
+                <p:cond evt="onNext" delay="0">
+                  <p:tgtEl>
+                    <p:sldTgt/>
+                  </p:tgtEl>
+                </p:cond>
+              </p:nextCondLst>
+            </p:seq>
+          </p:childTnLst>
+        </p:cTn>
+      </p:par>
+    </p:tnLst>
+    <p:bldLst>
+      <p:bldP spid="5" grpId="0" uiExpand="1" build="p"/>
+      <p:bldP spid="18" grpId="0" animBg="1"/>
+    </p:bldLst>
+  </p:timing>
+</p:sld>
+</file>
+
+<file path=ppt/slides/slide22.xml><?xml version="1.0" encoding="utf-8"?>
+<p:sld xmlns:a="http://schemas.openxmlformats.org/drawingml/2006/main" xmlns:r="http://schemas.openxmlformats.org/officeDocument/2006/relationships" xmlns:p="http://schemas.openxmlformats.org/presentationml/2006/main">
+  <p:cSld>
+    <p:spTree>
+      <p:nvGrpSpPr>
+        <p:cNvPr id="1" name=""/>
+        <p:cNvGrpSpPr/>
+        <p:nvPr/>
+      </p:nvGrpSpPr>
+      <p:grpSpPr>
+        <a:xfrm>
+          <a:off x="0" y="0"/>
+          <a:ext cx="0" cy="0"/>
+          <a:chOff x="0" y="0"/>
+          <a:chExt cx="0" cy="0"/>
+        </a:xfrm>
+      </p:grpSpPr>
+      <p:sp>
+        <p:nvSpPr>
+          <p:cNvPr id="2" name="Title 1"/>
+          <p:cNvSpPr>
+            <a:spLocks noGrp="1"/>
+          </p:cNvSpPr>
+          <p:nvPr>
+            <p:ph type="title"/>
+          </p:nvPr>
+        </p:nvSpPr>
+        <p:spPr/>
+        <p:txBody>
+          <a:bodyPr/>
+          <a:lstStyle/>
+          <a:p>
+            <a:r>
+              <a:rPr lang="en-US" dirty="0" smtClean="0"/>
+              <a:t>If statement</a:t>
+            </a:r>
+            <a:endParaRPr lang="en-US" dirty="0"/>
+          </a:p>
+        </p:txBody>
+      </p:sp>
+      <p:sp>
+        <p:nvSpPr>
+          <p:cNvPr id="26" name="Content Placeholder 25"/>
+          <p:cNvSpPr>
+            <a:spLocks noGrp="1"/>
+          </p:cNvSpPr>
+          <p:nvPr>
+            <p:ph idx="1"/>
+          </p:nvPr>
+        </p:nvSpPr>
+        <p:spPr>
+          <a:xfrm>
+            <a:off x="628650" y="4223886"/>
+            <a:ext cx="7886700" cy="1953077"/>
+          </a:xfrm>
+        </p:spPr>
+        <p:txBody>
+          <a:bodyPr/>
+          <a:lstStyle/>
+          <a:p>
+            <a:r>
+              <a:rPr lang="en-US" dirty="0">
+                <a:latin typeface="Courier New" panose="02070309020205020404" pitchFamily="49" charset="0"/>
+                <a:cs typeface="Courier New" panose="02070309020205020404" pitchFamily="49" charset="0"/>
+              </a:rPr>
+              <a:t>else</a:t>
+            </a:r>
+            <a:r>
+              <a:rPr lang="en-US" dirty="0"/>
+              <a:t>-clause is optional</a:t>
+            </a:r>
+          </a:p>
+          <a:p>
+            <a:r>
+              <a:rPr lang="en-US" dirty="0" smtClean="0"/>
+              <a:t>Can be chained</a:t>
+            </a:r>
+          </a:p>
+          <a:p>
+            <a:r>
+              <a:rPr lang="en-US" dirty="0" smtClean="0"/>
+              <a:t>Conditional</a:t>
+            </a:r>
+            <a:br>
+              <a:rPr lang="en-US" dirty="0" smtClean="0"/>
+            </a:br>
+            <a:r>
+              <a:rPr lang="en-US" dirty="0" smtClean="0"/>
+              <a:t>statement</a:t>
+            </a:r>
+            <a:endParaRPr lang="en-US" dirty="0"/>
+          </a:p>
+        </p:txBody>
+      </p:sp>
+      <p:sp>
+        <p:nvSpPr>
+          <p:cNvPr id="4" name="Slide Number Placeholder 3"/>
+          <p:cNvSpPr>
+            <a:spLocks noGrp="1"/>
+          </p:cNvSpPr>
+          <p:nvPr>
+            <p:ph type="sldNum" sz="quarter" idx="12"/>
+          </p:nvPr>
+        </p:nvSpPr>
+        <p:spPr/>
+        <p:txBody>
+          <a:bodyPr/>
+          <a:lstStyle/>
+          <a:p>
+            <a:fld id="{033373DF-BCDA-4600-B448-AFBDB22F4A39}" type="slidenum">
+              <a:rPr lang="en-US" smtClean="0"/>
+              <a:t>22</a:t>
+            </a:fld>
+            <a:endParaRPr lang="en-US"/>
+          </a:p>
+        </p:txBody>
+      </p:sp>
+      <p:sp>
+        <p:nvSpPr>
+          <p:cNvPr id="6" name="TextBox 5"/>
+          <p:cNvSpPr txBox="1"/>
+          <p:nvPr/>
+        </p:nvSpPr>
+        <p:spPr>
+          <a:xfrm>
+            <a:off x="701777" y="2196433"/>
+            <a:ext cx="3181965" cy="1815882"/>
+          </a:xfrm>
+          <a:prstGeom prst="rect">
+            <a:avLst/>
+          </a:prstGeom>
+          <a:solidFill>
+            <a:schemeClr val="bg1">
+              <a:lumMod val="75000"/>
+            </a:schemeClr>
+          </a:solidFill>
+        </p:spPr>
+        <p:txBody>
+          <a:bodyPr wrap="square" rtlCol="0">
+            <a:spAutoFit/>
+          </a:bodyPr>
+          <a:lstStyle/>
+          <a:p>
+            <a:r>
+              <a:rPr lang="en-US" sz="1600" dirty="0" smtClean="0">
+                <a:latin typeface="Courier New" pitchFamily="49" charset="0"/>
+                <a:cs typeface="Courier New" pitchFamily="49" charset="0"/>
+              </a:rPr>
+              <a:t>…</a:t>
+            </a:r>
+          </a:p>
+          <a:p>
+            <a:r>
+              <a:rPr lang="en-US" sz="1600" dirty="0">
+                <a:latin typeface="Courier New" pitchFamily="49" charset="0"/>
+                <a:cs typeface="Courier New" pitchFamily="49" charset="0"/>
+              </a:rPr>
+              <a:t> </a:t>
+            </a:r>
+            <a:r>
+              <a:rPr lang="en-US" sz="1600" dirty="0" smtClean="0">
+                <a:latin typeface="Courier New" pitchFamily="49" charset="0"/>
+                <a:cs typeface="Courier New" pitchFamily="49" charset="0"/>
+              </a:rPr>
+              <a:t>   if </a:t>
+            </a:r>
+            <a:r>
+              <a:rPr lang="en-US" sz="1600" dirty="0">
+                <a:latin typeface="Courier New" pitchFamily="49" charset="0"/>
+                <a:cs typeface="Courier New" pitchFamily="49" charset="0"/>
+              </a:rPr>
+              <a:t>(x &gt; y</a:t>
+            </a:r>
+            <a:r>
+              <a:rPr lang="en-US" sz="1600" dirty="0" smtClean="0">
+                <a:latin typeface="Courier New" pitchFamily="49" charset="0"/>
+                <a:cs typeface="Courier New" pitchFamily="49" charset="0"/>
+              </a:rPr>
+              <a:t>) {</a:t>
+            </a:r>
+            <a:endParaRPr lang="en-US" sz="1600" dirty="0">
+              <a:latin typeface="Courier New" pitchFamily="49" charset="0"/>
+              <a:cs typeface="Courier New" pitchFamily="49" charset="0"/>
+            </a:endParaRPr>
+          </a:p>
+          <a:p>
+            <a:r>
+              <a:rPr lang="en-US" sz="1600" dirty="0">
+                <a:latin typeface="Courier New" pitchFamily="49" charset="0"/>
+                <a:cs typeface="Courier New" pitchFamily="49" charset="0"/>
+              </a:rPr>
+              <a:t>    </a:t>
+            </a:r>
+            <a:r>
+              <a:rPr lang="en-US" sz="1600" dirty="0" smtClean="0">
+                <a:latin typeface="Courier New" pitchFamily="49" charset="0"/>
+                <a:cs typeface="Courier New" pitchFamily="49" charset="0"/>
+              </a:rPr>
+              <a:t>    </a:t>
+            </a:r>
+            <a:r>
+              <a:rPr lang="en-US" sz="1600" dirty="0">
+                <a:latin typeface="Courier New" pitchFamily="49" charset="0"/>
+                <a:cs typeface="Courier New" pitchFamily="49" charset="0"/>
+              </a:rPr>
+              <a:t>x -= y;</a:t>
+            </a:r>
+          </a:p>
+          <a:p>
+            <a:r>
+              <a:rPr lang="en-US" sz="1600" dirty="0">
+                <a:latin typeface="Courier New" pitchFamily="49" charset="0"/>
+                <a:cs typeface="Courier New" pitchFamily="49" charset="0"/>
+              </a:rPr>
+              <a:t>    </a:t>
+            </a:r>
+            <a:r>
+              <a:rPr lang="en-US" sz="1600" dirty="0" smtClean="0">
+                <a:latin typeface="Courier New" pitchFamily="49" charset="0"/>
+                <a:cs typeface="Courier New" pitchFamily="49" charset="0"/>
+              </a:rPr>
+              <a:t>} else {</a:t>
+            </a:r>
+            <a:endParaRPr lang="en-US" sz="1600" dirty="0">
+              <a:latin typeface="Courier New" pitchFamily="49" charset="0"/>
+              <a:cs typeface="Courier New" pitchFamily="49" charset="0"/>
+            </a:endParaRPr>
+          </a:p>
+          <a:p>
+            <a:r>
+              <a:rPr lang="en-US" sz="1600" dirty="0">
+                <a:latin typeface="Courier New" pitchFamily="49" charset="0"/>
+                <a:cs typeface="Courier New" pitchFamily="49" charset="0"/>
+              </a:rPr>
+              <a:t>    </a:t>
+            </a:r>
+            <a:r>
+              <a:rPr lang="en-US" sz="1600" dirty="0" smtClean="0">
+                <a:latin typeface="Courier New" pitchFamily="49" charset="0"/>
+                <a:cs typeface="Courier New" pitchFamily="49" charset="0"/>
+              </a:rPr>
+              <a:t>    </a:t>
+            </a:r>
+            <a:r>
+              <a:rPr lang="en-US" sz="1600" dirty="0">
+                <a:latin typeface="Courier New" pitchFamily="49" charset="0"/>
+                <a:cs typeface="Courier New" pitchFamily="49" charset="0"/>
+              </a:rPr>
+              <a:t>y -= x;</a:t>
+            </a:r>
+          </a:p>
+          <a:p>
+            <a:r>
+              <a:rPr lang="en-US" sz="1600" dirty="0">
+                <a:latin typeface="Courier New" pitchFamily="49" charset="0"/>
+                <a:cs typeface="Courier New" pitchFamily="49" charset="0"/>
+              </a:rPr>
+              <a:t>    </a:t>
+            </a:r>
+            <a:r>
+              <a:rPr lang="en-US" sz="1600" dirty="0" smtClean="0">
+                <a:latin typeface="Courier New" pitchFamily="49" charset="0"/>
+                <a:cs typeface="Courier New" pitchFamily="49" charset="0"/>
+              </a:rPr>
+              <a:t>}</a:t>
+            </a:r>
+          </a:p>
+          <a:p>
+            <a:r>
+              <a:rPr lang="en-US" sz="1600" dirty="0" smtClean="0">
+                <a:latin typeface="Courier New" pitchFamily="49" charset="0"/>
+                <a:cs typeface="Courier New" pitchFamily="49" charset="0"/>
+              </a:rPr>
+              <a:t>…</a:t>
+            </a:r>
+            <a:endParaRPr lang="en-US" sz="1600" dirty="0">
+              <a:latin typeface="Courier New" pitchFamily="49" charset="0"/>
+              <a:cs typeface="Courier New" pitchFamily="49" charset="0"/>
+            </a:endParaRPr>
+          </a:p>
+        </p:txBody>
+      </p:sp>
+      <p:grpSp>
+        <p:nvGrpSpPr>
+          <p:cNvPr id="7" name="Group 6"/>
+          <p:cNvGrpSpPr/>
+          <p:nvPr/>
+        </p:nvGrpSpPr>
+        <p:grpSpPr>
+          <a:xfrm>
+            <a:off x="1696283" y="1512142"/>
+            <a:ext cx="2806891" cy="1213985"/>
+            <a:chOff x="296846" y="3923306"/>
+            <a:chExt cx="2806891" cy="1213985"/>
+          </a:xfrm>
+        </p:grpSpPr>
+        <p:sp>
+          <p:nvSpPr>
+            <p:cNvPr id="8" name="TextBox 7"/>
+            <p:cNvSpPr txBox="1"/>
+            <p:nvPr/>
+          </p:nvSpPr>
+          <p:spPr>
+            <a:xfrm>
+              <a:off x="1010357" y="3923306"/>
+              <a:ext cx="2093380" cy="400110"/>
+            </a:xfrm>
+            <a:prstGeom prst="rect">
+              <a:avLst/>
+            </a:prstGeom>
+            <a:solidFill>
+              <a:schemeClr val="bg1"/>
+            </a:solidFill>
+            <a:ln w="19050">
+              <a:solidFill>
+                <a:srgbClr val="C00000"/>
+              </a:solidFill>
+            </a:ln>
+          </p:spPr>
+          <p:txBody>
+            <a:bodyPr wrap="square" rtlCol="0">
+              <a:spAutoFit/>
+            </a:bodyPr>
+            <a:lstStyle/>
+            <a:p>
+              <a:r>
+                <a:rPr lang="en-US" sz="2000" dirty="0" smtClean="0">
+                  <a:solidFill>
+                    <a:srgbClr val="C00000"/>
+                  </a:solidFill>
+                </a:rPr>
+                <a:t>Boolean condition</a:t>
+              </a:r>
+              <a:endParaRPr lang="en-US" sz="2000" dirty="0">
+                <a:solidFill>
+                  <a:srgbClr val="C00000"/>
+                </a:solidFill>
+                <a:latin typeface="Courier New" panose="02070309020205020404" pitchFamily="49" charset="0"/>
+                <a:cs typeface="Courier New" panose="02070309020205020404" pitchFamily="49" charset="0"/>
+              </a:endParaRPr>
+            </a:p>
+          </p:txBody>
+        </p:sp>
+        <p:sp>
+          <p:nvSpPr>
+            <p:cNvPr id="9" name="Rectangle 8"/>
+            <p:cNvSpPr/>
+            <p:nvPr/>
+          </p:nvSpPr>
+          <p:spPr>
+            <a:xfrm>
+              <a:off x="296846" y="4856447"/>
+              <a:ext cx="768807" cy="280844"/>
+            </a:xfrm>
+            <a:prstGeom prst="rect">
+              <a:avLst/>
+            </a:prstGeom>
+            <a:noFill/>
+            <a:ln w="19050">
+              <a:solidFill>
+                <a:srgbClr val="C00000"/>
+              </a:solidFill>
+            </a:ln>
+          </p:spPr>
+          <p:style>
+            <a:lnRef idx="2">
+              <a:schemeClr val="accent1">
+                <a:shade val="50000"/>
+              </a:schemeClr>
+            </a:lnRef>
+            <a:fillRef idx="1">
+              <a:schemeClr val="accent1"/>
+            </a:fillRef>
+            <a:effectRef idx="0">
+              <a:schemeClr val="accent1"/>
+            </a:effectRef>
+            <a:fontRef idx="minor">
+              <a:schemeClr val="lt1"/>
+            </a:fontRef>
+          </p:style>
+          <p:txBody>
+            <a:bodyPr rtlCol="0" anchor="ctr"/>
+            <a:lstStyle/>
+            <a:p>
+              <a:pPr algn="ctr"/>
+              <a:endParaRPr lang="en-US"/>
+            </a:p>
+          </p:txBody>
+        </p:sp>
+        <p:cxnSp>
+          <p:nvCxnSpPr>
+            <p:cNvPr id="10" name="Straight Arrow Connector 9"/>
+            <p:cNvCxnSpPr>
+              <a:stCxn id="8" idx="2"/>
+              <a:endCxn id="9" idx="0"/>
+            </p:cNvCxnSpPr>
+            <p:nvPr/>
+          </p:nvCxnSpPr>
+          <p:spPr>
+            <a:xfrm flipH="1">
+              <a:off x="681250" y="4323416"/>
+              <a:ext cx="1375797" cy="533031"/>
+            </a:xfrm>
+            <a:prstGeom prst="straightConnector1">
+              <a:avLst/>
+            </a:prstGeom>
+            <a:ln w="19050">
+              <a:solidFill>
+                <a:srgbClr val="C00000"/>
+              </a:solidFill>
+              <a:tailEnd type="stealth" w="lg" len="lg"/>
+            </a:ln>
+          </p:spPr>
+          <p:style>
+            <a:lnRef idx="1">
+              <a:schemeClr val="accent1"/>
+            </a:lnRef>
+            <a:fillRef idx="0">
+              <a:schemeClr val="accent1"/>
+            </a:fillRef>
+            <a:effectRef idx="0">
+              <a:schemeClr val="accent1"/>
+            </a:effectRef>
+            <a:fontRef idx="minor">
+              <a:schemeClr val="tx1"/>
+            </a:fontRef>
+          </p:style>
+        </p:cxnSp>
+      </p:grpSp>
+      <p:grpSp>
+        <p:nvGrpSpPr>
+          <p:cNvPr id="11" name="Group 10"/>
+          <p:cNvGrpSpPr/>
+          <p:nvPr/>
+        </p:nvGrpSpPr>
+        <p:grpSpPr>
+          <a:xfrm>
+            <a:off x="2833271" y="1912252"/>
+            <a:ext cx="4452432" cy="1073094"/>
+            <a:chOff x="5250416" y="4211543"/>
+            <a:chExt cx="4452432" cy="1073094"/>
+          </a:xfrm>
+        </p:grpSpPr>
+        <p:sp>
+          <p:nvSpPr>
+            <p:cNvPr id="12" name="Right Brace 11"/>
+            <p:cNvSpPr/>
+            <p:nvPr/>
+          </p:nvSpPr>
+          <p:spPr>
+            <a:xfrm>
+              <a:off x="5250416" y="5054365"/>
+              <a:ext cx="45719" cy="230272"/>
+            </a:xfrm>
+            <a:prstGeom prst="rightBrace">
+              <a:avLst/>
+            </a:prstGeom>
+            <a:ln w="28575">
+              <a:solidFill>
+                <a:srgbClr val="C00000"/>
+              </a:solidFill>
+            </a:ln>
+          </p:spPr>
+          <p:style>
+            <a:lnRef idx="1">
+              <a:schemeClr val="accent1"/>
+            </a:lnRef>
+            <a:fillRef idx="0">
+              <a:schemeClr val="accent1"/>
+            </a:fillRef>
+            <a:effectRef idx="0">
+              <a:schemeClr val="accent1"/>
+            </a:effectRef>
+            <a:fontRef idx="minor">
+              <a:schemeClr val="tx1"/>
+            </a:fontRef>
+          </p:style>
+          <p:txBody>
+            <a:bodyPr rtlCol="0" anchor="ctr"/>
+            <a:lstStyle/>
+            <a:p>
+              <a:pPr algn="ctr"/>
+              <a:endParaRPr lang="en-US"/>
+            </a:p>
+          </p:txBody>
+        </p:sp>
+        <p:grpSp>
+          <p:nvGrpSpPr>
+            <p:cNvPr id="13" name="Group 12"/>
+            <p:cNvGrpSpPr/>
+            <p:nvPr/>
+          </p:nvGrpSpPr>
+          <p:grpSpPr>
+            <a:xfrm>
+              <a:off x="5474977" y="4211543"/>
+              <a:ext cx="4227871" cy="948936"/>
+              <a:chOff x="-1350360" y="2462998"/>
+              <a:chExt cx="4227871" cy="948936"/>
+            </a:xfrm>
+          </p:grpSpPr>
+          <p:sp>
+            <p:nvSpPr>
+              <p:cNvPr id="14" name="TextBox 13"/>
+              <p:cNvSpPr txBox="1"/>
+              <p:nvPr/>
+            </p:nvSpPr>
+            <p:spPr>
+              <a:xfrm>
+                <a:off x="278235" y="2462998"/>
+                <a:ext cx="2599276" cy="707886"/>
+              </a:xfrm>
+              <a:prstGeom prst="rect">
+                <a:avLst/>
+              </a:prstGeom>
+              <a:solidFill>
+                <a:schemeClr val="bg1"/>
+              </a:solidFill>
+              <a:ln w="19050">
+                <a:solidFill>
+                  <a:srgbClr val="C00000"/>
+                </a:solidFill>
+              </a:ln>
+            </p:spPr>
+            <p:txBody>
+              <a:bodyPr wrap="square" rtlCol="0">
+                <a:spAutoFit/>
+              </a:bodyPr>
+              <a:lstStyle/>
+              <a:p>
+                <a:r>
+                  <a:rPr lang="en-US" sz="2000" dirty="0" smtClean="0">
+                    <a:solidFill>
+                      <a:srgbClr val="C00000"/>
+                    </a:solidFill>
+                  </a:rPr>
+                  <a:t>execute when Boolean condition </a:t>
+                </a:r>
+                <a:r>
+                  <a:rPr lang="en-US" sz="2000" dirty="0" smtClean="0">
+                    <a:solidFill>
+                      <a:srgbClr val="C00000"/>
+                    </a:solidFill>
+                    <a:latin typeface="Courier New" panose="02070309020205020404" pitchFamily="49" charset="0"/>
+                    <a:cs typeface="Courier New" panose="02070309020205020404" pitchFamily="49" charset="0"/>
+                  </a:rPr>
+                  <a:t>true</a:t>
+                </a:r>
+                <a:endParaRPr lang="en-US" sz="2000" dirty="0">
+                  <a:solidFill>
+                    <a:srgbClr val="C00000"/>
+                  </a:solidFill>
+                  <a:latin typeface="Courier New" panose="02070309020205020404" pitchFamily="49" charset="0"/>
+                  <a:cs typeface="Courier New" panose="02070309020205020404" pitchFamily="49" charset="0"/>
+                </a:endParaRPr>
+              </a:p>
+            </p:txBody>
+          </p:sp>
+          <p:cxnSp>
+            <p:nvCxnSpPr>
+              <p:cNvPr id="15" name="Straight Arrow Connector 14"/>
+              <p:cNvCxnSpPr>
+                <a:stCxn id="14" idx="1"/>
+              </p:cNvCxnSpPr>
+              <p:nvPr/>
+            </p:nvCxnSpPr>
+            <p:spPr>
+              <a:xfrm flipH="1">
+                <a:off x="-1350360" y="2816941"/>
+                <a:ext cx="1628595" cy="594993"/>
+              </a:xfrm>
+              <a:prstGeom prst="straightConnector1">
+                <a:avLst/>
+              </a:prstGeom>
+              <a:ln w="19050">
+                <a:solidFill>
+                  <a:srgbClr val="C00000"/>
+                </a:solidFill>
+                <a:tailEnd type="stealth" w="lg" len="lg"/>
+              </a:ln>
+            </p:spPr>
+            <p:style>
+              <a:lnRef idx="1">
+                <a:schemeClr val="accent1"/>
+              </a:lnRef>
+              <a:fillRef idx="0">
+                <a:schemeClr val="accent1"/>
+              </a:fillRef>
+              <a:effectRef idx="0">
+                <a:schemeClr val="accent1"/>
+              </a:effectRef>
+              <a:fontRef idx="minor">
+                <a:schemeClr val="tx1"/>
+              </a:fontRef>
+            </p:style>
+          </p:cxnSp>
+        </p:grpSp>
+      </p:grpSp>
+      <p:grpSp>
+        <p:nvGrpSpPr>
+          <p:cNvPr id="18" name="Group 17"/>
+          <p:cNvGrpSpPr/>
+          <p:nvPr/>
+        </p:nvGrpSpPr>
+        <p:grpSpPr>
+          <a:xfrm>
+            <a:off x="2833271" y="3078063"/>
+            <a:ext cx="4475291" cy="707886"/>
+            <a:chOff x="5227557" y="4211543"/>
+            <a:chExt cx="4475291" cy="707886"/>
+          </a:xfrm>
+        </p:grpSpPr>
+        <p:sp>
+          <p:nvSpPr>
+            <p:cNvPr id="19" name="Right Brace 18"/>
+            <p:cNvSpPr/>
+            <p:nvPr/>
+          </p:nvSpPr>
+          <p:spPr>
+            <a:xfrm>
+              <a:off x="5227557" y="4313481"/>
+              <a:ext cx="45719" cy="230272"/>
+            </a:xfrm>
+            <a:prstGeom prst="rightBrace">
+              <a:avLst/>
+            </a:prstGeom>
+            <a:ln w="28575">
+              <a:solidFill>
+                <a:srgbClr val="C00000"/>
+              </a:solidFill>
+            </a:ln>
+          </p:spPr>
+          <p:style>
+            <a:lnRef idx="1">
+              <a:schemeClr val="accent1"/>
+            </a:lnRef>
+            <a:fillRef idx="0">
+              <a:schemeClr val="accent1"/>
+            </a:fillRef>
+            <a:effectRef idx="0">
+              <a:schemeClr val="accent1"/>
+            </a:effectRef>
+            <a:fontRef idx="minor">
+              <a:schemeClr val="tx1"/>
+            </a:fontRef>
+          </p:style>
+          <p:txBody>
+            <a:bodyPr rtlCol="0" anchor="ctr"/>
+            <a:lstStyle/>
+            <a:p>
+              <a:pPr algn="ctr"/>
+              <a:endParaRPr lang="en-US"/>
+            </a:p>
+          </p:txBody>
+        </p:sp>
+        <p:grpSp>
+          <p:nvGrpSpPr>
+            <p:cNvPr id="20" name="Group 19"/>
+            <p:cNvGrpSpPr/>
+            <p:nvPr/>
+          </p:nvGrpSpPr>
+          <p:grpSpPr>
+            <a:xfrm>
+              <a:off x="5452118" y="4211543"/>
+              <a:ext cx="4250730" cy="707886"/>
+              <a:chOff x="-1373219" y="2462998"/>
+              <a:chExt cx="4250730" cy="707886"/>
+            </a:xfrm>
+          </p:grpSpPr>
+          <p:sp>
+            <p:nvSpPr>
+              <p:cNvPr id="21" name="TextBox 20"/>
+              <p:cNvSpPr txBox="1"/>
+              <p:nvPr/>
+            </p:nvSpPr>
+            <p:spPr>
+              <a:xfrm>
+                <a:off x="278235" y="2462998"/>
+                <a:ext cx="2599276" cy="707886"/>
+              </a:xfrm>
+              <a:prstGeom prst="rect">
+                <a:avLst/>
+              </a:prstGeom>
+              <a:solidFill>
+                <a:schemeClr val="bg1"/>
+              </a:solidFill>
+              <a:ln w="19050">
+                <a:solidFill>
+                  <a:srgbClr val="C00000"/>
+                </a:solidFill>
+              </a:ln>
+            </p:spPr>
+            <p:txBody>
+              <a:bodyPr wrap="square" rtlCol="0">
+                <a:spAutoFit/>
+              </a:bodyPr>
+              <a:lstStyle/>
+              <a:p>
+                <a:r>
+                  <a:rPr lang="en-US" sz="2000" dirty="0" smtClean="0">
+                    <a:solidFill>
+                      <a:srgbClr val="C00000"/>
+                    </a:solidFill>
+                  </a:rPr>
+                  <a:t>execute when Boolean condition </a:t>
+                </a:r>
+                <a:r>
+                  <a:rPr lang="en-US" sz="2000" dirty="0" smtClean="0">
+                    <a:solidFill>
+                      <a:srgbClr val="C00000"/>
+                    </a:solidFill>
+                    <a:latin typeface="Courier New" panose="02070309020205020404" pitchFamily="49" charset="0"/>
+                    <a:cs typeface="Courier New" panose="02070309020205020404" pitchFamily="49" charset="0"/>
+                  </a:rPr>
+                  <a:t>false</a:t>
+                </a:r>
+                <a:endParaRPr lang="en-US" sz="2000" dirty="0">
+                  <a:solidFill>
+                    <a:srgbClr val="C00000"/>
+                  </a:solidFill>
+                  <a:latin typeface="Courier New" panose="02070309020205020404" pitchFamily="49" charset="0"/>
+                  <a:cs typeface="Courier New" panose="02070309020205020404" pitchFamily="49" charset="0"/>
+                </a:endParaRPr>
+              </a:p>
+            </p:txBody>
+          </p:sp>
+          <p:cxnSp>
+            <p:nvCxnSpPr>
+              <p:cNvPr id="22" name="Straight Arrow Connector 21"/>
+              <p:cNvCxnSpPr>
+                <a:stCxn id="21" idx="1"/>
+              </p:cNvCxnSpPr>
+              <p:nvPr/>
+            </p:nvCxnSpPr>
+            <p:spPr>
+              <a:xfrm flipH="1" flipV="1">
+                <a:off x="-1373219" y="2704048"/>
+                <a:ext cx="1651454" cy="112893"/>
+              </a:xfrm>
+              <a:prstGeom prst="straightConnector1">
+                <a:avLst/>
+              </a:prstGeom>
+              <a:ln w="19050">
+                <a:solidFill>
+                  <a:srgbClr val="C00000"/>
+                </a:solidFill>
+                <a:tailEnd type="stealth" w="lg" len="lg"/>
+              </a:ln>
+            </p:spPr>
+            <p:style>
+              <a:lnRef idx="1">
+                <a:schemeClr val="accent1"/>
+              </a:lnRef>
+              <a:fillRef idx="0">
+                <a:schemeClr val="accent1"/>
+              </a:fillRef>
+              <a:effectRef idx="0">
+                <a:schemeClr val="accent1"/>
+              </a:effectRef>
+              <a:fontRef idx="minor">
+                <a:schemeClr val="tx1"/>
+              </a:fontRef>
+            </p:style>
+          </p:cxnSp>
+        </p:grpSp>
+      </p:grpSp>
+      <p:sp>
+        <p:nvSpPr>
+          <p:cNvPr id="27" name="TextBox 26"/>
+          <p:cNvSpPr txBox="1"/>
+          <p:nvPr/>
+        </p:nvSpPr>
+        <p:spPr>
+          <a:xfrm>
+            <a:off x="3426541" y="4804195"/>
+            <a:ext cx="2153265" cy="1815882"/>
+          </a:xfrm>
+          <a:prstGeom prst="rect">
+            <a:avLst/>
+          </a:prstGeom>
+          <a:solidFill>
+            <a:schemeClr val="bg1">
+              <a:lumMod val="75000"/>
+            </a:schemeClr>
+          </a:solidFill>
+        </p:spPr>
+        <p:txBody>
+          <a:bodyPr wrap="square" rtlCol="0">
+            <a:spAutoFit/>
+          </a:bodyPr>
+          <a:lstStyle/>
+          <a:p>
+            <a:r>
+              <a:rPr lang="en-US" sz="1600" dirty="0" smtClean="0">
+                <a:latin typeface="Courier New" pitchFamily="49" charset="0"/>
+                <a:cs typeface="Courier New" pitchFamily="49" charset="0"/>
+              </a:rPr>
+              <a:t>if (…) {</a:t>
+            </a:r>
+          </a:p>
+          <a:p>
+            <a:r>
+              <a:rPr lang="en-US" sz="1600" dirty="0">
+                <a:latin typeface="Courier New" pitchFamily="49" charset="0"/>
+                <a:cs typeface="Courier New" pitchFamily="49" charset="0"/>
+              </a:rPr>
+              <a:t> </a:t>
+            </a:r>
+            <a:r>
+              <a:rPr lang="en-US" sz="1600" dirty="0" smtClean="0">
+                <a:latin typeface="Courier New" pitchFamily="49" charset="0"/>
+                <a:cs typeface="Courier New" pitchFamily="49" charset="0"/>
+              </a:rPr>
+              <a:t>   …</a:t>
+            </a:r>
+          </a:p>
+          <a:p>
+            <a:r>
+              <a:rPr lang="en-US" sz="1600" dirty="0" smtClean="0">
+                <a:latin typeface="Courier New" pitchFamily="49" charset="0"/>
+                <a:cs typeface="Courier New" pitchFamily="49" charset="0"/>
+              </a:rPr>
+              <a:t>} else if (…) {</a:t>
+            </a:r>
+          </a:p>
+          <a:p>
+            <a:r>
+              <a:rPr lang="en-US" sz="1600" dirty="0">
+                <a:latin typeface="Courier New" pitchFamily="49" charset="0"/>
+                <a:cs typeface="Courier New" pitchFamily="49" charset="0"/>
+              </a:rPr>
+              <a:t> </a:t>
+            </a:r>
+            <a:r>
+              <a:rPr lang="en-US" sz="1600" dirty="0" smtClean="0">
+                <a:latin typeface="Courier New" pitchFamily="49" charset="0"/>
+                <a:cs typeface="Courier New" pitchFamily="49" charset="0"/>
+              </a:rPr>
+              <a:t>   …</a:t>
+            </a:r>
+          </a:p>
+          <a:p>
+            <a:r>
+              <a:rPr lang="en-US" sz="1600" dirty="0" smtClean="0">
+                <a:latin typeface="Courier New" pitchFamily="49" charset="0"/>
+                <a:cs typeface="Courier New" pitchFamily="49" charset="0"/>
+              </a:rPr>
+              <a:t>} else {</a:t>
+            </a:r>
+          </a:p>
+          <a:p>
+            <a:r>
+              <a:rPr lang="en-US" sz="1600" dirty="0">
+                <a:latin typeface="Courier New" pitchFamily="49" charset="0"/>
+                <a:cs typeface="Courier New" pitchFamily="49" charset="0"/>
+              </a:rPr>
+              <a:t> </a:t>
+            </a:r>
+            <a:r>
+              <a:rPr lang="en-US" sz="1600" dirty="0" smtClean="0">
+                <a:latin typeface="Courier New" pitchFamily="49" charset="0"/>
+                <a:cs typeface="Courier New" pitchFamily="49" charset="0"/>
+              </a:rPr>
+              <a:t>   …</a:t>
+            </a:r>
+          </a:p>
+          <a:p>
+            <a:r>
+              <a:rPr lang="en-US" sz="1600" dirty="0">
+                <a:latin typeface="Courier New" pitchFamily="49" charset="0"/>
+                <a:cs typeface="Courier New" pitchFamily="49" charset="0"/>
+              </a:rPr>
+              <a:t>}</a:t>
+            </a:r>
+            <a:endParaRPr lang="en-US" sz="1600" dirty="0">
+              <a:latin typeface="Courier New" pitchFamily="49" charset="0"/>
+              <a:cs typeface="Courier New" pitchFamily="49" charset="0"/>
+            </a:endParaRPr>
+          </a:p>
+        </p:txBody>
+      </p:sp>
+    </p:spTree>
+    <p:extLst>
+      <p:ext uri="{BB962C8B-B14F-4D97-AF65-F5344CB8AC3E}">
+        <p14:creationId xmlns:p14="http://schemas.microsoft.com/office/powerpoint/2010/main" val="3079315454"/>
+      </p:ext>
+    </p:extLst>
+  </p:cSld>
+  <p:clrMapOvr>
+    <a:masterClrMapping/>
+  </p:clrMapOvr>
+  <p:timing>
+    <p:tnLst>
+      <p:par>
+        <p:cTn id="1" dur="indefinite" restart="never" nodeType="tmRoot">
+          <p:childTnLst>
+            <p:seq concurrent="1" nextAc="seek">
+              <p:cTn id="2" dur="indefinite" nodeType="mainSeq">
+                <p:childTnLst>
+                  <p:par>
+                    <p:cTn id="3" fill="hold">
+                      <p:stCondLst>
+                        <p:cond delay="indefinite"/>
+                      </p:stCondLst>
+                      <p:childTnLst>
+                        <p:par>
+                          <p:cTn id="4" fill="hold">
+                            <p:stCondLst>
+                              <p:cond delay="0"/>
+                            </p:stCondLst>
+                            <p:childTnLst>
+                              <p:par>
+                                <p:cTn id="5" presetID="1" presetClass="entr" presetSubtype="0" fill="hold" nodeType="clickEffect">
+                                  <p:stCondLst>
+                                    <p:cond delay="0"/>
+                                  </p:stCondLst>
+                                  <p:childTnLst>
+                                    <p:set>
+                                      <p:cBhvr>
+                                        <p:cTn id="6" dur="1" fill="hold">
+                                          <p:stCondLst>
+                                            <p:cond delay="0"/>
+                                          </p:stCondLst>
+                                        </p:cTn>
+                                        <p:tgtEl>
+                                          <p:spTgt spid="7"/>
+                                        </p:tgtEl>
+                                        <p:attrNameLst>
+                                          <p:attrName>style.visibility</p:attrName>
+                                        </p:attrNameLst>
+                                      </p:cBhvr>
+                                      <p:to>
+                                        <p:strVal val="visible"/>
+                                      </p:to>
+                                    </p:set>
+                                  </p:childTnLst>
+                                </p:cTn>
+                              </p:par>
+                            </p:childTnLst>
+                          </p:cTn>
+                        </p:par>
+                      </p:childTnLst>
+                    </p:cTn>
+                  </p:par>
+                  <p:par>
+                    <p:cTn id="7" fill="hold">
+                      <p:stCondLst>
+                        <p:cond delay="indefinite"/>
+                      </p:stCondLst>
+                      <p:childTnLst>
+                        <p:par>
+                          <p:cTn id="8" fill="hold">
+                            <p:stCondLst>
+                              <p:cond delay="0"/>
+                            </p:stCondLst>
+                            <p:childTnLst>
+                              <p:par>
+                                <p:cTn id="9" presetID="1" presetClass="entr" presetSubtype="0" fill="hold" nodeType="clickEffect">
+                                  <p:stCondLst>
+                                    <p:cond delay="0"/>
+                                  </p:stCondLst>
+                                  <p:childTnLst>
+                                    <p:set>
+                                      <p:cBhvr>
+                                        <p:cTn id="10" dur="1" fill="hold">
+                                          <p:stCondLst>
+                                            <p:cond delay="0"/>
+                                          </p:stCondLst>
+                                        </p:cTn>
+                                        <p:tgtEl>
+                                          <p:spTgt spid="11"/>
+                                        </p:tgtEl>
+                                        <p:attrNameLst>
+                                          <p:attrName>style.visibility</p:attrName>
+                                        </p:attrNameLst>
+                                      </p:cBhvr>
+                                      <p:to>
+                                        <p:strVal val="visible"/>
+                                      </p:to>
+                                    </p:set>
+                                  </p:childTnLst>
+                                </p:cTn>
+                              </p:par>
+                            </p:childTnLst>
+                          </p:cTn>
+                        </p:par>
+                      </p:childTnLst>
+                    </p:cTn>
+                  </p:par>
+                  <p:par>
+                    <p:cTn id="11" fill="hold">
+                      <p:stCondLst>
+                        <p:cond delay="indefinite"/>
+                      </p:stCondLst>
+                      <p:childTnLst>
+                        <p:par>
+                          <p:cTn id="12" fill="hold">
+                            <p:stCondLst>
+                              <p:cond delay="0"/>
+                            </p:stCondLst>
+                            <p:childTnLst>
+                              <p:par>
+                                <p:cTn id="13" presetID="1" presetClass="entr" presetSubtype="0" fill="hold" nodeType="clickEffect">
+                                  <p:stCondLst>
+                                    <p:cond delay="0"/>
+                                  </p:stCondLst>
+                                  <p:childTnLst>
+                                    <p:set>
+                                      <p:cBhvr>
+                                        <p:cTn id="14" dur="1" fill="hold">
+                                          <p:stCondLst>
+                                            <p:cond delay="0"/>
+                                          </p:stCondLst>
+                                        </p:cTn>
+                                        <p:tgtEl>
+                                          <p:spTgt spid="18"/>
+                                        </p:tgtEl>
+                                        <p:attrNameLst>
+                                          <p:attrName>style.visibility</p:attrName>
+                                        </p:attrNameLst>
+                                      </p:cBhvr>
+                                      <p:to>
+                                        <p:strVal val="visible"/>
+                                      </p:to>
+                                    </p:set>
+                                  </p:childTnLst>
+                                </p:cTn>
+                              </p:par>
+                            </p:childTnLst>
+                          </p:cTn>
+                        </p:par>
+                      </p:childTnLst>
+                    </p:cTn>
+                  </p:par>
+                  <p:par>
+                    <p:cTn id="15" fill="hold">
+                      <p:stCondLst>
+                        <p:cond delay="indefinite"/>
+                      </p:stCondLst>
+                      <p:childTnLst>
+                        <p:par>
+                          <p:cTn id="16" fill="hold">
+                            <p:stCondLst>
+                              <p:cond delay="0"/>
+                            </p:stCondLst>
+                            <p:childTnLst>
+                              <p:par>
+                                <p:cTn id="17" presetID="1" presetClass="entr" presetSubtype="0" fill="hold" grpId="0" nodeType="clickEffect">
+                                  <p:stCondLst>
+                                    <p:cond delay="0"/>
+                                  </p:stCondLst>
+                                  <p:childTnLst>
+                                    <p:set>
+                                      <p:cBhvr>
+                                        <p:cTn id="18" dur="1" fill="hold">
+                                          <p:stCondLst>
+                                            <p:cond delay="0"/>
+                                          </p:stCondLst>
+                                        </p:cTn>
+                                        <p:tgtEl>
+                                          <p:spTgt spid="26">
+                                            <p:txEl>
+                                              <p:pRg st="0" end="0"/>
+                                            </p:txEl>
+                                          </p:spTgt>
+                                        </p:tgtEl>
+                                        <p:attrNameLst>
+                                          <p:attrName>style.visibility</p:attrName>
+                                        </p:attrNameLst>
+                                      </p:cBhvr>
+                                      <p:to>
+                                        <p:strVal val="visible"/>
+                                      </p:to>
+                                    </p:set>
+                                  </p:childTnLst>
+                                </p:cTn>
+                              </p:par>
+                            </p:childTnLst>
+                          </p:cTn>
+                        </p:par>
+                      </p:childTnLst>
+                    </p:cTn>
+                  </p:par>
+                  <p:par>
+                    <p:cTn id="19" fill="hold">
+                      <p:stCondLst>
+                        <p:cond delay="indefinite"/>
+                      </p:stCondLst>
+                      <p:childTnLst>
+                        <p:par>
+                          <p:cTn id="20" fill="hold">
+                            <p:stCondLst>
+                              <p:cond delay="0"/>
+                            </p:stCondLst>
+                            <p:childTnLst>
+                              <p:par>
+                                <p:cTn id="21" presetID="1" presetClass="entr" presetSubtype="0" fill="hold" grpId="0" nodeType="clickEffect">
+                                  <p:stCondLst>
+                                    <p:cond delay="0"/>
+                                  </p:stCondLst>
+                                  <p:childTnLst>
+                                    <p:set>
+                                      <p:cBhvr>
+                                        <p:cTn id="22" dur="1" fill="hold">
+                                          <p:stCondLst>
+                                            <p:cond delay="0"/>
+                                          </p:stCondLst>
+                                        </p:cTn>
+                                        <p:tgtEl>
+                                          <p:spTgt spid="26">
+                                            <p:txEl>
+                                              <p:pRg st="1" end="1"/>
+                                            </p:txEl>
+                                          </p:spTgt>
+                                        </p:tgtEl>
+                                        <p:attrNameLst>
+                                          <p:attrName>style.visibility</p:attrName>
+                                        </p:attrNameLst>
+                                      </p:cBhvr>
+                                      <p:to>
+                                        <p:strVal val="visible"/>
+                                      </p:to>
+                                    </p:set>
+                                  </p:childTnLst>
+                                </p:cTn>
+                              </p:par>
+                            </p:childTnLst>
+                          </p:cTn>
+                        </p:par>
+                      </p:childTnLst>
+                    </p:cTn>
+                  </p:par>
+                  <p:par>
+                    <p:cTn id="23" fill="hold">
+                      <p:stCondLst>
+                        <p:cond delay="indefinite"/>
+                      </p:stCondLst>
+                      <p:childTnLst>
+                        <p:par>
+                          <p:cTn id="24" fill="hold">
+                            <p:stCondLst>
+                              <p:cond delay="0"/>
+                            </p:stCondLst>
+                            <p:childTnLst>
+                              <p:par>
+                                <p:cTn id="25" presetID="1" presetClass="entr" presetSubtype="0" fill="hold" grpId="0" nodeType="clickEffect">
+                                  <p:stCondLst>
+                                    <p:cond delay="0"/>
+                                  </p:stCondLst>
+                                  <p:childTnLst>
+                                    <p:set>
+                                      <p:cBhvr>
+                                        <p:cTn id="26" dur="1" fill="hold">
+                                          <p:stCondLst>
+                                            <p:cond delay="0"/>
+                                          </p:stCondLst>
+                                        </p:cTn>
+                                        <p:tgtEl>
+                                          <p:spTgt spid="26">
+                                            <p:txEl>
+                                              <p:pRg st="2" end="2"/>
+                                            </p:txEl>
+                                          </p:spTgt>
+                                        </p:tgtEl>
+                                        <p:attrNameLst>
+                                          <p:attrName>style.visibility</p:attrName>
+                                        </p:attrNameLst>
+                                      </p:cBhvr>
+                                      <p:to>
+                                        <p:strVal val="visible"/>
+                                      </p:to>
+                                    </p:set>
+                                  </p:childTnLst>
+                                </p:cTn>
+                              </p:par>
+                              <p:par>
+                                <p:cTn id="27" presetID="1" presetClass="entr" presetSubtype="0" fill="hold" grpId="0" nodeType="withEffect">
+                                  <p:stCondLst>
+                                    <p:cond delay="0"/>
+                                  </p:stCondLst>
+                                  <p:childTnLst>
+                                    <p:set>
+                                      <p:cBhvr>
+                                        <p:cTn id="28" dur="1" fill="hold">
+                                          <p:stCondLst>
+                                            <p:cond delay="0"/>
+                                          </p:stCondLst>
+                                        </p:cTn>
+                                        <p:tgtEl>
+                                          <p:spTgt spid="27"/>
+                                        </p:tgtEl>
+                                        <p:attrNameLst>
+                                          <p:attrName>style.visibility</p:attrName>
+                                        </p:attrNameLst>
+                                      </p:cBhvr>
+                                      <p:to>
+                                        <p:strVal val="visible"/>
+                                      </p:to>
+                                    </p:set>
+                                  </p:childTnLst>
+                                </p:cTn>
+                              </p:par>
+                            </p:childTnLst>
+                          </p:cTn>
+                        </p:par>
+                      </p:childTnLst>
+                    </p:cTn>
+                  </p:par>
+                </p:childTnLst>
+              </p:cTn>
+              <p:prevCondLst>
+                <p:cond evt="onPrev" delay="0">
+                  <p:tgtEl>
+                    <p:sldTgt/>
+                  </p:tgtEl>
+                </p:cond>
+              </p:prevCondLst>
+              <p:nextCondLst>
+                <p:cond evt="onNext" delay="0">
+                  <p:tgtEl>
+                    <p:sldTgt/>
+                  </p:tgtEl>
+                </p:cond>
+              </p:nextCondLst>
+            </p:seq>
+          </p:childTnLst>
+        </p:cTn>
+      </p:par>
+    </p:tnLst>
+    <p:bldLst>
+      <p:bldP spid="26" grpId="0" build="p"/>
+      <p:bldP spid="27" grpId="0" animBg="1"/>
     </p:bldLst>
   </p:timing>
 </p:sld>

</xml_diff>

<commit_message>
Added slide on for statement, break statement
</commit_message>
<xml_diff>
--- a/CPlusPlus/essential_cpp.pptx
+++ b/CPlusPlus/essential_cpp.pptx
@@ -5,7 +5,7 @@
     <p:sldMasterId id="2147483660" r:id="rId1"/>
   </p:sldMasterIdLst>
   <p:notesMasterIdLst>
-    <p:notesMasterId r:id="rId24"/>
+    <p:notesMasterId r:id="rId26"/>
   </p:notesMasterIdLst>
   <p:sldIdLst>
     <p:sldId id="256" r:id="rId2"/>
@@ -30,6 +30,8 @@
     <p:sldId id="273" r:id="rId21"/>
     <p:sldId id="277" r:id="rId22"/>
     <p:sldId id="276" r:id="rId23"/>
+    <p:sldId id="278" r:id="rId24"/>
+    <p:sldId id="279" r:id="rId25"/>
   </p:sldIdLst>
   <p:sldSz cx="9144000" cy="6858000" type="screen4x3"/>
   <p:notesSz cx="6858000" cy="9144000"/>
@@ -14931,6 +14933,74 @@
           </a:p>
         </p:txBody>
       </p:sp>
+      <p:sp>
+        <p:nvSpPr>
+          <p:cNvPr id="21" name="TextBox 20"/>
+          <p:cNvSpPr txBox="1"/>
+          <p:nvPr/>
+        </p:nvSpPr>
+        <p:spPr>
+          <a:xfrm>
+            <a:off x="5146543" y="5519887"/>
+            <a:ext cx="2768425" cy="707886"/>
+          </a:xfrm>
+          <a:prstGeom prst="rect">
+            <a:avLst/>
+          </a:prstGeom>
+          <a:noFill/>
+          <a:ln>
+            <a:solidFill>
+              <a:schemeClr val="tx1"/>
+            </a:solidFill>
+          </a:ln>
+        </p:spPr>
+        <p:txBody>
+          <a:bodyPr wrap="square" rtlCol="0">
+            <a:spAutoFit/>
+          </a:bodyPr>
+          <a:lstStyle/>
+          <a:p>
+            <a:r>
+              <a:rPr lang="en-US" sz="2000" dirty="0" smtClean="0"/>
+              <a:t>Shortcut:</a:t>
+            </a:r>
+          </a:p>
+          <a:p>
+            <a:r>
+              <a:rPr lang="en-US" sz="2000" dirty="0" smtClean="0">
+                <a:latin typeface="Courier New" panose="02070309020205020404" pitchFamily="49" charset="0"/>
+                <a:cs typeface="Courier New" panose="02070309020205020404" pitchFamily="49" charset="0"/>
+              </a:rPr>
+              <a:t>x -= y</a:t>
+            </a:r>
+            <a:r>
+              <a:rPr lang="en-US" sz="2000" dirty="0" smtClean="0"/>
+              <a:t> </a:t>
+            </a:r>
+            <a:r>
+              <a:rPr lang="en-US" sz="2000" dirty="0" smtClean="0">
+                <a:sym typeface="Symbol" panose="05050102010706020507" pitchFamily="18" charset="2"/>
+              </a:rPr>
+              <a:t></a:t>
+            </a:r>
+            <a:r>
+              <a:rPr lang="en-US" sz="2000" dirty="0" smtClean="0"/>
+              <a:t> </a:t>
+            </a:r>
+            <a:r>
+              <a:rPr lang="en-US" sz="2000" dirty="0" smtClean="0">
+                <a:latin typeface="Courier New" panose="02070309020205020404" pitchFamily="49" charset="0"/>
+                <a:cs typeface="Courier New" panose="02070309020205020404" pitchFamily="49" charset="0"/>
+              </a:rPr>
+              <a:t>x = x - y</a:t>
+            </a:r>
+            <a:endParaRPr lang="en-US" sz="2000" dirty="0">
+              <a:latin typeface="Courier New" panose="02070309020205020404" pitchFamily="49" charset="0"/>
+              <a:cs typeface="Courier New" panose="02070309020205020404" pitchFamily="49" charset="0"/>
+            </a:endParaRPr>
+          </a:p>
+        </p:txBody>
+      </p:sp>
     </p:spTree>
     <p:extLst>
       <p:ext uri="{BB962C8B-B14F-4D97-AF65-F5344CB8AC3E}">
@@ -17364,6 +17434,1567 @@
       <p:bldP spid="26" grpId="0" build="p"/>
       <p:bldP spid="27" grpId="0" animBg="1"/>
     </p:bldLst>
+  </p:timing>
+</p:sld>
+</file>
+
+<file path=ppt/slides/slide23.xml><?xml version="1.0" encoding="utf-8"?>
+<p:sld xmlns:a="http://schemas.openxmlformats.org/drawingml/2006/main" xmlns:r="http://schemas.openxmlformats.org/officeDocument/2006/relationships" xmlns:p="http://schemas.openxmlformats.org/presentationml/2006/main">
+  <p:cSld>
+    <p:spTree>
+      <p:nvGrpSpPr>
+        <p:cNvPr id="1" name=""/>
+        <p:cNvGrpSpPr/>
+        <p:nvPr/>
+      </p:nvGrpSpPr>
+      <p:grpSpPr>
+        <a:xfrm>
+          <a:off x="0" y="0"/>
+          <a:ext cx="0" cy="0"/>
+          <a:chOff x="0" y="0"/>
+          <a:chExt cx="0" cy="0"/>
+        </a:xfrm>
+      </p:grpSpPr>
+      <p:sp>
+        <p:nvSpPr>
+          <p:cNvPr id="2" name="Title 1"/>
+          <p:cNvSpPr>
+            <a:spLocks noGrp="1"/>
+          </p:cNvSpPr>
+          <p:nvPr>
+            <p:ph type="title"/>
+          </p:nvPr>
+        </p:nvSpPr>
+        <p:spPr/>
+        <p:txBody>
+          <a:bodyPr/>
+          <a:lstStyle/>
+          <a:p>
+            <a:r>
+              <a:rPr lang="en-US" dirty="0" smtClean="0"/>
+              <a:t>For statement</a:t>
+            </a:r>
+            <a:endParaRPr lang="en-US" dirty="0"/>
+          </a:p>
+        </p:txBody>
+      </p:sp>
+      <p:sp>
+        <p:nvSpPr>
+          <p:cNvPr id="3" name="Content Placeholder 2"/>
+          <p:cNvSpPr>
+            <a:spLocks noGrp="1"/>
+          </p:cNvSpPr>
+          <p:nvPr>
+            <p:ph idx="1"/>
+          </p:nvPr>
+        </p:nvSpPr>
+        <p:spPr>
+          <a:xfrm>
+            <a:off x="628650" y="4119715"/>
+            <a:ext cx="7886700" cy="2057247"/>
+          </a:xfrm>
+        </p:spPr>
+        <p:txBody>
+          <a:bodyPr/>
+          <a:lstStyle/>
+          <a:p>
+            <a:r>
+              <a:rPr lang="en-US" dirty="0" smtClean="0"/>
+              <a:t>Repetition statement</a:t>
+            </a:r>
+          </a:p>
+          <a:p>
+            <a:r>
+              <a:rPr lang="en-US" dirty="0" smtClean="0"/>
+              <a:t>Initialization once, before first iteration</a:t>
+            </a:r>
+          </a:p>
+          <a:p>
+            <a:r>
+              <a:rPr lang="en-US" dirty="0" smtClean="0"/>
+              <a:t>Index modified after each iteration</a:t>
+            </a:r>
+            <a:endParaRPr lang="en-US" dirty="0"/>
+          </a:p>
+        </p:txBody>
+      </p:sp>
+      <p:sp>
+        <p:nvSpPr>
+          <p:cNvPr id="4" name="Slide Number Placeholder 3"/>
+          <p:cNvSpPr>
+            <a:spLocks noGrp="1"/>
+          </p:cNvSpPr>
+          <p:nvPr>
+            <p:ph type="sldNum" sz="quarter" idx="12"/>
+          </p:nvPr>
+        </p:nvSpPr>
+        <p:spPr/>
+        <p:txBody>
+          <a:bodyPr/>
+          <a:lstStyle/>
+          <a:p>
+            <a:fld id="{033373DF-BCDA-4600-B448-AFBDB22F4A39}" type="slidenum">
+              <a:rPr lang="en-US" smtClean="0"/>
+              <a:t>23</a:t>
+            </a:fld>
+            <a:endParaRPr lang="en-US"/>
+          </a:p>
+        </p:txBody>
+      </p:sp>
+      <p:sp>
+        <p:nvSpPr>
+          <p:cNvPr id="5" name="TextBox 4"/>
+          <p:cNvSpPr txBox="1"/>
+          <p:nvPr/>
+        </p:nvSpPr>
+        <p:spPr>
+          <a:xfrm>
+            <a:off x="701777" y="2196433"/>
+            <a:ext cx="4646971" cy="1815882"/>
+          </a:xfrm>
+          <a:prstGeom prst="rect">
+            <a:avLst/>
+          </a:prstGeom>
+          <a:solidFill>
+            <a:schemeClr val="bg1">
+              <a:lumMod val="75000"/>
+            </a:schemeClr>
+          </a:solidFill>
+        </p:spPr>
+        <p:txBody>
+          <a:bodyPr wrap="square" rtlCol="0">
+            <a:spAutoFit/>
+          </a:bodyPr>
+          <a:lstStyle/>
+          <a:p>
+            <a:r>
+              <a:rPr lang="nn-NO" sz="1600" dirty="0">
+                <a:latin typeface="Courier New" pitchFamily="49" charset="0"/>
+                <a:cs typeface="Courier New" pitchFamily="49" charset="0"/>
+              </a:rPr>
+              <a:t>int fac(int n) {</a:t>
+            </a:r>
+          </a:p>
+          <a:p>
+            <a:r>
+              <a:rPr lang="nn-NO" sz="1600" dirty="0">
+                <a:latin typeface="Courier New" pitchFamily="49" charset="0"/>
+                <a:cs typeface="Courier New" pitchFamily="49" charset="0"/>
+              </a:rPr>
+              <a:t>    int val {1};</a:t>
+            </a:r>
+          </a:p>
+          <a:p>
+            <a:r>
+              <a:rPr lang="nn-NO" sz="1600" dirty="0">
+                <a:latin typeface="Courier New" pitchFamily="49" charset="0"/>
+                <a:cs typeface="Courier New" pitchFamily="49" charset="0"/>
+              </a:rPr>
+              <a:t>    for (int i = 2; i &lt;= n; i</a:t>
+            </a:r>
+            <a:r>
+              <a:rPr lang="nn-NO" sz="1600" dirty="0" smtClean="0">
+                <a:latin typeface="Courier New" pitchFamily="49" charset="0"/>
+                <a:cs typeface="Courier New" pitchFamily="49" charset="0"/>
+              </a:rPr>
+              <a:t>++) {</a:t>
+            </a:r>
+            <a:endParaRPr lang="nn-NO" sz="1600" dirty="0">
+              <a:latin typeface="Courier New" pitchFamily="49" charset="0"/>
+              <a:cs typeface="Courier New" pitchFamily="49" charset="0"/>
+            </a:endParaRPr>
+          </a:p>
+          <a:p>
+            <a:r>
+              <a:rPr lang="nn-NO" sz="1600" dirty="0">
+                <a:latin typeface="Courier New" pitchFamily="49" charset="0"/>
+                <a:cs typeface="Courier New" pitchFamily="49" charset="0"/>
+              </a:rPr>
+              <a:t>        val *= i;</a:t>
+            </a:r>
+          </a:p>
+          <a:p>
+            <a:r>
+              <a:rPr lang="nn-NO" sz="1600" dirty="0">
+                <a:latin typeface="Courier New" pitchFamily="49" charset="0"/>
+                <a:cs typeface="Courier New" pitchFamily="49" charset="0"/>
+              </a:rPr>
+              <a:t>    </a:t>
+            </a:r>
+            <a:r>
+              <a:rPr lang="nn-NO" sz="1600" dirty="0" smtClean="0">
+                <a:latin typeface="Courier New" pitchFamily="49" charset="0"/>
+                <a:cs typeface="Courier New" pitchFamily="49" charset="0"/>
+              </a:rPr>
+              <a:t>}</a:t>
+            </a:r>
+          </a:p>
+          <a:p>
+            <a:r>
+              <a:rPr lang="nn-NO" sz="1600" dirty="0">
+                <a:latin typeface="Courier New" pitchFamily="49" charset="0"/>
+                <a:cs typeface="Courier New" pitchFamily="49" charset="0"/>
+              </a:rPr>
+              <a:t> </a:t>
+            </a:r>
+            <a:r>
+              <a:rPr lang="nn-NO" sz="1600" dirty="0" smtClean="0">
+                <a:latin typeface="Courier New" pitchFamily="49" charset="0"/>
+                <a:cs typeface="Courier New" pitchFamily="49" charset="0"/>
+              </a:rPr>
+              <a:t>   return </a:t>
+            </a:r>
+            <a:r>
+              <a:rPr lang="nn-NO" sz="1600" dirty="0">
+                <a:latin typeface="Courier New" pitchFamily="49" charset="0"/>
+                <a:cs typeface="Courier New" pitchFamily="49" charset="0"/>
+              </a:rPr>
+              <a:t>val;</a:t>
+            </a:r>
+          </a:p>
+          <a:p>
+            <a:r>
+              <a:rPr lang="nn-NO" sz="1600" dirty="0">
+                <a:latin typeface="Courier New" pitchFamily="49" charset="0"/>
+                <a:cs typeface="Courier New" pitchFamily="49" charset="0"/>
+              </a:rPr>
+              <a:t>}</a:t>
+            </a:r>
+          </a:p>
+        </p:txBody>
+      </p:sp>
+      <p:grpSp>
+        <p:nvGrpSpPr>
+          <p:cNvPr id="6" name="Group 5"/>
+          <p:cNvGrpSpPr/>
+          <p:nvPr/>
+        </p:nvGrpSpPr>
+        <p:grpSpPr>
+          <a:xfrm>
+            <a:off x="2948614" y="1743506"/>
+            <a:ext cx="2093380" cy="1237757"/>
+            <a:chOff x="5513" y="3899534"/>
+            <a:chExt cx="2093380" cy="1237757"/>
+          </a:xfrm>
+        </p:grpSpPr>
+        <p:sp>
+          <p:nvSpPr>
+            <p:cNvPr id="7" name="TextBox 6"/>
+            <p:cNvSpPr txBox="1"/>
+            <p:nvPr/>
+          </p:nvSpPr>
+          <p:spPr>
+            <a:xfrm>
+              <a:off x="5513" y="3899534"/>
+              <a:ext cx="2093380" cy="400110"/>
+            </a:xfrm>
+            <a:prstGeom prst="rect">
+              <a:avLst/>
+            </a:prstGeom>
+            <a:solidFill>
+              <a:schemeClr val="bg1"/>
+            </a:solidFill>
+            <a:ln w="19050">
+              <a:solidFill>
+                <a:srgbClr val="C00000"/>
+              </a:solidFill>
+            </a:ln>
+          </p:spPr>
+          <p:txBody>
+            <a:bodyPr wrap="square" rtlCol="0">
+              <a:spAutoFit/>
+            </a:bodyPr>
+            <a:lstStyle/>
+            <a:p>
+              <a:r>
+                <a:rPr lang="en-US" sz="2000" dirty="0" smtClean="0">
+                  <a:solidFill>
+                    <a:srgbClr val="C00000"/>
+                  </a:solidFill>
+                </a:rPr>
+                <a:t>Boolean condition</a:t>
+              </a:r>
+              <a:endParaRPr lang="en-US" sz="2000" dirty="0">
+                <a:solidFill>
+                  <a:srgbClr val="C00000"/>
+                </a:solidFill>
+                <a:latin typeface="Courier New" panose="02070309020205020404" pitchFamily="49" charset="0"/>
+                <a:cs typeface="Courier New" panose="02070309020205020404" pitchFamily="49" charset="0"/>
+              </a:endParaRPr>
+            </a:p>
+          </p:txBody>
+        </p:sp>
+        <p:sp>
+          <p:nvSpPr>
+            <p:cNvPr id="8" name="Rectangle 7"/>
+            <p:cNvSpPr/>
+            <p:nvPr/>
+          </p:nvSpPr>
+          <p:spPr>
+            <a:xfrm>
+              <a:off x="296846" y="4856447"/>
+              <a:ext cx="768807" cy="280844"/>
+            </a:xfrm>
+            <a:prstGeom prst="rect">
+              <a:avLst/>
+            </a:prstGeom>
+            <a:noFill/>
+            <a:ln w="19050">
+              <a:solidFill>
+                <a:srgbClr val="C00000"/>
+              </a:solidFill>
+            </a:ln>
+          </p:spPr>
+          <p:style>
+            <a:lnRef idx="2">
+              <a:schemeClr val="accent1">
+                <a:shade val="50000"/>
+              </a:schemeClr>
+            </a:lnRef>
+            <a:fillRef idx="1">
+              <a:schemeClr val="accent1"/>
+            </a:fillRef>
+            <a:effectRef idx="0">
+              <a:schemeClr val="accent1"/>
+            </a:effectRef>
+            <a:fontRef idx="minor">
+              <a:schemeClr val="lt1"/>
+            </a:fontRef>
+          </p:style>
+          <p:txBody>
+            <a:bodyPr rtlCol="0" anchor="ctr"/>
+            <a:lstStyle/>
+            <a:p>
+              <a:pPr algn="ctr"/>
+              <a:endParaRPr lang="en-US"/>
+            </a:p>
+          </p:txBody>
+        </p:sp>
+        <p:cxnSp>
+          <p:nvCxnSpPr>
+            <p:cNvPr id="9" name="Straight Arrow Connector 8"/>
+            <p:cNvCxnSpPr>
+              <a:stCxn id="7" idx="2"/>
+              <a:endCxn id="8" idx="0"/>
+            </p:cNvCxnSpPr>
+            <p:nvPr/>
+          </p:nvCxnSpPr>
+          <p:spPr>
+            <a:xfrm flipH="1">
+              <a:off x="681250" y="4299644"/>
+              <a:ext cx="370953" cy="556803"/>
+            </a:xfrm>
+            <a:prstGeom prst="straightConnector1">
+              <a:avLst/>
+            </a:prstGeom>
+            <a:ln w="19050">
+              <a:solidFill>
+                <a:srgbClr val="C00000"/>
+              </a:solidFill>
+              <a:tailEnd type="stealth" w="lg" len="lg"/>
+            </a:ln>
+          </p:spPr>
+          <p:style>
+            <a:lnRef idx="1">
+              <a:schemeClr val="accent1"/>
+            </a:lnRef>
+            <a:fillRef idx="0">
+              <a:schemeClr val="accent1"/>
+            </a:fillRef>
+            <a:effectRef idx="0">
+              <a:schemeClr val="accent1"/>
+            </a:effectRef>
+            <a:fontRef idx="minor">
+              <a:schemeClr val="tx1"/>
+            </a:fontRef>
+          </p:style>
+        </p:cxnSp>
+      </p:grpSp>
+      <p:grpSp>
+        <p:nvGrpSpPr>
+          <p:cNvPr id="10" name="Group 9"/>
+          <p:cNvGrpSpPr/>
+          <p:nvPr/>
+        </p:nvGrpSpPr>
+        <p:grpSpPr>
+          <a:xfrm>
+            <a:off x="1294250" y="1743506"/>
+            <a:ext cx="1724253" cy="1237757"/>
+            <a:chOff x="-281209" y="3899534"/>
+            <a:chExt cx="1724253" cy="1237757"/>
+          </a:xfrm>
+        </p:grpSpPr>
+        <p:sp>
+          <p:nvSpPr>
+            <p:cNvPr id="11" name="TextBox 10"/>
+            <p:cNvSpPr txBox="1"/>
+            <p:nvPr/>
+          </p:nvSpPr>
+          <p:spPr>
+            <a:xfrm>
+              <a:off x="-281209" y="3899534"/>
+              <a:ext cx="1488279" cy="400110"/>
+            </a:xfrm>
+            <a:prstGeom prst="rect">
+              <a:avLst/>
+            </a:prstGeom>
+            <a:solidFill>
+              <a:schemeClr val="bg1"/>
+            </a:solidFill>
+            <a:ln w="19050">
+              <a:solidFill>
+                <a:srgbClr val="C00000"/>
+              </a:solidFill>
+            </a:ln>
+          </p:spPr>
+          <p:txBody>
+            <a:bodyPr wrap="square" rtlCol="0">
+              <a:spAutoFit/>
+            </a:bodyPr>
+            <a:lstStyle/>
+            <a:p>
+              <a:r>
+                <a:rPr lang="en-US" sz="2000" dirty="0" smtClean="0">
+                  <a:solidFill>
+                    <a:srgbClr val="C00000"/>
+                  </a:solidFill>
+                </a:rPr>
+                <a:t>initialization</a:t>
+              </a:r>
+              <a:endParaRPr lang="en-US" sz="2000" dirty="0">
+                <a:solidFill>
+                  <a:srgbClr val="C00000"/>
+                </a:solidFill>
+                <a:latin typeface="Courier New" panose="02070309020205020404" pitchFamily="49" charset="0"/>
+                <a:cs typeface="Courier New" panose="02070309020205020404" pitchFamily="49" charset="0"/>
+              </a:endParaRPr>
+            </a:p>
+          </p:txBody>
+        </p:sp>
+        <p:sp>
+          <p:nvSpPr>
+            <p:cNvPr id="12" name="Rectangle 11"/>
+            <p:cNvSpPr/>
+            <p:nvPr/>
+          </p:nvSpPr>
+          <p:spPr>
+            <a:xfrm>
+              <a:off x="296846" y="4856447"/>
+              <a:ext cx="1146198" cy="280844"/>
+            </a:xfrm>
+            <a:prstGeom prst="rect">
+              <a:avLst/>
+            </a:prstGeom>
+            <a:noFill/>
+            <a:ln w="19050">
+              <a:solidFill>
+                <a:srgbClr val="C00000"/>
+              </a:solidFill>
+            </a:ln>
+          </p:spPr>
+          <p:style>
+            <a:lnRef idx="2">
+              <a:schemeClr val="accent1">
+                <a:shade val="50000"/>
+              </a:schemeClr>
+            </a:lnRef>
+            <a:fillRef idx="1">
+              <a:schemeClr val="accent1"/>
+            </a:fillRef>
+            <a:effectRef idx="0">
+              <a:schemeClr val="accent1"/>
+            </a:effectRef>
+            <a:fontRef idx="minor">
+              <a:schemeClr val="lt1"/>
+            </a:fontRef>
+          </p:style>
+          <p:txBody>
+            <a:bodyPr rtlCol="0" anchor="ctr"/>
+            <a:lstStyle/>
+            <a:p>
+              <a:pPr algn="ctr"/>
+              <a:endParaRPr lang="en-US"/>
+            </a:p>
+          </p:txBody>
+        </p:sp>
+        <p:cxnSp>
+          <p:nvCxnSpPr>
+            <p:cNvPr id="13" name="Straight Arrow Connector 12"/>
+            <p:cNvCxnSpPr>
+              <a:stCxn id="11" idx="2"/>
+              <a:endCxn id="12" idx="0"/>
+            </p:cNvCxnSpPr>
+            <p:nvPr/>
+          </p:nvCxnSpPr>
+          <p:spPr>
+            <a:xfrm>
+              <a:off x="462931" y="4299644"/>
+              <a:ext cx="407014" cy="556803"/>
+            </a:xfrm>
+            <a:prstGeom prst="straightConnector1">
+              <a:avLst/>
+            </a:prstGeom>
+            <a:ln w="19050">
+              <a:solidFill>
+                <a:srgbClr val="C00000"/>
+              </a:solidFill>
+              <a:tailEnd type="stealth" w="lg" len="lg"/>
+            </a:ln>
+          </p:spPr>
+          <p:style>
+            <a:lnRef idx="1">
+              <a:schemeClr val="accent1"/>
+            </a:lnRef>
+            <a:fillRef idx="0">
+              <a:schemeClr val="accent1"/>
+            </a:fillRef>
+            <a:effectRef idx="0">
+              <a:schemeClr val="accent1"/>
+            </a:effectRef>
+            <a:fontRef idx="minor">
+              <a:schemeClr val="tx1"/>
+            </a:fontRef>
+          </p:style>
+        </p:cxnSp>
+      </p:grpSp>
+      <p:grpSp>
+        <p:nvGrpSpPr>
+          <p:cNvPr id="19" name="Group 18"/>
+          <p:cNvGrpSpPr/>
+          <p:nvPr/>
+        </p:nvGrpSpPr>
+        <p:grpSpPr>
+          <a:xfrm>
+            <a:off x="4189031" y="1743506"/>
+            <a:ext cx="2605059" cy="1251665"/>
+            <a:chOff x="618714" y="3885626"/>
+            <a:chExt cx="2605059" cy="1251665"/>
+          </a:xfrm>
+        </p:grpSpPr>
+        <p:sp>
+          <p:nvSpPr>
+            <p:cNvPr id="20" name="TextBox 19"/>
+            <p:cNvSpPr txBox="1"/>
+            <p:nvPr/>
+          </p:nvSpPr>
+          <p:spPr>
+            <a:xfrm>
+              <a:off x="1637762" y="3885626"/>
+              <a:ext cx="1586011" cy="400110"/>
+            </a:xfrm>
+            <a:prstGeom prst="rect">
+              <a:avLst/>
+            </a:prstGeom>
+            <a:solidFill>
+              <a:schemeClr val="bg1"/>
+            </a:solidFill>
+            <a:ln w="19050">
+              <a:solidFill>
+                <a:srgbClr val="C00000"/>
+              </a:solidFill>
+            </a:ln>
+          </p:spPr>
+          <p:txBody>
+            <a:bodyPr wrap="square" rtlCol="0">
+              <a:spAutoFit/>
+            </a:bodyPr>
+            <a:lstStyle/>
+            <a:p>
+              <a:r>
+                <a:rPr lang="en-US" sz="2000" dirty="0" smtClean="0">
+                  <a:solidFill>
+                    <a:srgbClr val="C00000"/>
+                  </a:solidFill>
+                </a:rPr>
+                <a:t>index change</a:t>
+              </a:r>
+              <a:endParaRPr lang="en-US" sz="2000" dirty="0">
+                <a:solidFill>
+                  <a:srgbClr val="C00000"/>
+                </a:solidFill>
+                <a:latin typeface="Courier New" panose="02070309020205020404" pitchFamily="49" charset="0"/>
+                <a:cs typeface="Courier New" panose="02070309020205020404" pitchFamily="49" charset="0"/>
+              </a:endParaRPr>
+            </a:p>
+          </p:txBody>
+        </p:sp>
+        <p:sp>
+          <p:nvSpPr>
+            <p:cNvPr id="21" name="Rectangle 20"/>
+            <p:cNvSpPr/>
+            <p:nvPr/>
+          </p:nvSpPr>
+          <p:spPr>
+            <a:xfrm>
+              <a:off x="618714" y="4856447"/>
+              <a:ext cx="446939" cy="280844"/>
+            </a:xfrm>
+            <a:prstGeom prst="rect">
+              <a:avLst/>
+            </a:prstGeom>
+            <a:noFill/>
+            <a:ln w="19050">
+              <a:solidFill>
+                <a:srgbClr val="C00000"/>
+              </a:solidFill>
+            </a:ln>
+          </p:spPr>
+          <p:style>
+            <a:lnRef idx="2">
+              <a:schemeClr val="accent1">
+                <a:shade val="50000"/>
+              </a:schemeClr>
+            </a:lnRef>
+            <a:fillRef idx="1">
+              <a:schemeClr val="accent1"/>
+            </a:fillRef>
+            <a:effectRef idx="0">
+              <a:schemeClr val="accent1"/>
+            </a:effectRef>
+            <a:fontRef idx="minor">
+              <a:schemeClr val="lt1"/>
+            </a:fontRef>
+          </p:style>
+          <p:txBody>
+            <a:bodyPr rtlCol="0" anchor="ctr"/>
+            <a:lstStyle/>
+            <a:p>
+              <a:pPr algn="ctr"/>
+              <a:endParaRPr lang="en-US"/>
+            </a:p>
+          </p:txBody>
+        </p:sp>
+        <p:cxnSp>
+          <p:nvCxnSpPr>
+            <p:cNvPr id="22" name="Straight Arrow Connector 21"/>
+            <p:cNvCxnSpPr>
+              <a:stCxn id="20" idx="2"/>
+              <a:endCxn id="21" idx="0"/>
+            </p:cNvCxnSpPr>
+            <p:nvPr/>
+          </p:nvCxnSpPr>
+          <p:spPr>
+            <a:xfrm flipH="1">
+              <a:off x="842184" y="4285736"/>
+              <a:ext cx="1588584" cy="570711"/>
+            </a:xfrm>
+            <a:prstGeom prst="straightConnector1">
+              <a:avLst/>
+            </a:prstGeom>
+            <a:ln w="19050">
+              <a:solidFill>
+                <a:srgbClr val="C00000"/>
+              </a:solidFill>
+              <a:tailEnd type="stealth" w="lg" len="lg"/>
+            </a:ln>
+          </p:spPr>
+          <p:style>
+            <a:lnRef idx="1">
+              <a:schemeClr val="accent1"/>
+            </a:lnRef>
+            <a:fillRef idx="0">
+              <a:schemeClr val="accent1"/>
+            </a:fillRef>
+            <a:effectRef idx="0">
+              <a:schemeClr val="accent1"/>
+            </a:effectRef>
+            <a:fontRef idx="minor">
+              <a:schemeClr val="tx1"/>
+            </a:fontRef>
+          </p:style>
+        </p:cxnSp>
+      </p:grpSp>
+      <p:grpSp>
+        <p:nvGrpSpPr>
+          <p:cNvPr id="26" name="Group 25"/>
+          <p:cNvGrpSpPr/>
+          <p:nvPr/>
+        </p:nvGrpSpPr>
+        <p:grpSpPr>
+          <a:xfrm>
+            <a:off x="3110432" y="2981263"/>
+            <a:ext cx="4234263" cy="907237"/>
+            <a:chOff x="5468585" y="4012192"/>
+            <a:chExt cx="4234263" cy="907237"/>
+          </a:xfrm>
+        </p:grpSpPr>
+        <p:sp>
+          <p:nvSpPr>
+            <p:cNvPr id="27" name="Right Brace 26"/>
+            <p:cNvSpPr/>
+            <p:nvPr/>
+          </p:nvSpPr>
+          <p:spPr>
+            <a:xfrm>
+              <a:off x="5468585" y="4012192"/>
+              <a:ext cx="45719" cy="230272"/>
+            </a:xfrm>
+            <a:prstGeom prst="rightBrace">
+              <a:avLst/>
+            </a:prstGeom>
+            <a:ln w="28575">
+              <a:solidFill>
+                <a:srgbClr val="C00000"/>
+              </a:solidFill>
+            </a:ln>
+          </p:spPr>
+          <p:style>
+            <a:lnRef idx="1">
+              <a:schemeClr val="accent1"/>
+            </a:lnRef>
+            <a:fillRef idx="0">
+              <a:schemeClr val="accent1"/>
+            </a:fillRef>
+            <a:effectRef idx="0">
+              <a:schemeClr val="accent1"/>
+            </a:effectRef>
+            <a:fontRef idx="minor">
+              <a:schemeClr val="tx1"/>
+            </a:fontRef>
+          </p:style>
+          <p:txBody>
+            <a:bodyPr rtlCol="0" anchor="ctr"/>
+            <a:lstStyle/>
+            <a:p>
+              <a:pPr algn="ctr"/>
+              <a:endParaRPr lang="en-US"/>
+            </a:p>
+          </p:txBody>
+        </p:sp>
+        <p:grpSp>
+          <p:nvGrpSpPr>
+            <p:cNvPr id="28" name="Group 27"/>
+            <p:cNvGrpSpPr/>
+            <p:nvPr/>
+          </p:nvGrpSpPr>
+          <p:grpSpPr>
+            <a:xfrm>
+              <a:off x="5657092" y="4145369"/>
+              <a:ext cx="4045756" cy="774060"/>
+              <a:chOff x="-1168245" y="2396824"/>
+              <a:chExt cx="4045756" cy="774060"/>
+            </a:xfrm>
+          </p:grpSpPr>
+          <p:sp>
+            <p:nvSpPr>
+              <p:cNvPr id="29" name="TextBox 28"/>
+              <p:cNvSpPr txBox="1"/>
+              <p:nvPr/>
+            </p:nvSpPr>
+            <p:spPr>
+              <a:xfrm>
+                <a:off x="278235" y="2462998"/>
+                <a:ext cx="2599276" cy="707886"/>
+              </a:xfrm>
+              <a:prstGeom prst="rect">
+                <a:avLst/>
+              </a:prstGeom>
+              <a:solidFill>
+                <a:schemeClr val="bg1"/>
+              </a:solidFill>
+              <a:ln w="19050">
+                <a:solidFill>
+                  <a:srgbClr val="C00000"/>
+                </a:solidFill>
+              </a:ln>
+            </p:spPr>
+            <p:txBody>
+              <a:bodyPr wrap="square" rtlCol="0">
+                <a:spAutoFit/>
+              </a:bodyPr>
+              <a:lstStyle/>
+              <a:p>
+                <a:r>
+                  <a:rPr lang="en-US" sz="2000" dirty="0" smtClean="0">
+                    <a:solidFill>
+                      <a:srgbClr val="C00000"/>
+                    </a:solidFill>
+                  </a:rPr>
+                  <a:t>repeat while Boolean condition </a:t>
+                </a:r>
+                <a:r>
+                  <a:rPr lang="en-US" sz="2000" dirty="0" smtClean="0">
+                    <a:solidFill>
+                      <a:srgbClr val="C00000"/>
+                    </a:solidFill>
+                    <a:latin typeface="Courier New" panose="02070309020205020404" pitchFamily="49" charset="0"/>
+                    <a:cs typeface="Courier New" panose="02070309020205020404" pitchFamily="49" charset="0"/>
+                  </a:rPr>
+                  <a:t>true</a:t>
+                </a:r>
+                <a:endParaRPr lang="en-US" sz="2000" dirty="0">
+                  <a:solidFill>
+                    <a:srgbClr val="C00000"/>
+                  </a:solidFill>
+                  <a:latin typeface="Courier New" panose="02070309020205020404" pitchFamily="49" charset="0"/>
+                  <a:cs typeface="Courier New" panose="02070309020205020404" pitchFamily="49" charset="0"/>
+                </a:endParaRPr>
+              </a:p>
+            </p:txBody>
+          </p:sp>
+          <p:cxnSp>
+            <p:nvCxnSpPr>
+              <p:cNvPr id="30" name="Straight Arrow Connector 29"/>
+              <p:cNvCxnSpPr>
+                <a:stCxn id="29" idx="1"/>
+              </p:cNvCxnSpPr>
+              <p:nvPr/>
+            </p:nvCxnSpPr>
+            <p:spPr>
+              <a:xfrm flipH="1" flipV="1">
+                <a:off x="-1168245" y="2396824"/>
+                <a:ext cx="1446480" cy="420117"/>
+              </a:xfrm>
+              <a:prstGeom prst="straightConnector1">
+                <a:avLst/>
+              </a:prstGeom>
+              <a:ln w="19050">
+                <a:solidFill>
+                  <a:srgbClr val="C00000"/>
+                </a:solidFill>
+                <a:tailEnd type="stealth" w="lg" len="lg"/>
+              </a:ln>
+            </p:spPr>
+            <p:style>
+              <a:lnRef idx="1">
+                <a:schemeClr val="accent1"/>
+              </a:lnRef>
+              <a:fillRef idx="0">
+                <a:schemeClr val="accent1"/>
+              </a:fillRef>
+              <a:effectRef idx="0">
+                <a:schemeClr val="accent1"/>
+              </a:effectRef>
+              <a:fontRef idx="minor">
+                <a:schemeClr val="tx1"/>
+              </a:fontRef>
+            </p:style>
+          </p:cxnSp>
+        </p:grpSp>
+      </p:grpSp>
+      <p:sp>
+        <p:nvSpPr>
+          <p:cNvPr id="32" name="TextBox 31"/>
+          <p:cNvSpPr txBox="1"/>
+          <p:nvPr/>
+        </p:nvSpPr>
+        <p:spPr>
+          <a:xfrm>
+            <a:off x="6642499" y="3995900"/>
+            <a:ext cx="1913883" cy="707886"/>
+          </a:xfrm>
+          <a:prstGeom prst="rect">
+            <a:avLst/>
+          </a:prstGeom>
+          <a:noFill/>
+          <a:ln>
+            <a:solidFill>
+              <a:schemeClr val="tx1"/>
+            </a:solidFill>
+          </a:ln>
+        </p:spPr>
+        <p:txBody>
+          <a:bodyPr wrap="square" rtlCol="0">
+            <a:spAutoFit/>
+          </a:bodyPr>
+          <a:lstStyle/>
+          <a:p>
+            <a:r>
+              <a:rPr lang="en-US" sz="2000" dirty="0" smtClean="0"/>
+              <a:t>Shortcut:</a:t>
+            </a:r>
+          </a:p>
+          <a:p>
+            <a:r>
+              <a:rPr lang="en-US" sz="2000" dirty="0" err="1" smtClean="0">
+                <a:latin typeface="Courier New" panose="02070309020205020404" pitchFamily="49" charset="0"/>
+                <a:cs typeface="Courier New" panose="02070309020205020404" pitchFamily="49" charset="0"/>
+              </a:rPr>
+              <a:t>i</a:t>
+            </a:r>
+            <a:r>
+              <a:rPr lang="en-US" sz="2000" dirty="0" smtClean="0">
+                <a:latin typeface="Courier New" panose="02070309020205020404" pitchFamily="49" charset="0"/>
+                <a:cs typeface="Courier New" panose="02070309020205020404" pitchFamily="49" charset="0"/>
+              </a:rPr>
+              <a:t>++</a:t>
+            </a:r>
+            <a:r>
+              <a:rPr lang="en-US" sz="2000" dirty="0" smtClean="0">
+                <a:cs typeface="Courier New" panose="02070309020205020404" pitchFamily="49" charset="0"/>
+              </a:rPr>
+              <a:t> </a:t>
+            </a:r>
+            <a:r>
+              <a:rPr lang="en-US" sz="2000" dirty="0" smtClean="0">
+                <a:sym typeface="Symbol" panose="05050102010706020507" pitchFamily="18" charset="2"/>
+              </a:rPr>
+              <a:t></a:t>
+            </a:r>
+            <a:r>
+              <a:rPr lang="en-US" sz="2000" dirty="0" smtClean="0"/>
+              <a:t> </a:t>
+            </a:r>
+            <a:r>
+              <a:rPr lang="en-US" sz="2000" dirty="0" err="1" smtClean="0">
+                <a:latin typeface="Courier New" panose="02070309020205020404" pitchFamily="49" charset="0"/>
+                <a:cs typeface="Courier New" panose="02070309020205020404" pitchFamily="49" charset="0"/>
+              </a:rPr>
+              <a:t>i</a:t>
+            </a:r>
+            <a:r>
+              <a:rPr lang="en-US" sz="2000" dirty="0" smtClean="0">
+                <a:latin typeface="Courier New" panose="02070309020205020404" pitchFamily="49" charset="0"/>
+                <a:cs typeface="Courier New" panose="02070309020205020404" pitchFamily="49" charset="0"/>
+              </a:rPr>
+              <a:t> += 1</a:t>
+            </a:r>
+            <a:endParaRPr lang="en-US" sz="2000" dirty="0">
+              <a:latin typeface="Courier New" panose="02070309020205020404" pitchFamily="49" charset="0"/>
+              <a:cs typeface="Courier New" panose="02070309020205020404" pitchFamily="49" charset="0"/>
+            </a:endParaRPr>
+          </a:p>
+        </p:txBody>
+      </p:sp>
+      <p:graphicFrame>
+        <p:nvGraphicFramePr>
+          <p:cNvPr id="33" name="Object 32"/>
+          <p:cNvGraphicFramePr>
+            <a:graphicFrameLocks noChangeAspect="1"/>
+          </p:cNvGraphicFramePr>
+          <p:nvPr>
+            <p:extLst>
+              <p:ext uri="{D42A27DB-BD31-4B8C-83A1-F6EECF244321}">
+                <p14:modId xmlns:p14="http://schemas.microsoft.com/office/powerpoint/2010/main" val="4229239195"/>
+              </p:ext>
+            </p:extLst>
+          </p:nvPr>
+        </p:nvGraphicFramePr>
+        <p:xfrm>
+          <a:off x="7288285" y="2046477"/>
+          <a:ext cx="1154736" cy="934786"/>
+        </p:xfrm>
+        <a:graphic>
+          <a:graphicData uri="http://schemas.openxmlformats.org/presentationml/2006/ole">
+            <mc:AlternateContent xmlns:mc="http://schemas.openxmlformats.org/markup-compatibility/2006">
+              <mc:Choice xmlns:v="urn:schemas-microsoft-com:vml" Requires="v">
+                <p:oleObj spid="_x0000_s1029" name="Equation" r:id="rId3" imgW="533160" imgH="431640" progId="Equation.3">
+                  <p:embed/>
+                </p:oleObj>
+              </mc:Choice>
+              <mc:Fallback>
+                <p:oleObj name="Equation" r:id="rId3" imgW="533160" imgH="431640" progId="Equation.3">
+                  <p:embed/>
+                  <p:pic>
+                    <p:nvPicPr>
+                      <p:cNvPr id="0" name=""/>
+                      <p:cNvPicPr/>
+                      <p:nvPr/>
+                    </p:nvPicPr>
+                    <p:blipFill>
+                      <a:blip r:embed="rId4"/>
+                      <a:stretch>
+                        <a:fillRect/>
+                      </a:stretch>
+                    </p:blipFill>
+                    <p:spPr>
+                      <a:xfrm>
+                        <a:off x="7288285" y="2046477"/>
+                        <a:ext cx="1154736" cy="934786"/>
+                      </a:xfrm>
+                      <a:prstGeom prst="rect">
+                        <a:avLst/>
+                      </a:prstGeom>
+                      <a:ln>
+                        <a:solidFill>
+                          <a:schemeClr val="tx1"/>
+                        </a:solidFill>
+                      </a:ln>
+                    </p:spPr>
+                  </p:pic>
+                </p:oleObj>
+              </mc:Fallback>
+            </mc:AlternateContent>
+          </a:graphicData>
+        </a:graphic>
+      </p:graphicFrame>
+    </p:spTree>
+    <p:extLst>
+      <p:ext uri="{BB962C8B-B14F-4D97-AF65-F5344CB8AC3E}">
+        <p14:creationId xmlns:p14="http://schemas.microsoft.com/office/powerpoint/2010/main" val="362532364"/>
+      </p:ext>
+    </p:extLst>
+  </p:cSld>
+  <p:clrMapOvr>
+    <a:masterClrMapping/>
+  </p:clrMapOvr>
+  <p:timing>
+    <p:tnLst>
+      <p:par>
+        <p:cTn id="1" dur="indefinite" restart="never" nodeType="tmRoot">
+          <p:childTnLst>
+            <p:seq concurrent="1" nextAc="seek">
+              <p:cTn id="2" dur="indefinite" nodeType="mainSeq">
+                <p:childTnLst>
+                  <p:par>
+                    <p:cTn id="3" fill="hold">
+                      <p:stCondLst>
+                        <p:cond delay="indefinite"/>
+                      </p:stCondLst>
+                      <p:childTnLst>
+                        <p:par>
+                          <p:cTn id="4" fill="hold">
+                            <p:stCondLst>
+                              <p:cond delay="0"/>
+                            </p:stCondLst>
+                            <p:childTnLst>
+                              <p:par>
+                                <p:cTn id="5" presetID="1" presetClass="entr" presetSubtype="0" fill="hold" nodeType="clickEffect">
+                                  <p:stCondLst>
+                                    <p:cond delay="0"/>
+                                  </p:stCondLst>
+                                  <p:childTnLst>
+                                    <p:set>
+                                      <p:cBhvr>
+                                        <p:cTn id="6" dur="1" fill="hold">
+                                          <p:stCondLst>
+                                            <p:cond delay="0"/>
+                                          </p:stCondLst>
+                                        </p:cTn>
+                                        <p:tgtEl>
+                                          <p:spTgt spid="6"/>
+                                        </p:tgtEl>
+                                        <p:attrNameLst>
+                                          <p:attrName>style.visibility</p:attrName>
+                                        </p:attrNameLst>
+                                      </p:cBhvr>
+                                      <p:to>
+                                        <p:strVal val="visible"/>
+                                      </p:to>
+                                    </p:set>
+                                  </p:childTnLst>
+                                </p:cTn>
+                              </p:par>
+                            </p:childTnLst>
+                          </p:cTn>
+                        </p:par>
+                      </p:childTnLst>
+                    </p:cTn>
+                  </p:par>
+                  <p:par>
+                    <p:cTn id="7" fill="hold">
+                      <p:stCondLst>
+                        <p:cond delay="indefinite"/>
+                      </p:stCondLst>
+                      <p:childTnLst>
+                        <p:par>
+                          <p:cTn id="8" fill="hold">
+                            <p:stCondLst>
+                              <p:cond delay="0"/>
+                            </p:stCondLst>
+                            <p:childTnLst>
+                              <p:par>
+                                <p:cTn id="9" presetID="1" presetClass="entr" presetSubtype="0" fill="hold" nodeType="clickEffect">
+                                  <p:stCondLst>
+                                    <p:cond delay="0"/>
+                                  </p:stCondLst>
+                                  <p:childTnLst>
+                                    <p:set>
+                                      <p:cBhvr>
+                                        <p:cTn id="10" dur="1" fill="hold">
+                                          <p:stCondLst>
+                                            <p:cond delay="0"/>
+                                          </p:stCondLst>
+                                        </p:cTn>
+                                        <p:tgtEl>
+                                          <p:spTgt spid="10"/>
+                                        </p:tgtEl>
+                                        <p:attrNameLst>
+                                          <p:attrName>style.visibility</p:attrName>
+                                        </p:attrNameLst>
+                                      </p:cBhvr>
+                                      <p:to>
+                                        <p:strVal val="visible"/>
+                                      </p:to>
+                                    </p:set>
+                                  </p:childTnLst>
+                                </p:cTn>
+                              </p:par>
+                            </p:childTnLst>
+                          </p:cTn>
+                        </p:par>
+                      </p:childTnLst>
+                    </p:cTn>
+                  </p:par>
+                  <p:par>
+                    <p:cTn id="11" fill="hold">
+                      <p:stCondLst>
+                        <p:cond delay="indefinite"/>
+                      </p:stCondLst>
+                      <p:childTnLst>
+                        <p:par>
+                          <p:cTn id="12" fill="hold">
+                            <p:stCondLst>
+                              <p:cond delay="0"/>
+                            </p:stCondLst>
+                            <p:childTnLst>
+                              <p:par>
+                                <p:cTn id="13" presetID="1" presetClass="entr" presetSubtype="0" fill="hold" nodeType="clickEffect">
+                                  <p:stCondLst>
+                                    <p:cond delay="0"/>
+                                  </p:stCondLst>
+                                  <p:childTnLst>
+                                    <p:set>
+                                      <p:cBhvr>
+                                        <p:cTn id="14" dur="1" fill="hold">
+                                          <p:stCondLst>
+                                            <p:cond delay="0"/>
+                                          </p:stCondLst>
+                                        </p:cTn>
+                                        <p:tgtEl>
+                                          <p:spTgt spid="19"/>
+                                        </p:tgtEl>
+                                        <p:attrNameLst>
+                                          <p:attrName>style.visibility</p:attrName>
+                                        </p:attrNameLst>
+                                      </p:cBhvr>
+                                      <p:to>
+                                        <p:strVal val="visible"/>
+                                      </p:to>
+                                    </p:set>
+                                  </p:childTnLst>
+                                </p:cTn>
+                              </p:par>
+                            </p:childTnLst>
+                          </p:cTn>
+                        </p:par>
+                      </p:childTnLst>
+                    </p:cTn>
+                  </p:par>
+                  <p:par>
+                    <p:cTn id="15" fill="hold">
+                      <p:stCondLst>
+                        <p:cond delay="indefinite"/>
+                      </p:stCondLst>
+                      <p:childTnLst>
+                        <p:par>
+                          <p:cTn id="16" fill="hold">
+                            <p:stCondLst>
+                              <p:cond delay="0"/>
+                            </p:stCondLst>
+                            <p:childTnLst>
+                              <p:par>
+                                <p:cTn id="17" presetID="1" presetClass="entr" presetSubtype="0" fill="hold" nodeType="clickEffect">
+                                  <p:stCondLst>
+                                    <p:cond delay="0"/>
+                                  </p:stCondLst>
+                                  <p:childTnLst>
+                                    <p:set>
+                                      <p:cBhvr>
+                                        <p:cTn id="18" dur="1" fill="hold">
+                                          <p:stCondLst>
+                                            <p:cond delay="0"/>
+                                          </p:stCondLst>
+                                        </p:cTn>
+                                        <p:tgtEl>
+                                          <p:spTgt spid="26"/>
+                                        </p:tgtEl>
+                                        <p:attrNameLst>
+                                          <p:attrName>style.visibility</p:attrName>
+                                        </p:attrNameLst>
+                                      </p:cBhvr>
+                                      <p:to>
+                                        <p:strVal val="visible"/>
+                                      </p:to>
+                                    </p:set>
+                                  </p:childTnLst>
+                                </p:cTn>
+                              </p:par>
+                            </p:childTnLst>
+                          </p:cTn>
+                        </p:par>
+                      </p:childTnLst>
+                    </p:cTn>
+                  </p:par>
+                </p:childTnLst>
+              </p:cTn>
+              <p:prevCondLst>
+                <p:cond evt="onPrev" delay="0">
+                  <p:tgtEl>
+                    <p:sldTgt/>
+                  </p:tgtEl>
+                </p:cond>
+              </p:prevCondLst>
+              <p:nextCondLst>
+                <p:cond evt="onNext" delay="0">
+                  <p:tgtEl>
+                    <p:sldTgt/>
+                  </p:tgtEl>
+                </p:cond>
+              </p:nextCondLst>
+            </p:seq>
+          </p:childTnLst>
+        </p:cTn>
+      </p:par>
+    </p:tnLst>
+  </p:timing>
+</p:sld>
+</file>
+
+<file path=ppt/slides/slide24.xml><?xml version="1.0" encoding="utf-8"?>
+<p:sld xmlns:a="http://schemas.openxmlformats.org/drawingml/2006/main" xmlns:r="http://schemas.openxmlformats.org/officeDocument/2006/relationships" xmlns:p="http://schemas.openxmlformats.org/presentationml/2006/main">
+  <p:cSld>
+    <p:spTree>
+      <p:nvGrpSpPr>
+        <p:cNvPr id="1" name=""/>
+        <p:cNvGrpSpPr/>
+        <p:nvPr/>
+      </p:nvGrpSpPr>
+      <p:grpSpPr>
+        <a:xfrm>
+          <a:off x="0" y="0"/>
+          <a:ext cx="0" cy="0"/>
+          <a:chOff x="0" y="0"/>
+          <a:chExt cx="0" cy="0"/>
+        </a:xfrm>
+      </p:grpSpPr>
+      <p:sp>
+        <p:nvSpPr>
+          <p:cNvPr id="2" name="Title 1"/>
+          <p:cNvSpPr>
+            <a:spLocks noGrp="1"/>
+          </p:cNvSpPr>
+          <p:nvPr>
+            <p:ph type="title"/>
+          </p:nvPr>
+        </p:nvSpPr>
+        <p:spPr/>
+        <p:txBody>
+          <a:bodyPr/>
+          <a:lstStyle/>
+          <a:p>
+            <a:r>
+              <a:rPr lang="en-US" dirty="0" smtClean="0"/>
+              <a:t>Break statement</a:t>
+            </a:r>
+            <a:endParaRPr lang="en-US" dirty="0"/>
+          </a:p>
+        </p:txBody>
+      </p:sp>
+      <p:sp>
+        <p:nvSpPr>
+          <p:cNvPr id="3" name="Content Placeholder 2"/>
+          <p:cNvSpPr>
+            <a:spLocks noGrp="1"/>
+          </p:cNvSpPr>
+          <p:nvPr>
+            <p:ph idx="1"/>
+          </p:nvPr>
+        </p:nvSpPr>
+        <p:spPr/>
+        <p:txBody>
+          <a:bodyPr/>
+          <a:lstStyle/>
+          <a:p>
+            <a:r>
+              <a:rPr lang="en-US" dirty="0" smtClean="0"/>
+              <a:t>Interrupt repetition statement</a:t>
+            </a:r>
+            <a:endParaRPr lang="en-US" dirty="0"/>
+          </a:p>
+        </p:txBody>
+      </p:sp>
+      <p:sp>
+        <p:nvSpPr>
+          <p:cNvPr id="4" name="Slide Number Placeholder 3"/>
+          <p:cNvSpPr>
+            <a:spLocks noGrp="1"/>
+          </p:cNvSpPr>
+          <p:nvPr>
+            <p:ph type="sldNum" sz="quarter" idx="12"/>
+          </p:nvPr>
+        </p:nvSpPr>
+        <p:spPr/>
+        <p:txBody>
+          <a:bodyPr/>
+          <a:lstStyle/>
+          <a:p>
+            <a:fld id="{033373DF-BCDA-4600-B448-AFBDB22F4A39}" type="slidenum">
+              <a:rPr lang="en-US" smtClean="0"/>
+              <a:t>24</a:t>
+            </a:fld>
+            <a:endParaRPr lang="en-US"/>
+          </a:p>
+        </p:txBody>
+      </p:sp>
+      <p:sp>
+        <p:nvSpPr>
+          <p:cNvPr id="5" name="TextBox 4"/>
+          <p:cNvSpPr txBox="1"/>
+          <p:nvPr/>
+        </p:nvSpPr>
+        <p:spPr>
+          <a:xfrm>
+            <a:off x="701778" y="2658551"/>
+            <a:ext cx="5345062" cy="1815882"/>
+          </a:xfrm>
+          <a:prstGeom prst="rect">
+            <a:avLst/>
+          </a:prstGeom>
+          <a:solidFill>
+            <a:schemeClr val="bg1">
+              <a:lumMod val="75000"/>
+            </a:schemeClr>
+          </a:solidFill>
+        </p:spPr>
+        <p:txBody>
+          <a:bodyPr wrap="square" rtlCol="0">
+            <a:spAutoFit/>
+          </a:bodyPr>
+          <a:lstStyle/>
+          <a:p>
+            <a:r>
+              <a:rPr lang="en-US" sz="1600" dirty="0" err="1" smtClean="0">
+                <a:latin typeface="Courier New" pitchFamily="49" charset="0"/>
+                <a:cs typeface="Courier New" pitchFamily="49" charset="0"/>
+              </a:rPr>
+              <a:t>cout</a:t>
+            </a:r>
+            <a:r>
+              <a:rPr lang="en-US" sz="1600" dirty="0" smtClean="0">
+                <a:latin typeface="Courier New" pitchFamily="49" charset="0"/>
+                <a:cs typeface="Courier New" pitchFamily="49" charset="0"/>
+              </a:rPr>
+              <a:t> </a:t>
+            </a:r>
+            <a:r>
+              <a:rPr lang="en-US" sz="1600" dirty="0">
+                <a:latin typeface="Courier New" pitchFamily="49" charset="0"/>
+                <a:cs typeface="Courier New" pitchFamily="49" charset="0"/>
+              </a:rPr>
+              <a:t>&lt;&lt; </a:t>
+            </a:r>
+            <a:r>
+              <a:rPr lang="en-US" sz="1600" dirty="0" smtClean="0">
+                <a:latin typeface="Courier New" pitchFamily="49" charset="0"/>
+                <a:cs typeface="Courier New" pitchFamily="49" charset="0"/>
+              </a:rPr>
+              <a:t>"Name?" &lt;&lt; </a:t>
+            </a:r>
+            <a:r>
+              <a:rPr lang="en-US" sz="1600" dirty="0" err="1">
+                <a:latin typeface="Courier New" pitchFamily="49" charset="0"/>
+                <a:cs typeface="Courier New" pitchFamily="49" charset="0"/>
+              </a:rPr>
+              <a:t>endl</a:t>
+            </a:r>
+            <a:r>
+              <a:rPr lang="en-US" sz="1600" dirty="0">
+                <a:latin typeface="Courier New" pitchFamily="49" charset="0"/>
+                <a:cs typeface="Courier New" pitchFamily="49" charset="0"/>
+              </a:rPr>
+              <a:t>;</a:t>
+            </a:r>
+          </a:p>
+          <a:p>
+            <a:r>
+              <a:rPr lang="en-US" sz="1600" dirty="0" smtClean="0">
+                <a:latin typeface="Courier New" pitchFamily="49" charset="0"/>
+                <a:cs typeface="Courier New" pitchFamily="49" charset="0"/>
+              </a:rPr>
+              <a:t>while </a:t>
+            </a:r>
+            <a:r>
+              <a:rPr lang="en-US" sz="1600" dirty="0">
+                <a:latin typeface="Courier New" pitchFamily="49" charset="0"/>
+                <a:cs typeface="Courier New" pitchFamily="49" charset="0"/>
+              </a:rPr>
+              <a:t>(</a:t>
+            </a:r>
+            <a:r>
+              <a:rPr lang="en-US" sz="1600" dirty="0" err="1">
+                <a:latin typeface="Courier New" pitchFamily="49" charset="0"/>
+                <a:cs typeface="Courier New" pitchFamily="49" charset="0"/>
+              </a:rPr>
+              <a:t>cin</a:t>
+            </a:r>
+            <a:r>
+              <a:rPr lang="en-US" sz="1600" dirty="0">
+                <a:latin typeface="Courier New" pitchFamily="49" charset="0"/>
+                <a:cs typeface="Courier New" pitchFamily="49" charset="0"/>
+              </a:rPr>
+              <a:t> &gt;&gt; name) {</a:t>
+            </a:r>
+          </a:p>
+          <a:p>
+            <a:r>
+              <a:rPr lang="en-US" sz="1600" dirty="0" smtClean="0">
+                <a:latin typeface="Courier New" pitchFamily="49" charset="0"/>
+                <a:cs typeface="Courier New" pitchFamily="49" charset="0"/>
+              </a:rPr>
+              <a:t>    </a:t>
+            </a:r>
+            <a:r>
+              <a:rPr lang="en-US" sz="1600" dirty="0">
+                <a:latin typeface="Courier New" pitchFamily="49" charset="0"/>
+                <a:cs typeface="Courier New" pitchFamily="49" charset="0"/>
+              </a:rPr>
+              <a:t>if (name == "quit")</a:t>
+            </a:r>
+          </a:p>
+          <a:p>
+            <a:r>
+              <a:rPr lang="en-US" sz="1600" dirty="0" smtClean="0">
+                <a:latin typeface="Courier New" pitchFamily="49" charset="0"/>
+                <a:cs typeface="Courier New" pitchFamily="49" charset="0"/>
+              </a:rPr>
+              <a:t>        </a:t>
+            </a:r>
+            <a:r>
+              <a:rPr lang="en-US" sz="1600" dirty="0">
+                <a:latin typeface="Courier New" pitchFamily="49" charset="0"/>
+                <a:cs typeface="Courier New" pitchFamily="49" charset="0"/>
+              </a:rPr>
+              <a:t>break;</a:t>
+            </a:r>
+          </a:p>
+          <a:p>
+            <a:r>
+              <a:rPr lang="en-US" sz="1600" dirty="0" smtClean="0">
+                <a:latin typeface="Courier New" pitchFamily="49" charset="0"/>
+                <a:cs typeface="Courier New" pitchFamily="49" charset="0"/>
+              </a:rPr>
+              <a:t>    </a:t>
+            </a:r>
+            <a:r>
+              <a:rPr lang="en-US" sz="1600" dirty="0" err="1">
+                <a:latin typeface="Courier New" pitchFamily="49" charset="0"/>
+                <a:cs typeface="Courier New" pitchFamily="49" charset="0"/>
+              </a:rPr>
+              <a:t>cout</a:t>
+            </a:r>
+            <a:r>
+              <a:rPr lang="en-US" sz="1600" dirty="0">
+                <a:latin typeface="Courier New" pitchFamily="49" charset="0"/>
+                <a:cs typeface="Courier New" pitchFamily="49" charset="0"/>
+              </a:rPr>
+              <a:t> &lt;&lt; </a:t>
+            </a:r>
+            <a:r>
+              <a:rPr lang="en-US" sz="1600" dirty="0" smtClean="0">
+                <a:latin typeface="Courier New" pitchFamily="49" charset="0"/>
+                <a:cs typeface="Courier New" pitchFamily="49" charset="0"/>
+              </a:rPr>
+              <a:t>"Hi " &lt;&lt; </a:t>
+            </a:r>
+            <a:r>
+              <a:rPr lang="en-US" sz="1600" dirty="0">
+                <a:latin typeface="Courier New" pitchFamily="49" charset="0"/>
+                <a:cs typeface="Courier New" pitchFamily="49" charset="0"/>
+              </a:rPr>
+              <a:t>name &lt;&lt; "!" &lt;&lt; </a:t>
+            </a:r>
+            <a:r>
+              <a:rPr lang="en-US" sz="1600" dirty="0" err="1">
+                <a:latin typeface="Courier New" pitchFamily="49" charset="0"/>
+                <a:cs typeface="Courier New" pitchFamily="49" charset="0"/>
+              </a:rPr>
+              <a:t>endl</a:t>
+            </a:r>
+            <a:r>
+              <a:rPr lang="en-US" sz="1600" dirty="0">
+                <a:latin typeface="Courier New" pitchFamily="49" charset="0"/>
+                <a:cs typeface="Courier New" pitchFamily="49" charset="0"/>
+              </a:rPr>
+              <a:t>;</a:t>
+            </a:r>
+          </a:p>
+          <a:p>
+            <a:r>
+              <a:rPr lang="en-US" sz="1600" dirty="0" smtClean="0">
+                <a:latin typeface="Courier New" pitchFamily="49" charset="0"/>
+                <a:cs typeface="Courier New" pitchFamily="49" charset="0"/>
+              </a:rPr>
+              <a:t>}</a:t>
+            </a:r>
+            <a:endParaRPr lang="en-US" sz="1600" dirty="0">
+              <a:latin typeface="Courier New" pitchFamily="49" charset="0"/>
+              <a:cs typeface="Courier New" pitchFamily="49" charset="0"/>
+            </a:endParaRPr>
+          </a:p>
+          <a:p>
+            <a:r>
+              <a:rPr lang="en-US" sz="1600" dirty="0" err="1" smtClean="0">
+                <a:latin typeface="Courier New" pitchFamily="49" charset="0"/>
+                <a:cs typeface="Courier New" pitchFamily="49" charset="0"/>
+              </a:rPr>
+              <a:t>cout</a:t>
+            </a:r>
+            <a:r>
+              <a:rPr lang="en-US" sz="1600" dirty="0" smtClean="0">
+                <a:latin typeface="Courier New" pitchFamily="49" charset="0"/>
+                <a:cs typeface="Courier New" pitchFamily="49" charset="0"/>
+              </a:rPr>
+              <a:t> </a:t>
+            </a:r>
+            <a:r>
+              <a:rPr lang="en-US" sz="1600" dirty="0">
+                <a:latin typeface="Courier New" pitchFamily="49" charset="0"/>
+                <a:cs typeface="Courier New" pitchFamily="49" charset="0"/>
+              </a:rPr>
+              <a:t>&lt;&lt; </a:t>
+            </a:r>
+            <a:r>
+              <a:rPr lang="en-US" sz="1600" dirty="0" smtClean="0">
+                <a:latin typeface="Courier New" pitchFamily="49" charset="0"/>
+                <a:cs typeface="Courier New" pitchFamily="49" charset="0"/>
+              </a:rPr>
+              <a:t>"Bye" </a:t>
+            </a:r>
+            <a:r>
+              <a:rPr lang="en-US" sz="1600" dirty="0">
+                <a:latin typeface="Courier New" pitchFamily="49" charset="0"/>
+                <a:cs typeface="Courier New" pitchFamily="49" charset="0"/>
+              </a:rPr>
+              <a:t>&lt;&lt; </a:t>
+            </a:r>
+            <a:r>
+              <a:rPr lang="en-US" sz="1600" dirty="0" err="1">
+                <a:latin typeface="Courier New" pitchFamily="49" charset="0"/>
+                <a:cs typeface="Courier New" pitchFamily="49" charset="0"/>
+              </a:rPr>
+              <a:t>endl</a:t>
+            </a:r>
+            <a:r>
+              <a:rPr lang="en-US" sz="1600" dirty="0">
+                <a:latin typeface="Courier New" pitchFamily="49" charset="0"/>
+                <a:cs typeface="Courier New" pitchFamily="49" charset="0"/>
+              </a:rPr>
+              <a:t>;</a:t>
+            </a:r>
+            <a:endParaRPr lang="nn-NO" sz="1600" dirty="0">
+              <a:latin typeface="Courier New" pitchFamily="49" charset="0"/>
+              <a:cs typeface="Courier New" pitchFamily="49" charset="0"/>
+            </a:endParaRPr>
+          </a:p>
+        </p:txBody>
+      </p:sp>
+    </p:spTree>
+    <p:extLst>
+      <p:ext uri="{BB962C8B-B14F-4D97-AF65-F5344CB8AC3E}">
+        <p14:creationId xmlns:p14="http://schemas.microsoft.com/office/powerpoint/2010/main" val="975808360"/>
+      </p:ext>
+    </p:extLst>
+  </p:cSld>
+  <p:clrMapOvr>
+    <a:masterClrMapping/>
+  </p:clrMapOvr>
+  <p:timing>
+    <p:tnLst>
+      <p:par>
+        <p:cTn id="1" dur="indefinite" restart="never" nodeType="tmRoot"/>
+      </p:par>
+    </p:tnLst>
   </p:timing>
 </p:sld>
 </file>

</xml_diff>

<commit_message>
Added slide on scope
</commit_message>
<xml_diff>
--- a/CPlusPlus/essential_cpp.pptx
+++ b/CPlusPlus/essential_cpp.pptx
@@ -5,7 +5,7 @@
     <p:sldMasterId id="2147483660" r:id="rId1"/>
   </p:sldMasterIdLst>
   <p:notesMasterIdLst>
-    <p:notesMasterId r:id="rId26"/>
+    <p:notesMasterId r:id="rId27"/>
   </p:notesMasterIdLst>
   <p:sldIdLst>
     <p:sldId id="256" r:id="rId2"/>
@@ -32,6 +32,7 @@
     <p:sldId id="276" r:id="rId23"/>
     <p:sldId id="278" r:id="rId24"/>
     <p:sldId id="279" r:id="rId25"/>
+    <p:sldId id="280" r:id="rId26"/>
   </p:sldIdLst>
   <p:sldSz cx="9144000" cy="6858000" type="screen4x3"/>
   <p:notesSz cx="6858000" cy="9144000"/>
@@ -7635,7 +7636,25 @@
             <a:pPr lvl="1"/>
             <a:r>
               <a:rPr lang="en-US" dirty="0" smtClean="0"/>
-              <a:t>7 significant digits, smallest non-zero: 10</a:t>
+              <a:t>7 significant digits, smallest </a:t>
+            </a:r>
+            <a:r>
+              <a:rPr lang="en-US" dirty="0" smtClean="0"/>
+              <a:t>non-zero </a:t>
+            </a:r>
+            <a:r>
+              <a:rPr lang="en-US" dirty="0">
+                <a:sym typeface="Symbol" panose="05050102010706020507" pitchFamily="18" charset="2"/>
+              </a:rPr>
+              <a:t></a:t>
+            </a:r>
+            <a:r>
+              <a:rPr lang="en-US" dirty="0" smtClean="0"/>
+              <a:t> </a:t>
+            </a:r>
+            <a:r>
+              <a:rPr lang="en-US" dirty="0" smtClean="0"/>
+              <a:t>10</a:t>
             </a:r>
             <a:r>
               <a:rPr lang="en-US" baseline="30000" dirty="0" smtClean="0"/>
@@ -7704,7 +7723,21 @@
             </a:r>
             <a:r>
               <a:rPr lang="en-US" dirty="0"/>
-              <a:t> , smallest non-zero: </a:t>
+              <a:t> , smallest </a:t>
+            </a:r>
+            <a:r>
+              <a:rPr lang="en-US" dirty="0" smtClean="0"/>
+              <a:t>non-zero </a:t>
+            </a:r>
+            <a:r>
+              <a:rPr lang="en-US" dirty="0">
+                <a:sym typeface="Symbol" panose="05050102010706020507" pitchFamily="18" charset="2"/>
+              </a:rPr>
+              <a:t></a:t>
+            </a:r>
+            <a:r>
+              <a:rPr lang="en-US" dirty="0" smtClean="0"/>
+              <a:t> </a:t>
             </a:r>
             <a:r>
               <a:rPr lang="en-US" dirty="0" smtClean="0"/>
@@ -7721,10 +7754,6 @@
             <a:r>
               <a:rPr lang="en-US" dirty="0" smtClean="0"/>
               <a:t>range </a:t>
-            </a:r>
-            <a:r>
-              <a:rPr lang="en-US" dirty="0"/>
-              <a:t> </a:t>
             </a:r>
             <a:r>
               <a:rPr lang="en-US" dirty="0">
@@ -9792,8 +9821,11 @@
               <a:rPr lang="en-US" dirty="0" smtClean="0">
                 <a:cs typeface="Courier New" panose="02070309020205020404" pitchFamily="49" charset="0"/>
               </a:rPr>
-              <a:t>name</a:t>
-            </a:r>
+              <a:t>name (same rules as for variables)</a:t>
+            </a:r>
+            <a:endParaRPr lang="en-US" dirty="0" smtClean="0">
+              <a:cs typeface="Courier New" panose="02070309020205020404" pitchFamily="49" charset="0"/>
+            </a:endParaRPr>
           </a:p>
           <a:p>
             <a:pPr lvl="1"/>
@@ -15255,6 +15287,51 @@
                       </p:childTnLst>
                     </p:cTn>
                   </p:par>
+                  <p:par>
+                    <p:cTn id="23" fill="hold">
+                      <p:stCondLst>
+                        <p:cond delay="indefinite"/>
+                      </p:stCondLst>
+                      <p:childTnLst>
+                        <p:par>
+                          <p:cTn id="24" fill="hold">
+                            <p:stCondLst>
+                              <p:cond delay="0"/>
+                            </p:stCondLst>
+                            <p:childTnLst>
+                              <p:par>
+                                <p:cTn id="25" presetID="1" presetClass="entr" presetSubtype="0" fill="hold" grpId="0" nodeType="clickEffect">
+                                  <p:stCondLst>
+                                    <p:cond delay="0"/>
+                                  </p:stCondLst>
+                                  <p:childTnLst>
+                                    <p:set>
+                                      <p:cBhvr>
+                                        <p:cTn id="26" dur="1" fill="hold">
+                                          <p:stCondLst>
+                                            <p:cond delay="0"/>
+                                          </p:stCondLst>
+                                        </p:cTn>
+                                        <p:tgtEl>
+                                          <p:spTgt spid="21"/>
+                                        </p:tgtEl>
+                                        <p:attrNameLst>
+                                          <p:attrName>style.visibility</p:attrName>
+                                        </p:attrNameLst>
+                                      </p:cBhvr>
+                                      <p:to>
+                                        <p:strVal val="visible"/>
+                                      </p:to>
+                                    </p:set>
+                                  </p:childTnLst>
+                                </p:cTn>
+                              </p:par>
+                            </p:childTnLst>
+                          </p:cTn>
+                        </p:par>
+                      </p:childTnLst>
+                    </p:cTn>
+                  </p:par>
                 </p:childTnLst>
               </p:cTn>
               <p:prevCondLst>
@@ -15279,6 +15356,7 @@
     <p:bldLst>
       <p:bldP spid="5" grpId="0" uiExpand="1" build="p"/>
       <p:bldP spid="20" grpId="0" animBg="1"/>
+      <p:bldP spid="21" grpId="0" animBg="1"/>
     </p:bldLst>
   </p:timing>
 </p:sld>
@@ -15593,7 +15671,7 @@
         </p:nvGrpSpPr>
         <p:grpSpPr>
           <a:xfrm>
-            <a:off x="2401618" y="4532801"/>
+            <a:off x="2372122" y="4532801"/>
             <a:ext cx="2862187" cy="1008658"/>
             <a:chOff x="241550" y="3314758"/>
             <a:chExt cx="2862187" cy="1008658"/>
@@ -18113,9 +18191,9 @@
         <p:grpSpPr>
           <a:xfrm>
             <a:off x="3110432" y="2981263"/>
-            <a:ext cx="4234263" cy="907237"/>
+            <a:ext cx="3575505" cy="1249145"/>
             <a:chOff x="5468585" y="4012192"/>
-            <a:chExt cx="4234263" cy="907237"/>
+            <a:chExt cx="3575505" cy="1249145"/>
           </a:xfrm>
         </p:grpSpPr>
         <p:sp>
@@ -18169,10 +18247,10 @@
           </p:nvGrpSpPr>
           <p:grpSpPr>
             <a:xfrm>
-              <a:off x="5657092" y="4145369"/>
-              <a:ext cx="4045756" cy="774060"/>
-              <a:chOff x="-1168245" y="2396824"/>
-              <a:chExt cx="4045756" cy="774060"/>
+              <a:off x="5671624" y="4131458"/>
+              <a:ext cx="3372466" cy="1129879"/>
+              <a:chOff x="-1153713" y="2382913"/>
+              <a:chExt cx="3372466" cy="1129879"/>
             </a:xfrm>
           </p:grpSpPr>
           <p:sp>
@@ -18183,7 +18261,7 @@
             </p:nvSpPr>
             <p:spPr>
               <a:xfrm>
-                <a:off x="278235" y="2462998"/>
+                <a:off x="-380523" y="2804906"/>
                 <a:ext cx="2599276" cy="707886"/>
               </a:xfrm>
               <a:prstGeom prst="rect">
@@ -18242,8 +18320,8 @@
             </p:nvCxnSpPr>
             <p:spPr>
               <a:xfrm flipH="1" flipV="1">
-                <a:off x="-1168245" y="2396824"/>
-                <a:ext cx="1446480" cy="420117"/>
+                <a:off x="-1153713" y="2382913"/>
+                <a:ext cx="773190" cy="775936"/>
               </a:xfrm>
               <a:prstGeom prst="straightConnector1">
                 <a:avLst/>
@@ -18280,7 +18358,7 @@
         </p:nvSpPr>
         <p:spPr>
           <a:xfrm>
-            <a:off x="6642499" y="3995900"/>
+            <a:off x="6892876" y="4012315"/>
             <a:ext cx="1913883" cy="707886"/>
           </a:xfrm>
           <a:prstGeom prst="rect">
@@ -18365,20 +18443,20 @@
           <p:nvPr>
             <p:extLst>
               <p:ext uri="{D42A27DB-BD31-4B8C-83A1-F6EECF244321}">
-                <p14:modId xmlns:p14="http://schemas.microsoft.com/office/powerpoint/2010/main" val="4229239195"/>
+                <p14:modId xmlns:p14="http://schemas.microsoft.com/office/powerpoint/2010/main" val="2467759412"/>
               </p:ext>
             </p:extLst>
           </p:nvPr>
         </p:nvGraphicFramePr>
         <p:xfrm>
-          <a:off x="7288285" y="2046477"/>
+          <a:off x="7288285" y="1545033"/>
           <a:ext cx="1154736" cy="934786"/>
         </p:xfrm>
         <a:graphic>
           <a:graphicData uri="http://schemas.openxmlformats.org/presentationml/2006/ole">
             <mc:AlternateContent xmlns:mc="http://schemas.openxmlformats.org/markup-compatibility/2006">
               <mc:Choice xmlns:v="urn:schemas-microsoft-com:vml" Requires="v">
-                <p:oleObj spid="_x0000_s1029" name="Equation" r:id="rId3" imgW="533160" imgH="431640" progId="Equation.3">
+                <p:oleObj spid="_x0000_s1037" name="Equation" r:id="rId3" imgW="533160" imgH="431640" progId="Equation.3">
                   <p:embed/>
                 </p:oleObj>
               </mc:Choice>
@@ -18399,7 +18477,7 @@
                     </p:blipFill>
                     <p:spPr>
                       <a:xfrm>
-                        <a:off x="7288285" y="2046477"/>
+                        <a:off x="7288285" y="1545033"/>
                         <a:ext cx="1154736" cy="934786"/>
                       </a:xfrm>
                       <a:prstGeom prst="rect">
@@ -18418,10 +18496,970 @@
           </a:graphicData>
         </a:graphic>
       </p:graphicFrame>
+      <p:sp>
+        <p:nvSpPr>
+          <p:cNvPr id="34" name="TextBox 33"/>
+          <p:cNvSpPr txBox="1"/>
+          <p:nvPr/>
+        </p:nvSpPr>
+        <p:spPr>
+          <a:xfrm flipH="1">
+            <a:off x="5283097" y="2615955"/>
+            <a:ext cx="2243470" cy="707886"/>
+          </a:xfrm>
+          <a:prstGeom prst="rect">
+            <a:avLst/>
+          </a:prstGeom>
+          <a:solidFill>
+            <a:schemeClr val="bg1"/>
+          </a:solidFill>
+          <a:ln>
+            <a:solidFill>
+              <a:schemeClr val="tx1"/>
+            </a:solidFill>
+          </a:ln>
+        </p:spPr>
+        <p:txBody>
+          <a:bodyPr wrap="square" rtlCol="0">
+            <a:spAutoFit/>
+          </a:bodyPr>
+          <a:lstStyle/>
+          <a:p>
+            <a:r>
+              <a:rPr lang="en-US" sz="2000" dirty="0" smtClean="0"/>
+              <a:t>Body executed zero or more times</a:t>
+            </a:r>
+            <a:endParaRPr lang="en-US" sz="2000" dirty="0"/>
+          </a:p>
+        </p:txBody>
+      </p:sp>
     </p:spTree>
     <p:extLst>
       <p:ext uri="{BB962C8B-B14F-4D97-AF65-F5344CB8AC3E}">
         <p14:creationId xmlns:p14="http://schemas.microsoft.com/office/powerpoint/2010/main" val="362532364"/>
+      </p:ext>
+    </p:extLst>
+  </p:cSld>
+  <p:clrMapOvr>
+    <a:masterClrMapping/>
+  </p:clrMapOvr>
+  <p:timing>
+    <p:tnLst>
+      <p:par>
+        <p:cTn id="1" dur="indefinite" restart="never" nodeType="tmRoot">
+          <p:childTnLst>
+            <p:seq concurrent="1" nextAc="seek">
+              <p:cTn id="2" dur="indefinite" nodeType="mainSeq">
+                <p:childTnLst>
+                  <p:par>
+                    <p:cTn id="3" fill="hold">
+                      <p:stCondLst>
+                        <p:cond delay="indefinite"/>
+                      </p:stCondLst>
+                      <p:childTnLst>
+                        <p:par>
+                          <p:cTn id="4" fill="hold">
+                            <p:stCondLst>
+                              <p:cond delay="0"/>
+                            </p:stCondLst>
+                            <p:childTnLst>
+                              <p:par>
+                                <p:cTn id="5" presetID="1" presetClass="entr" presetSubtype="0" fill="hold" grpId="0" nodeType="clickEffect">
+                                  <p:stCondLst>
+                                    <p:cond delay="0"/>
+                                  </p:stCondLst>
+                                  <p:childTnLst>
+                                    <p:set>
+                                      <p:cBhvr>
+                                        <p:cTn id="6" dur="1" fill="hold">
+                                          <p:stCondLst>
+                                            <p:cond delay="0"/>
+                                          </p:stCondLst>
+                                        </p:cTn>
+                                        <p:tgtEl>
+                                          <p:spTgt spid="3">
+                                            <p:txEl>
+                                              <p:pRg st="0" end="0"/>
+                                            </p:txEl>
+                                          </p:spTgt>
+                                        </p:tgtEl>
+                                        <p:attrNameLst>
+                                          <p:attrName>style.visibility</p:attrName>
+                                        </p:attrNameLst>
+                                      </p:cBhvr>
+                                      <p:to>
+                                        <p:strVal val="visible"/>
+                                      </p:to>
+                                    </p:set>
+                                  </p:childTnLst>
+                                </p:cTn>
+                              </p:par>
+                            </p:childTnLst>
+                          </p:cTn>
+                        </p:par>
+                      </p:childTnLst>
+                    </p:cTn>
+                  </p:par>
+                  <p:par>
+                    <p:cTn id="7" fill="hold">
+                      <p:stCondLst>
+                        <p:cond delay="indefinite"/>
+                      </p:stCondLst>
+                      <p:childTnLst>
+                        <p:par>
+                          <p:cTn id="8" fill="hold">
+                            <p:stCondLst>
+                              <p:cond delay="0"/>
+                            </p:stCondLst>
+                            <p:childTnLst>
+                              <p:par>
+                                <p:cTn id="9" presetID="1" presetClass="entr" presetSubtype="0" fill="hold" grpId="0" nodeType="clickEffect">
+                                  <p:stCondLst>
+                                    <p:cond delay="0"/>
+                                  </p:stCondLst>
+                                  <p:childTnLst>
+                                    <p:set>
+                                      <p:cBhvr>
+                                        <p:cTn id="10" dur="1" fill="hold">
+                                          <p:stCondLst>
+                                            <p:cond delay="0"/>
+                                          </p:stCondLst>
+                                        </p:cTn>
+                                        <p:tgtEl>
+                                          <p:spTgt spid="3">
+                                            <p:txEl>
+                                              <p:pRg st="1" end="1"/>
+                                            </p:txEl>
+                                          </p:spTgt>
+                                        </p:tgtEl>
+                                        <p:attrNameLst>
+                                          <p:attrName>style.visibility</p:attrName>
+                                        </p:attrNameLst>
+                                      </p:cBhvr>
+                                      <p:to>
+                                        <p:strVal val="visible"/>
+                                      </p:to>
+                                    </p:set>
+                                  </p:childTnLst>
+                                </p:cTn>
+                              </p:par>
+                              <p:par>
+                                <p:cTn id="11" presetID="1" presetClass="entr" presetSubtype="0" fill="hold" nodeType="withEffect">
+                                  <p:stCondLst>
+                                    <p:cond delay="0"/>
+                                  </p:stCondLst>
+                                  <p:childTnLst>
+                                    <p:set>
+                                      <p:cBhvr>
+                                        <p:cTn id="12" dur="1" fill="hold">
+                                          <p:stCondLst>
+                                            <p:cond delay="0"/>
+                                          </p:stCondLst>
+                                        </p:cTn>
+                                        <p:tgtEl>
+                                          <p:spTgt spid="10"/>
+                                        </p:tgtEl>
+                                        <p:attrNameLst>
+                                          <p:attrName>style.visibility</p:attrName>
+                                        </p:attrNameLst>
+                                      </p:cBhvr>
+                                      <p:to>
+                                        <p:strVal val="visible"/>
+                                      </p:to>
+                                    </p:set>
+                                  </p:childTnLst>
+                                </p:cTn>
+                              </p:par>
+                            </p:childTnLst>
+                          </p:cTn>
+                        </p:par>
+                      </p:childTnLst>
+                    </p:cTn>
+                  </p:par>
+                  <p:par>
+                    <p:cTn id="13" fill="hold">
+                      <p:stCondLst>
+                        <p:cond delay="indefinite"/>
+                      </p:stCondLst>
+                      <p:childTnLst>
+                        <p:par>
+                          <p:cTn id="14" fill="hold">
+                            <p:stCondLst>
+                              <p:cond delay="0"/>
+                            </p:stCondLst>
+                            <p:childTnLst>
+                              <p:par>
+                                <p:cTn id="15" presetID="1" presetClass="entr" presetSubtype="0" fill="hold" nodeType="clickEffect">
+                                  <p:stCondLst>
+                                    <p:cond delay="0"/>
+                                  </p:stCondLst>
+                                  <p:childTnLst>
+                                    <p:set>
+                                      <p:cBhvr>
+                                        <p:cTn id="16" dur="1" fill="hold">
+                                          <p:stCondLst>
+                                            <p:cond delay="0"/>
+                                          </p:stCondLst>
+                                        </p:cTn>
+                                        <p:tgtEl>
+                                          <p:spTgt spid="6"/>
+                                        </p:tgtEl>
+                                        <p:attrNameLst>
+                                          <p:attrName>style.visibility</p:attrName>
+                                        </p:attrNameLst>
+                                      </p:cBhvr>
+                                      <p:to>
+                                        <p:strVal val="visible"/>
+                                      </p:to>
+                                    </p:set>
+                                  </p:childTnLst>
+                                </p:cTn>
+                              </p:par>
+                            </p:childTnLst>
+                          </p:cTn>
+                        </p:par>
+                      </p:childTnLst>
+                    </p:cTn>
+                  </p:par>
+                  <p:par>
+                    <p:cTn id="17" fill="hold">
+                      <p:stCondLst>
+                        <p:cond delay="indefinite"/>
+                      </p:stCondLst>
+                      <p:childTnLst>
+                        <p:par>
+                          <p:cTn id="18" fill="hold">
+                            <p:stCondLst>
+                              <p:cond delay="0"/>
+                            </p:stCondLst>
+                            <p:childTnLst>
+                              <p:par>
+                                <p:cTn id="19" presetID="1" presetClass="entr" presetSubtype="0" fill="hold" grpId="0" nodeType="clickEffect">
+                                  <p:stCondLst>
+                                    <p:cond delay="0"/>
+                                  </p:stCondLst>
+                                  <p:childTnLst>
+                                    <p:set>
+                                      <p:cBhvr>
+                                        <p:cTn id="20" dur="1" fill="hold">
+                                          <p:stCondLst>
+                                            <p:cond delay="0"/>
+                                          </p:stCondLst>
+                                        </p:cTn>
+                                        <p:tgtEl>
+                                          <p:spTgt spid="3">
+                                            <p:txEl>
+                                              <p:pRg st="2" end="2"/>
+                                            </p:txEl>
+                                          </p:spTgt>
+                                        </p:tgtEl>
+                                        <p:attrNameLst>
+                                          <p:attrName>style.visibility</p:attrName>
+                                        </p:attrNameLst>
+                                      </p:cBhvr>
+                                      <p:to>
+                                        <p:strVal val="visible"/>
+                                      </p:to>
+                                    </p:set>
+                                  </p:childTnLst>
+                                </p:cTn>
+                              </p:par>
+                              <p:par>
+                                <p:cTn id="21" presetID="1" presetClass="entr" presetSubtype="0" fill="hold" nodeType="withEffect">
+                                  <p:stCondLst>
+                                    <p:cond delay="0"/>
+                                  </p:stCondLst>
+                                  <p:childTnLst>
+                                    <p:set>
+                                      <p:cBhvr>
+                                        <p:cTn id="22" dur="1" fill="hold">
+                                          <p:stCondLst>
+                                            <p:cond delay="0"/>
+                                          </p:stCondLst>
+                                        </p:cTn>
+                                        <p:tgtEl>
+                                          <p:spTgt spid="19"/>
+                                        </p:tgtEl>
+                                        <p:attrNameLst>
+                                          <p:attrName>style.visibility</p:attrName>
+                                        </p:attrNameLst>
+                                      </p:cBhvr>
+                                      <p:to>
+                                        <p:strVal val="visible"/>
+                                      </p:to>
+                                    </p:set>
+                                  </p:childTnLst>
+                                </p:cTn>
+                              </p:par>
+                            </p:childTnLst>
+                          </p:cTn>
+                        </p:par>
+                      </p:childTnLst>
+                    </p:cTn>
+                  </p:par>
+                  <p:par>
+                    <p:cTn id="23" fill="hold">
+                      <p:stCondLst>
+                        <p:cond delay="indefinite"/>
+                      </p:stCondLst>
+                      <p:childTnLst>
+                        <p:par>
+                          <p:cTn id="24" fill="hold">
+                            <p:stCondLst>
+                              <p:cond delay="0"/>
+                            </p:stCondLst>
+                            <p:childTnLst>
+                              <p:par>
+                                <p:cTn id="25" presetID="1" presetClass="entr" presetSubtype="0" fill="hold" grpId="0" nodeType="clickEffect">
+                                  <p:stCondLst>
+                                    <p:cond delay="0"/>
+                                  </p:stCondLst>
+                                  <p:childTnLst>
+                                    <p:set>
+                                      <p:cBhvr>
+                                        <p:cTn id="26" dur="1" fill="hold">
+                                          <p:stCondLst>
+                                            <p:cond delay="0"/>
+                                          </p:stCondLst>
+                                        </p:cTn>
+                                        <p:tgtEl>
+                                          <p:spTgt spid="32"/>
+                                        </p:tgtEl>
+                                        <p:attrNameLst>
+                                          <p:attrName>style.visibility</p:attrName>
+                                        </p:attrNameLst>
+                                      </p:cBhvr>
+                                      <p:to>
+                                        <p:strVal val="visible"/>
+                                      </p:to>
+                                    </p:set>
+                                  </p:childTnLst>
+                                </p:cTn>
+                              </p:par>
+                            </p:childTnLst>
+                          </p:cTn>
+                        </p:par>
+                      </p:childTnLst>
+                    </p:cTn>
+                  </p:par>
+                  <p:par>
+                    <p:cTn id="27" fill="hold">
+                      <p:stCondLst>
+                        <p:cond delay="indefinite"/>
+                      </p:stCondLst>
+                      <p:childTnLst>
+                        <p:par>
+                          <p:cTn id="28" fill="hold">
+                            <p:stCondLst>
+                              <p:cond delay="0"/>
+                            </p:stCondLst>
+                            <p:childTnLst>
+                              <p:par>
+                                <p:cTn id="29" presetID="1" presetClass="entr" presetSubtype="0" fill="hold" nodeType="clickEffect">
+                                  <p:stCondLst>
+                                    <p:cond delay="0"/>
+                                  </p:stCondLst>
+                                  <p:childTnLst>
+                                    <p:set>
+                                      <p:cBhvr>
+                                        <p:cTn id="30" dur="1" fill="hold">
+                                          <p:stCondLst>
+                                            <p:cond delay="0"/>
+                                          </p:stCondLst>
+                                        </p:cTn>
+                                        <p:tgtEl>
+                                          <p:spTgt spid="26"/>
+                                        </p:tgtEl>
+                                        <p:attrNameLst>
+                                          <p:attrName>style.visibility</p:attrName>
+                                        </p:attrNameLst>
+                                      </p:cBhvr>
+                                      <p:to>
+                                        <p:strVal val="visible"/>
+                                      </p:to>
+                                    </p:set>
+                                  </p:childTnLst>
+                                </p:cTn>
+                              </p:par>
+                            </p:childTnLst>
+                          </p:cTn>
+                        </p:par>
+                      </p:childTnLst>
+                    </p:cTn>
+                  </p:par>
+                  <p:par>
+                    <p:cTn id="31" fill="hold">
+                      <p:stCondLst>
+                        <p:cond delay="indefinite"/>
+                      </p:stCondLst>
+                      <p:childTnLst>
+                        <p:par>
+                          <p:cTn id="32" fill="hold">
+                            <p:stCondLst>
+                              <p:cond delay="0"/>
+                            </p:stCondLst>
+                            <p:childTnLst>
+                              <p:par>
+                                <p:cTn id="33" presetID="1" presetClass="entr" presetSubtype="0" fill="hold" grpId="0" nodeType="clickEffect">
+                                  <p:stCondLst>
+                                    <p:cond delay="0"/>
+                                  </p:stCondLst>
+                                  <p:childTnLst>
+                                    <p:set>
+                                      <p:cBhvr>
+                                        <p:cTn id="34" dur="1" fill="hold">
+                                          <p:stCondLst>
+                                            <p:cond delay="0"/>
+                                          </p:stCondLst>
+                                        </p:cTn>
+                                        <p:tgtEl>
+                                          <p:spTgt spid="34"/>
+                                        </p:tgtEl>
+                                        <p:attrNameLst>
+                                          <p:attrName>style.visibility</p:attrName>
+                                        </p:attrNameLst>
+                                      </p:cBhvr>
+                                      <p:to>
+                                        <p:strVal val="visible"/>
+                                      </p:to>
+                                    </p:set>
+                                  </p:childTnLst>
+                                </p:cTn>
+                              </p:par>
+                            </p:childTnLst>
+                          </p:cTn>
+                        </p:par>
+                      </p:childTnLst>
+                    </p:cTn>
+                  </p:par>
+                </p:childTnLst>
+              </p:cTn>
+              <p:prevCondLst>
+                <p:cond evt="onPrev" delay="0">
+                  <p:tgtEl>
+                    <p:sldTgt/>
+                  </p:tgtEl>
+                </p:cond>
+              </p:prevCondLst>
+              <p:nextCondLst>
+                <p:cond evt="onNext" delay="0">
+                  <p:tgtEl>
+                    <p:sldTgt/>
+                  </p:tgtEl>
+                </p:cond>
+              </p:nextCondLst>
+            </p:seq>
+          </p:childTnLst>
+        </p:cTn>
+      </p:par>
+    </p:tnLst>
+    <p:bldLst>
+      <p:bldP spid="3" grpId="0" uiExpand="1" build="p"/>
+      <p:bldP spid="32" grpId="0" animBg="1"/>
+      <p:bldP spid="34" grpId="0" animBg="1"/>
+    </p:bldLst>
+  </p:timing>
+</p:sld>
+</file>
+
+<file path=ppt/slides/slide24.xml><?xml version="1.0" encoding="utf-8"?>
+<p:sld xmlns:a="http://schemas.openxmlformats.org/drawingml/2006/main" xmlns:r="http://schemas.openxmlformats.org/officeDocument/2006/relationships" xmlns:p="http://schemas.openxmlformats.org/presentationml/2006/main">
+  <p:cSld>
+    <p:spTree>
+      <p:nvGrpSpPr>
+        <p:cNvPr id="1" name=""/>
+        <p:cNvGrpSpPr/>
+        <p:nvPr/>
+      </p:nvGrpSpPr>
+      <p:grpSpPr>
+        <a:xfrm>
+          <a:off x="0" y="0"/>
+          <a:ext cx="0" cy="0"/>
+          <a:chOff x="0" y="0"/>
+          <a:chExt cx="0" cy="0"/>
+        </a:xfrm>
+      </p:grpSpPr>
+      <p:sp>
+        <p:nvSpPr>
+          <p:cNvPr id="2" name="Title 1"/>
+          <p:cNvSpPr>
+            <a:spLocks noGrp="1"/>
+          </p:cNvSpPr>
+          <p:nvPr>
+            <p:ph type="title"/>
+          </p:nvPr>
+        </p:nvSpPr>
+        <p:spPr/>
+        <p:txBody>
+          <a:bodyPr/>
+          <a:lstStyle/>
+          <a:p>
+            <a:r>
+              <a:rPr lang="en-US" dirty="0" smtClean="0"/>
+              <a:t>Break statement</a:t>
+            </a:r>
+            <a:endParaRPr lang="en-US" dirty="0"/>
+          </a:p>
+        </p:txBody>
+      </p:sp>
+      <p:sp>
+        <p:nvSpPr>
+          <p:cNvPr id="3" name="Content Placeholder 2"/>
+          <p:cNvSpPr>
+            <a:spLocks noGrp="1"/>
+          </p:cNvSpPr>
+          <p:nvPr>
+            <p:ph idx="1"/>
+          </p:nvPr>
+        </p:nvSpPr>
+        <p:spPr/>
+        <p:txBody>
+          <a:bodyPr/>
+          <a:lstStyle/>
+          <a:p>
+            <a:r>
+              <a:rPr lang="en-US" dirty="0" smtClean="0"/>
+              <a:t>Interrupt repetition statement</a:t>
+            </a:r>
+            <a:endParaRPr lang="en-US" dirty="0"/>
+          </a:p>
+        </p:txBody>
+      </p:sp>
+      <p:sp>
+        <p:nvSpPr>
+          <p:cNvPr id="4" name="Slide Number Placeholder 3"/>
+          <p:cNvSpPr>
+            <a:spLocks noGrp="1"/>
+          </p:cNvSpPr>
+          <p:nvPr>
+            <p:ph type="sldNum" sz="quarter" idx="12"/>
+          </p:nvPr>
+        </p:nvSpPr>
+        <p:spPr/>
+        <p:txBody>
+          <a:bodyPr/>
+          <a:lstStyle/>
+          <a:p>
+            <a:fld id="{033373DF-BCDA-4600-B448-AFBDB22F4A39}" type="slidenum">
+              <a:rPr lang="en-US" smtClean="0"/>
+              <a:t>24</a:t>
+            </a:fld>
+            <a:endParaRPr lang="en-US"/>
+          </a:p>
+        </p:txBody>
+      </p:sp>
+      <p:sp>
+        <p:nvSpPr>
+          <p:cNvPr id="5" name="TextBox 4"/>
+          <p:cNvSpPr txBox="1"/>
+          <p:nvPr/>
+        </p:nvSpPr>
+        <p:spPr>
+          <a:xfrm>
+            <a:off x="701778" y="2658551"/>
+            <a:ext cx="5345062" cy="1815882"/>
+          </a:xfrm>
+          <a:prstGeom prst="rect">
+            <a:avLst/>
+          </a:prstGeom>
+          <a:solidFill>
+            <a:schemeClr val="bg1">
+              <a:lumMod val="75000"/>
+            </a:schemeClr>
+          </a:solidFill>
+        </p:spPr>
+        <p:txBody>
+          <a:bodyPr wrap="square" rtlCol="0">
+            <a:spAutoFit/>
+          </a:bodyPr>
+          <a:lstStyle/>
+          <a:p>
+            <a:r>
+              <a:rPr lang="en-US" sz="1600" dirty="0" err="1" smtClean="0">
+                <a:latin typeface="Courier New" pitchFamily="49" charset="0"/>
+                <a:cs typeface="Courier New" pitchFamily="49" charset="0"/>
+              </a:rPr>
+              <a:t>cout</a:t>
+            </a:r>
+            <a:r>
+              <a:rPr lang="en-US" sz="1600" dirty="0" smtClean="0">
+                <a:latin typeface="Courier New" pitchFamily="49" charset="0"/>
+                <a:cs typeface="Courier New" pitchFamily="49" charset="0"/>
+              </a:rPr>
+              <a:t> </a:t>
+            </a:r>
+            <a:r>
+              <a:rPr lang="en-US" sz="1600" dirty="0">
+                <a:latin typeface="Courier New" pitchFamily="49" charset="0"/>
+                <a:cs typeface="Courier New" pitchFamily="49" charset="0"/>
+              </a:rPr>
+              <a:t>&lt;&lt; </a:t>
+            </a:r>
+            <a:r>
+              <a:rPr lang="en-US" sz="1600" dirty="0" smtClean="0">
+                <a:latin typeface="Courier New" pitchFamily="49" charset="0"/>
+                <a:cs typeface="Courier New" pitchFamily="49" charset="0"/>
+              </a:rPr>
+              <a:t>"Name?" &lt;&lt; </a:t>
+            </a:r>
+            <a:r>
+              <a:rPr lang="en-US" sz="1600" dirty="0" err="1">
+                <a:latin typeface="Courier New" pitchFamily="49" charset="0"/>
+                <a:cs typeface="Courier New" pitchFamily="49" charset="0"/>
+              </a:rPr>
+              <a:t>endl</a:t>
+            </a:r>
+            <a:r>
+              <a:rPr lang="en-US" sz="1600" dirty="0">
+                <a:latin typeface="Courier New" pitchFamily="49" charset="0"/>
+                <a:cs typeface="Courier New" pitchFamily="49" charset="0"/>
+              </a:rPr>
+              <a:t>;</a:t>
+            </a:r>
+          </a:p>
+          <a:p>
+            <a:r>
+              <a:rPr lang="en-US" sz="1600" dirty="0" smtClean="0">
+                <a:latin typeface="Courier New" pitchFamily="49" charset="0"/>
+                <a:cs typeface="Courier New" pitchFamily="49" charset="0"/>
+              </a:rPr>
+              <a:t>while </a:t>
+            </a:r>
+            <a:r>
+              <a:rPr lang="en-US" sz="1600" dirty="0">
+                <a:latin typeface="Courier New" pitchFamily="49" charset="0"/>
+                <a:cs typeface="Courier New" pitchFamily="49" charset="0"/>
+              </a:rPr>
+              <a:t>(</a:t>
+            </a:r>
+            <a:r>
+              <a:rPr lang="en-US" sz="1600" dirty="0" err="1">
+                <a:latin typeface="Courier New" pitchFamily="49" charset="0"/>
+                <a:cs typeface="Courier New" pitchFamily="49" charset="0"/>
+              </a:rPr>
+              <a:t>cin</a:t>
+            </a:r>
+            <a:r>
+              <a:rPr lang="en-US" sz="1600" dirty="0">
+                <a:latin typeface="Courier New" pitchFamily="49" charset="0"/>
+                <a:cs typeface="Courier New" pitchFamily="49" charset="0"/>
+              </a:rPr>
+              <a:t> &gt;&gt; name) {</a:t>
+            </a:r>
+          </a:p>
+          <a:p>
+            <a:r>
+              <a:rPr lang="en-US" sz="1600" dirty="0" smtClean="0">
+                <a:latin typeface="Courier New" pitchFamily="49" charset="0"/>
+                <a:cs typeface="Courier New" pitchFamily="49" charset="0"/>
+              </a:rPr>
+              <a:t>    </a:t>
+            </a:r>
+            <a:r>
+              <a:rPr lang="en-US" sz="1600" dirty="0">
+                <a:latin typeface="Courier New" pitchFamily="49" charset="0"/>
+                <a:cs typeface="Courier New" pitchFamily="49" charset="0"/>
+              </a:rPr>
+              <a:t>if (name == "quit")</a:t>
+            </a:r>
+          </a:p>
+          <a:p>
+            <a:r>
+              <a:rPr lang="en-US" sz="1600" dirty="0" smtClean="0">
+                <a:latin typeface="Courier New" pitchFamily="49" charset="0"/>
+                <a:cs typeface="Courier New" pitchFamily="49" charset="0"/>
+              </a:rPr>
+              <a:t>        </a:t>
+            </a:r>
+            <a:r>
+              <a:rPr lang="en-US" sz="1600" dirty="0">
+                <a:latin typeface="Courier New" pitchFamily="49" charset="0"/>
+                <a:cs typeface="Courier New" pitchFamily="49" charset="0"/>
+              </a:rPr>
+              <a:t>break;</a:t>
+            </a:r>
+          </a:p>
+          <a:p>
+            <a:r>
+              <a:rPr lang="en-US" sz="1600" dirty="0" smtClean="0">
+                <a:latin typeface="Courier New" pitchFamily="49" charset="0"/>
+                <a:cs typeface="Courier New" pitchFamily="49" charset="0"/>
+              </a:rPr>
+              <a:t>    </a:t>
+            </a:r>
+            <a:r>
+              <a:rPr lang="en-US" sz="1600" dirty="0" err="1">
+                <a:latin typeface="Courier New" pitchFamily="49" charset="0"/>
+                <a:cs typeface="Courier New" pitchFamily="49" charset="0"/>
+              </a:rPr>
+              <a:t>cout</a:t>
+            </a:r>
+            <a:r>
+              <a:rPr lang="en-US" sz="1600" dirty="0">
+                <a:latin typeface="Courier New" pitchFamily="49" charset="0"/>
+                <a:cs typeface="Courier New" pitchFamily="49" charset="0"/>
+              </a:rPr>
+              <a:t> &lt;&lt; </a:t>
+            </a:r>
+            <a:r>
+              <a:rPr lang="en-US" sz="1600" dirty="0" smtClean="0">
+                <a:latin typeface="Courier New" pitchFamily="49" charset="0"/>
+                <a:cs typeface="Courier New" pitchFamily="49" charset="0"/>
+              </a:rPr>
+              <a:t>"Hi " &lt;&lt; </a:t>
+            </a:r>
+            <a:r>
+              <a:rPr lang="en-US" sz="1600" dirty="0">
+                <a:latin typeface="Courier New" pitchFamily="49" charset="0"/>
+                <a:cs typeface="Courier New" pitchFamily="49" charset="0"/>
+              </a:rPr>
+              <a:t>name &lt;&lt; "!" &lt;&lt; </a:t>
+            </a:r>
+            <a:r>
+              <a:rPr lang="en-US" sz="1600" dirty="0" err="1">
+                <a:latin typeface="Courier New" pitchFamily="49" charset="0"/>
+                <a:cs typeface="Courier New" pitchFamily="49" charset="0"/>
+              </a:rPr>
+              <a:t>endl</a:t>
+            </a:r>
+            <a:r>
+              <a:rPr lang="en-US" sz="1600" dirty="0">
+                <a:latin typeface="Courier New" pitchFamily="49" charset="0"/>
+                <a:cs typeface="Courier New" pitchFamily="49" charset="0"/>
+              </a:rPr>
+              <a:t>;</a:t>
+            </a:r>
+          </a:p>
+          <a:p>
+            <a:r>
+              <a:rPr lang="en-US" sz="1600" dirty="0" smtClean="0">
+                <a:latin typeface="Courier New" pitchFamily="49" charset="0"/>
+                <a:cs typeface="Courier New" pitchFamily="49" charset="0"/>
+              </a:rPr>
+              <a:t>}</a:t>
+            </a:r>
+            <a:endParaRPr lang="en-US" sz="1600" dirty="0">
+              <a:latin typeface="Courier New" pitchFamily="49" charset="0"/>
+              <a:cs typeface="Courier New" pitchFamily="49" charset="0"/>
+            </a:endParaRPr>
+          </a:p>
+          <a:p>
+            <a:r>
+              <a:rPr lang="en-US" sz="1600" dirty="0" err="1" smtClean="0">
+                <a:latin typeface="Courier New" pitchFamily="49" charset="0"/>
+                <a:cs typeface="Courier New" pitchFamily="49" charset="0"/>
+              </a:rPr>
+              <a:t>cout</a:t>
+            </a:r>
+            <a:r>
+              <a:rPr lang="en-US" sz="1600" dirty="0" smtClean="0">
+                <a:latin typeface="Courier New" pitchFamily="49" charset="0"/>
+                <a:cs typeface="Courier New" pitchFamily="49" charset="0"/>
+              </a:rPr>
+              <a:t> </a:t>
+            </a:r>
+            <a:r>
+              <a:rPr lang="en-US" sz="1600" dirty="0">
+                <a:latin typeface="Courier New" pitchFamily="49" charset="0"/>
+                <a:cs typeface="Courier New" pitchFamily="49" charset="0"/>
+              </a:rPr>
+              <a:t>&lt;&lt; </a:t>
+            </a:r>
+            <a:r>
+              <a:rPr lang="en-US" sz="1600" dirty="0" smtClean="0">
+                <a:latin typeface="Courier New" pitchFamily="49" charset="0"/>
+                <a:cs typeface="Courier New" pitchFamily="49" charset="0"/>
+              </a:rPr>
+              <a:t>"Bye" </a:t>
+            </a:r>
+            <a:r>
+              <a:rPr lang="en-US" sz="1600" dirty="0">
+                <a:latin typeface="Courier New" pitchFamily="49" charset="0"/>
+                <a:cs typeface="Courier New" pitchFamily="49" charset="0"/>
+              </a:rPr>
+              <a:t>&lt;&lt; </a:t>
+            </a:r>
+            <a:r>
+              <a:rPr lang="en-US" sz="1600" dirty="0" err="1">
+                <a:latin typeface="Courier New" pitchFamily="49" charset="0"/>
+                <a:cs typeface="Courier New" pitchFamily="49" charset="0"/>
+              </a:rPr>
+              <a:t>endl</a:t>
+            </a:r>
+            <a:r>
+              <a:rPr lang="en-US" sz="1600" dirty="0">
+                <a:latin typeface="Courier New" pitchFamily="49" charset="0"/>
+                <a:cs typeface="Courier New" pitchFamily="49" charset="0"/>
+              </a:rPr>
+              <a:t>;</a:t>
+            </a:r>
+            <a:endParaRPr lang="nn-NO" sz="1600" dirty="0">
+              <a:latin typeface="Courier New" pitchFamily="49" charset="0"/>
+              <a:cs typeface="Courier New" pitchFamily="49" charset="0"/>
+            </a:endParaRPr>
+          </a:p>
+        </p:txBody>
+      </p:sp>
+      <p:grpSp>
+        <p:nvGrpSpPr>
+          <p:cNvPr id="14" name="Group 13"/>
+          <p:cNvGrpSpPr/>
+          <p:nvPr/>
+        </p:nvGrpSpPr>
+        <p:grpSpPr>
+          <a:xfrm>
+            <a:off x="5555226" y="3556845"/>
+            <a:ext cx="902724" cy="736244"/>
+            <a:chOff x="5555226" y="3556845"/>
+            <a:chExt cx="902724" cy="736244"/>
+          </a:xfrm>
+        </p:grpSpPr>
+        <p:cxnSp>
+          <p:nvCxnSpPr>
+            <p:cNvPr id="7" name="Straight Connector 6"/>
+            <p:cNvCxnSpPr/>
+            <p:nvPr/>
+          </p:nvCxnSpPr>
+          <p:spPr>
+            <a:xfrm>
+              <a:off x="5555226" y="3576325"/>
+              <a:ext cx="902724" cy="0"/>
+            </a:xfrm>
+            <a:prstGeom prst="line">
+              <a:avLst/>
+            </a:prstGeom>
+            <a:ln w="38100">
+              <a:solidFill>
+                <a:srgbClr val="C00000"/>
+              </a:solidFill>
+            </a:ln>
+          </p:spPr>
+          <p:style>
+            <a:lnRef idx="1">
+              <a:schemeClr val="accent1"/>
+            </a:lnRef>
+            <a:fillRef idx="0">
+              <a:schemeClr val="accent1"/>
+            </a:fillRef>
+            <a:effectRef idx="0">
+              <a:schemeClr val="accent1"/>
+            </a:effectRef>
+            <a:fontRef idx="minor">
+              <a:schemeClr val="tx1"/>
+            </a:fontRef>
+          </p:style>
+        </p:cxnSp>
+        <p:cxnSp>
+          <p:nvCxnSpPr>
+            <p:cNvPr id="8" name="Straight Connector 7"/>
+            <p:cNvCxnSpPr/>
+            <p:nvPr/>
+          </p:nvCxnSpPr>
+          <p:spPr>
+            <a:xfrm>
+              <a:off x="6442280" y="3556845"/>
+              <a:ext cx="15670" cy="730020"/>
+            </a:xfrm>
+            <a:prstGeom prst="line">
+              <a:avLst/>
+            </a:prstGeom>
+            <a:ln w="38100">
+              <a:solidFill>
+                <a:srgbClr val="C00000"/>
+              </a:solidFill>
+            </a:ln>
+          </p:spPr>
+          <p:style>
+            <a:lnRef idx="1">
+              <a:schemeClr val="accent1"/>
+            </a:lnRef>
+            <a:fillRef idx="0">
+              <a:schemeClr val="accent1"/>
+            </a:fillRef>
+            <a:effectRef idx="0">
+              <a:schemeClr val="accent1"/>
+            </a:effectRef>
+            <a:fontRef idx="minor">
+              <a:schemeClr val="tx1"/>
+            </a:fontRef>
+          </p:style>
+        </p:cxnSp>
+        <p:cxnSp>
+          <p:nvCxnSpPr>
+            <p:cNvPr id="12" name="Straight Connector 11"/>
+            <p:cNvCxnSpPr/>
+            <p:nvPr/>
+          </p:nvCxnSpPr>
+          <p:spPr>
+            <a:xfrm>
+              <a:off x="5555226" y="3569110"/>
+              <a:ext cx="902724" cy="19664"/>
+            </a:xfrm>
+            <a:prstGeom prst="line">
+              <a:avLst/>
+            </a:prstGeom>
+            <a:ln w="38100">
+              <a:solidFill>
+                <a:srgbClr val="C00000"/>
+              </a:solidFill>
+            </a:ln>
+          </p:spPr>
+          <p:style>
+            <a:lnRef idx="1">
+              <a:schemeClr val="accent1"/>
+            </a:lnRef>
+            <a:fillRef idx="0">
+              <a:schemeClr val="accent1"/>
+            </a:fillRef>
+            <a:effectRef idx="0">
+              <a:schemeClr val="accent1"/>
+            </a:effectRef>
+            <a:fontRef idx="minor">
+              <a:schemeClr val="tx1"/>
+            </a:fontRef>
+          </p:style>
+        </p:cxnSp>
+        <p:cxnSp>
+          <p:nvCxnSpPr>
+            <p:cNvPr id="13" name="Straight Connector 12"/>
+            <p:cNvCxnSpPr/>
+            <p:nvPr/>
+          </p:nvCxnSpPr>
+          <p:spPr>
+            <a:xfrm>
+              <a:off x="5555226" y="4273425"/>
+              <a:ext cx="902724" cy="19664"/>
+            </a:xfrm>
+            <a:prstGeom prst="line">
+              <a:avLst/>
+            </a:prstGeom>
+            <a:ln w="38100">
+              <a:solidFill>
+                <a:srgbClr val="C00000"/>
+              </a:solidFill>
+              <a:headEnd type="stealth" w="lg" len="lg"/>
+            </a:ln>
+          </p:spPr>
+          <p:style>
+            <a:lnRef idx="1">
+              <a:schemeClr val="accent1"/>
+            </a:lnRef>
+            <a:fillRef idx="0">
+              <a:schemeClr val="accent1"/>
+            </a:fillRef>
+            <a:effectRef idx="0">
+              <a:schemeClr val="accent1"/>
+            </a:effectRef>
+            <a:fontRef idx="minor">
+              <a:schemeClr val="tx1"/>
+            </a:fontRef>
+          </p:style>
+        </p:cxnSp>
+      </p:grpSp>
+    </p:spTree>
+    <p:extLst>
+      <p:ext uri="{BB962C8B-B14F-4D97-AF65-F5344CB8AC3E}">
+        <p14:creationId xmlns:p14="http://schemas.microsoft.com/office/powerpoint/2010/main" val="975808360"/>
       </p:ext>
     </p:extLst>
   </p:cSld>
@@ -18462,7 +19500,1040 @@
                                           </p:stCondLst>
                                         </p:cTn>
                                         <p:tgtEl>
-                                          <p:spTgt spid="6"/>
+                                          <p:spTgt spid="14"/>
+                                        </p:tgtEl>
+                                        <p:attrNameLst>
+                                          <p:attrName>style.visibility</p:attrName>
+                                        </p:attrNameLst>
+                                      </p:cBhvr>
+                                      <p:to>
+                                        <p:strVal val="visible"/>
+                                      </p:to>
+                                    </p:set>
+                                  </p:childTnLst>
+                                </p:cTn>
+                              </p:par>
+                            </p:childTnLst>
+                          </p:cTn>
+                        </p:par>
+                      </p:childTnLst>
+                    </p:cTn>
+                  </p:par>
+                </p:childTnLst>
+              </p:cTn>
+              <p:prevCondLst>
+                <p:cond evt="onPrev" delay="0">
+                  <p:tgtEl>
+                    <p:sldTgt/>
+                  </p:tgtEl>
+                </p:cond>
+              </p:prevCondLst>
+              <p:nextCondLst>
+                <p:cond evt="onNext" delay="0">
+                  <p:tgtEl>
+                    <p:sldTgt/>
+                  </p:tgtEl>
+                </p:cond>
+              </p:nextCondLst>
+            </p:seq>
+          </p:childTnLst>
+        </p:cTn>
+      </p:par>
+    </p:tnLst>
+  </p:timing>
+</p:sld>
+</file>
+
+<file path=ppt/slides/slide25.xml><?xml version="1.0" encoding="utf-8"?>
+<p:sld xmlns:a="http://schemas.openxmlformats.org/drawingml/2006/main" xmlns:r="http://schemas.openxmlformats.org/officeDocument/2006/relationships" xmlns:p="http://schemas.openxmlformats.org/presentationml/2006/main">
+  <p:cSld>
+    <p:spTree>
+      <p:nvGrpSpPr>
+        <p:cNvPr id="1" name=""/>
+        <p:cNvGrpSpPr/>
+        <p:nvPr/>
+      </p:nvGrpSpPr>
+      <p:grpSpPr>
+        <a:xfrm>
+          <a:off x="0" y="0"/>
+          <a:ext cx="0" cy="0"/>
+          <a:chOff x="0" y="0"/>
+          <a:chExt cx="0" cy="0"/>
+        </a:xfrm>
+      </p:grpSpPr>
+      <p:sp>
+        <p:nvSpPr>
+          <p:cNvPr id="2" name="Title 1"/>
+          <p:cNvSpPr>
+            <a:spLocks noGrp="1"/>
+          </p:cNvSpPr>
+          <p:nvPr>
+            <p:ph type="title"/>
+          </p:nvPr>
+        </p:nvSpPr>
+        <p:spPr/>
+        <p:txBody>
+          <a:bodyPr/>
+          <a:lstStyle/>
+          <a:p>
+            <a:r>
+              <a:rPr lang="en-US" dirty="0" smtClean="0"/>
+              <a:t>Blocks</a:t>
+            </a:r>
+            <a:endParaRPr lang="en-US" dirty="0"/>
+          </a:p>
+        </p:txBody>
+      </p:sp>
+      <p:sp>
+        <p:nvSpPr>
+          <p:cNvPr id="3" name="Content Placeholder 2"/>
+          <p:cNvSpPr>
+            <a:spLocks noGrp="1"/>
+          </p:cNvSpPr>
+          <p:nvPr>
+            <p:ph idx="1"/>
+          </p:nvPr>
+        </p:nvSpPr>
+        <p:spPr/>
+        <p:txBody>
+          <a:bodyPr/>
+          <a:lstStyle/>
+          <a:p>
+            <a:r>
+              <a:rPr lang="en-US" dirty="0" smtClean="0"/>
+              <a:t>Blocks: one or more statements</a:t>
+            </a:r>
+          </a:p>
+          <a:p>
+            <a:r>
+              <a:rPr lang="en-US" dirty="0" smtClean="0"/>
+              <a:t>Enclosed in </a:t>
+            </a:r>
+            <a:r>
+              <a:rPr lang="en-US" dirty="0" smtClean="0">
+                <a:latin typeface="Courier New" panose="02070309020205020404" pitchFamily="49" charset="0"/>
+                <a:cs typeface="Courier New" panose="02070309020205020404" pitchFamily="49" charset="0"/>
+              </a:rPr>
+              <a:t>{…}</a:t>
+            </a:r>
+          </a:p>
+          <a:p>
+            <a:r>
+              <a:rPr lang="en-US" dirty="0" smtClean="0"/>
+              <a:t>Defines scope</a:t>
+            </a:r>
+            <a:endParaRPr lang="en-US" dirty="0"/>
+          </a:p>
+        </p:txBody>
+      </p:sp>
+      <p:sp>
+        <p:nvSpPr>
+          <p:cNvPr id="4" name="Slide Number Placeholder 3"/>
+          <p:cNvSpPr>
+            <a:spLocks noGrp="1"/>
+          </p:cNvSpPr>
+          <p:nvPr>
+            <p:ph type="sldNum" sz="quarter" idx="12"/>
+          </p:nvPr>
+        </p:nvSpPr>
+        <p:spPr/>
+        <p:txBody>
+          <a:bodyPr/>
+          <a:lstStyle/>
+          <a:p>
+            <a:fld id="{033373DF-BCDA-4600-B448-AFBDB22F4A39}" type="slidenum">
+              <a:rPr lang="en-US" smtClean="0"/>
+              <a:t>25</a:t>
+            </a:fld>
+            <a:endParaRPr lang="en-US"/>
+          </a:p>
+        </p:txBody>
+      </p:sp>
+      <p:sp>
+        <p:nvSpPr>
+          <p:cNvPr id="5" name="TextBox 4"/>
+          <p:cNvSpPr txBox="1"/>
+          <p:nvPr/>
+        </p:nvSpPr>
+        <p:spPr>
+          <a:xfrm>
+            <a:off x="701778" y="3533625"/>
+            <a:ext cx="5345062" cy="2800767"/>
+          </a:xfrm>
+          <a:prstGeom prst="rect">
+            <a:avLst/>
+          </a:prstGeom>
+          <a:solidFill>
+            <a:schemeClr val="bg1">
+              <a:lumMod val="75000"/>
+            </a:schemeClr>
+          </a:solidFill>
+        </p:spPr>
+        <p:txBody>
+          <a:bodyPr wrap="square" rtlCol="0">
+            <a:spAutoFit/>
+          </a:bodyPr>
+          <a:lstStyle/>
+          <a:p>
+            <a:r>
+              <a:rPr lang="en-US" sz="1600" dirty="0" smtClean="0">
+                <a:latin typeface="Courier New" pitchFamily="49" charset="0"/>
+                <a:cs typeface="Courier New" pitchFamily="49" charset="0"/>
+              </a:rPr>
+              <a:t>…</a:t>
+            </a:r>
+          </a:p>
+          <a:p>
+            <a:r>
+              <a:rPr lang="en-US" sz="1600" dirty="0" err="1" smtClean="0">
+                <a:latin typeface="Courier New" pitchFamily="49" charset="0"/>
+                <a:cs typeface="Courier New" pitchFamily="49" charset="0"/>
+              </a:rPr>
+              <a:t>int</a:t>
+            </a:r>
+            <a:r>
+              <a:rPr lang="en-US" sz="1600" dirty="0" smtClean="0">
+                <a:latin typeface="Courier New" pitchFamily="49" charset="0"/>
+                <a:cs typeface="Courier New" pitchFamily="49" charset="0"/>
+              </a:rPr>
+              <a:t> </a:t>
+            </a:r>
+            <a:r>
+              <a:rPr lang="en-US" sz="1600" dirty="0" err="1" smtClean="0">
+                <a:latin typeface="Courier New" pitchFamily="49" charset="0"/>
+                <a:cs typeface="Courier New" pitchFamily="49" charset="0"/>
+              </a:rPr>
+              <a:t>i</a:t>
+            </a:r>
+            <a:r>
+              <a:rPr lang="en-US" sz="1600" dirty="0" smtClean="0">
+                <a:latin typeface="Courier New" pitchFamily="49" charset="0"/>
+                <a:cs typeface="Courier New" pitchFamily="49" charset="0"/>
+              </a:rPr>
+              <a:t> {3};</a:t>
+            </a:r>
+          </a:p>
+          <a:p>
+            <a:r>
+              <a:rPr lang="en-US" sz="1600" dirty="0" smtClean="0">
+                <a:latin typeface="Courier New" pitchFamily="49" charset="0"/>
+                <a:cs typeface="Courier New" pitchFamily="49" charset="0"/>
+              </a:rPr>
+              <a:t>{</a:t>
+            </a:r>
+          </a:p>
+          <a:p>
+            <a:r>
+              <a:rPr lang="en-US" sz="1600" dirty="0">
+                <a:latin typeface="Courier New" pitchFamily="49" charset="0"/>
+                <a:cs typeface="Courier New" pitchFamily="49" charset="0"/>
+              </a:rPr>
+              <a:t> </a:t>
+            </a:r>
+            <a:r>
+              <a:rPr lang="en-US" sz="1600" dirty="0" smtClean="0">
+                <a:latin typeface="Courier New" pitchFamily="49" charset="0"/>
+                <a:cs typeface="Courier New" pitchFamily="49" charset="0"/>
+              </a:rPr>
+              <a:t>   </a:t>
+            </a:r>
+            <a:r>
+              <a:rPr lang="en-US" sz="1600" dirty="0" err="1" smtClean="0">
+                <a:latin typeface="Courier New" pitchFamily="49" charset="0"/>
+                <a:cs typeface="Courier New" pitchFamily="49" charset="0"/>
+              </a:rPr>
+              <a:t>int</a:t>
+            </a:r>
+            <a:r>
+              <a:rPr lang="en-US" sz="1600" dirty="0" smtClean="0">
+                <a:latin typeface="Courier New" pitchFamily="49" charset="0"/>
+                <a:cs typeface="Courier New" pitchFamily="49" charset="0"/>
+              </a:rPr>
+              <a:t> </a:t>
+            </a:r>
+            <a:r>
+              <a:rPr lang="en-US" sz="1600" dirty="0" err="1" smtClean="0">
+                <a:latin typeface="Courier New" pitchFamily="49" charset="0"/>
+                <a:cs typeface="Courier New" pitchFamily="49" charset="0"/>
+              </a:rPr>
+              <a:t>i</a:t>
+            </a:r>
+            <a:r>
+              <a:rPr lang="en-US" sz="1600" dirty="0" smtClean="0">
+                <a:latin typeface="Courier New" pitchFamily="49" charset="0"/>
+                <a:cs typeface="Courier New" pitchFamily="49" charset="0"/>
+              </a:rPr>
+              <a:t> {5};</a:t>
+            </a:r>
+          </a:p>
+          <a:p>
+            <a:r>
+              <a:rPr lang="en-US" sz="1600" dirty="0">
+                <a:latin typeface="Courier New" pitchFamily="49" charset="0"/>
+                <a:cs typeface="Courier New" pitchFamily="49" charset="0"/>
+              </a:rPr>
+              <a:t> </a:t>
+            </a:r>
+            <a:r>
+              <a:rPr lang="en-US" sz="1600" dirty="0" smtClean="0">
+                <a:latin typeface="Courier New" pitchFamily="49" charset="0"/>
+                <a:cs typeface="Courier New" pitchFamily="49" charset="0"/>
+              </a:rPr>
+              <a:t>   </a:t>
+            </a:r>
+            <a:r>
+              <a:rPr lang="en-US" sz="1600" dirty="0" err="1" smtClean="0">
+                <a:latin typeface="Courier New" pitchFamily="49" charset="0"/>
+                <a:cs typeface="Courier New" pitchFamily="49" charset="0"/>
+              </a:rPr>
+              <a:t>cout</a:t>
+            </a:r>
+            <a:r>
+              <a:rPr lang="en-US" sz="1600" dirty="0" smtClean="0">
+                <a:latin typeface="Courier New" pitchFamily="49" charset="0"/>
+                <a:cs typeface="Courier New" pitchFamily="49" charset="0"/>
+              </a:rPr>
+              <a:t> &lt;&lt; </a:t>
+            </a:r>
+            <a:r>
+              <a:rPr lang="en-US" sz="1600" dirty="0" err="1" smtClean="0">
+                <a:latin typeface="Courier New" pitchFamily="49" charset="0"/>
+                <a:cs typeface="Courier New" pitchFamily="49" charset="0"/>
+              </a:rPr>
+              <a:t>i</a:t>
+            </a:r>
+            <a:r>
+              <a:rPr lang="en-US" sz="1600" dirty="0" smtClean="0">
+                <a:latin typeface="Courier New" pitchFamily="49" charset="0"/>
+                <a:cs typeface="Courier New" pitchFamily="49" charset="0"/>
+              </a:rPr>
+              <a:t> &lt;&lt; </a:t>
+            </a:r>
+            <a:r>
+              <a:rPr lang="en-US" sz="1600" dirty="0" err="1" smtClean="0">
+                <a:latin typeface="Courier New" pitchFamily="49" charset="0"/>
+                <a:cs typeface="Courier New" pitchFamily="49" charset="0"/>
+              </a:rPr>
+              <a:t>endl</a:t>
+            </a:r>
+            <a:r>
+              <a:rPr lang="en-US" sz="1600" dirty="0" smtClean="0">
+                <a:latin typeface="Courier New" pitchFamily="49" charset="0"/>
+                <a:cs typeface="Courier New" pitchFamily="49" charset="0"/>
+              </a:rPr>
+              <a:t>;</a:t>
+            </a:r>
+          </a:p>
+          <a:p>
+            <a:r>
+              <a:rPr lang="en-US" sz="1600" dirty="0" smtClean="0">
+                <a:latin typeface="Courier New" pitchFamily="49" charset="0"/>
+                <a:cs typeface="Courier New" pitchFamily="49" charset="0"/>
+              </a:rPr>
+              <a:t>}</a:t>
+            </a:r>
+          </a:p>
+          <a:p>
+            <a:r>
+              <a:rPr lang="en-US" sz="1600" dirty="0" err="1" smtClean="0">
+                <a:latin typeface="Courier New" pitchFamily="49" charset="0"/>
+                <a:cs typeface="Courier New" pitchFamily="49" charset="0"/>
+              </a:rPr>
+              <a:t>cout</a:t>
+            </a:r>
+            <a:r>
+              <a:rPr lang="en-US" sz="1600" dirty="0" smtClean="0">
+                <a:latin typeface="Courier New" pitchFamily="49" charset="0"/>
+                <a:cs typeface="Courier New" pitchFamily="49" charset="0"/>
+              </a:rPr>
+              <a:t> &lt;&lt; </a:t>
+            </a:r>
+            <a:r>
+              <a:rPr lang="en-US" sz="1600" dirty="0" err="1" smtClean="0">
+                <a:latin typeface="Courier New" pitchFamily="49" charset="0"/>
+                <a:cs typeface="Courier New" pitchFamily="49" charset="0"/>
+              </a:rPr>
+              <a:t>i</a:t>
+            </a:r>
+            <a:r>
+              <a:rPr lang="en-US" sz="1600" dirty="0" smtClean="0">
+                <a:latin typeface="Courier New" pitchFamily="49" charset="0"/>
+                <a:cs typeface="Courier New" pitchFamily="49" charset="0"/>
+              </a:rPr>
+              <a:t> &lt;&lt; </a:t>
+            </a:r>
+            <a:r>
+              <a:rPr lang="en-US" sz="1600" dirty="0" err="1" smtClean="0">
+                <a:latin typeface="Courier New" pitchFamily="49" charset="0"/>
+                <a:cs typeface="Courier New" pitchFamily="49" charset="0"/>
+              </a:rPr>
+              <a:t>endl</a:t>
+            </a:r>
+            <a:r>
+              <a:rPr lang="en-US" sz="1600" dirty="0" smtClean="0">
+                <a:latin typeface="Courier New" pitchFamily="49" charset="0"/>
+                <a:cs typeface="Courier New" pitchFamily="49" charset="0"/>
+              </a:rPr>
+              <a:t>;</a:t>
+            </a:r>
+          </a:p>
+          <a:p>
+            <a:r>
+              <a:rPr lang="en-US" sz="1600" dirty="0" smtClean="0">
+                <a:latin typeface="Courier New" pitchFamily="49" charset="0"/>
+                <a:cs typeface="Courier New" pitchFamily="49" charset="0"/>
+              </a:rPr>
+              <a:t>for (</a:t>
+            </a:r>
+            <a:r>
+              <a:rPr lang="en-US" sz="1600" dirty="0" err="1" smtClean="0">
+                <a:latin typeface="Courier New" pitchFamily="49" charset="0"/>
+                <a:cs typeface="Courier New" pitchFamily="49" charset="0"/>
+              </a:rPr>
+              <a:t>int</a:t>
+            </a:r>
+            <a:r>
+              <a:rPr lang="en-US" sz="1600" dirty="0" smtClean="0">
+                <a:latin typeface="Courier New" pitchFamily="49" charset="0"/>
+                <a:cs typeface="Courier New" pitchFamily="49" charset="0"/>
+              </a:rPr>
+              <a:t> </a:t>
+            </a:r>
+            <a:r>
+              <a:rPr lang="en-US" sz="1600" dirty="0" err="1" smtClean="0">
+                <a:latin typeface="Courier New" pitchFamily="49" charset="0"/>
+                <a:cs typeface="Courier New" pitchFamily="49" charset="0"/>
+              </a:rPr>
+              <a:t>i</a:t>
+            </a:r>
+            <a:r>
+              <a:rPr lang="en-US" sz="1600" dirty="0" smtClean="0">
+                <a:latin typeface="Courier New" pitchFamily="49" charset="0"/>
+                <a:cs typeface="Courier New" pitchFamily="49" charset="0"/>
+              </a:rPr>
+              <a:t> = 7; </a:t>
+            </a:r>
+            <a:r>
+              <a:rPr lang="en-US" sz="1600" dirty="0" err="1" smtClean="0">
+                <a:latin typeface="Courier New" pitchFamily="49" charset="0"/>
+                <a:cs typeface="Courier New" pitchFamily="49" charset="0"/>
+              </a:rPr>
+              <a:t>i</a:t>
+            </a:r>
+            <a:r>
+              <a:rPr lang="en-US" sz="1600" dirty="0" smtClean="0">
+                <a:latin typeface="Courier New" pitchFamily="49" charset="0"/>
+                <a:cs typeface="Courier New" pitchFamily="49" charset="0"/>
+              </a:rPr>
+              <a:t> &lt; 10; </a:t>
+            </a:r>
+            <a:r>
+              <a:rPr lang="en-US" sz="1600" dirty="0" err="1" smtClean="0">
+                <a:latin typeface="Courier New" pitchFamily="49" charset="0"/>
+                <a:cs typeface="Courier New" pitchFamily="49" charset="0"/>
+              </a:rPr>
+              <a:t>i</a:t>
+            </a:r>
+            <a:r>
+              <a:rPr lang="en-US" sz="1600" dirty="0" smtClean="0">
+                <a:latin typeface="Courier New" pitchFamily="49" charset="0"/>
+                <a:cs typeface="Courier New" pitchFamily="49" charset="0"/>
+              </a:rPr>
+              <a:t>++)</a:t>
+            </a:r>
+          </a:p>
+          <a:p>
+            <a:r>
+              <a:rPr lang="en-US" sz="1600" dirty="0" smtClean="0">
+                <a:latin typeface="Courier New" pitchFamily="49" charset="0"/>
+                <a:cs typeface="Courier New" pitchFamily="49" charset="0"/>
+              </a:rPr>
+              <a:t>    </a:t>
+            </a:r>
+            <a:r>
+              <a:rPr lang="en-US" sz="1600" dirty="0" err="1" smtClean="0">
+                <a:latin typeface="Courier New" pitchFamily="49" charset="0"/>
+                <a:cs typeface="Courier New" pitchFamily="49" charset="0"/>
+              </a:rPr>
+              <a:t>cout</a:t>
+            </a:r>
+            <a:r>
+              <a:rPr lang="en-US" sz="1600" dirty="0" smtClean="0">
+                <a:latin typeface="Courier New" pitchFamily="49" charset="0"/>
+                <a:cs typeface="Courier New" pitchFamily="49" charset="0"/>
+              </a:rPr>
+              <a:t> &lt;&lt; </a:t>
+            </a:r>
+            <a:r>
+              <a:rPr lang="en-US" sz="1600" dirty="0" err="1" smtClean="0">
+                <a:latin typeface="Courier New" pitchFamily="49" charset="0"/>
+                <a:cs typeface="Courier New" pitchFamily="49" charset="0"/>
+              </a:rPr>
+              <a:t>i</a:t>
+            </a:r>
+            <a:r>
+              <a:rPr lang="en-US" sz="1600" dirty="0" smtClean="0">
+                <a:latin typeface="Courier New" pitchFamily="49" charset="0"/>
+                <a:cs typeface="Courier New" pitchFamily="49" charset="0"/>
+              </a:rPr>
+              <a:t> &lt;&lt; " ";</a:t>
+            </a:r>
+          </a:p>
+          <a:p>
+            <a:r>
+              <a:rPr lang="en-US" sz="1600" dirty="0" err="1" smtClean="0">
+                <a:latin typeface="Courier New" pitchFamily="49" charset="0"/>
+                <a:cs typeface="Courier New" pitchFamily="49" charset="0"/>
+              </a:rPr>
+              <a:t>cout</a:t>
+            </a:r>
+            <a:r>
+              <a:rPr lang="en-US" sz="1600" dirty="0" smtClean="0">
+                <a:latin typeface="Courier New" pitchFamily="49" charset="0"/>
+                <a:cs typeface="Courier New" pitchFamily="49" charset="0"/>
+              </a:rPr>
+              <a:t> &lt;&lt; </a:t>
+            </a:r>
+            <a:r>
+              <a:rPr lang="en-US" sz="1600" dirty="0" err="1" smtClean="0">
+                <a:latin typeface="Courier New" pitchFamily="49" charset="0"/>
+                <a:cs typeface="Courier New" pitchFamily="49" charset="0"/>
+              </a:rPr>
+              <a:t>i</a:t>
+            </a:r>
+            <a:r>
+              <a:rPr lang="en-US" sz="1600" dirty="0" smtClean="0">
+                <a:latin typeface="Courier New" pitchFamily="49" charset="0"/>
+                <a:cs typeface="Courier New" pitchFamily="49" charset="0"/>
+              </a:rPr>
+              <a:t> &lt;&lt; </a:t>
+            </a:r>
+            <a:r>
+              <a:rPr lang="en-US" sz="1600" dirty="0" err="1" smtClean="0">
+                <a:latin typeface="Courier New" pitchFamily="49" charset="0"/>
+                <a:cs typeface="Courier New" pitchFamily="49" charset="0"/>
+              </a:rPr>
+              <a:t>endl</a:t>
+            </a:r>
+            <a:r>
+              <a:rPr lang="en-US" sz="1600" dirty="0" smtClean="0">
+                <a:latin typeface="Courier New" pitchFamily="49" charset="0"/>
+                <a:cs typeface="Courier New" pitchFamily="49" charset="0"/>
+              </a:rPr>
+              <a:t>;</a:t>
+            </a:r>
+          </a:p>
+          <a:p>
+            <a:r>
+              <a:rPr lang="en-US" sz="1600" dirty="0" smtClean="0">
+                <a:latin typeface="Courier New" pitchFamily="49" charset="0"/>
+                <a:cs typeface="Courier New" pitchFamily="49" charset="0"/>
+              </a:rPr>
+              <a:t>…</a:t>
+            </a:r>
+            <a:endParaRPr lang="nn-NO" sz="1600" dirty="0">
+              <a:latin typeface="Courier New" pitchFamily="49" charset="0"/>
+              <a:cs typeface="Courier New" pitchFamily="49" charset="0"/>
+            </a:endParaRPr>
+          </a:p>
+        </p:txBody>
+      </p:sp>
+      <p:grpSp>
+        <p:nvGrpSpPr>
+          <p:cNvPr id="11" name="Group 10"/>
+          <p:cNvGrpSpPr/>
+          <p:nvPr/>
+        </p:nvGrpSpPr>
+        <p:grpSpPr>
+          <a:xfrm>
+            <a:off x="4511358" y="4433102"/>
+            <a:ext cx="1535482" cy="338554"/>
+            <a:chOff x="6409603" y="4128799"/>
+            <a:chExt cx="1535482" cy="338554"/>
+          </a:xfrm>
+        </p:grpSpPr>
+        <p:sp>
+          <p:nvSpPr>
+            <p:cNvPr id="6" name="TextBox 5"/>
+            <p:cNvSpPr txBox="1"/>
+            <p:nvPr/>
+          </p:nvSpPr>
+          <p:spPr>
+            <a:xfrm>
+              <a:off x="7112387" y="4128799"/>
+              <a:ext cx="832698" cy="338554"/>
+            </a:xfrm>
+            <a:prstGeom prst="rect">
+              <a:avLst/>
+            </a:prstGeom>
+            <a:solidFill>
+              <a:schemeClr val="tx1"/>
+            </a:solidFill>
+            <a:ln>
+              <a:solidFill>
+                <a:schemeClr val="tx1"/>
+              </a:solidFill>
+            </a:ln>
+          </p:spPr>
+          <p:txBody>
+            <a:bodyPr wrap="square" rtlCol="0">
+              <a:spAutoFit/>
+            </a:bodyPr>
+            <a:lstStyle/>
+            <a:p>
+              <a:r>
+                <a:rPr lang="en-US" sz="1600" b="1" dirty="0" smtClean="0">
+                  <a:solidFill>
+                    <a:schemeClr val="bg1"/>
+                  </a:solidFill>
+                  <a:latin typeface="Courier New" pitchFamily="49" charset="0"/>
+                  <a:cs typeface="Courier New" pitchFamily="49" charset="0"/>
+                </a:rPr>
+                <a:t>5</a:t>
+              </a:r>
+              <a:endParaRPr lang="en-US" sz="1600" dirty="0">
+                <a:solidFill>
+                  <a:schemeClr val="bg1"/>
+                </a:solidFill>
+                <a:latin typeface="Courier New" pitchFamily="49" charset="0"/>
+                <a:cs typeface="Courier New" pitchFamily="49" charset="0"/>
+              </a:endParaRPr>
+            </a:p>
+          </p:txBody>
+        </p:sp>
+        <p:cxnSp>
+          <p:nvCxnSpPr>
+            <p:cNvPr id="8" name="Straight Arrow Connector 7"/>
+            <p:cNvCxnSpPr/>
+            <p:nvPr/>
+          </p:nvCxnSpPr>
+          <p:spPr>
+            <a:xfrm>
+              <a:off x="6409603" y="4298076"/>
+              <a:ext cx="597390" cy="0"/>
+            </a:xfrm>
+            <a:prstGeom prst="straightConnector1">
+              <a:avLst/>
+            </a:prstGeom>
+            <a:ln w="34925">
+              <a:solidFill>
+                <a:schemeClr val="tx1"/>
+              </a:solidFill>
+              <a:tailEnd type="stealth" w="lg" len="lg"/>
+            </a:ln>
+          </p:spPr>
+          <p:style>
+            <a:lnRef idx="1">
+              <a:schemeClr val="accent1"/>
+            </a:lnRef>
+            <a:fillRef idx="0">
+              <a:schemeClr val="accent1"/>
+            </a:fillRef>
+            <a:effectRef idx="0">
+              <a:schemeClr val="accent1"/>
+            </a:effectRef>
+            <a:fontRef idx="minor">
+              <a:schemeClr val="tx1"/>
+            </a:fontRef>
+          </p:style>
+        </p:cxnSp>
+      </p:grpSp>
+      <p:grpSp>
+        <p:nvGrpSpPr>
+          <p:cNvPr id="12" name="Group 11"/>
+          <p:cNvGrpSpPr/>
+          <p:nvPr/>
+        </p:nvGrpSpPr>
+        <p:grpSpPr>
+          <a:xfrm>
+            <a:off x="4511358" y="4972099"/>
+            <a:ext cx="1535482" cy="338554"/>
+            <a:chOff x="6409603" y="4128799"/>
+            <a:chExt cx="1535482" cy="338554"/>
+          </a:xfrm>
+        </p:grpSpPr>
+        <p:sp>
+          <p:nvSpPr>
+            <p:cNvPr id="13" name="TextBox 12"/>
+            <p:cNvSpPr txBox="1"/>
+            <p:nvPr/>
+          </p:nvSpPr>
+          <p:spPr>
+            <a:xfrm>
+              <a:off x="7112387" y="4128799"/>
+              <a:ext cx="832698" cy="338554"/>
+            </a:xfrm>
+            <a:prstGeom prst="rect">
+              <a:avLst/>
+            </a:prstGeom>
+            <a:solidFill>
+              <a:schemeClr val="tx1"/>
+            </a:solidFill>
+            <a:ln>
+              <a:solidFill>
+                <a:schemeClr val="tx1"/>
+              </a:solidFill>
+            </a:ln>
+          </p:spPr>
+          <p:txBody>
+            <a:bodyPr wrap="square" rtlCol="0">
+              <a:spAutoFit/>
+            </a:bodyPr>
+            <a:lstStyle/>
+            <a:p>
+              <a:r>
+                <a:rPr lang="en-US" sz="1600" b="1" dirty="0">
+                  <a:solidFill>
+                    <a:schemeClr val="bg1"/>
+                  </a:solidFill>
+                  <a:latin typeface="Courier New" pitchFamily="49" charset="0"/>
+                  <a:cs typeface="Courier New" pitchFamily="49" charset="0"/>
+                </a:rPr>
+                <a:t>3</a:t>
+              </a:r>
+              <a:endParaRPr lang="en-US" sz="1600" dirty="0">
+                <a:solidFill>
+                  <a:schemeClr val="bg1"/>
+                </a:solidFill>
+                <a:latin typeface="Courier New" pitchFamily="49" charset="0"/>
+                <a:cs typeface="Courier New" pitchFamily="49" charset="0"/>
+              </a:endParaRPr>
+            </a:p>
+          </p:txBody>
+        </p:sp>
+        <p:cxnSp>
+          <p:nvCxnSpPr>
+            <p:cNvPr id="14" name="Straight Arrow Connector 13"/>
+            <p:cNvCxnSpPr/>
+            <p:nvPr/>
+          </p:nvCxnSpPr>
+          <p:spPr>
+            <a:xfrm>
+              <a:off x="6409603" y="4298076"/>
+              <a:ext cx="597390" cy="0"/>
+            </a:xfrm>
+            <a:prstGeom prst="straightConnector1">
+              <a:avLst/>
+            </a:prstGeom>
+            <a:ln w="34925">
+              <a:solidFill>
+                <a:schemeClr val="tx1"/>
+              </a:solidFill>
+              <a:tailEnd type="stealth" w="lg" len="lg"/>
+            </a:ln>
+          </p:spPr>
+          <p:style>
+            <a:lnRef idx="1">
+              <a:schemeClr val="accent1"/>
+            </a:lnRef>
+            <a:fillRef idx="0">
+              <a:schemeClr val="accent1"/>
+            </a:fillRef>
+            <a:effectRef idx="0">
+              <a:schemeClr val="accent1"/>
+            </a:effectRef>
+            <a:fontRef idx="minor">
+              <a:schemeClr val="tx1"/>
+            </a:fontRef>
+          </p:style>
+        </p:cxnSp>
+      </p:grpSp>
+      <p:grpSp>
+        <p:nvGrpSpPr>
+          <p:cNvPr id="15" name="Group 14"/>
+          <p:cNvGrpSpPr/>
+          <p:nvPr/>
+        </p:nvGrpSpPr>
+        <p:grpSpPr>
+          <a:xfrm>
+            <a:off x="4511358" y="5410874"/>
+            <a:ext cx="1535482" cy="338554"/>
+            <a:chOff x="6409603" y="4128799"/>
+            <a:chExt cx="1535482" cy="338554"/>
+          </a:xfrm>
+        </p:grpSpPr>
+        <p:sp>
+          <p:nvSpPr>
+            <p:cNvPr id="16" name="TextBox 15"/>
+            <p:cNvSpPr txBox="1"/>
+            <p:nvPr/>
+          </p:nvSpPr>
+          <p:spPr>
+            <a:xfrm>
+              <a:off x="7112387" y="4128799"/>
+              <a:ext cx="832698" cy="338554"/>
+            </a:xfrm>
+            <a:prstGeom prst="rect">
+              <a:avLst/>
+            </a:prstGeom>
+            <a:solidFill>
+              <a:schemeClr val="tx1"/>
+            </a:solidFill>
+            <a:ln>
+              <a:solidFill>
+                <a:schemeClr val="tx1"/>
+              </a:solidFill>
+            </a:ln>
+          </p:spPr>
+          <p:txBody>
+            <a:bodyPr wrap="square" rtlCol="0">
+              <a:spAutoFit/>
+            </a:bodyPr>
+            <a:lstStyle/>
+            <a:p>
+              <a:r>
+                <a:rPr lang="en-US" sz="1600" dirty="0" smtClean="0">
+                  <a:solidFill>
+                    <a:schemeClr val="bg1"/>
+                  </a:solidFill>
+                  <a:latin typeface="Courier New" pitchFamily="49" charset="0"/>
+                  <a:cs typeface="Courier New" pitchFamily="49" charset="0"/>
+                </a:rPr>
+                <a:t>7 8 9</a:t>
+              </a:r>
+              <a:endParaRPr lang="en-US" sz="1600" dirty="0">
+                <a:solidFill>
+                  <a:schemeClr val="bg1"/>
+                </a:solidFill>
+                <a:latin typeface="Courier New" pitchFamily="49" charset="0"/>
+                <a:cs typeface="Courier New" pitchFamily="49" charset="0"/>
+              </a:endParaRPr>
+            </a:p>
+          </p:txBody>
+        </p:sp>
+        <p:cxnSp>
+          <p:nvCxnSpPr>
+            <p:cNvPr id="17" name="Straight Arrow Connector 16"/>
+            <p:cNvCxnSpPr/>
+            <p:nvPr/>
+          </p:nvCxnSpPr>
+          <p:spPr>
+            <a:xfrm>
+              <a:off x="6409603" y="4298076"/>
+              <a:ext cx="597390" cy="0"/>
+            </a:xfrm>
+            <a:prstGeom prst="straightConnector1">
+              <a:avLst/>
+            </a:prstGeom>
+            <a:ln w="34925">
+              <a:solidFill>
+                <a:schemeClr val="tx1"/>
+              </a:solidFill>
+              <a:tailEnd type="stealth" w="lg" len="lg"/>
+            </a:ln>
+          </p:spPr>
+          <p:style>
+            <a:lnRef idx="1">
+              <a:schemeClr val="accent1"/>
+            </a:lnRef>
+            <a:fillRef idx="0">
+              <a:schemeClr val="accent1"/>
+            </a:fillRef>
+            <a:effectRef idx="0">
+              <a:schemeClr val="accent1"/>
+            </a:effectRef>
+            <a:fontRef idx="minor">
+              <a:schemeClr val="tx1"/>
+            </a:fontRef>
+          </p:style>
+        </p:cxnSp>
+      </p:grpSp>
+      <p:grpSp>
+        <p:nvGrpSpPr>
+          <p:cNvPr id="18" name="Group 17"/>
+          <p:cNvGrpSpPr/>
+          <p:nvPr/>
+        </p:nvGrpSpPr>
+        <p:grpSpPr>
+          <a:xfrm>
+            <a:off x="4511358" y="5818127"/>
+            <a:ext cx="1535482" cy="338554"/>
+            <a:chOff x="6409603" y="4128799"/>
+            <a:chExt cx="1535482" cy="338554"/>
+          </a:xfrm>
+        </p:grpSpPr>
+        <p:sp>
+          <p:nvSpPr>
+            <p:cNvPr id="19" name="TextBox 18"/>
+            <p:cNvSpPr txBox="1"/>
+            <p:nvPr/>
+          </p:nvSpPr>
+          <p:spPr>
+            <a:xfrm>
+              <a:off x="7112387" y="4128799"/>
+              <a:ext cx="832698" cy="338554"/>
+            </a:xfrm>
+            <a:prstGeom prst="rect">
+              <a:avLst/>
+            </a:prstGeom>
+            <a:solidFill>
+              <a:schemeClr val="tx1"/>
+            </a:solidFill>
+            <a:ln>
+              <a:solidFill>
+                <a:schemeClr val="tx1"/>
+              </a:solidFill>
+            </a:ln>
+          </p:spPr>
+          <p:txBody>
+            <a:bodyPr wrap="square" rtlCol="0">
+              <a:spAutoFit/>
+            </a:bodyPr>
+            <a:lstStyle/>
+            <a:p>
+              <a:r>
+                <a:rPr lang="en-US" sz="1600" b="1" dirty="0">
+                  <a:solidFill>
+                    <a:schemeClr val="bg1"/>
+                  </a:solidFill>
+                  <a:latin typeface="Courier New" pitchFamily="49" charset="0"/>
+                  <a:cs typeface="Courier New" pitchFamily="49" charset="0"/>
+                </a:rPr>
+                <a:t>3</a:t>
+              </a:r>
+              <a:endParaRPr lang="en-US" sz="1600" dirty="0">
+                <a:solidFill>
+                  <a:schemeClr val="bg1"/>
+                </a:solidFill>
+                <a:latin typeface="Courier New" pitchFamily="49" charset="0"/>
+                <a:cs typeface="Courier New" pitchFamily="49" charset="0"/>
+              </a:endParaRPr>
+            </a:p>
+          </p:txBody>
+        </p:sp>
+        <p:cxnSp>
+          <p:nvCxnSpPr>
+            <p:cNvPr id="20" name="Straight Arrow Connector 19"/>
+            <p:cNvCxnSpPr/>
+            <p:nvPr/>
+          </p:nvCxnSpPr>
+          <p:spPr>
+            <a:xfrm>
+              <a:off x="6409603" y="4298076"/>
+              <a:ext cx="597390" cy="0"/>
+            </a:xfrm>
+            <a:prstGeom prst="straightConnector1">
+              <a:avLst/>
+            </a:prstGeom>
+            <a:ln w="34925">
+              <a:solidFill>
+                <a:schemeClr val="tx1"/>
+              </a:solidFill>
+              <a:tailEnd type="stealth" w="lg" len="lg"/>
+            </a:ln>
+          </p:spPr>
+          <p:style>
+            <a:lnRef idx="1">
+              <a:schemeClr val="accent1"/>
+            </a:lnRef>
+            <a:fillRef idx="0">
+              <a:schemeClr val="accent1"/>
+            </a:fillRef>
+            <a:effectRef idx="0">
+              <a:schemeClr val="accent1"/>
+            </a:effectRef>
+            <a:fontRef idx="minor">
+              <a:schemeClr val="tx1"/>
+            </a:fontRef>
+          </p:style>
+        </p:cxnSp>
+      </p:grpSp>
+      <p:sp>
+        <p:nvSpPr>
+          <p:cNvPr id="21" name="TextBox 20"/>
+          <p:cNvSpPr txBox="1"/>
+          <p:nvPr/>
+        </p:nvSpPr>
+        <p:spPr>
+          <a:xfrm rot="20068315">
+            <a:off x="5807980" y="3430725"/>
+            <a:ext cx="1866217" cy="830997"/>
+          </a:xfrm>
+          <a:prstGeom prst="rect">
+            <a:avLst/>
+          </a:prstGeom>
+          <a:solidFill>
+            <a:schemeClr val="bg1"/>
+          </a:solidFill>
+          <a:ln>
+            <a:solidFill>
+              <a:srgbClr val="C00000"/>
+            </a:solidFill>
+          </a:ln>
+        </p:spPr>
+        <p:txBody>
+          <a:bodyPr wrap="none" rtlCol="0">
+            <a:spAutoFit/>
+          </a:bodyPr>
+          <a:lstStyle/>
+          <a:p>
+            <a:r>
+              <a:rPr lang="en-US" sz="2400" dirty="0" smtClean="0"/>
+              <a:t>Don't do this:</a:t>
+            </a:r>
+            <a:br>
+              <a:rPr lang="en-US" sz="2400" dirty="0" smtClean="0"/>
+            </a:br>
+            <a:r>
+              <a:rPr lang="en-US" sz="2400" dirty="0" smtClean="0"/>
+              <a:t>confusing!</a:t>
+            </a:r>
+            <a:endParaRPr lang="en-US" sz="2400" dirty="0"/>
+          </a:p>
+        </p:txBody>
+      </p:sp>
+    </p:spTree>
+    <p:extLst>
+      <p:ext uri="{BB962C8B-B14F-4D97-AF65-F5344CB8AC3E}">
+        <p14:creationId xmlns:p14="http://schemas.microsoft.com/office/powerpoint/2010/main" val="3188477547"/>
+      </p:ext>
+    </p:extLst>
+  </p:cSld>
+  <p:clrMapOvr>
+    <a:masterClrMapping/>
+  </p:clrMapOvr>
+  <p:timing>
+    <p:tnLst>
+      <p:par>
+        <p:cTn id="1" dur="indefinite" restart="never" nodeType="tmRoot">
+          <p:childTnLst>
+            <p:seq concurrent="1" nextAc="seek">
+              <p:cTn id="2" dur="indefinite" nodeType="mainSeq">
+                <p:childTnLst>
+                  <p:par>
+                    <p:cTn id="3" fill="hold">
+                      <p:stCondLst>
+                        <p:cond delay="indefinite"/>
+                        <p:cond evt="onBegin" delay="0">
+                          <p:tn val="2"/>
+                        </p:cond>
+                      </p:stCondLst>
+                      <p:childTnLst>
+                        <p:par>
+                          <p:cTn id="4" fill="hold">
+                            <p:stCondLst>
+                              <p:cond delay="0"/>
+                            </p:stCondLst>
+                            <p:childTnLst>
+                              <p:par>
+                                <p:cTn id="5" presetID="1" presetClass="entr" presetSubtype="0" fill="hold" grpId="0" nodeType="withEffect">
+                                  <p:stCondLst>
+                                    <p:cond delay="0"/>
+                                  </p:stCondLst>
+                                  <p:childTnLst>
+                                    <p:set>
+                                      <p:cBhvr>
+                                        <p:cTn id="6" dur="1" fill="hold">
+                                          <p:stCondLst>
+                                            <p:cond delay="0"/>
+                                          </p:stCondLst>
+                                        </p:cTn>
+                                        <p:tgtEl>
+                                          <p:spTgt spid="3">
+                                            <p:txEl>
+                                              <p:pRg st="0" end="0"/>
+                                            </p:txEl>
+                                          </p:spTgt>
                                         </p:tgtEl>
                                         <p:attrNameLst>
                                           <p:attrName>style.visibility</p:attrName>
@@ -18494,7 +20565,7 @@
                             </p:stCondLst>
                             <p:childTnLst>
                               <p:par>
-                                <p:cTn id="9" presetID="1" presetClass="entr" presetSubtype="0" fill="hold" nodeType="clickEffect">
+                                <p:cTn id="9" presetID="1" presetClass="entr" presetSubtype="0" fill="hold" grpId="0" nodeType="clickEffect">
                                   <p:stCondLst>
                                     <p:cond delay="0"/>
                                   </p:stCondLst>
@@ -18507,7 +20578,11 @@
                                           </p:stCondLst>
                                         </p:cTn>
                                         <p:tgtEl>
-                                          <p:spTgt spid="10"/>
+                                          <p:spTgt spid="3">
+                                            <p:txEl>
+                                              <p:pRg st="1" end="1"/>
+                                            </p:txEl>
+                                          </p:spTgt>
                                         </p:tgtEl>
                                         <p:attrNameLst>
                                           <p:attrName>style.visibility</p:attrName>
@@ -18539,7 +20614,7 @@
                             </p:stCondLst>
                             <p:childTnLst>
                               <p:par>
-                                <p:cTn id="13" presetID="1" presetClass="entr" presetSubtype="0" fill="hold" nodeType="clickEffect">
+                                <p:cTn id="13" presetID="1" presetClass="entr" presetSubtype="0" fill="hold" grpId="0" nodeType="clickEffect">
                                   <p:stCondLst>
                                     <p:cond delay="0"/>
                                   </p:stCondLst>
@@ -18552,7 +20627,11 @@
                                           </p:stCondLst>
                                         </p:cTn>
                                         <p:tgtEl>
-                                          <p:spTgt spid="19"/>
+                                          <p:spTgt spid="3">
+                                            <p:txEl>
+                                              <p:pRg st="2" end="2"/>
+                                            </p:txEl>
+                                          </p:spTgt>
                                         </p:tgtEl>
                                         <p:attrNameLst>
                                           <p:attrName>style.visibility</p:attrName>
@@ -18597,7 +20676,187 @@
                                           </p:stCondLst>
                                         </p:cTn>
                                         <p:tgtEl>
-                                          <p:spTgt spid="26"/>
+                                          <p:spTgt spid="11"/>
+                                        </p:tgtEl>
+                                        <p:attrNameLst>
+                                          <p:attrName>style.visibility</p:attrName>
+                                        </p:attrNameLst>
+                                      </p:cBhvr>
+                                      <p:to>
+                                        <p:strVal val="visible"/>
+                                      </p:to>
+                                    </p:set>
+                                  </p:childTnLst>
+                                </p:cTn>
+                              </p:par>
+                            </p:childTnLst>
+                          </p:cTn>
+                        </p:par>
+                      </p:childTnLst>
+                    </p:cTn>
+                  </p:par>
+                  <p:par>
+                    <p:cTn id="19" fill="hold">
+                      <p:stCondLst>
+                        <p:cond delay="indefinite"/>
+                      </p:stCondLst>
+                      <p:childTnLst>
+                        <p:par>
+                          <p:cTn id="20" fill="hold">
+                            <p:stCondLst>
+                              <p:cond delay="0"/>
+                            </p:stCondLst>
+                            <p:childTnLst>
+                              <p:par>
+                                <p:cTn id="21" presetID="1" presetClass="entr" presetSubtype="0" fill="hold" nodeType="clickEffect">
+                                  <p:stCondLst>
+                                    <p:cond delay="0"/>
+                                  </p:stCondLst>
+                                  <p:childTnLst>
+                                    <p:set>
+                                      <p:cBhvr>
+                                        <p:cTn id="22" dur="1" fill="hold">
+                                          <p:stCondLst>
+                                            <p:cond delay="0"/>
+                                          </p:stCondLst>
+                                        </p:cTn>
+                                        <p:tgtEl>
+                                          <p:spTgt spid="12"/>
+                                        </p:tgtEl>
+                                        <p:attrNameLst>
+                                          <p:attrName>style.visibility</p:attrName>
+                                        </p:attrNameLst>
+                                      </p:cBhvr>
+                                      <p:to>
+                                        <p:strVal val="visible"/>
+                                      </p:to>
+                                    </p:set>
+                                  </p:childTnLst>
+                                </p:cTn>
+                              </p:par>
+                            </p:childTnLst>
+                          </p:cTn>
+                        </p:par>
+                      </p:childTnLst>
+                    </p:cTn>
+                  </p:par>
+                  <p:par>
+                    <p:cTn id="23" fill="hold">
+                      <p:stCondLst>
+                        <p:cond delay="indefinite"/>
+                      </p:stCondLst>
+                      <p:childTnLst>
+                        <p:par>
+                          <p:cTn id="24" fill="hold">
+                            <p:stCondLst>
+                              <p:cond delay="0"/>
+                            </p:stCondLst>
+                            <p:childTnLst>
+                              <p:par>
+                                <p:cTn id="25" presetID="1" presetClass="entr" presetSubtype="0" fill="hold" nodeType="clickEffect">
+                                  <p:stCondLst>
+                                    <p:cond delay="0"/>
+                                  </p:stCondLst>
+                                  <p:childTnLst>
+                                    <p:set>
+                                      <p:cBhvr>
+                                        <p:cTn id="26" dur="1" fill="hold">
+                                          <p:stCondLst>
+                                            <p:cond delay="0"/>
+                                          </p:stCondLst>
+                                        </p:cTn>
+                                        <p:tgtEl>
+                                          <p:spTgt spid="15"/>
+                                        </p:tgtEl>
+                                        <p:attrNameLst>
+                                          <p:attrName>style.visibility</p:attrName>
+                                        </p:attrNameLst>
+                                      </p:cBhvr>
+                                      <p:to>
+                                        <p:strVal val="visible"/>
+                                      </p:to>
+                                    </p:set>
+                                  </p:childTnLst>
+                                </p:cTn>
+                              </p:par>
+                            </p:childTnLst>
+                          </p:cTn>
+                        </p:par>
+                      </p:childTnLst>
+                    </p:cTn>
+                  </p:par>
+                  <p:par>
+                    <p:cTn id="27" fill="hold">
+                      <p:stCondLst>
+                        <p:cond delay="indefinite"/>
+                      </p:stCondLst>
+                      <p:childTnLst>
+                        <p:par>
+                          <p:cTn id="28" fill="hold">
+                            <p:stCondLst>
+                              <p:cond delay="0"/>
+                            </p:stCondLst>
+                            <p:childTnLst>
+                              <p:par>
+                                <p:cTn id="29" presetID="1" presetClass="entr" presetSubtype="0" fill="hold" nodeType="clickEffect">
+                                  <p:stCondLst>
+                                    <p:cond delay="0"/>
+                                  </p:stCondLst>
+                                  <p:childTnLst>
+                                    <p:set>
+                                      <p:cBhvr>
+                                        <p:cTn id="30" dur="1" fill="hold">
+                                          <p:stCondLst>
+                                            <p:cond delay="0"/>
+                                          </p:stCondLst>
+                                        </p:cTn>
+                                        <p:tgtEl>
+                                          <p:spTgt spid="18"/>
+                                        </p:tgtEl>
+                                        <p:attrNameLst>
+                                          <p:attrName>style.visibility</p:attrName>
+                                        </p:attrNameLst>
+                                      </p:cBhvr>
+                                      <p:to>
+                                        <p:strVal val="visible"/>
+                                      </p:to>
+                                    </p:set>
+                                  </p:childTnLst>
+                                </p:cTn>
+                              </p:par>
+                            </p:childTnLst>
+                          </p:cTn>
+                        </p:par>
+                      </p:childTnLst>
+                    </p:cTn>
+                  </p:par>
+                  <p:par>
+                    <p:cTn id="31" fill="hold">
+                      <p:stCondLst>
+                        <p:cond delay="indefinite"/>
+                      </p:stCondLst>
+                      <p:childTnLst>
+                        <p:par>
+                          <p:cTn id="32" fill="hold">
+                            <p:stCondLst>
+                              <p:cond delay="0"/>
+                            </p:stCondLst>
+                            <p:childTnLst>
+                              <p:par>
+                                <p:cTn id="33" presetID="1" presetClass="entr" presetSubtype="0" fill="hold" grpId="0" nodeType="clickEffect">
+                                  <p:stCondLst>
+                                    <p:cond delay="0"/>
+                                  </p:stCondLst>
+                                  <p:childTnLst>
+                                    <p:set>
+                                      <p:cBhvr>
+                                        <p:cTn id="34" dur="1" fill="hold">
+                                          <p:stCondLst>
+                                            <p:cond delay="0"/>
+                                          </p:stCondLst>
+                                        </p:cTn>
+                                        <p:tgtEl>
+                                          <p:spTgt spid="21"/>
                                         </p:tgtEl>
                                         <p:attrNameLst>
                                           <p:attrName>style.visibility</p:attrName>
@@ -18637,364 +20896,10 @@
         </p:cTn>
       </p:par>
     </p:tnLst>
-  </p:timing>
-</p:sld>
-</file>
-
-<file path=ppt/slides/slide24.xml><?xml version="1.0" encoding="utf-8"?>
-<p:sld xmlns:a="http://schemas.openxmlformats.org/drawingml/2006/main" xmlns:r="http://schemas.openxmlformats.org/officeDocument/2006/relationships" xmlns:p="http://schemas.openxmlformats.org/presentationml/2006/main">
-  <p:cSld>
-    <p:spTree>
-      <p:nvGrpSpPr>
-        <p:cNvPr id="1" name=""/>
-        <p:cNvGrpSpPr/>
-        <p:nvPr/>
-      </p:nvGrpSpPr>
-      <p:grpSpPr>
-        <a:xfrm>
-          <a:off x="0" y="0"/>
-          <a:ext cx="0" cy="0"/>
-          <a:chOff x="0" y="0"/>
-          <a:chExt cx="0" cy="0"/>
-        </a:xfrm>
-      </p:grpSpPr>
-      <p:sp>
-        <p:nvSpPr>
-          <p:cNvPr id="2" name="Title 1"/>
-          <p:cNvSpPr>
-            <a:spLocks noGrp="1"/>
-          </p:cNvSpPr>
-          <p:nvPr>
-            <p:ph type="title"/>
-          </p:nvPr>
-        </p:nvSpPr>
-        <p:spPr/>
-        <p:txBody>
-          <a:bodyPr/>
-          <a:lstStyle/>
-          <a:p>
-            <a:r>
-              <a:rPr lang="en-US" dirty="0" smtClean="0"/>
-              <a:t>Break statement</a:t>
-            </a:r>
-            <a:endParaRPr lang="en-US" dirty="0"/>
-          </a:p>
-        </p:txBody>
-      </p:sp>
-      <p:sp>
-        <p:nvSpPr>
-          <p:cNvPr id="3" name="Content Placeholder 2"/>
-          <p:cNvSpPr>
-            <a:spLocks noGrp="1"/>
-          </p:cNvSpPr>
-          <p:nvPr>
-            <p:ph idx="1"/>
-          </p:nvPr>
-        </p:nvSpPr>
-        <p:spPr/>
-        <p:txBody>
-          <a:bodyPr/>
-          <a:lstStyle/>
-          <a:p>
-            <a:r>
-              <a:rPr lang="en-US" dirty="0" smtClean="0"/>
-              <a:t>Interrupt repetition statement</a:t>
-            </a:r>
-            <a:endParaRPr lang="en-US" dirty="0"/>
-          </a:p>
-        </p:txBody>
-      </p:sp>
-      <p:sp>
-        <p:nvSpPr>
-          <p:cNvPr id="4" name="Slide Number Placeholder 3"/>
-          <p:cNvSpPr>
-            <a:spLocks noGrp="1"/>
-          </p:cNvSpPr>
-          <p:nvPr>
-            <p:ph type="sldNum" sz="quarter" idx="12"/>
-          </p:nvPr>
-        </p:nvSpPr>
-        <p:spPr/>
-        <p:txBody>
-          <a:bodyPr/>
-          <a:lstStyle/>
-          <a:p>
-            <a:fld id="{033373DF-BCDA-4600-B448-AFBDB22F4A39}" type="slidenum">
-              <a:rPr lang="en-US" smtClean="0"/>
-              <a:t>24</a:t>
-            </a:fld>
-            <a:endParaRPr lang="en-US"/>
-          </a:p>
-        </p:txBody>
-      </p:sp>
-      <p:sp>
-        <p:nvSpPr>
-          <p:cNvPr id="5" name="TextBox 4"/>
-          <p:cNvSpPr txBox="1"/>
-          <p:nvPr/>
-        </p:nvSpPr>
-        <p:spPr>
-          <a:xfrm>
-            <a:off x="701778" y="2658551"/>
-            <a:ext cx="5345062" cy="1815882"/>
-          </a:xfrm>
-          <a:prstGeom prst="rect">
-            <a:avLst/>
-          </a:prstGeom>
-          <a:solidFill>
-            <a:schemeClr val="bg1">
-              <a:lumMod val="75000"/>
-            </a:schemeClr>
-          </a:solidFill>
-        </p:spPr>
-        <p:txBody>
-          <a:bodyPr wrap="square" rtlCol="0">
-            <a:spAutoFit/>
-          </a:bodyPr>
-          <a:lstStyle/>
-          <a:p>
-            <a:r>
-              <a:rPr lang="en-US" sz="1600" dirty="0" err="1" smtClean="0">
-                <a:latin typeface="Courier New" pitchFamily="49" charset="0"/>
-                <a:cs typeface="Courier New" pitchFamily="49" charset="0"/>
-              </a:rPr>
-              <a:t>cout</a:t>
-            </a:r>
-            <a:r>
-              <a:rPr lang="en-US" sz="1600" dirty="0" smtClean="0">
-                <a:latin typeface="Courier New" pitchFamily="49" charset="0"/>
-                <a:cs typeface="Courier New" pitchFamily="49" charset="0"/>
-              </a:rPr>
-              <a:t> </a:t>
-            </a:r>
-            <a:r>
-              <a:rPr lang="en-US" sz="1600" dirty="0">
-                <a:latin typeface="Courier New" pitchFamily="49" charset="0"/>
-                <a:cs typeface="Courier New" pitchFamily="49" charset="0"/>
-              </a:rPr>
-              <a:t>&lt;&lt; </a:t>
-            </a:r>
-            <a:r>
-              <a:rPr lang="en-US" sz="1600" dirty="0" smtClean="0">
-                <a:latin typeface="Courier New" pitchFamily="49" charset="0"/>
-                <a:cs typeface="Courier New" pitchFamily="49" charset="0"/>
-              </a:rPr>
-              <a:t>"Name?" &lt;&lt; </a:t>
-            </a:r>
-            <a:r>
-              <a:rPr lang="en-US" sz="1600" dirty="0" err="1">
-                <a:latin typeface="Courier New" pitchFamily="49" charset="0"/>
-                <a:cs typeface="Courier New" pitchFamily="49" charset="0"/>
-              </a:rPr>
-              <a:t>endl</a:t>
-            </a:r>
-            <a:r>
-              <a:rPr lang="en-US" sz="1600" dirty="0">
-                <a:latin typeface="Courier New" pitchFamily="49" charset="0"/>
-                <a:cs typeface="Courier New" pitchFamily="49" charset="0"/>
-              </a:rPr>
-              <a:t>;</a:t>
-            </a:r>
-          </a:p>
-          <a:p>
-            <a:r>
-              <a:rPr lang="en-US" sz="1600" dirty="0" smtClean="0">
-                <a:latin typeface="Courier New" pitchFamily="49" charset="0"/>
-                <a:cs typeface="Courier New" pitchFamily="49" charset="0"/>
-              </a:rPr>
-              <a:t>while </a:t>
-            </a:r>
-            <a:r>
-              <a:rPr lang="en-US" sz="1600" dirty="0">
-                <a:latin typeface="Courier New" pitchFamily="49" charset="0"/>
-                <a:cs typeface="Courier New" pitchFamily="49" charset="0"/>
-              </a:rPr>
-              <a:t>(</a:t>
-            </a:r>
-            <a:r>
-              <a:rPr lang="en-US" sz="1600" dirty="0" err="1">
-                <a:latin typeface="Courier New" pitchFamily="49" charset="0"/>
-                <a:cs typeface="Courier New" pitchFamily="49" charset="0"/>
-              </a:rPr>
-              <a:t>cin</a:t>
-            </a:r>
-            <a:r>
-              <a:rPr lang="en-US" sz="1600" dirty="0">
-                <a:latin typeface="Courier New" pitchFamily="49" charset="0"/>
-                <a:cs typeface="Courier New" pitchFamily="49" charset="0"/>
-              </a:rPr>
-              <a:t> &gt;&gt; name) {</a:t>
-            </a:r>
-          </a:p>
-          <a:p>
-            <a:r>
-              <a:rPr lang="en-US" sz="1600" dirty="0" smtClean="0">
-                <a:latin typeface="Courier New" pitchFamily="49" charset="0"/>
-                <a:cs typeface="Courier New" pitchFamily="49" charset="0"/>
-              </a:rPr>
-              <a:t>    </a:t>
-            </a:r>
-            <a:r>
-              <a:rPr lang="en-US" sz="1600" dirty="0">
-                <a:latin typeface="Courier New" pitchFamily="49" charset="0"/>
-                <a:cs typeface="Courier New" pitchFamily="49" charset="0"/>
-              </a:rPr>
-              <a:t>if (name == "quit")</a:t>
-            </a:r>
-          </a:p>
-          <a:p>
-            <a:r>
-              <a:rPr lang="en-US" sz="1600" dirty="0" smtClean="0">
-                <a:latin typeface="Courier New" pitchFamily="49" charset="0"/>
-                <a:cs typeface="Courier New" pitchFamily="49" charset="0"/>
-              </a:rPr>
-              <a:t>        </a:t>
-            </a:r>
-            <a:r>
-              <a:rPr lang="en-US" sz="1600" dirty="0">
-                <a:latin typeface="Courier New" pitchFamily="49" charset="0"/>
-                <a:cs typeface="Courier New" pitchFamily="49" charset="0"/>
-              </a:rPr>
-              <a:t>break;</a:t>
-            </a:r>
-          </a:p>
-          <a:p>
-            <a:r>
-              <a:rPr lang="en-US" sz="1600" dirty="0" smtClean="0">
-                <a:latin typeface="Courier New" pitchFamily="49" charset="0"/>
-                <a:cs typeface="Courier New" pitchFamily="49" charset="0"/>
-              </a:rPr>
-              <a:t>    </a:t>
-            </a:r>
-            <a:r>
-              <a:rPr lang="en-US" sz="1600" dirty="0" err="1">
-                <a:latin typeface="Courier New" pitchFamily="49" charset="0"/>
-                <a:cs typeface="Courier New" pitchFamily="49" charset="0"/>
-              </a:rPr>
-              <a:t>cout</a:t>
-            </a:r>
-            <a:r>
-              <a:rPr lang="en-US" sz="1600" dirty="0">
-                <a:latin typeface="Courier New" pitchFamily="49" charset="0"/>
-                <a:cs typeface="Courier New" pitchFamily="49" charset="0"/>
-              </a:rPr>
-              <a:t> &lt;&lt; </a:t>
-            </a:r>
-            <a:r>
-              <a:rPr lang="en-US" sz="1600" dirty="0" smtClean="0">
-                <a:latin typeface="Courier New" pitchFamily="49" charset="0"/>
-                <a:cs typeface="Courier New" pitchFamily="49" charset="0"/>
-              </a:rPr>
-              <a:t>"Hi " &lt;&lt; </a:t>
-            </a:r>
-            <a:r>
-              <a:rPr lang="en-US" sz="1600" dirty="0">
-                <a:latin typeface="Courier New" pitchFamily="49" charset="0"/>
-                <a:cs typeface="Courier New" pitchFamily="49" charset="0"/>
-              </a:rPr>
-              <a:t>name &lt;&lt; "!" &lt;&lt; </a:t>
-            </a:r>
-            <a:r>
-              <a:rPr lang="en-US" sz="1600" dirty="0" err="1">
-                <a:latin typeface="Courier New" pitchFamily="49" charset="0"/>
-                <a:cs typeface="Courier New" pitchFamily="49" charset="0"/>
-              </a:rPr>
-              <a:t>endl</a:t>
-            </a:r>
-            <a:r>
-              <a:rPr lang="en-US" sz="1600" dirty="0">
-                <a:latin typeface="Courier New" pitchFamily="49" charset="0"/>
-                <a:cs typeface="Courier New" pitchFamily="49" charset="0"/>
-              </a:rPr>
-              <a:t>;</a:t>
-            </a:r>
-          </a:p>
-          <a:p>
-            <a:r>
-              <a:rPr lang="en-US" sz="1600" dirty="0" smtClean="0">
-                <a:latin typeface="Courier New" pitchFamily="49" charset="0"/>
-                <a:cs typeface="Courier New" pitchFamily="49" charset="0"/>
-              </a:rPr>
-              <a:t>}</a:t>
-            </a:r>
-            <a:endParaRPr lang="en-US" sz="1600" dirty="0">
-              <a:latin typeface="Courier New" pitchFamily="49" charset="0"/>
-              <a:cs typeface="Courier New" pitchFamily="49" charset="0"/>
-            </a:endParaRPr>
-          </a:p>
-          <a:p>
-            <a:r>
-              <a:rPr lang="en-US" sz="1600" dirty="0" err="1" smtClean="0">
-                <a:latin typeface="Courier New" pitchFamily="49" charset="0"/>
-                <a:cs typeface="Courier New" pitchFamily="49" charset="0"/>
-              </a:rPr>
-              <a:t>cout</a:t>
-            </a:r>
-            <a:r>
-              <a:rPr lang="en-US" sz="1600" dirty="0" smtClean="0">
-                <a:latin typeface="Courier New" pitchFamily="49" charset="0"/>
-                <a:cs typeface="Courier New" pitchFamily="49" charset="0"/>
-              </a:rPr>
-              <a:t> </a:t>
-            </a:r>
-            <a:r>
-              <a:rPr lang="en-US" sz="1600" dirty="0">
-                <a:latin typeface="Courier New" pitchFamily="49" charset="0"/>
-                <a:cs typeface="Courier New" pitchFamily="49" charset="0"/>
-              </a:rPr>
-              <a:t>&lt;&lt; </a:t>
-            </a:r>
-            <a:r>
-              <a:rPr lang="en-US" sz="1600" dirty="0" smtClean="0">
-                <a:latin typeface="Courier New" pitchFamily="49" charset="0"/>
-                <a:cs typeface="Courier New" pitchFamily="49" charset="0"/>
-              </a:rPr>
-              <a:t>"Bye" </a:t>
-            </a:r>
-            <a:r>
-              <a:rPr lang="en-US" sz="1600" dirty="0">
-                <a:latin typeface="Courier New" pitchFamily="49" charset="0"/>
-                <a:cs typeface="Courier New" pitchFamily="49" charset="0"/>
-              </a:rPr>
-              <a:t>&lt;&lt; </a:t>
-            </a:r>
-            <a:r>
-              <a:rPr lang="en-US" sz="1600" dirty="0" err="1">
-                <a:latin typeface="Courier New" pitchFamily="49" charset="0"/>
-                <a:cs typeface="Courier New" pitchFamily="49" charset="0"/>
-              </a:rPr>
-              <a:t>endl</a:t>
-            </a:r>
-            <a:r>
-              <a:rPr lang="en-US" sz="1600" dirty="0">
-                <a:latin typeface="Courier New" pitchFamily="49" charset="0"/>
-                <a:cs typeface="Courier New" pitchFamily="49" charset="0"/>
-              </a:rPr>
-              <a:t>;</a:t>
-            </a:r>
-            <a:endParaRPr lang="nn-NO" sz="1600" dirty="0">
-              <a:latin typeface="Courier New" pitchFamily="49" charset="0"/>
-              <a:cs typeface="Courier New" pitchFamily="49" charset="0"/>
-            </a:endParaRPr>
-          </a:p>
-        </p:txBody>
-      </p:sp>
-    </p:spTree>
-    <p:extLst>
-      <p:ext uri="{BB962C8B-B14F-4D97-AF65-F5344CB8AC3E}">
-        <p14:creationId xmlns:p14="http://schemas.microsoft.com/office/powerpoint/2010/main" val="975808360"/>
-      </p:ext>
-    </p:extLst>
-  </p:cSld>
-  <p:clrMapOvr>
-    <a:masterClrMapping/>
-  </p:clrMapOvr>
-  <p:timing>
-    <p:tnLst>
-      <p:par>
-        <p:cTn id="1" dur="indefinite" restart="never" nodeType="tmRoot"/>
-      </p:par>
-    </p:tnLst>
+    <p:bldLst>
+      <p:bldP spid="3" grpId="0" uiExpand="1" build="p"/>
+      <p:bldP spid="21" grpId="0" animBg="1"/>
+    </p:bldLst>
   </p:timing>
 </p:sld>
 </file>
@@ -22053,8 +23958,19 @@
           </a:p>
           <a:p>
             <a:r>
+              <a:rPr lang="en-US" dirty="0" smtClean="0">
+                <a:latin typeface="Courier New" panose="02070309020205020404" pitchFamily="49" charset="0"/>
+                <a:cs typeface="Courier New" panose="02070309020205020404" pitchFamily="49" charset="0"/>
+              </a:rPr>
+              <a:t>main</a:t>
+            </a:r>
+            <a:r>
               <a:rPr lang="en-US" dirty="0" smtClean="0"/>
-              <a:t>Function definition</a:t>
+              <a:t> function </a:t>
+            </a:r>
+            <a:r>
+              <a:rPr lang="en-US" dirty="0" smtClean="0"/>
+              <a:t>definition</a:t>
             </a:r>
           </a:p>
           <a:p>
@@ -22398,9 +24314,9 @@
         <p:grpSpPr>
           <a:xfrm>
             <a:off x="1214770" y="3344860"/>
-            <a:ext cx="7405022" cy="1323439"/>
+            <a:ext cx="7031202" cy="1036036"/>
             <a:chOff x="-1469923" y="3344860"/>
-            <a:chExt cx="7405022" cy="1323439"/>
+            <a:chExt cx="7031202" cy="1036036"/>
           </a:xfrm>
         </p:grpSpPr>
         <p:sp>
@@ -22412,7 +24328,7 @@
           <p:spPr>
             <a:xfrm>
               <a:off x="3779701" y="3344860"/>
-              <a:ext cx="2155398" cy="1323439"/>
+              <a:ext cx="1781578" cy="1015663"/>
             </a:xfrm>
             <a:prstGeom prst="rect">
               <a:avLst/>
@@ -22438,7 +24354,7 @@
                     <a:srgbClr val="C00000"/>
                   </a:solidFill>
                 </a:rPr>
-                <a:t>function signature:</a:t>
+                <a:t>Application has</a:t>
               </a:r>
               <a:br>
                 <a:rPr lang="en-US" sz="2000" dirty="0" smtClean="0">
@@ -22453,24 +24369,7 @@
                     <a:srgbClr val="C00000"/>
                   </a:solidFill>
                 </a:rPr>
-                <a:t> </a:t>
-              </a:r>
-              <a:r>
-                <a:rPr lang="en-US" sz="2000" dirty="0" smtClean="0">
-                  <a:solidFill>
-                    <a:srgbClr val="C00000"/>
-                  </a:solidFill>
-                  <a:sym typeface="Symbol" panose="05050102010706020507" pitchFamily="18" charset="2"/>
-                </a:rPr>
-                <a:t>  </a:t>
-              </a:r>
-              <a:r>
-                <a:rPr lang="en-US" sz="2000" dirty="0" smtClean="0">
-                  <a:solidFill>
-                    <a:srgbClr val="C00000"/>
-                  </a:solidFill>
-                </a:rPr>
-                <a:t>return type</a:t>
+                <a:t>exactly one</a:t>
               </a:r>
             </a:p>
             <a:p>
@@ -22479,17 +24378,10 @@
                   <a:solidFill>
                     <a:srgbClr val="C00000"/>
                   </a:solidFill>
+                  <a:latin typeface="Courier New" panose="02070309020205020404" pitchFamily="49" charset="0"/>
+                  <a:cs typeface="Courier New" panose="02070309020205020404" pitchFamily="49" charset="0"/>
                 </a:rPr>
-                <a:t> </a:t>
-              </a:r>
-              <a:r>
-                <a:rPr lang="en-US" sz="2000" dirty="0" smtClean="0">
-                  <a:solidFill>
-                    <a:srgbClr val="C00000"/>
-                  </a:solidFill>
-                  <a:sym typeface="Symbol" panose="05050102010706020507" pitchFamily="18" charset="2"/>
-                </a:rPr>
-                <a:t>  </a:t>
+                <a:t>main</a:t>
               </a:r>
               <a:r>
                 <a:rPr lang="en-US" sz="2000" dirty="0" smtClean="0">
@@ -22497,39 +24389,7 @@
                     <a:srgbClr val="C00000"/>
                   </a:solidFill>
                 </a:rPr>
-                <a:t>function name</a:t>
-              </a:r>
-              <a:br>
-                <a:rPr lang="en-US" sz="2000" dirty="0" smtClean="0">
-                  <a:solidFill>
-                    <a:srgbClr val="C00000"/>
-                  </a:solidFill>
-                </a:rPr>
-              </a:br>
-              <a:r>
-                <a:rPr lang="en-US" sz="2000" dirty="0" smtClean="0">
-                  <a:solidFill>
-                    <a:srgbClr val="C00000"/>
-                  </a:solidFill>
-                </a:rPr>
-                <a:t> </a:t>
-              </a:r>
-              <a:r>
-                <a:rPr lang="en-US" sz="2000" dirty="0" smtClean="0">
-                  <a:solidFill>
-                    <a:srgbClr val="C00000"/>
-                  </a:solidFill>
-                  <a:sym typeface="Symbol" panose="05050102010706020507" pitchFamily="18" charset="2"/>
-                </a:rPr>
-                <a:t>  </a:t>
-              </a:r>
-              <a:r>
-                <a:rPr lang="en-US" sz="2000" dirty="0" smtClean="0">
-                  <a:solidFill>
-                    <a:srgbClr val="C00000"/>
-                  </a:solidFill>
-                </a:rPr>
-                <a:t>argument types</a:t>
+                <a:t> function</a:t>
               </a:r>
               <a:endParaRPr lang="en-US" sz="2000" dirty="0">
                 <a:solidFill>
@@ -22596,8 +24456,8 @@
           </p:nvCxnSpPr>
           <p:spPr>
             <a:xfrm flipH="1">
-              <a:off x="2585884" y="4006580"/>
-              <a:ext cx="1193817" cy="233894"/>
+              <a:off x="2585884" y="3852692"/>
+              <a:ext cx="1193817" cy="387782"/>
             </a:xfrm>
             <a:prstGeom prst="straightConnector1">
               <a:avLst/>

</xml_diff>